<commit_message>
Add agenda and purpose slides.
</commit_message>
<xml_diff>
--- a/TransactionLog.pptx
+++ b/TransactionLog.pptx
@@ -5,11 +5,13 @@
     <p:sldMasterId id="2147483648" r:id="rId1"/>
   </p:sldMasterIdLst>
   <p:notesMasterIdLst>
-    <p:notesMasterId r:id="rId4"/>
+    <p:notesMasterId r:id="rId6"/>
   </p:notesMasterIdLst>
   <p:sldIdLst>
     <p:sldId id="328" r:id="rId2"/>
     <p:sldId id="259" r:id="rId3"/>
+    <p:sldId id="329" r:id="rId4"/>
+    <p:sldId id="330" r:id="rId5"/>
   </p:sldIdLst>
   <p:sldSz cx="9144000" cy="6858000" type="screen4x3"/>
   <p:notesSz cx="6858000" cy="9144000"/>
@@ -520,14 +522,6 @@
           <a:bodyPr/>
           <a:lstStyle/>
           <a:p>
-            <a:r>
-              <a:rPr lang="en-US" dirty="0"/>
-              <a:t>This is a session about optimizer internals.  The optimizer is already</a:t>
-            </a:r>
-            <a:r>
-              <a:rPr lang="en-US" baseline="0" dirty="0"/>
-              <a:t> pretty much a black box, but there is a lot of unofficial information about how it works.  I intend to dig in even deeper and examine some mostly undocumented commands, DMVs and structures.  If this isn’t your cup of tea, I won’t be offended if you decide to find a different session.  This is also mostly a theoretical session.  It is intended to help you write better queries, but we aren’t going actually discuss how to do that.</a:t>
-            </a:r>
             <a:endParaRPr lang="en-US" dirty="0"/>
           </a:p>
         </p:txBody>
@@ -4830,11 +4824,11 @@
   <p:clrMapOvr>
     <a:masterClrMapping/>
   </p:clrMapOvr>
-  <mc:AlternateContent xmlns:mc="http://schemas.openxmlformats.org/markup-compatibility/2006">
-    <mc:Choice xmlns:p14="http://schemas.microsoft.com/office/powerpoint/2010/main" Requires="p14">
+  <mc:AlternateContent xmlns:mc="http://schemas.openxmlformats.org/markup-compatibility/2006" xmlns:p14="http://schemas.microsoft.com/office/powerpoint/2010/main">
+    <mc:Choice Requires="p14">
       <p:transition spd="slow" p14:dur="2000"/>
     </mc:Choice>
-    <mc:Fallback>
+    <mc:Fallback xmlns="">
       <p:transition spd="slow"/>
     </mc:Fallback>
   </mc:AlternateContent>
@@ -5843,6 +5837,268 @@
     <p:extLst>
       <p:ext uri="{BB962C8B-B14F-4D97-AF65-F5344CB8AC3E}">
         <p14:creationId xmlns:p14="http://schemas.microsoft.com/office/powerpoint/2010/main" val="1021995815"/>
+      </p:ext>
+    </p:extLst>
+  </p:cSld>
+  <p:clrMapOvr>
+    <a:masterClrMapping/>
+  </p:clrMapOvr>
+</p:sld>
+</file>
+
+<file path=ppt/slides/slide3.xml><?xml version="1.0" encoding="utf-8"?>
+<p:sld xmlns:a="http://schemas.openxmlformats.org/drawingml/2006/main" xmlns:r="http://schemas.openxmlformats.org/officeDocument/2006/relationships" xmlns:p="http://schemas.openxmlformats.org/presentationml/2006/main">
+  <p:cSld>
+    <p:spTree>
+      <p:nvGrpSpPr>
+        <p:cNvPr id="1" name=""/>
+        <p:cNvGrpSpPr/>
+        <p:nvPr/>
+      </p:nvGrpSpPr>
+      <p:grpSpPr>
+        <a:xfrm>
+          <a:off x="0" y="0"/>
+          <a:ext cx="0" cy="0"/>
+          <a:chOff x="0" y="0"/>
+          <a:chExt cx="0" cy="0"/>
+        </a:xfrm>
+      </p:grpSpPr>
+      <p:sp>
+        <p:nvSpPr>
+          <p:cNvPr id="2" name="Title 1"/>
+          <p:cNvSpPr>
+            <a:spLocks noGrp="1"/>
+          </p:cNvSpPr>
+          <p:nvPr>
+            <p:ph type="title"/>
+          </p:nvPr>
+        </p:nvSpPr>
+        <p:spPr/>
+        <p:txBody>
+          <a:bodyPr/>
+          <a:lstStyle/>
+          <a:p>
+            <a:r>
+              <a:rPr lang="en-US" dirty="0" smtClean="0"/>
+              <a:t>Agenda</a:t>
+            </a:r>
+            <a:endParaRPr lang="en-US" dirty="0"/>
+          </a:p>
+        </p:txBody>
+      </p:sp>
+      <p:sp>
+        <p:nvSpPr>
+          <p:cNvPr id="3" name="Content Placeholder 2"/>
+          <p:cNvSpPr>
+            <a:spLocks noGrp="1"/>
+          </p:cNvSpPr>
+          <p:nvPr>
+            <p:ph idx="1"/>
+          </p:nvPr>
+        </p:nvSpPr>
+        <p:spPr/>
+        <p:txBody>
+          <a:bodyPr/>
+          <a:lstStyle/>
+          <a:p>
+            <a:r>
+              <a:rPr lang="en-US" dirty="0" smtClean="0"/>
+              <a:t>Purpose of the transaction log</a:t>
+            </a:r>
+          </a:p>
+          <a:p>
+            <a:r>
+              <a:rPr lang="en-US" dirty="0" smtClean="0"/>
+              <a:t>Organization of the transaction log</a:t>
+            </a:r>
+          </a:p>
+          <a:p>
+            <a:r>
+              <a:rPr lang="en-US" dirty="0" smtClean="0"/>
+              <a:t>Flushing the log</a:t>
+            </a:r>
+          </a:p>
+          <a:p>
+            <a:r>
+              <a:rPr lang="en-US" dirty="0" smtClean="0"/>
+              <a:t>Clearing the log</a:t>
+            </a:r>
+          </a:p>
+          <a:p>
+            <a:r>
+              <a:rPr lang="en-US" dirty="0" smtClean="0"/>
+              <a:t>Checkpoints</a:t>
+            </a:r>
+          </a:p>
+          <a:p>
+            <a:r>
+              <a:rPr lang="en-US" dirty="0" smtClean="0"/>
+              <a:t>Rollback operations</a:t>
+            </a:r>
+          </a:p>
+          <a:p>
+            <a:r>
+              <a:rPr lang="en-US" dirty="0" smtClean="0"/>
+              <a:t>VLF fragmentation</a:t>
+            </a:r>
+          </a:p>
+          <a:p>
+            <a:r>
+              <a:rPr lang="en-US" dirty="0" smtClean="0"/>
+              <a:t>Log monitoring</a:t>
+            </a:r>
+          </a:p>
+        </p:txBody>
+      </p:sp>
+    </p:spTree>
+    <p:extLst>
+      <p:ext uri="{BB962C8B-B14F-4D97-AF65-F5344CB8AC3E}">
+        <p14:creationId xmlns:p14="http://schemas.microsoft.com/office/powerpoint/2010/main" val="1097259878"/>
+      </p:ext>
+    </p:extLst>
+  </p:cSld>
+  <p:clrMapOvr>
+    <a:masterClrMapping/>
+  </p:clrMapOvr>
+</p:sld>
+</file>
+
+<file path=ppt/slides/slide4.xml><?xml version="1.0" encoding="utf-8"?>
+<p:sld xmlns:a="http://schemas.openxmlformats.org/drawingml/2006/main" xmlns:r="http://schemas.openxmlformats.org/officeDocument/2006/relationships" xmlns:p="http://schemas.openxmlformats.org/presentationml/2006/main">
+  <p:cSld>
+    <p:spTree>
+      <p:nvGrpSpPr>
+        <p:cNvPr id="1" name=""/>
+        <p:cNvGrpSpPr/>
+        <p:nvPr/>
+      </p:nvGrpSpPr>
+      <p:grpSpPr>
+        <a:xfrm>
+          <a:off x="0" y="0"/>
+          <a:ext cx="0" cy="0"/>
+          <a:chOff x="0" y="0"/>
+          <a:chExt cx="0" cy="0"/>
+        </a:xfrm>
+      </p:grpSpPr>
+      <p:sp>
+        <p:nvSpPr>
+          <p:cNvPr id="2" name="Title 1"/>
+          <p:cNvSpPr>
+            <a:spLocks noGrp="1"/>
+          </p:cNvSpPr>
+          <p:nvPr>
+            <p:ph type="title"/>
+          </p:nvPr>
+        </p:nvSpPr>
+        <p:spPr/>
+        <p:txBody>
+          <a:bodyPr/>
+          <a:lstStyle/>
+          <a:p>
+            <a:r>
+              <a:rPr lang="en-US" dirty="0" smtClean="0"/>
+              <a:t>Purpose of the Transaction Log</a:t>
+            </a:r>
+            <a:endParaRPr lang="en-US" dirty="0"/>
+          </a:p>
+        </p:txBody>
+      </p:sp>
+      <p:sp>
+        <p:nvSpPr>
+          <p:cNvPr id="3" name="Content Placeholder 2"/>
+          <p:cNvSpPr>
+            <a:spLocks noGrp="1"/>
+          </p:cNvSpPr>
+          <p:nvPr>
+            <p:ph idx="1"/>
+          </p:nvPr>
+        </p:nvSpPr>
+        <p:spPr/>
+        <p:txBody>
+          <a:bodyPr>
+            <a:normAutofit lnSpcReduction="10000"/>
+          </a:bodyPr>
+          <a:lstStyle/>
+          <a:p>
+            <a:r>
+              <a:rPr lang="en-US" dirty="0" smtClean="0"/>
+              <a:t>Primary purposes</a:t>
+            </a:r>
+          </a:p>
+          <a:p>
+            <a:pPr lvl="1"/>
+            <a:r>
+              <a:rPr lang="en-US" dirty="0" smtClean="0"/>
+              <a:t>Durability</a:t>
+            </a:r>
+          </a:p>
+          <a:p>
+            <a:pPr lvl="2"/>
+            <a:r>
+              <a:rPr lang="en-US" dirty="0" smtClean="0"/>
+              <a:t>Crash recovery / restore operations</a:t>
+            </a:r>
+          </a:p>
+          <a:p>
+            <a:pPr lvl="1"/>
+            <a:r>
+              <a:rPr lang="en-US" dirty="0" smtClean="0"/>
+              <a:t>Atomicity</a:t>
+            </a:r>
+          </a:p>
+          <a:p>
+            <a:pPr lvl="1"/>
+            <a:r>
+              <a:rPr lang="en-US" dirty="0" smtClean="0"/>
+              <a:t>Thought experiment</a:t>
+            </a:r>
+          </a:p>
+          <a:p>
+            <a:pPr lvl="2"/>
+            <a:r>
+              <a:rPr lang="en-US" dirty="0" smtClean="0"/>
+              <a:t>What would SQL be like without </a:t>
+            </a:r>
+            <a:r>
+              <a:rPr lang="en-US" smtClean="0"/>
+              <a:t>a transaction log?</a:t>
+            </a:r>
+            <a:endParaRPr lang="en-US" dirty="0" smtClean="0"/>
+          </a:p>
+          <a:p>
+            <a:r>
+              <a:rPr lang="en-US" dirty="0" smtClean="0"/>
+              <a:t>Secondary purposes</a:t>
+            </a:r>
+          </a:p>
+          <a:p>
+            <a:pPr lvl="1"/>
+            <a:r>
+              <a:rPr lang="en-US" dirty="0" smtClean="0"/>
+              <a:t>Log reader (replication, CDC)</a:t>
+            </a:r>
+          </a:p>
+          <a:p>
+            <a:pPr lvl="1"/>
+            <a:r>
+              <a:rPr lang="en-US" dirty="0" smtClean="0"/>
+              <a:t>Mirroring / Availability Groups / log shipping</a:t>
+            </a:r>
+          </a:p>
+          <a:p>
+            <a:pPr lvl="1"/>
+            <a:r>
+              <a:rPr lang="en-US" dirty="0" smtClean="0"/>
+              <a:t>Snapshots</a:t>
+            </a:r>
+            <a:endParaRPr lang="en-US" dirty="0"/>
+          </a:p>
+        </p:txBody>
+      </p:sp>
+    </p:spTree>
+    <p:extLst>
+      <p:ext uri="{BB962C8B-B14F-4D97-AF65-F5344CB8AC3E}">
+        <p14:creationId xmlns:p14="http://schemas.microsoft.com/office/powerpoint/2010/main" val="1146920383"/>
       </p:ext>
     </p:extLst>
   </p:cSld>

</xml_diff>

<commit_message>
Add Visio document for diagrams.  Add Organization of the log file.
</commit_message>
<xml_diff>
--- a/TransactionLog.pptx
+++ b/TransactionLog.pptx
@@ -5,13 +5,17 @@
     <p:sldMasterId id="2147483648" r:id="rId1"/>
   </p:sldMasterIdLst>
   <p:notesMasterIdLst>
-    <p:notesMasterId r:id="rId6"/>
+    <p:notesMasterId r:id="rId10"/>
   </p:notesMasterIdLst>
   <p:sldIdLst>
     <p:sldId id="328" r:id="rId2"/>
     <p:sldId id="259" r:id="rId3"/>
     <p:sldId id="329" r:id="rId4"/>
     <p:sldId id="330" r:id="rId5"/>
+    <p:sldId id="331" r:id="rId6"/>
+    <p:sldId id="332" r:id="rId7"/>
+    <p:sldId id="333" r:id="rId8"/>
+    <p:sldId id="334" r:id="rId9"/>
   </p:sldIdLst>
   <p:sldSz cx="9144000" cy="6858000" type="screen4x3"/>
   <p:notesSz cx="6858000" cy="9144000"/>
@@ -6057,13 +6061,8 @@
             <a:pPr lvl="2"/>
             <a:r>
               <a:rPr lang="en-US" dirty="0" smtClean="0"/>
-              <a:t>What would SQL be like without </a:t>
-            </a:r>
-            <a:r>
-              <a:rPr lang="en-US" smtClean="0"/>
-              <a:t>a transaction log?</a:t>
-            </a:r>
-            <a:endParaRPr lang="en-US" dirty="0" smtClean="0"/>
+              <a:t>What would SQL be like without a transaction log?</a:t>
+            </a:r>
           </a:p>
           <a:p>
             <a:r>
@@ -6099,6 +6098,441 @@
     <p:extLst>
       <p:ext uri="{BB962C8B-B14F-4D97-AF65-F5344CB8AC3E}">
         <p14:creationId xmlns:p14="http://schemas.microsoft.com/office/powerpoint/2010/main" val="1146920383"/>
+      </p:ext>
+    </p:extLst>
+  </p:cSld>
+  <p:clrMapOvr>
+    <a:masterClrMapping/>
+  </p:clrMapOvr>
+</p:sld>
+</file>
+
+<file path=ppt/slides/slide5.xml><?xml version="1.0" encoding="utf-8"?>
+<p:sld xmlns:a="http://schemas.openxmlformats.org/drawingml/2006/main" xmlns:r="http://schemas.openxmlformats.org/officeDocument/2006/relationships" xmlns:p="http://schemas.openxmlformats.org/presentationml/2006/main">
+  <p:cSld>
+    <p:spTree>
+      <p:nvGrpSpPr>
+        <p:cNvPr id="1" name=""/>
+        <p:cNvGrpSpPr/>
+        <p:nvPr/>
+      </p:nvGrpSpPr>
+      <p:grpSpPr>
+        <a:xfrm>
+          <a:off x="0" y="0"/>
+          <a:ext cx="0" cy="0"/>
+          <a:chOff x="0" y="0"/>
+          <a:chExt cx="0" cy="0"/>
+        </a:xfrm>
+      </p:grpSpPr>
+      <p:sp>
+        <p:nvSpPr>
+          <p:cNvPr id="2" name="Title 1"/>
+          <p:cNvSpPr>
+            <a:spLocks noGrp="1"/>
+          </p:cNvSpPr>
+          <p:nvPr>
+            <p:ph type="title"/>
+          </p:nvPr>
+        </p:nvSpPr>
+        <p:spPr/>
+        <p:txBody>
+          <a:bodyPr/>
+          <a:lstStyle/>
+          <a:p>
+            <a:r>
+              <a:rPr lang="en-US" dirty="0" smtClean="0"/>
+              <a:t>What Goes in the Transaction Log?</a:t>
+            </a:r>
+            <a:endParaRPr lang="en-US" dirty="0"/>
+          </a:p>
+        </p:txBody>
+      </p:sp>
+      <p:sp>
+        <p:nvSpPr>
+          <p:cNvPr id="3" name="Content Placeholder 2"/>
+          <p:cNvSpPr>
+            <a:spLocks noGrp="1"/>
+          </p:cNvSpPr>
+          <p:nvPr>
+            <p:ph idx="1"/>
+          </p:nvPr>
+        </p:nvSpPr>
+        <p:spPr/>
+        <p:txBody>
+          <a:bodyPr/>
+          <a:lstStyle/>
+          <a:p>
+            <a:r>
+              <a:rPr lang="en-US" u="sng" dirty="0" smtClean="0"/>
+              <a:t>Everything</a:t>
+            </a:r>
+            <a:r>
+              <a:rPr lang="en-US" dirty="0" smtClean="0"/>
+              <a:t> that modifies the state </a:t>
+            </a:r>
+            <a:r>
+              <a:rPr lang="en-US" u="sng" dirty="0" smtClean="0"/>
+              <a:t>any</a:t>
+            </a:r>
+            <a:r>
+              <a:rPr lang="en-US" dirty="0" smtClean="0"/>
+              <a:t> database in SQL</a:t>
+            </a:r>
+          </a:p>
+          <a:p>
+            <a:r>
+              <a:rPr lang="en-US" dirty="0" smtClean="0"/>
+              <a:t>Very limited exceptions for some </a:t>
+            </a:r>
+            <a:r>
+              <a:rPr lang="en-US" dirty="0" err="1" smtClean="0"/>
+              <a:t>tempdb</a:t>
+            </a:r>
+            <a:r>
+              <a:rPr lang="en-US" dirty="0" smtClean="0"/>
+              <a:t> objects</a:t>
+            </a:r>
+            <a:endParaRPr lang="en-US" dirty="0"/>
+          </a:p>
+        </p:txBody>
+      </p:sp>
+    </p:spTree>
+    <p:extLst>
+      <p:ext uri="{BB962C8B-B14F-4D97-AF65-F5344CB8AC3E}">
+        <p14:creationId xmlns:p14="http://schemas.microsoft.com/office/powerpoint/2010/main" val="1907664427"/>
+      </p:ext>
+    </p:extLst>
+  </p:cSld>
+  <p:clrMapOvr>
+    <a:masterClrMapping/>
+  </p:clrMapOvr>
+</p:sld>
+</file>
+
+<file path=ppt/slides/slide6.xml><?xml version="1.0" encoding="utf-8"?>
+<p:sld xmlns:a="http://schemas.openxmlformats.org/drawingml/2006/main" xmlns:r="http://schemas.openxmlformats.org/officeDocument/2006/relationships" xmlns:p="http://schemas.openxmlformats.org/presentationml/2006/main">
+  <p:cSld>
+    <p:spTree>
+      <p:nvGrpSpPr>
+        <p:cNvPr id="1" name=""/>
+        <p:cNvGrpSpPr/>
+        <p:nvPr/>
+      </p:nvGrpSpPr>
+      <p:grpSpPr>
+        <a:xfrm>
+          <a:off x="0" y="0"/>
+          <a:ext cx="0" cy="0"/>
+          <a:chOff x="0" y="0"/>
+          <a:chExt cx="0" cy="0"/>
+        </a:xfrm>
+      </p:grpSpPr>
+      <p:sp>
+        <p:nvSpPr>
+          <p:cNvPr id="2" name="Title 1"/>
+          <p:cNvSpPr>
+            <a:spLocks noGrp="1"/>
+          </p:cNvSpPr>
+          <p:nvPr>
+            <p:ph type="title"/>
+          </p:nvPr>
+        </p:nvSpPr>
+        <p:spPr/>
+        <p:txBody>
+          <a:bodyPr/>
+          <a:lstStyle/>
+          <a:p>
+            <a:r>
+              <a:rPr lang="en-US" dirty="0" smtClean="0"/>
+              <a:t>Organization of the Transaction Log</a:t>
+            </a:r>
+            <a:endParaRPr lang="en-US" dirty="0"/>
+          </a:p>
+        </p:txBody>
+      </p:sp>
+      <p:sp>
+        <p:nvSpPr>
+          <p:cNvPr id="3" name="Content Placeholder 2"/>
+          <p:cNvSpPr>
+            <a:spLocks noGrp="1"/>
+          </p:cNvSpPr>
+          <p:nvPr>
+            <p:ph idx="1"/>
+          </p:nvPr>
+        </p:nvSpPr>
+        <p:spPr>
+          <a:xfrm>
+            <a:off x="4352925" y="1600200"/>
+            <a:ext cx="4333875" cy="4525963"/>
+          </a:xfrm>
+        </p:spPr>
+        <p:txBody>
+          <a:bodyPr/>
+          <a:lstStyle/>
+          <a:p>
+            <a:r>
+              <a:rPr lang="en-US" dirty="0" smtClean="0"/>
+              <a:t>The Transaction Log is just a file …</a:t>
+            </a:r>
+            <a:endParaRPr lang="en-US" dirty="0"/>
+          </a:p>
+        </p:txBody>
+      </p:sp>
+      <p:pic>
+        <p:nvPicPr>
+          <p:cNvPr id="4" name="Picture 3"/>
+          <p:cNvPicPr>
+            <a:picLocks noChangeAspect="1"/>
+          </p:cNvPicPr>
+          <p:nvPr/>
+        </p:nvPicPr>
+        <p:blipFill>
+          <a:blip r:embed="rId2"/>
+          <a:stretch>
+            <a:fillRect/>
+          </a:stretch>
+        </p:blipFill>
+        <p:spPr>
+          <a:xfrm>
+            <a:off x="457200" y="1417638"/>
+            <a:ext cx="3810789" cy="4678078"/>
+          </a:xfrm>
+          <a:prstGeom prst="rect">
+            <a:avLst/>
+          </a:prstGeom>
+        </p:spPr>
+      </p:pic>
+    </p:spTree>
+    <p:extLst>
+      <p:ext uri="{BB962C8B-B14F-4D97-AF65-F5344CB8AC3E}">
+        <p14:creationId xmlns:p14="http://schemas.microsoft.com/office/powerpoint/2010/main" val="3982838056"/>
+      </p:ext>
+    </p:extLst>
+  </p:cSld>
+  <p:clrMapOvr>
+    <a:masterClrMapping/>
+  </p:clrMapOvr>
+</p:sld>
+</file>
+
+<file path=ppt/slides/slide7.xml><?xml version="1.0" encoding="utf-8"?>
+<p:sld xmlns:a="http://schemas.openxmlformats.org/drawingml/2006/main" xmlns:r="http://schemas.openxmlformats.org/officeDocument/2006/relationships" xmlns:p="http://schemas.openxmlformats.org/presentationml/2006/main">
+  <p:cSld>
+    <p:spTree>
+      <p:nvGrpSpPr>
+        <p:cNvPr id="1" name=""/>
+        <p:cNvGrpSpPr/>
+        <p:nvPr/>
+      </p:nvGrpSpPr>
+      <p:grpSpPr>
+        <a:xfrm>
+          <a:off x="0" y="0"/>
+          <a:ext cx="0" cy="0"/>
+          <a:chOff x="0" y="0"/>
+          <a:chExt cx="0" cy="0"/>
+        </a:xfrm>
+      </p:grpSpPr>
+      <p:sp>
+        <p:nvSpPr>
+          <p:cNvPr id="2" name="Title 1"/>
+          <p:cNvSpPr>
+            <a:spLocks noGrp="1"/>
+          </p:cNvSpPr>
+          <p:nvPr>
+            <p:ph type="title"/>
+          </p:nvPr>
+        </p:nvSpPr>
+        <p:spPr/>
+        <p:txBody>
+          <a:bodyPr/>
+          <a:lstStyle/>
+          <a:p>
+            <a:r>
+              <a:rPr lang="en-US" dirty="0" smtClean="0"/>
+              <a:t>Organization of the Transaction Log</a:t>
+            </a:r>
+            <a:endParaRPr lang="en-US" dirty="0"/>
+          </a:p>
+        </p:txBody>
+      </p:sp>
+      <p:sp>
+        <p:nvSpPr>
+          <p:cNvPr id="3" name="Content Placeholder 2"/>
+          <p:cNvSpPr>
+            <a:spLocks noGrp="1"/>
+          </p:cNvSpPr>
+          <p:nvPr>
+            <p:ph idx="1"/>
+          </p:nvPr>
+        </p:nvSpPr>
+        <p:spPr>
+          <a:xfrm>
+            <a:off x="4352925" y="1600200"/>
+            <a:ext cx="4333875" cy="4525963"/>
+          </a:xfrm>
+        </p:spPr>
+        <p:txBody>
+          <a:bodyPr/>
+          <a:lstStyle/>
+          <a:p>
+            <a:r>
+              <a:rPr lang="en-US" dirty="0" smtClean="0"/>
+              <a:t>The Transaction Log is just a file …</a:t>
+            </a:r>
+          </a:p>
+          <a:p>
+            <a:r>
+              <a:rPr lang="en-US" dirty="0" smtClean="0"/>
+              <a:t>With a bit of header information …</a:t>
+            </a:r>
+            <a:endParaRPr lang="en-US" dirty="0"/>
+          </a:p>
+        </p:txBody>
+      </p:sp>
+      <p:pic>
+        <p:nvPicPr>
+          <p:cNvPr id="5" name="Picture 4"/>
+          <p:cNvPicPr>
+            <a:picLocks noChangeAspect="1"/>
+          </p:cNvPicPr>
+          <p:nvPr/>
+        </p:nvPicPr>
+        <p:blipFill>
+          <a:blip r:embed="rId2"/>
+          <a:stretch>
+            <a:fillRect/>
+          </a:stretch>
+        </p:blipFill>
+        <p:spPr>
+          <a:xfrm>
+            <a:off x="457200" y="1417320"/>
+            <a:ext cx="3813762" cy="4681728"/>
+          </a:xfrm>
+          <a:prstGeom prst="rect">
+            <a:avLst/>
+          </a:prstGeom>
+        </p:spPr>
+      </p:pic>
+    </p:spTree>
+    <p:extLst>
+      <p:ext uri="{BB962C8B-B14F-4D97-AF65-F5344CB8AC3E}">
+        <p14:creationId xmlns:p14="http://schemas.microsoft.com/office/powerpoint/2010/main" val="1865007227"/>
+      </p:ext>
+    </p:extLst>
+  </p:cSld>
+  <p:clrMapOvr>
+    <a:masterClrMapping/>
+  </p:clrMapOvr>
+</p:sld>
+</file>
+
+<file path=ppt/slides/slide8.xml><?xml version="1.0" encoding="utf-8"?>
+<p:sld xmlns:a="http://schemas.openxmlformats.org/drawingml/2006/main" xmlns:r="http://schemas.openxmlformats.org/officeDocument/2006/relationships" xmlns:p="http://schemas.openxmlformats.org/presentationml/2006/main">
+  <p:cSld>
+    <p:spTree>
+      <p:nvGrpSpPr>
+        <p:cNvPr id="1" name=""/>
+        <p:cNvGrpSpPr/>
+        <p:nvPr/>
+      </p:nvGrpSpPr>
+      <p:grpSpPr>
+        <a:xfrm>
+          <a:off x="0" y="0"/>
+          <a:ext cx="0" cy="0"/>
+          <a:chOff x="0" y="0"/>
+          <a:chExt cx="0" cy="0"/>
+        </a:xfrm>
+      </p:grpSpPr>
+      <p:sp>
+        <p:nvSpPr>
+          <p:cNvPr id="2" name="Title 1"/>
+          <p:cNvSpPr>
+            <a:spLocks noGrp="1"/>
+          </p:cNvSpPr>
+          <p:nvPr>
+            <p:ph type="title"/>
+          </p:nvPr>
+        </p:nvSpPr>
+        <p:spPr/>
+        <p:txBody>
+          <a:bodyPr/>
+          <a:lstStyle/>
+          <a:p>
+            <a:r>
+              <a:rPr lang="en-US" dirty="0" smtClean="0"/>
+              <a:t>Organization of the Transaction Log</a:t>
+            </a:r>
+            <a:endParaRPr lang="en-US" dirty="0"/>
+          </a:p>
+        </p:txBody>
+      </p:sp>
+      <p:sp>
+        <p:nvSpPr>
+          <p:cNvPr id="3" name="Content Placeholder 2"/>
+          <p:cNvSpPr>
+            <a:spLocks noGrp="1"/>
+          </p:cNvSpPr>
+          <p:nvPr>
+            <p:ph idx="1"/>
+          </p:nvPr>
+        </p:nvSpPr>
+        <p:spPr>
+          <a:xfrm>
+            <a:off x="4352925" y="1600200"/>
+            <a:ext cx="4333875" cy="4525963"/>
+          </a:xfrm>
+        </p:spPr>
+        <p:txBody>
+          <a:bodyPr/>
+          <a:lstStyle/>
+          <a:p>
+            <a:r>
+              <a:rPr lang="en-US" dirty="0" smtClean="0"/>
+              <a:t>The Transaction Log is just a file …</a:t>
+            </a:r>
+          </a:p>
+          <a:p>
+            <a:r>
+              <a:rPr lang="en-US" dirty="0" smtClean="0"/>
+              <a:t>With a bit of header information …</a:t>
+            </a:r>
+          </a:p>
+          <a:p>
+            <a:r>
+              <a:rPr lang="en-US" dirty="0" smtClean="0"/>
+              <a:t>Then divided into Virtual Log Files.</a:t>
+            </a:r>
+            <a:endParaRPr lang="en-US" dirty="0"/>
+          </a:p>
+        </p:txBody>
+      </p:sp>
+      <p:pic>
+        <p:nvPicPr>
+          <p:cNvPr id="4" name="Picture 3"/>
+          <p:cNvPicPr>
+            <a:picLocks noChangeAspect="1"/>
+          </p:cNvPicPr>
+          <p:nvPr/>
+        </p:nvPicPr>
+        <p:blipFill>
+          <a:blip r:embed="rId2"/>
+          <a:stretch>
+            <a:fillRect/>
+          </a:stretch>
+        </p:blipFill>
+        <p:spPr>
+          <a:xfrm>
+            <a:off x="457200" y="1417320"/>
+            <a:ext cx="3813762" cy="4681728"/>
+          </a:xfrm>
+          <a:prstGeom prst="rect">
+            <a:avLst/>
+          </a:prstGeom>
+        </p:spPr>
+      </p:pic>
+    </p:spTree>
+    <p:extLst>
+      <p:ext uri="{BB962C8B-B14F-4D97-AF65-F5344CB8AC3E}">
+        <p14:creationId xmlns:p14="http://schemas.microsoft.com/office/powerpoint/2010/main" val="3601134671"/>
       </p:ext>
     </p:extLst>
   </p:cSld>

</xml_diff>

<commit_message>
More on log file organization and VLFs.
</commit_message>
<xml_diff>
--- a/TransactionLog.pptx
+++ b/TransactionLog.pptx
@@ -5,7 +5,7 @@
     <p:sldMasterId id="2147483648" r:id="rId1"/>
   </p:sldMasterIdLst>
   <p:notesMasterIdLst>
-    <p:notesMasterId r:id="rId10"/>
+    <p:notesMasterId r:id="rId17"/>
   </p:notesMasterIdLst>
   <p:sldIdLst>
     <p:sldId id="328" r:id="rId2"/>
@@ -16,6 +16,13 @@
     <p:sldId id="332" r:id="rId7"/>
     <p:sldId id="333" r:id="rId8"/>
     <p:sldId id="334" r:id="rId9"/>
+    <p:sldId id="335" r:id="rId10"/>
+    <p:sldId id="339" r:id="rId11"/>
+    <p:sldId id="336" r:id="rId12"/>
+    <p:sldId id="337" r:id="rId13"/>
+    <p:sldId id="338" r:id="rId14"/>
+    <p:sldId id="340" r:id="rId15"/>
+    <p:sldId id="341" r:id="rId16"/>
   </p:sldIdLst>
   <p:sldSz cx="9144000" cy="6858000" type="screen4x3"/>
   <p:notesSz cx="6858000" cy="9144000"/>
@@ -215,7 +222,7 @@
           <a:p>
             <a:fld id="{2EDCB34D-5EC2-4739-9693-E425457AC201}" type="datetimeFigureOut">
               <a:rPr lang="en-US" smtClean="0"/>
-              <a:t>08/02/2016</a:t>
+              <a:t>8/2/2016</a:t>
             </a:fld>
             <a:endParaRPr lang="en-US"/>
           </a:p>
@@ -801,7 +808,7 @@
             <a:fld id="{5942B21B-2ADA-A040-A652-A7305E1B99FE}" type="datetimeFigureOut">
               <a:rPr lang="en-US" smtClean="0"/>
               <a:pPr/>
-              <a:t>08/02/2016</a:t>
+              <a:t>8/2/2016</a:t>
             </a:fld>
             <a:endParaRPr lang="en-US" dirty="0"/>
           </a:p>
@@ -991,7 +998,7 @@
           <a:p>
             <a:fld id="{5942B21B-2ADA-A040-A652-A7305E1B99FE}" type="datetimeFigureOut">
               <a:rPr lang="en-US" smtClean="0"/>
-              <a:t>08/02/2016</a:t>
+              <a:t>8/2/2016</a:t>
             </a:fld>
             <a:endParaRPr lang="en-US"/>
           </a:p>
@@ -1115,7 +1122,7 @@
             <a:fld id="{5942B21B-2ADA-A040-A652-A7305E1B99FE}" type="datetimeFigureOut">
               <a:rPr lang="en-US" smtClean="0"/>
               <a:pPr/>
-              <a:t>08/02/2016</a:t>
+              <a:t>8/2/2016</a:t>
             </a:fld>
             <a:r>
               <a:rPr lang="en-US"/>
@@ -1386,7 +1393,7 @@
             <a:fld id="{5942B21B-2ADA-A040-A652-A7305E1B99FE}" type="datetimeFigureOut">
               <a:rPr lang="en-US" smtClean="0"/>
               <a:pPr/>
-              <a:t>08/02/2016</a:t>
+              <a:t>8/2/2016</a:t>
             </a:fld>
             <a:r>
               <a:rPr lang="en-US" dirty="0"/>
@@ -1656,7 +1663,7 @@
             <a:fld id="{5942B21B-2ADA-A040-A652-A7305E1B99FE}" type="datetimeFigureOut">
               <a:rPr lang="en-US" smtClean="0"/>
               <a:pPr/>
-              <a:t>08/02/2016</a:t>
+              <a:t>8/2/2016</a:t>
             </a:fld>
             <a:r>
               <a:rPr lang="en-US" dirty="0"/>
@@ -1996,7 +2003,7 @@
             <a:fld id="{5942B21B-2ADA-A040-A652-A7305E1B99FE}" type="datetimeFigureOut">
               <a:rPr lang="en-US" smtClean="0"/>
               <a:pPr/>
-              <a:t>08/02/2016</a:t>
+              <a:t>8/2/2016</a:t>
             </a:fld>
             <a:r>
               <a:rPr lang="en-US" dirty="0"/>
@@ -2337,7 +2344,7 @@
             <a:fld id="{5942B21B-2ADA-A040-A652-A7305E1B99FE}" type="datetimeFigureOut">
               <a:rPr lang="en-US" smtClean="0"/>
               <a:pPr/>
-              <a:t>08/02/2016</a:t>
+              <a:t>8/2/2016</a:t>
             </a:fld>
             <a:r>
               <a:rPr lang="en-US" dirty="0"/>
@@ -2852,7 +2859,7 @@
             <a:fld id="{5942B21B-2ADA-A040-A652-A7305E1B99FE}" type="datetimeFigureOut">
               <a:rPr lang="en-US" smtClean="0"/>
               <a:pPr/>
-              <a:t>08/02/2016</a:t>
+              <a:t>8/2/2016</a:t>
             </a:fld>
             <a:r>
               <a:rPr lang="en-US" dirty="0"/>
@@ -3061,7 +3068,7 @@
             <a:fld id="{5942B21B-2ADA-A040-A652-A7305E1B99FE}" type="datetimeFigureOut">
               <a:rPr lang="en-US" smtClean="0"/>
               <a:pPr/>
-              <a:t>08/02/2016</a:t>
+              <a:t>8/2/2016</a:t>
             </a:fld>
             <a:r>
               <a:rPr lang="en-US" dirty="0"/>
@@ -3248,7 +3255,7 @@
             <a:fld id="{5942B21B-2ADA-A040-A652-A7305E1B99FE}" type="datetimeFigureOut">
               <a:rPr lang="en-US" smtClean="0"/>
               <a:pPr/>
-              <a:t>08/02/2016</a:t>
+              <a:t>8/2/2016</a:t>
             </a:fld>
             <a:r>
               <a:rPr lang="en-US" dirty="0"/>
@@ -3579,7 +3586,7 @@
             <a:fld id="{5942B21B-2ADA-A040-A652-A7305E1B99FE}" type="datetimeFigureOut">
               <a:rPr lang="en-US" smtClean="0"/>
               <a:pPr/>
-              <a:t>08/02/2016</a:t>
+              <a:t>8/2/2016</a:t>
             </a:fld>
             <a:r>
               <a:rPr lang="en-US" dirty="0"/>
@@ -3887,7 +3894,7 @@
             <a:fld id="{5942B21B-2ADA-A040-A652-A7305E1B99FE}" type="datetimeFigureOut">
               <a:rPr lang="en-US" smtClean="0"/>
               <a:pPr/>
-              <a:t>08/02/2016</a:t>
+              <a:t>8/2/2016</a:t>
             </a:fld>
             <a:r>
               <a:rPr lang="en-US" dirty="0"/>
@@ -4166,7 +4173,7 @@
             <a:fld id="{5942B21B-2ADA-A040-A652-A7305E1B99FE}" type="datetimeFigureOut">
               <a:rPr lang="en-US" smtClean="0"/>
               <a:pPr/>
-              <a:t>08/02/2016</a:t>
+              <a:t>8/2/2016</a:t>
             </a:fld>
             <a:r>
               <a:rPr lang="en-US" dirty="0"/>
@@ -4621,10 +4628,9 @@
           <a:lstStyle/>
           <a:p>
             <a:r>
-              <a:rPr lang="en-US" dirty="0" smtClean="0"/>
+              <a:rPr lang="en-US" dirty="0"/>
               <a:t>Transaction Log Fundamentals for the DBA</a:t>
             </a:r>
-            <a:endParaRPr lang="en-US" dirty="0"/>
           </a:p>
         </p:txBody>
       </p:sp>
@@ -4800,20 +4806,8 @@
               <a:buNone/>
             </a:pPr>
             <a:r>
-              <a:rPr lang="en-US" dirty="0" smtClean="0"/>
-              <a:t>St. Louis, MO </a:t>
-            </a:r>
-            <a:r>
-              <a:rPr lang="en-US" dirty="0"/>
-              <a:t>– </a:t>
-            </a:r>
-            <a:r>
-              <a:rPr lang="en-US" dirty="0" smtClean="0"/>
-              <a:t>September 10, </a:t>
-            </a:r>
-            <a:r>
-              <a:rPr lang="en-US" dirty="0"/>
-              <a:t>2016</a:t>
+              <a:rPr lang="en-US" dirty="0"/>
+              <a:t>St. Louis, MO – September 10, 2016</a:t>
             </a:r>
           </a:p>
         </p:txBody>
@@ -4828,14 +4822,732 @@
   <p:clrMapOvr>
     <a:masterClrMapping/>
   </p:clrMapOvr>
-  <mc:AlternateContent xmlns:mc="http://schemas.openxmlformats.org/markup-compatibility/2006" xmlns:p14="http://schemas.microsoft.com/office/powerpoint/2010/main">
-    <mc:Choice Requires="p14">
-      <p:transition spd="slow" p14:dur="2000"/>
-    </mc:Choice>
-    <mc:Fallback xmlns="">
-      <p:transition spd="slow"/>
-    </mc:Fallback>
-  </mc:AlternateContent>
+</p:sld>
+</file>
+
+<file path=ppt/slides/slide10.xml><?xml version="1.0" encoding="utf-8"?>
+<p:sld xmlns:a="http://schemas.openxmlformats.org/drawingml/2006/main" xmlns:r="http://schemas.openxmlformats.org/officeDocument/2006/relationships" xmlns:p="http://schemas.openxmlformats.org/presentationml/2006/main">
+  <p:cSld>
+    <p:spTree>
+      <p:nvGrpSpPr>
+        <p:cNvPr id="1" name=""/>
+        <p:cNvGrpSpPr/>
+        <p:nvPr/>
+      </p:nvGrpSpPr>
+      <p:grpSpPr>
+        <a:xfrm>
+          <a:off x="0" y="0"/>
+          <a:ext cx="0" cy="0"/>
+          <a:chOff x="0" y="0"/>
+          <a:chExt cx="0" cy="0"/>
+        </a:xfrm>
+      </p:grpSpPr>
+      <p:sp>
+        <p:nvSpPr>
+          <p:cNvPr id="2" name="Title 1"/>
+          <p:cNvSpPr>
+            <a:spLocks noGrp="1"/>
+          </p:cNvSpPr>
+          <p:nvPr>
+            <p:ph type="title"/>
+          </p:nvPr>
+        </p:nvSpPr>
+        <p:spPr/>
+        <p:txBody>
+          <a:bodyPr/>
+          <a:lstStyle/>
+          <a:p>
+            <a:r>
+              <a:rPr lang="en-US" dirty="0"/>
+              <a:t>Virtual Log Files</a:t>
+            </a:r>
+          </a:p>
+        </p:txBody>
+      </p:sp>
+      <p:sp>
+        <p:nvSpPr>
+          <p:cNvPr id="3" name="Content Placeholder 2"/>
+          <p:cNvSpPr>
+            <a:spLocks noGrp="1"/>
+          </p:cNvSpPr>
+          <p:nvPr>
+            <p:ph idx="1"/>
+          </p:nvPr>
+        </p:nvSpPr>
+        <p:spPr>
+          <a:xfrm>
+            <a:off x="4352925" y="1600200"/>
+            <a:ext cx="4333875" cy="4525963"/>
+          </a:xfrm>
+          <a:noFill/>
+        </p:spPr>
+        <p:txBody>
+          <a:bodyPr/>
+          <a:lstStyle/>
+          <a:p>
+            <a:r>
+              <a:rPr lang="en-US" dirty="0"/>
+              <a:t>VLFs can be in one of three statuses:</a:t>
+            </a:r>
+          </a:p>
+          <a:p>
+            <a:pPr lvl="1"/>
+            <a:r>
+              <a:rPr lang="en-US" dirty="0">
+                <a:solidFill>
+                  <a:srgbClr val="92D050"/>
+                </a:solidFill>
+              </a:rPr>
+              <a:t>Inactive</a:t>
+            </a:r>
+          </a:p>
+          <a:p>
+            <a:pPr lvl="1"/>
+            <a:r>
+              <a:rPr lang="en-US" dirty="0">
+                <a:solidFill>
+                  <a:srgbClr val="FFFF00"/>
+                </a:solidFill>
+              </a:rPr>
+              <a:t>Active (current)</a:t>
+            </a:r>
+          </a:p>
+          <a:p>
+            <a:pPr lvl="1"/>
+            <a:r>
+              <a:rPr lang="en-US" dirty="0">
+                <a:solidFill>
+                  <a:srgbClr val="FF0000"/>
+                </a:solidFill>
+              </a:rPr>
+              <a:t>Active (not usable)</a:t>
+            </a:r>
+            <a:endParaRPr lang="en-US" dirty="0">
+              <a:solidFill>
+                <a:schemeClr val="tx1"/>
+              </a:solidFill>
+            </a:endParaRPr>
+          </a:p>
+          <a:p>
+            <a:r>
+              <a:rPr lang="en-US" dirty="0"/>
+              <a:t>Only one VLF is current at a time.</a:t>
+            </a:r>
+          </a:p>
+          <a:p>
+            <a:r>
+              <a:rPr lang="en-US" dirty="0"/>
+              <a:t>VLFs are numbered.</a:t>
+            </a:r>
+          </a:p>
+          <a:p>
+            <a:pPr marL="0" indent="0">
+              <a:buNone/>
+            </a:pPr>
+            <a:endParaRPr lang="en-US" dirty="0"/>
+          </a:p>
+        </p:txBody>
+      </p:sp>
+      <p:pic>
+        <p:nvPicPr>
+          <p:cNvPr id="5" name="Picture 4"/>
+          <p:cNvPicPr>
+            <a:picLocks noChangeAspect="1"/>
+          </p:cNvPicPr>
+          <p:nvPr/>
+        </p:nvPicPr>
+        <p:blipFill>
+          <a:blip r:embed="rId2"/>
+          <a:stretch>
+            <a:fillRect/>
+          </a:stretch>
+        </p:blipFill>
+        <p:spPr>
+          <a:xfrm>
+            <a:off x="457200" y="1417320"/>
+            <a:ext cx="3814109" cy="4681728"/>
+          </a:xfrm>
+          <a:prstGeom prst="rect">
+            <a:avLst/>
+          </a:prstGeom>
+        </p:spPr>
+      </p:pic>
+    </p:spTree>
+    <p:extLst>
+      <p:ext uri="{BB962C8B-B14F-4D97-AF65-F5344CB8AC3E}">
+        <p14:creationId xmlns:p14="http://schemas.microsoft.com/office/powerpoint/2010/main" val="1725116295"/>
+      </p:ext>
+    </p:extLst>
+  </p:cSld>
+  <p:clrMapOvr>
+    <a:masterClrMapping/>
+  </p:clrMapOvr>
+</p:sld>
+</file>
+
+<file path=ppt/slides/slide11.xml><?xml version="1.0" encoding="utf-8"?>
+<p:sld xmlns:a="http://schemas.openxmlformats.org/drawingml/2006/main" xmlns:r="http://schemas.openxmlformats.org/officeDocument/2006/relationships" xmlns:p="http://schemas.openxmlformats.org/presentationml/2006/main">
+  <p:cSld>
+    <p:spTree>
+      <p:nvGrpSpPr>
+        <p:cNvPr id="1" name=""/>
+        <p:cNvGrpSpPr/>
+        <p:nvPr/>
+      </p:nvGrpSpPr>
+      <p:grpSpPr>
+        <a:xfrm>
+          <a:off x="0" y="0"/>
+          <a:ext cx="0" cy="0"/>
+          <a:chOff x="0" y="0"/>
+          <a:chExt cx="0" cy="0"/>
+        </a:xfrm>
+      </p:grpSpPr>
+      <p:sp>
+        <p:nvSpPr>
+          <p:cNvPr id="2" name="Title 1"/>
+          <p:cNvSpPr>
+            <a:spLocks noGrp="1"/>
+          </p:cNvSpPr>
+          <p:nvPr>
+            <p:ph type="title"/>
+          </p:nvPr>
+        </p:nvSpPr>
+        <p:spPr/>
+        <p:txBody>
+          <a:bodyPr/>
+          <a:lstStyle/>
+          <a:p>
+            <a:r>
+              <a:rPr lang="en-US" dirty="0"/>
+              <a:t>Virtual Log Files</a:t>
+            </a:r>
+          </a:p>
+        </p:txBody>
+      </p:sp>
+      <p:sp>
+        <p:nvSpPr>
+          <p:cNvPr id="3" name="Content Placeholder 2"/>
+          <p:cNvSpPr>
+            <a:spLocks noGrp="1"/>
+          </p:cNvSpPr>
+          <p:nvPr>
+            <p:ph idx="1"/>
+          </p:nvPr>
+        </p:nvSpPr>
+        <p:spPr>
+          <a:xfrm>
+            <a:off x="4352925" y="1600200"/>
+            <a:ext cx="4333875" cy="4525963"/>
+          </a:xfrm>
+          <a:noFill/>
+        </p:spPr>
+        <p:txBody>
+          <a:bodyPr/>
+          <a:lstStyle/>
+          <a:p>
+            <a:r>
+              <a:rPr lang="en-US" dirty="0"/>
+              <a:t>As more records are added to the log, additional VLFs are allocated.</a:t>
+            </a:r>
+            <a:endParaRPr lang="en-US" dirty="0">
+              <a:solidFill>
+                <a:srgbClr val="FF0000"/>
+              </a:solidFill>
+            </a:endParaRPr>
+          </a:p>
+        </p:txBody>
+      </p:sp>
+      <p:pic>
+        <p:nvPicPr>
+          <p:cNvPr id="5" name="Picture 4"/>
+          <p:cNvPicPr>
+            <a:picLocks noChangeAspect="1"/>
+          </p:cNvPicPr>
+          <p:nvPr/>
+        </p:nvPicPr>
+        <p:blipFill>
+          <a:blip r:embed="rId2"/>
+          <a:stretch>
+            <a:fillRect/>
+          </a:stretch>
+        </p:blipFill>
+        <p:spPr>
+          <a:xfrm>
+            <a:off x="457200" y="1417320"/>
+            <a:ext cx="3813048" cy="4680426"/>
+          </a:xfrm>
+          <a:prstGeom prst="rect">
+            <a:avLst/>
+          </a:prstGeom>
+        </p:spPr>
+      </p:pic>
+    </p:spTree>
+    <p:extLst>
+      <p:ext uri="{BB962C8B-B14F-4D97-AF65-F5344CB8AC3E}">
+        <p14:creationId xmlns:p14="http://schemas.microsoft.com/office/powerpoint/2010/main" val="1339213773"/>
+      </p:ext>
+    </p:extLst>
+  </p:cSld>
+  <p:clrMapOvr>
+    <a:masterClrMapping/>
+  </p:clrMapOvr>
+</p:sld>
+</file>
+
+<file path=ppt/slides/slide12.xml><?xml version="1.0" encoding="utf-8"?>
+<p:sld xmlns:a="http://schemas.openxmlformats.org/drawingml/2006/main" xmlns:r="http://schemas.openxmlformats.org/officeDocument/2006/relationships" xmlns:p="http://schemas.openxmlformats.org/presentationml/2006/main">
+  <p:cSld>
+    <p:spTree>
+      <p:nvGrpSpPr>
+        <p:cNvPr id="1" name=""/>
+        <p:cNvGrpSpPr/>
+        <p:nvPr/>
+      </p:nvGrpSpPr>
+      <p:grpSpPr>
+        <a:xfrm>
+          <a:off x="0" y="0"/>
+          <a:ext cx="0" cy="0"/>
+          <a:chOff x="0" y="0"/>
+          <a:chExt cx="0" cy="0"/>
+        </a:xfrm>
+      </p:grpSpPr>
+      <p:sp>
+        <p:nvSpPr>
+          <p:cNvPr id="2" name="Title 1"/>
+          <p:cNvSpPr>
+            <a:spLocks noGrp="1"/>
+          </p:cNvSpPr>
+          <p:nvPr>
+            <p:ph type="title"/>
+          </p:nvPr>
+        </p:nvSpPr>
+        <p:spPr/>
+        <p:txBody>
+          <a:bodyPr/>
+          <a:lstStyle/>
+          <a:p>
+            <a:r>
+              <a:rPr lang="en-US" dirty="0"/>
+              <a:t>Virtual Log Files</a:t>
+            </a:r>
+          </a:p>
+        </p:txBody>
+      </p:sp>
+      <p:sp>
+        <p:nvSpPr>
+          <p:cNvPr id="3" name="Content Placeholder 2"/>
+          <p:cNvSpPr>
+            <a:spLocks noGrp="1"/>
+          </p:cNvSpPr>
+          <p:nvPr>
+            <p:ph idx="1"/>
+          </p:nvPr>
+        </p:nvSpPr>
+        <p:spPr>
+          <a:xfrm>
+            <a:off x="4352925" y="1600200"/>
+            <a:ext cx="4333875" cy="4525963"/>
+          </a:xfrm>
+          <a:noFill/>
+        </p:spPr>
+        <p:txBody>
+          <a:bodyPr/>
+          <a:lstStyle/>
+          <a:p>
+            <a:r>
+              <a:rPr lang="en-US" dirty="0"/>
+              <a:t>As more records are added to the log, additional VLFs are allocated.</a:t>
+            </a:r>
+            <a:endParaRPr lang="en-US" dirty="0">
+              <a:solidFill>
+                <a:srgbClr val="FF0000"/>
+              </a:solidFill>
+            </a:endParaRPr>
+          </a:p>
+        </p:txBody>
+      </p:sp>
+      <p:pic>
+        <p:nvPicPr>
+          <p:cNvPr id="4" name="Picture 3"/>
+          <p:cNvPicPr>
+            <a:picLocks noChangeAspect="1"/>
+          </p:cNvPicPr>
+          <p:nvPr/>
+        </p:nvPicPr>
+        <p:blipFill>
+          <a:blip r:embed="rId2"/>
+          <a:stretch>
+            <a:fillRect/>
+          </a:stretch>
+        </p:blipFill>
+        <p:spPr>
+          <a:xfrm>
+            <a:off x="457200" y="1417320"/>
+            <a:ext cx="3814109" cy="4681728"/>
+          </a:xfrm>
+          <a:prstGeom prst="rect">
+            <a:avLst/>
+          </a:prstGeom>
+        </p:spPr>
+      </p:pic>
+    </p:spTree>
+    <p:extLst>
+      <p:ext uri="{BB962C8B-B14F-4D97-AF65-F5344CB8AC3E}">
+        <p14:creationId xmlns:p14="http://schemas.microsoft.com/office/powerpoint/2010/main" val="3381668158"/>
+      </p:ext>
+    </p:extLst>
+  </p:cSld>
+  <p:clrMapOvr>
+    <a:masterClrMapping/>
+  </p:clrMapOvr>
+</p:sld>
+</file>
+
+<file path=ppt/slides/slide13.xml><?xml version="1.0" encoding="utf-8"?>
+<p:sld xmlns:a="http://schemas.openxmlformats.org/drawingml/2006/main" xmlns:r="http://schemas.openxmlformats.org/officeDocument/2006/relationships" xmlns:p="http://schemas.openxmlformats.org/presentationml/2006/main">
+  <p:cSld>
+    <p:spTree>
+      <p:nvGrpSpPr>
+        <p:cNvPr id="1" name=""/>
+        <p:cNvGrpSpPr/>
+        <p:nvPr/>
+      </p:nvGrpSpPr>
+      <p:grpSpPr>
+        <a:xfrm>
+          <a:off x="0" y="0"/>
+          <a:ext cx="0" cy="0"/>
+          <a:chOff x="0" y="0"/>
+          <a:chExt cx="0" cy="0"/>
+        </a:xfrm>
+      </p:grpSpPr>
+      <p:sp>
+        <p:nvSpPr>
+          <p:cNvPr id="2" name="Title 1"/>
+          <p:cNvSpPr>
+            <a:spLocks noGrp="1"/>
+          </p:cNvSpPr>
+          <p:nvPr>
+            <p:ph type="title"/>
+          </p:nvPr>
+        </p:nvSpPr>
+        <p:spPr/>
+        <p:txBody>
+          <a:bodyPr/>
+          <a:lstStyle/>
+          <a:p>
+            <a:r>
+              <a:rPr lang="en-US" dirty="0"/>
+              <a:t>Virtual Log Files</a:t>
+            </a:r>
+          </a:p>
+        </p:txBody>
+      </p:sp>
+      <p:sp>
+        <p:nvSpPr>
+          <p:cNvPr id="3" name="Content Placeholder 2"/>
+          <p:cNvSpPr>
+            <a:spLocks noGrp="1"/>
+          </p:cNvSpPr>
+          <p:nvPr>
+            <p:ph idx="1"/>
+          </p:nvPr>
+        </p:nvSpPr>
+        <p:spPr>
+          <a:xfrm>
+            <a:off x="4352925" y="1600200"/>
+            <a:ext cx="4333875" cy="4525963"/>
+          </a:xfrm>
+          <a:noFill/>
+        </p:spPr>
+        <p:txBody>
+          <a:bodyPr/>
+          <a:lstStyle/>
+          <a:p>
+            <a:r>
+              <a:rPr lang="en-US" dirty="0"/>
+              <a:t>As more records are added to the log, additional VLFs are put in use.</a:t>
+            </a:r>
+          </a:p>
+          <a:p>
+            <a:r>
+              <a:rPr lang="en-US" dirty="0"/>
+              <a:t>Writing to the log is circular so long as VLF are available.</a:t>
+            </a:r>
+          </a:p>
+          <a:p>
+            <a:r>
+              <a:rPr lang="en-US" dirty="0"/>
+              <a:t>What happens next?</a:t>
+            </a:r>
+          </a:p>
+        </p:txBody>
+      </p:sp>
+      <p:pic>
+        <p:nvPicPr>
+          <p:cNvPr id="5" name="Picture 4"/>
+          <p:cNvPicPr>
+            <a:picLocks noChangeAspect="1"/>
+          </p:cNvPicPr>
+          <p:nvPr/>
+        </p:nvPicPr>
+        <p:blipFill>
+          <a:blip r:embed="rId2"/>
+          <a:stretch>
+            <a:fillRect/>
+          </a:stretch>
+        </p:blipFill>
+        <p:spPr>
+          <a:xfrm>
+            <a:off x="457200" y="1417320"/>
+            <a:ext cx="3814109" cy="4681728"/>
+          </a:xfrm>
+          <a:prstGeom prst="rect">
+            <a:avLst/>
+          </a:prstGeom>
+        </p:spPr>
+      </p:pic>
+    </p:spTree>
+    <p:extLst>
+      <p:ext uri="{BB962C8B-B14F-4D97-AF65-F5344CB8AC3E}">
+        <p14:creationId xmlns:p14="http://schemas.microsoft.com/office/powerpoint/2010/main" val="1135754112"/>
+      </p:ext>
+    </p:extLst>
+  </p:cSld>
+  <p:clrMapOvr>
+    <a:masterClrMapping/>
+  </p:clrMapOvr>
+</p:sld>
+</file>
+
+<file path=ppt/slides/slide14.xml><?xml version="1.0" encoding="utf-8"?>
+<p:sld xmlns:a="http://schemas.openxmlformats.org/drawingml/2006/main" xmlns:r="http://schemas.openxmlformats.org/officeDocument/2006/relationships" xmlns:p="http://schemas.openxmlformats.org/presentationml/2006/main">
+  <p:cSld>
+    <p:spTree>
+      <p:nvGrpSpPr>
+        <p:cNvPr id="1" name=""/>
+        <p:cNvGrpSpPr/>
+        <p:nvPr/>
+      </p:nvGrpSpPr>
+      <p:grpSpPr>
+        <a:xfrm>
+          <a:off x="0" y="0"/>
+          <a:ext cx="0" cy="0"/>
+          <a:chOff x="0" y="0"/>
+          <a:chExt cx="0" cy="0"/>
+        </a:xfrm>
+      </p:grpSpPr>
+      <p:sp>
+        <p:nvSpPr>
+          <p:cNvPr id="2" name="Title 1"/>
+          <p:cNvSpPr>
+            <a:spLocks noGrp="1"/>
+          </p:cNvSpPr>
+          <p:nvPr>
+            <p:ph type="title"/>
+          </p:nvPr>
+        </p:nvSpPr>
+        <p:spPr/>
+        <p:txBody>
+          <a:bodyPr/>
+          <a:lstStyle/>
+          <a:p>
+            <a:r>
+              <a:rPr lang="en-US" dirty="0"/>
+              <a:t>Virtual Log Files</a:t>
+            </a:r>
+          </a:p>
+        </p:txBody>
+      </p:sp>
+      <p:sp>
+        <p:nvSpPr>
+          <p:cNvPr id="3" name="Content Placeholder 2"/>
+          <p:cNvSpPr>
+            <a:spLocks noGrp="1"/>
+          </p:cNvSpPr>
+          <p:nvPr>
+            <p:ph idx="1"/>
+          </p:nvPr>
+        </p:nvSpPr>
+        <p:spPr>
+          <a:xfrm>
+            <a:off x="4352925" y="1600200"/>
+            <a:ext cx="4333875" cy="4525963"/>
+          </a:xfrm>
+          <a:noFill/>
+        </p:spPr>
+        <p:txBody>
+          <a:bodyPr/>
+          <a:lstStyle/>
+          <a:p>
+            <a:r>
+              <a:rPr lang="en-US" dirty="0"/>
+              <a:t>The log file has to grow</a:t>
+            </a:r>
+          </a:p>
+          <a:p>
+            <a:r>
+              <a:rPr lang="en-US" dirty="0"/>
+              <a:t>More VLFs are added</a:t>
+            </a:r>
+          </a:p>
+          <a:p>
+            <a:endParaRPr lang="en-US" dirty="0"/>
+          </a:p>
+        </p:txBody>
+      </p:sp>
+      <p:pic>
+        <p:nvPicPr>
+          <p:cNvPr id="4" name="Picture 3"/>
+          <p:cNvPicPr>
+            <a:picLocks noChangeAspect="1"/>
+          </p:cNvPicPr>
+          <p:nvPr/>
+        </p:nvPicPr>
+        <p:blipFill>
+          <a:blip r:embed="rId2"/>
+          <a:stretch>
+            <a:fillRect/>
+          </a:stretch>
+        </p:blipFill>
+        <p:spPr>
+          <a:xfrm>
+            <a:off x="457200" y="1417320"/>
+            <a:ext cx="2008736" cy="4692864"/>
+          </a:xfrm>
+          <a:prstGeom prst="rect">
+            <a:avLst/>
+          </a:prstGeom>
+        </p:spPr>
+      </p:pic>
+    </p:spTree>
+    <p:extLst>
+      <p:ext uri="{BB962C8B-B14F-4D97-AF65-F5344CB8AC3E}">
+        <p14:creationId xmlns:p14="http://schemas.microsoft.com/office/powerpoint/2010/main" val="3149823093"/>
+      </p:ext>
+    </p:extLst>
+  </p:cSld>
+  <p:clrMapOvr>
+    <a:masterClrMapping/>
+  </p:clrMapOvr>
+</p:sld>
+</file>
+
+<file path=ppt/slides/slide15.xml><?xml version="1.0" encoding="utf-8"?>
+<p:sld xmlns:a="http://schemas.openxmlformats.org/drawingml/2006/main" xmlns:r="http://schemas.openxmlformats.org/officeDocument/2006/relationships" xmlns:p="http://schemas.openxmlformats.org/presentationml/2006/main">
+  <p:cSld>
+    <p:spTree>
+      <p:nvGrpSpPr>
+        <p:cNvPr id="1" name=""/>
+        <p:cNvGrpSpPr/>
+        <p:nvPr/>
+      </p:nvGrpSpPr>
+      <p:grpSpPr>
+        <a:xfrm>
+          <a:off x="0" y="0"/>
+          <a:ext cx="0" cy="0"/>
+          <a:chOff x="0" y="0"/>
+          <a:chExt cx="0" cy="0"/>
+        </a:xfrm>
+      </p:grpSpPr>
+      <p:sp>
+        <p:nvSpPr>
+          <p:cNvPr id="2" name="Title 1"/>
+          <p:cNvSpPr>
+            <a:spLocks noGrp="1"/>
+          </p:cNvSpPr>
+          <p:nvPr>
+            <p:ph type="title"/>
+          </p:nvPr>
+        </p:nvSpPr>
+        <p:spPr/>
+        <p:txBody>
+          <a:bodyPr/>
+          <a:lstStyle/>
+          <a:p>
+            <a:r>
+              <a:rPr lang="en-US" dirty="0"/>
+              <a:t>Virtual Log Files</a:t>
+            </a:r>
+          </a:p>
+        </p:txBody>
+      </p:sp>
+      <p:sp>
+        <p:nvSpPr>
+          <p:cNvPr id="3" name="Content Placeholder 2"/>
+          <p:cNvSpPr>
+            <a:spLocks noGrp="1"/>
+          </p:cNvSpPr>
+          <p:nvPr>
+            <p:ph idx="1"/>
+          </p:nvPr>
+        </p:nvSpPr>
+        <p:spPr>
+          <a:xfrm>
+            <a:off x="4352925" y="1600200"/>
+            <a:ext cx="4333875" cy="4525963"/>
+          </a:xfrm>
+          <a:noFill/>
+        </p:spPr>
+        <p:txBody>
+          <a:bodyPr/>
+          <a:lstStyle/>
+          <a:p>
+            <a:r>
+              <a:rPr lang="en-US" dirty="0"/>
+              <a:t>The log file has to grow</a:t>
+            </a:r>
+          </a:p>
+          <a:p>
+            <a:r>
+              <a:rPr lang="en-US" dirty="0"/>
+              <a:t>More VLFs are added</a:t>
+            </a:r>
+          </a:p>
+          <a:p>
+            <a:r>
+              <a:rPr lang="en-US" dirty="0"/>
+              <a:t>Eventually the log will be truncated</a:t>
+            </a:r>
+          </a:p>
+          <a:p>
+            <a:endParaRPr lang="en-US" dirty="0"/>
+          </a:p>
+        </p:txBody>
+      </p:sp>
+      <p:pic>
+        <p:nvPicPr>
+          <p:cNvPr id="5" name="Picture 4"/>
+          <p:cNvPicPr>
+            <a:picLocks noChangeAspect="1"/>
+          </p:cNvPicPr>
+          <p:nvPr/>
+        </p:nvPicPr>
+        <p:blipFill>
+          <a:blip r:embed="rId2"/>
+          <a:stretch>
+            <a:fillRect/>
+          </a:stretch>
+        </p:blipFill>
+        <p:spPr>
+          <a:xfrm>
+            <a:off x="457200" y="1417320"/>
+            <a:ext cx="2003969" cy="4681728"/>
+          </a:xfrm>
+          <a:prstGeom prst="rect">
+            <a:avLst/>
+          </a:prstGeom>
+        </p:spPr>
+      </p:pic>
+    </p:spTree>
+    <p:extLst>
+      <p:ext uri="{BB962C8B-B14F-4D97-AF65-F5344CB8AC3E}">
+        <p14:creationId xmlns:p14="http://schemas.microsoft.com/office/powerpoint/2010/main" val="1187216737"/>
+      </p:ext>
+    </p:extLst>
+  </p:cSld>
+  <p:clrMapOvr>
+    <a:masterClrMapping/>
+  </p:clrMapOvr>
 </p:sld>
 </file>
 
@@ -5830,10 +6542,9 @@
               <a:buNone/>
             </a:pPr>
             <a:r>
-              <a:rPr lang="en-US" dirty="0" smtClean="0"/>
+              <a:rPr lang="en-US" dirty="0"/>
               <a:t>www.tf3604.com/log</a:t>
             </a:r>
-            <a:endParaRPr lang="en-US" dirty="0"/>
           </a:p>
         </p:txBody>
       </p:sp>
@@ -5883,10 +6594,9 @@
           <a:lstStyle/>
           <a:p>
             <a:r>
-              <a:rPr lang="en-US" dirty="0" smtClean="0"/>
+              <a:rPr lang="en-US" dirty="0"/>
               <a:t>Agenda</a:t>
             </a:r>
-            <a:endParaRPr lang="en-US" dirty="0"/>
           </a:p>
         </p:txBody>
       </p:sp>
@@ -5906,49 +6616,49 @@
           <a:lstStyle/>
           <a:p>
             <a:r>
-              <a:rPr lang="en-US" dirty="0" smtClean="0"/>
+              <a:rPr lang="en-US" dirty="0"/>
               <a:t>Purpose of the transaction log</a:t>
             </a:r>
           </a:p>
           <a:p>
             <a:r>
-              <a:rPr lang="en-US" dirty="0" smtClean="0"/>
+              <a:rPr lang="en-US" dirty="0"/>
               <a:t>Organization of the transaction log</a:t>
             </a:r>
           </a:p>
           <a:p>
             <a:r>
-              <a:rPr lang="en-US" dirty="0" smtClean="0"/>
+              <a:rPr lang="en-US" dirty="0"/>
               <a:t>Flushing the log</a:t>
             </a:r>
           </a:p>
           <a:p>
             <a:r>
-              <a:rPr lang="en-US" dirty="0" smtClean="0"/>
+              <a:rPr lang="en-US" dirty="0"/>
               <a:t>Clearing the log</a:t>
             </a:r>
           </a:p>
           <a:p>
             <a:r>
-              <a:rPr lang="en-US" dirty="0" smtClean="0"/>
+              <a:rPr lang="en-US" dirty="0"/>
               <a:t>Checkpoints</a:t>
             </a:r>
           </a:p>
           <a:p>
             <a:r>
-              <a:rPr lang="en-US" dirty="0" smtClean="0"/>
+              <a:rPr lang="en-US" dirty="0"/>
               <a:t>Rollback operations</a:t>
             </a:r>
           </a:p>
           <a:p>
             <a:r>
-              <a:rPr lang="en-US" dirty="0" smtClean="0"/>
+              <a:rPr lang="en-US" dirty="0"/>
               <a:t>VLF fragmentation</a:t>
             </a:r>
           </a:p>
           <a:p>
             <a:r>
-              <a:rPr lang="en-US" dirty="0" smtClean="0"/>
+              <a:rPr lang="en-US" dirty="0"/>
               <a:t>Log monitoring</a:t>
             </a:r>
           </a:p>
@@ -6000,10 +6710,9 @@
           <a:lstStyle/>
           <a:p>
             <a:r>
-              <a:rPr lang="en-US" dirty="0" smtClean="0"/>
+              <a:rPr lang="en-US" dirty="0"/>
               <a:t>Purpose of the Transaction Log</a:t>
             </a:r>
-            <a:endParaRPr lang="en-US" dirty="0"/>
           </a:p>
         </p:txBody>
       </p:sp>
@@ -6025,72 +6734,71 @@
           <a:lstStyle/>
           <a:p>
             <a:r>
-              <a:rPr lang="en-US" dirty="0" smtClean="0"/>
+              <a:rPr lang="en-US" dirty="0"/>
               <a:t>Primary purposes</a:t>
             </a:r>
           </a:p>
           <a:p>
             <a:pPr lvl="1"/>
             <a:r>
-              <a:rPr lang="en-US" dirty="0" smtClean="0"/>
+              <a:rPr lang="en-US" dirty="0"/>
               <a:t>Durability</a:t>
             </a:r>
           </a:p>
           <a:p>
             <a:pPr lvl="2"/>
             <a:r>
-              <a:rPr lang="en-US" dirty="0" smtClean="0"/>
+              <a:rPr lang="en-US" dirty="0"/>
               <a:t>Crash recovery / restore operations</a:t>
             </a:r>
           </a:p>
           <a:p>
             <a:pPr lvl="1"/>
             <a:r>
-              <a:rPr lang="en-US" dirty="0" smtClean="0"/>
+              <a:rPr lang="en-US" dirty="0"/>
               <a:t>Atomicity</a:t>
             </a:r>
           </a:p>
           <a:p>
             <a:pPr lvl="1"/>
             <a:r>
-              <a:rPr lang="en-US" dirty="0" smtClean="0"/>
+              <a:rPr lang="en-US" dirty="0"/>
               <a:t>Thought experiment</a:t>
             </a:r>
           </a:p>
           <a:p>
             <a:pPr lvl="2"/>
             <a:r>
-              <a:rPr lang="en-US" dirty="0" smtClean="0"/>
+              <a:rPr lang="en-US" dirty="0"/>
               <a:t>What would SQL be like without a transaction log?</a:t>
             </a:r>
           </a:p>
           <a:p>
             <a:r>
-              <a:rPr lang="en-US" dirty="0" smtClean="0"/>
+              <a:rPr lang="en-US" dirty="0"/>
               <a:t>Secondary purposes</a:t>
             </a:r>
           </a:p>
           <a:p>
             <a:pPr lvl="1"/>
             <a:r>
-              <a:rPr lang="en-US" dirty="0" smtClean="0"/>
+              <a:rPr lang="en-US" dirty="0"/>
               <a:t>Log reader (replication, CDC)</a:t>
             </a:r>
           </a:p>
           <a:p>
             <a:pPr lvl="1"/>
             <a:r>
-              <a:rPr lang="en-US" dirty="0" smtClean="0"/>
+              <a:rPr lang="en-US" dirty="0"/>
               <a:t>Mirroring / Availability Groups / log shipping</a:t>
             </a:r>
           </a:p>
           <a:p>
             <a:pPr lvl="1"/>
             <a:r>
-              <a:rPr lang="en-US" dirty="0" smtClean="0"/>
+              <a:rPr lang="en-US" dirty="0"/>
               <a:t>Snapshots</a:t>
             </a:r>
-            <a:endParaRPr lang="en-US" dirty="0"/>
           </a:p>
         </p:txBody>
       </p:sp>
@@ -6140,10 +6848,9 @@
           <a:lstStyle/>
           <a:p>
             <a:r>
-              <a:rPr lang="en-US" dirty="0" smtClean="0"/>
+              <a:rPr lang="en-US" dirty="0"/>
               <a:t>What Goes in the Transaction Log?</a:t>
             </a:r>
-            <a:endParaRPr lang="en-US" dirty="0"/>
           </a:p>
         </p:txBody>
       </p:sp>
@@ -6163,36 +6870,35 @@
           <a:lstStyle/>
           <a:p>
             <a:r>
-              <a:rPr lang="en-US" u="sng" dirty="0" smtClean="0"/>
+              <a:rPr lang="en-US" u="sng" dirty="0"/>
               <a:t>Everything</a:t>
             </a:r>
             <a:r>
-              <a:rPr lang="en-US" dirty="0" smtClean="0"/>
+              <a:rPr lang="en-US" dirty="0"/>
               <a:t> that modifies the state </a:t>
             </a:r>
             <a:r>
-              <a:rPr lang="en-US" u="sng" dirty="0" smtClean="0"/>
+              <a:rPr lang="en-US" u="sng" dirty="0"/>
               <a:t>any</a:t>
             </a:r>
             <a:r>
-              <a:rPr lang="en-US" dirty="0" smtClean="0"/>
+              <a:rPr lang="en-US" dirty="0"/>
               <a:t> database in SQL</a:t>
             </a:r>
           </a:p>
           <a:p>
             <a:r>
-              <a:rPr lang="en-US" dirty="0" smtClean="0"/>
+              <a:rPr lang="en-US" dirty="0"/>
               <a:t>Very limited exceptions for some </a:t>
             </a:r>
             <a:r>
-              <a:rPr lang="en-US" dirty="0" err="1" smtClean="0"/>
+              <a:rPr lang="en-US" dirty="0" err="1"/>
               <a:t>tempdb</a:t>
             </a:r>
             <a:r>
-              <a:rPr lang="en-US" dirty="0" smtClean="0"/>
+              <a:rPr lang="en-US" dirty="0"/>
               <a:t> objects</a:t>
             </a:r>
-            <a:endParaRPr lang="en-US" dirty="0"/>
           </a:p>
         </p:txBody>
       </p:sp>
@@ -6242,10 +6948,9 @@
           <a:lstStyle/>
           <a:p>
             <a:r>
-              <a:rPr lang="en-US" dirty="0" smtClean="0"/>
+              <a:rPr lang="en-US" dirty="0"/>
               <a:t>Organization of the Transaction Log</a:t>
             </a:r>
-            <a:endParaRPr lang="en-US" dirty="0"/>
           </a:p>
         </p:txBody>
       </p:sp>
@@ -6270,10 +6975,9 @@
           <a:lstStyle/>
           <a:p>
             <a:r>
-              <a:rPr lang="en-US" dirty="0" smtClean="0"/>
+              <a:rPr lang="en-US" dirty="0"/>
               <a:t>The Transaction Log is just a file …</a:t>
             </a:r>
-            <a:endParaRPr lang="en-US" dirty="0"/>
           </a:p>
         </p:txBody>
       </p:sp>
@@ -6347,10 +7051,9 @@
           <a:lstStyle/>
           <a:p>
             <a:r>
-              <a:rPr lang="en-US" dirty="0" smtClean="0"/>
+              <a:rPr lang="en-US" dirty="0"/>
               <a:t>Organization of the Transaction Log</a:t>
             </a:r>
-            <a:endParaRPr lang="en-US" dirty="0"/>
           </a:p>
         </p:txBody>
       </p:sp>
@@ -6375,22 +7078,21 @@
           <a:lstStyle/>
           <a:p>
             <a:r>
-              <a:rPr lang="en-US" dirty="0" smtClean="0"/>
+              <a:rPr lang="en-US" dirty="0"/>
               <a:t>The Transaction Log is just a file …</a:t>
             </a:r>
           </a:p>
           <a:p>
             <a:r>
-              <a:rPr lang="en-US" dirty="0" smtClean="0"/>
+              <a:rPr lang="en-US" dirty="0"/>
               <a:t>With a bit of header information …</a:t>
             </a:r>
-            <a:endParaRPr lang="en-US" dirty="0"/>
           </a:p>
         </p:txBody>
       </p:sp>
       <p:pic>
         <p:nvPicPr>
-          <p:cNvPr id="5" name="Picture 4"/>
+          <p:cNvPr id="4" name="Picture 3"/>
           <p:cNvPicPr>
             <a:picLocks noChangeAspect="1"/>
           </p:cNvPicPr>
@@ -6405,7 +7107,7 @@
         <p:spPr>
           <a:xfrm>
             <a:off x="457200" y="1417320"/>
-            <a:ext cx="3813762" cy="4681728"/>
+            <a:ext cx="3814109" cy="4681728"/>
           </a:xfrm>
           <a:prstGeom prst="rect">
             <a:avLst/>
@@ -6458,10 +7160,9 @@
           <a:lstStyle/>
           <a:p>
             <a:r>
-              <a:rPr lang="en-US" dirty="0" smtClean="0"/>
+              <a:rPr lang="en-US" dirty="0"/>
               <a:t>Organization of the Transaction Log</a:t>
             </a:r>
-            <a:endParaRPr lang="en-US" dirty="0"/>
           </a:p>
         </p:txBody>
       </p:sp>
@@ -6486,22 +7187,169 @@
           <a:lstStyle/>
           <a:p>
             <a:r>
-              <a:rPr lang="en-US" dirty="0" smtClean="0"/>
+              <a:rPr lang="en-US" dirty="0"/>
               <a:t>The Transaction Log is just a file …</a:t>
             </a:r>
           </a:p>
           <a:p>
             <a:r>
-              <a:rPr lang="en-US" dirty="0" smtClean="0"/>
+              <a:rPr lang="en-US" dirty="0"/>
               <a:t>With a bit of header information …</a:t>
             </a:r>
           </a:p>
           <a:p>
             <a:r>
-              <a:rPr lang="en-US" dirty="0" smtClean="0"/>
+              <a:rPr lang="en-US" dirty="0"/>
               <a:t>Then divided into Virtual Log Files.</a:t>
             </a:r>
-            <a:endParaRPr lang="en-US" dirty="0"/>
+          </a:p>
+        </p:txBody>
+      </p:sp>
+      <p:pic>
+        <p:nvPicPr>
+          <p:cNvPr id="5" name="Picture 4"/>
+          <p:cNvPicPr>
+            <a:picLocks noChangeAspect="1"/>
+          </p:cNvPicPr>
+          <p:nvPr/>
+        </p:nvPicPr>
+        <p:blipFill>
+          <a:blip r:embed="rId2"/>
+          <a:stretch>
+            <a:fillRect/>
+          </a:stretch>
+        </p:blipFill>
+        <p:spPr>
+          <a:xfrm>
+            <a:off x="457200" y="1417320"/>
+            <a:ext cx="3814109" cy="4681728"/>
+          </a:xfrm>
+          <a:prstGeom prst="rect">
+            <a:avLst/>
+          </a:prstGeom>
+        </p:spPr>
+      </p:pic>
+    </p:spTree>
+    <p:extLst>
+      <p:ext uri="{BB962C8B-B14F-4D97-AF65-F5344CB8AC3E}">
+        <p14:creationId xmlns:p14="http://schemas.microsoft.com/office/powerpoint/2010/main" val="3601134671"/>
+      </p:ext>
+    </p:extLst>
+  </p:cSld>
+  <p:clrMapOvr>
+    <a:masterClrMapping/>
+  </p:clrMapOvr>
+</p:sld>
+</file>
+
+<file path=ppt/slides/slide9.xml><?xml version="1.0" encoding="utf-8"?>
+<p:sld xmlns:a="http://schemas.openxmlformats.org/drawingml/2006/main" xmlns:r="http://schemas.openxmlformats.org/officeDocument/2006/relationships" xmlns:p="http://schemas.openxmlformats.org/presentationml/2006/main">
+  <p:cSld>
+    <p:spTree>
+      <p:nvGrpSpPr>
+        <p:cNvPr id="1" name=""/>
+        <p:cNvGrpSpPr/>
+        <p:nvPr/>
+      </p:nvGrpSpPr>
+      <p:grpSpPr>
+        <a:xfrm>
+          <a:off x="0" y="0"/>
+          <a:ext cx="0" cy="0"/>
+          <a:chOff x="0" y="0"/>
+          <a:chExt cx="0" cy="0"/>
+        </a:xfrm>
+      </p:grpSpPr>
+      <p:sp>
+        <p:nvSpPr>
+          <p:cNvPr id="2" name="Title 1"/>
+          <p:cNvSpPr>
+            <a:spLocks noGrp="1"/>
+          </p:cNvSpPr>
+          <p:nvPr>
+            <p:ph type="title"/>
+          </p:nvPr>
+        </p:nvSpPr>
+        <p:spPr/>
+        <p:txBody>
+          <a:bodyPr/>
+          <a:lstStyle/>
+          <a:p>
+            <a:r>
+              <a:rPr lang="en-US" dirty="0"/>
+              <a:t>Virtual Log Files</a:t>
+            </a:r>
+          </a:p>
+        </p:txBody>
+      </p:sp>
+      <p:sp>
+        <p:nvSpPr>
+          <p:cNvPr id="3" name="Content Placeholder 2"/>
+          <p:cNvSpPr>
+            <a:spLocks noGrp="1"/>
+          </p:cNvSpPr>
+          <p:nvPr>
+            <p:ph idx="1"/>
+          </p:nvPr>
+        </p:nvSpPr>
+        <p:spPr>
+          <a:xfrm>
+            <a:off x="4352925" y="1600200"/>
+            <a:ext cx="4333875" cy="4525963"/>
+          </a:xfrm>
+          <a:noFill/>
+        </p:spPr>
+        <p:txBody>
+          <a:bodyPr/>
+          <a:lstStyle/>
+          <a:p>
+            <a:r>
+              <a:rPr lang="en-US" dirty="0"/>
+              <a:t>VLFs can be in one of three statuses:</a:t>
+            </a:r>
+          </a:p>
+          <a:p>
+            <a:pPr lvl="1"/>
+            <a:r>
+              <a:rPr lang="en-US" dirty="0">
+                <a:solidFill>
+                  <a:srgbClr val="92D050"/>
+                </a:solidFill>
+              </a:rPr>
+              <a:t>Inactive</a:t>
+            </a:r>
+          </a:p>
+          <a:p>
+            <a:pPr lvl="1"/>
+            <a:r>
+              <a:rPr lang="en-US" dirty="0">
+                <a:solidFill>
+                  <a:srgbClr val="FFFF00"/>
+                </a:solidFill>
+              </a:rPr>
+              <a:t>Active (current)</a:t>
+            </a:r>
+          </a:p>
+          <a:p>
+            <a:pPr lvl="1"/>
+            <a:r>
+              <a:rPr lang="en-US" dirty="0">
+                <a:solidFill>
+                  <a:srgbClr val="FF0000"/>
+                </a:solidFill>
+              </a:rPr>
+              <a:t>Active (not usable)</a:t>
+            </a:r>
+            <a:endParaRPr lang="en-US" dirty="0">
+              <a:solidFill>
+                <a:schemeClr val="tx1"/>
+              </a:solidFill>
+            </a:endParaRPr>
+          </a:p>
+          <a:p>
+            <a:r>
+              <a:rPr lang="en-US" dirty="0"/>
+              <a:t>Only one VLF is current at a time.</a:t>
+            </a:r>
           </a:p>
         </p:txBody>
       </p:sp>
@@ -6522,7 +7370,7 @@
         <p:spPr>
           <a:xfrm>
             <a:off x="457200" y="1417320"/>
-            <a:ext cx="3813762" cy="4681728"/>
+            <a:ext cx="3814109" cy="4681728"/>
           </a:xfrm>
           <a:prstGeom prst="rect">
             <a:avLst/>
@@ -6532,7 +7380,7 @@
     </p:spTree>
     <p:extLst>
       <p:ext uri="{BB962C8B-B14F-4D97-AF65-F5344CB8AC3E}">
-        <p14:creationId xmlns:p14="http://schemas.microsoft.com/office/powerpoint/2010/main" val="3601134671"/>
+        <p14:creationId xmlns:p14="http://schemas.microsoft.com/office/powerpoint/2010/main" val="1865925798"/>
       </p:ext>
     </p:extLst>
   </p:cSld>

</xml_diff>

<commit_message>
Additional organization of log file slides.
</commit_message>
<xml_diff>
--- a/TransactionLog.pptx
+++ b/TransactionLog.pptx
@@ -5,7 +5,7 @@
     <p:sldMasterId id="2147483648" r:id="rId1"/>
   </p:sldMasterIdLst>
   <p:notesMasterIdLst>
-    <p:notesMasterId r:id="rId17"/>
+    <p:notesMasterId r:id="rId20"/>
   </p:notesMasterIdLst>
   <p:sldIdLst>
     <p:sldId id="328" r:id="rId2"/>
@@ -23,6 +23,9 @@
     <p:sldId id="338" r:id="rId14"/>
     <p:sldId id="340" r:id="rId15"/>
     <p:sldId id="341" r:id="rId16"/>
+    <p:sldId id="342" r:id="rId17"/>
+    <p:sldId id="343" r:id="rId18"/>
+    <p:sldId id="344" r:id="rId19"/>
   </p:sldIdLst>
   <p:sldSz cx="9144000" cy="6858000" type="screen4x3"/>
   <p:notesSz cx="6858000" cy="9144000"/>
@@ -222,7 +225,7 @@
           <a:p>
             <a:fld id="{2EDCB34D-5EC2-4739-9693-E425457AC201}" type="datetimeFigureOut">
               <a:rPr lang="en-US" smtClean="0"/>
-              <a:t>8/2/2016</a:t>
+              <a:t>8/3/2016</a:t>
             </a:fld>
             <a:endParaRPr lang="en-US"/>
           </a:p>
@@ -808,7 +811,7 @@
             <a:fld id="{5942B21B-2ADA-A040-A652-A7305E1B99FE}" type="datetimeFigureOut">
               <a:rPr lang="en-US" smtClean="0"/>
               <a:pPr/>
-              <a:t>8/2/2016</a:t>
+              <a:t>8/3/2016</a:t>
             </a:fld>
             <a:endParaRPr lang="en-US" dirty="0"/>
           </a:p>
@@ -998,7 +1001,7 @@
           <a:p>
             <a:fld id="{5942B21B-2ADA-A040-A652-A7305E1B99FE}" type="datetimeFigureOut">
               <a:rPr lang="en-US" smtClean="0"/>
-              <a:t>8/2/2016</a:t>
+              <a:t>8/3/2016</a:t>
             </a:fld>
             <a:endParaRPr lang="en-US"/>
           </a:p>
@@ -1122,7 +1125,7 @@
             <a:fld id="{5942B21B-2ADA-A040-A652-A7305E1B99FE}" type="datetimeFigureOut">
               <a:rPr lang="en-US" smtClean="0"/>
               <a:pPr/>
-              <a:t>8/2/2016</a:t>
+              <a:t>8/3/2016</a:t>
             </a:fld>
             <a:r>
               <a:rPr lang="en-US"/>
@@ -1393,7 +1396,7 @@
             <a:fld id="{5942B21B-2ADA-A040-A652-A7305E1B99FE}" type="datetimeFigureOut">
               <a:rPr lang="en-US" smtClean="0"/>
               <a:pPr/>
-              <a:t>8/2/2016</a:t>
+              <a:t>8/3/2016</a:t>
             </a:fld>
             <a:r>
               <a:rPr lang="en-US" dirty="0"/>
@@ -1663,7 +1666,7 @@
             <a:fld id="{5942B21B-2ADA-A040-A652-A7305E1B99FE}" type="datetimeFigureOut">
               <a:rPr lang="en-US" smtClean="0"/>
               <a:pPr/>
-              <a:t>8/2/2016</a:t>
+              <a:t>8/3/2016</a:t>
             </a:fld>
             <a:r>
               <a:rPr lang="en-US" dirty="0"/>
@@ -2003,7 +2006,7 @@
             <a:fld id="{5942B21B-2ADA-A040-A652-A7305E1B99FE}" type="datetimeFigureOut">
               <a:rPr lang="en-US" smtClean="0"/>
               <a:pPr/>
-              <a:t>8/2/2016</a:t>
+              <a:t>8/3/2016</a:t>
             </a:fld>
             <a:r>
               <a:rPr lang="en-US" dirty="0"/>
@@ -2344,7 +2347,7 @@
             <a:fld id="{5942B21B-2ADA-A040-A652-A7305E1B99FE}" type="datetimeFigureOut">
               <a:rPr lang="en-US" smtClean="0"/>
               <a:pPr/>
-              <a:t>8/2/2016</a:t>
+              <a:t>8/3/2016</a:t>
             </a:fld>
             <a:r>
               <a:rPr lang="en-US" dirty="0"/>
@@ -2859,7 +2862,7 @@
             <a:fld id="{5942B21B-2ADA-A040-A652-A7305E1B99FE}" type="datetimeFigureOut">
               <a:rPr lang="en-US" smtClean="0"/>
               <a:pPr/>
-              <a:t>8/2/2016</a:t>
+              <a:t>8/3/2016</a:t>
             </a:fld>
             <a:r>
               <a:rPr lang="en-US" dirty="0"/>
@@ -3068,7 +3071,7 @@
             <a:fld id="{5942B21B-2ADA-A040-A652-A7305E1B99FE}" type="datetimeFigureOut">
               <a:rPr lang="en-US" smtClean="0"/>
               <a:pPr/>
-              <a:t>8/2/2016</a:t>
+              <a:t>8/3/2016</a:t>
             </a:fld>
             <a:r>
               <a:rPr lang="en-US" dirty="0"/>
@@ -3255,7 +3258,7 @@
             <a:fld id="{5942B21B-2ADA-A040-A652-A7305E1B99FE}" type="datetimeFigureOut">
               <a:rPr lang="en-US" smtClean="0"/>
               <a:pPr/>
-              <a:t>8/2/2016</a:t>
+              <a:t>8/3/2016</a:t>
             </a:fld>
             <a:r>
               <a:rPr lang="en-US" dirty="0"/>
@@ -3586,7 +3589,7 @@
             <a:fld id="{5942B21B-2ADA-A040-A652-A7305E1B99FE}" type="datetimeFigureOut">
               <a:rPr lang="en-US" smtClean="0"/>
               <a:pPr/>
-              <a:t>8/2/2016</a:t>
+              <a:t>8/3/2016</a:t>
             </a:fld>
             <a:r>
               <a:rPr lang="en-US" dirty="0"/>
@@ -3894,7 +3897,7 @@
             <a:fld id="{5942B21B-2ADA-A040-A652-A7305E1B99FE}" type="datetimeFigureOut">
               <a:rPr lang="en-US" smtClean="0"/>
               <a:pPr/>
-              <a:t>8/2/2016</a:t>
+              <a:t>8/3/2016</a:t>
             </a:fld>
             <a:r>
               <a:rPr lang="en-US" dirty="0"/>
@@ -4173,7 +4176,7 @@
             <a:fld id="{5942B21B-2ADA-A040-A652-A7305E1B99FE}" type="datetimeFigureOut">
               <a:rPr lang="en-US" smtClean="0"/>
               <a:pPr/>
-              <a:t>8/2/2016</a:t>
+              <a:t>8/3/2016</a:t>
             </a:fld>
             <a:r>
               <a:rPr lang="en-US" dirty="0"/>
@@ -5551,6 +5554,412 @@
 </p:sld>
 </file>
 
+<file path=ppt/slides/slide16.xml><?xml version="1.0" encoding="utf-8"?>
+<p:sld xmlns:a="http://schemas.openxmlformats.org/drawingml/2006/main" xmlns:r="http://schemas.openxmlformats.org/officeDocument/2006/relationships" xmlns:p="http://schemas.openxmlformats.org/presentationml/2006/main">
+  <p:cSld>
+    <p:spTree>
+      <p:nvGrpSpPr>
+        <p:cNvPr id="1" name=""/>
+        <p:cNvGrpSpPr/>
+        <p:nvPr/>
+      </p:nvGrpSpPr>
+      <p:grpSpPr>
+        <a:xfrm>
+          <a:off x="0" y="0"/>
+          <a:ext cx="0" cy="0"/>
+          <a:chOff x="0" y="0"/>
+          <a:chExt cx="0" cy="0"/>
+        </a:xfrm>
+      </p:grpSpPr>
+      <p:sp>
+        <p:nvSpPr>
+          <p:cNvPr id="2" name="Title 1"/>
+          <p:cNvSpPr>
+            <a:spLocks noGrp="1"/>
+          </p:cNvSpPr>
+          <p:nvPr>
+            <p:ph type="title"/>
+          </p:nvPr>
+        </p:nvSpPr>
+        <p:spPr/>
+        <p:txBody>
+          <a:bodyPr/>
+          <a:lstStyle/>
+          <a:p>
+            <a:r>
+              <a:rPr lang="en-US" dirty="0"/>
+              <a:t>Organization of the Transaction Log</a:t>
+            </a:r>
+          </a:p>
+        </p:txBody>
+      </p:sp>
+      <p:sp>
+        <p:nvSpPr>
+          <p:cNvPr id="3" name="Content Placeholder 2"/>
+          <p:cNvSpPr>
+            <a:spLocks noGrp="1"/>
+          </p:cNvSpPr>
+          <p:nvPr>
+            <p:ph idx="1"/>
+          </p:nvPr>
+        </p:nvSpPr>
+        <p:spPr>
+          <a:xfrm>
+            <a:off x="4352925" y="1600200"/>
+            <a:ext cx="4333875" cy="1113503"/>
+          </a:xfrm>
+        </p:spPr>
+        <p:txBody>
+          <a:bodyPr/>
+          <a:lstStyle/>
+          <a:p>
+            <a:r>
+              <a:rPr lang="en-US" dirty="0"/>
+              <a:t>VLFs are also structured</a:t>
+            </a:r>
+          </a:p>
+        </p:txBody>
+      </p:sp>
+      <p:pic>
+        <p:nvPicPr>
+          <p:cNvPr id="5" name="Picture 4"/>
+          <p:cNvPicPr>
+            <a:picLocks noChangeAspect="1"/>
+          </p:cNvPicPr>
+          <p:nvPr/>
+        </p:nvPicPr>
+        <p:blipFill>
+          <a:blip r:embed="rId2"/>
+          <a:stretch>
+            <a:fillRect/>
+          </a:stretch>
+        </p:blipFill>
+        <p:spPr>
+          <a:xfrm>
+            <a:off x="457200" y="1417320"/>
+            <a:ext cx="3814109" cy="4681728"/>
+          </a:xfrm>
+          <a:prstGeom prst="rect">
+            <a:avLst/>
+          </a:prstGeom>
+        </p:spPr>
+      </p:pic>
+      <p:pic>
+        <p:nvPicPr>
+          <p:cNvPr id="4" name="Picture 3"/>
+          <p:cNvPicPr>
+            <a:picLocks noChangeAspect="1"/>
+          </p:cNvPicPr>
+          <p:nvPr/>
+        </p:nvPicPr>
+        <p:blipFill>
+          <a:blip r:embed="rId3"/>
+          <a:stretch>
+            <a:fillRect/>
+          </a:stretch>
+        </p:blipFill>
+        <p:spPr>
+          <a:xfrm>
+            <a:off x="4352925" y="3422084"/>
+            <a:ext cx="4566167" cy="1444425"/>
+          </a:xfrm>
+          <a:prstGeom prst="rect">
+            <a:avLst/>
+          </a:prstGeom>
+        </p:spPr>
+      </p:pic>
+      <p:cxnSp>
+        <p:nvCxnSpPr>
+          <p:cNvPr id="7" name="Straight Arrow Connector 6"/>
+          <p:cNvCxnSpPr/>
+          <p:nvPr/>
+        </p:nvCxnSpPr>
+        <p:spPr>
+          <a:xfrm>
+            <a:off x="3023419" y="4129548"/>
+            <a:ext cx="1172552" cy="14749"/>
+          </a:xfrm>
+          <a:prstGeom prst="straightConnector1">
+            <a:avLst/>
+          </a:prstGeom>
+          <a:ln w="127000">
+            <a:solidFill>
+              <a:srgbClr val="FF0000"/>
+            </a:solidFill>
+            <a:tailEnd type="triangle"/>
+          </a:ln>
+        </p:spPr>
+        <p:style>
+          <a:lnRef idx="2">
+            <a:schemeClr val="accent1"/>
+          </a:lnRef>
+          <a:fillRef idx="0">
+            <a:schemeClr val="accent1"/>
+          </a:fillRef>
+          <a:effectRef idx="1">
+            <a:schemeClr val="accent1"/>
+          </a:effectRef>
+          <a:fontRef idx="minor">
+            <a:schemeClr val="tx1"/>
+          </a:fontRef>
+        </p:style>
+      </p:cxnSp>
+    </p:spTree>
+    <p:extLst>
+      <p:ext uri="{BB962C8B-B14F-4D97-AF65-F5344CB8AC3E}">
+        <p14:creationId xmlns:p14="http://schemas.microsoft.com/office/powerpoint/2010/main" val="4034079435"/>
+      </p:ext>
+    </p:extLst>
+  </p:cSld>
+  <p:clrMapOvr>
+    <a:masterClrMapping/>
+  </p:clrMapOvr>
+</p:sld>
+</file>
+
+<file path=ppt/slides/slide17.xml><?xml version="1.0" encoding="utf-8"?>
+<p:sld xmlns:a="http://schemas.openxmlformats.org/drawingml/2006/main" xmlns:r="http://schemas.openxmlformats.org/officeDocument/2006/relationships" xmlns:p="http://schemas.openxmlformats.org/presentationml/2006/main">
+  <p:cSld>
+    <p:spTree>
+      <p:nvGrpSpPr>
+        <p:cNvPr id="1" name=""/>
+        <p:cNvGrpSpPr/>
+        <p:nvPr/>
+      </p:nvGrpSpPr>
+      <p:grpSpPr>
+        <a:xfrm>
+          <a:off x="0" y="0"/>
+          <a:ext cx="0" cy="0"/>
+          <a:chOff x="0" y="0"/>
+          <a:chExt cx="0" cy="0"/>
+        </a:xfrm>
+      </p:grpSpPr>
+      <p:sp>
+        <p:nvSpPr>
+          <p:cNvPr id="2" name="Title 1"/>
+          <p:cNvSpPr>
+            <a:spLocks noGrp="1"/>
+          </p:cNvSpPr>
+          <p:nvPr>
+            <p:ph type="title"/>
+          </p:nvPr>
+        </p:nvSpPr>
+        <p:spPr/>
+        <p:txBody>
+          <a:bodyPr/>
+          <a:lstStyle/>
+          <a:p>
+            <a:r>
+              <a:rPr lang="en-US" dirty="0"/>
+              <a:t>VLF Detail</a:t>
+            </a:r>
+          </a:p>
+        </p:txBody>
+      </p:sp>
+      <p:sp>
+        <p:nvSpPr>
+          <p:cNvPr id="3" name="Content Placeholder 2"/>
+          <p:cNvSpPr>
+            <a:spLocks noGrp="1"/>
+          </p:cNvSpPr>
+          <p:nvPr>
+            <p:ph idx="1"/>
+          </p:nvPr>
+        </p:nvSpPr>
+        <p:spPr>
+          <a:xfrm>
+            <a:off x="457201" y="3797145"/>
+            <a:ext cx="8229600" cy="2329018"/>
+          </a:xfrm>
+        </p:spPr>
+        <p:txBody>
+          <a:bodyPr/>
+          <a:lstStyle/>
+          <a:p>
+            <a:r>
+              <a:rPr lang="en-US" dirty="0"/>
+              <a:t>Again there is a header</a:t>
+            </a:r>
+          </a:p>
+          <a:p>
+            <a:r>
+              <a:rPr lang="en-US" dirty="0"/>
+              <a:t>Then a series of log blocks</a:t>
+            </a:r>
+          </a:p>
+          <a:p>
+            <a:pPr lvl="1"/>
+            <a:r>
+              <a:rPr lang="en-US" dirty="0"/>
+              <a:t>In 512 byte increments up to 60K in size</a:t>
+            </a:r>
+          </a:p>
+        </p:txBody>
+      </p:sp>
+      <p:pic>
+        <p:nvPicPr>
+          <p:cNvPr id="7" name="Picture 6"/>
+          <p:cNvPicPr>
+            <a:picLocks noChangeAspect="1"/>
+          </p:cNvPicPr>
+          <p:nvPr/>
+        </p:nvPicPr>
+        <p:blipFill>
+          <a:blip r:embed="rId2"/>
+          <a:stretch>
+            <a:fillRect/>
+          </a:stretch>
+        </p:blipFill>
+        <p:spPr>
+          <a:xfrm>
+            <a:off x="457200" y="1417320"/>
+            <a:ext cx="8190125" cy="2377440"/>
+          </a:xfrm>
+          <a:prstGeom prst="rect">
+            <a:avLst/>
+          </a:prstGeom>
+        </p:spPr>
+      </p:pic>
+    </p:spTree>
+    <p:extLst>
+      <p:ext uri="{BB962C8B-B14F-4D97-AF65-F5344CB8AC3E}">
+        <p14:creationId xmlns:p14="http://schemas.microsoft.com/office/powerpoint/2010/main" val="3765893842"/>
+      </p:ext>
+    </p:extLst>
+  </p:cSld>
+  <p:clrMapOvr>
+    <a:masterClrMapping/>
+  </p:clrMapOvr>
+</p:sld>
+</file>
+
+<file path=ppt/slides/slide18.xml><?xml version="1.0" encoding="utf-8"?>
+<p:sld xmlns:a="http://schemas.openxmlformats.org/drawingml/2006/main" xmlns:r="http://schemas.openxmlformats.org/officeDocument/2006/relationships" xmlns:p="http://schemas.openxmlformats.org/presentationml/2006/main">
+  <p:cSld>
+    <p:spTree>
+      <p:nvGrpSpPr>
+        <p:cNvPr id="1" name=""/>
+        <p:cNvGrpSpPr/>
+        <p:nvPr/>
+      </p:nvGrpSpPr>
+      <p:grpSpPr>
+        <a:xfrm>
+          <a:off x="0" y="0"/>
+          <a:ext cx="0" cy="0"/>
+          <a:chOff x="0" y="0"/>
+          <a:chExt cx="0" cy="0"/>
+        </a:xfrm>
+      </p:grpSpPr>
+      <p:sp>
+        <p:nvSpPr>
+          <p:cNvPr id="2" name="Title 1"/>
+          <p:cNvSpPr>
+            <a:spLocks noGrp="1"/>
+          </p:cNvSpPr>
+          <p:nvPr>
+            <p:ph type="title"/>
+          </p:nvPr>
+        </p:nvSpPr>
+        <p:spPr/>
+        <p:txBody>
+          <a:bodyPr/>
+          <a:lstStyle/>
+          <a:p>
+            <a:r>
+              <a:rPr lang="en-US" dirty="0"/>
+              <a:t>Log Block Detail</a:t>
+            </a:r>
+          </a:p>
+        </p:txBody>
+      </p:sp>
+      <p:sp>
+        <p:nvSpPr>
+          <p:cNvPr id="3" name="Content Placeholder 2"/>
+          <p:cNvSpPr>
+            <a:spLocks noGrp="1"/>
+          </p:cNvSpPr>
+          <p:nvPr>
+            <p:ph idx="1"/>
+          </p:nvPr>
+        </p:nvSpPr>
+        <p:spPr>
+          <a:xfrm>
+            <a:off x="457201" y="3797145"/>
+            <a:ext cx="8229600" cy="2329018"/>
+          </a:xfrm>
+        </p:spPr>
+        <p:txBody>
+          <a:bodyPr/>
+          <a:lstStyle/>
+          <a:p>
+            <a:r>
+              <a:rPr lang="en-US" dirty="0"/>
+              <a:t>As expected, starts with a header</a:t>
+            </a:r>
+          </a:p>
+          <a:p>
+            <a:r>
+              <a:rPr lang="en-US" dirty="0"/>
+              <a:t>Then a series of log records</a:t>
+            </a:r>
+          </a:p>
+          <a:p>
+            <a:pPr lvl="1"/>
+            <a:r>
+              <a:rPr lang="en-US" dirty="0"/>
+              <a:t>Completely variable </a:t>
+            </a:r>
+            <a:r>
+              <a:rPr lang="en-US"/>
+              <a:t>in size</a:t>
+            </a:r>
+            <a:endParaRPr lang="en-US" dirty="0"/>
+          </a:p>
+          <a:p>
+            <a:r>
+              <a:rPr lang="en-US" dirty="0"/>
+              <a:t>And an index to the log records (slot array)</a:t>
+            </a:r>
+          </a:p>
+        </p:txBody>
+      </p:sp>
+      <p:pic>
+        <p:nvPicPr>
+          <p:cNvPr id="5" name="Picture 4"/>
+          <p:cNvPicPr>
+            <a:picLocks noChangeAspect="1"/>
+          </p:cNvPicPr>
+          <p:nvPr/>
+        </p:nvPicPr>
+        <p:blipFill>
+          <a:blip r:embed="rId2"/>
+          <a:stretch>
+            <a:fillRect/>
+          </a:stretch>
+        </p:blipFill>
+        <p:spPr>
+          <a:xfrm>
+            <a:off x="457200" y="1417320"/>
+            <a:ext cx="8190125" cy="2377440"/>
+          </a:xfrm>
+          <a:prstGeom prst="rect">
+            <a:avLst/>
+          </a:prstGeom>
+        </p:spPr>
+      </p:pic>
+    </p:spTree>
+    <p:extLst>
+      <p:ext uri="{BB962C8B-B14F-4D97-AF65-F5344CB8AC3E}">
+        <p14:creationId xmlns:p14="http://schemas.microsoft.com/office/powerpoint/2010/main" val="803829485"/>
+      </p:ext>
+    </p:extLst>
+  </p:cSld>
+  <p:clrMapOvr>
+    <a:masterClrMapping/>
+  </p:clrMapOvr>
+</p:sld>
+</file>
+
 <file path=ppt/slides/slide2.xml><?xml version="1.0" encoding="utf-8"?>
 <p:sld xmlns:a="http://schemas.openxmlformats.org/drawingml/2006/main" xmlns:r="http://schemas.openxmlformats.org/officeDocument/2006/relationships" xmlns:p="http://schemas.openxmlformats.org/presentationml/2006/main">
   <p:cSld>
@@ -6729,7 +7138,7 @@
         <p:spPr/>
         <p:txBody>
           <a:bodyPr>
-            <a:normAutofit lnSpcReduction="10000"/>
+            <a:normAutofit fontScale="92500" lnSpcReduction="10000"/>
           </a:bodyPr>
           <a:lstStyle/>
           <a:p>
@@ -6743,6 +7152,13 @@
             <a:r>
               <a:rPr lang="en-US" dirty="0"/>
               <a:t>Durability</a:t>
+            </a:r>
+          </a:p>
+          <a:p>
+            <a:pPr lvl="2"/>
+            <a:r>
+              <a:rPr lang="en-US" dirty="0"/>
+              <a:t>Write-ahead logging</a:t>
             </a:r>
           </a:p>
           <a:p>
@@ -6884,6 +7300,36 @@
             <a:r>
               <a:rPr lang="en-US" dirty="0"/>
               <a:t> database in SQL</a:t>
+            </a:r>
+          </a:p>
+          <a:p>
+            <a:pPr lvl="1"/>
+            <a:r>
+              <a:rPr lang="en-US" dirty="0"/>
+              <a:t>Includes data to </a:t>
+            </a:r>
+            <a:r>
+              <a:rPr lang="en-US" b="1" dirty="0"/>
+              <a:t>redo</a:t>
+            </a:r>
+            <a:r>
+              <a:rPr lang="en-US" dirty="0"/>
+              <a:t> an operation</a:t>
+            </a:r>
+          </a:p>
+          <a:p>
+            <a:pPr lvl="1"/>
+            <a:r>
+              <a:rPr lang="en-US" dirty="0"/>
+              <a:t>Includes data to </a:t>
+            </a:r>
+            <a:r>
+              <a:rPr lang="en-US" b="1" dirty="0"/>
+              <a:t>undo</a:t>
+            </a:r>
+            <a:r>
+              <a:rPr lang="en-US" dirty="0"/>
+              <a:t> an operation</a:t>
             </a:r>
           </a:p>
           <a:p>
@@ -7203,6 +7649,13 @@
               <a:t>Then divided into Virtual Log Files.</a:t>
             </a:r>
           </a:p>
+          <a:p>
+            <a:pPr lvl="1"/>
+            <a:r>
+              <a:rPr lang="en-US" dirty="0"/>
+              <a:t>Not necessarily of equal size</a:t>
+            </a:r>
+          </a:p>
         </p:txBody>
       </p:sp>
       <p:pic>
@@ -7304,7 +7757,7 @@
           <a:p>
             <a:r>
               <a:rPr lang="en-US" dirty="0"/>
-              <a:t>VLFs can be in one of three statuses:</a:t>
+              <a:t>VLFs can be in one of two statuses:</a:t>
             </a:r>
           </a:p>
           <a:p>

</xml_diff>

<commit_message>
LSN info and basic log informational commands.
</commit_message>
<xml_diff>
--- a/TransactionLog.pptx
+++ b/TransactionLog.pptx
@@ -5,7 +5,7 @@
     <p:sldMasterId id="2147483648" r:id="rId1"/>
   </p:sldMasterIdLst>
   <p:notesMasterIdLst>
-    <p:notesMasterId r:id="rId20"/>
+    <p:notesMasterId r:id="rId26"/>
   </p:notesMasterIdLst>
   <p:sldIdLst>
     <p:sldId id="328" r:id="rId2"/>
@@ -26,6 +26,12 @@
     <p:sldId id="342" r:id="rId17"/>
     <p:sldId id="343" r:id="rId18"/>
     <p:sldId id="344" r:id="rId19"/>
+    <p:sldId id="345" r:id="rId20"/>
+    <p:sldId id="346" r:id="rId21"/>
+    <p:sldId id="348" r:id="rId22"/>
+    <p:sldId id="349" r:id="rId23"/>
+    <p:sldId id="350" r:id="rId24"/>
+    <p:sldId id="351" r:id="rId25"/>
   </p:sldIdLst>
   <p:sldSz cx="9144000" cy="6858000" type="screen4x3"/>
   <p:notesSz cx="6858000" cy="9144000"/>
@@ -225,7 +231,7 @@
           <a:p>
             <a:fld id="{2EDCB34D-5EC2-4739-9693-E425457AC201}" type="datetimeFigureOut">
               <a:rPr lang="en-US" smtClean="0"/>
-              <a:t>8/3/2016</a:t>
+              <a:t>08/04/2016</a:t>
             </a:fld>
             <a:endParaRPr lang="en-US"/>
           </a:p>
@@ -811,7 +817,7 @@
             <a:fld id="{5942B21B-2ADA-A040-A652-A7305E1B99FE}" type="datetimeFigureOut">
               <a:rPr lang="en-US" smtClean="0"/>
               <a:pPr/>
-              <a:t>8/3/2016</a:t>
+              <a:t>08/04/2016</a:t>
             </a:fld>
             <a:endParaRPr lang="en-US" dirty="0"/>
           </a:p>
@@ -1001,7 +1007,7 @@
           <a:p>
             <a:fld id="{5942B21B-2ADA-A040-A652-A7305E1B99FE}" type="datetimeFigureOut">
               <a:rPr lang="en-US" smtClean="0"/>
-              <a:t>8/3/2016</a:t>
+              <a:t>08/04/2016</a:t>
             </a:fld>
             <a:endParaRPr lang="en-US"/>
           </a:p>
@@ -1125,7 +1131,7 @@
             <a:fld id="{5942B21B-2ADA-A040-A652-A7305E1B99FE}" type="datetimeFigureOut">
               <a:rPr lang="en-US" smtClean="0"/>
               <a:pPr/>
-              <a:t>8/3/2016</a:t>
+              <a:t>08/04/2016</a:t>
             </a:fld>
             <a:r>
               <a:rPr lang="en-US"/>
@@ -1396,7 +1402,7 @@
             <a:fld id="{5942B21B-2ADA-A040-A652-A7305E1B99FE}" type="datetimeFigureOut">
               <a:rPr lang="en-US" smtClean="0"/>
               <a:pPr/>
-              <a:t>8/3/2016</a:t>
+              <a:t>08/04/2016</a:t>
             </a:fld>
             <a:r>
               <a:rPr lang="en-US" dirty="0"/>
@@ -1666,7 +1672,7 @@
             <a:fld id="{5942B21B-2ADA-A040-A652-A7305E1B99FE}" type="datetimeFigureOut">
               <a:rPr lang="en-US" smtClean="0"/>
               <a:pPr/>
-              <a:t>8/3/2016</a:t>
+              <a:t>08/04/2016</a:t>
             </a:fld>
             <a:r>
               <a:rPr lang="en-US" dirty="0"/>
@@ -2006,7 +2012,7 @@
             <a:fld id="{5942B21B-2ADA-A040-A652-A7305E1B99FE}" type="datetimeFigureOut">
               <a:rPr lang="en-US" smtClean="0"/>
               <a:pPr/>
-              <a:t>8/3/2016</a:t>
+              <a:t>08/04/2016</a:t>
             </a:fld>
             <a:r>
               <a:rPr lang="en-US" dirty="0"/>
@@ -2347,7 +2353,7 @@
             <a:fld id="{5942B21B-2ADA-A040-A652-A7305E1B99FE}" type="datetimeFigureOut">
               <a:rPr lang="en-US" smtClean="0"/>
               <a:pPr/>
-              <a:t>8/3/2016</a:t>
+              <a:t>08/04/2016</a:t>
             </a:fld>
             <a:r>
               <a:rPr lang="en-US" dirty="0"/>
@@ -2862,7 +2868,7 @@
             <a:fld id="{5942B21B-2ADA-A040-A652-A7305E1B99FE}" type="datetimeFigureOut">
               <a:rPr lang="en-US" smtClean="0"/>
               <a:pPr/>
-              <a:t>8/3/2016</a:t>
+              <a:t>08/04/2016</a:t>
             </a:fld>
             <a:r>
               <a:rPr lang="en-US" dirty="0"/>
@@ -3071,7 +3077,7 @@
             <a:fld id="{5942B21B-2ADA-A040-A652-A7305E1B99FE}" type="datetimeFigureOut">
               <a:rPr lang="en-US" smtClean="0"/>
               <a:pPr/>
-              <a:t>8/3/2016</a:t>
+              <a:t>08/04/2016</a:t>
             </a:fld>
             <a:r>
               <a:rPr lang="en-US" dirty="0"/>
@@ -3258,7 +3264,7 @@
             <a:fld id="{5942B21B-2ADA-A040-A652-A7305E1B99FE}" type="datetimeFigureOut">
               <a:rPr lang="en-US" smtClean="0"/>
               <a:pPr/>
-              <a:t>8/3/2016</a:t>
+              <a:t>08/04/2016</a:t>
             </a:fld>
             <a:r>
               <a:rPr lang="en-US" dirty="0"/>
@@ -3589,7 +3595,7 @@
             <a:fld id="{5942B21B-2ADA-A040-A652-A7305E1B99FE}" type="datetimeFigureOut">
               <a:rPr lang="en-US" smtClean="0"/>
               <a:pPr/>
-              <a:t>8/3/2016</a:t>
+              <a:t>08/04/2016</a:t>
             </a:fld>
             <a:r>
               <a:rPr lang="en-US" dirty="0"/>
@@ -3897,7 +3903,7 @@
             <a:fld id="{5942B21B-2ADA-A040-A652-A7305E1B99FE}" type="datetimeFigureOut">
               <a:rPr lang="en-US" smtClean="0"/>
               <a:pPr/>
-              <a:t>8/3/2016</a:t>
+              <a:t>08/04/2016</a:t>
             </a:fld>
             <a:r>
               <a:rPr lang="en-US" dirty="0"/>
@@ -4176,7 +4182,7 @@
             <a:fld id="{5942B21B-2ADA-A040-A652-A7305E1B99FE}" type="datetimeFigureOut">
               <a:rPr lang="en-US" smtClean="0"/>
               <a:pPr/>
-              <a:t>8/3/2016</a:t>
+              <a:t>08/04/2016</a:t>
             </a:fld>
             <a:r>
               <a:rPr lang="en-US" dirty="0"/>
@@ -5939,7 +5945,7 @@
         </p:blipFill>
         <p:spPr>
           <a:xfrm>
-            <a:off x="457200" y="1417320"/>
+            <a:off x="457200" y="1419705"/>
             <a:ext cx="8190125" cy="2377440"/>
           </a:xfrm>
           <a:prstGeom prst="rect">
@@ -5951,6 +5957,138 @@
     <p:extLst>
       <p:ext uri="{BB962C8B-B14F-4D97-AF65-F5344CB8AC3E}">
         <p14:creationId xmlns:p14="http://schemas.microsoft.com/office/powerpoint/2010/main" val="803829485"/>
+      </p:ext>
+    </p:extLst>
+  </p:cSld>
+  <p:clrMapOvr>
+    <a:masterClrMapping/>
+  </p:clrMapOvr>
+</p:sld>
+</file>
+
+<file path=ppt/slides/slide19.xml><?xml version="1.0" encoding="utf-8"?>
+<p:sld xmlns:a="http://schemas.openxmlformats.org/drawingml/2006/main" xmlns:r="http://schemas.openxmlformats.org/officeDocument/2006/relationships" xmlns:p="http://schemas.openxmlformats.org/presentationml/2006/main">
+  <p:cSld>
+    <p:spTree>
+      <p:nvGrpSpPr>
+        <p:cNvPr id="1" name=""/>
+        <p:cNvGrpSpPr/>
+        <p:nvPr/>
+      </p:nvGrpSpPr>
+      <p:grpSpPr>
+        <a:xfrm>
+          <a:off x="0" y="0"/>
+          <a:ext cx="0" cy="0"/>
+          <a:chOff x="0" y="0"/>
+          <a:chExt cx="0" cy="0"/>
+        </a:xfrm>
+      </p:grpSpPr>
+      <p:sp>
+        <p:nvSpPr>
+          <p:cNvPr id="2" name="Title 1"/>
+          <p:cNvSpPr>
+            <a:spLocks noGrp="1"/>
+          </p:cNvSpPr>
+          <p:nvPr>
+            <p:ph type="title"/>
+          </p:nvPr>
+        </p:nvSpPr>
+        <p:spPr/>
+        <p:txBody>
+          <a:bodyPr/>
+          <a:lstStyle/>
+          <a:p>
+            <a:r>
+              <a:rPr lang="en-US" dirty="0"/>
+              <a:t>Log </a:t>
+            </a:r>
+            <a:r>
+              <a:rPr lang="en-US" dirty="0" smtClean="0"/>
+              <a:t>Record Detail</a:t>
+            </a:r>
+            <a:endParaRPr lang="en-US" dirty="0"/>
+          </a:p>
+        </p:txBody>
+      </p:sp>
+      <p:sp>
+        <p:nvSpPr>
+          <p:cNvPr id="3" name="Content Placeholder 2"/>
+          <p:cNvSpPr>
+            <a:spLocks noGrp="1"/>
+          </p:cNvSpPr>
+          <p:nvPr>
+            <p:ph idx="1"/>
+          </p:nvPr>
+        </p:nvSpPr>
+        <p:spPr>
+          <a:xfrm>
+            <a:off x="457201" y="3797145"/>
+            <a:ext cx="8229600" cy="2329018"/>
+          </a:xfrm>
+        </p:spPr>
+        <p:txBody>
+          <a:bodyPr>
+            <a:normAutofit lnSpcReduction="10000"/>
+          </a:bodyPr>
+          <a:lstStyle/>
+          <a:p>
+            <a:r>
+              <a:rPr lang="en-US" dirty="0" smtClean="0"/>
+              <a:t>Of course, a header</a:t>
+            </a:r>
+          </a:p>
+          <a:p>
+            <a:pPr lvl="1"/>
+            <a:r>
+              <a:rPr lang="en-US" dirty="0" smtClean="0"/>
+              <a:t>Record type, transaction ID, length, pointer to previous transaction record, etc.</a:t>
+            </a:r>
+            <a:endParaRPr lang="en-US" dirty="0"/>
+          </a:p>
+          <a:p>
+            <a:r>
+              <a:rPr lang="en-US" dirty="0" smtClean="0"/>
+              <a:t>Payload</a:t>
+            </a:r>
+          </a:p>
+          <a:p>
+            <a:pPr lvl="1"/>
+            <a:r>
+              <a:rPr lang="en-US" dirty="0" smtClean="0"/>
+              <a:t>Before/after image of changes</a:t>
+            </a:r>
+            <a:endParaRPr lang="en-US" dirty="0"/>
+          </a:p>
+        </p:txBody>
+      </p:sp>
+      <p:pic>
+        <p:nvPicPr>
+          <p:cNvPr id="4" name="Picture 3"/>
+          <p:cNvPicPr>
+            <a:picLocks noChangeAspect="1"/>
+          </p:cNvPicPr>
+          <p:nvPr/>
+        </p:nvPicPr>
+        <p:blipFill>
+          <a:blip r:embed="rId2"/>
+          <a:stretch>
+            <a:fillRect/>
+          </a:stretch>
+        </p:blipFill>
+        <p:spPr>
+          <a:xfrm>
+            <a:off x="457200" y="1417320"/>
+            <a:ext cx="8199451" cy="2377440"/>
+          </a:xfrm>
+          <a:prstGeom prst="rect">
+            <a:avLst/>
+          </a:prstGeom>
+        </p:spPr>
+      </p:pic>
+    </p:spTree>
+    <p:extLst>
+      <p:ext uri="{BB962C8B-B14F-4D97-AF65-F5344CB8AC3E}">
+        <p14:creationId xmlns:p14="http://schemas.microsoft.com/office/powerpoint/2010/main" val="3638472235"/>
       </p:ext>
     </p:extLst>
   </p:cSld>
@@ -6961,6 +7099,973 @@
     <p:extLst>
       <p:ext uri="{BB962C8B-B14F-4D97-AF65-F5344CB8AC3E}">
         <p14:creationId xmlns:p14="http://schemas.microsoft.com/office/powerpoint/2010/main" val="1021995815"/>
+      </p:ext>
+    </p:extLst>
+  </p:cSld>
+  <p:clrMapOvr>
+    <a:masterClrMapping/>
+  </p:clrMapOvr>
+</p:sld>
+</file>
+
+<file path=ppt/slides/slide20.xml><?xml version="1.0" encoding="utf-8"?>
+<p:sld xmlns:a="http://schemas.openxmlformats.org/drawingml/2006/main" xmlns:r="http://schemas.openxmlformats.org/officeDocument/2006/relationships" xmlns:p="http://schemas.openxmlformats.org/presentationml/2006/main">
+  <p:cSld>
+    <p:spTree>
+      <p:nvGrpSpPr>
+        <p:cNvPr id="1" name=""/>
+        <p:cNvGrpSpPr/>
+        <p:nvPr/>
+      </p:nvGrpSpPr>
+      <p:grpSpPr>
+        <a:xfrm>
+          <a:off x="0" y="0"/>
+          <a:ext cx="0" cy="0"/>
+          <a:chOff x="0" y="0"/>
+          <a:chExt cx="0" cy="0"/>
+        </a:xfrm>
+      </p:grpSpPr>
+      <p:sp>
+        <p:nvSpPr>
+          <p:cNvPr id="2" name="Title 1"/>
+          <p:cNvSpPr>
+            <a:spLocks noGrp="1"/>
+          </p:cNvSpPr>
+          <p:nvPr>
+            <p:ph type="title"/>
+          </p:nvPr>
+        </p:nvSpPr>
+        <p:spPr/>
+        <p:txBody>
+          <a:bodyPr/>
+          <a:lstStyle/>
+          <a:p>
+            <a:r>
+              <a:rPr lang="en-US" dirty="0" smtClean="0"/>
+              <a:t>Log Sequence Number</a:t>
+            </a:r>
+            <a:endParaRPr lang="en-US" dirty="0"/>
+          </a:p>
+        </p:txBody>
+      </p:sp>
+      <p:sp>
+        <p:nvSpPr>
+          <p:cNvPr id="3" name="Content Placeholder 2"/>
+          <p:cNvSpPr>
+            <a:spLocks noGrp="1"/>
+          </p:cNvSpPr>
+          <p:nvPr>
+            <p:ph idx="1"/>
+          </p:nvPr>
+        </p:nvSpPr>
+        <p:spPr/>
+        <p:txBody>
+          <a:bodyPr/>
+          <a:lstStyle/>
+          <a:p>
+            <a:r>
+              <a:rPr lang="en-US" dirty="0" smtClean="0"/>
+              <a:t>Each log record can be uniquely identified by its Log Sequence Number (LSN)</a:t>
+            </a:r>
+          </a:p>
+          <a:p>
+            <a:r>
+              <a:rPr lang="en-US" dirty="0" smtClean="0"/>
+              <a:t>An LSN is composed of three parts</a:t>
+            </a:r>
+          </a:p>
+          <a:p>
+            <a:pPr lvl="1"/>
+            <a:r>
+              <a:rPr lang="en-US" dirty="0" smtClean="0"/>
+              <a:t>VLF number</a:t>
+            </a:r>
+          </a:p>
+          <a:p>
+            <a:pPr lvl="1"/>
+            <a:r>
+              <a:rPr lang="en-US" dirty="0" smtClean="0"/>
+              <a:t>Log Block offset (512-byte chunks, not contiguous)</a:t>
+            </a:r>
+          </a:p>
+          <a:p>
+            <a:pPr lvl="1"/>
+            <a:r>
+              <a:rPr lang="en-US" dirty="0" smtClean="0"/>
+              <a:t>Log Record number (slot number)</a:t>
+            </a:r>
+          </a:p>
+          <a:p>
+            <a:r>
+              <a:rPr lang="en-US" dirty="0" smtClean="0"/>
+              <a:t>The LSN is in a very real way a pointer into the log file</a:t>
+            </a:r>
+            <a:endParaRPr lang="en-US" dirty="0"/>
+          </a:p>
+        </p:txBody>
+      </p:sp>
+    </p:spTree>
+    <p:extLst>
+      <p:ext uri="{BB962C8B-B14F-4D97-AF65-F5344CB8AC3E}">
+        <p14:creationId xmlns:p14="http://schemas.microsoft.com/office/powerpoint/2010/main" val="1560482780"/>
+      </p:ext>
+    </p:extLst>
+  </p:cSld>
+  <p:clrMapOvr>
+    <a:masterClrMapping/>
+  </p:clrMapOvr>
+</p:sld>
+</file>
+
+<file path=ppt/slides/slide21.xml><?xml version="1.0" encoding="utf-8"?>
+<p:sld xmlns:a="http://schemas.openxmlformats.org/drawingml/2006/main" xmlns:r="http://schemas.openxmlformats.org/officeDocument/2006/relationships" xmlns:p="http://schemas.openxmlformats.org/presentationml/2006/main">
+  <p:cSld>
+    <p:spTree>
+      <p:nvGrpSpPr>
+        <p:cNvPr id="1" name=""/>
+        <p:cNvGrpSpPr/>
+        <p:nvPr/>
+      </p:nvGrpSpPr>
+      <p:grpSpPr>
+        <a:xfrm>
+          <a:off x="0" y="0"/>
+          <a:ext cx="0" cy="0"/>
+          <a:chOff x="0" y="0"/>
+          <a:chExt cx="0" cy="0"/>
+        </a:xfrm>
+      </p:grpSpPr>
+      <p:sp>
+        <p:nvSpPr>
+          <p:cNvPr id="2" name="Title 1"/>
+          <p:cNvSpPr>
+            <a:spLocks noGrp="1"/>
+          </p:cNvSpPr>
+          <p:nvPr>
+            <p:ph type="title"/>
+          </p:nvPr>
+        </p:nvSpPr>
+        <p:spPr/>
+        <p:txBody>
+          <a:bodyPr/>
+          <a:lstStyle/>
+          <a:p>
+            <a:r>
+              <a:rPr lang="en-US" dirty="0" smtClean="0"/>
+              <a:t>LSN Representations</a:t>
+            </a:r>
+            <a:endParaRPr lang="en-US" dirty="0"/>
+          </a:p>
+        </p:txBody>
+      </p:sp>
+      <p:sp>
+        <p:nvSpPr>
+          <p:cNvPr id="3" name="Content Placeholder 2"/>
+          <p:cNvSpPr>
+            <a:spLocks noGrp="1"/>
+          </p:cNvSpPr>
+          <p:nvPr>
+            <p:ph idx="1"/>
+          </p:nvPr>
+        </p:nvSpPr>
+        <p:spPr>
+          <a:xfrm>
+            <a:off x="457200" y="1600201"/>
+            <a:ext cx="8229600" cy="628650"/>
+          </a:xfrm>
+        </p:spPr>
+        <p:txBody>
+          <a:bodyPr/>
+          <a:lstStyle/>
+          <a:p>
+            <a:pPr marL="0" indent="0">
+              <a:buNone/>
+            </a:pPr>
+            <a:r>
+              <a:rPr lang="en-US" dirty="0" smtClean="0"/>
+              <a:t>Three common ways to express an LSN</a:t>
+            </a:r>
+          </a:p>
+        </p:txBody>
+      </p:sp>
+      <p:graphicFrame>
+        <p:nvGraphicFramePr>
+          <p:cNvPr id="4" name="Table 3"/>
+          <p:cNvGraphicFramePr>
+            <a:graphicFrameLocks noGrp="1"/>
+          </p:cNvGraphicFramePr>
+          <p:nvPr>
+            <p:extLst>
+              <p:ext uri="{D42A27DB-BD31-4B8C-83A1-F6EECF244321}">
+                <p14:modId xmlns:p14="http://schemas.microsoft.com/office/powerpoint/2010/main" val="2590883591"/>
+              </p:ext>
+            </p:extLst>
+          </p:nvPr>
+        </p:nvGraphicFramePr>
+        <p:xfrm>
+          <a:off x="457200" y="2352675"/>
+          <a:ext cx="8229600" cy="1779746"/>
+        </p:xfrm>
+        <a:graphic>
+          <a:graphicData uri="http://schemas.openxmlformats.org/drawingml/2006/table">
+            <a:tbl>
+              <a:tblPr firstRow="1" bandRow="1">
+                <a:tableStyleId>{5C22544A-7EE6-4342-B048-85BDC9FD1C3A}</a:tableStyleId>
+              </a:tblPr>
+              <a:tblGrid>
+                <a:gridCol w="1895475"/>
+                <a:gridCol w="3171825"/>
+                <a:gridCol w="3162300"/>
+              </a:tblGrid>
+              <a:tr h="397986">
+                <a:tc>
+                  <a:txBody>
+                    <a:bodyPr/>
+                    <a:lstStyle/>
+                    <a:p>
+                      <a:r>
+                        <a:rPr lang="en-US" dirty="0" smtClean="0"/>
+                        <a:t>Format</a:t>
+                      </a:r>
+                      <a:endParaRPr lang="en-US" dirty="0"/>
+                    </a:p>
+                  </a:txBody>
+                  <a:tcPr/>
+                </a:tc>
+                <a:tc>
+                  <a:txBody>
+                    <a:bodyPr/>
+                    <a:lstStyle/>
+                    <a:p>
+                      <a:r>
+                        <a:rPr lang="en-US" dirty="0" smtClean="0"/>
+                        <a:t>Example</a:t>
+                      </a:r>
+                      <a:endParaRPr lang="en-US" dirty="0"/>
+                    </a:p>
+                  </a:txBody>
+                  <a:tcPr/>
+                </a:tc>
+                <a:tc>
+                  <a:txBody>
+                    <a:bodyPr/>
+                    <a:lstStyle/>
+                    <a:p>
+                      <a:r>
+                        <a:rPr lang="en-US" dirty="0" smtClean="0"/>
+                        <a:t>Common uses</a:t>
+                      </a:r>
+                      <a:endParaRPr lang="en-US" dirty="0"/>
+                    </a:p>
+                  </a:txBody>
+                  <a:tcPr/>
+                </a:tc>
+              </a:tr>
+              <a:tr h="370840">
+                <a:tc>
+                  <a:txBody>
+                    <a:bodyPr/>
+                    <a:lstStyle/>
+                    <a:p>
+                      <a:r>
+                        <a:rPr lang="en-US" dirty="0" smtClean="0"/>
+                        <a:t>Colon-separated (hexadecimal)</a:t>
+                      </a:r>
+                      <a:endParaRPr lang="en-US" dirty="0"/>
+                    </a:p>
+                  </a:txBody>
+                  <a:tcPr/>
+                </a:tc>
+                <a:tc>
+                  <a:txBody>
+                    <a:bodyPr/>
+                    <a:lstStyle/>
+                    <a:p>
+                      <a:pPr marL="0" marR="0" lvl="1" indent="0" algn="l" defTabSz="457200" rtl="0" eaLnBrk="1" fontAlgn="auto" latinLnBrk="0" hangingPunct="1">
+                        <a:lnSpc>
+                          <a:spcPct val="100000"/>
+                        </a:lnSpc>
+                        <a:spcBef>
+                          <a:spcPts val="0"/>
+                        </a:spcBef>
+                        <a:spcAft>
+                          <a:spcPts val="0"/>
+                        </a:spcAft>
+                        <a:buClrTx/>
+                        <a:buSzTx/>
+                        <a:buFontTx/>
+                        <a:buNone/>
+                        <a:tabLst/>
+                        <a:defRPr/>
+                      </a:pPr>
+                      <a:r>
+                        <a:rPr lang="en-US" dirty="0" smtClean="0"/>
+                        <a:t>000001c0:0000006b:0005</a:t>
+                      </a:r>
+                    </a:p>
+                    <a:p>
+                      <a:endParaRPr lang="en-US" dirty="0"/>
+                    </a:p>
+                  </a:txBody>
+                  <a:tcPr/>
+                </a:tc>
+                <a:tc>
+                  <a:txBody>
+                    <a:bodyPr/>
+                    <a:lstStyle/>
+                    <a:p>
+                      <a:r>
+                        <a:rPr lang="en-US" dirty="0" smtClean="0"/>
+                        <a:t>Log management</a:t>
+                      </a:r>
+                      <a:endParaRPr lang="en-US" dirty="0"/>
+                    </a:p>
+                  </a:txBody>
+                  <a:tcPr/>
+                </a:tc>
+              </a:tr>
+              <a:tr h="370840">
+                <a:tc>
+                  <a:txBody>
+                    <a:bodyPr/>
+                    <a:lstStyle/>
+                    <a:p>
+                      <a:r>
+                        <a:rPr lang="en-US" dirty="0" smtClean="0"/>
+                        <a:t>Hexadecimal</a:t>
+                      </a:r>
+                      <a:endParaRPr lang="en-US" dirty="0"/>
+                    </a:p>
+                  </a:txBody>
+                  <a:tcPr/>
+                </a:tc>
+                <a:tc>
+                  <a:txBody>
+                    <a:bodyPr/>
+                    <a:lstStyle/>
+                    <a:p>
+                      <a:pPr marL="0" marR="0" lvl="1" indent="0" algn="l" defTabSz="457200" rtl="0" eaLnBrk="1" fontAlgn="auto" latinLnBrk="0" hangingPunct="1">
+                        <a:lnSpc>
+                          <a:spcPct val="100000"/>
+                        </a:lnSpc>
+                        <a:spcBef>
+                          <a:spcPts val="0"/>
+                        </a:spcBef>
+                        <a:spcAft>
+                          <a:spcPts val="0"/>
+                        </a:spcAft>
+                        <a:buClrTx/>
+                        <a:buSzTx/>
+                        <a:buFontTx/>
+                        <a:buNone/>
+                        <a:tabLst/>
+                        <a:defRPr/>
+                      </a:pPr>
+                      <a:r>
+                        <a:rPr lang="en-US" sz="1800" kern="1200" dirty="0" smtClean="0">
+                          <a:solidFill>
+                            <a:schemeClr val="dk1"/>
+                          </a:solidFill>
+                          <a:latin typeface="+mn-lt"/>
+                          <a:ea typeface="+mn-ea"/>
+                          <a:cs typeface="+mn-cs"/>
+                        </a:rPr>
+                        <a:t>0x000001c00000006b0005</a:t>
+                      </a:r>
+                      <a:endParaRPr lang="en-US" dirty="0" smtClean="0"/>
+                    </a:p>
+                  </a:txBody>
+                  <a:tcPr/>
+                </a:tc>
+                <a:tc>
+                  <a:txBody>
+                    <a:bodyPr/>
+                    <a:lstStyle/>
+                    <a:p>
+                      <a:r>
+                        <a:rPr lang="en-US" dirty="0" smtClean="0"/>
+                        <a:t>Change data capture</a:t>
+                      </a:r>
+                      <a:endParaRPr lang="en-US" dirty="0"/>
+                    </a:p>
+                  </a:txBody>
+                  <a:tcPr/>
+                </a:tc>
+              </a:tr>
+              <a:tr h="370840">
+                <a:tc>
+                  <a:txBody>
+                    <a:bodyPr/>
+                    <a:lstStyle/>
+                    <a:p>
+                      <a:r>
+                        <a:rPr lang="en-US" dirty="0" smtClean="0"/>
+                        <a:t>Decimal</a:t>
+                      </a:r>
+                      <a:endParaRPr lang="en-US" dirty="0"/>
+                    </a:p>
+                  </a:txBody>
+                  <a:tcPr/>
+                </a:tc>
+                <a:tc>
+                  <a:txBody>
+                    <a:bodyPr/>
+                    <a:lstStyle/>
+                    <a:p>
+                      <a:r>
+                        <a:rPr lang="en-US" dirty="0" smtClean="0"/>
+                        <a:t>448000000010700005</a:t>
+                      </a:r>
+                      <a:endParaRPr lang="en-US" dirty="0"/>
+                    </a:p>
+                  </a:txBody>
+                  <a:tcPr/>
+                </a:tc>
+                <a:tc>
+                  <a:txBody>
+                    <a:bodyPr/>
+                    <a:lstStyle/>
+                    <a:p>
+                      <a:r>
+                        <a:rPr lang="en-US" dirty="0" smtClean="0"/>
+                        <a:t>Backup</a:t>
+                      </a:r>
+                      <a:endParaRPr lang="en-US" dirty="0"/>
+                    </a:p>
+                  </a:txBody>
+                  <a:tcPr/>
+                </a:tc>
+              </a:tr>
+            </a:tbl>
+          </a:graphicData>
+        </a:graphic>
+      </p:graphicFrame>
+      <p:sp>
+        <p:nvSpPr>
+          <p:cNvPr id="5" name="Content Placeholder 2"/>
+          <p:cNvSpPr txBox="1">
+            <a:spLocks/>
+          </p:cNvSpPr>
+          <p:nvPr/>
+        </p:nvSpPr>
+        <p:spPr>
+          <a:xfrm>
+            <a:off x="457200" y="4284821"/>
+            <a:ext cx="8229600" cy="628650"/>
+          </a:xfrm>
+          <a:prstGeom prst="rect">
+            <a:avLst/>
+          </a:prstGeom>
+        </p:spPr>
+        <p:txBody>
+          <a:bodyPr vert="horz" lIns="91440" tIns="45720" rIns="91440" bIns="45720" rtlCol="0">
+            <a:normAutofit/>
+          </a:bodyPr>
+          <a:lstStyle>
+            <a:lvl1pPr marL="342900" indent="-342900" algn="l" defTabSz="457200" rtl="0" eaLnBrk="1" latinLnBrk="0" hangingPunct="1">
+              <a:spcBef>
+                <a:spcPct val="20000"/>
+              </a:spcBef>
+              <a:buFont typeface="Wingdings" charset="2"/>
+              <a:buChar char="§"/>
+              <a:defRPr sz="3000" kern="1200">
+                <a:solidFill>
+                  <a:schemeClr val="tx2"/>
+                </a:solidFill>
+                <a:latin typeface="+mn-lt"/>
+                <a:ea typeface="+mn-ea"/>
+                <a:cs typeface="+mn-cs"/>
+              </a:defRPr>
+            </a:lvl1pPr>
+            <a:lvl2pPr marL="742950" indent="-285750" algn="l" defTabSz="457200" rtl="0" eaLnBrk="1" latinLnBrk="0" hangingPunct="1">
+              <a:spcBef>
+                <a:spcPct val="20000"/>
+              </a:spcBef>
+              <a:buFont typeface="Wingdings" charset="2"/>
+              <a:buChar char="§"/>
+              <a:defRPr sz="2600" kern="1200">
+                <a:solidFill>
+                  <a:srgbClr val="474947"/>
+                </a:solidFill>
+                <a:latin typeface="+mn-lt"/>
+                <a:ea typeface="+mn-ea"/>
+                <a:cs typeface="+mn-cs"/>
+              </a:defRPr>
+            </a:lvl2pPr>
+            <a:lvl3pPr marL="1143000" indent="-228600" algn="l" defTabSz="457200" rtl="0" eaLnBrk="1" latinLnBrk="0" hangingPunct="1">
+              <a:spcBef>
+                <a:spcPct val="20000"/>
+              </a:spcBef>
+              <a:buFont typeface="Wingdings" charset="2"/>
+              <a:buChar char="§"/>
+              <a:defRPr sz="2200" kern="1200">
+                <a:solidFill>
+                  <a:srgbClr val="474947"/>
+                </a:solidFill>
+                <a:latin typeface="+mn-lt"/>
+                <a:ea typeface="+mn-ea"/>
+                <a:cs typeface="+mn-cs"/>
+              </a:defRPr>
+            </a:lvl3pPr>
+            <a:lvl4pPr marL="1600200" indent="-228600" algn="l" defTabSz="457200" rtl="0" eaLnBrk="1" latinLnBrk="0" hangingPunct="1">
+              <a:spcBef>
+                <a:spcPct val="20000"/>
+              </a:spcBef>
+              <a:buFont typeface="Wingdings" charset="2"/>
+              <a:buChar char="§"/>
+              <a:defRPr sz="2000" kern="1200">
+                <a:solidFill>
+                  <a:srgbClr val="474947"/>
+                </a:solidFill>
+                <a:latin typeface="+mn-lt"/>
+                <a:ea typeface="+mn-ea"/>
+                <a:cs typeface="+mn-cs"/>
+              </a:defRPr>
+            </a:lvl4pPr>
+            <a:lvl5pPr marL="2057400" indent="-228600" algn="l" defTabSz="457200" rtl="0" eaLnBrk="1" latinLnBrk="0" hangingPunct="1">
+              <a:spcBef>
+                <a:spcPct val="20000"/>
+              </a:spcBef>
+              <a:buFont typeface="Wingdings" charset="2"/>
+              <a:buChar char="§"/>
+              <a:defRPr sz="1800" kern="1200">
+                <a:solidFill>
+                  <a:srgbClr val="474947"/>
+                </a:solidFill>
+                <a:latin typeface="+mn-lt"/>
+                <a:ea typeface="+mn-ea"/>
+                <a:cs typeface="+mn-cs"/>
+              </a:defRPr>
+            </a:lvl5pPr>
+            <a:lvl6pPr marL="2514600" indent="-228600" algn="l" defTabSz="457200" rtl="0" eaLnBrk="1" latinLnBrk="0" hangingPunct="1">
+              <a:spcBef>
+                <a:spcPct val="20000"/>
+              </a:spcBef>
+              <a:buFont typeface="Arial"/>
+              <a:buChar char="•"/>
+              <a:defRPr sz="2000" kern="1200">
+                <a:solidFill>
+                  <a:schemeClr val="tx1"/>
+                </a:solidFill>
+                <a:latin typeface="+mn-lt"/>
+                <a:ea typeface="+mn-ea"/>
+                <a:cs typeface="+mn-cs"/>
+              </a:defRPr>
+            </a:lvl6pPr>
+            <a:lvl7pPr marL="2971800" indent="-228600" algn="l" defTabSz="457200" rtl="0" eaLnBrk="1" latinLnBrk="0" hangingPunct="1">
+              <a:spcBef>
+                <a:spcPct val="20000"/>
+              </a:spcBef>
+              <a:buFont typeface="Arial"/>
+              <a:buChar char="•"/>
+              <a:defRPr sz="2000" kern="1200">
+                <a:solidFill>
+                  <a:schemeClr val="tx1"/>
+                </a:solidFill>
+                <a:latin typeface="+mn-lt"/>
+                <a:ea typeface="+mn-ea"/>
+                <a:cs typeface="+mn-cs"/>
+              </a:defRPr>
+            </a:lvl7pPr>
+            <a:lvl8pPr marL="3429000" indent="-228600" algn="l" defTabSz="457200" rtl="0" eaLnBrk="1" latinLnBrk="0" hangingPunct="1">
+              <a:spcBef>
+                <a:spcPct val="20000"/>
+              </a:spcBef>
+              <a:buFont typeface="Arial"/>
+              <a:buChar char="•"/>
+              <a:defRPr sz="2000" kern="1200">
+                <a:solidFill>
+                  <a:schemeClr val="tx1"/>
+                </a:solidFill>
+                <a:latin typeface="+mn-lt"/>
+                <a:ea typeface="+mn-ea"/>
+                <a:cs typeface="+mn-cs"/>
+              </a:defRPr>
+            </a:lvl8pPr>
+            <a:lvl9pPr marL="3886200" indent="-228600" algn="l" defTabSz="457200" rtl="0" eaLnBrk="1" latinLnBrk="0" hangingPunct="1">
+              <a:spcBef>
+                <a:spcPct val="20000"/>
+              </a:spcBef>
+              <a:buFont typeface="Arial"/>
+              <a:buChar char="•"/>
+              <a:defRPr sz="2000" kern="1200">
+                <a:solidFill>
+                  <a:schemeClr val="tx1"/>
+                </a:solidFill>
+                <a:latin typeface="+mn-lt"/>
+                <a:ea typeface="+mn-ea"/>
+                <a:cs typeface="+mn-cs"/>
+              </a:defRPr>
+            </a:lvl9pPr>
+          </a:lstStyle>
+          <a:p>
+            <a:pPr marL="0" indent="0">
+              <a:buFont typeface="Wingdings" charset="2"/>
+              <a:buNone/>
+            </a:pPr>
+            <a:r>
+              <a:rPr lang="en-US" dirty="0" smtClean="0"/>
+              <a:t>These three LSNs are equivalent</a:t>
+            </a:r>
+          </a:p>
+        </p:txBody>
+      </p:sp>
+    </p:spTree>
+    <p:extLst>
+      <p:ext uri="{BB962C8B-B14F-4D97-AF65-F5344CB8AC3E}">
+        <p14:creationId xmlns:p14="http://schemas.microsoft.com/office/powerpoint/2010/main" val="2618731270"/>
+      </p:ext>
+    </p:extLst>
+  </p:cSld>
+  <p:clrMapOvr>
+    <a:masterClrMapping/>
+  </p:clrMapOvr>
+</p:sld>
+</file>
+
+<file path=ppt/slides/slide22.xml><?xml version="1.0" encoding="utf-8"?>
+<p:sld xmlns:a="http://schemas.openxmlformats.org/drawingml/2006/main" xmlns:r="http://schemas.openxmlformats.org/officeDocument/2006/relationships" xmlns:p="http://schemas.openxmlformats.org/presentationml/2006/main">
+  <p:cSld>
+    <p:spTree>
+      <p:nvGrpSpPr>
+        <p:cNvPr id="1" name=""/>
+        <p:cNvGrpSpPr/>
+        <p:nvPr/>
+      </p:nvGrpSpPr>
+      <p:grpSpPr>
+        <a:xfrm>
+          <a:off x="0" y="0"/>
+          <a:ext cx="0" cy="0"/>
+          <a:chOff x="0" y="0"/>
+          <a:chExt cx="0" cy="0"/>
+        </a:xfrm>
+      </p:grpSpPr>
+      <p:sp>
+        <p:nvSpPr>
+          <p:cNvPr id="2" name="Title 1"/>
+          <p:cNvSpPr>
+            <a:spLocks noGrp="1"/>
+          </p:cNvSpPr>
+          <p:nvPr>
+            <p:ph type="title"/>
+          </p:nvPr>
+        </p:nvSpPr>
+        <p:spPr/>
+        <p:txBody>
+          <a:bodyPr/>
+          <a:lstStyle/>
+          <a:p>
+            <a:r>
+              <a:rPr lang="en-US" dirty="0" smtClean="0"/>
+              <a:t>DBCC LOGINFO(‘</a:t>
+            </a:r>
+            <a:r>
+              <a:rPr lang="en-US" dirty="0" err="1" smtClean="0"/>
+              <a:t>db_name</a:t>
+            </a:r>
+            <a:r>
+              <a:rPr lang="en-US" dirty="0" smtClean="0"/>
+              <a:t>’)</a:t>
+            </a:r>
+            <a:endParaRPr lang="en-US" dirty="0"/>
+          </a:p>
+        </p:txBody>
+      </p:sp>
+      <p:sp>
+        <p:nvSpPr>
+          <p:cNvPr id="3" name="Content Placeholder 2"/>
+          <p:cNvSpPr>
+            <a:spLocks noGrp="1"/>
+          </p:cNvSpPr>
+          <p:nvPr>
+            <p:ph idx="1"/>
+          </p:nvPr>
+        </p:nvSpPr>
+        <p:spPr>
+          <a:xfrm>
+            <a:off x="457200" y="1408113"/>
+            <a:ext cx="8229600" cy="676275"/>
+          </a:xfrm>
+        </p:spPr>
+        <p:txBody>
+          <a:bodyPr/>
+          <a:lstStyle/>
+          <a:p>
+            <a:pPr marL="0" indent="0">
+              <a:buNone/>
+            </a:pPr>
+            <a:r>
+              <a:rPr lang="en-US" dirty="0" smtClean="0"/>
+              <a:t>Returns one row per VLF</a:t>
+            </a:r>
+            <a:endParaRPr lang="en-US" dirty="0"/>
+          </a:p>
+        </p:txBody>
+      </p:sp>
+      <p:pic>
+        <p:nvPicPr>
+          <p:cNvPr id="5" name="Picture 4"/>
+          <p:cNvPicPr>
+            <a:picLocks noChangeAspect="1"/>
+          </p:cNvPicPr>
+          <p:nvPr/>
+        </p:nvPicPr>
+        <p:blipFill>
+          <a:blip r:embed="rId2"/>
+          <a:stretch>
+            <a:fillRect/>
+          </a:stretch>
+        </p:blipFill>
+        <p:spPr>
+          <a:xfrm>
+            <a:off x="457200" y="2084388"/>
+            <a:ext cx="8067675" cy="3634087"/>
+          </a:xfrm>
+          <a:prstGeom prst="rect">
+            <a:avLst/>
+          </a:prstGeom>
+        </p:spPr>
+      </p:pic>
+    </p:spTree>
+    <p:extLst>
+      <p:ext uri="{BB962C8B-B14F-4D97-AF65-F5344CB8AC3E}">
+        <p14:creationId xmlns:p14="http://schemas.microsoft.com/office/powerpoint/2010/main" val="3403567972"/>
+      </p:ext>
+    </p:extLst>
+  </p:cSld>
+  <p:clrMapOvr>
+    <a:masterClrMapping/>
+  </p:clrMapOvr>
+</p:sld>
+</file>
+
+<file path=ppt/slides/slide23.xml><?xml version="1.0" encoding="utf-8"?>
+<p:sld xmlns:a="http://schemas.openxmlformats.org/drawingml/2006/main" xmlns:r="http://schemas.openxmlformats.org/officeDocument/2006/relationships" xmlns:p="http://schemas.openxmlformats.org/presentationml/2006/main">
+  <p:cSld>
+    <p:spTree>
+      <p:nvGrpSpPr>
+        <p:cNvPr id="1" name=""/>
+        <p:cNvGrpSpPr/>
+        <p:nvPr/>
+      </p:nvGrpSpPr>
+      <p:grpSpPr>
+        <a:xfrm>
+          <a:off x="0" y="0"/>
+          <a:ext cx="0" cy="0"/>
+          <a:chOff x="0" y="0"/>
+          <a:chExt cx="0" cy="0"/>
+        </a:xfrm>
+      </p:grpSpPr>
+      <p:sp>
+        <p:nvSpPr>
+          <p:cNvPr id="2" name="Title 1"/>
+          <p:cNvSpPr>
+            <a:spLocks noGrp="1"/>
+          </p:cNvSpPr>
+          <p:nvPr>
+            <p:ph type="title"/>
+          </p:nvPr>
+        </p:nvSpPr>
+        <p:spPr/>
+        <p:txBody>
+          <a:bodyPr/>
+          <a:lstStyle/>
+          <a:p>
+            <a:r>
+              <a:rPr lang="en-US" dirty="0" err="1" smtClean="0"/>
+              <a:t>fn_dblog</a:t>
+            </a:r>
+            <a:r>
+              <a:rPr lang="en-US" dirty="0" smtClean="0"/>
+              <a:t>(</a:t>
+            </a:r>
+            <a:r>
+              <a:rPr lang="en-US" dirty="0" err="1" smtClean="0"/>
+              <a:t>start_lsn</a:t>
+            </a:r>
+            <a:r>
+              <a:rPr lang="en-US" dirty="0" smtClean="0"/>
+              <a:t>, </a:t>
+            </a:r>
+            <a:r>
+              <a:rPr lang="en-US" dirty="0" err="1" smtClean="0"/>
+              <a:t>end_lsn</a:t>
+            </a:r>
+            <a:r>
+              <a:rPr lang="en-US" dirty="0" smtClean="0"/>
+              <a:t>)</a:t>
+            </a:r>
+            <a:endParaRPr lang="en-US" dirty="0"/>
+          </a:p>
+        </p:txBody>
+      </p:sp>
+      <p:sp>
+        <p:nvSpPr>
+          <p:cNvPr id="3" name="Content Placeholder 2"/>
+          <p:cNvSpPr>
+            <a:spLocks noGrp="1"/>
+          </p:cNvSpPr>
+          <p:nvPr>
+            <p:ph idx="1"/>
+          </p:nvPr>
+        </p:nvSpPr>
+        <p:spPr>
+          <a:xfrm>
+            <a:off x="457200" y="1397001"/>
+            <a:ext cx="8229600" cy="704850"/>
+          </a:xfrm>
+        </p:spPr>
+        <p:txBody>
+          <a:bodyPr/>
+          <a:lstStyle/>
+          <a:p>
+            <a:pPr marL="0" indent="0">
+              <a:buNone/>
+            </a:pPr>
+            <a:r>
+              <a:rPr lang="en-US" dirty="0" smtClean="0"/>
+              <a:t>Returns one row per log record</a:t>
+            </a:r>
+            <a:endParaRPr lang="en-US" dirty="0"/>
+          </a:p>
+        </p:txBody>
+      </p:sp>
+      <p:pic>
+        <p:nvPicPr>
+          <p:cNvPr id="4" name="Picture 3"/>
+          <p:cNvPicPr>
+            <a:picLocks noChangeAspect="1"/>
+          </p:cNvPicPr>
+          <p:nvPr/>
+        </p:nvPicPr>
+        <p:blipFill>
+          <a:blip r:embed="rId2"/>
+          <a:stretch>
+            <a:fillRect/>
+          </a:stretch>
+        </p:blipFill>
+        <p:spPr>
+          <a:xfrm>
+            <a:off x="457200" y="2025651"/>
+            <a:ext cx="7962900" cy="4032860"/>
+          </a:xfrm>
+          <a:prstGeom prst="rect">
+            <a:avLst/>
+          </a:prstGeom>
+        </p:spPr>
+      </p:pic>
+    </p:spTree>
+    <p:extLst>
+      <p:ext uri="{BB962C8B-B14F-4D97-AF65-F5344CB8AC3E}">
+        <p14:creationId xmlns:p14="http://schemas.microsoft.com/office/powerpoint/2010/main" val="2370315233"/>
+      </p:ext>
+    </p:extLst>
+  </p:cSld>
+  <p:clrMapOvr>
+    <a:masterClrMapping/>
+  </p:clrMapOvr>
+</p:sld>
+</file>
+
+<file path=ppt/slides/slide24.xml><?xml version="1.0" encoding="utf-8"?>
+<p:sld xmlns:a="http://schemas.openxmlformats.org/drawingml/2006/main" xmlns:r="http://schemas.openxmlformats.org/officeDocument/2006/relationships" xmlns:p="http://schemas.openxmlformats.org/presentationml/2006/main">
+  <p:cSld>
+    <p:spTree>
+      <p:nvGrpSpPr>
+        <p:cNvPr id="1" name=""/>
+        <p:cNvGrpSpPr/>
+        <p:nvPr/>
+      </p:nvGrpSpPr>
+      <p:grpSpPr>
+        <a:xfrm>
+          <a:off x="0" y="0"/>
+          <a:ext cx="0" cy="0"/>
+          <a:chOff x="0" y="0"/>
+          <a:chExt cx="0" cy="0"/>
+        </a:xfrm>
+      </p:grpSpPr>
+      <p:sp>
+        <p:nvSpPr>
+          <p:cNvPr id="2" name="Title 1"/>
+          <p:cNvSpPr>
+            <a:spLocks noGrp="1"/>
+          </p:cNvSpPr>
+          <p:nvPr>
+            <p:ph type="title"/>
+          </p:nvPr>
+        </p:nvSpPr>
+        <p:spPr/>
+        <p:txBody>
+          <a:bodyPr/>
+          <a:lstStyle/>
+          <a:p>
+            <a:r>
+              <a:rPr lang="en-US" dirty="0" smtClean="0"/>
+              <a:t>Related commands/function</a:t>
+            </a:r>
+            <a:endParaRPr lang="en-US" dirty="0"/>
+          </a:p>
+        </p:txBody>
+      </p:sp>
+      <p:sp>
+        <p:nvSpPr>
+          <p:cNvPr id="3" name="Content Placeholder 2"/>
+          <p:cNvSpPr>
+            <a:spLocks noGrp="1"/>
+          </p:cNvSpPr>
+          <p:nvPr>
+            <p:ph idx="1"/>
+          </p:nvPr>
+        </p:nvSpPr>
+        <p:spPr/>
+        <p:txBody>
+          <a:bodyPr/>
+          <a:lstStyle/>
+          <a:p>
+            <a:r>
+              <a:rPr lang="en-US" dirty="0" smtClean="0"/>
+              <a:t>DBCC SQLPERF(LOGSPACE)</a:t>
+            </a:r>
+          </a:p>
+          <a:p>
+            <a:pPr lvl="1"/>
+            <a:r>
+              <a:rPr lang="en-US" dirty="0" smtClean="0"/>
+              <a:t>Log size, percent used per database</a:t>
+            </a:r>
+          </a:p>
+          <a:p>
+            <a:r>
+              <a:rPr lang="en-US" dirty="0" err="1" smtClean="0"/>
+              <a:t>fn_dump_dblog</a:t>
+            </a:r>
+            <a:endParaRPr lang="en-US" dirty="0" smtClean="0"/>
+          </a:p>
+          <a:p>
+            <a:pPr lvl="1"/>
+            <a:r>
+              <a:rPr lang="en-US" dirty="0" smtClean="0"/>
+              <a:t>Similar to </a:t>
+            </a:r>
+            <a:r>
+              <a:rPr lang="en-US" dirty="0" err="1" smtClean="0"/>
+              <a:t>fn_dblog</a:t>
+            </a:r>
+            <a:r>
+              <a:rPr lang="en-US" dirty="0" smtClean="0"/>
+              <a:t>, but reads </a:t>
+            </a:r>
+            <a:r>
+              <a:rPr lang="en-US" smtClean="0"/>
+              <a:t>from backup file</a:t>
+            </a:r>
+            <a:endParaRPr lang="en-US" dirty="0"/>
+          </a:p>
+        </p:txBody>
+      </p:sp>
+    </p:spTree>
+    <p:extLst>
+      <p:ext uri="{BB962C8B-B14F-4D97-AF65-F5344CB8AC3E}">
+        <p14:creationId xmlns:p14="http://schemas.microsoft.com/office/powerpoint/2010/main" val="961231621"/>
       </p:ext>
     </p:extLst>
   </p:cSld>
@@ -7342,9 +8447,14 @@
               <a:t>tempdb</a:t>
             </a:r>
             <a:r>
-              <a:rPr lang="en-US" dirty="0"/>
-              <a:t> objects</a:t>
-            </a:r>
+              <a:rPr lang="en-US"/>
+              <a:t> </a:t>
+            </a:r>
+            <a:r>
+              <a:rPr lang="en-US" smtClean="0"/>
+              <a:t>operations</a:t>
+            </a:r>
+            <a:endParaRPr lang="en-US" dirty="0"/>
           </a:p>
         </p:txBody>
       </p:sp>

</xml_diff>

<commit_message>
Checkpoints, flushing the log, clearing the log.
</commit_message>
<xml_diff>
--- a/TransactionLog.pptx
+++ b/TransactionLog.pptx
@@ -5,7 +5,7 @@
     <p:sldMasterId id="2147483648" r:id="rId1"/>
   </p:sldMasterIdLst>
   <p:notesMasterIdLst>
-    <p:notesMasterId r:id="rId27"/>
+    <p:notesMasterId r:id="rId30"/>
   </p:notesMasterIdLst>
   <p:sldIdLst>
     <p:sldId id="328" r:id="rId2"/>
@@ -32,7 +32,10 @@
     <p:sldId id="349" r:id="rId23"/>
     <p:sldId id="350" r:id="rId24"/>
     <p:sldId id="351" r:id="rId25"/>
-    <p:sldId id="352" r:id="rId26"/>
+    <p:sldId id="354" r:id="rId26"/>
+    <p:sldId id="353" r:id="rId27"/>
+    <p:sldId id="352" r:id="rId28"/>
+    <p:sldId id="355" r:id="rId29"/>
   </p:sldIdLst>
   <p:sldSz cx="9144000" cy="6858000" type="screen4x3"/>
   <p:notesSz cx="6858000" cy="9144000"/>
@@ -232,7 +235,7 @@
           <a:p>
             <a:fld id="{2EDCB34D-5EC2-4739-9693-E425457AC201}" type="datetimeFigureOut">
               <a:rPr lang="en-US" smtClean="0"/>
-              <a:t>8/5/2016</a:t>
+              <a:t>8/8/2016</a:t>
             </a:fld>
             <a:endParaRPr lang="en-US"/>
           </a:p>
@@ -818,7 +821,7 @@
             <a:fld id="{5942B21B-2ADA-A040-A652-A7305E1B99FE}" type="datetimeFigureOut">
               <a:rPr lang="en-US" smtClean="0"/>
               <a:pPr/>
-              <a:t>8/5/2016</a:t>
+              <a:t>8/8/2016</a:t>
             </a:fld>
             <a:endParaRPr lang="en-US" dirty="0"/>
           </a:p>
@@ -1008,7 +1011,7 @@
           <a:p>
             <a:fld id="{5942B21B-2ADA-A040-A652-A7305E1B99FE}" type="datetimeFigureOut">
               <a:rPr lang="en-US" smtClean="0"/>
-              <a:t>8/5/2016</a:t>
+              <a:t>8/8/2016</a:t>
             </a:fld>
             <a:endParaRPr lang="en-US"/>
           </a:p>
@@ -1132,7 +1135,7 @@
             <a:fld id="{5942B21B-2ADA-A040-A652-A7305E1B99FE}" type="datetimeFigureOut">
               <a:rPr lang="en-US" smtClean="0"/>
               <a:pPr/>
-              <a:t>8/5/2016</a:t>
+              <a:t>8/8/2016</a:t>
             </a:fld>
             <a:r>
               <a:rPr lang="en-US"/>
@@ -1403,7 +1406,7 @@
             <a:fld id="{5942B21B-2ADA-A040-A652-A7305E1B99FE}" type="datetimeFigureOut">
               <a:rPr lang="en-US" smtClean="0"/>
               <a:pPr/>
-              <a:t>8/5/2016</a:t>
+              <a:t>8/8/2016</a:t>
             </a:fld>
             <a:r>
               <a:rPr lang="en-US" dirty="0"/>
@@ -1673,7 +1676,7 @@
             <a:fld id="{5942B21B-2ADA-A040-A652-A7305E1B99FE}" type="datetimeFigureOut">
               <a:rPr lang="en-US" smtClean="0"/>
               <a:pPr/>
-              <a:t>8/5/2016</a:t>
+              <a:t>8/8/2016</a:t>
             </a:fld>
             <a:r>
               <a:rPr lang="en-US" dirty="0"/>
@@ -2013,7 +2016,7 @@
             <a:fld id="{5942B21B-2ADA-A040-A652-A7305E1B99FE}" type="datetimeFigureOut">
               <a:rPr lang="en-US" smtClean="0"/>
               <a:pPr/>
-              <a:t>8/5/2016</a:t>
+              <a:t>8/8/2016</a:t>
             </a:fld>
             <a:r>
               <a:rPr lang="en-US" dirty="0"/>
@@ -2354,7 +2357,7 @@
             <a:fld id="{5942B21B-2ADA-A040-A652-A7305E1B99FE}" type="datetimeFigureOut">
               <a:rPr lang="en-US" smtClean="0"/>
               <a:pPr/>
-              <a:t>8/5/2016</a:t>
+              <a:t>8/8/2016</a:t>
             </a:fld>
             <a:r>
               <a:rPr lang="en-US" dirty="0"/>
@@ -2869,7 +2872,7 @@
             <a:fld id="{5942B21B-2ADA-A040-A652-A7305E1B99FE}" type="datetimeFigureOut">
               <a:rPr lang="en-US" smtClean="0"/>
               <a:pPr/>
-              <a:t>8/5/2016</a:t>
+              <a:t>8/8/2016</a:t>
             </a:fld>
             <a:r>
               <a:rPr lang="en-US" dirty="0"/>
@@ -3078,7 +3081,7 @@
             <a:fld id="{5942B21B-2ADA-A040-A652-A7305E1B99FE}" type="datetimeFigureOut">
               <a:rPr lang="en-US" smtClean="0"/>
               <a:pPr/>
-              <a:t>8/5/2016</a:t>
+              <a:t>8/8/2016</a:t>
             </a:fld>
             <a:r>
               <a:rPr lang="en-US" dirty="0"/>
@@ -3265,7 +3268,7 @@
             <a:fld id="{5942B21B-2ADA-A040-A652-A7305E1B99FE}" type="datetimeFigureOut">
               <a:rPr lang="en-US" smtClean="0"/>
               <a:pPr/>
-              <a:t>8/5/2016</a:t>
+              <a:t>8/8/2016</a:t>
             </a:fld>
             <a:r>
               <a:rPr lang="en-US" dirty="0"/>
@@ -3596,7 +3599,7 @@
             <a:fld id="{5942B21B-2ADA-A040-A652-A7305E1B99FE}" type="datetimeFigureOut">
               <a:rPr lang="en-US" smtClean="0"/>
               <a:pPr/>
-              <a:t>8/5/2016</a:t>
+              <a:t>8/8/2016</a:t>
             </a:fld>
             <a:r>
               <a:rPr lang="en-US" dirty="0"/>
@@ -3904,7 +3907,7 @@
             <a:fld id="{5942B21B-2ADA-A040-A652-A7305E1B99FE}" type="datetimeFigureOut">
               <a:rPr lang="en-US" smtClean="0"/>
               <a:pPr/>
-              <a:t>8/5/2016</a:t>
+              <a:t>8/8/2016</a:t>
             </a:fld>
             <a:r>
               <a:rPr lang="en-US" dirty="0"/>
@@ -4183,7 +4186,7 @@
             <a:fld id="{5942B21B-2ADA-A040-A652-A7305E1B99FE}" type="datetimeFigureOut">
               <a:rPr lang="en-US" smtClean="0"/>
               <a:pPr/>
-              <a:t>8/5/2016</a:t>
+              <a:t>8/8/2016</a:t>
             </a:fld>
             <a:r>
               <a:rPr lang="en-US" dirty="0"/>
@@ -8123,6 +8126,235 @@
           <a:p>
             <a:r>
               <a:rPr lang="en-US" dirty="0"/>
+              <a:t>Checkpoint</a:t>
+            </a:r>
+          </a:p>
+        </p:txBody>
+      </p:sp>
+      <p:sp>
+        <p:nvSpPr>
+          <p:cNvPr id="3" name="Content Placeholder 2"/>
+          <p:cNvSpPr>
+            <a:spLocks noGrp="1"/>
+          </p:cNvSpPr>
+          <p:nvPr>
+            <p:ph idx="1"/>
+          </p:nvPr>
+        </p:nvSpPr>
+        <p:spPr/>
+        <p:txBody>
+          <a:bodyPr/>
+          <a:lstStyle/>
+          <a:p>
+            <a:r>
+              <a:rPr lang="en-US" dirty="0"/>
+              <a:t>Process of writing dirty pages from the buffer pool to disk</a:t>
+            </a:r>
+          </a:p>
+          <a:p>
+            <a:pPr lvl="1"/>
+            <a:r>
+              <a:rPr lang="en-US" dirty="0"/>
+              <a:t>Irrespective of transaction completion</a:t>
+            </a:r>
+          </a:p>
+          <a:p>
+            <a:r>
+              <a:rPr lang="en-US" dirty="0"/>
+              <a:t>Triggers</a:t>
+            </a:r>
+          </a:p>
+          <a:p>
+            <a:pPr lvl="1"/>
+            <a:r>
+              <a:rPr lang="en-US" dirty="0"/>
+              <a:t>Automatic</a:t>
+            </a:r>
+          </a:p>
+          <a:p>
+            <a:pPr lvl="1"/>
+            <a:r>
+              <a:rPr lang="en-US" dirty="0"/>
+              <a:t>Indirect</a:t>
+            </a:r>
+          </a:p>
+          <a:p>
+            <a:pPr lvl="1"/>
+            <a:r>
+              <a:rPr lang="en-US" dirty="0"/>
+              <a:t>Internal</a:t>
+            </a:r>
+          </a:p>
+          <a:p>
+            <a:pPr lvl="1"/>
+            <a:r>
+              <a:rPr lang="en-US" dirty="0"/>
+              <a:t>Manual</a:t>
+            </a:r>
+          </a:p>
+          <a:p>
+            <a:pPr marL="0" indent="0">
+              <a:buNone/>
+            </a:pPr>
+            <a:endParaRPr lang="en-US" dirty="0"/>
+          </a:p>
+        </p:txBody>
+      </p:sp>
+    </p:spTree>
+    <p:extLst>
+      <p:ext uri="{BB962C8B-B14F-4D97-AF65-F5344CB8AC3E}">
+        <p14:creationId xmlns:p14="http://schemas.microsoft.com/office/powerpoint/2010/main" val="998445908"/>
+      </p:ext>
+    </p:extLst>
+  </p:cSld>
+  <p:clrMapOvr>
+    <a:masterClrMapping/>
+  </p:clrMapOvr>
+</p:sld>
+</file>
+
+<file path=ppt/slides/slide26.xml><?xml version="1.0" encoding="utf-8"?>
+<p:sld xmlns:a="http://schemas.openxmlformats.org/drawingml/2006/main" xmlns:r="http://schemas.openxmlformats.org/officeDocument/2006/relationships" xmlns:p="http://schemas.openxmlformats.org/presentationml/2006/main">
+  <p:cSld>
+    <p:spTree>
+      <p:nvGrpSpPr>
+        <p:cNvPr id="1" name=""/>
+        <p:cNvGrpSpPr/>
+        <p:nvPr/>
+      </p:nvGrpSpPr>
+      <p:grpSpPr>
+        <a:xfrm>
+          <a:off x="0" y="0"/>
+          <a:ext cx="0" cy="0"/>
+          <a:chOff x="0" y="0"/>
+          <a:chExt cx="0" cy="0"/>
+        </a:xfrm>
+      </p:grpSpPr>
+      <p:sp>
+        <p:nvSpPr>
+          <p:cNvPr id="2" name="Title 1"/>
+          <p:cNvSpPr>
+            <a:spLocks noGrp="1"/>
+          </p:cNvSpPr>
+          <p:nvPr>
+            <p:ph type="title"/>
+          </p:nvPr>
+        </p:nvSpPr>
+        <p:spPr/>
+        <p:txBody>
+          <a:bodyPr/>
+          <a:lstStyle/>
+          <a:p>
+            <a:r>
+              <a:rPr lang="en-US" dirty="0"/>
+              <a:t>Flushing the Log</a:t>
+            </a:r>
+          </a:p>
+        </p:txBody>
+      </p:sp>
+      <p:sp>
+        <p:nvSpPr>
+          <p:cNvPr id="3" name="Content Placeholder 2"/>
+          <p:cNvSpPr>
+            <a:spLocks noGrp="1"/>
+          </p:cNvSpPr>
+          <p:nvPr>
+            <p:ph idx="1"/>
+          </p:nvPr>
+        </p:nvSpPr>
+        <p:spPr/>
+        <p:txBody>
+          <a:bodyPr/>
+          <a:lstStyle/>
+          <a:p>
+            <a:r>
+              <a:rPr lang="en-US" dirty="0"/>
+              <a:t>Flushing = closing a log block</a:t>
+            </a:r>
+          </a:p>
+          <a:p>
+            <a:r>
+              <a:rPr lang="en-US" dirty="0"/>
+              <a:t>Triggers</a:t>
+            </a:r>
+          </a:p>
+          <a:p>
+            <a:pPr lvl="1"/>
+            <a:r>
+              <a:rPr lang="en-US" dirty="0"/>
+              <a:t>60K limit reached</a:t>
+            </a:r>
+          </a:p>
+          <a:p>
+            <a:pPr lvl="1"/>
+            <a:r>
+              <a:rPr lang="en-US" dirty="0"/>
+              <a:t>Transaction commits</a:t>
+            </a:r>
+          </a:p>
+          <a:p>
+            <a:pPr lvl="1"/>
+            <a:r>
+              <a:rPr lang="en-US" dirty="0"/>
+              <a:t>Transaction rollbacks</a:t>
+            </a:r>
+          </a:p>
+          <a:p>
+            <a:pPr lvl="1"/>
+            <a:r>
+              <a:rPr lang="en-US" dirty="0"/>
+              <a:t>Checkpoint</a:t>
+            </a:r>
+          </a:p>
+        </p:txBody>
+      </p:sp>
+    </p:spTree>
+    <p:extLst>
+      <p:ext uri="{BB962C8B-B14F-4D97-AF65-F5344CB8AC3E}">
+        <p14:creationId xmlns:p14="http://schemas.microsoft.com/office/powerpoint/2010/main" val="4039889923"/>
+      </p:ext>
+    </p:extLst>
+  </p:cSld>
+  <p:clrMapOvr>
+    <a:masterClrMapping/>
+  </p:clrMapOvr>
+</p:sld>
+</file>
+
+<file path=ppt/slides/slide27.xml><?xml version="1.0" encoding="utf-8"?>
+<p:sld xmlns:a="http://schemas.openxmlformats.org/drawingml/2006/main" xmlns:r="http://schemas.openxmlformats.org/officeDocument/2006/relationships" xmlns:p="http://schemas.openxmlformats.org/presentationml/2006/main">
+  <p:cSld>
+    <p:spTree>
+      <p:nvGrpSpPr>
+        <p:cNvPr id="1" name=""/>
+        <p:cNvGrpSpPr/>
+        <p:nvPr/>
+      </p:nvGrpSpPr>
+      <p:grpSpPr>
+        <a:xfrm>
+          <a:off x="0" y="0"/>
+          <a:ext cx="0" cy="0"/>
+          <a:chOff x="0" y="0"/>
+          <a:chExt cx="0" cy="0"/>
+        </a:xfrm>
+      </p:grpSpPr>
+      <p:sp>
+        <p:nvSpPr>
+          <p:cNvPr id="2" name="Title 1"/>
+          <p:cNvSpPr>
+            <a:spLocks noGrp="1"/>
+          </p:cNvSpPr>
+          <p:nvPr>
+            <p:ph type="title"/>
+          </p:nvPr>
+        </p:nvSpPr>
+        <p:spPr/>
+        <p:txBody>
+          <a:bodyPr/>
+          <a:lstStyle/>
+          <a:p>
+            <a:r>
+              <a:rPr lang="en-US" dirty="0"/>
               <a:t>Recovery Models</a:t>
             </a:r>
           </a:p>
@@ -8231,6 +8463,127 @@
     <p:extLst>
       <p:ext uri="{BB962C8B-B14F-4D97-AF65-F5344CB8AC3E}">
         <p14:creationId xmlns:p14="http://schemas.microsoft.com/office/powerpoint/2010/main" val="3098932775"/>
+      </p:ext>
+    </p:extLst>
+  </p:cSld>
+  <p:clrMapOvr>
+    <a:masterClrMapping/>
+  </p:clrMapOvr>
+</p:sld>
+</file>
+
+<file path=ppt/slides/slide28.xml><?xml version="1.0" encoding="utf-8"?>
+<p:sld xmlns:a="http://schemas.openxmlformats.org/drawingml/2006/main" xmlns:r="http://schemas.openxmlformats.org/officeDocument/2006/relationships" xmlns:p="http://schemas.openxmlformats.org/presentationml/2006/main">
+  <p:cSld>
+    <p:spTree>
+      <p:nvGrpSpPr>
+        <p:cNvPr id="1" name=""/>
+        <p:cNvGrpSpPr/>
+        <p:nvPr/>
+      </p:nvGrpSpPr>
+      <p:grpSpPr>
+        <a:xfrm>
+          <a:off x="0" y="0"/>
+          <a:ext cx="0" cy="0"/>
+          <a:chOff x="0" y="0"/>
+          <a:chExt cx="0" cy="0"/>
+        </a:xfrm>
+      </p:grpSpPr>
+      <p:sp>
+        <p:nvSpPr>
+          <p:cNvPr id="2" name="Title 1"/>
+          <p:cNvSpPr>
+            <a:spLocks noGrp="1"/>
+          </p:cNvSpPr>
+          <p:nvPr>
+            <p:ph type="title"/>
+          </p:nvPr>
+        </p:nvSpPr>
+        <p:spPr/>
+        <p:txBody>
+          <a:bodyPr/>
+          <a:lstStyle/>
+          <a:p>
+            <a:r>
+              <a:rPr lang="en-US" dirty="0"/>
+              <a:t>Clearing the Log</a:t>
+            </a:r>
+          </a:p>
+        </p:txBody>
+      </p:sp>
+      <p:sp>
+        <p:nvSpPr>
+          <p:cNvPr id="3" name="Content Placeholder 2"/>
+          <p:cNvSpPr>
+            <a:spLocks noGrp="1"/>
+          </p:cNvSpPr>
+          <p:nvPr>
+            <p:ph idx="1"/>
+          </p:nvPr>
+        </p:nvSpPr>
+        <p:spPr/>
+        <p:txBody>
+          <a:bodyPr/>
+          <a:lstStyle/>
+          <a:p>
+            <a:r>
+              <a:rPr lang="en-US" dirty="0"/>
+              <a:t>Marks unneeded portions of log as inactive</a:t>
+            </a:r>
+          </a:p>
+          <a:p>
+            <a:r>
+              <a:rPr lang="en-US" dirty="0"/>
+              <a:t>Triggers:</a:t>
+            </a:r>
+          </a:p>
+          <a:p>
+            <a:pPr lvl="1"/>
+            <a:r>
+              <a:rPr lang="en-US" dirty="0"/>
+              <a:t>Simple recovery: Checkpoint</a:t>
+            </a:r>
+          </a:p>
+          <a:p>
+            <a:pPr lvl="1"/>
+            <a:r>
+              <a:rPr lang="en-US" dirty="0"/>
+              <a:t>Full/bulked-log: Log Backup</a:t>
+            </a:r>
+          </a:p>
+          <a:p>
+            <a:r>
+              <a:rPr lang="en-US" dirty="0"/>
+              <a:t>Why can’t the log clear?</a:t>
+            </a:r>
+          </a:p>
+          <a:p>
+            <a:pPr lvl="1"/>
+            <a:r>
+              <a:rPr lang="en-US" dirty="0"/>
+              <a:t>Pending log backup</a:t>
+            </a:r>
+          </a:p>
+          <a:p>
+            <a:pPr lvl="1"/>
+            <a:r>
+              <a:rPr lang="en-US" dirty="0"/>
+              <a:t>Active replication / CDC / AG / mirroring</a:t>
+            </a:r>
+          </a:p>
+          <a:p>
+            <a:pPr lvl="1"/>
+            <a:r>
+              <a:rPr lang="en-US"/>
+              <a:t>Long-running transaction</a:t>
+            </a:r>
+          </a:p>
+        </p:txBody>
+      </p:sp>
+    </p:spTree>
+    <p:extLst>
+      <p:ext uri="{BB962C8B-B14F-4D97-AF65-F5344CB8AC3E}">
+        <p14:creationId xmlns:p14="http://schemas.microsoft.com/office/powerpoint/2010/main" val="4028217354"/>
       </p:ext>
     </p:extLst>
   </p:cSld>

</xml_diff>

<commit_message>
A bit of detail on checkpoints.
</commit_message>
<xml_diff>
--- a/TransactionLog.pptx
+++ b/TransactionLog.pptx
@@ -5,7 +5,7 @@
     <p:sldMasterId id="2147483648" r:id="rId1"/>
   </p:sldMasterIdLst>
   <p:notesMasterIdLst>
-    <p:notesMasterId r:id="rId30"/>
+    <p:notesMasterId r:id="rId31"/>
   </p:notesMasterIdLst>
   <p:sldIdLst>
     <p:sldId id="328" r:id="rId2"/>
@@ -33,9 +33,10 @@
     <p:sldId id="350" r:id="rId24"/>
     <p:sldId id="351" r:id="rId25"/>
     <p:sldId id="354" r:id="rId26"/>
-    <p:sldId id="353" r:id="rId27"/>
-    <p:sldId id="352" r:id="rId28"/>
-    <p:sldId id="355" r:id="rId29"/>
+    <p:sldId id="356" r:id="rId27"/>
+    <p:sldId id="353" r:id="rId28"/>
+    <p:sldId id="352" r:id="rId29"/>
+    <p:sldId id="355" r:id="rId30"/>
   </p:sldIdLst>
   <p:sldSz cx="9144000" cy="6858000" type="screen4x3"/>
   <p:notesSz cx="6858000" cy="9144000"/>
@@ -235,7 +236,7 @@
           <a:p>
             <a:fld id="{2EDCB34D-5EC2-4739-9693-E425457AC201}" type="datetimeFigureOut">
               <a:rPr lang="en-US" smtClean="0"/>
-              <a:t>8/8/2016</a:t>
+              <a:t>8/10/2016</a:t>
             </a:fld>
             <a:endParaRPr lang="en-US"/>
           </a:p>
@@ -821,7 +822,7 @@
             <a:fld id="{5942B21B-2ADA-A040-A652-A7305E1B99FE}" type="datetimeFigureOut">
               <a:rPr lang="en-US" smtClean="0"/>
               <a:pPr/>
-              <a:t>8/8/2016</a:t>
+              <a:t>8/10/2016</a:t>
             </a:fld>
             <a:endParaRPr lang="en-US" dirty="0"/>
           </a:p>
@@ -1011,7 +1012,7 @@
           <a:p>
             <a:fld id="{5942B21B-2ADA-A040-A652-A7305E1B99FE}" type="datetimeFigureOut">
               <a:rPr lang="en-US" smtClean="0"/>
-              <a:t>8/8/2016</a:t>
+              <a:t>8/10/2016</a:t>
             </a:fld>
             <a:endParaRPr lang="en-US"/>
           </a:p>
@@ -1135,7 +1136,7 @@
             <a:fld id="{5942B21B-2ADA-A040-A652-A7305E1B99FE}" type="datetimeFigureOut">
               <a:rPr lang="en-US" smtClean="0"/>
               <a:pPr/>
-              <a:t>8/8/2016</a:t>
+              <a:t>8/10/2016</a:t>
             </a:fld>
             <a:r>
               <a:rPr lang="en-US"/>
@@ -1406,7 +1407,7 @@
             <a:fld id="{5942B21B-2ADA-A040-A652-A7305E1B99FE}" type="datetimeFigureOut">
               <a:rPr lang="en-US" smtClean="0"/>
               <a:pPr/>
-              <a:t>8/8/2016</a:t>
+              <a:t>8/10/2016</a:t>
             </a:fld>
             <a:r>
               <a:rPr lang="en-US" dirty="0"/>
@@ -1676,7 +1677,7 @@
             <a:fld id="{5942B21B-2ADA-A040-A652-A7305E1B99FE}" type="datetimeFigureOut">
               <a:rPr lang="en-US" smtClean="0"/>
               <a:pPr/>
-              <a:t>8/8/2016</a:t>
+              <a:t>8/10/2016</a:t>
             </a:fld>
             <a:r>
               <a:rPr lang="en-US" dirty="0"/>
@@ -2016,7 +2017,7 @@
             <a:fld id="{5942B21B-2ADA-A040-A652-A7305E1B99FE}" type="datetimeFigureOut">
               <a:rPr lang="en-US" smtClean="0"/>
               <a:pPr/>
-              <a:t>8/8/2016</a:t>
+              <a:t>8/10/2016</a:t>
             </a:fld>
             <a:r>
               <a:rPr lang="en-US" dirty="0"/>
@@ -2357,7 +2358,7 @@
             <a:fld id="{5942B21B-2ADA-A040-A652-A7305E1B99FE}" type="datetimeFigureOut">
               <a:rPr lang="en-US" smtClean="0"/>
               <a:pPr/>
-              <a:t>8/8/2016</a:t>
+              <a:t>8/10/2016</a:t>
             </a:fld>
             <a:r>
               <a:rPr lang="en-US" dirty="0"/>
@@ -2872,7 +2873,7 @@
             <a:fld id="{5942B21B-2ADA-A040-A652-A7305E1B99FE}" type="datetimeFigureOut">
               <a:rPr lang="en-US" smtClean="0"/>
               <a:pPr/>
-              <a:t>8/8/2016</a:t>
+              <a:t>8/10/2016</a:t>
             </a:fld>
             <a:r>
               <a:rPr lang="en-US" dirty="0"/>
@@ -3081,7 +3082,7 @@
             <a:fld id="{5942B21B-2ADA-A040-A652-A7305E1B99FE}" type="datetimeFigureOut">
               <a:rPr lang="en-US" smtClean="0"/>
               <a:pPr/>
-              <a:t>8/8/2016</a:t>
+              <a:t>8/10/2016</a:t>
             </a:fld>
             <a:r>
               <a:rPr lang="en-US" dirty="0"/>
@@ -3268,7 +3269,7 @@
             <a:fld id="{5942B21B-2ADA-A040-A652-A7305E1B99FE}" type="datetimeFigureOut">
               <a:rPr lang="en-US" smtClean="0"/>
               <a:pPr/>
-              <a:t>8/8/2016</a:t>
+              <a:t>8/10/2016</a:t>
             </a:fld>
             <a:r>
               <a:rPr lang="en-US" dirty="0"/>
@@ -3599,7 +3600,7 @@
             <a:fld id="{5942B21B-2ADA-A040-A652-A7305E1B99FE}" type="datetimeFigureOut">
               <a:rPr lang="en-US" smtClean="0"/>
               <a:pPr/>
-              <a:t>8/8/2016</a:t>
+              <a:t>8/10/2016</a:t>
             </a:fld>
             <a:r>
               <a:rPr lang="en-US" dirty="0"/>
@@ -3907,7 +3908,7 @@
             <a:fld id="{5942B21B-2ADA-A040-A652-A7305E1B99FE}" type="datetimeFigureOut">
               <a:rPr lang="en-US" smtClean="0"/>
               <a:pPr/>
-              <a:t>8/8/2016</a:t>
+              <a:t>8/10/2016</a:t>
             </a:fld>
             <a:r>
               <a:rPr lang="en-US" dirty="0"/>
@@ -4186,7 +4187,7 @@
             <a:fld id="{5942B21B-2ADA-A040-A652-A7305E1B99FE}" type="datetimeFigureOut">
               <a:rPr lang="en-US" smtClean="0"/>
               <a:pPr/>
-              <a:t>8/8/2016</a:t>
+              <a:t>8/10/2016</a:t>
             </a:fld>
             <a:r>
               <a:rPr lang="en-US" dirty="0"/>
@@ -8159,40 +8160,6 @@
             </a:r>
           </a:p>
           <a:p>
-            <a:r>
-              <a:rPr lang="en-US" dirty="0"/>
-              <a:t>Triggers</a:t>
-            </a:r>
-          </a:p>
-          <a:p>
-            <a:pPr lvl="1"/>
-            <a:r>
-              <a:rPr lang="en-US" dirty="0"/>
-              <a:t>Automatic</a:t>
-            </a:r>
-          </a:p>
-          <a:p>
-            <a:pPr lvl="1"/>
-            <a:r>
-              <a:rPr lang="en-US" dirty="0"/>
-              <a:t>Indirect</a:t>
-            </a:r>
-          </a:p>
-          <a:p>
-            <a:pPr lvl="1"/>
-            <a:r>
-              <a:rPr lang="en-US" dirty="0"/>
-              <a:t>Internal</a:t>
-            </a:r>
-          </a:p>
-          <a:p>
-            <a:pPr lvl="1"/>
-            <a:r>
-              <a:rPr lang="en-US" dirty="0"/>
-              <a:t>Manual</a:t>
-            </a:r>
-          </a:p>
-          <a:p>
             <a:pPr marL="0" indent="0">
               <a:buNone/>
             </a:pPr>
@@ -8247,7 +8214,7 @@
           <a:p>
             <a:r>
               <a:rPr lang="en-US" dirty="0"/>
-              <a:t>Flushing the Log</a:t>
+              <a:t>Checkpoint Types</a:t>
             </a:r>
           </a:p>
         </p:txBody>
@@ -8264,54 +8231,82 @@
         </p:nvSpPr>
         <p:spPr/>
         <p:txBody>
-          <a:bodyPr/>
+          <a:bodyPr>
+            <a:normAutofit lnSpcReduction="10000"/>
+          </a:bodyPr>
           <a:lstStyle/>
           <a:p>
             <a:r>
               <a:rPr lang="en-US" dirty="0"/>
-              <a:t>Flushing = closing a log block</a:t>
-            </a:r>
-          </a:p>
-          <a:p>
-            <a:r>
-              <a:rPr lang="en-US" dirty="0"/>
-              <a:t>Triggers</a:t>
+              <a:t>Automatic</a:t>
             </a:r>
           </a:p>
           <a:p>
             <a:pPr lvl="1"/>
             <a:r>
               <a:rPr lang="en-US" dirty="0"/>
-              <a:t>60K limit reached</a:t>
+              <a:t>Period background thread</a:t>
             </a:r>
           </a:p>
           <a:p>
             <a:pPr lvl="1"/>
             <a:r>
               <a:rPr lang="en-US" dirty="0"/>
-              <a:t>Transaction commits</a:t>
+              <a:t>Instance-wide</a:t>
+            </a:r>
+          </a:p>
+          <a:p>
+            <a:r>
+              <a:rPr lang="en-US" dirty="0"/>
+              <a:t>Indirect (2012+)</a:t>
             </a:r>
           </a:p>
           <a:p>
             <a:pPr lvl="1"/>
             <a:r>
               <a:rPr lang="en-US" dirty="0"/>
-              <a:t>Transaction rollbacks</a:t>
+              <a:t>Database-specific</a:t>
+            </a:r>
+          </a:p>
+          <a:p>
+            <a:r>
+              <a:rPr lang="en-US" dirty="0"/>
+              <a:t>Internal</a:t>
             </a:r>
           </a:p>
           <a:p>
             <a:pPr lvl="1"/>
             <a:r>
               <a:rPr lang="en-US" dirty="0"/>
-              <a:t>Checkpoint</a:t>
-            </a:r>
+              <a:t>During operations such as backup, snapshots</a:t>
+            </a:r>
+          </a:p>
+          <a:p>
+            <a:r>
+              <a:rPr lang="en-US" dirty="0"/>
+              <a:t>Manual</a:t>
+            </a:r>
+          </a:p>
+          <a:p>
+            <a:pPr lvl="1"/>
+            <a:r>
+              <a:rPr lang="en-US"/>
+              <a:t>CHECKPOINT command</a:t>
+            </a:r>
+            <a:endParaRPr lang="en-US" dirty="0"/>
+          </a:p>
+          <a:p>
+            <a:pPr marL="0" indent="0">
+              <a:buNone/>
+            </a:pPr>
+            <a:endParaRPr lang="en-US" dirty="0"/>
           </a:p>
         </p:txBody>
       </p:sp>
     </p:spTree>
     <p:extLst>
       <p:ext uri="{BB962C8B-B14F-4D97-AF65-F5344CB8AC3E}">
-        <p14:creationId xmlns:p14="http://schemas.microsoft.com/office/powerpoint/2010/main" val="4039889923"/>
+        <p14:creationId xmlns:p14="http://schemas.microsoft.com/office/powerpoint/2010/main" val="2925193969"/>
       </p:ext>
     </p:extLst>
   </p:cSld>
@@ -8355,6 +8350,114 @@
           <a:p>
             <a:r>
               <a:rPr lang="en-US" dirty="0"/>
+              <a:t>Flushing the Log</a:t>
+            </a:r>
+          </a:p>
+        </p:txBody>
+      </p:sp>
+      <p:sp>
+        <p:nvSpPr>
+          <p:cNvPr id="3" name="Content Placeholder 2"/>
+          <p:cNvSpPr>
+            <a:spLocks noGrp="1"/>
+          </p:cNvSpPr>
+          <p:nvPr>
+            <p:ph idx="1"/>
+          </p:nvPr>
+        </p:nvSpPr>
+        <p:spPr/>
+        <p:txBody>
+          <a:bodyPr/>
+          <a:lstStyle/>
+          <a:p>
+            <a:r>
+              <a:rPr lang="en-US" dirty="0"/>
+              <a:t>Flushing = closing a log block</a:t>
+            </a:r>
+          </a:p>
+          <a:p>
+            <a:r>
+              <a:rPr lang="en-US" dirty="0"/>
+              <a:t>Triggers</a:t>
+            </a:r>
+          </a:p>
+          <a:p>
+            <a:pPr lvl="1"/>
+            <a:r>
+              <a:rPr lang="en-US" dirty="0"/>
+              <a:t>60K limit reached</a:t>
+            </a:r>
+          </a:p>
+          <a:p>
+            <a:pPr lvl="1"/>
+            <a:r>
+              <a:rPr lang="en-US" dirty="0"/>
+              <a:t>Transaction commits</a:t>
+            </a:r>
+          </a:p>
+          <a:p>
+            <a:pPr lvl="1"/>
+            <a:r>
+              <a:rPr lang="en-US" dirty="0"/>
+              <a:t>Transaction rollbacks</a:t>
+            </a:r>
+          </a:p>
+          <a:p>
+            <a:pPr lvl="1"/>
+            <a:r>
+              <a:rPr lang="en-US" dirty="0"/>
+              <a:t>Checkpoint</a:t>
+            </a:r>
+          </a:p>
+        </p:txBody>
+      </p:sp>
+    </p:spTree>
+    <p:extLst>
+      <p:ext uri="{BB962C8B-B14F-4D97-AF65-F5344CB8AC3E}">
+        <p14:creationId xmlns:p14="http://schemas.microsoft.com/office/powerpoint/2010/main" val="4039889923"/>
+      </p:ext>
+    </p:extLst>
+  </p:cSld>
+  <p:clrMapOvr>
+    <a:masterClrMapping/>
+  </p:clrMapOvr>
+</p:sld>
+</file>
+
+<file path=ppt/slides/slide28.xml><?xml version="1.0" encoding="utf-8"?>
+<p:sld xmlns:a="http://schemas.openxmlformats.org/drawingml/2006/main" xmlns:r="http://schemas.openxmlformats.org/officeDocument/2006/relationships" xmlns:p="http://schemas.openxmlformats.org/presentationml/2006/main">
+  <p:cSld>
+    <p:spTree>
+      <p:nvGrpSpPr>
+        <p:cNvPr id="1" name=""/>
+        <p:cNvGrpSpPr/>
+        <p:nvPr/>
+      </p:nvGrpSpPr>
+      <p:grpSpPr>
+        <a:xfrm>
+          <a:off x="0" y="0"/>
+          <a:ext cx="0" cy="0"/>
+          <a:chOff x="0" y="0"/>
+          <a:chExt cx="0" cy="0"/>
+        </a:xfrm>
+      </p:grpSpPr>
+      <p:sp>
+        <p:nvSpPr>
+          <p:cNvPr id="2" name="Title 1"/>
+          <p:cNvSpPr>
+            <a:spLocks noGrp="1"/>
+          </p:cNvSpPr>
+          <p:nvPr>
+            <p:ph type="title"/>
+          </p:nvPr>
+        </p:nvSpPr>
+        <p:spPr/>
+        <p:txBody>
+          <a:bodyPr/>
+          <a:lstStyle/>
+          <a:p>
+            <a:r>
+              <a:rPr lang="en-US" dirty="0"/>
               <a:t>Recovery Models</a:t>
             </a:r>
           </a:p>
@@ -8472,7 +8575,7 @@
 </p:sld>
 </file>
 
-<file path=ppt/slides/slide28.xml><?xml version="1.0" encoding="utf-8"?>
+<file path=ppt/slides/slide29.xml><?xml version="1.0" encoding="utf-8"?>
 <p:sld xmlns:a="http://schemas.openxmlformats.org/drawingml/2006/main" xmlns:r="http://schemas.openxmlformats.org/officeDocument/2006/relationships" xmlns:p="http://schemas.openxmlformats.org/presentationml/2006/main">
   <p:cSld>
     <p:spTree>

</xml_diff>

<commit_message>
More on clearing the log.
</commit_message>
<xml_diff>
--- a/TransactionLog.pptx
+++ b/TransactionLog.pptx
@@ -8677,9 +8677,31 @@
           <a:p>
             <a:pPr lvl="1"/>
             <a:r>
-              <a:rPr lang="en-US"/>
+              <a:rPr lang="en-US" dirty="0"/>
               <a:t>Long-running transaction</a:t>
             </a:r>
+          </a:p>
+          <a:p>
+            <a:pPr lvl="1"/>
+            <a:r>
+              <a:rPr lang="en-US" dirty="0"/>
+              <a:t>See </a:t>
+            </a:r>
+            <a:r>
+              <a:rPr lang="en-US" sz="2000" b="1" dirty="0" err="1">
+                <a:latin typeface="Courier New" panose="02070309020205020404" pitchFamily="49" charset="0"/>
+                <a:cs typeface="Courier New" panose="02070309020205020404" pitchFamily="49" charset="0"/>
+              </a:rPr>
+              <a:t>sys.databases.log_reuse_wait_desc</a:t>
+            </a:r>
+            <a:endParaRPr lang="en-US" sz="2000" b="1" dirty="0">
+              <a:latin typeface="Courier New" panose="02070309020205020404" pitchFamily="49" charset="0"/>
+              <a:cs typeface="Courier New" panose="02070309020205020404" pitchFamily="49" charset="0"/>
+            </a:endParaRPr>
+          </a:p>
+          <a:p>
+            <a:pPr lvl="1"/>
+            <a:endParaRPr lang="en-US" dirty="0"/>
           </a:p>
         </p:txBody>
       </p:sp>

</xml_diff>

<commit_message>
Add subtitle to header.  Condense agenda.  Clarify LSN composition.  Add VLF creation info.
</commit_message>
<xml_diff>
--- a/TransactionLog.pptx
+++ b/TransactionLog.pptx
@@ -5,7 +5,7 @@
     <p:sldMasterId id="2147483648" r:id="rId1"/>
   </p:sldMasterIdLst>
   <p:notesMasterIdLst>
-    <p:notesMasterId r:id="rId31"/>
+    <p:notesMasterId r:id="rId32"/>
   </p:notesMasterIdLst>
   <p:sldIdLst>
     <p:sldId id="328" r:id="rId2"/>
@@ -37,6 +37,7 @@
     <p:sldId id="353" r:id="rId28"/>
     <p:sldId id="352" r:id="rId29"/>
     <p:sldId id="355" r:id="rId30"/>
+    <p:sldId id="357" r:id="rId31"/>
   </p:sldIdLst>
   <p:sldSz cx="9144000" cy="6858000" type="screen4x3"/>
   <p:notesSz cx="6858000" cy="9144000"/>
@@ -236,7 +237,7 @@
           <a:p>
             <a:fld id="{2EDCB34D-5EC2-4739-9693-E425457AC201}" type="datetimeFigureOut">
               <a:rPr lang="en-US" smtClean="0"/>
-              <a:t>8/10/2016</a:t>
+              <a:t>08/15/2016</a:t>
             </a:fld>
             <a:endParaRPr lang="en-US"/>
           </a:p>
@@ -822,7 +823,7 @@
             <a:fld id="{5942B21B-2ADA-A040-A652-A7305E1B99FE}" type="datetimeFigureOut">
               <a:rPr lang="en-US" smtClean="0"/>
               <a:pPr/>
-              <a:t>8/10/2016</a:t>
+              <a:t>08/15/2016</a:t>
             </a:fld>
             <a:endParaRPr lang="en-US" dirty="0"/>
           </a:p>
@@ -1012,7 +1013,7 @@
           <a:p>
             <a:fld id="{5942B21B-2ADA-A040-A652-A7305E1B99FE}" type="datetimeFigureOut">
               <a:rPr lang="en-US" smtClean="0"/>
-              <a:t>8/10/2016</a:t>
+              <a:t>08/15/2016</a:t>
             </a:fld>
             <a:endParaRPr lang="en-US"/>
           </a:p>
@@ -1136,7 +1137,7 @@
             <a:fld id="{5942B21B-2ADA-A040-A652-A7305E1B99FE}" type="datetimeFigureOut">
               <a:rPr lang="en-US" smtClean="0"/>
               <a:pPr/>
-              <a:t>8/10/2016</a:t>
+              <a:t>08/15/2016</a:t>
             </a:fld>
             <a:r>
               <a:rPr lang="en-US"/>
@@ -1407,7 +1408,7 @@
             <a:fld id="{5942B21B-2ADA-A040-A652-A7305E1B99FE}" type="datetimeFigureOut">
               <a:rPr lang="en-US" smtClean="0"/>
               <a:pPr/>
-              <a:t>8/10/2016</a:t>
+              <a:t>08/15/2016</a:t>
             </a:fld>
             <a:r>
               <a:rPr lang="en-US" dirty="0"/>
@@ -1677,7 +1678,7 @@
             <a:fld id="{5942B21B-2ADA-A040-A652-A7305E1B99FE}" type="datetimeFigureOut">
               <a:rPr lang="en-US" smtClean="0"/>
               <a:pPr/>
-              <a:t>8/10/2016</a:t>
+              <a:t>08/15/2016</a:t>
             </a:fld>
             <a:r>
               <a:rPr lang="en-US" dirty="0"/>
@@ -2017,7 +2018,7 @@
             <a:fld id="{5942B21B-2ADA-A040-A652-A7305E1B99FE}" type="datetimeFigureOut">
               <a:rPr lang="en-US" smtClean="0"/>
               <a:pPr/>
-              <a:t>8/10/2016</a:t>
+              <a:t>08/15/2016</a:t>
             </a:fld>
             <a:r>
               <a:rPr lang="en-US" dirty="0"/>
@@ -2358,7 +2359,7 @@
             <a:fld id="{5942B21B-2ADA-A040-A652-A7305E1B99FE}" type="datetimeFigureOut">
               <a:rPr lang="en-US" smtClean="0"/>
               <a:pPr/>
-              <a:t>8/10/2016</a:t>
+              <a:t>08/15/2016</a:t>
             </a:fld>
             <a:r>
               <a:rPr lang="en-US" dirty="0"/>
@@ -2873,7 +2874,7 @@
             <a:fld id="{5942B21B-2ADA-A040-A652-A7305E1B99FE}" type="datetimeFigureOut">
               <a:rPr lang="en-US" smtClean="0"/>
               <a:pPr/>
-              <a:t>8/10/2016</a:t>
+              <a:t>08/15/2016</a:t>
             </a:fld>
             <a:r>
               <a:rPr lang="en-US" dirty="0"/>
@@ -3082,7 +3083,7 @@
             <a:fld id="{5942B21B-2ADA-A040-A652-A7305E1B99FE}" type="datetimeFigureOut">
               <a:rPr lang="en-US" smtClean="0"/>
               <a:pPr/>
-              <a:t>8/10/2016</a:t>
+              <a:t>08/15/2016</a:t>
             </a:fld>
             <a:r>
               <a:rPr lang="en-US" dirty="0"/>
@@ -3269,7 +3270,7 @@
             <a:fld id="{5942B21B-2ADA-A040-A652-A7305E1B99FE}" type="datetimeFigureOut">
               <a:rPr lang="en-US" smtClean="0"/>
               <a:pPr/>
-              <a:t>8/10/2016</a:t>
+              <a:t>08/15/2016</a:t>
             </a:fld>
             <a:r>
               <a:rPr lang="en-US" dirty="0"/>
@@ -3600,7 +3601,7 @@
             <a:fld id="{5942B21B-2ADA-A040-A652-A7305E1B99FE}" type="datetimeFigureOut">
               <a:rPr lang="en-US" smtClean="0"/>
               <a:pPr/>
-              <a:t>8/10/2016</a:t>
+              <a:t>08/15/2016</a:t>
             </a:fld>
             <a:r>
               <a:rPr lang="en-US" dirty="0"/>
@@ -3908,7 +3909,7 @@
             <a:fld id="{5942B21B-2ADA-A040-A652-A7305E1B99FE}" type="datetimeFigureOut">
               <a:rPr lang="en-US" smtClean="0"/>
               <a:pPr/>
-              <a:t>8/10/2016</a:t>
+              <a:t>08/15/2016</a:t>
             </a:fld>
             <a:r>
               <a:rPr lang="en-US" dirty="0"/>
@@ -4187,7 +4188,7 @@
             <a:fld id="{5942B21B-2ADA-A040-A652-A7305E1B99FE}" type="datetimeFigureOut">
               <a:rPr lang="en-US" smtClean="0"/>
               <a:pPr/>
-              <a:t>8/10/2016</a:t>
+              <a:t>08/15/2016</a:t>
             </a:fld>
             <a:r>
               <a:rPr lang="en-US" dirty="0"/>
@@ -4826,6 +4827,52 @@
           </a:p>
         </p:txBody>
       </p:sp>
+      <p:sp>
+        <p:nvSpPr>
+          <p:cNvPr id="5" name="Title 1"/>
+          <p:cNvSpPr txBox="1">
+            <a:spLocks/>
+          </p:cNvSpPr>
+          <p:nvPr/>
+        </p:nvSpPr>
+        <p:spPr>
+          <a:xfrm>
+            <a:off x="1343025" y="1648166"/>
+            <a:ext cx="7318535" cy="1470025"/>
+          </a:xfrm>
+          <a:prstGeom prst="rect">
+            <a:avLst/>
+          </a:prstGeom>
+        </p:spPr>
+        <p:txBody>
+          <a:bodyPr vert="horz" lIns="91440" tIns="45720" rIns="91440" bIns="45720" rtlCol="0" anchor="ctr">
+            <a:normAutofit/>
+          </a:bodyPr>
+          <a:lstStyle>
+            <a:lvl1pPr algn="l" defTabSz="457200" rtl="0" eaLnBrk="1" latinLnBrk="0" hangingPunct="1">
+              <a:spcBef>
+                <a:spcPct val="0"/>
+              </a:spcBef>
+              <a:buNone/>
+              <a:defRPr sz="4000" kern="1200">
+                <a:solidFill>
+                  <a:schemeClr val="accent1"/>
+                </a:solidFill>
+                <a:latin typeface="+mj-lt"/>
+                <a:ea typeface="+mj-ea"/>
+                <a:cs typeface="+mj-cs"/>
+              </a:defRPr>
+            </a:lvl1pPr>
+          </a:lstStyle>
+          <a:p>
+            <a:r>
+              <a:rPr lang="en-US" sz="3200" smtClean="0"/>
+              <a:t>Visualize Your Transaction Log</a:t>
+            </a:r>
+            <a:endParaRPr lang="en-US" sz="3200" dirty="0"/>
+          </a:p>
+        </p:txBody>
+      </p:sp>
     </p:spTree>
     <p:extLst>
       <p:ext uri="{BB962C8B-B14F-4D97-AF65-F5344CB8AC3E}">
@@ -7182,7 +7229,15 @@
             <a:pPr lvl="1"/>
             <a:r>
               <a:rPr lang="en-US" dirty="0"/>
-              <a:t>Log Block offset (512-byte chunks, not contiguous)</a:t>
+              <a:t>Log Block offset (512-byte chunks, not </a:t>
+            </a:r>
+            <a:r>
+              <a:rPr lang="en-US" dirty="0" smtClean="0"/>
+              <a:t>necessarily contiguous</a:t>
+            </a:r>
+            <a:r>
+              <a:rPr lang="en-US" dirty="0"/>
+              <a:t>)</a:t>
             </a:r>
           </a:p>
           <a:p>
@@ -7310,21 +7365,21 @@
                 <a:gridCol w="1895475">
                   <a:extLst>
                     <a:ext uri="{9D8B030D-6E8A-4147-A177-3AD203B41FA5}">
-                      <a16:colId xmlns:a16="http://schemas.microsoft.com/office/drawing/2014/main" val="20000"/>
+                      <a16:colId xmlns:a16="http://schemas.microsoft.com/office/drawing/2014/main" xmlns="" val="20000"/>
                     </a:ext>
                   </a:extLst>
                 </a:gridCol>
                 <a:gridCol w="3171825">
                   <a:extLst>
                     <a:ext uri="{9D8B030D-6E8A-4147-A177-3AD203B41FA5}">
-                      <a16:colId xmlns:a16="http://schemas.microsoft.com/office/drawing/2014/main" val="20001"/>
+                      <a16:colId xmlns:a16="http://schemas.microsoft.com/office/drawing/2014/main" xmlns="" val="20001"/>
                     </a:ext>
                   </a:extLst>
                 </a:gridCol>
                 <a:gridCol w="3162300">
                   <a:extLst>
                     <a:ext uri="{9D8B030D-6E8A-4147-A177-3AD203B41FA5}">
-                      <a16:colId xmlns:a16="http://schemas.microsoft.com/office/drawing/2014/main" val="20002"/>
+                      <a16:colId xmlns:a16="http://schemas.microsoft.com/office/drawing/2014/main" xmlns="" val="20002"/>
                     </a:ext>
                   </a:extLst>
                 </a:gridCol>
@@ -7371,7 +7426,7 @@
                 </a:tc>
                 <a:extLst>
                   <a:ext uri="{0D108BD9-81ED-4DB2-BD59-A6C34878D82A}">
-                    <a16:rowId xmlns:a16="http://schemas.microsoft.com/office/drawing/2014/main" val="10000"/>
+                    <a16:rowId xmlns:a16="http://schemas.microsoft.com/office/drawing/2014/main" xmlns="" val="10000"/>
                   </a:ext>
                 </a:extLst>
               </a:tr>
@@ -7437,7 +7492,7 @@
                 </a:tc>
                 <a:extLst>
                   <a:ext uri="{0D108BD9-81ED-4DB2-BD59-A6C34878D82A}">
-                    <a16:rowId xmlns:a16="http://schemas.microsoft.com/office/drawing/2014/main" val="10001"/>
+                    <a16:rowId xmlns:a16="http://schemas.microsoft.com/office/drawing/2014/main" xmlns="" val="10001"/>
                   </a:ext>
                 </a:extLst>
               </a:tr>
@@ -7508,7 +7563,7 @@
                 </a:tc>
                 <a:extLst>
                   <a:ext uri="{0D108BD9-81ED-4DB2-BD59-A6C34878D82A}">
-                    <a16:rowId xmlns:a16="http://schemas.microsoft.com/office/drawing/2014/main" val="10002"/>
+                    <a16:rowId xmlns:a16="http://schemas.microsoft.com/office/drawing/2014/main" xmlns="" val="10002"/>
                   </a:ext>
                 </a:extLst>
               </a:tr>
@@ -7554,7 +7609,7 @@
                 </a:tc>
                 <a:extLst>
                   <a:ext uri="{0D108BD9-81ED-4DB2-BD59-A6C34878D82A}">
-                    <a16:rowId xmlns:a16="http://schemas.microsoft.com/office/drawing/2014/main" val="10003"/>
+                    <a16:rowId xmlns:a16="http://schemas.microsoft.com/office/drawing/2014/main" xmlns="" val="10003"/>
                   </a:ext>
                 </a:extLst>
               </a:tr>
@@ -8785,26 +8840,27 @@
           </a:p>
           <a:p>
             <a:r>
-              <a:rPr lang="en-US" dirty="0"/>
-              <a:t>Flushing the log</a:t>
-            </a:r>
-          </a:p>
-          <a:p>
-            <a:r>
-              <a:rPr lang="en-US" dirty="0"/>
-              <a:t>Clearing the log</a:t>
-            </a:r>
-          </a:p>
-          <a:p>
-            <a:r>
-              <a:rPr lang="en-US" dirty="0"/>
-              <a:t>Checkpoints</a:t>
-            </a:r>
-          </a:p>
-          <a:p>
-            <a:r>
-              <a:rPr lang="en-US" dirty="0"/>
-              <a:t>Rollback operations</a:t>
+              <a:rPr lang="en-US" dirty="0" smtClean="0"/>
+              <a:t>Flushing &amp; clearing </a:t>
+            </a:r>
+            <a:r>
+              <a:rPr lang="en-US" dirty="0"/>
+              <a:t>the </a:t>
+            </a:r>
+            <a:r>
+              <a:rPr lang="en-US" dirty="0" smtClean="0"/>
+              <a:t>log / checkpoints</a:t>
+            </a:r>
+            <a:endParaRPr lang="en-US" dirty="0"/>
+          </a:p>
+          <a:p>
+            <a:r>
+              <a:rPr lang="en-US" dirty="0" smtClean="0"/>
+              <a:t>Rollback </a:t>
+            </a:r>
+            <a:r>
+              <a:rPr lang="en-US" dirty="0"/>
+              <a:t>operations</a:t>
             </a:r>
           </a:p>
           <a:p>
@@ -8825,6 +8881,446 @@
     <p:extLst>
       <p:ext uri="{BB962C8B-B14F-4D97-AF65-F5344CB8AC3E}">
         <p14:creationId xmlns:p14="http://schemas.microsoft.com/office/powerpoint/2010/main" val="1097259878"/>
+      </p:ext>
+    </p:extLst>
+  </p:cSld>
+  <p:clrMapOvr>
+    <a:masterClrMapping/>
+  </p:clrMapOvr>
+</p:sld>
+</file>
+
+<file path=ppt/slides/slide30.xml><?xml version="1.0" encoding="utf-8"?>
+<p:sld xmlns:a="http://schemas.openxmlformats.org/drawingml/2006/main" xmlns:r="http://schemas.openxmlformats.org/officeDocument/2006/relationships" xmlns:p="http://schemas.openxmlformats.org/presentationml/2006/main">
+  <p:cSld>
+    <p:spTree>
+      <p:nvGrpSpPr>
+        <p:cNvPr id="1" name=""/>
+        <p:cNvGrpSpPr/>
+        <p:nvPr/>
+      </p:nvGrpSpPr>
+      <p:grpSpPr>
+        <a:xfrm>
+          <a:off x="0" y="0"/>
+          <a:ext cx="0" cy="0"/>
+          <a:chOff x="0" y="0"/>
+          <a:chExt cx="0" cy="0"/>
+        </a:xfrm>
+      </p:grpSpPr>
+      <p:sp>
+        <p:nvSpPr>
+          <p:cNvPr id="2" name="Title 1"/>
+          <p:cNvSpPr>
+            <a:spLocks noGrp="1"/>
+          </p:cNvSpPr>
+          <p:nvPr>
+            <p:ph type="title"/>
+          </p:nvPr>
+        </p:nvSpPr>
+        <p:spPr/>
+        <p:txBody>
+          <a:bodyPr/>
+          <a:lstStyle/>
+          <a:p>
+            <a:r>
+              <a:rPr lang="en-US" dirty="0" smtClean="0"/>
+              <a:t>Creating new VLFs</a:t>
+            </a:r>
+            <a:endParaRPr lang="en-US" dirty="0"/>
+          </a:p>
+        </p:txBody>
+      </p:sp>
+      <p:sp>
+        <p:nvSpPr>
+          <p:cNvPr id="3" name="Content Placeholder 2"/>
+          <p:cNvSpPr>
+            <a:spLocks noGrp="1"/>
+          </p:cNvSpPr>
+          <p:nvPr>
+            <p:ph idx="1"/>
+          </p:nvPr>
+        </p:nvSpPr>
+        <p:spPr>
+          <a:xfrm>
+            <a:off x="457200" y="1600200"/>
+            <a:ext cx="8229600" cy="523875"/>
+          </a:xfrm>
+        </p:spPr>
+        <p:txBody>
+          <a:bodyPr>
+            <a:normAutofit lnSpcReduction="10000"/>
+          </a:bodyPr>
+          <a:lstStyle/>
+          <a:p>
+            <a:pPr marL="0" indent="0">
+              <a:buNone/>
+            </a:pPr>
+            <a:r>
+              <a:rPr lang="en-US" dirty="0" smtClean="0"/>
+              <a:t>My transaction log grew.  How many VLFs?</a:t>
+            </a:r>
+            <a:endParaRPr lang="en-US" dirty="0"/>
+          </a:p>
+        </p:txBody>
+      </p:sp>
+      <p:graphicFrame>
+        <p:nvGraphicFramePr>
+          <p:cNvPr id="4" name="Table 3"/>
+          <p:cNvGraphicFramePr>
+            <a:graphicFrameLocks noGrp="1"/>
+          </p:cNvGraphicFramePr>
+          <p:nvPr>
+            <p:extLst>
+              <p:ext uri="{D42A27DB-BD31-4B8C-83A1-F6EECF244321}">
+                <p14:modId xmlns:p14="http://schemas.microsoft.com/office/powerpoint/2010/main" val="2768268463"/>
+              </p:ext>
+            </p:extLst>
+          </p:nvPr>
+        </p:nvGraphicFramePr>
+        <p:xfrm>
+          <a:off x="1524000" y="2222500"/>
+          <a:ext cx="6096000" cy="1483360"/>
+        </p:xfrm>
+        <a:graphic>
+          <a:graphicData uri="http://schemas.openxmlformats.org/drawingml/2006/table">
+            <a:tbl>
+              <a:tblPr firstRow="1" bandRow="1">
+                <a:tableStyleId>{5C22544A-7EE6-4342-B048-85BDC9FD1C3A}</a:tableStyleId>
+              </a:tblPr>
+              <a:tblGrid>
+                <a:gridCol w="3048000"/>
+                <a:gridCol w="3048000"/>
+              </a:tblGrid>
+              <a:tr h="370840">
+                <a:tc>
+                  <a:txBody>
+                    <a:bodyPr/>
+                    <a:lstStyle/>
+                    <a:p>
+                      <a:pPr algn="ctr"/>
+                      <a:r>
+                        <a:rPr lang="en-US" dirty="0" smtClean="0"/>
+                        <a:t>Log</a:t>
+                      </a:r>
+                      <a:r>
+                        <a:rPr lang="en-US" baseline="0" dirty="0" smtClean="0"/>
+                        <a:t> growth size</a:t>
+                      </a:r>
+                      <a:endParaRPr lang="en-US" dirty="0"/>
+                    </a:p>
+                  </a:txBody>
+                  <a:tcPr/>
+                </a:tc>
+                <a:tc>
+                  <a:txBody>
+                    <a:bodyPr/>
+                    <a:lstStyle/>
+                    <a:p>
+                      <a:pPr algn="ctr"/>
+                      <a:r>
+                        <a:rPr lang="en-US" dirty="0" smtClean="0"/>
+                        <a:t>New</a:t>
+                      </a:r>
+                      <a:r>
+                        <a:rPr lang="en-US" baseline="0" dirty="0" smtClean="0"/>
+                        <a:t> VLFs created</a:t>
+                      </a:r>
+                      <a:endParaRPr lang="en-US" dirty="0"/>
+                    </a:p>
+                  </a:txBody>
+                  <a:tcPr/>
+                </a:tc>
+              </a:tr>
+              <a:tr h="370840">
+                <a:tc>
+                  <a:txBody>
+                    <a:bodyPr/>
+                    <a:lstStyle/>
+                    <a:p>
+                      <a:pPr algn="ctr"/>
+                      <a:r>
+                        <a:rPr lang="en-US" dirty="0" smtClean="0"/>
+                        <a:t>1 to 64 MB</a:t>
+                      </a:r>
+                      <a:endParaRPr lang="en-US" dirty="0"/>
+                    </a:p>
+                  </a:txBody>
+                  <a:tcPr/>
+                </a:tc>
+                <a:tc>
+                  <a:txBody>
+                    <a:bodyPr/>
+                    <a:lstStyle/>
+                    <a:p>
+                      <a:pPr algn="ctr"/>
+                      <a:r>
+                        <a:rPr lang="en-US" dirty="0" smtClean="0"/>
+                        <a:t>4</a:t>
+                      </a:r>
+                      <a:endParaRPr lang="en-US" dirty="0"/>
+                    </a:p>
+                  </a:txBody>
+                  <a:tcPr/>
+                </a:tc>
+              </a:tr>
+              <a:tr h="370840">
+                <a:tc>
+                  <a:txBody>
+                    <a:bodyPr/>
+                    <a:lstStyle/>
+                    <a:p>
+                      <a:pPr algn="ctr"/>
+                      <a:r>
+                        <a:rPr lang="en-US" dirty="0" smtClean="0"/>
+                        <a:t>64 MB to 1 GB</a:t>
+                      </a:r>
+                      <a:endParaRPr lang="en-US" dirty="0"/>
+                    </a:p>
+                  </a:txBody>
+                  <a:tcPr/>
+                </a:tc>
+                <a:tc>
+                  <a:txBody>
+                    <a:bodyPr/>
+                    <a:lstStyle/>
+                    <a:p>
+                      <a:pPr algn="ctr"/>
+                      <a:r>
+                        <a:rPr lang="en-US" dirty="0" smtClean="0"/>
+                        <a:t>8</a:t>
+                      </a:r>
+                      <a:endParaRPr lang="en-US" dirty="0"/>
+                    </a:p>
+                  </a:txBody>
+                  <a:tcPr/>
+                </a:tc>
+              </a:tr>
+              <a:tr h="370840">
+                <a:tc>
+                  <a:txBody>
+                    <a:bodyPr/>
+                    <a:lstStyle/>
+                    <a:p>
+                      <a:pPr algn="ctr"/>
+                      <a:r>
+                        <a:rPr lang="en-US" dirty="0" smtClean="0"/>
+                        <a:t>Greater</a:t>
+                      </a:r>
+                      <a:r>
+                        <a:rPr lang="en-US" baseline="0" dirty="0" smtClean="0"/>
+                        <a:t> than 1 GB</a:t>
+                      </a:r>
+                      <a:endParaRPr lang="en-US" dirty="0"/>
+                    </a:p>
+                  </a:txBody>
+                  <a:tcPr/>
+                </a:tc>
+                <a:tc>
+                  <a:txBody>
+                    <a:bodyPr/>
+                    <a:lstStyle/>
+                    <a:p>
+                      <a:pPr algn="ctr"/>
+                      <a:r>
+                        <a:rPr lang="en-US" dirty="0" smtClean="0"/>
+                        <a:t>16</a:t>
+                      </a:r>
+                      <a:endParaRPr lang="en-US" dirty="0"/>
+                    </a:p>
+                  </a:txBody>
+                  <a:tcPr/>
+                </a:tc>
+              </a:tr>
+            </a:tbl>
+          </a:graphicData>
+        </a:graphic>
+      </p:graphicFrame>
+      <p:sp>
+        <p:nvSpPr>
+          <p:cNvPr id="5" name="Content Placeholder 2"/>
+          <p:cNvSpPr txBox="1">
+            <a:spLocks/>
+          </p:cNvSpPr>
+          <p:nvPr/>
+        </p:nvSpPr>
+        <p:spPr>
+          <a:xfrm>
+            <a:off x="457200" y="3952875"/>
+            <a:ext cx="8229600" cy="2066925"/>
+          </a:xfrm>
+          <a:prstGeom prst="rect">
+            <a:avLst/>
+          </a:prstGeom>
+        </p:spPr>
+        <p:txBody>
+          <a:bodyPr vert="horz" lIns="91440" tIns="45720" rIns="91440" bIns="45720" rtlCol="0">
+            <a:normAutofit/>
+          </a:bodyPr>
+          <a:lstStyle>
+            <a:lvl1pPr marL="342900" indent="-342900" algn="l" defTabSz="457200" rtl="0" eaLnBrk="1" latinLnBrk="0" hangingPunct="1">
+              <a:spcBef>
+                <a:spcPct val="20000"/>
+              </a:spcBef>
+              <a:buFont typeface="Wingdings" charset="2"/>
+              <a:buChar char="§"/>
+              <a:defRPr sz="3000" kern="1200">
+                <a:solidFill>
+                  <a:schemeClr val="tx2"/>
+                </a:solidFill>
+                <a:latin typeface="+mn-lt"/>
+                <a:ea typeface="+mn-ea"/>
+                <a:cs typeface="+mn-cs"/>
+              </a:defRPr>
+            </a:lvl1pPr>
+            <a:lvl2pPr marL="742950" indent="-285750" algn="l" defTabSz="457200" rtl="0" eaLnBrk="1" latinLnBrk="0" hangingPunct="1">
+              <a:spcBef>
+                <a:spcPct val="20000"/>
+              </a:spcBef>
+              <a:buFont typeface="Wingdings" charset="2"/>
+              <a:buChar char="§"/>
+              <a:defRPr sz="2600" kern="1200">
+                <a:solidFill>
+                  <a:srgbClr val="474947"/>
+                </a:solidFill>
+                <a:latin typeface="+mn-lt"/>
+                <a:ea typeface="+mn-ea"/>
+                <a:cs typeface="+mn-cs"/>
+              </a:defRPr>
+            </a:lvl2pPr>
+            <a:lvl3pPr marL="1143000" indent="-228600" algn="l" defTabSz="457200" rtl="0" eaLnBrk="1" latinLnBrk="0" hangingPunct="1">
+              <a:spcBef>
+                <a:spcPct val="20000"/>
+              </a:spcBef>
+              <a:buFont typeface="Wingdings" charset="2"/>
+              <a:buChar char="§"/>
+              <a:defRPr sz="2200" kern="1200">
+                <a:solidFill>
+                  <a:srgbClr val="474947"/>
+                </a:solidFill>
+                <a:latin typeface="+mn-lt"/>
+                <a:ea typeface="+mn-ea"/>
+                <a:cs typeface="+mn-cs"/>
+              </a:defRPr>
+            </a:lvl3pPr>
+            <a:lvl4pPr marL="1600200" indent="-228600" algn="l" defTabSz="457200" rtl="0" eaLnBrk="1" latinLnBrk="0" hangingPunct="1">
+              <a:spcBef>
+                <a:spcPct val="20000"/>
+              </a:spcBef>
+              <a:buFont typeface="Wingdings" charset="2"/>
+              <a:buChar char="§"/>
+              <a:defRPr sz="2000" kern="1200">
+                <a:solidFill>
+                  <a:srgbClr val="474947"/>
+                </a:solidFill>
+                <a:latin typeface="+mn-lt"/>
+                <a:ea typeface="+mn-ea"/>
+                <a:cs typeface="+mn-cs"/>
+              </a:defRPr>
+            </a:lvl4pPr>
+            <a:lvl5pPr marL="2057400" indent="-228600" algn="l" defTabSz="457200" rtl="0" eaLnBrk="1" latinLnBrk="0" hangingPunct="1">
+              <a:spcBef>
+                <a:spcPct val="20000"/>
+              </a:spcBef>
+              <a:buFont typeface="Wingdings" charset="2"/>
+              <a:buChar char="§"/>
+              <a:defRPr sz="1800" kern="1200">
+                <a:solidFill>
+                  <a:srgbClr val="474947"/>
+                </a:solidFill>
+                <a:latin typeface="+mn-lt"/>
+                <a:ea typeface="+mn-ea"/>
+                <a:cs typeface="+mn-cs"/>
+              </a:defRPr>
+            </a:lvl5pPr>
+            <a:lvl6pPr marL="2514600" indent="-228600" algn="l" defTabSz="457200" rtl="0" eaLnBrk="1" latinLnBrk="0" hangingPunct="1">
+              <a:spcBef>
+                <a:spcPct val="20000"/>
+              </a:spcBef>
+              <a:buFont typeface="Arial"/>
+              <a:buChar char="•"/>
+              <a:defRPr sz="2000" kern="1200">
+                <a:solidFill>
+                  <a:schemeClr val="tx1"/>
+                </a:solidFill>
+                <a:latin typeface="+mn-lt"/>
+                <a:ea typeface="+mn-ea"/>
+                <a:cs typeface="+mn-cs"/>
+              </a:defRPr>
+            </a:lvl6pPr>
+            <a:lvl7pPr marL="2971800" indent="-228600" algn="l" defTabSz="457200" rtl="0" eaLnBrk="1" latinLnBrk="0" hangingPunct="1">
+              <a:spcBef>
+                <a:spcPct val="20000"/>
+              </a:spcBef>
+              <a:buFont typeface="Arial"/>
+              <a:buChar char="•"/>
+              <a:defRPr sz="2000" kern="1200">
+                <a:solidFill>
+                  <a:schemeClr val="tx1"/>
+                </a:solidFill>
+                <a:latin typeface="+mn-lt"/>
+                <a:ea typeface="+mn-ea"/>
+                <a:cs typeface="+mn-cs"/>
+              </a:defRPr>
+            </a:lvl7pPr>
+            <a:lvl8pPr marL="3429000" indent="-228600" algn="l" defTabSz="457200" rtl="0" eaLnBrk="1" latinLnBrk="0" hangingPunct="1">
+              <a:spcBef>
+                <a:spcPct val="20000"/>
+              </a:spcBef>
+              <a:buFont typeface="Arial"/>
+              <a:buChar char="•"/>
+              <a:defRPr sz="2000" kern="1200">
+                <a:solidFill>
+                  <a:schemeClr val="tx1"/>
+                </a:solidFill>
+                <a:latin typeface="+mn-lt"/>
+                <a:ea typeface="+mn-ea"/>
+                <a:cs typeface="+mn-cs"/>
+              </a:defRPr>
+            </a:lvl8pPr>
+            <a:lvl9pPr marL="3886200" indent="-228600" algn="l" defTabSz="457200" rtl="0" eaLnBrk="1" latinLnBrk="0" hangingPunct="1">
+              <a:spcBef>
+                <a:spcPct val="20000"/>
+              </a:spcBef>
+              <a:buFont typeface="Arial"/>
+              <a:buChar char="•"/>
+              <a:defRPr sz="2000" kern="1200">
+                <a:solidFill>
+                  <a:schemeClr val="tx1"/>
+                </a:solidFill>
+                <a:latin typeface="+mn-lt"/>
+                <a:ea typeface="+mn-ea"/>
+                <a:cs typeface="+mn-cs"/>
+              </a:defRPr>
+            </a:lvl9pPr>
+          </a:lstStyle>
+          <a:p>
+            <a:pPr marL="0" indent="0">
+              <a:buNone/>
+            </a:pPr>
+            <a:r>
+              <a:rPr lang="en-US" dirty="0" smtClean="0"/>
+              <a:t>Special case for SQL 2014+</a:t>
+            </a:r>
+          </a:p>
+          <a:p>
+            <a:r>
+              <a:rPr lang="en-US" dirty="0" smtClean="0"/>
+              <a:t>Compute current log size / growth amount</a:t>
+            </a:r>
+          </a:p>
+          <a:p>
+            <a:r>
+              <a:rPr lang="en-US" dirty="0" smtClean="0"/>
+              <a:t>If greater than 8, add only 1 new VLF</a:t>
+            </a:r>
+            <a:endParaRPr lang="en-US" dirty="0"/>
+          </a:p>
+        </p:txBody>
+      </p:sp>
+    </p:spTree>
+    <p:extLst>
+      <p:ext uri="{BB962C8B-B14F-4D97-AF65-F5344CB8AC3E}">
+        <p14:creationId xmlns:p14="http://schemas.microsoft.com/office/powerpoint/2010/main" val="3274095779"/>
       </p:ext>
     </p:extLst>
   </p:cSld>

</xml_diff>

<commit_message>
Add decimal-separated LSN format.
</commit_message>
<xml_diff>
--- a/TransactionLog.pptx
+++ b/TransactionLog.pptx
@@ -5,7 +5,7 @@
     <p:sldMasterId id="2147483648" r:id="rId1"/>
   </p:sldMasterIdLst>
   <p:notesMasterIdLst>
-    <p:notesMasterId r:id="rId33"/>
+    <p:notesMasterId r:id="rId34"/>
   </p:notesMasterIdLst>
   <p:sldIdLst>
     <p:sldId id="328" r:id="rId2"/>
@@ -39,6 +39,7 @@
     <p:sldId id="352" r:id="rId30"/>
     <p:sldId id="355" r:id="rId31"/>
     <p:sldId id="357" r:id="rId32"/>
+    <p:sldId id="359" r:id="rId33"/>
   </p:sldIdLst>
   <p:sldSz cx="9144000" cy="6858000" type="screen4x3"/>
   <p:notesSz cx="6858000" cy="9144000"/>
@@ -238,7 +239,7 @@
           <a:p>
             <a:fld id="{2EDCB34D-5EC2-4739-9693-E425457AC201}" type="datetimeFigureOut">
               <a:rPr lang="en-US" smtClean="0"/>
-              <a:t>08/17/2016</a:t>
+              <a:t>8/30/2016</a:t>
             </a:fld>
             <a:endParaRPr lang="en-US"/>
           </a:p>
@@ -824,7 +825,7 @@
             <a:fld id="{5942B21B-2ADA-A040-A652-A7305E1B99FE}" type="datetimeFigureOut">
               <a:rPr lang="en-US" smtClean="0"/>
               <a:pPr/>
-              <a:t>08/17/2016</a:t>
+              <a:t>8/30/2016</a:t>
             </a:fld>
             <a:endParaRPr lang="en-US" dirty="0"/>
           </a:p>
@@ -1014,7 +1015,7 @@
           <a:p>
             <a:fld id="{5942B21B-2ADA-A040-A652-A7305E1B99FE}" type="datetimeFigureOut">
               <a:rPr lang="en-US" smtClean="0"/>
-              <a:t>08/17/2016</a:t>
+              <a:t>8/30/2016</a:t>
             </a:fld>
             <a:endParaRPr lang="en-US"/>
           </a:p>
@@ -1138,7 +1139,7 @@
             <a:fld id="{5942B21B-2ADA-A040-A652-A7305E1B99FE}" type="datetimeFigureOut">
               <a:rPr lang="en-US" smtClean="0"/>
               <a:pPr/>
-              <a:t>08/17/2016</a:t>
+              <a:t>8/30/2016</a:t>
             </a:fld>
             <a:r>
               <a:rPr lang="en-US"/>
@@ -1409,7 +1410,7 @@
             <a:fld id="{5942B21B-2ADA-A040-A652-A7305E1B99FE}" type="datetimeFigureOut">
               <a:rPr lang="en-US" smtClean="0"/>
               <a:pPr/>
-              <a:t>08/17/2016</a:t>
+              <a:t>8/30/2016</a:t>
             </a:fld>
             <a:r>
               <a:rPr lang="en-US" dirty="0"/>
@@ -1679,7 +1680,7 @@
             <a:fld id="{5942B21B-2ADA-A040-A652-A7305E1B99FE}" type="datetimeFigureOut">
               <a:rPr lang="en-US" smtClean="0"/>
               <a:pPr/>
-              <a:t>08/17/2016</a:t>
+              <a:t>8/30/2016</a:t>
             </a:fld>
             <a:r>
               <a:rPr lang="en-US" dirty="0"/>
@@ -2019,7 +2020,7 @@
             <a:fld id="{5942B21B-2ADA-A040-A652-A7305E1B99FE}" type="datetimeFigureOut">
               <a:rPr lang="en-US" smtClean="0"/>
               <a:pPr/>
-              <a:t>08/17/2016</a:t>
+              <a:t>8/30/2016</a:t>
             </a:fld>
             <a:r>
               <a:rPr lang="en-US" dirty="0"/>
@@ -2360,7 +2361,7 @@
             <a:fld id="{5942B21B-2ADA-A040-A652-A7305E1B99FE}" type="datetimeFigureOut">
               <a:rPr lang="en-US" smtClean="0"/>
               <a:pPr/>
-              <a:t>08/17/2016</a:t>
+              <a:t>8/30/2016</a:t>
             </a:fld>
             <a:r>
               <a:rPr lang="en-US" dirty="0"/>
@@ -2875,7 +2876,7 @@
             <a:fld id="{5942B21B-2ADA-A040-A652-A7305E1B99FE}" type="datetimeFigureOut">
               <a:rPr lang="en-US" smtClean="0"/>
               <a:pPr/>
-              <a:t>08/17/2016</a:t>
+              <a:t>8/30/2016</a:t>
             </a:fld>
             <a:r>
               <a:rPr lang="en-US" dirty="0"/>
@@ -3084,7 +3085,7 @@
             <a:fld id="{5942B21B-2ADA-A040-A652-A7305E1B99FE}" type="datetimeFigureOut">
               <a:rPr lang="en-US" smtClean="0"/>
               <a:pPr/>
-              <a:t>08/17/2016</a:t>
+              <a:t>8/30/2016</a:t>
             </a:fld>
             <a:r>
               <a:rPr lang="en-US" dirty="0"/>
@@ -3271,7 +3272,7 @@
             <a:fld id="{5942B21B-2ADA-A040-A652-A7305E1B99FE}" type="datetimeFigureOut">
               <a:rPr lang="en-US" smtClean="0"/>
               <a:pPr/>
-              <a:t>08/17/2016</a:t>
+              <a:t>8/30/2016</a:t>
             </a:fld>
             <a:r>
               <a:rPr lang="en-US" dirty="0"/>
@@ -3602,7 +3603,7 @@
             <a:fld id="{5942B21B-2ADA-A040-A652-A7305E1B99FE}" type="datetimeFigureOut">
               <a:rPr lang="en-US" smtClean="0"/>
               <a:pPr/>
-              <a:t>08/17/2016</a:t>
+              <a:t>8/30/2016</a:t>
             </a:fld>
             <a:r>
               <a:rPr lang="en-US" dirty="0"/>
@@ -3910,7 +3911,7 @@
             <a:fld id="{5942B21B-2ADA-A040-A652-A7305E1B99FE}" type="datetimeFigureOut">
               <a:rPr lang="en-US" smtClean="0"/>
               <a:pPr/>
-              <a:t>08/17/2016</a:t>
+              <a:t>8/30/2016</a:t>
             </a:fld>
             <a:r>
               <a:rPr lang="en-US" dirty="0"/>
@@ -4189,7 +4190,7 @@
             <a:fld id="{5942B21B-2ADA-A040-A652-A7305E1B99FE}" type="datetimeFigureOut">
               <a:rPr lang="en-US" smtClean="0"/>
               <a:pPr/>
-              <a:t>08/17/2016</a:t>
+              <a:t>8/30/2016</a:t>
             </a:fld>
             <a:r>
               <a:rPr lang="en-US" dirty="0"/>
@@ -4867,7 +4868,7 @@
           </a:lstStyle>
           <a:p>
             <a:r>
-              <a:rPr lang="en-US" sz="3200" smtClean="0"/>
+              <a:rPr lang="en-US" sz="3200"/>
               <a:t>Visualize Your Transaction Log</a:t>
             </a:r>
             <a:endParaRPr lang="en-US" sz="3200" dirty="0"/>
@@ -7187,10 +7188,9 @@
           <a:lstStyle/>
           <a:p>
             <a:r>
-              <a:rPr lang="en-US" dirty="0" smtClean="0"/>
+              <a:rPr lang="en-US" dirty="0"/>
               <a:t>Physical vs Logical Log File</a:t>
             </a:r>
-            <a:endParaRPr lang="en-US" dirty="0"/>
           </a:p>
         </p:txBody>
       </p:sp>
@@ -7210,51 +7210,50 @@
           <a:lstStyle/>
           <a:p>
             <a:r>
-              <a:rPr lang="en-US" dirty="0" smtClean="0"/>
+              <a:rPr lang="en-US" dirty="0"/>
               <a:t>Logical Log File</a:t>
             </a:r>
           </a:p>
           <a:p>
             <a:pPr lvl="1"/>
             <a:r>
-              <a:rPr lang="en-US" dirty="0" smtClean="0"/>
+              <a:rPr lang="en-US" dirty="0"/>
               <a:t>Always growing</a:t>
             </a:r>
           </a:p>
           <a:p>
             <a:pPr lvl="1"/>
             <a:r>
-              <a:rPr lang="en-US" dirty="0" smtClean="0"/>
+              <a:rPr lang="en-US" dirty="0"/>
               <a:t>Write once / read many</a:t>
             </a:r>
           </a:p>
           <a:p>
             <a:r>
-              <a:rPr lang="en-US" dirty="0" smtClean="0"/>
+              <a:rPr lang="en-US" dirty="0"/>
               <a:t>Physical Log File</a:t>
             </a:r>
           </a:p>
           <a:p>
             <a:pPr lvl="1"/>
             <a:r>
-              <a:rPr lang="en-US" dirty="0" smtClean="0"/>
+              <a:rPr lang="en-US" dirty="0"/>
               <a:t>Only grows when full (or manually grown)</a:t>
             </a:r>
           </a:p>
           <a:p>
             <a:pPr lvl="1"/>
             <a:r>
-              <a:rPr lang="en-US" dirty="0" smtClean="0"/>
+              <a:rPr lang="en-US" dirty="0"/>
               <a:t>Divided into virtual log files (VLFs)</a:t>
             </a:r>
           </a:p>
           <a:p>
             <a:pPr lvl="1"/>
             <a:r>
-              <a:rPr lang="en-US" dirty="0" smtClean="0"/>
+              <a:rPr lang="en-US" dirty="0"/>
               <a:t>VLFs are inactivated when possible and over-written</a:t>
             </a:r>
-            <a:endParaRPr lang="en-US" dirty="0"/>
           </a:p>
         </p:txBody>
       </p:sp>
@@ -7347,15 +7346,7 @@
             <a:pPr lvl="1"/>
             <a:r>
               <a:rPr lang="en-US" dirty="0"/>
-              <a:t>Log Block offset (512-byte chunks, not </a:t>
-            </a:r>
-            <a:r>
-              <a:rPr lang="en-US" dirty="0" smtClean="0"/>
-              <a:t>necessarily contiguous</a:t>
-            </a:r>
-            <a:r>
-              <a:rPr lang="en-US" dirty="0"/>
-              <a:t>)</a:t>
+              <a:t>Log Block offset (512-byte chunks, not necessarily contiguous)</a:t>
             </a:r>
           </a:p>
           <a:p>
@@ -7368,15 +7359,7 @@
           <a:p>
             <a:r>
               <a:rPr lang="en-US" dirty="0"/>
-              <a:t>The LSN is in a very real way a pointer into the </a:t>
-            </a:r>
-            <a:r>
-              <a:rPr lang="en-US" dirty="0" smtClean="0"/>
-              <a:t>(logical) log </a:t>
-            </a:r>
-            <a:r>
-              <a:rPr lang="en-US" dirty="0"/>
-              <a:t>file</a:t>
+              <a:t>The LSN is in a very real way a pointer into the (logical) log file</a:t>
             </a:r>
           </a:p>
         </p:txBody>
@@ -7472,14 +7455,14 @@
           <p:nvPr>
             <p:extLst>
               <p:ext uri="{D42A27DB-BD31-4B8C-83A1-F6EECF244321}">
-                <p14:modId xmlns:p14="http://schemas.microsoft.com/office/powerpoint/2010/main" val="2590883591"/>
+                <p14:modId xmlns:p14="http://schemas.microsoft.com/office/powerpoint/2010/main" val="388941808"/>
               </p:ext>
             </p:extLst>
           </p:nvPr>
         </p:nvGraphicFramePr>
         <p:xfrm>
           <a:off x="457200" y="2352675"/>
-          <a:ext cx="8229600" cy="1779746"/>
+          <a:ext cx="8229600" cy="2419826"/>
         </p:xfrm>
         <a:graphic>
           <a:graphicData uri="http://schemas.openxmlformats.org/drawingml/2006/table">
@@ -7491,21 +7474,21 @@
                 <a:gridCol w="1895475">
                   <a:extLst>
                     <a:ext uri="{9D8B030D-6E8A-4147-A177-3AD203B41FA5}">
-                      <a16:colId xmlns="" xmlns:a16="http://schemas.microsoft.com/office/drawing/2014/main" val="20000"/>
+                      <a16:colId xmlns:a16="http://schemas.microsoft.com/office/drawing/2014/main" val="20000"/>
                     </a:ext>
                   </a:extLst>
                 </a:gridCol>
                 <a:gridCol w="3171825">
                   <a:extLst>
                     <a:ext uri="{9D8B030D-6E8A-4147-A177-3AD203B41FA5}">
-                      <a16:colId xmlns="" xmlns:a16="http://schemas.microsoft.com/office/drawing/2014/main" val="20001"/>
+                      <a16:colId xmlns:a16="http://schemas.microsoft.com/office/drawing/2014/main" val="20001"/>
                     </a:ext>
                   </a:extLst>
                 </a:gridCol>
                 <a:gridCol w="3162300">
                   <a:extLst>
                     <a:ext uri="{9D8B030D-6E8A-4147-A177-3AD203B41FA5}">
-                      <a16:colId xmlns="" xmlns:a16="http://schemas.microsoft.com/office/drawing/2014/main" val="20002"/>
+                      <a16:colId xmlns:a16="http://schemas.microsoft.com/office/drawing/2014/main" val="20002"/>
                     </a:ext>
                   </a:extLst>
                 </a:gridCol>
@@ -7552,7 +7535,7 @@
                 </a:tc>
                 <a:extLst>
                   <a:ext uri="{0D108BD9-81ED-4DB2-BD59-A6C34878D82A}">
-                    <a16:rowId xmlns="" xmlns:a16="http://schemas.microsoft.com/office/drawing/2014/main" val="10000"/>
+                    <a16:rowId xmlns:a16="http://schemas.microsoft.com/office/drawing/2014/main" val="10000"/>
                   </a:ext>
                 </a:extLst>
               </a:tr>
@@ -7618,7 +7601,7 @@
                 </a:tc>
                 <a:extLst>
                   <a:ext uri="{0D108BD9-81ED-4DB2-BD59-A6C34878D82A}">
-                    <a16:rowId xmlns="" xmlns:a16="http://schemas.microsoft.com/office/drawing/2014/main" val="10001"/>
+                    <a16:rowId xmlns:a16="http://schemas.microsoft.com/office/drawing/2014/main" val="10001"/>
                   </a:ext>
                 </a:extLst>
               </a:tr>
@@ -7689,7 +7672,7 @@
                 </a:tc>
                 <a:extLst>
                   <a:ext uri="{0D108BD9-81ED-4DB2-BD59-A6C34878D82A}">
-                    <a16:rowId xmlns="" xmlns:a16="http://schemas.microsoft.com/office/drawing/2014/main" val="10002"/>
+                    <a16:rowId xmlns:a16="http://schemas.microsoft.com/office/drawing/2014/main" val="10002"/>
                   </a:ext>
                 </a:extLst>
               </a:tr>
@@ -7735,7 +7718,58 @@
                 </a:tc>
                 <a:extLst>
                   <a:ext uri="{0D108BD9-81ED-4DB2-BD59-A6C34878D82A}">
-                    <a16:rowId xmlns="" xmlns:a16="http://schemas.microsoft.com/office/drawing/2014/main" val="10003"/>
+                    <a16:rowId xmlns:a16="http://schemas.microsoft.com/office/drawing/2014/main" val="10003"/>
+                  </a:ext>
+                </a:extLst>
+              </a:tr>
+              <a:tr h="370840">
+                <a:tc>
+                  <a:txBody>
+                    <a:bodyPr/>
+                    <a:lstStyle/>
+                    <a:p>
+                      <a:r>
+                        <a:rPr lang="en-US" dirty="0"/>
+                        <a:t>Colon-separated (decimal)</a:t>
+                      </a:r>
+                    </a:p>
+                  </a:txBody>
+                  <a:tcPr/>
+                </a:tc>
+                <a:tc>
+                  <a:txBody>
+                    <a:bodyPr/>
+                    <a:lstStyle/>
+                    <a:p>
+                      <a:r>
+                        <a:rPr lang="en-US" dirty="0"/>
+                        <a:t>448:107:5</a:t>
+                      </a:r>
+                    </a:p>
+                  </a:txBody>
+                  <a:tcPr/>
+                </a:tc>
+                <a:tc>
+                  <a:txBody>
+                    <a:bodyPr/>
+                    <a:lstStyle/>
+                    <a:p>
+                      <a:r>
+                        <a:rPr lang="en-US" dirty="0"/>
+                        <a:t>Input to </a:t>
+                      </a:r>
+                      <a:r>
+                        <a:rPr lang="en-US" dirty="0" err="1"/>
+                        <a:t>fn_dblog</a:t>
+                      </a:r>
+                      <a:endParaRPr lang="en-US" dirty="0"/>
+                    </a:p>
+                  </a:txBody>
+                  <a:tcPr/>
+                </a:tc>
+                <a:extLst>
+                  <a:ext uri="{0D108BD9-81ED-4DB2-BD59-A6C34878D82A}">
+                    <a16:rowId xmlns:a16="http://schemas.microsoft.com/office/drawing/2014/main" val="3543017676"/>
                   </a:ext>
                 </a:extLst>
               </a:tr>
@@ -7753,7 +7787,7 @@
         </p:nvSpPr>
         <p:spPr>
           <a:xfrm>
-            <a:off x="457200" y="4284821"/>
+            <a:off x="457200" y="4877015"/>
             <a:ext cx="8229600" cy="628650"/>
           </a:xfrm>
           <a:prstGeom prst="rect">
@@ -8432,18 +8466,18 @@
           <a:p>
             <a:pPr lvl="1"/>
             <a:r>
-              <a:rPr lang="en-US" dirty="0" smtClean="0"/>
+              <a:rPr lang="en-US" dirty="0"/>
               <a:t>Instance-wide [</a:t>
             </a:r>
             <a:r>
-              <a:rPr lang="en-US" sz="1700" dirty="0" err="1" smtClean="0">
+              <a:rPr lang="en-US" sz="1700" dirty="0" err="1">
                 <a:latin typeface="Courier New" panose="02070309020205020404" pitchFamily="49" charset="0"/>
                 <a:cs typeface="Courier New" panose="02070309020205020404" pitchFamily="49" charset="0"/>
               </a:rPr>
               <a:t>sp_configure</a:t>
             </a:r>
             <a:r>
-              <a:rPr lang="en-US" sz="1700" dirty="0" smtClean="0">
+              <a:rPr lang="en-US" sz="1700" dirty="0">
                 <a:latin typeface="Courier New" panose="02070309020205020404" pitchFamily="49" charset="0"/>
                 <a:cs typeface="Courier New" panose="02070309020205020404" pitchFamily="49" charset="0"/>
               </a:rPr>
@@ -8454,42 +8488,41 @@
               <a:t>'</a:t>
             </a:r>
             <a:r>
-              <a:rPr lang="en-US" sz="1700" dirty="0" smtClean="0">
+              <a:rPr lang="en-US" sz="1700" dirty="0">
                 <a:latin typeface="Courier New" panose="02070309020205020404" pitchFamily="49" charset="0"/>
                 <a:cs typeface="Courier New" panose="02070309020205020404" pitchFamily="49" charset="0"/>
               </a:rPr>
               <a:t>recovery interval (</a:t>
             </a:r>
             <a:r>
-              <a:rPr lang="en-US" sz="1700" smtClean="0">
+              <a:rPr lang="en-US" sz="1700">
                 <a:latin typeface="Courier New" panose="02070309020205020404" pitchFamily="49" charset="0"/>
                 <a:cs typeface="Courier New" panose="02070309020205020404" pitchFamily="49" charset="0"/>
               </a:rPr>
               <a:t>min)</a:t>
             </a:r>
             <a:r>
-              <a:rPr lang="en-US" sz="1600" smtClean="0"/>
+              <a:rPr lang="en-US" sz="1600"/>
               <a:t>'</a:t>
             </a:r>
             <a:r>
-              <a:rPr lang="en-US" sz="1700" smtClean="0">
+              <a:rPr lang="en-US" sz="1700">
                 <a:latin typeface="Courier New" panose="02070309020205020404" pitchFamily="49" charset="0"/>
                 <a:cs typeface="Courier New" panose="02070309020205020404" pitchFamily="49" charset="0"/>
               </a:rPr>
               <a:t>, </a:t>
             </a:r>
             <a:r>
-              <a:rPr lang="en-US" sz="1700" dirty="0" smtClean="0">
+              <a:rPr lang="en-US" sz="1700" dirty="0">
                 <a:latin typeface="Courier New" panose="02070309020205020404" pitchFamily="49" charset="0"/>
                 <a:cs typeface="Courier New" panose="02070309020205020404" pitchFamily="49" charset="0"/>
               </a:rPr>
               <a:t>2</a:t>
             </a:r>
             <a:r>
-              <a:rPr lang="en-US" dirty="0" smtClean="0"/>
+              <a:rPr lang="en-US" dirty="0"/>
               <a:t>]</a:t>
             </a:r>
-            <a:endParaRPr lang="en-US" dirty="0"/>
           </a:p>
           <a:p>
             <a:r>
@@ -8500,56 +8533,55 @@
           <a:p>
             <a:pPr lvl="1"/>
             <a:r>
-              <a:rPr lang="en-US" dirty="0" smtClean="0"/>
+              <a:rPr lang="en-US" dirty="0"/>
               <a:t>Database-specific</a:t>
             </a:r>
           </a:p>
           <a:p>
             <a:pPr lvl="1"/>
             <a:r>
-              <a:rPr lang="en-US" dirty="0" smtClean="0"/>
+              <a:rPr lang="en-US" dirty="0"/>
               <a:t>[</a:t>
             </a:r>
             <a:r>
-              <a:rPr lang="en-US" sz="1700" dirty="0" smtClean="0">
+              <a:rPr lang="en-US" sz="1700" dirty="0">
                 <a:latin typeface="Courier New" panose="02070309020205020404" pitchFamily="49" charset="0"/>
                 <a:cs typeface="Courier New" panose="02070309020205020404" pitchFamily="49" charset="0"/>
               </a:rPr>
               <a:t>alter database </a:t>
             </a:r>
             <a:r>
-              <a:rPr lang="en-US" sz="1700" dirty="0" err="1" smtClean="0">
+              <a:rPr lang="en-US" sz="1700" dirty="0" err="1">
                 <a:latin typeface="Courier New" panose="02070309020205020404" pitchFamily="49" charset="0"/>
                 <a:cs typeface="Courier New" panose="02070309020205020404" pitchFamily="49" charset="0"/>
               </a:rPr>
               <a:t>myDB</a:t>
             </a:r>
             <a:r>
-              <a:rPr lang="en-US" sz="1700" dirty="0" smtClean="0">
+              <a:rPr lang="en-US" sz="1700" dirty="0">
                 <a:latin typeface="Courier New" panose="02070309020205020404" pitchFamily="49" charset="0"/>
                 <a:cs typeface="Courier New" panose="02070309020205020404" pitchFamily="49" charset="0"/>
               </a:rPr>
               <a:t> set </a:t>
             </a:r>
             <a:r>
-              <a:rPr lang="en-US" sz="1700" dirty="0" err="1" smtClean="0">
+              <a:rPr lang="en-US" sz="1700" dirty="0" err="1">
                 <a:latin typeface="Courier New" panose="02070309020205020404" pitchFamily="49" charset="0"/>
                 <a:cs typeface="Courier New" panose="02070309020205020404" pitchFamily="49" charset="0"/>
               </a:rPr>
               <a:t>target_recovery_time</a:t>
             </a:r>
             <a:r>
-              <a:rPr lang="en-US" sz="1700" dirty="0" smtClean="0">
+              <a:rPr lang="en-US" sz="1700" dirty="0">
                 <a:latin typeface="Courier New" panose="02070309020205020404" pitchFamily="49" charset="0"/>
                 <a:cs typeface="Courier New" panose="02070309020205020404" pitchFamily="49" charset="0"/>
               </a:rPr>
               <a:t> = 2 minutes</a:t>
             </a:r>
             <a:r>
-              <a:rPr lang="en-US" dirty="0" smtClean="0"/>
+              <a:rPr lang="en-US" dirty="0"/>
               <a:t>]</a:t>
             </a:r>
-            <a:endParaRPr lang="en-US" dirty="0"/>
           </a:p>
           <a:p>
             <a:r>
@@ -8561,13 +8593,8 @@
             <a:pPr lvl="1"/>
             <a:r>
               <a:rPr lang="en-US" dirty="0"/>
-              <a:t>During operations such as backup, </a:t>
-            </a:r>
-            <a:r>
-              <a:rPr lang="en-US" dirty="0" smtClean="0"/>
-              <a:t>snapshots, shutdown</a:t>
-            </a:r>
-            <a:endParaRPr lang="en-US" dirty="0"/>
+              <a:t>During operations such as backup, snapshots, shutdown</a:t>
+            </a:r>
           </a:p>
           <a:p>
             <a:r>
@@ -8929,27 +8956,14 @@
           </a:p>
           <a:p>
             <a:r>
-              <a:rPr lang="en-US" dirty="0" smtClean="0"/>
-              <a:t>Flushing &amp; clearing </a:t>
-            </a:r>
-            <a:r>
-              <a:rPr lang="en-US" dirty="0"/>
-              <a:t>the </a:t>
-            </a:r>
-            <a:r>
-              <a:rPr lang="en-US" dirty="0" smtClean="0"/>
-              <a:t>log / checkpoints</a:t>
-            </a:r>
-            <a:endParaRPr lang="en-US" dirty="0"/>
-          </a:p>
-          <a:p>
-            <a:r>
-              <a:rPr lang="en-US" dirty="0" smtClean="0"/>
-              <a:t>Rollback </a:t>
-            </a:r>
-            <a:r>
-              <a:rPr lang="en-US" dirty="0"/>
-              <a:t>operations</a:t>
+              <a:rPr lang="en-US" dirty="0"/>
+              <a:t>Flushing &amp; clearing the log / checkpoints</a:t>
+            </a:r>
+          </a:p>
+          <a:p>
+            <a:r>
+              <a:rPr lang="en-US" dirty="0"/>
+              <a:t>Rollback operations</a:t>
             </a:r>
           </a:p>
           <a:p>
@@ -9155,10 +9169,9 @@
           <a:lstStyle/>
           <a:p>
             <a:r>
-              <a:rPr lang="en-US" dirty="0" smtClean="0"/>
+              <a:rPr lang="en-US" dirty="0"/>
               <a:t>Creating new VLFs</a:t>
             </a:r>
-            <a:endParaRPr lang="en-US" dirty="0"/>
           </a:p>
         </p:txBody>
       </p:sp>
@@ -9188,10 +9201,9 @@
               <a:buNone/>
             </a:pPr>
             <a:r>
-              <a:rPr lang="en-US" dirty="0" smtClean="0"/>
+              <a:rPr lang="en-US" dirty="0"/>
               <a:t>My transaction log grew.  How many VLFs?</a:t>
             </a:r>
-            <a:endParaRPr lang="en-US" dirty="0"/>
           </a:p>
         </p:txBody>
       </p:sp>
@@ -9220,8 +9232,20 @@
                 <a:tableStyleId>{5C22544A-7EE6-4342-B048-85BDC9FD1C3A}</a:tableStyleId>
               </a:tblPr>
               <a:tblGrid>
-                <a:gridCol w="3048000"/>
-                <a:gridCol w="3048000"/>
+                <a:gridCol w="3048000">
+                  <a:extLst>
+                    <a:ext uri="{9D8B030D-6E8A-4147-A177-3AD203B41FA5}">
+                      <a16:colId xmlns:a16="http://schemas.microsoft.com/office/drawing/2014/main" val="20000"/>
+                    </a:ext>
+                  </a:extLst>
+                </a:gridCol>
+                <a:gridCol w="3048000">
+                  <a:extLst>
+                    <a:ext uri="{9D8B030D-6E8A-4147-A177-3AD203B41FA5}">
+                      <a16:colId xmlns:a16="http://schemas.microsoft.com/office/drawing/2014/main" val="20001"/>
+                    </a:ext>
+                  </a:extLst>
+                </a:gridCol>
               </a:tblGrid>
               <a:tr h="370840">
                 <a:tc>
@@ -9231,11 +9255,11 @@
                     <a:p>
                       <a:pPr algn="ctr"/>
                       <a:r>
-                        <a:rPr lang="en-US" dirty="0" smtClean="0"/>
+                        <a:rPr lang="en-US" dirty="0"/>
                         <a:t>Log</a:t>
                       </a:r>
                       <a:r>
-                        <a:rPr lang="en-US" baseline="0" dirty="0" smtClean="0"/>
+                        <a:rPr lang="en-US" baseline="0" dirty="0"/>
                         <a:t> growth size</a:t>
                       </a:r>
                       <a:endParaRPr lang="en-US" dirty="0"/>
@@ -9250,11 +9274,11 @@
                     <a:p>
                       <a:pPr algn="ctr"/>
                       <a:r>
-                        <a:rPr lang="en-US" dirty="0" smtClean="0"/>
+                        <a:rPr lang="en-US" dirty="0"/>
                         <a:t>New</a:t>
                       </a:r>
                       <a:r>
-                        <a:rPr lang="en-US" baseline="0" dirty="0" smtClean="0"/>
+                        <a:rPr lang="en-US" baseline="0" dirty="0"/>
                         <a:t> VLFs created</a:t>
                       </a:r>
                       <a:endParaRPr lang="en-US" dirty="0"/>
@@ -9262,6 +9286,11 @@
                   </a:txBody>
                   <a:tcPr/>
                 </a:tc>
+                <a:extLst>
+                  <a:ext uri="{0D108BD9-81ED-4DB2-BD59-A6C34878D82A}">
+                    <a16:rowId xmlns:a16="http://schemas.microsoft.com/office/drawing/2014/main" val="10000"/>
+                  </a:ext>
+                </a:extLst>
               </a:tr>
               <a:tr h="370840">
                 <a:tc>
@@ -9271,10 +9300,9 @@
                     <a:p>
                       <a:pPr algn="ctr"/>
                       <a:r>
-                        <a:rPr lang="en-US" dirty="0" smtClean="0"/>
+                        <a:rPr lang="en-US" dirty="0"/>
                         <a:t>1 to 64 MB</a:t>
                       </a:r>
-                      <a:endParaRPr lang="en-US" dirty="0"/>
                     </a:p>
                   </a:txBody>
                   <a:tcPr/>
@@ -9286,14 +9314,18 @@
                     <a:p>
                       <a:pPr algn="ctr"/>
                       <a:r>
-                        <a:rPr lang="en-US" dirty="0" smtClean="0"/>
+                        <a:rPr lang="en-US" dirty="0"/>
                         <a:t>4</a:t>
                       </a:r>
-                      <a:endParaRPr lang="en-US" dirty="0"/>
                     </a:p>
                   </a:txBody>
                   <a:tcPr/>
                 </a:tc>
+                <a:extLst>
+                  <a:ext uri="{0D108BD9-81ED-4DB2-BD59-A6C34878D82A}">
+                    <a16:rowId xmlns:a16="http://schemas.microsoft.com/office/drawing/2014/main" val="10001"/>
+                  </a:ext>
+                </a:extLst>
               </a:tr>
               <a:tr h="370840">
                 <a:tc>
@@ -9303,10 +9335,9 @@
                     <a:p>
                       <a:pPr algn="ctr"/>
                       <a:r>
-                        <a:rPr lang="en-US" dirty="0" smtClean="0"/>
+                        <a:rPr lang="en-US" dirty="0"/>
                         <a:t>64 MB to 1 GB</a:t>
                       </a:r>
-                      <a:endParaRPr lang="en-US" dirty="0"/>
                     </a:p>
                   </a:txBody>
                   <a:tcPr/>
@@ -9318,14 +9349,18 @@
                     <a:p>
                       <a:pPr algn="ctr"/>
                       <a:r>
-                        <a:rPr lang="en-US" dirty="0" smtClean="0"/>
+                        <a:rPr lang="en-US" dirty="0"/>
                         <a:t>8</a:t>
                       </a:r>
-                      <a:endParaRPr lang="en-US" dirty="0"/>
                     </a:p>
                   </a:txBody>
                   <a:tcPr/>
                 </a:tc>
+                <a:extLst>
+                  <a:ext uri="{0D108BD9-81ED-4DB2-BD59-A6C34878D82A}">
+                    <a16:rowId xmlns:a16="http://schemas.microsoft.com/office/drawing/2014/main" val="10002"/>
+                  </a:ext>
+                </a:extLst>
               </a:tr>
               <a:tr h="370840">
                 <a:tc>
@@ -9335,11 +9370,11 @@
                     <a:p>
                       <a:pPr algn="ctr"/>
                       <a:r>
-                        <a:rPr lang="en-US" dirty="0" smtClean="0"/>
+                        <a:rPr lang="en-US" dirty="0"/>
                         <a:t>Greater</a:t>
                       </a:r>
                       <a:r>
-                        <a:rPr lang="en-US" baseline="0" dirty="0" smtClean="0"/>
+                        <a:rPr lang="en-US" baseline="0" dirty="0"/>
                         <a:t> than 1 GB</a:t>
                       </a:r>
                       <a:endParaRPr lang="en-US" dirty="0"/>
@@ -9354,14 +9389,18 @@
                     <a:p>
                       <a:pPr algn="ctr"/>
                       <a:r>
-                        <a:rPr lang="en-US" dirty="0" smtClean="0"/>
+                        <a:rPr lang="en-US" dirty="0"/>
                         <a:t>16</a:t>
                       </a:r>
-                      <a:endParaRPr lang="en-US" dirty="0"/>
                     </a:p>
                   </a:txBody>
                   <a:tcPr/>
                 </a:tc>
+                <a:extLst>
+                  <a:ext uri="{0D108BD9-81ED-4DB2-BD59-A6C34878D82A}">
+                    <a16:rowId xmlns:a16="http://schemas.microsoft.com/office/drawing/2014/main" val="10003"/>
+                  </a:ext>
+                </a:extLst>
               </a:tr>
             </a:tbl>
           </a:graphicData>
@@ -9530,22 +9569,21 @@
               <a:buNone/>
             </a:pPr>
             <a:r>
-              <a:rPr lang="en-US" dirty="0" smtClean="0"/>
+              <a:rPr lang="en-US" dirty="0"/>
               <a:t>Special case for SQL 2014+</a:t>
             </a:r>
           </a:p>
           <a:p>
             <a:r>
-              <a:rPr lang="en-US" dirty="0" smtClean="0"/>
+              <a:rPr lang="en-US" dirty="0"/>
               <a:t>Compute current log size / growth amount</a:t>
             </a:r>
           </a:p>
           <a:p>
             <a:r>
-              <a:rPr lang="en-US" dirty="0" smtClean="0"/>
+              <a:rPr lang="en-US" dirty="0"/>
               <a:t>If greater than 8, add only 1 new VLF</a:t>
             </a:r>
-            <a:endParaRPr lang="en-US" dirty="0"/>
           </a:p>
         </p:txBody>
       </p:sp>
@@ -9553,6 +9591,122 @@
     <p:extLst>
       <p:ext uri="{BB962C8B-B14F-4D97-AF65-F5344CB8AC3E}">
         <p14:creationId xmlns:p14="http://schemas.microsoft.com/office/powerpoint/2010/main" val="3274095779"/>
+      </p:ext>
+    </p:extLst>
+  </p:cSld>
+  <p:clrMapOvr>
+    <a:masterClrMapping/>
+  </p:clrMapOvr>
+</p:sld>
+</file>
+
+<file path=ppt/slides/slide32.xml><?xml version="1.0" encoding="utf-8"?>
+<p:sld xmlns:a="http://schemas.openxmlformats.org/drawingml/2006/main" xmlns:r="http://schemas.openxmlformats.org/officeDocument/2006/relationships" xmlns:p="http://schemas.openxmlformats.org/presentationml/2006/main">
+  <p:cSld>
+    <p:spTree>
+      <p:nvGrpSpPr>
+        <p:cNvPr id="1" name=""/>
+        <p:cNvGrpSpPr/>
+        <p:nvPr/>
+      </p:nvGrpSpPr>
+      <p:grpSpPr>
+        <a:xfrm>
+          <a:off x="0" y="0"/>
+          <a:ext cx="0" cy="0"/>
+          <a:chOff x="0" y="0"/>
+          <a:chExt cx="0" cy="0"/>
+        </a:xfrm>
+      </p:grpSpPr>
+      <p:sp>
+        <p:nvSpPr>
+          <p:cNvPr id="2" name="Title 1"/>
+          <p:cNvSpPr>
+            <a:spLocks noGrp="1"/>
+          </p:cNvSpPr>
+          <p:nvPr>
+            <p:ph type="title"/>
+          </p:nvPr>
+        </p:nvSpPr>
+        <p:spPr/>
+        <p:txBody>
+          <a:bodyPr/>
+          <a:lstStyle/>
+          <a:p>
+            <a:r>
+              <a:rPr lang="en-US" dirty="0"/>
+              <a:t>VLF Trade-Offs</a:t>
+            </a:r>
+          </a:p>
+        </p:txBody>
+      </p:sp>
+      <p:sp>
+        <p:nvSpPr>
+          <p:cNvPr id="3" name="Content Placeholder 2"/>
+          <p:cNvSpPr>
+            <a:spLocks noGrp="1"/>
+          </p:cNvSpPr>
+          <p:nvPr>
+            <p:ph idx="1"/>
+          </p:nvPr>
+        </p:nvSpPr>
+        <p:spPr/>
+        <p:txBody>
+          <a:bodyPr/>
+          <a:lstStyle/>
+          <a:p>
+            <a:r>
+              <a:rPr lang="en-US" dirty="0"/>
+              <a:t>Too many VLFs create performance problems</a:t>
+            </a:r>
+          </a:p>
+          <a:p>
+            <a:pPr lvl="1"/>
+            <a:r>
+              <a:rPr lang="en-US" dirty="0"/>
+              <a:t>Slows noticeably any time log is read</a:t>
+            </a:r>
+          </a:p>
+          <a:p>
+            <a:pPr lvl="2"/>
+            <a:r>
+              <a:rPr lang="en-US" dirty="0"/>
+              <a:t>Start-up time for database, log reader, etc.</a:t>
+            </a:r>
+          </a:p>
+          <a:p>
+            <a:pPr lvl="1"/>
+            <a:r>
+              <a:rPr lang="en-US" dirty="0"/>
+              <a:t>But smaller VLFs are faster to allocate (zero-</a:t>
+            </a:r>
+            <a:r>
+              <a:rPr lang="en-US" dirty="0" err="1"/>
+              <a:t>init</a:t>
+            </a:r>
+            <a:r>
+              <a:rPr lang="en-US" dirty="0"/>
+              <a:t>)</a:t>
+            </a:r>
+          </a:p>
+          <a:p>
+            <a:r>
+              <a:rPr lang="en-US" dirty="0"/>
+              <a:t>Too few VLFs also create performance problems</a:t>
+            </a:r>
+          </a:p>
+          <a:p>
+            <a:pPr lvl="1"/>
+            <a:r>
+              <a:rPr lang="en-US" dirty="0"/>
+              <a:t>Clearing the log</a:t>
+            </a:r>
+          </a:p>
+        </p:txBody>
+      </p:sp>
+    </p:spTree>
+    <p:extLst>
+      <p:ext uri="{BB962C8B-B14F-4D97-AF65-F5344CB8AC3E}">
+        <p14:creationId xmlns:p14="http://schemas.microsoft.com/office/powerpoint/2010/main" val="2035035367"/>
       </p:ext>
     </p:extLst>
   </p:cSld>

</xml_diff>

<commit_message>
Minor reorganization for better flow of information.
</commit_message>
<xml_diff>
--- a/TransactionLog.pptx
+++ b/TransactionLog.pptx
@@ -5,7 +5,7 @@
     <p:sldMasterId id="2147483648" r:id="rId1"/>
   </p:sldMasterIdLst>
   <p:notesMasterIdLst>
-    <p:notesMasterId r:id="rId34"/>
+    <p:notesMasterId r:id="rId35"/>
   </p:notesMasterIdLst>
   <p:sldIdLst>
     <p:sldId id="328" r:id="rId2"/>
@@ -13,21 +13,21 @@
     <p:sldId id="329" r:id="rId4"/>
     <p:sldId id="330" r:id="rId5"/>
     <p:sldId id="331" r:id="rId6"/>
-    <p:sldId id="332" r:id="rId7"/>
-    <p:sldId id="333" r:id="rId8"/>
-    <p:sldId id="334" r:id="rId9"/>
-    <p:sldId id="335" r:id="rId10"/>
-    <p:sldId id="339" r:id="rId11"/>
-    <p:sldId id="336" r:id="rId12"/>
-    <p:sldId id="337" r:id="rId13"/>
-    <p:sldId id="338" r:id="rId14"/>
-    <p:sldId id="340" r:id="rId15"/>
-    <p:sldId id="341" r:id="rId16"/>
-    <p:sldId id="342" r:id="rId17"/>
-    <p:sldId id="343" r:id="rId18"/>
-    <p:sldId id="344" r:id="rId19"/>
-    <p:sldId id="345" r:id="rId20"/>
-    <p:sldId id="358" r:id="rId21"/>
+    <p:sldId id="360" r:id="rId7"/>
+    <p:sldId id="332" r:id="rId8"/>
+    <p:sldId id="333" r:id="rId9"/>
+    <p:sldId id="334" r:id="rId10"/>
+    <p:sldId id="335" r:id="rId11"/>
+    <p:sldId id="339" r:id="rId12"/>
+    <p:sldId id="336" r:id="rId13"/>
+    <p:sldId id="337" r:id="rId14"/>
+    <p:sldId id="338" r:id="rId15"/>
+    <p:sldId id="340" r:id="rId16"/>
+    <p:sldId id="341" r:id="rId17"/>
+    <p:sldId id="342" r:id="rId18"/>
+    <p:sldId id="343" r:id="rId19"/>
+    <p:sldId id="344" r:id="rId20"/>
+    <p:sldId id="345" r:id="rId21"/>
     <p:sldId id="346" r:id="rId22"/>
     <p:sldId id="348" r:id="rId23"/>
     <p:sldId id="349" r:id="rId24"/>
@@ -35,11 +35,12 @@
     <p:sldId id="351" r:id="rId26"/>
     <p:sldId id="354" r:id="rId27"/>
     <p:sldId id="356" r:id="rId28"/>
-    <p:sldId id="353" r:id="rId29"/>
-    <p:sldId id="352" r:id="rId30"/>
-    <p:sldId id="355" r:id="rId31"/>
-    <p:sldId id="357" r:id="rId32"/>
-    <p:sldId id="359" r:id="rId33"/>
+    <p:sldId id="361" r:id="rId29"/>
+    <p:sldId id="353" r:id="rId30"/>
+    <p:sldId id="352" r:id="rId31"/>
+    <p:sldId id="355" r:id="rId32"/>
+    <p:sldId id="357" r:id="rId33"/>
+    <p:sldId id="359" r:id="rId34"/>
   </p:sldIdLst>
   <p:sldSz cx="9144000" cy="6858000" type="screen4x3"/>
   <p:notesSz cx="6858000" cy="9144000"/>
@@ -239,7 +240,7 @@
           <a:p>
             <a:fld id="{2EDCB34D-5EC2-4739-9693-E425457AC201}" type="datetimeFigureOut">
               <a:rPr lang="en-US" smtClean="0"/>
-              <a:t>8/30/2016</a:t>
+              <a:t>08/31/2016</a:t>
             </a:fld>
             <a:endParaRPr lang="en-US"/>
           </a:p>
@@ -825,7 +826,7 @@
             <a:fld id="{5942B21B-2ADA-A040-A652-A7305E1B99FE}" type="datetimeFigureOut">
               <a:rPr lang="en-US" smtClean="0"/>
               <a:pPr/>
-              <a:t>8/30/2016</a:t>
+              <a:t>08/31/2016</a:t>
             </a:fld>
             <a:endParaRPr lang="en-US" dirty="0"/>
           </a:p>
@@ -1015,7 +1016,7 @@
           <a:p>
             <a:fld id="{5942B21B-2ADA-A040-A652-A7305E1B99FE}" type="datetimeFigureOut">
               <a:rPr lang="en-US" smtClean="0"/>
-              <a:t>8/30/2016</a:t>
+              <a:t>08/31/2016</a:t>
             </a:fld>
             <a:endParaRPr lang="en-US"/>
           </a:p>
@@ -1139,7 +1140,7 @@
             <a:fld id="{5942B21B-2ADA-A040-A652-A7305E1B99FE}" type="datetimeFigureOut">
               <a:rPr lang="en-US" smtClean="0"/>
               <a:pPr/>
-              <a:t>8/30/2016</a:t>
+              <a:t>08/31/2016</a:t>
             </a:fld>
             <a:r>
               <a:rPr lang="en-US"/>
@@ -1410,7 +1411,7 @@
             <a:fld id="{5942B21B-2ADA-A040-A652-A7305E1B99FE}" type="datetimeFigureOut">
               <a:rPr lang="en-US" smtClean="0"/>
               <a:pPr/>
-              <a:t>8/30/2016</a:t>
+              <a:t>08/31/2016</a:t>
             </a:fld>
             <a:r>
               <a:rPr lang="en-US" dirty="0"/>
@@ -1680,7 +1681,7 @@
             <a:fld id="{5942B21B-2ADA-A040-A652-A7305E1B99FE}" type="datetimeFigureOut">
               <a:rPr lang="en-US" smtClean="0"/>
               <a:pPr/>
-              <a:t>8/30/2016</a:t>
+              <a:t>08/31/2016</a:t>
             </a:fld>
             <a:r>
               <a:rPr lang="en-US" dirty="0"/>
@@ -2020,7 +2021,7 @@
             <a:fld id="{5942B21B-2ADA-A040-A652-A7305E1B99FE}" type="datetimeFigureOut">
               <a:rPr lang="en-US" smtClean="0"/>
               <a:pPr/>
-              <a:t>8/30/2016</a:t>
+              <a:t>08/31/2016</a:t>
             </a:fld>
             <a:r>
               <a:rPr lang="en-US" dirty="0"/>
@@ -2361,7 +2362,7 @@
             <a:fld id="{5942B21B-2ADA-A040-A652-A7305E1B99FE}" type="datetimeFigureOut">
               <a:rPr lang="en-US" smtClean="0"/>
               <a:pPr/>
-              <a:t>8/30/2016</a:t>
+              <a:t>08/31/2016</a:t>
             </a:fld>
             <a:r>
               <a:rPr lang="en-US" dirty="0"/>
@@ -2876,7 +2877,7 @@
             <a:fld id="{5942B21B-2ADA-A040-A652-A7305E1B99FE}" type="datetimeFigureOut">
               <a:rPr lang="en-US" smtClean="0"/>
               <a:pPr/>
-              <a:t>8/30/2016</a:t>
+              <a:t>08/31/2016</a:t>
             </a:fld>
             <a:r>
               <a:rPr lang="en-US" dirty="0"/>
@@ -3085,7 +3086,7 @@
             <a:fld id="{5942B21B-2ADA-A040-A652-A7305E1B99FE}" type="datetimeFigureOut">
               <a:rPr lang="en-US" smtClean="0"/>
               <a:pPr/>
-              <a:t>8/30/2016</a:t>
+              <a:t>08/31/2016</a:t>
             </a:fld>
             <a:r>
               <a:rPr lang="en-US" dirty="0"/>
@@ -3272,7 +3273,7 @@
             <a:fld id="{5942B21B-2ADA-A040-A652-A7305E1B99FE}" type="datetimeFigureOut">
               <a:rPr lang="en-US" smtClean="0"/>
               <a:pPr/>
-              <a:t>8/30/2016</a:t>
+              <a:t>08/31/2016</a:t>
             </a:fld>
             <a:r>
               <a:rPr lang="en-US" dirty="0"/>
@@ -3603,7 +3604,7 @@
             <a:fld id="{5942B21B-2ADA-A040-A652-A7305E1B99FE}" type="datetimeFigureOut">
               <a:rPr lang="en-US" smtClean="0"/>
               <a:pPr/>
-              <a:t>8/30/2016</a:t>
+              <a:t>08/31/2016</a:t>
             </a:fld>
             <a:r>
               <a:rPr lang="en-US" dirty="0"/>
@@ -3911,7 +3912,7 @@
             <a:fld id="{5942B21B-2ADA-A040-A652-A7305E1B99FE}" type="datetimeFigureOut">
               <a:rPr lang="en-US" smtClean="0"/>
               <a:pPr/>
-              <a:t>8/30/2016</a:t>
+              <a:t>08/31/2016</a:t>
             </a:fld>
             <a:r>
               <a:rPr lang="en-US" dirty="0"/>
@@ -4190,7 +4191,7 @@
             <a:fld id="{5942B21B-2ADA-A040-A652-A7305E1B99FE}" type="datetimeFigureOut">
               <a:rPr lang="en-US" smtClean="0"/>
               <a:pPr/>
-              <a:t>8/30/2016</a:t>
+              <a:t>08/31/2016</a:t>
             </a:fld>
             <a:r>
               <a:rPr lang="en-US" dirty="0"/>
@@ -4950,7 +4951,7 @@
           <a:p>
             <a:r>
               <a:rPr lang="en-US" dirty="0"/>
-              <a:t>VLFs can be in one of three statuses:</a:t>
+              <a:t>VLFs can be in one of two statuses:</a:t>
             </a:r>
           </a:p>
           <a:p>
@@ -4997,23 +4998,11 @@
               <a:t>Only one VLF is current at a time.</a:t>
             </a:r>
           </a:p>
-          <a:p>
-            <a:r>
-              <a:rPr lang="en-US" dirty="0"/>
-              <a:t>VLFs are numbered.</a:t>
-            </a:r>
-          </a:p>
-          <a:p>
-            <a:pPr marL="0" indent="0">
-              <a:buNone/>
-            </a:pPr>
-            <a:endParaRPr lang="en-US" dirty="0"/>
-          </a:p>
         </p:txBody>
       </p:sp>
       <p:pic>
         <p:nvPicPr>
-          <p:cNvPr id="5" name="Picture 4"/>
+          <p:cNvPr id="4" name="Picture 3"/>
           <p:cNvPicPr>
             <a:picLocks noChangeAspect="1"/>
           </p:cNvPicPr>
@@ -5038,7 +5027,7 @@
     </p:spTree>
     <p:extLst>
       <p:ext uri="{BB962C8B-B14F-4D97-AF65-F5344CB8AC3E}">
-        <p14:creationId xmlns:p14="http://schemas.microsoft.com/office/powerpoint/2010/main" val="1725116295"/>
+        <p14:creationId xmlns:p14="http://schemas.microsoft.com/office/powerpoint/2010/main" val="1865925798"/>
       </p:ext>
     </p:extLst>
   </p:cSld>
@@ -5110,13 +5099,64 @@
           <a:p>
             <a:r>
               <a:rPr lang="en-US" dirty="0"/>
-              <a:t>As more records are added to the log, additional VLFs are allocated.</a:t>
+              <a:t>VLFs can be in one of three statuses:</a:t>
+            </a:r>
+          </a:p>
+          <a:p>
+            <a:pPr lvl="1"/>
+            <a:r>
+              <a:rPr lang="en-US" dirty="0">
+                <a:solidFill>
+                  <a:srgbClr val="92D050"/>
+                </a:solidFill>
+              </a:rPr>
+              <a:t>Inactive</a:t>
+            </a:r>
+          </a:p>
+          <a:p>
+            <a:pPr lvl="1"/>
+            <a:r>
+              <a:rPr lang="en-US" dirty="0">
+                <a:solidFill>
+                  <a:srgbClr val="FFFF00"/>
+                </a:solidFill>
+              </a:rPr>
+              <a:t>Active (current)</a:t>
+            </a:r>
+          </a:p>
+          <a:p>
+            <a:pPr lvl="1"/>
+            <a:r>
+              <a:rPr lang="en-US" dirty="0">
+                <a:solidFill>
+                  <a:srgbClr val="FF0000"/>
+                </a:solidFill>
+              </a:rPr>
+              <a:t>Active (not usable)</a:t>
             </a:r>
             <a:endParaRPr lang="en-US" dirty="0">
               <a:solidFill>
-                <a:srgbClr val="FF0000"/>
+                <a:schemeClr val="tx1"/>
               </a:solidFill>
             </a:endParaRPr>
+          </a:p>
+          <a:p>
+            <a:r>
+              <a:rPr lang="en-US" dirty="0"/>
+              <a:t>Only one VLF is current at a time.</a:t>
+            </a:r>
+          </a:p>
+          <a:p>
+            <a:r>
+              <a:rPr lang="en-US" dirty="0"/>
+              <a:t>VLFs are numbered.</a:t>
+            </a:r>
+          </a:p>
+          <a:p>
+            <a:pPr marL="0" indent="0">
+              <a:buNone/>
+            </a:pPr>
+            <a:endParaRPr lang="en-US" dirty="0"/>
           </a:p>
         </p:txBody>
       </p:sp>
@@ -5137,7 +5177,7 @@
         <p:spPr>
           <a:xfrm>
             <a:off x="457200" y="1417320"/>
-            <a:ext cx="3813048" cy="4680426"/>
+            <a:ext cx="3814109" cy="4681728"/>
           </a:xfrm>
           <a:prstGeom prst="rect">
             <a:avLst/>
@@ -5147,7 +5187,7 @@
     </p:spTree>
     <p:extLst>
       <p:ext uri="{BB962C8B-B14F-4D97-AF65-F5344CB8AC3E}">
-        <p14:creationId xmlns:p14="http://schemas.microsoft.com/office/powerpoint/2010/main" val="1339213773"/>
+        <p14:creationId xmlns:p14="http://schemas.microsoft.com/office/powerpoint/2010/main" val="1725116295"/>
       </p:ext>
     </p:extLst>
   </p:cSld>
@@ -5231,7 +5271,7 @@
       </p:sp>
       <p:pic>
         <p:nvPicPr>
-          <p:cNvPr id="4" name="Picture 3"/>
+          <p:cNvPr id="5" name="Picture 4"/>
           <p:cNvPicPr>
             <a:picLocks noChangeAspect="1"/>
           </p:cNvPicPr>
@@ -5246,7 +5286,7 @@
         <p:spPr>
           <a:xfrm>
             <a:off x="457200" y="1417320"/>
-            <a:ext cx="3814109" cy="4681728"/>
+            <a:ext cx="3813048" cy="4680426"/>
           </a:xfrm>
           <a:prstGeom prst="rect">
             <a:avLst/>
@@ -5256,7 +5296,7 @@
     </p:spTree>
     <p:extLst>
       <p:ext uri="{BB962C8B-B14F-4D97-AF65-F5344CB8AC3E}">
-        <p14:creationId xmlns:p14="http://schemas.microsoft.com/office/powerpoint/2010/main" val="3381668158"/>
+        <p14:creationId xmlns:p14="http://schemas.microsoft.com/office/powerpoint/2010/main" val="1339213773"/>
       </p:ext>
     </p:extLst>
   </p:cSld>
@@ -5328,26 +5368,19 @@
           <a:p>
             <a:r>
               <a:rPr lang="en-US" dirty="0"/>
-              <a:t>As more records are added to the log, additional VLFs are put in use.</a:t>
-            </a:r>
-          </a:p>
-          <a:p>
-            <a:r>
-              <a:rPr lang="en-US" dirty="0"/>
-              <a:t>Writing to the log is circular so long as VLF are available.</a:t>
-            </a:r>
-          </a:p>
-          <a:p>
-            <a:r>
-              <a:rPr lang="en-US" dirty="0"/>
-              <a:t>What happens next?</a:t>
-            </a:r>
+              <a:t>As more records are added to the log, additional VLFs are allocated.</a:t>
+            </a:r>
+            <a:endParaRPr lang="en-US" dirty="0">
+              <a:solidFill>
+                <a:srgbClr val="FF0000"/>
+              </a:solidFill>
+            </a:endParaRPr>
           </a:p>
         </p:txBody>
       </p:sp>
       <p:pic>
         <p:nvPicPr>
-          <p:cNvPr id="5" name="Picture 4"/>
+          <p:cNvPr id="4" name="Picture 3"/>
           <p:cNvPicPr>
             <a:picLocks noChangeAspect="1"/>
           </p:cNvPicPr>
@@ -5372,7 +5405,7 @@
     </p:spTree>
     <p:extLst>
       <p:ext uri="{BB962C8B-B14F-4D97-AF65-F5344CB8AC3E}">
-        <p14:creationId xmlns:p14="http://schemas.microsoft.com/office/powerpoint/2010/main" val="1135754112"/>
+        <p14:creationId xmlns:p14="http://schemas.microsoft.com/office/powerpoint/2010/main" val="3381668158"/>
       </p:ext>
     </p:extLst>
   </p:cSld>
@@ -5444,23 +5477,26 @@
           <a:p>
             <a:r>
               <a:rPr lang="en-US" dirty="0"/>
-              <a:t>The log file has to grow</a:t>
-            </a:r>
-          </a:p>
-          <a:p>
-            <a:r>
-              <a:rPr lang="en-US" dirty="0"/>
-              <a:t>More VLFs are added</a:t>
-            </a:r>
-          </a:p>
-          <a:p>
-            <a:endParaRPr lang="en-US" dirty="0"/>
+              <a:t>As more records are added to the log, additional VLFs are put in use.</a:t>
+            </a:r>
+          </a:p>
+          <a:p>
+            <a:r>
+              <a:rPr lang="en-US" dirty="0"/>
+              <a:t>Writing to the log is circular so long as VLF are available.</a:t>
+            </a:r>
+          </a:p>
+          <a:p>
+            <a:r>
+              <a:rPr lang="en-US" dirty="0"/>
+              <a:t>What happens next?</a:t>
+            </a:r>
           </a:p>
         </p:txBody>
       </p:sp>
       <p:pic>
         <p:nvPicPr>
-          <p:cNvPr id="4" name="Picture 3"/>
+          <p:cNvPr id="5" name="Picture 4"/>
           <p:cNvPicPr>
             <a:picLocks noChangeAspect="1"/>
           </p:cNvPicPr>
@@ -5475,7 +5511,7 @@
         <p:spPr>
           <a:xfrm>
             <a:off x="457200" y="1417320"/>
-            <a:ext cx="2008736" cy="4692864"/>
+            <a:ext cx="3814109" cy="4681728"/>
           </a:xfrm>
           <a:prstGeom prst="rect">
             <a:avLst/>
@@ -5485,7 +5521,7 @@
     </p:spTree>
     <p:extLst>
       <p:ext uri="{BB962C8B-B14F-4D97-AF65-F5344CB8AC3E}">
-        <p14:creationId xmlns:p14="http://schemas.microsoft.com/office/powerpoint/2010/main" val="3149823093"/>
+        <p14:creationId xmlns:p14="http://schemas.microsoft.com/office/powerpoint/2010/main" val="1135754112"/>
       </p:ext>
     </p:extLst>
   </p:cSld>
@@ -5567,6 +5603,119 @@
             </a:r>
           </a:p>
           <a:p>
+            <a:endParaRPr lang="en-US" dirty="0"/>
+          </a:p>
+        </p:txBody>
+      </p:sp>
+      <p:pic>
+        <p:nvPicPr>
+          <p:cNvPr id="4" name="Picture 3"/>
+          <p:cNvPicPr>
+            <a:picLocks noChangeAspect="1"/>
+          </p:cNvPicPr>
+          <p:nvPr/>
+        </p:nvPicPr>
+        <p:blipFill>
+          <a:blip r:embed="rId2"/>
+          <a:stretch>
+            <a:fillRect/>
+          </a:stretch>
+        </p:blipFill>
+        <p:spPr>
+          <a:xfrm>
+            <a:off x="457200" y="1417320"/>
+            <a:ext cx="2008736" cy="4692864"/>
+          </a:xfrm>
+          <a:prstGeom prst="rect">
+            <a:avLst/>
+          </a:prstGeom>
+        </p:spPr>
+      </p:pic>
+    </p:spTree>
+    <p:extLst>
+      <p:ext uri="{BB962C8B-B14F-4D97-AF65-F5344CB8AC3E}">
+        <p14:creationId xmlns:p14="http://schemas.microsoft.com/office/powerpoint/2010/main" val="3149823093"/>
+      </p:ext>
+    </p:extLst>
+  </p:cSld>
+  <p:clrMapOvr>
+    <a:masterClrMapping/>
+  </p:clrMapOvr>
+</p:sld>
+</file>
+
+<file path=ppt/slides/slide16.xml><?xml version="1.0" encoding="utf-8"?>
+<p:sld xmlns:a="http://schemas.openxmlformats.org/drawingml/2006/main" xmlns:r="http://schemas.openxmlformats.org/officeDocument/2006/relationships" xmlns:p="http://schemas.openxmlformats.org/presentationml/2006/main">
+  <p:cSld>
+    <p:spTree>
+      <p:nvGrpSpPr>
+        <p:cNvPr id="1" name=""/>
+        <p:cNvGrpSpPr/>
+        <p:nvPr/>
+      </p:nvGrpSpPr>
+      <p:grpSpPr>
+        <a:xfrm>
+          <a:off x="0" y="0"/>
+          <a:ext cx="0" cy="0"/>
+          <a:chOff x="0" y="0"/>
+          <a:chExt cx="0" cy="0"/>
+        </a:xfrm>
+      </p:grpSpPr>
+      <p:sp>
+        <p:nvSpPr>
+          <p:cNvPr id="2" name="Title 1"/>
+          <p:cNvSpPr>
+            <a:spLocks noGrp="1"/>
+          </p:cNvSpPr>
+          <p:nvPr>
+            <p:ph type="title"/>
+          </p:nvPr>
+        </p:nvSpPr>
+        <p:spPr/>
+        <p:txBody>
+          <a:bodyPr/>
+          <a:lstStyle/>
+          <a:p>
+            <a:r>
+              <a:rPr lang="en-US" dirty="0"/>
+              <a:t>Virtual Log Files</a:t>
+            </a:r>
+          </a:p>
+        </p:txBody>
+      </p:sp>
+      <p:sp>
+        <p:nvSpPr>
+          <p:cNvPr id="3" name="Content Placeholder 2"/>
+          <p:cNvSpPr>
+            <a:spLocks noGrp="1"/>
+          </p:cNvSpPr>
+          <p:nvPr>
+            <p:ph idx="1"/>
+          </p:nvPr>
+        </p:nvSpPr>
+        <p:spPr>
+          <a:xfrm>
+            <a:off x="4352925" y="1600200"/>
+            <a:ext cx="4333875" cy="4525963"/>
+          </a:xfrm>
+          <a:noFill/>
+        </p:spPr>
+        <p:txBody>
+          <a:bodyPr/>
+          <a:lstStyle/>
+          <a:p>
+            <a:r>
+              <a:rPr lang="en-US" dirty="0"/>
+              <a:t>The log file has to grow</a:t>
+            </a:r>
+          </a:p>
+          <a:p>
+            <a:r>
+              <a:rPr lang="en-US" dirty="0"/>
+              <a:t>More VLFs are added</a:t>
+            </a:r>
+          </a:p>
+          <a:p>
             <a:r>
               <a:rPr lang="en-US" dirty="0"/>
               <a:t>Eventually the log will be truncated</a:t>
@@ -5614,7 +5763,7 @@
 </p:sld>
 </file>
 
-<file path=ppt/slides/slide16.xml><?xml version="1.0" encoding="utf-8"?>
+<file path=ppt/slides/slide17.xml><?xml version="1.0" encoding="utf-8"?>
 <p:sld xmlns:a="http://schemas.openxmlformats.org/drawingml/2006/main" xmlns:r="http://schemas.openxmlformats.org/officeDocument/2006/relationships" xmlns:p="http://schemas.openxmlformats.org/presentationml/2006/main">
   <p:cSld>
     <p:spTree>
@@ -5777,122 +5926,6 @@
 </p:sld>
 </file>
 
-<file path=ppt/slides/slide17.xml><?xml version="1.0" encoding="utf-8"?>
-<p:sld xmlns:a="http://schemas.openxmlformats.org/drawingml/2006/main" xmlns:r="http://schemas.openxmlformats.org/officeDocument/2006/relationships" xmlns:p="http://schemas.openxmlformats.org/presentationml/2006/main">
-  <p:cSld>
-    <p:spTree>
-      <p:nvGrpSpPr>
-        <p:cNvPr id="1" name=""/>
-        <p:cNvGrpSpPr/>
-        <p:nvPr/>
-      </p:nvGrpSpPr>
-      <p:grpSpPr>
-        <a:xfrm>
-          <a:off x="0" y="0"/>
-          <a:ext cx="0" cy="0"/>
-          <a:chOff x="0" y="0"/>
-          <a:chExt cx="0" cy="0"/>
-        </a:xfrm>
-      </p:grpSpPr>
-      <p:sp>
-        <p:nvSpPr>
-          <p:cNvPr id="2" name="Title 1"/>
-          <p:cNvSpPr>
-            <a:spLocks noGrp="1"/>
-          </p:cNvSpPr>
-          <p:nvPr>
-            <p:ph type="title"/>
-          </p:nvPr>
-        </p:nvSpPr>
-        <p:spPr/>
-        <p:txBody>
-          <a:bodyPr/>
-          <a:lstStyle/>
-          <a:p>
-            <a:r>
-              <a:rPr lang="en-US" dirty="0"/>
-              <a:t>VLF Detail</a:t>
-            </a:r>
-          </a:p>
-        </p:txBody>
-      </p:sp>
-      <p:sp>
-        <p:nvSpPr>
-          <p:cNvPr id="3" name="Content Placeholder 2"/>
-          <p:cNvSpPr>
-            <a:spLocks noGrp="1"/>
-          </p:cNvSpPr>
-          <p:nvPr>
-            <p:ph idx="1"/>
-          </p:nvPr>
-        </p:nvSpPr>
-        <p:spPr>
-          <a:xfrm>
-            <a:off x="457201" y="3797145"/>
-            <a:ext cx="8229600" cy="2329018"/>
-          </a:xfrm>
-        </p:spPr>
-        <p:txBody>
-          <a:bodyPr/>
-          <a:lstStyle/>
-          <a:p>
-            <a:r>
-              <a:rPr lang="en-US" dirty="0"/>
-              <a:t>Again there is a header</a:t>
-            </a:r>
-          </a:p>
-          <a:p>
-            <a:r>
-              <a:rPr lang="en-US" dirty="0"/>
-              <a:t>Then a series of log blocks</a:t>
-            </a:r>
-          </a:p>
-          <a:p>
-            <a:pPr lvl="1"/>
-            <a:r>
-              <a:rPr lang="en-US" dirty="0"/>
-              <a:t>In 512 byte increments up to 60K in size</a:t>
-            </a:r>
-          </a:p>
-        </p:txBody>
-      </p:sp>
-      <p:pic>
-        <p:nvPicPr>
-          <p:cNvPr id="7" name="Picture 6"/>
-          <p:cNvPicPr>
-            <a:picLocks noChangeAspect="1"/>
-          </p:cNvPicPr>
-          <p:nvPr/>
-        </p:nvPicPr>
-        <p:blipFill>
-          <a:blip r:embed="rId2"/>
-          <a:stretch>
-            <a:fillRect/>
-          </a:stretch>
-        </p:blipFill>
-        <p:spPr>
-          <a:xfrm>
-            <a:off x="457200" y="1417320"/>
-            <a:ext cx="8190125" cy="2377440"/>
-          </a:xfrm>
-          <a:prstGeom prst="rect">
-            <a:avLst/>
-          </a:prstGeom>
-        </p:spPr>
-      </p:pic>
-    </p:spTree>
-    <p:extLst>
-      <p:ext uri="{BB962C8B-B14F-4D97-AF65-F5344CB8AC3E}">
-        <p14:creationId xmlns:p14="http://schemas.microsoft.com/office/powerpoint/2010/main" val="3765893842"/>
-      </p:ext>
-    </p:extLst>
-  </p:cSld>
-  <p:clrMapOvr>
-    <a:masterClrMapping/>
-  </p:clrMapOvr>
-</p:sld>
-</file>
-
 <file path=ppt/slides/slide18.xml><?xml version="1.0" encoding="utf-8"?>
 <p:sld xmlns:a="http://schemas.openxmlformats.org/drawingml/2006/main" xmlns:r="http://schemas.openxmlformats.org/officeDocument/2006/relationships" xmlns:p="http://schemas.openxmlformats.org/presentationml/2006/main">
   <p:cSld>
@@ -5927,7 +5960,7 @@
           <a:p>
             <a:r>
               <a:rPr lang="en-US" dirty="0"/>
-              <a:t>Log Block Detail</a:t>
+              <a:t>VLF Detail</a:t>
             </a:r>
           </a:p>
         </p:txBody>
@@ -5954,38 +5987,27 @@
           <a:p>
             <a:r>
               <a:rPr lang="en-US" dirty="0"/>
-              <a:t>As expected, starts with a header</a:t>
-            </a:r>
-          </a:p>
-          <a:p>
-            <a:r>
-              <a:rPr lang="en-US" dirty="0"/>
-              <a:t>Then a series of log records</a:t>
+              <a:t>Again there is a header</a:t>
+            </a:r>
+          </a:p>
+          <a:p>
+            <a:r>
+              <a:rPr lang="en-US" dirty="0"/>
+              <a:t>Then a series of log blocks</a:t>
             </a:r>
           </a:p>
           <a:p>
             <a:pPr lvl="1"/>
             <a:r>
               <a:rPr lang="en-US" dirty="0"/>
-              <a:t>Completely variable </a:t>
-            </a:r>
-            <a:r>
-              <a:rPr lang="en-US"/>
-              <a:t>in size</a:t>
-            </a:r>
-            <a:endParaRPr lang="en-US" dirty="0"/>
-          </a:p>
-          <a:p>
-            <a:r>
-              <a:rPr lang="en-US" dirty="0"/>
-              <a:t>And an index to the log records (slot array)</a:t>
+              <a:t>In 512 byte increments up to 60K in size</a:t>
             </a:r>
           </a:p>
         </p:txBody>
       </p:sp>
       <p:pic>
         <p:nvPicPr>
-          <p:cNvPr id="5" name="Picture 4"/>
+          <p:cNvPr id="7" name="Picture 6"/>
           <p:cNvPicPr>
             <a:picLocks noChangeAspect="1"/>
           </p:cNvPicPr>
@@ -5999,7 +6021,7 @@
         </p:blipFill>
         <p:spPr>
           <a:xfrm>
-            <a:off x="457200" y="1419705"/>
+            <a:off x="457200" y="1417320"/>
             <a:ext cx="8190125" cy="2377440"/>
           </a:xfrm>
           <a:prstGeom prst="rect">
@@ -6010,7 +6032,7 @@
     </p:spTree>
     <p:extLst>
       <p:ext uri="{BB962C8B-B14F-4D97-AF65-F5344CB8AC3E}">
-        <p14:creationId xmlns:p14="http://schemas.microsoft.com/office/powerpoint/2010/main" val="803829485"/>
+        <p14:creationId xmlns:p14="http://schemas.microsoft.com/office/powerpoint/2010/main" val="3765893842"/>
       </p:ext>
     </p:extLst>
   </p:cSld>
@@ -6054,7 +6076,7 @@
           <a:p>
             <a:r>
               <a:rPr lang="en-US" dirty="0"/>
-              <a:t>Log Record Detail</a:t>
+              <a:t>Log Block Detail</a:t>
             </a:r>
           </a:p>
         </p:txBody>
@@ -6076,41 +6098,43 @@
           </a:xfrm>
         </p:spPr>
         <p:txBody>
-          <a:bodyPr>
-            <a:normAutofit lnSpcReduction="10000"/>
-          </a:bodyPr>
+          <a:bodyPr/>
           <a:lstStyle/>
           <a:p>
             <a:r>
               <a:rPr lang="en-US" dirty="0"/>
-              <a:t>Of course, a header</a:t>
+              <a:t>As expected, starts with a header</a:t>
+            </a:r>
+          </a:p>
+          <a:p>
+            <a:r>
+              <a:rPr lang="en-US" dirty="0"/>
+              <a:t>Then a series of log records</a:t>
             </a:r>
           </a:p>
           <a:p>
             <a:pPr lvl="1"/>
             <a:r>
               <a:rPr lang="en-US" dirty="0"/>
-              <a:t>Record type, transaction ID, length, pointer to previous transaction record, etc.</a:t>
-            </a:r>
-          </a:p>
-          <a:p>
-            <a:r>
-              <a:rPr lang="en-US" dirty="0"/>
-              <a:t>Payload</a:t>
-            </a:r>
-          </a:p>
-          <a:p>
-            <a:pPr lvl="1"/>
-            <a:r>
-              <a:rPr lang="en-US" dirty="0"/>
-              <a:t>Before/after image of changes</a:t>
+              <a:t>Completely variable </a:t>
+            </a:r>
+            <a:r>
+              <a:rPr lang="en-US"/>
+              <a:t>in size</a:t>
+            </a:r>
+            <a:endParaRPr lang="en-US" dirty="0"/>
+          </a:p>
+          <a:p>
+            <a:r>
+              <a:rPr lang="en-US" dirty="0"/>
+              <a:t>And an index to the log records (slot array)</a:t>
             </a:r>
           </a:p>
         </p:txBody>
       </p:sp>
       <p:pic>
         <p:nvPicPr>
-          <p:cNvPr id="4" name="Picture 3"/>
+          <p:cNvPr id="5" name="Picture 4"/>
           <p:cNvPicPr>
             <a:picLocks noChangeAspect="1"/>
           </p:cNvPicPr>
@@ -6124,8 +6148,8 @@
         </p:blipFill>
         <p:spPr>
           <a:xfrm>
-            <a:off x="457200" y="1417320"/>
-            <a:ext cx="8199451" cy="2377440"/>
+            <a:off x="457200" y="1419705"/>
+            <a:ext cx="8190125" cy="2377440"/>
           </a:xfrm>
           <a:prstGeom prst="rect">
             <a:avLst/>
@@ -6135,7 +6159,7 @@
     </p:spTree>
     <p:extLst>
       <p:ext uri="{BB962C8B-B14F-4D97-AF65-F5344CB8AC3E}">
-        <p14:creationId xmlns:p14="http://schemas.microsoft.com/office/powerpoint/2010/main" val="3638472235"/>
+        <p14:creationId xmlns:p14="http://schemas.microsoft.com/office/powerpoint/2010/main" val="803829485"/>
       </p:ext>
     </p:extLst>
   </p:cSld>
@@ -7189,7 +7213,7 @@
           <a:p>
             <a:r>
               <a:rPr lang="en-US" dirty="0"/>
-              <a:t>Physical vs Logical Log File</a:t>
+              <a:t>Log Record Detail</a:t>
             </a:r>
           </a:p>
         </p:txBody>
@@ -7204,63 +7228,73 @@
             <p:ph idx="1"/>
           </p:nvPr>
         </p:nvSpPr>
-        <p:spPr/>
-        <p:txBody>
-          <a:bodyPr/>
+        <p:spPr>
+          <a:xfrm>
+            <a:off x="457201" y="3797145"/>
+            <a:ext cx="8229600" cy="2329018"/>
+          </a:xfrm>
+        </p:spPr>
+        <p:txBody>
+          <a:bodyPr>
+            <a:normAutofit lnSpcReduction="10000"/>
+          </a:bodyPr>
           <a:lstStyle/>
           <a:p>
             <a:r>
               <a:rPr lang="en-US" dirty="0"/>
-              <a:t>Logical Log File</a:t>
+              <a:t>Of course, a header</a:t>
             </a:r>
           </a:p>
           <a:p>
             <a:pPr lvl="1"/>
             <a:r>
               <a:rPr lang="en-US" dirty="0"/>
-              <a:t>Always growing</a:t>
+              <a:t>Record type, transaction ID, length, pointer to previous transaction record, etc.</a:t>
+            </a:r>
+          </a:p>
+          <a:p>
+            <a:r>
+              <a:rPr lang="en-US" dirty="0"/>
+              <a:t>Payload</a:t>
             </a:r>
           </a:p>
           <a:p>
             <a:pPr lvl="1"/>
             <a:r>
               <a:rPr lang="en-US" dirty="0"/>
-              <a:t>Write once / read many</a:t>
-            </a:r>
-          </a:p>
-          <a:p>
-            <a:r>
-              <a:rPr lang="en-US" dirty="0"/>
-              <a:t>Physical Log File</a:t>
-            </a:r>
-          </a:p>
-          <a:p>
-            <a:pPr lvl="1"/>
-            <a:r>
-              <a:rPr lang="en-US" dirty="0"/>
-              <a:t>Only grows when full (or manually grown)</a:t>
-            </a:r>
-          </a:p>
-          <a:p>
-            <a:pPr lvl="1"/>
-            <a:r>
-              <a:rPr lang="en-US" dirty="0"/>
-              <a:t>Divided into virtual log files (VLFs)</a:t>
-            </a:r>
-          </a:p>
-          <a:p>
-            <a:pPr lvl="1"/>
-            <a:r>
-              <a:rPr lang="en-US" dirty="0"/>
-              <a:t>VLFs are inactivated when possible and over-written</a:t>
-            </a:r>
-          </a:p>
-        </p:txBody>
-      </p:sp>
+              <a:t>Before/after image of changes</a:t>
+            </a:r>
+          </a:p>
+        </p:txBody>
+      </p:sp>
+      <p:pic>
+        <p:nvPicPr>
+          <p:cNvPr id="4" name="Picture 3"/>
+          <p:cNvPicPr>
+            <a:picLocks noChangeAspect="1"/>
+          </p:cNvPicPr>
+          <p:nvPr/>
+        </p:nvPicPr>
+        <p:blipFill>
+          <a:blip r:embed="rId2"/>
+          <a:stretch>
+            <a:fillRect/>
+          </a:stretch>
+        </p:blipFill>
+        <p:spPr>
+          <a:xfrm>
+            <a:off x="457200" y="1417320"/>
+            <a:ext cx="8199451" cy="2377440"/>
+          </a:xfrm>
+          <a:prstGeom prst="rect">
+            <a:avLst/>
+          </a:prstGeom>
+        </p:spPr>
+      </p:pic>
     </p:spTree>
     <p:extLst>
       <p:ext uri="{BB962C8B-B14F-4D97-AF65-F5344CB8AC3E}">
-        <p14:creationId xmlns:p14="http://schemas.microsoft.com/office/powerpoint/2010/main" val="1031376588"/>
+        <p14:creationId xmlns:p14="http://schemas.microsoft.com/office/powerpoint/2010/main" val="3638472235"/>
       </p:ext>
     </p:extLst>
   </p:cSld>
@@ -7455,7 +7489,7 @@
           <p:nvPr>
             <p:extLst>
               <p:ext uri="{D42A27DB-BD31-4B8C-83A1-F6EECF244321}">
-                <p14:modId xmlns:p14="http://schemas.microsoft.com/office/powerpoint/2010/main" val="388941808"/>
+                <p14:modId xmlns:p14="http://schemas.microsoft.com/office/powerpoint/2010/main" val="3688946346"/>
               </p:ext>
             </p:extLst>
           </p:nvPr>
@@ -7474,21 +7508,21 @@
                 <a:gridCol w="1895475">
                   <a:extLst>
                     <a:ext uri="{9D8B030D-6E8A-4147-A177-3AD203B41FA5}">
-                      <a16:colId xmlns:a16="http://schemas.microsoft.com/office/drawing/2014/main" val="20000"/>
+                      <a16:colId xmlns:a16="http://schemas.microsoft.com/office/drawing/2014/main" xmlns="" val="20000"/>
                     </a:ext>
                   </a:extLst>
                 </a:gridCol>
                 <a:gridCol w="3171825">
                   <a:extLst>
                     <a:ext uri="{9D8B030D-6E8A-4147-A177-3AD203B41FA5}">
-                      <a16:colId xmlns:a16="http://schemas.microsoft.com/office/drawing/2014/main" val="20001"/>
+                      <a16:colId xmlns:a16="http://schemas.microsoft.com/office/drawing/2014/main" xmlns="" val="20001"/>
                     </a:ext>
                   </a:extLst>
                 </a:gridCol>
                 <a:gridCol w="3162300">
                   <a:extLst>
                     <a:ext uri="{9D8B030D-6E8A-4147-A177-3AD203B41FA5}">
-                      <a16:colId xmlns:a16="http://schemas.microsoft.com/office/drawing/2014/main" val="20002"/>
+                      <a16:colId xmlns:a16="http://schemas.microsoft.com/office/drawing/2014/main" xmlns="" val="20002"/>
                     </a:ext>
                   </a:extLst>
                 </a:gridCol>
@@ -7535,7 +7569,7 @@
                 </a:tc>
                 <a:extLst>
                   <a:ext uri="{0D108BD9-81ED-4DB2-BD59-A6C34878D82A}">
-                    <a16:rowId xmlns:a16="http://schemas.microsoft.com/office/drawing/2014/main" val="10000"/>
+                    <a16:rowId xmlns:a16="http://schemas.microsoft.com/office/drawing/2014/main" xmlns="" val="10000"/>
                   </a:ext>
                 </a:extLst>
               </a:tr>
@@ -7576,11 +7610,9 @@
                         <a:defRPr/>
                       </a:pPr>
                       <a:r>
-                        <a:rPr lang="en-US" dirty="0"/>
+                        <a:rPr lang="en-US" dirty="0" smtClean="0"/>
                         <a:t>000001c0:0000006b:0005</a:t>
                       </a:r>
-                    </a:p>
-                    <a:p>
                       <a:endParaRPr lang="en-US" dirty="0"/>
                     </a:p>
                   </a:txBody>
@@ -7601,7 +7633,7 @@
                 </a:tc>
                 <a:extLst>
                   <a:ext uri="{0D108BD9-81ED-4DB2-BD59-A6C34878D82A}">
-                    <a16:rowId xmlns:a16="http://schemas.microsoft.com/office/drawing/2014/main" val="10001"/>
+                    <a16:rowId xmlns:a16="http://schemas.microsoft.com/office/drawing/2014/main" xmlns="" val="10001"/>
                   </a:ext>
                 </a:extLst>
               </a:tr>
@@ -7642,7 +7674,7 @@
                         <a:defRPr/>
                       </a:pPr>
                       <a:r>
-                        <a:rPr lang="en-US" sz="1800" kern="1200" dirty="0">
+                        <a:rPr lang="en-US" sz="1800" kern="1200" dirty="0" smtClean="0">
                           <a:solidFill>
                             <a:schemeClr val="dk1"/>
                           </a:solidFill>
@@ -7672,7 +7704,7 @@
                 </a:tc>
                 <a:extLst>
                   <a:ext uri="{0D108BD9-81ED-4DB2-BD59-A6C34878D82A}">
-                    <a16:rowId xmlns:a16="http://schemas.microsoft.com/office/drawing/2014/main" val="10002"/>
+                    <a16:rowId xmlns:a16="http://schemas.microsoft.com/office/drawing/2014/main" xmlns="" val="10002"/>
                   </a:ext>
                 </a:extLst>
               </a:tr>
@@ -7696,9 +7728,10 @@
                     <a:lstStyle/>
                     <a:p>
                       <a:r>
-                        <a:rPr lang="en-US" dirty="0"/>
+                        <a:rPr lang="en-US" dirty="0" smtClean="0"/>
                         <a:t>448000000010700005</a:t>
                       </a:r>
+                      <a:endParaRPr lang="en-US" dirty="0"/>
                     </a:p>
                   </a:txBody>
                   <a:tcPr/>
@@ -7718,7 +7751,7 @@
                 </a:tc>
                 <a:extLst>
                   <a:ext uri="{0D108BD9-81ED-4DB2-BD59-A6C34878D82A}">
-                    <a16:rowId xmlns:a16="http://schemas.microsoft.com/office/drawing/2014/main" val="10003"/>
+                    <a16:rowId xmlns:a16="http://schemas.microsoft.com/office/drawing/2014/main" xmlns="" val="10003"/>
                   </a:ext>
                 </a:extLst>
               </a:tr>
@@ -7742,9 +7775,10 @@
                     <a:lstStyle/>
                     <a:p>
                       <a:r>
-                        <a:rPr lang="en-US" dirty="0"/>
+                        <a:rPr lang="en-US" dirty="0" smtClean="0"/>
                         <a:t>448:107:5</a:t>
                       </a:r>
+                      <a:endParaRPr lang="en-US" dirty="0"/>
                     </a:p>
                   </a:txBody>
                   <a:tcPr/>
@@ -7769,7 +7803,7 @@
                 </a:tc>
                 <a:extLst>
                   <a:ext uri="{0D108BD9-81ED-4DB2-BD59-A6C34878D82A}">
-                    <a16:rowId xmlns:a16="http://schemas.microsoft.com/office/drawing/2014/main" val="3543017676"/>
+                    <a16:rowId xmlns:a16="http://schemas.microsoft.com/office/drawing/2014/main" xmlns="" val="3543017676"/>
                   </a:ext>
                 </a:extLst>
               </a:tr>
@@ -8663,9 +8697,10 @@
           <a:lstStyle/>
           <a:p>
             <a:r>
-              <a:rPr lang="en-US" dirty="0"/>
-              <a:t>Flushing the Log</a:t>
-            </a:r>
+              <a:rPr lang="en-US" dirty="0" smtClean="0"/>
+              <a:t>Checkpoint Process</a:t>
+            </a:r>
+            <a:endParaRPr lang="en-US" dirty="0"/>
           </a:p>
         </p:txBody>
       </p:sp>
@@ -8685,50 +8720,54 @@
           <a:lstStyle/>
           <a:p>
             <a:r>
-              <a:rPr lang="en-US" dirty="0"/>
-              <a:t>Flushing = closing a log block</a:t>
-            </a:r>
-          </a:p>
-          <a:p>
-            <a:r>
-              <a:rPr lang="en-US" dirty="0"/>
-              <a:t>Triggers</a:t>
+              <a:rPr lang="en-US" dirty="0" smtClean="0"/>
+              <a:t>Write to log (checkpoint start)</a:t>
             </a:r>
           </a:p>
           <a:p>
             <a:pPr lvl="1"/>
             <a:r>
-              <a:rPr lang="en-US" dirty="0"/>
-              <a:t>60K limit reached</a:t>
-            </a:r>
-          </a:p>
-          <a:p>
-            <a:pPr lvl="1"/>
-            <a:r>
-              <a:rPr lang="en-US" dirty="0"/>
-              <a:t>Transaction commits</a:t>
-            </a:r>
-          </a:p>
-          <a:p>
-            <a:pPr lvl="1"/>
-            <a:r>
-              <a:rPr lang="en-US" dirty="0"/>
-              <a:t>Transaction rollbacks</a:t>
-            </a:r>
-          </a:p>
-          <a:p>
-            <a:pPr lvl="1"/>
-            <a:r>
-              <a:rPr lang="en-US" dirty="0"/>
-              <a:t>Checkpoint</a:t>
-            </a:r>
+              <a:rPr lang="en-US" dirty="0" smtClean="0"/>
+              <a:t>Also info about any uncommitted transactions</a:t>
+            </a:r>
+          </a:p>
+          <a:p>
+            <a:r>
+              <a:rPr lang="en-US" dirty="0" smtClean="0"/>
+              <a:t>Flush the log</a:t>
+            </a:r>
+          </a:p>
+          <a:p>
+            <a:r>
+              <a:rPr lang="en-US" dirty="0" smtClean="0"/>
+              <a:t>Identify dirty pages; write to disk</a:t>
+            </a:r>
+          </a:p>
+          <a:p>
+            <a:r>
+              <a:rPr lang="en-US" dirty="0" smtClean="0"/>
+              <a:t>Update boot page with log ID corresponding to checkpoint start</a:t>
+            </a:r>
+          </a:p>
+          <a:p>
+            <a:r>
+              <a:rPr lang="en-US" dirty="0" smtClean="0"/>
+              <a:t>Clear the log (SIMPLE recovery)</a:t>
+            </a:r>
+          </a:p>
+          <a:p>
+            <a:r>
+              <a:rPr lang="en-US" dirty="0" smtClean="0"/>
+              <a:t>Write to log (checkpoint finish)</a:t>
+            </a:r>
+            <a:endParaRPr lang="en-US" dirty="0"/>
           </a:p>
         </p:txBody>
       </p:sp>
     </p:spTree>
     <p:extLst>
       <p:ext uri="{BB962C8B-B14F-4D97-AF65-F5344CB8AC3E}">
-        <p14:creationId xmlns:p14="http://schemas.microsoft.com/office/powerpoint/2010/main" val="4039889923"/>
+        <p14:creationId xmlns:p14="http://schemas.microsoft.com/office/powerpoint/2010/main" val="348943073"/>
       </p:ext>
     </p:extLst>
   </p:cSld>
@@ -8772,7 +8811,7 @@
           <a:p>
             <a:r>
               <a:rPr lang="en-US" dirty="0"/>
-              <a:t>Recovery Models</a:t>
+              <a:t>Flushing the Log</a:t>
             </a:r>
           </a:p>
         </p:txBody>
@@ -8789,97 +8828,54 @@
         </p:nvSpPr>
         <p:spPr/>
         <p:txBody>
-          <a:bodyPr>
-            <a:normAutofit fontScale="92500" lnSpcReduction="10000"/>
-          </a:bodyPr>
+          <a:bodyPr/>
           <a:lstStyle/>
           <a:p>
             <a:r>
               <a:rPr lang="en-US" dirty="0"/>
-              <a:t>Impacts how SQL logs changes</a:t>
+              <a:t>Flushing = closing a log block</a:t>
+            </a:r>
+          </a:p>
+          <a:p>
+            <a:r>
+              <a:rPr lang="en-US" dirty="0"/>
+              <a:t>Triggers</a:t>
             </a:r>
           </a:p>
           <a:p>
             <a:pPr lvl="1"/>
             <a:r>
               <a:rPr lang="en-US" dirty="0"/>
-              <a:t>Simple recovery model</a:t>
-            </a:r>
-          </a:p>
-          <a:p>
-            <a:pPr lvl="2"/>
-            <a:r>
-              <a:rPr lang="en-US" dirty="0"/>
-              <a:t>All changes logged, but can be discarded on commit</a:t>
-            </a:r>
-          </a:p>
-          <a:p>
-            <a:pPr lvl="2"/>
-            <a:r>
-              <a:rPr lang="en-US" dirty="0"/>
-              <a:t>Can only recover to the latest full backup</a:t>
+              <a:t>60K limit reached</a:t>
             </a:r>
           </a:p>
           <a:p>
             <a:pPr lvl="1"/>
             <a:r>
               <a:rPr lang="en-US" dirty="0"/>
-              <a:t>Full recovery model</a:t>
-            </a:r>
-          </a:p>
-          <a:p>
-            <a:pPr lvl="2"/>
-            <a:r>
-              <a:rPr lang="en-US" dirty="0"/>
-              <a:t>Log records must be kept until log backup completed</a:t>
-            </a:r>
-          </a:p>
-          <a:p>
-            <a:pPr lvl="2"/>
-            <a:r>
-              <a:rPr lang="en-US" dirty="0"/>
-              <a:t>Can recover to an arbitrary point in time</a:t>
+              <a:t>Transaction commits</a:t>
             </a:r>
           </a:p>
           <a:p>
             <a:pPr lvl="1"/>
             <a:r>
               <a:rPr lang="en-US" dirty="0"/>
-              <a:t>Bulk-logged recovery model</a:t>
-            </a:r>
-          </a:p>
-          <a:p>
-            <a:pPr lvl="2"/>
-            <a:r>
-              <a:rPr lang="en-US" dirty="0"/>
-              <a:t>Similar to full model, but some changes are only “noted” rather than fully logged</a:t>
-            </a:r>
-          </a:p>
-          <a:p>
-            <a:pPr lvl="2"/>
-            <a:r>
-              <a:rPr lang="en-US" dirty="0"/>
-              <a:t>Log backups still include all changes</a:t>
-            </a:r>
-          </a:p>
-          <a:p>
-            <a:pPr lvl="2"/>
-            <a:r>
-              <a:rPr lang="en-US" dirty="0"/>
-              <a:t>Point-in-time recovery </a:t>
-            </a:r>
-            <a:r>
-              <a:rPr lang="en-US"/>
-              <a:t>not possible</a:t>
-            </a:r>
-            <a:endParaRPr lang="en-US" dirty="0"/>
+              <a:t>Transaction rollbacks</a:t>
+            </a:r>
+          </a:p>
+          <a:p>
+            <a:pPr lvl="1"/>
+            <a:r>
+              <a:rPr lang="en-US" dirty="0"/>
+              <a:t>Checkpoint</a:t>
+            </a:r>
           </a:p>
         </p:txBody>
       </p:sp>
     </p:spTree>
     <p:extLst>
       <p:ext uri="{BB962C8B-B14F-4D97-AF65-F5344CB8AC3E}">
-        <p14:creationId xmlns:p14="http://schemas.microsoft.com/office/powerpoint/2010/main" val="3098932775"/>
+        <p14:creationId xmlns:p14="http://schemas.microsoft.com/office/powerpoint/2010/main" val="4039889923"/>
       </p:ext>
     </p:extLst>
   </p:cSld>
@@ -9027,7 +9023,7 @@
           <a:p>
             <a:r>
               <a:rPr lang="en-US" dirty="0"/>
-              <a:t>Clearing the Log</a:t>
+              <a:t>Recovery Models</a:t>
             </a:r>
           </a:p>
         </p:txBody>
@@ -9044,81 +9040,89 @@
         </p:nvSpPr>
         <p:spPr/>
         <p:txBody>
-          <a:bodyPr/>
+          <a:bodyPr>
+            <a:normAutofit fontScale="92500" lnSpcReduction="10000"/>
+          </a:bodyPr>
           <a:lstStyle/>
           <a:p>
             <a:r>
               <a:rPr lang="en-US" dirty="0"/>
-              <a:t>Marks unneeded portions of log as inactive</a:t>
-            </a:r>
-          </a:p>
-          <a:p>
-            <a:r>
-              <a:rPr lang="en-US" dirty="0"/>
-              <a:t>Triggers:</a:t>
+              <a:t>Impacts how SQL logs changes</a:t>
             </a:r>
           </a:p>
           <a:p>
             <a:pPr lvl="1"/>
             <a:r>
               <a:rPr lang="en-US" dirty="0"/>
-              <a:t>Simple recovery: Checkpoint</a:t>
+              <a:t>Simple recovery model</a:t>
+            </a:r>
+          </a:p>
+          <a:p>
+            <a:pPr lvl="2"/>
+            <a:r>
+              <a:rPr lang="en-US" dirty="0"/>
+              <a:t>All changes logged, but can be discarded on commit</a:t>
+            </a:r>
+          </a:p>
+          <a:p>
+            <a:pPr lvl="2"/>
+            <a:r>
+              <a:rPr lang="en-US" dirty="0"/>
+              <a:t>Can only recover to the latest full backup</a:t>
             </a:r>
           </a:p>
           <a:p>
             <a:pPr lvl="1"/>
             <a:r>
               <a:rPr lang="en-US" dirty="0"/>
-              <a:t>Full/bulked-log: Log Backup</a:t>
-            </a:r>
-          </a:p>
-          <a:p>
-            <a:r>
-              <a:rPr lang="en-US" dirty="0"/>
-              <a:t>Why can’t the log clear?</a:t>
+              <a:t>Full recovery model</a:t>
+            </a:r>
+          </a:p>
+          <a:p>
+            <a:pPr lvl="2"/>
+            <a:r>
+              <a:rPr lang="en-US" dirty="0"/>
+              <a:t>Log records must be kept until log backup completed</a:t>
+            </a:r>
+          </a:p>
+          <a:p>
+            <a:pPr lvl="2"/>
+            <a:r>
+              <a:rPr lang="en-US" dirty="0"/>
+              <a:t>Can recover to an arbitrary point in time</a:t>
             </a:r>
           </a:p>
           <a:p>
             <a:pPr lvl="1"/>
             <a:r>
               <a:rPr lang="en-US" dirty="0"/>
-              <a:t>Pending log backup</a:t>
-            </a:r>
-          </a:p>
-          <a:p>
-            <a:pPr lvl="1"/>
-            <a:r>
-              <a:rPr lang="en-US" dirty="0"/>
-              <a:t>Active replication / CDC / AG / mirroring</a:t>
-            </a:r>
-          </a:p>
-          <a:p>
-            <a:pPr lvl="1"/>
-            <a:r>
-              <a:rPr lang="en-US" dirty="0"/>
-              <a:t>Long-running transaction</a:t>
-            </a:r>
-          </a:p>
-          <a:p>
-            <a:pPr lvl="1"/>
-            <a:r>
-              <a:rPr lang="en-US" dirty="0"/>
-              <a:t>See </a:t>
-            </a:r>
-            <a:r>
-              <a:rPr lang="en-US" sz="2000" b="1" dirty="0" err="1">
-                <a:latin typeface="Courier New" panose="02070309020205020404" pitchFamily="49" charset="0"/>
-                <a:cs typeface="Courier New" panose="02070309020205020404" pitchFamily="49" charset="0"/>
-              </a:rPr>
-              <a:t>sys.databases.log_reuse_wait_desc</a:t>
-            </a:r>
-            <a:endParaRPr lang="en-US" sz="2000" b="1" dirty="0">
-              <a:latin typeface="Courier New" panose="02070309020205020404" pitchFamily="49" charset="0"/>
-              <a:cs typeface="Courier New" panose="02070309020205020404" pitchFamily="49" charset="0"/>
-            </a:endParaRPr>
-          </a:p>
-          <a:p>
-            <a:pPr lvl="1"/>
+              <a:t>Bulk-logged recovery model</a:t>
+            </a:r>
+          </a:p>
+          <a:p>
+            <a:pPr lvl="2"/>
+            <a:r>
+              <a:rPr lang="en-US" dirty="0"/>
+              <a:t>Similar to full model, but some changes are only “noted” rather than fully logged</a:t>
+            </a:r>
+          </a:p>
+          <a:p>
+            <a:pPr lvl="2"/>
+            <a:r>
+              <a:rPr lang="en-US" dirty="0"/>
+              <a:t>Log backups still include all changes</a:t>
+            </a:r>
+          </a:p>
+          <a:p>
+            <a:pPr lvl="2"/>
+            <a:r>
+              <a:rPr lang="en-US" dirty="0"/>
+              <a:t>Point-in-time recovery </a:t>
+            </a:r>
+            <a:r>
+              <a:rPr lang="en-US"/>
+              <a:t>not possible</a:t>
+            </a:r>
             <a:endParaRPr lang="en-US" dirty="0"/>
           </a:p>
         </p:txBody>
@@ -9126,7 +9130,7 @@
     </p:spTree>
     <p:extLst>
       <p:ext uri="{BB962C8B-B14F-4D97-AF65-F5344CB8AC3E}">
-        <p14:creationId xmlns:p14="http://schemas.microsoft.com/office/powerpoint/2010/main" val="4028217354"/>
+        <p14:creationId xmlns:p14="http://schemas.microsoft.com/office/powerpoint/2010/main" val="3098932775"/>
       </p:ext>
     </p:extLst>
   </p:cSld>
@@ -9170,6 +9174,149 @@
           <a:p>
             <a:r>
               <a:rPr lang="en-US" dirty="0"/>
+              <a:t>Clearing the Log</a:t>
+            </a:r>
+          </a:p>
+        </p:txBody>
+      </p:sp>
+      <p:sp>
+        <p:nvSpPr>
+          <p:cNvPr id="3" name="Content Placeholder 2"/>
+          <p:cNvSpPr>
+            <a:spLocks noGrp="1"/>
+          </p:cNvSpPr>
+          <p:nvPr>
+            <p:ph idx="1"/>
+          </p:nvPr>
+        </p:nvSpPr>
+        <p:spPr/>
+        <p:txBody>
+          <a:bodyPr/>
+          <a:lstStyle/>
+          <a:p>
+            <a:r>
+              <a:rPr lang="en-US" dirty="0"/>
+              <a:t>Marks unneeded portions of log as inactive</a:t>
+            </a:r>
+          </a:p>
+          <a:p>
+            <a:r>
+              <a:rPr lang="en-US" dirty="0"/>
+              <a:t>Triggers:</a:t>
+            </a:r>
+          </a:p>
+          <a:p>
+            <a:pPr lvl="1"/>
+            <a:r>
+              <a:rPr lang="en-US" dirty="0"/>
+              <a:t>Simple recovery: Checkpoint</a:t>
+            </a:r>
+          </a:p>
+          <a:p>
+            <a:pPr lvl="1"/>
+            <a:r>
+              <a:rPr lang="en-US" dirty="0"/>
+              <a:t>Full/bulked-log: Log Backup</a:t>
+            </a:r>
+          </a:p>
+          <a:p>
+            <a:r>
+              <a:rPr lang="en-US" dirty="0"/>
+              <a:t>Why can’t the log clear?</a:t>
+            </a:r>
+          </a:p>
+          <a:p>
+            <a:pPr lvl="1"/>
+            <a:r>
+              <a:rPr lang="en-US" dirty="0"/>
+              <a:t>Pending log backup</a:t>
+            </a:r>
+          </a:p>
+          <a:p>
+            <a:pPr lvl="1"/>
+            <a:r>
+              <a:rPr lang="en-US" dirty="0"/>
+              <a:t>Active replication / CDC / AG / mirroring</a:t>
+            </a:r>
+          </a:p>
+          <a:p>
+            <a:pPr lvl="1"/>
+            <a:r>
+              <a:rPr lang="en-US" dirty="0"/>
+              <a:t>Long-running transaction</a:t>
+            </a:r>
+          </a:p>
+          <a:p>
+            <a:pPr lvl="1"/>
+            <a:r>
+              <a:rPr lang="en-US" dirty="0"/>
+              <a:t>See </a:t>
+            </a:r>
+            <a:r>
+              <a:rPr lang="en-US" sz="2000" b="1" dirty="0" err="1">
+                <a:latin typeface="Courier New" panose="02070309020205020404" pitchFamily="49" charset="0"/>
+                <a:cs typeface="Courier New" panose="02070309020205020404" pitchFamily="49" charset="0"/>
+              </a:rPr>
+              <a:t>sys.databases.log_reuse_wait_desc</a:t>
+            </a:r>
+            <a:endParaRPr lang="en-US" sz="2000" b="1" dirty="0">
+              <a:latin typeface="Courier New" panose="02070309020205020404" pitchFamily="49" charset="0"/>
+              <a:cs typeface="Courier New" panose="02070309020205020404" pitchFamily="49" charset="0"/>
+            </a:endParaRPr>
+          </a:p>
+          <a:p>
+            <a:pPr lvl="1"/>
+            <a:endParaRPr lang="en-US" dirty="0"/>
+          </a:p>
+        </p:txBody>
+      </p:sp>
+    </p:spTree>
+    <p:extLst>
+      <p:ext uri="{BB962C8B-B14F-4D97-AF65-F5344CB8AC3E}">
+        <p14:creationId xmlns:p14="http://schemas.microsoft.com/office/powerpoint/2010/main" val="4028217354"/>
+      </p:ext>
+    </p:extLst>
+  </p:cSld>
+  <p:clrMapOvr>
+    <a:masterClrMapping/>
+  </p:clrMapOvr>
+</p:sld>
+</file>
+
+<file path=ppt/slides/slide32.xml><?xml version="1.0" encoding="utf-8"?>
+<p:sld xmlns:a="http://schemas.openxmlformats.org/drawingml/2006/main" xmlns:r="http://schemas.openxmlformats.org/officeDocument/2006/relationships" xmlns:p="http://schemas.openxmlformats.org/presentationml/2006/main">
+  <p:cSld>
+    <p:spTree>
+      <p:nvGrpSpPr>
+        <p:cNvPr id="1" name=""/>
+        <p:cNvGrpSpPr/>
+        <p:nvPr/>
+      </p:nvGrpSpPr>
+      <p:grpSpPr>
+        <a:xfrm>
+          <a:off x="0" y="0"/>
+          <a:ext cx="0" cy="0"/>
+          <a:chOff x="0" y="0"/>
+          <a:chExt cx="0" cy="0"/>
+        </a:xfrm>
+      </p:grpSpPr>
+      <p:sp>
+        <p:nvSpPr>
+          <p:cNvPr id="2" name="Title 1"/>
+          <p:cNvSpPr>
+            <a:spLocks noGrp="1"/>
+          </p:cNvSpPr>
+          <p:nvPr>
+            <p:ph type="title"/>
+          </p:nvPr>
+        </p:nvSpPr>
+        <p:spPr/>
+        <p:txBody>
+          <a:bodyPr/>
+          <a:lstStyle/>
+          <a:p>
+            <a:r>
+              <a:rPr lang="en-US" dirty="0"/>
               <a:t>Creating new VLFs</a:t>
             </a:r>
           </a:p>
@@ -9235,14 +9382,14 @@
                 <a:gridCol w="3048000">
                   <a:extLst>
                     <a:ext uri="{9D8B030D-6E8A-4147-A177-3AD203B41FA5}">
-                      <a16:colId xmlns:a16="http://schemas.microsoft.com/office/drawing/2014/main" val="20000"/>
+                      <a16:colId xmlns:a16="http://schemas.microsoft.com/office/drawing/2014/main" xmlns="" val="20000"/>
                     </a:ext>
                   </a:extLst>
                 </a:gridCol>
                 <a:gridCol w="3048000">
                   <a:extLst>
                     <a:ext uri="{9D8B030D-6E8A-4147-A177-3AD203B41FA5}">
-                      <a16:colId xmlns:a16="http://schemas.microsoft.com/office/drawing/2014/main" val="20001"/>
+                      <a16:colId xmlns:a16="http://schemas.microsoft.com/office/drawing/2014/main" xmlns="" val="20001"/>
                     </a:ext>
                   </a:extLst>
                 </a:gridCol>
@@ -9288,7 +9435,7 @@
                 </a:tc>
                 <a:extLst>
                   <a:ext uri="{0D108BD9-81ED-4DB2-BD59-A6C34878D82A}">
-                    <a16:rowId xmlns:a16="http://schemas.microsoft.com/office/drawing/2014/main" val="10000"/>
+                    <a16:rowId xmlns:a16="http://schemas.microsoft.com/office/drawing/2014/main" xmlns="" val="10000"/>
                   </a:ext>
                 </a:extLst>
               </a:tr>
@@ -9323,7 +9470,7 @@
                 </a:tc>
                 <a:extLst>
                   <a:ext uri="{0D108BD9-81ED-4DB2-BD59-A6C34878D82A}">
-                    <a16:rowId xmlns:a16="http://schemas.microsoft.com/office/drawing/2014/main" val="10001"/>
+                    <a16:rowId xmlns:a16="http://schemas.microsoft.com/office/drawing/2014/main" xmlns="" val="10001"/>
                   </a:ext>
                 </a:extLst>
               </a:tr>
@@ -9358,7 +9505,7 @@
                 </a:tc>
                 <a:extLst>
                   <a:ext uri="{0D108BD9-81ED-4DB2-BD59-A6C34878D82A}">
-                    <a16:rowId xmlns:a16="http://schemas.microsoft.com/office/drawing/2014/main" val="10002"/>
+                    <a16:rowId xmlns:a16="http://schemas.microsoft.com/office/drawing/2014/main" xmlns="" val="10002"/>
                   </a:ext>
                 </a:extLst>
               </a:tr>
@@ -9398,7 +9545,7 @@
                 </a:tc>
                 <a:extLst>
                   <a:ext uri="{0D108BD9-81ED-4DB2-BD59-A6C34878D82A}">
-                    <a16:rowId xmlns:a16="http://schemas.microsoft.com/office/drawing/2014/main" val="10003"/>
+                    <a16:rowId xmlns:a16="http://schemas.microsoft.com/office/drawing/2014/main" xmlns="" val="10003"/>
                   </a:ext>
                 </a:extLst>
               </a:tr>
@@ -9600,7 +9747,7 @@
 </p:sld>
 </file>
 
-<file path=ppt/slides/slide32.xml><?xml version="1.0" encoding="utf-8"?>
+<file path=ppt/slides/slide33.xml><?xml version="1.0" encoding="utf-8"?>
 <p:sld xmlns:a="http://schemas.openxmlformats.org/drawingml/2006/main" xmlns:r="http://schemas.openxmlformats.org/officeDocument/2006/relationships" xmlns:p="http://schemas.openxmlformats.org/presentationml/2006/main">
   <p:cSld>
     <p:spTree>
@@ -9964,18 +10111,17 @@
           </a:p>
           <a:p>
             <a:r>
-              <a:rPr lang="en-US" dirty="0"/>
+              <a:rPr lang="en-US" sz="2400" dirty="0"/>
               <a:t>Very limited exceptions for some </a:t>
             </a:r>
             <a:r>
-              <a:rPr lang="en-US" dirty="0" err="1"/>
+              <a:rPr lang="en-US" sz="2400" dirty="0" err="1"/>
               <a:t>tempdb</a:t>
             </a:r>
             <a:r>
-              <a:rPr lang="en-US"/>
+              <a:rPr lang="en-US" sz="2400" dirty="0"/>
               <a:t> operations</a:t>
             </a:r>
-            <a:endParaRPr lang="en-US" dirty="0"/>
           </a:p>
         </p:txBody>
       </p:sp>
@@ -10026,7 +10172,7 @@
           <a:p>
             <a:r>
               <a:rPr lang="en-US" dirty="0"/>
-              <a:t>Organization of the Transaction Log</a:t>
+              <a:t>Physical vs Logical Log File</a:t>
             </a:r>
           </a:p>
         </p:txBody>
@@ -10041,51 +10187,83 @@
             <p:ph idx="1"/>
           </p:nvPr>
         </p:nvSpPr>
-        <p:spPr>
-          <a:xfrm>
-            <a:off x="4352925" y="1600200"/>
-            <a:ext cx="4333875" cy="4525963"/>
-          </a:xfrm>
-        </p:spPr>
+        <p:spPr/>
         <p:txBody>
           <a:bodyPr/>
           <a:lstStyle/>
           <a:p>
             <a:r>
               <a:rPr lang="en-US" dirty="0"/>
-              <a:t>The Transaction Log is just a file …</a:t>
-            </a:r>
-          </a:p>
-        </p:txBody>
-      </p:sp>
-      <p:pic>
-        <p:nvPicPr>
-          <p:cNvPr id="4" name="Picture 3"/>
-          <p:cNvPicPr>
-            <a:picLocks noChangeAspect="1"/>
-          </p:cNvPicPr>
-          <p:nvPr/>
-        </p:nvPicPr>
-        <p:blipFill>
-          <a:blip r:embed="rId2"/>
-          <a:stretch>
-            <a:fillRect/>
-          </a:stretch>
-        </p:blipFill>
-        <p:spPr>
-          <a:xfrm>
-            <a:off x="457200" y="1417638"/>
-            <a:ext cx="3810789" cy="4678078"/>
-          </a:xfrm>
-          <a:prstGeom prst="rect">
-            <a:avLst/>
-          </a:prstGeom>
-        </p:spPr>
-      </p:pic>
+              <a:t>Logical Log File</a:t>
+            </a:r>
+          </a:p>
+          <a:p>
+            <a:pPr lvl="1"/>
+            <a:r>
+              <a:rPr lang="en-US" dirty="0"/>
+              <a:t>Always growing</a:t>
+            </a:r>
+          </a:p>
+          <a:p>
+            <a:pPr lvl="1"/>
+            <a:r>
+              <a:rPr lang="en-US" dirty="0"/>
+              <a:t>Write once / read </a:t>
+            </a:r>
+            <a:r>
+              <a:rPr lang="en-US" dirty="0" smtClean="0"/>
+              <a:t>many</a:t>
+            </a:r>
+          </a:p>
+          <a:p>
+            <a:pPr lvl="2"/>
+            <a:r>
+              <a:rPr lang="en-US" dirty="0" smtClean="0"/>
+              <a:t>After being written, log records are </a:t>
+            </a:r>
+            <a:r>
+              <a:rPr lang="en-US" b="1" dirty="0" smtClean="0"/>
+              <a:t>never</a:t>
+            </a:r>
+            <a:r>
+              <a:rPr lang="en-US" dirty="0" smtClean="0"/>
+              <a:t> changed</a:t>
+            </a:r>
+            <a:endParaRPr lang="en-US" dirty="0"/>
+          </a:p>
+          <a:p>
+            <a:r>
+              <a:rPr lang="en-US" dirty="0"/>
+              <a:t>Physical Log File</a:t>
+            </a:r>
+          </a:p>
+          <a:p>
+            <a:pPr lvl="1"/>
+            <a:r>
+              <a:rPr lang="en-US" dirty="0"/>
+              <a:t>Only grows when full (or manually grown)</a:t>
+            </a:r>
+          </a:p>
+          <a:p>
+            <a:pPr lvl="1"/>
+            <a:r>
+              <a:rPr lang="en-US" dirty="0"/>
+              <a:t>Divided into virtual log files (VLFs)</a:t>
+            </a:r>
+          </a:p>
+          <a:p>
+            <a:pPr lvl="1"/>
+            <a:r>
+              <a:rPr lang="en-US" dirty="0"/>
+              <a:t>VLFs are inactivated when possible and over-written</a:t>
+            </a:r>
+          </a:p>
+        </p:txBody>
+      </p:sp>
     </p:spTree>
     <p:extLst>
       <p:ext uri="{BB962C8B-B14F-4D97-AF65-F5344CB8AC3E}">
-        <p14:creationId xmlns:p14="http://schemas.microsoft.com/office/powerpoint/2010/main" val="3982838056"/>
+        <p14:creationId xmlns:p14="http://schemas.microsoft.com/office/powerpoint/2010/main" val="3330670825"/>
       </p:ext>
     </p:extLst>
   </p:cSld>
@@ -10159,12 +10337,6 @@
               <a:t>The Transaction Log is just a file …</a:t>
             </a:r>
           </a:p>
-          <a:p>
-            <a:r>
-              <a:rPr lang="en-US" dirty="0"/>
-              <a:t>With a bit of header information …</a:t>
-            </a:r>
-          </a:p>
         </p:txBody>
       </p:sp>
       <p:pic>
@@ -10183,8 +10355,8 @@
         </p:blipFill>
         <p:spPr>
           <a:xfrm>
-            <a:off x="457200" y="1417320"/>
-            <a:ext cx="3814109" cy="4681728"/>
+            <a:off x="457200" y="1417638"/>
+            <a:ext cx="3810789" cy="4678078"/>
           </a:xfrm>
           <a:prstGeom prst="rect">
             <a:avLst/>
@@ -10194,7 +10366,7 @@
     </p:spTree>
     <p:extLst>
       <p:ext uri="{BB962C8B-B14F-4D97-AF65-F5344CB8AC3E}">
-        <p14:creationId xmlns:p14="http://schemas.microsoft.com/office/powerpoint/2010/main" val="1865007227"/>
+        <p14:creationId xmlns:p14="http://schemas.microsoft.com/office/powerpoint/2010/main" val="3982838056"/>
       </p:ext>
     </p:extLst>
   </p:cSld>
@@ -10274,24 +10446,11 @@
               <a:t>With a bit of header information …</a:t>
             </a:r>
           </a:p>
-          <a:p>
-            <a:r>
-              <a:rPr lang="en-US" dirty="0"/>
-              <a:t>Then divided into Virtual Log Files.</a:t>
-            </a:r>
-          </a:p>
-          <a:p>
-            <a:pPr lvl="1"/>
-            <a:r>
-              <a:rPr lang="en-US" dirty="0"/>
-              <a:t>Not necessarily of equal size</a:t>
-            </a:r>
-          </a:p>
         </p:txBody>
       </p:sp>
       <p:pic>
         <p:nvPicPr>
-          <p:cNvPr id="5" name="Picture 4"/>
+          <p:cNvPr id="4" name="Picture 3"/>
           <p:cNvPicPr>
             <a:picLocks noChangeAspect="1"/>
           </p:cNvPicPr>
@@ -10316,7 +10475,7 @@
     </p:spTree>
     <p:extLst>
       <p:ext uri="{BB962C8B-B14F-4D97-AF65-F5344CB8AC3E}">
-        <p14:creationId xmlns:p14="http://schemas.microsoft.com/office/powerpoint/2010/main" val="3601134671"/>
+        <p14:creationId xmlns:p14="http://schemas.microsoft.com/office/powerpoint/2010/main" val="1865007227"/>
       </p:ext>
     </p:extLst>
   </p:cSld>
@@ -10360,7 +10519,7 @@
           <a:p>
             <a:r>
               <a:rPr lang="en-US" dirty="0"/>
-              <a:t>Virtual Log Files</a:t>
+              <a:t>Organization of the Transaction Log</a:t>
             </a:r>
           </a:p>
         </p:txBody>
@@ -10380,7 +10539,6 @@
             <a:off x="4352925" y="1600200"/>
             <a:ext cx="4333875" cy="4525963"/>
           </a:xfrm>
-          <a:noFill/>
         </p:spPr>
         <p:txBody>
           <a:bodyPr/>
@@ -10388,58 +10546,33 @@
           <a:p>
             <a:r>
               <a:rPr lang="en-US" dirty="0"/>
-              <a:t>VLFs can be in one of two statuses:</a:t>
+              <a:t>The Transaction Log is just a file …</a:t>
+            </a:r>
+          </a:p>
+          <a:p>
+            <a:r>
+              <a:rPr lang="en-US" dirty="0"/>
+              <a:t>With a bit of header information …</a:t>
+            </a:r>
+          </a:p>
+          <a:p>
+            <a:r>
+              <a:rPr lang="en-US" dirty="0"/>
+              <a:t>Then divided into Virtual Log Files.</a:t>
             </a:r>
           </a:p>
           <a:p>
             <a:pPr lvl="1"/>
             <a:r>
-              <a:rPr lang="en-US" dirty="0">
-                <a:solidFill>
-                  <a:srgbClr val="92D050"/>
-                </a:solidFill>
-              </a:rPr>
-              <a:t>Inactive</a:t>
-            </a:r>
-          </a:p>
-          <a:p>
-            <a:pPr lvl="1"/>
-            <a:r>
-              <a:rPr lang="en-US" dirty="0">
-                <a:solidFill>
-                  <a:srgbClr val="FFFF00"/>
-                </a:solidFill>
-              </a:rPr>
-              <a:t>Active (current)</a:t>
-            </a:r>
-          </a:p>
-          <a:p>
-            <a:pPr lvl="1"/>
-            <a:r>
-              <a:rPr lang="en-US" dirty="0">
-                <a:solidFill>
-                  <a:srgbClr val="FF0000"/>
-                </a:solidFill>
-              </a:rPr>
-              <a:t>Active (not usable)</a:t>
-            </a:r>
-            <a:endParaRPr lang="en-US" dirty="0">
-              <a:solidFill>
-                <a:schemeClr val="tx1"/>
-              </a:solidFill>
-            </a:endParaRPr>
-          </a:p>
-          <a:p>
-            <a:r>
-              <a:rPr lang="en-US" dirty="0"/>
-              <a:t>Only one VLF is current at a time.</a:t>
+              <a:rPr lang="en-US" dirty="0"/>
+              <a:t>Not necessarily of equal size</a:t>
             </a:r>
           </a:p>
         </p:txBody>
       </p:sp>
       <p:pic>
         <p:nvPicPr>
-          <p:cNvPr id="4" name="Picture 3"/>
+          <p:cNvPr id="5" name="Picture 4"/>
           <p:cNvPicPr>
             <a:picLocks noChangeAspect="1"/>
           </p:cNvPicPr>
@@ -10464,7 +10597,7 @@
     </p:spTree>
     <p:extLst>
       <p:ext uri="{BB962C8B-B14F-4D97-AF65-F5344CB8AC3E}">
-        <p14:creationId xmlns:p14="http://schemas.microsoft.com/office/powerpoint/2010/main" val="1865925798"/>
+        <p14:creationId xmlns:p14="http://schemas.microsoft.com/office/powerpoint/2010/main" val="3601134671"/>
       </p:ext>
     </p:extLst>
   </p:cSld>

</xml_diff>

<commit_message>
Add demos.  Minor updates to slide deck.
</commit_message>
<xml_diff>
--- a/TransactionLog.pptx
+++ b/TransactionLog.pptx
@@ -5,7 +5,7 @@
     <p:sldMasterId id="2147483648" r:id="rId1"/>
   </p:sldMasterIdLst>
   <p:notesMasterIdLst>
-    <p:notesMasterId r:id="rId38"/>
+    <p:notesMasterId r:id="rId45"/>
   </p:notesMasterIdLst>
   <p:sldIdLst>
     <p:sldId id="328" r:id="rId2"/>
@@ -42,8 +42,15 @@
     <p:sldId id="353" r:id="rId33"/>
     <p:sldId id="352" r:id="rId34"/>
     <p:sldId id="355" r:id="rId35"/>
-    <p:sldId id="357" r:id="rId36"/>
-    <p:sldId id="359" r:id="rId37"/>
+    <p:sldId id="366" r:id="rId36"/>
+    <p:sldId id="368" r:id="rId37"/>
+    <p:sldId id="369" r:id="rId38"/>
+    <p:sldId id="357" r:id="rId39"/>
+    <p:sldId id="359" r:id="rId40"/>
+    <p:sldId id="365" r:id="rId41"/>
+    <p:sldId id="367" r:id="rId42"/>
+    <p:sldId id="370" r:id="rId43"/>
+    <p:sldId id="371" r:id="rId44"/>
   </p:sldIdLst>
   <p:sldSz cx="9144000" cy="6858000" type="screen4x3"/>
   <p:notesSz cx="6858000" cy="9144000"/>
@@ -243,7 +250,7 @@
           <a:p>
             <a:fld id="{2EDCB34D-5EC2-4739-9693-E425457AC201}" type="datetimeFigureOut">
               <a:rPr lang="en-US" smtClean="0"/>
-              <a:t>09/06/2016</a:t>
+              <a:t>09/08/2016</a:t>
             </a:fld>
             <a:endParaRPr lang="en-US"/>
           </a:p>
@@ -829,7 +836,7 @@
             <a:fld id="{5942B21B-2ADA-A040-A652-A7305E1B99FE}" type="datetimeFigureOut">
               <a:rPr lang="en-US" smtClean="0"/>
               <a:pPr/>
-              <a:t>09/06/2016</a:t>
+              <a:t>09/08/2016</a:t>
             </a:fld>
             <a:endParaRPr lang="en-US" dirty="0"/>
           </a:p>
@@ -1019,7 +1026,7 @@
           <a:p>
             <a:fld id="{5942B21B-2ADA-A040-A652-A7305E1B99FE}" type="datetimeFigureOut">
               <a:rPr lang="en-US" smtClean="0"/>
-              <a:t>09/06/2016</a:t>
+              <a:t>09/08/2016</a:t>
             </a:fld>
             <a:endParaRPr lang="en-US"/>
           </a:p>
@@ -1143,7 +1150,7 @@
             <a:fld id="{5942B21B-2ADA-A040-A652-A7305E1B99FE}" type="datetimeFigureOut">
               <a:rPr lang="en-US" smtClean="0"/>
               <a:pPr/>
-              <a:t>09/06/2016</a:t>
+              <a:t>09/08/2016</a:t>
             </a:fld>
             <a:r>
               <a:rPr lang="en-US"/>
@@ -1414,7 +1421,7 @@
             <a:fld id="{5942B21B-2ADA-A040-A652-A7305E1B99FE}" type="datetimeFigureOut">
               <a:rPr lang="en-US" smtClean="0"/>
               <a:pPr/>
-              <a:t>09/06/2016</a:t>
+              <a:t>09/08/2016</a:t>
             </a:fld>
             <a:r>
               <a:rPr lang="en-US" dirty="0"/>
@@ -1684,7 +1691,7 @@
             <a:fld id="{5942B21B-2ADA-A040-A652-A7305E1B99FE}" type="datetimeFigureOut">
               <a:rPr lang="en-US" smtClean="0"/>
               <a:pPr/>
-              <a:t>09/06/2016</a:t>
+              <a:t>09/08/2016</a:t>
             </a:fld>
             <a:r>
               <a:rPr lang="en-US" dirty="0"/>
@@ -2024,7 +2031,7 @@
             <a:fld id="{5942B21B-2ADA-A040-A652-A7305E1B99FE}" type="datetimeFigureOut">
               <a:rPr lang="en-US" smtClean="0"/>
               <a:pPr/>
-              <a:t>09/06/2016</a:t>
+              <a:t>09/08/2016</a:t>
             </a:fld>
             <a:r>
               <a:rPr lang="en-US" dirty="0"/>
@@ -2365,7 +2372,7 @@
             <a:fld id="{5942B21B-2ADA-A040-A652-A7305E1B99FE}" type="datetimeFigureOut">
               <a:rPr lang="en-US" smtClean="0"/>
               <a:pPr/>
-              <a:t>09/06/2016</a:t>
+              <a:t>09/08/2016</a:t>
             </a:fld>
             <a:r>
               <a:rPr lang="en-US" dirty="0"/>
@@ -2880,7 +2887,7 @@
             <a:fld id="{5942B21B-2ADA-A040-A652-A7305E1B99FE}" type="datetimeFigureOut">
               <a:rPr lang="en-US" smtClean="0"/>
               <a:pPr/>
-              <a:t>09/06/2016</a:t>
+              <a:t>09/08/2016</a:t>
             </a:fld>
             <a:r>
               <a:rPr lang="en-US" dirty="0"/>
@@ -3089,7 +3096,7 @@
             <a:fld id="{5942B21B-2ADA-A040-A652-A7305E1B99FE}" type="datetimeFigureOut">
               <a:rPr lang="en-US" smtClean="0"/>
               <a:pPr/>
-              <a:t>09/06/2016</a:t>
+              <a:t>09/08/2016</a:t>
             </a:fld>
             <a:r>
               <a:rPr lang="en-US" dirty="0"/>
@@ -3276,7 +3283,7 @@
             <a:fld id="{5942B21B-2ADA-A040-A652-A7305E1B99FE}" type="datetimeFigureOut">
               <a:rPr lang="en-US" smtClean="0"/>
               <a:pPr/>
-              <a:t>09/06/2016</a:t>
+              <a:t>09/08/2016</a:t>
             </a:fld>
             <a:r>
               <a:rPr lang="en-US" dirty="0"/>
@@ -3607,7 +3614,7 @@
             <a:fld id="{5942B21B-2ADA-A040-A652-A7305E1B99FE}" type="datetimeFigureOut">
               <a:rPr lang="en-US" smtClean="0"/>
               <a:pPr/>
-              <a:t>09/06/2016</a:t>
+              <a:t>09/08/2016</a:t>
             </a:fld>
             <a:r>
               <a:rPr lang="en-US" dirty="0"/>
@@ -3915,7 +3922,7 @@
             <a:fld id="{5942B21B-2ADA-A040-A652-A7305E1B99FE}" type="datetimeFigureOut">
               <a:rPr lang="en-US" smtClean="0"/>
               <a:pPr/>
-              <a:t>09/06/2016</a:t>
+              <a:t>09/08/2016</a:t>
             </a:fld>
             <a:r>
               <a:rPr lang="en-US" dirty="0"/>
@@ -4194,7 +4201,7 @@
             <a:fld id="{5942B21B-2ADA-A040-A652-A7305E1B99FE}" type="datetimeFigureOut">
               <a:rPr lang="en-US" smtClean="0"/>
               <a:pPr/>
-              <a:t>09/06/2016</a:t>
+              <a:t>09/08/2016</a:t>
             </a:fld>
             <a:r>
               <a:rPr lang="en-US" dirty="0"/>
@@ -7511,21 +7518,21 @@
                 <a:gridCol w="1895475">
                   <a:extLst>
                     <a:ext uri="{9D8B030D-6E8A-4147-A177-3AD203B41FA5}">
-                      <a16:colId xmlns="" xmlns:a16="http://schemas.microsoft.com/office/drawing/2014/main" val="20000"/>
+                      <a16:colId xmlns:a16="http://schemas.microsoft.com/office/drawing/2014/main" xmlns="" val="20000"/>
                     </a:ext>
                   </a:extLst>
                 </a:gridCol>
                 <a:gridCol w="3171825">
                   <a:extLst>
                     <a:ext uri="{9D8B030D-6E8A-4147-A177-3AD203B41FA5}">
-                      <a16:colId xmlns="" xmlns:a16="http://schemas.microsoft.com/office/drawing/2014/main" val="20001"/>
+                      <a16:colId xmlns:a16="http://schemas.microsoft.com/office/drawing/2014/main" xmlns="" val="20001"/>
                     </a:ext>
                   </a:extLst>
                 </a:gridCol>
                 <a:gridCol w="3162300">
                   <a:extLst>
                     <a:ext uri="{9D8B030D-6E8A-4147-A177-3AD203B41FA5}">
-                      <a16:colId xmlns="" xmlns:a16="http://schemas.microsoft.com/office/drawing/2014/main" val="20002"/>
+                      <a16:colId xmlns:a16="http://schemas.microsoft.com/office/drawing/2014/main" xmlns="" val="20002"/>
                     </a:ext>
                   </a:extLst>
                 </a:gridCol>
@@ -7572,7 +7579,7 @@
                 </a:tc>
                 <a:extLst>
                   <a:ext uri="{0D108BD9-81ED-4DB2-BD59-A6C34878D82A}">
-                    <a16:rowId xmlns="" xmlns:a16="http://schemas.microsoft.com/office/drawing/2014/main" val="10000"/>
+                    <a16:rowId xmlns:a16="http://schemas.microsoft.com/office/drawing/2014/main" xmlns="" val="10000"/>
                   </a:ext>
                 </a:extLst>
               </a:tr>
@@ -7636,7 +7643,7 @@
                 </a:tc>
                 <a:extLst>
                   <a:ext uri="{0D108BD9-81ED-4DB2-BD59-A6C34878D82A}">
-                    <a16:rowId xmlns="" xmlns:a16="http://schemas.microsoft.com/office/drawing/2014/main" val="10001"/>
+                    <a16:rowId xmlns:a16="http://schemas.microsoft.com/office/drawing/2014/main" xmlns="" val="10001"/>
                   </a:ext>
                 </a:extLst>
               </a:tr>
@@ -7707,7 +7714,7 @@
                 </a:tc>
                 <a:extLst>
                   <a:ext uri="{0D108BD9-81ED-4DB2-BD59-A6C34878D82A}">
-                    <a16:rowId xmlns="" xmlns:a16="http://schemas.microsoft.com/office/drawing/2014/main" val="10002"/>
+                    <a16:rowId xmlns:a16="http://schemas.microsoft.com/office/drawing/2014/main" xmlns="" val="10002"/>
                   </a:ext>
                 </a:extLst>
               </a:tr>
@@ -7754,7 +7761,7 @@
                 </a:tc>
                 <a:extLst>
                   <a:ext uri="{0D108BD9-81ED-4DB2-BD59-A6C34878D82A}">
-                    <a16:rowId xmlns="" xmlns:a16="http://schemas.microsoft.com/office/drawing/2014/main" val="10003"/>
+                    <a16:rowId xmlns:a16="http://schemas.microsoft.com/office/drawing/2014/main" xmlns="" val="10003"/>
                   </a:ext>
                 </a:extLst>
               </a:tr>
@@ -7806,7 +7813,7 @@
                 </a:tc>
                 <a:extLst>
                   <a:ext uri="{0D108BD9-81ED-4DB2-BD59-A6C34878D82A}">
-                    <a16:rowId xmlns="" xmlns:a16="http://schemas.microsoft.com/office/drawing/2014/main" val="3543017676"/>
+                    <a16:rowId xmlns:a16="http://schemas.microsoft.com/office/drawing/2014/main" xmlns="" val="3543017676"/>
                   </a:ext>
                 </a:extLst>
               </a:tr>
@@ -9570,6 +9577,286 @@
           <a:lstStyle/>
           <a:p>
             <a:r>
+              <a:rPr lang="en-US" dirty="0" smtClean="0"/>
+              <a:t>Demos</a:t>
+            </a:r>
+            <a:endParaRPr lang="en-US" dirty="0"/>
+          </a:p>
+        </p:txBody>
+      </p:sp>
+      <p:sp>
+        <p:nvSpPr>
+          <p:cNvPr id="3" name="Content Placeholder 2"/>
+          <p:cNvSpPr>
+            <a:spLocks noGrp="1"/>
+          </p:cNvSpPr>
+          <p:nvPr>
+            <p:ph idx="1"/>
+          </p:nvPr>
+        </p:nvSpPr>
+        <p:spPr/>
+        <p:txBody>
+          <a:bodyPr/>
+          <a:lstStyle/>
+          <a:p>
+            <a:pPr marL="0" indent="0">
+              <a:buNone/>
+            </a:pPr>
+            <a:r>
+              <a:rPr lang="en-US" dirty="0" smtClean="0"/>
+              <a:t>Simple recovery</a:t>
+            </a:r>
+          </a:p>
+          <a:p>
+            <a:pPr marL="0" indent="0">
+              <a:buNone/>
+            </a:pPr>
+            <a:r>
+              <a:rPr lang="en-US" dirty="0" smtClean="0"/>
+              <a:t>Full recovery</a:t>
+            </a:r>
+          </a:p>
+          <a:p>
+            <a:pPr marL="0" indent="0">
+              <a:buNone/>
+            </a:pPr>
+            <a:endParaRPr lang="en-US" dirty="0"/>
+          </a:p>
+        </p:txBody>
+      </p:sp>
+    </p:spTree>
+    <p:extLst>
+      <p:ext uri="{BB962C8B-B14F-4D97-AF65-F5344CB8AC3E}">
+        <p14:creationId xmlns:p14="http://schemas.microsoft.com/office/powerpoint/2010/main" val="4059385380"/>
+      </p:ext>
+    </p:extLst>
+  </p:cSld>
+  <p:clrMapOvr>
+    <a:masterClrMapping/>
+  </p:clrMapOvr>
+</p:sld>
+</file>
+
+<file path=ppt/slides/slide36.xml><?xml version="1.0" encoding="utf-8"?>
+<p:sld xmlns:a="http://schemas.openxmlformats.org/drawingml/2006/main" xmlns:r="http://schemas.openxmlformats.org/officeDocument/2006/relationships" xmlns:p="http://schemas.openxmlformats.org/presentationml/2006/main">
+  <p:cSld>
+    <p:spTree>
+      <p:nvGrpSpPr>
+        <p:cNvPr id="1" name=""/>
+        <p:cNvGrpSpPr/>
+        <p:nvPr/>
+      </p:nvGrpSpPr>
+      <p:grpSpPr>
+        <a:xfrm>
+          <a:off x="0" y="0"/>
+          <a:ext cx="0" cy="0"/>
+          <a:chOff x="0" y="0"/>
+          <a:chExt cx="0" cy="0"/>
+        </a:xfrm>
+      </p:grpSpPr>
+      <p:sp>
+        <p:nvSpPr>
+          <p:cNvPr id="2" name="Title 1"/>
+          <p:cNvSpPr>
+            <a:spLocks noGrp="1"/>
+          </p:cNvSpPr>
+          <p:nvPr>
+            <p:ph type="title"/>
+          </p:nvPr>
+        </p:nvSpPr>
+        <p:spPr/>
+        <p:txBody>
+          <a:bodyPr/>
+          <a:lstStyle/>
+          <a:p>
+            <a:r>
+              <a:rPr lang="en-US" dirty="0" smtClean="0"/>
+              <a:t>Rolling Back a Transaction</a:t>
+            </a:r>
+            <a:endParaRPr lang="en-US" dirty="0"/>
+          </a:p>
+        </p:txBody>
+      </p:sp>
+      <p:sp>
+        <p:nvSpPr>
+          <p:cNvPr id="3" name="Content Placeholder 2"/>
+          <p:cNvSpPr>
+            <a:spLocks noGrp="1"/>
+          </p:cNvSpPr>
+          <p:nvPr>
+            <p:ph idx="1"/>
+          </p:nvPr>
+        </p:nvSpPr>
+        <p:spPr/>
+        <p:txBody>
+          <a:bodyPr/>
+          <a:lstStyle/>
+          <a:p>
+            <a:r>
+              <a:rPr lang="en-US" dirty="0" smtClean="0"/>
+              <a:t>When a transaction cannot complete, it must rollback</a:t>
+            </a:r>
+          </a:p>
+          <a:p>
+            <a:pPr lvl="1"/>
+            <a:r>
+              <a:rPr lang="en-US" dirty="0" smtClean="0"/>
+              <a:t>ROLLBACK TRANSACTION command</a:t>
+            </a:r>
+          </a:p>
+          <a:p>
+            <a:pPr lvl="1"/>
+            <a:r>
+              <a:rPr lang="en-US" dirty="0" smtClean="0"/>
+              <a:t>Connection is abandoned</a:t>
+            </a:r>
+          </a:p>
+          <a:p>
+            <a:pPr lvl="2"/>
+            <a:r>
+              <a:rPr lang="en-US" dirty="0" smtClean="0"/>
+              <a:t>Network failure, KILL, severe errors, client crash</a:t>
+            </a:r>
+          </a:p>
+          <a:p>
+            <a:pPr lvl="1"/>
+            <a:r>
+              <a:rPr lang="en-US" dirty="0" smtClean="0"/>
+              <a:t>Non-graceful shutdown of SQL (crash recovery)</a:t>
+            </a:r>
+          </a:p>
+          <a:p>
+            <a:pPr lvl="1"/>
+            <a:r>
+              <a:rPr lang="en-US" dirty="0" smtClean="0"/>
+              <a:t>Restore operations</a:t>
+            </a:r>
+            <a:endParaRPr lang="en-US" dirty="0"/>
+          </a:p>
+        </p:txBody>
+      </p:sp>
+    </p:spTree>
+    <p:extLst>
+      <p:ext uri="{BB962C8B-B14F-4D97-AF65-F5344CB8AC3E}">
+        <p14:creationId xmlns:p14="http://schemas.microsoft.com/office/powerpoint/2010/main" val="2736551440"/>
+      </p:ext>
+    </p:extLst>
+  </p:cSld>
+  <p:clrMapOvr>
+    <a:masterClrMapping/>
+  </p:clrMapOvr>
+</p:sld>
+</file>
+
+<file path=ppt/slides/slide37.xml><?xml version="1.0" encoding="utf-8"?>
+<p:sld xmlns:a="http://schemas.openxmlformats.org/drawingml/2006/main" xmlns:r="http://schemas.openxmlformats.org/officeDocument/2006/relationships" xmlns:p="http://schemas.openxmlformats.org/presentationml/2006/main">
+  <p:cSld>
+    <p:spTree>
+      <p:nvGrpSpPr>
+        <p:cNvPr id="1" name=""/>
+        <p:cNvGrpSpPr/>
+        <p:nvPr/>
+      </p:nvGrpSpPr>
+      <p:grpSpPr>
+        <a:xfrm>
+          <a:off x="0" y="0"/>
+          <a:ext cx="0" cy="0"/>
+          <a:chOff x="0" y="0"/>
+          <a:chExt cx="0" cy="0"/>
+        </a:xfrm>
+      </p:grpSpPr>
+      <p:sp>
+        <p:nvSpPr>
+          <p:cNvPr id="2" name="Title 1"/>
+          <p:cNvSpPr>
+            <a:spLocks noGrp="1"/>
+          </p:cNvSpPr>
+          <p:nvPr>
+            <p:ph type="title"/>
+          </p:nvPr>
+        </p:nvSpPr>
+        <p:spPr/>
+        <p:txBody>
+          <a:bodyPr/>
+          <a:lstStyle/>
+          <a:p>
+            <a:r>
+              <a:rPr lang="en-US" dirty="0" smtClean="0"/>
+              <a:t>Rolling Back a Transaction</a:t>
+            </a:r>
+            <a:endParaRPr lang="en-US" dirty="0"/>
+          </a:p>
+        </p:txBody>
+      </p:sp>
+      <p:sp>
+        <p:nvSpPr>
+          <p:cNvPr id="3" name="Content Placeholder 2"/>
+          <p:cNvSpPr>
+            <a:spLocks noGrp="1"/>
+          </p:cNvSpPr>
+          <p:nvPr>
+            <p:ph idx="1"/>
+          </p:nvPr>
+        </p:nvSpPr>
+        <p:spPr/>
+        <p:txBody>
+          <a:bodyPr/>
+          <a:lstStyle/>
+          <a:p>
+            <a:r>
+              <a:rPr lang="en-US" dirty="0" smtClean="0"/>
+              <a:t>Log records form a reverse linked list of operations within a transaction.</a:t>
+            </a:r>
+            <a:endParaRPr lang="en-US" dirty="0"/>
+          </a:p>
+        </p:txBody>
+      </p:sp>
+    </p:spTree>
+    <p:extLst>
+      <p:ext uri="{BB962C8B-B14F-4D97-AF65-F5344CB8AC3E}">
+        <p14:creationId xmlns:p14="http://schemas.microsoft.com/office/powerpoint/2010/main" val="2549905237"/>
+      </p:ext>
+    </p:extLst>
+  </p:cSld>
+  <p:clrMapOvr>
+    <a:masterClrMapping/>
+  </p:clrMapOvr>
+</p:sld>
+</file>
+
+<file path=ppt/slides/slide38.xml><?xml version="1.0" encoding="utf-8"?>
+<p:sld xmlns:a="http://schemas.openxmlformats.org/drawingml/2006/main" xmlns:r="http://schemas.openxmlformats.org/officeDocument/2006/relationships" xmlns:p="http://schemas.openxmlformats.org/presentationml/2006/main">
+  <p:cSld>
+    <p:spTree>
+      <p:nvGrpSpPr>
+        <p:cNvPr id="1" name=""/>
+        <p:cNvGrpSpPr/>
+        <p:nvPr/>
+      </p:nvGrpSpPr>
+      <p:grpSpPr>
+        <a:xfrm>
+          <a:off x="0" y="0"/>
+          <a:ext cx="0" cy="0"/>
+          <a:chOff x="0" y="0"/>
+          <a:chExt cx="0" cy="0"/>
+        </a:xfrm>
+      </p:grpSpPr>
+      <p:sp>
+        <p:nvSpPr>
+          <p:cNvPr id="2" name="Title 1"/>
+          <p:cNvSpPr>
+            <a:spLocks noGrp="1"/>
+          </p:cNvSpPr>
+          <p:nvPr>
+            <p:ph type="title"/>
+          </p:nvPr>
+        </p:nvSpPr>
+        <p:spPr/>
+        <p:txBody>
+          <a:bodyPr/>
+          <a:lstStyle/>
+          <a:p>
+            <a:r>
               <a:rPr lang="en-US" dirty="0"/>
               <a:t>Creating new VLFs</a:t>
             </a:r>
@@ -9636,14 +9923,14 @@
                 <a:gridCol w="3048000">
                   <a:extLst>
                     <a:ext uri="{9D8B030D-6E8A-4147-A177-3AD203B41FA5}">
-                      <a16:colId xmlns="" xmlns:a16="http://schemas.microsoft.com/office/drawing/2014/main" val="20000"/>
+                      <a16:colId xmlns:a16="http://schemas.microsoft.com/office/drawing/2014/main" xmlns="" val="20000"/>
                     </a:ext>
                   </a:extLst>
                 </a:gridCol>
                 <a:gridCol w="3048000">
                   <a:extLst>
                     <a:ext uri="{9D8B030D-6E8A-4147-A177-3AD203B41FA5}">
-                      <a16:colId xmlns="" xmlns:a16="http://schemas.microsoft.com/office/drawing/2014/main" val="20001"/>
+                      <a16:colId xmlns:a16="http://schemas.microsoft.com/office/drawing/2014/main" xmlns="" val="20001"/>
                     </a:ext>
                   </a:extLst>
                 </a:gridCol>
@@ -9689,7 +9976,7 @@
                 </a:tc>
                 <a:extLst>
                   <a:ext uri="{0D108BD9-81ED-4DB2-BD59-A6C34878D82A}">
-                    <a16:rowId xmlns="" xmlns:a16="http://schemas.microsoft.com/office/drawing/2014/main" val="10000"/>
+                    <a16:rowId xmlns:a16="http://schemas.microsoft.com/office/drawing/2014/main" xmlns="" val="10000"/>
                   </a:ext>
                 </a:extLst>
               </a:tr>
@@ -9724,7 +10011,7 @@
                 </a:tc>
                 <a:extLst>
                   <a:ext uri="{0D108BD9-81ED-4DB2-BD59-A6C34878D82A}">
-                    <a16:rowId xmlns="" xmlns:a16="http://schemas.microsoft.com/office/drawing/2014/main" val="10001"/>
+                    <a16:rowId xmlns:a16="http://schemas.microsoft.com/office/drawing/2014/main" xmlns="" val="10001"/>
                   </a:ext>
                 </a:extLst>
               </a:tr>
@@ -9759,7 +10046,7 @@
                 </a:tc>
                 <a:extLst>
                   <a:ext uri="{0D108BD9-81ED-4DB2-BD59-A6C34878D82A}">
-                    <a16:rowId xmlns="" xmlns:a16="http://schemas.microsoft.com/office/drawing/2014/main" val="10002"/>
+                    <a16:rowId xmlns:a16="http://schemas.microsoft.com/office/drawing/2014/main" xmlns="" val="10002"/>
                   </a:ext>
                 </a:extLst>
               </a:tr>
@@ -9799,7 +10086,7 @@
                 </a:tc>
                 <a:extLst>
                   <a:ext uri="{0D108BD9-81ED-4DB2-BD59-A6C34878D82A}">
-                    <a16:rowId xmlns="" xmlns:a16="http://schemas.microsoft.com/office/drawing/2014/main" val="10003"/>
+                    <a16:rowId xmlns:a16="http://schemas.microsoft.com/office/drawing/2014/main" xmlns="" val="10003"/>
                   </a:ext>
                 </a:extLst>
               </a:tr>
@@ -10001,7 +10288,7 @@
 </p:sld>
 </file>
 
-<file path=ppt/slides/slide36.xml><?xml version="1.0" encoding="utf-8"?>
+<file path=ppt/slides/slide39.xml><?xml version="1.0" encoding="utf-8"?>
 <p:sld xmlns:a="http://schemas.openxmlformats.org/drawingml/2006/main" xmlns:r="http://schemas.openxmlformats.org/officeDocument/2006/relationships" xmlns:p="http://schemas.openxmlformats.org/presentationml/2006/main">
   <p:cSld>
     <p:spTree>
@@ -10273,6 +10560,611 @@
     <p:extLst>
       <p:ext uri="{BB962C8B-B14F-4D97-AF65-F5344CB8AC3E}">
         <p14:creationId xmlns:p14="http://schemas.microsoft.com/office/powerpoint/2010/main" val="1146920383"/>
+      </p:ext>
+    </p:extLst>
+  </p:cSld>
+  <p:clrMapOvr>
+    <a:masterClrMapping/>
+  </p:clrMapOvr>
+</p:sld>
+</file>
+
+<file path=ppt/slides/slide40.xml><?xml version="1.0" encoding="utf-8"?>
+<p:sld xmlns:a="http://schemas.openxmlformats.org/drawingml/2006/main" xmlns:r="http://schemas.openxmlformats.org/officeDocument/2006/relationships" xmlns:p="http://schemas.openxmlformats.org/presentationml/2006/main">
+  <p:cSld>
+    <p:spTree>
+      <p:nvGrpSpPr>
+        <p:cNvPr id="1" name=""/>
+        <p:cNvGrpSpPr/>
+        <p:nvPr/>
+      </p:nvGrpSpPr>
+      <p:grpSpPr>
+        <a:xfrm>
+          <a:off x="0" y="0"/>
+          <a:ext cx="0" cy="0"/>
+          <a:chOff x="0" y="0"/>
+          <a:chExt cx="0" cy="0"/>
+        </a:xfrm>
+      </p:grpSpPr>
+      <p:sp>
+        <p:nvSpPr>
+          <p:cNvPr id="2" name="Title 1"/>
+          <p:cNvSpPr>
+            <a:spLocks noGrp="1"/>
+          </p:cNvSpPr>
+          <p:nvPr>
+            <p:ph type="title"/>
+          </p:nvPr>
+        </p:nvSpPr>
+        <p:spPr/>
+        <p:txBody>
+          <a:bodyPr/>
+          <a:lstStyle/>
+          <a:p>
+            <a:r>
+              <a:rPr lang="en-US" dirty="0" smtClean="0"/>
+              <a:t>Pre-Allocating the Log</a:t>
+            </a:r>
+            <a:endParaRPr lang="en-US" dirty="0"/>
+          </a:p>
+        </p:txBody>
+      </p:sp>
+      <p:sp>
+        <p:nvSpPr>
+          <p:cNvPr id="3" name="Content Placeholder 2"/>
+          <p:cNvSpPr>
+            <a:spLocks noGrp="1"/>
+          </p:cNvSpPr>
+          <p:nvPr>
+            <p:ph idx="1"/>
+          </p:nvPr>
+        </p:nvSpPr>
+        <p:spPr/>
+        <p:txBody>
+          <a:bodyPr/>
+          <a:lstStyle/>
+          <a:p>
+            <a:r>
+              <a:rPr lang="en-US" dirty="0" smtClean="0"/>
+              <a:t>Why?</a:t>
+            </a:r>
+          </a:p>
+          <a:p>
+            <a:pPr lvl="1"/>
+            <a:r>
+              <a:rPr lang="en-US" dirty="0" smtClean="0"/>
+              <a:t>Eliminate VLF fragmentation</a:t>
+            </a:r>
+          </a:p>
+          <a:p>
+            <a:pPr lvl="1"/>
+            <a:r>
+              <a:rPr lang="en-US" dirty="0" smtClean="0"/>
+              <a:t>Avoid log growth during user operations</a:t>
+            </a:r>
+          </a:p>
+          <a:p>
+            <a:pPr lvl="2"/>
+            <a:r>
+              <a:rPr lang="en-US" dirty="0" smtClean="0"/>
+              <a:t>Can be time-consuming due to zero-initialization</a:t>
+            </a:r>
+            <a:endParaRPr lang="en-US" dirty="0"/>
+          </a:p>
+        </p:txBody>
+      </p:sp>
+    </p:spTree>
+    <p:extLst>
+      <p:ext uri="{BB962C8B-B14F-4D97-AF65-F5344CB8AC3E}">
+        <p14:creationId xmlns:p14="http://schemas.microsoft.com/office/powerpoint/2010/main" val="1170893381"/>
+      </p:ext>
+    </p:extLst>
+  </p:cSld>
+  <p:clrMapOvr>
+    <a:masterClrMapping/>
+  </p:clrMapOvr>
+</p:sld>
+</file>
+
+<file path=ppt/slides/slide41.xml><?xml version="1.0" encoding="utf-8"?>
+<p:sld xmlns:a="http://schemas.openxmlformats.org/drawingml/2006/main" xmlns:r="http://schemas.openxmlformats.org/officeDocument/2006/relationships" xmlns:p="http://schemas.openxmlformats.org/presentationml/2006/main">
+  <p:cSld>
+    <p:spTree>
+      <p:nvGrpSpPr>
+        <p:cNvPr id="1" name=""/>
+        <p:cNvGrpSpPr/>
+        <p:nvPr/>
+      </p:nvGrpSpPr>
+      <p:grpSpPr>
+        <a:xfrm>
+          <a:off x="0" y="0"/>
+          <a:ext cx="0" cy="0"/>
+          <a:chOff x="0" y="0"/>
+          <a:chExt cx="0" cy="0"/>
+        </a:xfrm>
+      </p:grpSpPr>
+      <p:sp>
+        <p:nvSpPr>
+          <p:cNvPr id="2" name="Title 1"/>
+          <p:cNvSpPr>
+            <a:spLocks noGrp="1"/>
+          </p:cNvSpPr>
+          <p:nvPr>
+            <p:ph type="title"/>
+          </p:nvPr>
+        </p:nvSpPr>
+        <p:spPr/>
+        <p:txBody>
+          <a:bodyPr/>
+          <a:lstStyle/>
+          <a:p>
+            <a:r>
+              <a:rPr lang="en-US" dirty="0" smtClean="0"/>
+              <a:t>Demo</a:t>
+            </a:r>
+            <a:endParaRPr lang="en-US" dirty="0"/>
+          </a:p>
+        </p:txBody>
+      </p:sp>
+      <p:sp>
+        <p:nvSpPr>
+          <p:cNvPr id="3" name="Content Placeholder 2"/>
+          <p:cNvSpPr>
+            <a:spLocks noGrp="1"/>
+          </p:cNvSpPr>
+          <p:nvPr>
+            <p:ph idx="1"/>
+          </p:nvPr>
+        </p:nvSpPr>
+        <p:spPr/>
+        <p:txBody>
+          <a:bodyPr/>
+          <a:lstStyle/>
+          <a:p>
+            <a:pPr marL="0" indent="0">
+              <a:buNone/>
+            </a:pPr>
+            <a:r>
+              <a:rPr lang="en-US" dirty="0" smtClean="0"/>
+              <a:t>VLF Fragmentation</a:t>
+            </a:r>
+            <a:endParaRPr lang="en-US" dirty="0"/>
+          </a:p>
+        </p:txBody>
+      </p:sp>
+    </p:spTree>
+    <p:extLst>
+      <p:ext uri="{BB962C8B-B14F-4D97-AF65-F5344CB8AC3E}">
+        <p14:creationId xmlns:p14="http://schemas.microsoft.com/office/powerpoint/2010/main" val="2679887936"/>
+      </p:ext>
+    </p:extLst>
+  </p:cSld>
+  <p:clrMapOvr>
+    <a:masterClrMapping/>
+  </p:clrMapOvr>
+</p:sld>
+</file>
+
+<file path=ppt/slides/slide42.xml><?xml version="1.0" encoding="utf-8"?>
+<p:sld xmlns:a="http://schemas.openxmlformats.org/drawingml/2006/main" xmlns:r="http://schemas.openxmlformats.org/officeDocument/2006/relationships" xmlns:p="http://schemas.openxmlformats.org/presentationml/2006/main">
+  <p:cSld>
+    <p:spTree>
+      <p:nvGrpSpPr>
+        <p:cNvPr id="1" name=""/>
+        <p:cNvGrpSpPr/>
+        <p:nvPr/>
+      </p:nvGrpSpPr>
+      <p:grpSpPr>
+        <a:xfrm>
+          <a:off x="0" y="0"/>
+          <a:ext cx="0" cy="0"/>
+          <a:chOff x="0" y="0"/>
+          <a:chExt cx="0" cy="0"/>
+        </a:xfrm>
+      </p:grpSpPr>
+      <p:sp>
+        <p:nvSpPr>
+          <p:cNvPr id="2" name="Title 1"/>
+          <p:cNvSpPr>
+            <a:spLocks noGrp="1"/>
+          </p:cNvSpPr>
+          <p:nvPr>
+            <p:ph type="title"/>
+          </p:nvPr>
+        </p:nvSpPr>
+        <p:spPr/>
+        <p:txBody>
+          <a:bodyPr/>
+          <a:lstStyle/>
+          <a:p>
+            <a:r>
+              <a:rPr lang="en-US" dirty="0" smtClean="0"/>
+              <a:t>Log Monitoring</a:t>
+            </a:r>
+            <a:endParaRPr lang="en-US" dirty="0"/>
+          </a:p>
+        </p:txBody>
+      </p:sp>
+      <p:sp>
+        <p:nvSpPr>
+          <p:cNvPr id="3" name="Content Placeholder 2"/>
+          <p:cNvSpPr>
+            <a:spLocks noGrp="1"/>
+          </p:cNvSpPr>
+          <p:nvPr>
+            <p:ph idx="1"/>
+          </p:nvPr>
+        </p:nvSpPr>
+        <p:spPr/>
+        <p:txBody>
+          <a:bodyPr>
+            <a:normAutofit/>
+          </a:bodyPr>
+          <a:lstStyle/>
+          <a:p>
+            <a:r>
+              <a:rPr lang="en-US" dirty="0" smtClean="0"/>
+              <a:t>Watch your VLF count</a:t>
+            </a:r>
+          </a:p>
+          <a:p>
+            <a:r>
+              <a:rPr lang="en-US" dirty="0" smtClean="0"/>
+              <a:t>Monitor log </a:t>
+            </a:r>
+            <a:r>
+              <a:rPr lang="en-US" smtClean="0"/>
+              <a:t>size over time</a:t>
+            </a:r>
+            <a:endParaRPr lang="en-US" dirty="0" smtClean="0"/>
+          </a:p>
+          <a:p>
+            <a:r>
+              <a:rPr lang="en-US" dirty="0" smtClean="0"/>
+              <a:t>Set SQL Alerts on:</a:t>
+            </a:r>
+          </a:p>
+          <a:p>
+            <a:pPr lvl="1"/>
+            <a:r>
+              <a:rPr lang="en-US" dirty="0" smtClean="0"/>
+              <a:t>Severity 17 errors (will alert on log full)</a:t>
+            </a:r>
+          </a:p>
+          <a:p>
+            <a:pPr lvl="1"/>
+            <a:r>
+              <a:rPr lang="en-US" dirty="0" smtClean="0"/>
+              <a:t>Error 5145</a:t>
+            </a:r>
+          </a:p>
+          <a:p>
+            <a:pPr lvl="2"/>
+            <a:r>
+              <a:rPr lang="en-US" sz="1800" b="1" dirty="0" err="1" smtClean="0">
+                <a:solidFill>
+                  <a:srgbClr val="FF0000"/>
+                </a:solidFill>
+                <a:latin typeface="Courier New" panose="02070309020205020404" pitchFamily="49" charset="0"/>
+                <a:cs typeface="Courier New" panose="02070309020205020404" pitchFamily="49" charset="0"/>
+              </a:rPr>
+              <a:t>Autogrow</a:t>
+            </a:r>
+            <a:r>
+              <a:rPr lang="en-US" sz="1800" b="1" dirty="0" smtClean="0">
+                <a:solidFill>
+                  <a:srgbClr val="FF0000"/>
+                </a:solidFill>
+                <a:latin typeface="Courier New" panose="02070309020205020404" pitchFamily="49" charset="0"/>
+                <a:cs typeface="Courier New" panose="02070309020205020404" pitchFamily="49" charset="0"/>
+              </a:rPr>
+              <a:t> of file </a:t>
+            </a:r>
+            <a:r>
+              <a:rPr lang="en-US" sz="1800" b="1" dirty="0">
+                <a:solidFill>
+                  <a:srgbClr val="FF0000"/>
+                </a:solidFill>
+                <a:latin typeface="Courier New" panose="02070309020205020404" pitchFamily="49" charset="0"/>
+                <a:cs typeface="Courier New" panose="02070309020205020404" pitchFamily="49" charset="0"/>
+              </a:rPr>
+              <a:t>'</a:t>
+            </a:r>
+            <a:r>
+              <a:rPr lang="en-US" sz="1800" b="1" dirty="0" smtClean="0">
+                <a:solidFill>
+                  <a:srgbClr val="FF0000"/>
+                </a:solidFill>
+                <a:latin typeface="Courier New" panose="02070309020205020404" pitchFamily="49" charset="0"/>
+                <a:cs typeface="Courier New" panose="02070309020205020404" pitchFamily="49" charset="0"/>
+              </a:rPr>
+              <a:t>…' in database </a:t>
+            </a:r>
+            <a:r>
+              <a:rPr lang="en-US" sz="1800" b="1" dirty="0">
+                <a:solidFill>
+                  <a:srgbClr val="FF0000"/>
+                </a:solidFill>
+                <a:latin typeface="Courier New" panose="02070309020205020404" pitchFamily="49" charset="0"/>
+                <a:cs typeface="Courier New" panose="02070309020205020404" pitchFamily="49" charset="0"/>
+              </a:rPr>
+              <a:t>'</a:t>
+            </a:r>
+            <a:r>
+              <a:rPr lang="en-US" sz="1800" b="1" dirty="0" smtClean="0">
+                <a:solidFill>
+                  <a:srgbClr val="FF0000"/>
+                </a:solidFill>
+                <a:latin typeface="Courier New" panose="02070309020205020404" pitchFamily="49" charset="0"/>
+                <a:cs typeface="Courier New" panose="02070309020205020404" pitchFamily="49" charset="0"/>
+              </a:rPr>
+              <a:t>…' was cancelled by user or timed out after xx milliseconds.</a:t>
+            </a:r>
+          </a:p>
+          <a:p>
+            <a:pPr lvl="1"/>
+            <a:r>
+              <a:rPr lang="en-US" dirty="0" smtClean="0"/>
+              <a:t>Error 5144</a:t>
+            </a:r>
+          </a:p>
+          <a:p>
+            <a:pPr lvl="2"/>
+            <a:r>
+              <a:rPr lang="en-US" sz="1800" b="1" dirty="0" err="1" smtClean="0">
+                <a:solidFill>
+                  <a:srgbClr val="FF0000"/>
+                </a:solidFill>
+                <a:latin typeface="Courier New" panose="02070309020205020404" pitchFamily="49" charset="0"/>
+                <a:cs typeface="Courier New" panose="02070309020205020404" pitchFamily="49" charset="0"/>
+              </a:rPr>
+              <a:t>Autogrow</a:t>
+            </a:r>
+            <a:r>
+              <a:rPr lang="en-US" sz="1800" b="1" dirty="0" smtClean="0">
+                <a:solidFill>
+                  <a:srgbClr val="FF0000"/>
+                </a:solidFill>
+                <a:latin typeface="Courier New" panose="02070309020205020404" pitchFamily="49" charset="0"/>
+                <a:cs typeface="Courier New" panose="02070309020205020404" pitchFamily="49" charset="0"/>
+              </a:rPr>
+              <a:t> of file </a:t>
+            </a:r>
+            <a:r>
+              <a:rPr lang="en-US" sz="1800" dirty="0" smtClean="0">
+                <a:solidFill>
+                  <a:srgbClr val="FF0000"/>
+                </a:solidFill>
+              </a:rPr>
+              <a:t>'</a:t>
+            </a:r>
+            <a:r>
+              <a:rPr lang="en-US" sz="1800" b="1" dirty="0" smtClean="0">
+                <a:solidFill>
+                  <a:srgbClr val="FF0000"/>
+                </a:solidFill>
+                <a:latin typeface="Courier New" panose="02070309020205020404" pitchFamily="49" charset="0"/>
+                <a:cs typeface="Courier New" panose="02070309020205020404" pitchFamily="49" charset="0"/>
+              </a:rPr>
+              <a:t>…</a:t>
+            </a:r>
+            <a:r>
+              <a:rPr lang="en-US" sz="1800" dirty="0">
+                <a:solidFill>
+                  <a:srgbClr val="FF0000"/>
+                </a:solidFill>
+              </a:rPr>
+              <a:t>'</a:t>
+            </a:r>
+            <a:r>
+              <a:rPr lang="en-US" sz="1800" b="1" dirty="0" smtClean="0">
+                <a:solidFill>
+                  <a:srgbClr val="FF0000"/>
+                </a:solidFill>
+                <a:latin typeface="Courier New" panose="02070309020205020404" pitchFamily="49" charset="0"/>
+                <a:cs typeface="Courier New" panose="02070309020205020404" pitchFamily="49" charset="0"/>
+              </a:rPr>
+              <a:t> in database </a:t>
+            </a:r>
+            <a:r>
+              <a:rPr lang="en-US" sz="1800" dirty="0" smtClean="0">
+                <a:solidFill>
+                  <a:srgbClr val="FF0000"/>
+                </a:solidFill>
+              </a:rPr>
+              <a:t>'</a:t>
+            </a:r>
+            <a:r>
+              <a:rPr lang="en-US" sz="1800" b="1" dirty="0" smtClean="0">
+                <a:solidFill>
+                  <a:srgbClr val="FF0000"/>
+                </a:solidFill>
+                <a:latin typeface="Courier New" panose="02070309020205020404" pitchFamily="49" charset="0"/>
+                <a:cs typeface="Courier New" panose="02070309020205020404" pitchFamily="49" charset="0"/>
+              </a:rPr>
+              <a:t>…</a:t>
+            </a:r>
+            <a:r>
+              <a:rPr lang="en-US" sz="1800" dirty="0">
+                <a:solidFill>
+                  <a:srgbClr val="FF0000"/>
+                </a:solidFill>
+              </a:rPr>
+              <a:t>'</a:t>
+            </a:r>
+            <a:r>
+              <a:rPr lang="en-US" sz="1800" b="1" dirty="0" smtClean="0">
+                <a:solidFill>
+                  <a:srgbClr val="FF0000"/>
+                </a:solidFill>
+                <a:latin typeface="Courier New" panose="02070309020205020404" pitchFamily="49" charset="0"/>
+                <a:cs typeface="Courier New" panose="02070309020205020404" pitchFamily="49" charset="0"/>
+              </a:rPr>
+              <a:t> took xx milliseconds.</a:t>
+            </a:r>
+            <a:endParaRPr lang="en-US" sz="1800" b="1" dirty="0">
+              <a:solidFill>
+                <a:srgbClr val="FF0000"/>
+              </a:solidFill>
+              <a:latin typeface="Courier New" panose="02070309020205020404" pitchFamily="49" charset="0"/>
+              <a:cs typeface="Courier New" panose="02070309020205020404" pitchFamily="49" charset="0"/>
+            </a:endParaRPr>
+          </a:p>
+        </p:txBody>
+      </p:sp>
+    </p:spTree>
+    <p:extLst>
+      <p:ext uri="{BB962C8B-B14F-4D97-AF65-F5344CB8AC3E}">
+        <p14:creationId xmlns:p14="http://schemas.microsoft.com/office/powerpoint/2010/main" val="2782776955"/>
+      </p:ext>
+    </p:extLst>
+  </p:cSld>
+  <p:clrMapOvr>
+    <a:masterClrMapping/>
+  </p:clrMapOvr>
+</p:sld>
+</file>
+
+<file path=ppt/slides/slide43.xml><?xml version="1.0" encoding="utf-8"?>
+<p:sld xmlns:a="http://schemas.openxmlformats.org/drawingml/2006/main" xmlns:r="http://schemas.openxmlformats.org/officeDocument/2006/relationships" xmlns:p="http://schemas.openxmlformats.org/presentationml/2006/main">
+  <p:cSld>
+    <p:spTree>
+      <p:nvGrpSpPr>
+        <p:cNvPr id="1" name=""/>
+        <p:cNvGrpSpPr/>
+        <p:nvPr/>
+      </p:nvGrpSpPr>
+      <p:grpSpPr>
+        <a:xfrm>
+          <a:off x="0" y="0"/>
+          <a:ext cx="0" cy="0"/>
+          <a:chOff x="0" y="0"/>
+          <a:chExt cx="0" cy="0"/>
+        </a:xfrm>
+      </p:grpSpPr>
+      <p:sp>
+        <p:nvSpPr>
+          <p:cNvPr id="2" name="Title 1"/>
+          <p:cNvSpPr>
+            <a:spLocks noGrp="1"/>
+          </p:cNvSpPr>
+          <p:nvPr>
+            <p:ph type="title"/>
+          </p:nvPr>
+        </p:nvSpPr>
+        <p:spPr/>
+        <p:txBody>
+          <a:bodyPr/>
+          <a:lstStyle/>
+          <a:p>
+            <a:r>
+              <a:rPr lang="en-US" dirty="0"/>
+              <a:t>Thank You</a:t>
+            </a:r>
+          </a:p>
+        </p:txBody>
+      </p:sp>
+      <p:sp>
+        <p:nvSpPr>
+          <p:cNvPr id="3" name="Content Placeholder 2"/>
+          <p:cNvSpPr>
+            <a:spLocks noGrp="1"/>
+          </p:cNvSpPr>
+          <p:nvPr>
+            <p:ph idx="1"/>
+          </p:nvPr>
+        </p:nvSpPr>
+        <p:spPr/>
+        <p:txBody>
+          <a:bodyPr>
+            <a:normAutofit/>
+          </a:bodyPr>
+          <a:lstStyle/>
+          <a:p>
+            <a:r>
+              <a:rPr lang="en-US" dirty="0"/>
+              <a:t>This presentation and supporting materials can be found at </a:t>
+            </a:r>
+            <a:r>
+              <a:rPr lang="en-US" dirty="0" smtClean="0">
+                <a:hlinkClick r:id="rId2"/>
+              </a:rPr>
+              <a:t>www.tf3604.com/log</a:t>
+            </a:r>
+            <a:r>
+              <a:rPr lang="en-US" dirty="0" smtClean="0"/>
+              <a:t>.</a:t>
+            </a:r>
+            <a:endParaRPr lang="en-US" dirty="0"/>
+          </a:p>
+          <a:p>
+            <a:pPr lvl="1"/>
+            <a:r>
+              <a:rPr lang="en-US" dirty="0"/>
+              <a:t>Slide deck</a:t>
+            </a:r>
+          </a:p>
+          <a:p>
+            <a:pPr lvl="1"/>
+            <a:r>
+              <a:rPr lang="en-US" dirty="0"/>
+              <a:t>Scripts</a:t>
+            </a:r>
+          </a:p>
+          <a:p>
+            <a:pPr lvl="1"/>
+            <a:r>
+              <a:rPr lang="en-US" dirty="0"/>
+              <a:t>Sample database</a:t>
+            </a:r>
+          </a:p>
+          <a:p>
+            <a:pPr lvl="1"/>
+            <a:r>
+              <a:rPr lang="en-US" dirty="0"/>
+              <a:t>SQL Server </a:t>
+            </a:r>
+            <a:r>
+              <a:rPr lang="en-US" dirty="0" smtClean="0"/>
+              <a:t>Log File Visualizer binaries </a:t>
+            </a:r>
+            <a:r>
+              <a:rPr lang="en-US" dirty="0"/>
+              <a:t>&amp; source</a:t>
+            </a:r>
+          </a:p>
+          <a:p>
+            <a:pPr lvl="1"/>
+            <a:endParaRPr lang="en-US" dirty="0"/>
+          </a:p>
+          <a:p>
+            <a:pPr marL="0" indent="0">
+              <a:buNone/>
+            </a:pPr>
+            <a:endParaRPr lang="en-US" dirty="0"/>
+          </a:p>
+          <a:p>
+            <a:pPr marL="0" indent="0" algn="ctr">
+              <a:buNone/>
+            </a:pPr>
+            <a:r>
+              <a:rPr lang="en-US" dirty="0">
+                <a:solidFill>
+                  <a:schemeClr val="accent1">
+                    <a:lumMod val="60000"/>
+                    <a:lumOff val="40000"/>
+                  </a:schemeClr>
+                </a:solidFill>
+              </a:rPr>
+              <a:t>brian@tf3604.com	• @tf3604</a:t>
+            </a:r>
+          </a:p>
+        </p:txBody>
+      </p:sp>
+    </p:spTree>
+    <p:extLst>
+      <p:ext uri="{BB962C8B-B14F-4D97-AF65-F5344CB8AC3E}">
+        <p14:creationId xmlns:p14="http://schemas.microsoft.com/office/powerpoint/2010/main" val="340294112"/>
       </p:ext>
     </p:extLst>
   </p:cSld>

</xml_diff>

<commit_message>
Additional info on VLF statuses. Clarification on simple recovery vs auto-truncate.
</commit_message>
<xml_diff>
--- a/TransactionLog.pptx
+++ b/TransactionLog.pptx
@@ -256,7 +256,7 @@
           <a:p>
             <a:fld id="{2EDCB34D-5EC2-4739-9693-E425457AC201}" type="datetimeFigureOut">
               <a:rPr lang="en-US" smtClean="0"/>
-              <a:t>09/09/2016</a:t>
+              <a:t>10/27/2016</a:t>
             </a:fld>
             <a:endParaRPr lang="en-US"/>
           </a:p>
@@ -607,6 +607,190 @@
 </p:notes>
 </file>
 
+<file path=ppt/notesSlides/notesSlide2.xml><?xml version="1.0" encoding="utf-8"?>
+<p:notes xmlns:a="http://schemas.openxmlformats.org/drawingml/2006/main" xmlns:r="http://schemas.openxmlformats.org/officeDocument/2006/relationships" xmlns:p="http://schemas.openxmlformats.org/presentationml/2006/main">
+  <p:cSld>
+    <p:spTree>
+      <p:nvGrpSpPr>
+        <p:cNvPr id="1" name=""/>
+        <p:cNvGrpSpPr/>
+        <p:nvPr/>
+      </p:nvGrpSpPr>
+      <p:grpSpPr>
+        <a:xfrm>
+          <a:off x="0" y="0"/>
+          <a:ext cx="0" cy="0"/>
+          <a:chOff x="0" y="0"/>
+          <a:chExt cx="0" cy="0"/>
+        </a:xfrm>
+      </p:grpSpPr>
+      <p:sp>
+        <p:nvSpPr>
+          <p:cNvPr id="2" name="Slide Image Placeholder 1"/>
+          <p:cNvSpPr>
+            <a:spLocks noGrp="1" noRot="1" noChangeAspect="1"/>
+          </p:cNvSpPr>
+          <p:nvPr>
+            <p:ph type="sldImg"/>
+          </p:nvPr>
+        </p:nvSpPr>
+        <p:spPr/>
+      </p:sp>
+      <p:sp>
+        <p:nvSpPr>
+          <p:cNvPr id="3" name="Notes Placeholder 2"/>
+          <p:cNvSpPr>
+            <a:spLocks noGrp="1"/>
+          </p:cNvSpPr>
+          <p:nvPr>
+            <p:ph type="body" idx="1"/>
+          </p:nvPr>
+        </p:nvSpPr>
+        <p:spPr/>
+        <p:txBody>
+          <a:bodyPr/>
+          <a:lstStyle/>
+          <a:p>
+            <a:r>
+              <a:rPr lang="en-US" dirty="0" smtClean="0"/>
+              <a:t>Limit of 24K per </a:t>
+            </a:r>
+            <a:r>
+              <a:rPr lang="en-US" smtClean="0"/>
+              <a:t>log record?</a:t>
+            </a:r>
+            <a:endParaRPr lang="en-US" dirty="0"/>
+          </a:p>
+        </p:txBody>
+      </p:sp>
+      <p:sp>
+        <p:nvSpPr>
+          <p:cNvPr id="4" name="Slide Number Placeholder 3"/>
+          <p:cNvSpPr>
+            <a:spLocks noGrp="1"/>
+          </p:cNvSpPr>
+          <p:nvPr>
+            <p:ph type="sldNum" sz="quarter" idx="10"/>
+          </p:nvPr>
+        </p:nvSpPr>
+        <p:spPr/>
+        <p:txBody>
+          <a:bodyPr/>
+          <a:lstStyle/>
+          <a:p>
+            <a:fld id="{ADDBA41D-AE03-4F1C-B074-B56312AFAE46}" type="slidenum">
+              <a:rPr lang="en-US" smtClean="0"/>
+              <a:t>19</a:t>
+            </a:fld>
+            <a:endParaRPr lang="en-US"/>
+          </a:p>
+        </p:txBody>
+      </p:sp>
+    </p:spTree>
+    <p:extLst>
+      <p:ext uri="{BB962C8B-B14F-4D97-AF65-F5344CB8AC3E}">
+        <p14:creationId xmlns:p14="http://schemas.microsoft.com/office/powerpoint/2010/main" val="2635528499"/>
+      </p:ext>
+    </p:extLst>
+  </p:cSld>
+  <p:clrMapOvr>
+    <a:masterClrMapping/>
+  </p:clrMapOvr>
+</p:notes>
+</file>
+
+<file path=ppt/notesSlides/notesSlide3.xml><?xml version="1.0" encoding="utf-8"?>
+<p:notes xmlns:a="http://schemas.openxmlformats.org/drawingml/2006/main" xmlns:r="http://schemas.openxmlformats.org/officeDocument/2006/relationships" xmlns:p="http://schemas.openxmlformats.org/presentationml/2006/main">
+  <p:cSld>
+    <p:spTree>
+      <p:nvGrpSpPr>
+        <p:cNvPr id="1" name=""/>
+        <p:cNvGrpSpPr/>
+        <p:nvPr/>
+      </p:nvGrpSpPr>
+      <p:grpSpPr>
+        <a:xfrm>
+          <a:off x="0" y="0"/>
+          <a:ext cx="0" cy="0"/>
+          <a:chOff x="0" y="0"/>
+          <a:chExt cx="0" cy="0"/>
+        </a:xfrm>
+      </p:grpSpPr>
+      <p:sp>
+        <p:nvSpPr>
+          <p:cNvPr id="2" name="Slide Image Placeholder 1"/>
+          <p:cNvSpPr>
+            <a:spLocks noGrp="1" noRot="1" noChangeAspect="1"/>
+          </p:cNvSpPr>
+          <p:nvPr>
+            <p:ph type="sldImg"/>
+          </p:nvPr>
+        </p:nvSpPr>
+        <p:spPr/>
+      </p:sp>
+      <p:sp>
+        <p:nvSpPr>
+          <p:cNvPr id="3" name="Notes Placeholder 2"/>
+          <p:cNvSpPr>
+            <a:spLocks noGrp="1"/>
+          </p:cNvSpPr>
+          <p:nvPr>
+            <p:ph type="body" idx="1"/>
+          </p:nvPr>
+        </p:nvSpPr>
+        <p:spPr/>
+        <p:txBody>
+          <a:bodyPr/>
+          <a:lstStyle/>
+          <a:p>
+            <a:r>
+              <a:rPr lang="en-US" dirty="0" smtClean="0"/>
+              <a:t>Auto-truncate mode means that the database (1) is in the Simple recovery model, or no</a:t>
+            </a:r>
+            <a:r>
+              <a:rPr lang="en-US" baseline="0" dirty="0" smtClean="0"/>
+              <a:t> full database backup since changing to Full or Bulked Logged model.</a:t>
+            </a:r>
+            <a:endParaRPr lang="en-US" dirty="0"/>
+          </a:p>
+        </p:txBody>
+      </p:sp>
+      <p:sp>
+        <p:nvSpPr>
+          <p:cNvPr id="4" name="Slide Number Placeholder 3"/>
+          <p:cNvSpPr>
+            <a:spLocks noGrp="1"/>
+          </p:cNvSpPr>
+          <p:nvPr>
+            <p:ph type="sldNum" sz="quarter" idx="10"/>
+          </p:nvPr>
+        </p:nvSpPr>
+        <p:spPr/>
+        <p:txBody>
+          <a:bodyPr/>
+          <a:lstStyle/>
+          <a:p>
+            <a:fld id="{ADDBA41D-AE03-4F1C-B074-B56312AFAE46}" type="slidenum">
+              <a:rPr lang="en-US" smtClean="0"/>
+              <a:t>34</a:t>
+            </a:fld>
+            <a:endParaRPr lang="en-US"/>
+          </a:p>
+        </p:txBody>
+      </p:sp>
+    </p:spTree>
+    <p:extLst>
+      <p:ext uri="{BB962C8B-B14F-4D97-AF65-F5344CB8AC3E}">
+        <p14:creationId xmlns:p14="http://schemas.microsoft.com/office/powerpoint/2010/main" val="1398294388"/>
+      </p:ext>
+    </p:extLst>
+  </p:cSld>
+  <p:clrMapOvr>
+    <a:masterClrMapping/>
+  </p:clrMapOvr>
+</p:notes>
+</file>
+
 <file path=ppt/slideLayouts/slideLayout1.xml><?xml version="1.0" encoding="utf-8"?>
 <p:sldLayout xmlns:a="http://schemas.openxmlformats.org/drawingml/2006/main" xmlns:r="http://schemas.openxmlformats.org/officeDocument/2006/relationships" xmlns:p="http://schemas.openxmlformats.org/presentationml/2006/main" type="title" preserve="1">
   <p:cSld name="Title Slide">
@@ -842,7 +1026,7 @@
             <a:fld id="{5942B21B-2ADA-A040-A652-A7305E1B99FE}" type="datetimeFigureOut">
               <a:rPr lang="en-US" smtClean="0"/>
               <a:pPr/>
-              <a:t>09/09/2016</a:t>
+              <a:t>10/27/2016</a:t>
             </a:fld>
             <a:endParaRPr lang="en-US" dirty="0"/>
           </a:p>
@@ -1032,7 +1216,7 @@
           <a:p>
             <a:fld id="{5942B21B-2ADA-A040-A652-A7305E1B99FE}" type="datetimeFigureOut">
               <a:rPr lang="en-US" smtClean="0"/>
-              <a:t>09/09/2016</a:t>
+              <a:t>10/27/2016</a:t>
             </a:fld>
             <a:endParaRPr lang="en-US"/>
           </a:p>
@@ -1156,7 +1340,7 @@
             <a:fld id="{5942B21B-2ADA-A040-A652-A7305E1B99FE}" type="datetimeFigureOut">
               <a:rPr lang="en-US" smtClean="0"/>
               <a:pPr/>
-              <a:t>09/09/2016</a:t>
+              <a:t>10/27/2016</a:t>
             </a:fld>
             <a:r>
               <a:rPr lang="en-US"/>
@@ -1427,7 +1611,7 @@
             <a:fld id="{5942B21B-2ADA-A040-A652-A7305E1B99FE}" type="datetimeFigureOut">
               <a:rPr lang="en-US" smtClean="0"/>
               <a:pPr/>
-              <a:t>09/09/2016</a:t>
+              <a:t>10/27/2016</a:t>
             </a:fld>
             <a:r>
               <a:rPr lang="en-US" dirty="0"/>
@@ -1697,7 +1881,7 @@
             <a:fld id="{5942B21B-2ADA-A040-A652-A7305E1B99FE}" type="datetimeFigureOut">
               <a:rPr lang="en-US" smtClean="0"/>
               <a:pPr/>
-              <a:t>09/09/2016</a:t>
+              <a:t>10/27/2016</a:t>
             </a:fld>
             <a:r>
               <a:rPr lang="en-US" dirty="0"/>
@@ -2037,7 +2221,7 @@
             <a:fld id="{5942B21B-2ADA-A040-A652-A7305E1B99FE}" type="datetimeFigureOut">
               <a:rPr lang="en-US" smtClean="0"/>
               <a:pPr/>
-              <a:t>09/09/2016</a:t>
+              <a:t>10/27/2016</a:t>
             </a:fld>
             <a:r>
               <a:rPr lang="en-US" dirty="0"/>
@@ -2378,7 +2562,7 @@
             <a:fld id="{5942B21B-2ADA-A040-A652-A7305E1B99FE}" type="datetimeFigureOut">
               <a:rPr lang="en-US" smtClean="0"/>
               <a:pPr/>
-              <a:t>09/09/2016</a:t>
+              <a:t>10/27/2016</a:t>
             </a:fld>
             <a:r>
               <a:rPr lang="en-US" dirty="0"/>
@@ -2893,7 +3077,7 @@
             <a:fld id="{5942B21B-2ADA-A040-A652-A7305E1B99FE}" type="datetimeFigureOut">
               <a:rPr lang="en-US" smtClean="0"/>
               <a:pPr/>
-              <a:t>09/09/2016</a:t>
+              <a:t>10/27/2016</a:t>
             </a:fld>
             <a:r>
               <a:rPr lang="en-US" dirty="0"/>
@@ -3102,7 +3286,7 @@
             <a:fld id="{5942B21B-2ADA-A040-A652-A7305E1B99FE}" type="datetimeFigureOut">
               <a:rPr lang="en-US" smtClean="0"/>
               <a:pPr/>
-              <a:t>09/09/2016</a:t>
+              <a:t>10/27/2016</a:t>
             </a:fld>
             <a:r>
               <a:rPr lang="en-US" dirty="0"/>
@@ -3289,7 +3473,7 @@
             <a:fld id="{5942B21B-2ADA-A040-A652-A7305E1B99FE}" type="datetimeFigureOut">
               <a:rPr lang="en-US" smtClean="0"/>
               <a:pPr/>
-              <a:t>09/09/2016</a:t>
+              <a:t>10/27/2016</a:t>
             </a:fld>
             <a:r>
               <a:rPr lang="en-US" dirty="0"/>
@@ -3620,7 +3804,7 @@
             <a:fld id="{5942B21B-2ADA-A040-A652-A7305E1B99FE}" type="datetimeFigureOut">
               <a:rPr lang="en-US" smtClean="0"/>
               <a:pPr/>
-              <a:t>09/09/2016</a:t>
+              <a:t>10/27/2016</a:t>
             </a:fld>
             <a:r>
               <a:rPr lang="en-US" dirty="0"/>
@@ -3928,7 +4112,7 @@
             <a:fld id="{5942B21B-2ADA-A040-A652-A7305E1B99FE}" type="datetimeFigureOut">
               <a:rPr lang="en-US" smtClean="0"/>
               <a:pPr/>
-              <a:t>09/09/2016</a:t>
+              <a:t>10/27/2016</a:t>
             </a:fld>
             <a:r>
               <a:rPr lang="en-US" dirty="0"/>
@@ -4207,7 +4391,7 @@
             <a:fld id="{5942B21B-2ADA-A040-A652-A7305E1B99FE}" type="datetimeFigureOut">
               <a:rPr lang="en-US" smtClean="0"/>
               <a:pPr/>
-              <a:t>09/09/2016</a:t>
+              <a:t>10/27/2016</a:t>
             </a:fld>
             <a:r>
               <a:rPr lang="en-US" dirty="0"/>
@@ -4967,19 +5151,43 @@
           <a:p>
             <a:r>
               <a:rPr lang="en-US" dirty="0"/>
-              <a:t>VLFs can be in one of two statuses:</a:t>
+              <a:t>VLFs can be in one of </a:t>
+            </a:r>
+            <a:r>
+              <a:rPr lang="en-US" dirty="0" smtClean="0"/>
+              <a:t>several statuses</a:t>
+            </a:r>
+            <a:r>
+              <a:rPr lang="en-US" dirty="0"/>
+              <a:t>:</a:t>
             </a:r>
           </a:p>
           <a:p>
             <a:pPr lvl="1"/>
             <a:r>
-              <a:rPr lang="en-US" dirty="0">
+              <a:rPr lang="en-US" dirty="0" smtClean="0">
                 <a:solidFill>
                   <a:srgbClr val="92D050"/>
                 </a:solidFill>
               </a:rPr>
-              <a:t>Inactive</a:t>
-            </a:r>
+              <a:t>Inactive (never used)</a:t>
+            </a:r>
+          </a:p>
+          <a:p>
+            <a:pPr lvl="1"/>
+            <a:r>
+              <a:rPr lang="en-US" dirty="0" smtClean="0">
+                <a:solidFill>
+                  <a:srgbClr val="92D050"/>
+                </a:solidFill>
+              </a:rPr>
+              <a:t>Inactive (previously used)</a:t>
+            </a:r>
+            <a:endParaRPr lang="en-US" dirty="0">
+              <a:solidFill>
+                <a:srgbClr val="92D050"/>
+              </a:solidFill>
+            </a:endParaRPr>
           </a:p>
           <a:p>
             <a:pPr lvl="1"/>
@@ -5000,18 +5208,25 @@
                   <a:srgbClr val="FF0000"/>
                 </a:solidFill>
               </a:rPr>
-              <a:t>Active (not usable)</a:t>
-            </a:r>
-            <a:endParaRPr lang="en-US" dirty="0">
-              <a:solidFill>
-                <a:schemeClr val="tx1"/>
-              </a:solidFill>
-            </a:endParaRPr>
-          </a:p>
-          <a:p>
-            <a:r>
-              <a:rPr lang="en-US" dirty="0"/>
-              <a:t>Only one VLF is current at a time.</a:t>
+              <a:t>Active (not usable</a:t>
+            </a:r>
+            <a:r>
+              <a:rPr lang="en-US" dirty="0" smtClean="0">
+                <a:solidFill>
+                  <a:srgbClr val="FF0000"/>
+                </a:solidFill>
+              </a:rPr>
+              <a:t>)</a:t>
+            </a:r>
+          </a:p>
+          <a:p>
+            <a:r>
+              <a:rPr lang="en-US" dirty="0" smtClean="0"/>
+              <a:t>Only </a:t>
+            </a:r>
+            <a:r>
+              <a:rPr lang="en-US" dirty="0"/>
+              <a:t>one VLF is current at a time.</a:t>
             </a:r>
           </a:p>
         </p:txBody>
@@ -6132,11 +6347,15 @@
             <a:pPr lvl="1"/>
             <a:r>
               <a:rPr lang="en-US" dirty="0"/>
-              <a:t>Completely variable </a:t>
-            </a:r>
-            <a:r>
-              <a:rPr lang="en-US"/>
-              <a:t>in size</a:t>
+              <a:t>Completely variable in </a:t>
+            </a:r>
+            <a:r>
+              <a:rPr lang="en-US" dirty="0" smtClean="0"/>
+              <a:t>size (in 512 </a:t>
+            </a:r>
+            <a:r>
+              <a:rPr lang="en-US" smtClean="0"/>
+              <a:t>bytes chunks)</a:t>
             </a:r>
             <a:endParaRPr lang="en-US" dirty="0"/>
           </a:p>
@@ -6157,7 +6376,7 @@
           <p:nvPr/>
         </p:nvPicPr>
         <p:blipFill>
-          <a:blip r:embed="rId2"/>
+          <a:blip r:embed="rId3"/>
           <a:stretch>
             <a:fillRect/>
           </a:stretch>
@@ -7524,21 +7743,21 @@
                 <a:gridCol w="1895475">
                   <a:extLst>
                     <a:ext uri="{9D8B030D-6E8A-4147-A177-3AD203B41FA5}">
-                      <a16:colId xmlns="" xmlns:a16="http://schemas.microsoft.com/office/drawing/2014/main" val="20000"/>
+                      <a16:colId xmlns:a16="http://schemas.microsoft.com/office/drawing/2014/main" xmlns="" val="20000"/>
                     </a:ext>
                   </a:extLst>
                 </a:gridCol>
                 <a:gridCol w="3171825">
                   <a:extLst>
                     <a:ext uri="{9D8B030D-6E8A-4147-A177-3AD203B41FA5}">
-                      <a16:colId xmlns="" xmlns:a16="http://schemas.microsoft.com/office/drawing/2014/main" val="20001"/>
+                      <a16:colId xmlns:a16="http://schemas.microsoft.com/office/drawing/2014/main" xmlns="" val="20001"/>
                     </a:ext>
                   </a:extLst>
                 </a:gridCol>
                 <a:gridCol w="3162300">
                   <a:extLst>
                     <a:ext uri="{9D8B030D-6E8A-4147-A177-3AD203B41FA5}">
-                      <a16:colId xmlns="" xmlns:a16="http://schemas.microsoft.com/office/drawing/2014/main" val="20002"/>
+                      <a16:colId xmlns:a16="http://schemas.microsoft.com/office/drawing/2014/main" xmlns="" val="20002"/>
                     </a:ext>
                   </a:extLst>
                 </a:gridCol>
@@ -7585,7 +7804,7 @@
                 </a:tc>
                 <a:extLst>
                   <a:ext uri="{0D108BD9-81ED-4DB2-BD59-A6C34878D82A}">
-                    <a16:rowId xmlns="" xmlns:a16="http://schemas.microsoft.com/office/drawing/2014/main" val="10000"/>
+                    <a16:rowId xmlns:a16="http://schemas.microsoft.com/office/drawing/2014/main" xmlns="" val="10000"/>
                   </a:ext>
                 </a:extLst>
               </a:tr>
@@ -7648,7 +7867,7 @@
                 </a:tc>
                 <a:extLst>
                   <a:ext uri="{0D108BD9-81ED-4DB2-BD59-A6C34878D82A}">
-                    <a16:rowId xmlns="" xmlns:a16="http://schemas.microsoft.com/office/drawing/2014/main" val="10001"/>
+                    <a16:rowId xmlns:a16="http://schemas.microsoft.com/office/drawing/2014/main" xmlns="" val="10001"/>
                   </a:ext>
                 </a:extLst>
               </a:tr>
@@ -7719,7 +7938,7 @@
                 </a:tc>
                 <a:extLst>
                   <a:ext uri="{0D108BD9-81ED-4DB2-BD59-A6C34878D82A}">
-                    <a16:rowId xmlns="" xmlns:a16="http://schemas.microsoft.com/office/drawing/2014/main" val="10002"/>
+                    <a16:rowId xmlns:a16="http://schemas.microsoft.com/office/drawing/2014/main" xmlns="" val="10002"/>
                   </a:ext>
                 </a:extLst>
               </a:tr>
@@ -7765,7 +7984,7 @@
                 </a:tc>
                 <a:extLst>
                   <a:ext uri="{0D108BD9-81ED-4DB2-BD59-A6C34878D82A}">
-                    <a16:rowId xmlns="" xmlns:a16="http://schemas.microsoft.com/office/drawing/2014/main" val="10003"/>
+                    <a16:rowId xmlns:a16="http://schemas.microsoft.com/office/drawing/2014/main" xmlns="" val="10003"/>
                   </a:ext>
                 </a:extLst>
               </a:tr>
@@ -7816,7 +8035,7 @@
                 </a:tc>
                 <a:extLst>
                   <a:ext uri="{0D108BD9-81ED-4DB2-BD59-A6C34878D82A}">
-                    <a16:rowId xmlns="" xmlns:a16="http://schemas.microsoft.com/office/drawing/2014/main" val="3543017676"/>
+                    <a16:rowId xmlns:a16="http://schemas.microsoft.com/office/drawing/2014/main" xmlns="" val="3543017676"/>
                   </a:ext>
                 </a:extLst>
               </a:tr>
@@ -9434,7 +9653,9 @@
         </p:nvSpPr>
         <p:spPr/>
         <p:txBody>
-          <a:bodyPr/>
+          <a:bodyPr>
+            <a:normAutofit fontScale="92500" lnSpcReduction="10000"/>
+          </a:bodyPr>
           <a:lstStyle/>
           <a:p>
             <a:r>
@@ -9452,15 +9673,35 @@
             <a:pPr lvl="1"/>
             <a:r>
               <a:rPr lang="en-US" dirty="0"/>
-              <a:t>Simple recovery: Checkpoint</a:t>
+              <a:t>Simple </a:t>
+            </a:r>
+            <a:r>
+              <a:rPr lang="en-US" dirty="0" smtClean="0"/>
+              <a:t>recovery*: </a:t>
+            </a:r>
+            <a:r>
+              <a:rPr lang="en-US" dirty="0"/>
+              <a:t>Checkpoint</a:t>
             </a:r>
           </a:p>
           <a:p>
             <a:pPr lvl="1"/>
             <a:r>
               <a:rPr lang="en-US" dirty="0"/>
-              <a:t>Full/bulked-log: Log Backup</a:t>
-            </a:r>
+              <a:t>Full/bulked-log: Log </a:t>
+            </a:r>
+            <a:r>
+              <a:rPr lang="en-US" dirty="0" smtClean="0"/>
+              <a:t>Backup</a:t>
+            </a:r>
+          </a:p>
+          <a:p>
+            <a:pPr lvl="1"/>
+            <a:r>
+              <a:rPr lang="en-US" dirty="0" smtClean="0"/>
+              <a:t>Change from Full or Bulked Logged to Simple**</a:t>
+            </a:r>
+            <a:endParaRPr lang="en-US" dirty="0"/>
           </a:p>
           <a:p>
             <a:r>
@@ -9510,6 +9751,185 @@
           <a:p>
             <a:pPr lvl="1"/>
             <a:endParaRPr lang="en-US" dirty="0"/>
+          </a:p>
+        </p:txBody>
+      </p:sp>
+      <p:sp>
+        <p:nvSpPr>
+          <p:cNvPr id="4" name="Content Placeholder 2"/>
+          <p:cNvSpPr txBox="1">
+            <a:spLocks/>
+          </p:cNvSpPr>
+          <p:nvPr/>
+        </p:nvSpPr>
+        <p:spPr>
+          <a:xfrm>
+            <a:off x="209550" y="6126163"/>
+            <a:ext cx="6800850" cy="600075"/>
+          </a:xfrm>
+          <a:prstGeom prst="rect">
+            <a:avLst/>
+          </a:prstGeom>
+        </p:spPr>
+        <p:txBody>
+          <a:bodyPr vert="horz" lIns="91440" tIns="45720" rIns="91440" bIns="45720" rtlCol="0">
+            <a:normAutofit fontScale="92500" lnSpcReduction="20000"/>
+          </a:bodyPr>
+          <a:lstStyle>
+            <a:lvl1pPr marL="342900" indent="-342900" algn="l" defTabSz="457200" rtl="0" eaLnBrk="1" latinLnBrk="0" hangingPunct="1">
+              <a:spcBef>
+                <a:spcPct val="20000"/>
+              </a:spcBef>
+              <a:buFont typeface="Wingdings" charset="2"/>
+              <a:buChar char="§"/>
+              <a:defRPr sz="3000" kern="1200">
+                <a:solidFill>
+                  <a:schemeClr val="tx2"/>
+                </a:solidFill>
+                <a:latin typeface="+mn-lt"/>
+                <a:ea typeface="+mn-ea"/>
+                <a:cs typeface="+mn-cs"/>
+              </a:defRPr>
+            </a:lvl1pPr>
+            <a:lvl2pPr marL="742950" indent="-285750" algn="l" defTabSz="457200" rtl="0" eaLnBrk="1" latinLnBrk="0" hangingPunct="1">
+              <a:spcBef>
+                <a:spcPct val="20000"/>
+              </a:spcBef>
+              <a:buFont typeface="Wingdings" charset="2"/>
+              <a:buChar char="§"/>
+              <a:defRPr sz="2600" kern="1200">
+                <a:solidFill>
+                  <a:srgbClr val="474947"/>
+                </a:solidFill>
+                <a:latin typeface="+mn-lt"/>
+                <a:ea typeface="+mn-ea"/>
+                <a:cs typeface="+mn-cs"/>
+              </a:defRPr>
+            </a:lvl2pPr>
+            <a:lvl3pPr marL="1143000" indent="-228600" algn="l" defTabSz="457200" rtl="0" eaLnBrk="1" latinLnBrk="0" hangingPunct="1">
+              <a:spcBef>
+                <a:spcPct val="20000"/>
+              </a:spcBef>
+              <a:buFont typeface="Wingdings" charset="2"/>
+              <a:buChar char="§"/>
+              <a:defRPr sz="2200" kern="1200">
+                <a:solidFill>
+                  <a:srgbClr val="474947"/>
+                </a:solidFill>
+                <a:latin typeface="+mn-lt"/>
+                <a:ea typeface="+mn-ea"/>
+                <a:cs typeface="+mn-cs"/>
+              </a:defRPr>
+            </a:lvl3pPr>
+            <a:lvl4pPr marL="1600200" indent="-228600" algn="l" defTabSz="457200" rtl="0" eaLnBrk="1" latinLnBrk="0" hangingPunct="1">
+              <a:spcBef>
+                <a:spcPct val="20000"/>
+              </a:spcBef>
+              <a:buFont typeface="Wingdings" charset="2"/>
+              <a:buChar char="§"/>
+              <a:defRPr sz="2000" kern="1200">
+                <a:solidFill>
+                  <a:srgbClr val="474947"/>
+                </a:solidFill>
+                <a:latin typeface="+mn-lt"/>
+                <a:ea typeface="+mn-ea"/>
+                <a:cs typeface="+mn-cs"/>
+              </a:defRPr>
+            </a:lvl4pPr>
+            <a:lvl5pPr marL="2057400" indent="-228600" algn="l" defTabSz="457200" rtl="0" eaLnBrk="1" latinLnBrk="0" hangingPunct="1">
+              <a:spcBef>
+                <a:spcPct val="20000"/>
+              </a:spcBef>
+              <a:buFont typeface="Wingdings" charset="2"/>
+              <a:buChar char="§"/>
+              <a:defRPr sz="1800" kern="1200">
+                <a:solidFill>
+                  <a:srgbClr val="474947"/>
+                </a:solidFill>
+                <a:latin typeface="+mn-lt"/>
+                <a:ea typeface="+mn-ea"/>
+                <a:cs typeface="+mn-cs"/>
+              </a:defRPr>
+            </a:lvl5pPr>
+            <a:lvl6pPr marL="2514600" indent="-228600" algn="l" defTabSz="457200" rtl="0" eaLnBrk="1" latinLnBrk="0" hangingPunct="1">
+              <a:spcBef>
+                <a:spcPct val="20000"/>
+              </a:spcBef>
+              <a:buFont typeface="Arial"/>
+              <a:buChar char="•"/>
+              <a:defRPr sz="2000" kern="1200">
+                <a:solidFill>
+                  <a:schemeClr val="tx1"/>
+                </a:solidFill>
+                <a:latin typeface="+mn-lt"/>
+                <a:ea typeface="+mn-ea"/>
+                <a:cs typeface="+mn-cs"/>
+              </a:defRPr>
+            </a:lvl6pPr>
+            <a:lvl7pPr marL="2971800" indent="-228600" algn="l" defTabSz="457200" rtl="0" eaLnBrk="1" latinLnBrk="0" hangingPunct="1">
+              <a:spcBef>
+                <a:spcPct val="20000"/>
+              </a:spcBef>
+              <a:buFont typeface="Arial"/>
+              <a:buChar char="•"/>
+              <a:defRPr sz="2000" kern="1200">
+                <a:solidFill>
+                  <a:schemeClr val="tx1"/>
+                </a:solidFill>
+                <a:latin typeface="+mn-lt"/>
+                <a:ea typeface="+mn-ea"/>
+                <a:cs typeface="+mn-cs"/>
+              </a:defRPr>
+            </a:lvl7pPr>
+            <a:lvl8pPr marL="3429000" indent="-228600" algn="l" defTabSz="457200" rtl="0" eaLnBrk="1" latinLnBrk="0" hangingPunct="1">
+              <a:spcBef>
+                <a:spcPct val="20000"/>
+              </a:spcBef>
+              <a:buFont typeface="Arial"/>
+              <a:buChar char="•"/>
+              <a:defRPr sz="2000" kern="1200">
+                <a:solidFill>
+                  <a:schemeClr val="tx1"/>
+                </a:solidFill>
+                <a:latin typeface="+mn-lt"/>
+                <a:ea typeface="+mn-ea"/>
+                <a:cs typeface="+mn-cs"/>
+              </a:defRPr>
+            </a:lvl8pPr>
+            <a:lvl9pPr marL="3886200" indent="-228600" algn="l" defTabSz="457200" rtl="0" eaLnBrk="1" latinLnBrk="0" hangingPunct="1">
+              <a:spcBef>
+                <a:spcPct val="20000"/>
+              </a:spcBef>
+              <a:buFont typeface="Arial"/>
+              <a:buChar char="•"/>
+              <a:defRPr sz="2000" kern="1200">
+                <a:solidFill>
+                  <a:schemeClr val="tx1"/>
+                </a:solidFill>
+                <a:latin typeface="+mn-lt"/>
+                <a:ea typeface="+mn-ea"/>
+                <a:cs typeface="+mn-cs"/>
+              </a:defRPr>
+            </a:lvl9pPr>
+          </a:lstStyle>
+          <a:p>
+            <a:pPr marL="57150" indent="0">
+              <a:buNone/>
+            </a:pPr>
+            <a:r>
+              <a:rPr lang="en-US" sz="1800" dirty="0" smtClean="0"/>
+              <a:t>* More technically, when in “auto-truncate” mode.</a:t>
+            </a:r>
+          </a:p>
+          <a:p>
+            <a:pPr marL="57150" indent="0">
+              <a:buNone/>
+            </a:pPr>
+            <a:r>
+              <a:rPr lang="en-US" sz="1800" dirty="0" smtClean="0"/>
+              <a:t>** But this breaks the backup chain!</a:t>
+            </a:r>
+            <a:endParaRPr lang="en-US" sz="1800" dirty="0"/>
           </a:p>
         </p:txBody>
       </p:sp>
@@ -10685,14 +11105,14 @@
                 <a:gridCol w="3048000">
                   <a:extLst>
                     <a:ext uri="{9D8B030D-6E8A-4147-A177-3AD203B41FA5}">
-                      <a16:colId xmlns="" xmlns:a16="http://schemas.microsoft.com/office/drawing/2014/main" val="20000"/>
+                      <a16:colId xmlns:a16="http://schemas.microsoft.com/office/drawing/2014/main" xmlns="" val="20000"/>
                     </a:ext>
                   </a:extLst>
                 </a:gridCol>
                 <a:gridCol w="3048000">
                   <a:extLst>
                     <a:ext uri="{9D8B030D-6E8A-4147-A177-3AD203B41FA5}">
-                      <a16:colId xmlns="" xmlns:a16="http://schemas.microsoft.com/office/drawing/2014/main" val="20001"/>
+                      <a16:colId xmlns:a16="http://schemas.microsoft.com/office/drawing/2014/main" xmlns="" val="20001"/>
                     </a:ext>
                   </a:extLst>
                 </a:gridCol>
@@ -10738,7 +11158,7 @@
                 </a:tc>
                 <a:extLst>
                   <a:ext uri="{0D108BD9-81ED-4DB2-BD59-A6C34878D82A}">
-                    <a16:rowId xmlns="" xmlns:a16="http://schemas.microsoft.com/office/drawing/2014/main" val="10000"/>
+                    <a16:rowId xmlns:a16="http://schemas.microsoft.com/office/drawing/2014/main" xmlns="" val="10000"/>
                   </a:ext>
                 </a:extLst>
               </a:tr>
@@ -10773,7 +11193,7 @@
                 </a:tc>
                 <a:extLst>
                   <a:ext uri="{0D108BD9-81ED-4DB2-BD59-A6C34878D82A}">
-                    <a16:rowId xmlns="" xmlns:a16="http://schemas.microsoft.com/office/drawing/2014/main" val="10001"/>
+                    <a16:rowId xmlns:a16="http://schemas.microsoft.com/office/drawing/2014/main" xmlns="" val="10001"/>
                   </a:ext>
                 </a:extLst>
               </a:tr>
@@ -10808,7 +11228,7 @@
                 </a:tc>
                 <a:extLst>
                   <a:ext uri="{0D108BD9-81ED-4DB2-BD59-A6C34878D82A}">
-                    <a16:rowId xmlns="" xmlns:a16="http://schemas.microsoft.com/office/drawing/2014/main" val="10002"/>
+                    <a16:rowId xmlns:a16="http://schemas.microsoft.com/office/drawing/2014/main" xmlns="" val="10002"/>
                   </a:ext>
                 </a:extLst>
               </a:tr>
@@ -10848,7 +11268,7 @@
                 </a:tc>
                 <a:extLst>
                   <a:ext uri="{0D108BD9-81ED-4DB2-BD59-A6C34878D82A}">
-                    <a16:rowId xmlns="" xmlns:a16="http://schemas.microsoft.com/office/drawing/2014/main" val="10003"/>
+                    <a16:rowId xmlns:a16="http://schemas.microsoft.com/office/drawing/2014/main" xmlns="" val="10003"/>
                   </a:ext>
                 </a:extLst>
               </a:tr>

</xml_diff>

<commit_message>
Correct error in previous commit.
</commit_message>
<xml_diff>
--- a/TransactionLog.pptx
+++ b/TransactionLog.pptx
@@ -6347,23 +6347,24 @@
             <a:pPr lvl="1"/>
             <a:r>
               <a:rPr lang="en-US" dirty="0"/>
-              <a:t>Completely variable in </a:t>
-            </a:r>
+              <a:t>Completely variable </a:t>
+            </a:r>
+            <a:r>
+              <a:rPr lang="en-US"/>
+              <a:t>in </a:t>
+            </a:r>
+            <a:r>
+              <a:rPr lang="en-US" smtClean="0"/>
+              <a:t>size</a:t>
+            </a:r>
+            <a:endParaRPr lang="en-US" dirty="0" smtClean="0"/>
+          </a:p>
+          <a:p>
             <a:r>
               <a:rPr lang="en-US" dirty="0" smtClean="0"/>
-              <a:t>size (in 512 </a:t>
-            </a:r>
-            <a:r>
-              <a:rPr lang="en-US" smtClean="0"/>
-              <a:t>bytes chunks)</a:t>
+              <a:t>And an index to the log records (slot array)</a:t>
             </a:r>
             <a:endParaRPr lang="en-US" dirty="0"/>
-          </a:p>
-          <a:p>
-            <a:r>
-              <a:rPr lang="en-US" dirty="0"/>
-              <a:t>And an index to the log records (slot array)</a:t>
-            </a:r>
           </a:p>
         </p:txBody>
       </p:sp>
@@ -7743,21 +7744,21 @@
                 <a:gridCol w="1895475">
                   <a:extLst>
                     <a:ext uri="{9D8B030D-6E8A-4147-A177-3AD203B41FA5}">
-                      <a16:colId xmlns:a16="http://schemas.microsoft.com/office/drawing/2014/main" xmlns="" val="20000"/>
+                      <a16:colId xmlns="" xmlns:a16="http://schemas.microsoft.com/office/drawing/2014/main" val="20000"/>
                     </a:ext>
                   </a:extLst>
                 </a:gridCol>
                 <a:gridCol w="3171825">
                   <a:extLst>
                     <a:ext uri="{9D8B030D-6E8A-4147-A177-3AD203B41FA5}">
-                      <a16:colId xmlns:a16="http://schemas.microsoft.com/office/drawing/2014/main" xmlns="" val="20001"/>
+                      <a16:colId xmlns="" xmlns:a16="http://schemas.microsoft.com/office/drawing/2014/main" val="20001"/>
                     </a:ext>
                   </a:extLst>
                 </a:gridCol>
                 <a:gridCol w="3162300">
                   <a:extLst>
                     <a:ext uri="{9D8B030D-6E8A-4147-A177-3AD203B41FA5}">
-                      <a16:colId xmlns:a16="http://schemas.microsoft.com/office/drawing/2014/main" xmlns="" val="20002"/>
+                      <a16:colId xmlns="" xmlns:a16="http://schemas.microsoft.com/office/drawing/2014/main" val="20002"/>
                     </a:ext>
                   </a:extLst>
                 </a:gridCol>
@@ -7804,7 +7805,7 @@
                 </a:tc>
                 <a:extLst>
                   <a:ext uri="{0D108BD9-81ED-4DB2-BD59-A6C34878D82A}">
-                    <a16:rowId xmlns:a16="http://schemas.microsoft.com/office/drawing/2014/main" xmlns="" val="10000"/>
+                    <a16:rowId xmlns="" xmlns:a16="http://schemas.microsoft.com/office/drawing/2014/main" val="10000"/>
                   </a:ext>
                 </a:extLst>
               </a:tr>
@@ -7867,7 +7868,7 @@
                 </a:tc>
                 <a:extLst>
                   <a:ext uri="{0D108BD9-81ED-4DB2-BD59-A6C34878D82A}">
-                    <a16:rowId xmlns:a16="http://schemas.microsoft.com/office/drawing/2014/main" xmlns="" val="10001"/>
+                    <a16:rowId xmlns="" xmlns:a16="http://schemas.microsoft.com/office/drawing/2014/main" val="10001"/>
                   </a:ext>
                 </a:extLst>
               </a:tr>
@@ -7938,7 +7939,7 @@
                 </a:tc>
                 <a:extLst>
                   <a:ext uri="{0D108BD9-81ED-4DB2-BD59-A6C34878D82A}">
-                    <a16:rowId xmlns:a16="http://schemas.microsoft.com/office/drawing/2014/main" xmlns="" val="10002"/>
+                    <a16:rowId xmlns="" xmlns:a16="http://schemas.microsoft.com/office/drawing/2014/main" val="10002"/>
                   </a:ext>
                 </a:extLst>
               </a:tr>
@@ -7984,7 +7985,7 @@
                 </a:tc>
                 <a:extLst>
                   <a:ext uri="{0D108BD9-81ED-4DB2-BD59-A6C34878D82A}">
-                    <a16:rowId xmlns:a16="http://schemas.microsoft.com/office/drawing/2014/main" xmlns="" val="10003"/>
+                    <a16:rowId xmlns="" xmlns:a16="http://schemas.microsoft.com/office/drawing/2014/main" val="10003"/>
                   </a:ext>
                 </a:extLst>
               </a:tr>
@@ -8035,7 +8036,7 @@
                 </a:tc>
                 <a:extLst>
                   <a:ext uri="{0D108BD9-81ED-4DB2-BD59-A6C34878D82A}">
-                    <a16:rowId xmlns:a16="http://schemas.microsoft.com/office/drawing/2014/main" xmlns="" val="3543017676"/>
+                    <a16:rowId xmlns="" xmlns:a16="http://schemas.microsoft.com/office/drawing/2014/main" val="3543017676"/>
                   </a:ext>
                 </a:extLst>
               </a:tr>
@@ -11105,14 +11106,14 @@
                 <a:gridCol w="3048000">
                   <a:extLst>
                     <a:ext uri="{9D8B030D-6E8A-4147-A177-3AD203B41FA5}">
-                      <a16:colId xmlns:a16="http://schemas.microsoft.com/office/drawing/2014/main" xmlns="" val="20000"/>
+                      <a16:colId xmlns="" xmlns:a16="http://schemas.microsoft.com/office/drawing/2014/main" val="20000"/>
                     </a:ext>
                   </a:extLst>
                 </a:gridCol>
                 <a:gridCol w="3048000">
                   <a:extLst>
                     <a:ext uri="{9D8B030D-6E8A-4147-A177-3AD203B41FA5}">
-                      <a16:colId xmlns:a16="http://schemas.microsoft.com/office/drawing/2014/main" xmlns="" val="20001"/>
+                      <a16:colId xmlns="" xmlns:a16="http://schemas.microsoft.com/office/drawing/2014/main" val="20001"/>
                     </a:ext>
                   </a:extLst>
                 </a:gridCol>
@@ -11158,7 +11159,7 @@
                 </a:tc>
                 <a:extLst>
                   <a:ext uri="{0D108BD9-81ED-4DB2-BD59-A6C34878D82A}">
-                    <a16:rowId xmlns:a16="http://schemas.microsoft.com/office/drawing/2014/main" xmlns="" val="10000"/>
+                    <a16:rowId xmlns="" xmlns:a16="http://schemas.microsoft.com/office/drawing/2014/main" val="10000"/>
                   </a:ext>
                 </a:extLst>
               </a:tr>
@@ -11193,7 +11194,7 @@
                 </a:tc>
                 <a:extLst>
                   <a:ext uri="{0D108BD9-81ED-4DB2-BD59-A6C34878D82A}">
-                    <a16:rowId xmlns:a16="http://schemas.microsoft.com/office/drawing/2014/main" xmlns="" val="10001"/>
+                    <a16:rowId xmlns="" xmlns:a16="http://schemas.microsoft.com/office/drawing/2014/main" val="10001"/>
                   </a:ext>
                 </a:extLst>
               </a:tr>
@@ -11228,7 +11229,7 @@
                 </a:tc>
                 <a:extLst>
                   <a:ext uri="{0D108BD9-81ED-4DB2-BD59-A6C34878D82A}">
-                    <a16:rowId xmlns:a16="http://schemas.microsoft.com/office/drawing/2014/main" xmlns="" val="10002"/>
+                    <a16:rowId xmlns="" xmlns:a16="http://schemas.microsoft.com/office/drawing/2014/main" val="10002"/>
                   </a:ext>
                 </a:extLst>
               </a:tr>
@@ -11268,7 +11269,7 @@
                 </a:tc>
                 <a:extLst>
                   <a:ext uri="{0D108BD9-81ED-4DB2-BD59-A6C34878D82A}">
-                    <a16:rowId xmlns:a16="http://schemas.microsoft.com/office/drawing/2014/main" xmlns="" val="10003"/>
+                    <a16:rowId xmlns="" xmlns:a16="http://schemas.microsoft.com/office/drawing/2014/main" val="10003"/>
                   </a:ext>
                 </a:extLst>
               </a:tr>

</xml_diff>

<commit_message>
Change title slide to Nashville and rename presentation.
</commit_message>
<xml_diff>
--- a/TransactionLog.pptx
+++ b/TransactionLog.pptx
@@ -256,7 +256,7 @@
           <a:p>
             <a:fld id="{2EDCB34D-5EC2-4739-9693-E425457AC201}" type="datetimeFigureOut">
               <a:rPr lang="en-US" smtClean="0"/>
-              <a:t>10/27/2016</a:t>
+              <a:t>12/5/2016</a:t>
             </a:fld>
             <a:endParaRPr lang="en-US"/>
           </a:p>
@@ -652,11 +652,11 @@
           <a:lstStyle/>
           <a:p>
             <a:r>
-              <a:rPr lang="en-US" dirty="0" smtClean="0"/>
+              <a:rPr lang="en-US" dirty="0"/>
               <a:t>Limit of 24K per </a:t>
             </a:r>
             <a:r>
-              <a:rPr lang="en-US" smtClean="0"/>
+              <a:rPr lang="en-US"/>
               <a:t>log record?</a:t>
             </a:r>
             <a:endParaRPr lang="en-US" dirty="0"/>
@@ -744,11 +744,11 @@
           <a:lstStyle/>
           <a:p>
             <a:r>
-              <a:rPr lang="en-US" dirty="0" smtClean="0"/>
+              <a:rPr lang="en-US" dirty="0"/>
               <a:t>Auto-truncate mode means that the database (1) is in the Simple recovery model, or no</a:t>
             </a:r>
             <a:r>
-              <a:rPr lang="en-US" baseline="0" dirty="0" smtClean="0"/>
+              <a:rPr lang="en-US" baseline="0" dirty="0"/>
               <a:t> full database backup since changing to Full or Bulked Logged model.</a:t>
             </a:r>
             <a:endParaRPr lang="en-US" dirty="0"/>
@@ -1026,7 +1026,7 @@
             <a:fld id="{5942B21B-2ADA-A040-A652-A7305E1B99FE}" type="datetimeFigureOut">
               <a:rPr lang="en-US" smtClean="0"/>
               <a:pPr/>
-              <a:t>10/27/2016</a:t>
+              <a:t>12/5/2016</a:t>
             </a:fld>
             <a:endParaRPr lang="en-US" dirty="0"/>
           </a:p>
@@ -1216,7 +1216,7 @@
           <a:p>
             <a:fld id="{5942B21B-2ADA-A040-A652-A7305E1B99FE}" type="datetimeFigureOut">
               <a:rPr lang="en-US" smtClean="0"/>
-              <a:t>10/27/2016</a:t>
+              <a:t>12/5/2016</a:t>
             </a:fld>
             <a:endParaRPr lang="en-US"/>
           </a:p>
@@ -1340,7 +1340,7 @@
             <a:fld id="{5942B21B-2ADA-A040-A652-A7305E1B99FE}" type="datetimeFigureOut">
               <a:rPr lang="en-US" smtClean="0"/>
               <a:pPr/>
-              <a:t>10/27/2016</a:t>
+              <a:t>12/5/2016</a:t>
             </a:fld>
             <a:r>
               <a:rPr lang="en-US"/>
@@ -1611,7 +1611,7 @@
             <a:fld id="{5942B21B-2ADA-A040-A652-A7305E1B99FE}" type="datetimeFigureOut">
               <a:rPr lang="en-US" smtClean="0"/>
               <a:pPr/>
-              <a:t>10/27/2016</a:t>
+              <a:t>12/5/2016</a:t>
             </a:fld>
             <a:r>
               <a:rPr lang="en-US" dirty="0"/>
@@ -1881,7 +1881,7 @@
             <a:fld id="{5942B21B-2ADA-A040-A652-A7305E1B99FE}" type="datetimeFigureOut">
               <a:rPr lang="en-US" smtClean="0"/>
               <a:pPr/>
-              <a:t>10/27/2016</a:t>
+              <a:t>12/5/2016</a:t>
             </a:fld>
             <a:r>
               <a:rPr lang="en-US" dirty="0"/>
@@ -2221,7 +2221,7 @@
             <a:fld id="{5942B21B-2ADA-A040-A652-A7305E1B99FE}" type="datetimeFigureOut">
               <a:rPr lang="en-US" smtClean="0"/>
               <a:pPr/>
-              <a:t>10/27/2016</a:t>
+              <a:t>12/5/2016</a:t>
             </a:fld>
             <a:r>
               <a:rPr lang="en-US" dirty="0"/>
@@ -2562,7 +2562,7 @@
             <a:fld id="{5942B21B-2ADA-A040-A652-A7305E1B99FE}" type="datetimeFigureOut">
               <a:rPr lang="en-US" smtClean="0"/>
               <a:pPr/>
-              <a:t>10/27/2016</a:t>
+              <a:t>12/5/2016</a:t>
             </a:fld>
             <a:r>
               <a:rPr lang="en-US" dirty="0"/>
@@ -3077,7 +3077,7 @@
             <a:fld id="{5942B21B-2ADA-A040-A652-A7305E1B99FE}" type="datetimeFigureOut">
               <a:rPr lang="en-US" smtClean="0"/>
               <a:pPr/>
-              <a:t>10/27/2016</a:t>
+              <a:t>12/5/2016</a:t>
             </a:fld>
             <a:r>
               <a:rPr lang="en-US" dirty="0"/>
@@ -3286,7 +3286,7 @@
             <a:fld id="{5942B21B-2ADA-A040-A652-A7305E1B99FE}" type="datetimeFigureOut">
               <a:rPr lang="en-US" smtClean="0"/>
               <a:pPr/>
-              <a:t>10/27/2016</a:t>
+              <a:t>12/5/2016</a:t>
             </a:fld>
             <a:r>
               <a:rPr lang="en-US" dirty="0"/>
@@ -3473,7 +3473,7 @@
             <a:fld id="{5942B21B-2ADA-A040-A652-A7305E1B99FE}" type="datetimeFigureOut">
               <a:rPr lang="en-US" smtClean="0"/>
               <a:pPr/>
-              <a:t>10/27/2016</a:t>
+              <a:t>12/5/2016</a:t>
             </a:fld>
             <a:r>
               <a:rPr lang="en-US" dirty="0"/>
@@ -3804,7 +3804,7 @@
             <a:fld id="{5942B21B-2ADA-A040-A652-A7305E1B99FE}" type="datetimeFigureOut">
               <a:rPr lang="en-US" smtClean="0"/>
               <a:pPr/>
-              <a:t>10/27/2016</a:t>
+              <a:t>12/5/2016</a:t>
             </a:fld>
             <a:r>
               <a:rPr lang="en-US" dirty="0"/>
@@ -4112,7 +4112,7 @@
             <a:fld id="{5942B21B-2ADA-A040-A652-A7305E1B99FE}" type="datetimeFigureOut">
               <a:rPr lang="en-US" smtClean="0"/>
               <a:pPr/>
-              <a:t>10/27/2016</a:t>
+              <a:t>12/5/2016</a:t>
             </a:fld>
             <a:r>
               <a:rPr lang="en-US" dirty="0"/>
@@ -4391,7 +4391,7 @@
             <a:fld id="{5942B21B-2ADA-A040-A652-A7305E1B99FE}" type="datetimeFigureOut">
               <a:rPr lang="en-US" smtClean="0"/>
               <a:pPr/>
-              <a:t>10/27/2016</a:t>
+              <a:t>12/5/2016</a:t>
             </a:fld>
             <a:r>
               <a:rPr lang="en-US" dirty="0"/>
@@ -4847,7 +4847,7 @@
           <a:p>
             <a:r>
               <a:rPr lang="en-US" dirty="0"/>
-              <a:t>Transaction Log Fundamentals for the DBA</a:t>
+              <a:t>Visualize Your Transaction Log</a:t>
             </a:r>
           </a:p>
         </p:txBody>
@@ -4863,7 +4863,7 @@
         <p:spPr>
           <a:xfrm>
             <a:off x="458408" y="5605933"/>
-            <a:ext cx="5711386" cy="1045124"/>
+            <a:ext cx="6464906" cy="1045124"/>
           </a:xfrm>
           <a:prstGeom prst="rect">
             <a:avLst/>
@@ -4871,7 +4871,7 @@
         </p:spPr>
         <p:txBody>
           <a:bodyPr vert="horz" lIns="91440" tIns="45720" rIns="91440" bIns="45720" rtlCol="0">
-            <a:normAutofit fontScale="85000" lnSpcReduction="10000"/>
+            <a:normAutofit lnSpcReduction="10000"/>
           </a:bodyPr>
           <a:lstStyle>
             <a:lvl1pPr marL="342900" indent="-342900" algn="l" defTabSz="457200" rtl="0" eaLnBrk="1" latinLnBrk="0" hangingPunct="1">
@@ -5025,54 +5025,8 @@
             </a:pPr>
             <a:r>
               <a:rPr lang="en-US" dirty="0"/>
-              <a:t>St. Louis, MO – September 10, 2016</a:t>
-            </a:r>
-          </a:p>
-        </p:txBody>
-      </p:sp>
-      <p:sp>
-        <p:nvSpPr>
-          <p:cNvPr id="5" name="Title 1"/>
-          <p:cNvSpPr txBox="1">
-            <a:spLocks/>
-          </p:cNvSpPr>
-          <p:nvPr/>
-        </p:nvSpPr>
-        <p:spPr>
-          <a:xfrm>
-            <a:off x="1343025" y="1648166"/>
-            <a:ext cx="7318535" cy="1470025"/>
-          </a:xfrm>
-          <a:prstGeom prst="rect">
-            <a:avLst/>
-          </a:prstGeom>
-        </p:spPr>
-        <p:txBody>
-          <a:bodyPr vert="horz" lIns="91440" tIns="45720" rIns="91440" bIns="45720" rtlCol="0" anchor="ctr">
-            <a:normAutofit/>
-          </a:bodyPr>
-          <a:lstStyle>
-            <a:lvl1pPr algn="l" defTabSz="457200" rtl="0" eaLnBrk="1" latinLnBrk="0" hangingPunct="1">
-              <a:spcBef>
-                <a:spcPct val="0"/>
-              </a:spcBef>
-              <a:buNone/>
-              <a:defRPr sz="4000" kern="1200">
-                <a:solidFill>
-                  <a:schemeClr val="accent1"/>
-                </a:solidFill>
-                <a:latin typeface="+mj-lt"/>
-                <a:ea typeface="+mj-ea"/>
-                <a:cs typeface="+mj-cs"/>
-              </a:defRPr>
-            </a:lvl1pPr>
-          </a:lstStyle>
-          <a:p>
-            <a:r>
-              <a:rPr lang="en-US" sz="3200"/>
-              <a:t>Visualize Your Transaction Log</a:t>
-            </a:r>
-            <a:endParaRPr lang="en-US" sz="3200" dirty="0"/>
+              <a:t>Nashville, TN – January 14, 2017</a:t>
+            </a:r>
           </a:p>
         </p:txBody>
       </p:sp>
@@ -5151,21 +5105,13 @@
           <a:p>
             <a:r>
               <a:rPr lang="en-US" dirty="0"/>
-              <a:t>VLFs can be in one of </a:t>
-            </a:r>
-            <a:r>
-              <a:rPr lang="en-US" dirty="0" smtClean="0"/>
-              <a:t>several statuses</a:t>
-            </a:r>
-            <a:r>
-              <a:rPr lang="en-US" dirty="0"/>
-              <a:t>:</a:t>
+              <a:t>VLFs can be in one of several statuses:</a:t>
             </a:r>
           </a:p>
           <a:p>
             <a:pPr lvl="1"/>
             <a:r>
-              <a:rPr lang="en-US" dirty="0" smtClean="0">
+              <a:rPr lang="en-US" dirty="0">
                 <a:solidFill>
                   <a:srgbClr val="92D050"/>
                 </a:solidFill>
@@ -5176,18 +5122,13 @@
           <a:p>
             <a:pPr lvl="1"/>
             <a:r>
-              <a:rPr lang="en-US" dirty="0" smtClean="0">
+              <a:rPr lang="en-US" dirty="0">
                 <a:solidFill>
                   <a:srgbClr val="92D050"/>
                 </a:solidFill>
               </a:rPr>
               <a:t>Inactive (previously used)</a:t>
             </a:r>
-            <a:endParaRPr lang="en-US" dirty="0">
-              <a:solidFill>
-                <a:srgbClr val="92D050"/>
-              </a:solidFill>
-            </a:endParaRPr>
           </a:p>
           <a:p>
             <a:pPr lvl="1"/>
@@ -5208,25 +5149,13 @@
                   <a:srgbClr val="FF0000"/>
                 </a:solidFill>
               </a:rPr>
-              <a:t>Active (not usable</a:t>
-            </a:r>
-            <a:r>
-              <a:rPr lang="en-US" dirty="0" smtClean="0">
-                <a:solidFill>
-                  <a:srgbClr val="FF0000"/>
-                </a:solidFill>
-              </a:rPr>
-              <a:t>)</a:t>
-            </a:r>
-          </a:p>
-          <a:p>
-            <a:r>
-              <a:rPr lang="en-US" dirty="0" smtClean="0"/>
-              <a:t>Only </a:t>
-            </a:r>
-            <a:r>
-              <a:rPr lang="en-US" dirty="0"/>
-              <a:t>one VLF is current at a time.</a:t>
+              <a:t>Active (not usable)</a:t>
+            </a:r>
+          </a:p>
+          <a:p>
+            <a:r>
+              <a:rPr lang="en-US" dirty="0"/>
+              <a:t>Only one VLF is current at a time.</a:t>
             </a:r>
           </a:p>
         </p:txBody>
@@ -6351,20 +6280,15 @@
             </a:r>
             <a:r>
               <a:rPr lang="en-US"/>
-              <a:t>in </a:t>
-            </a:r>
-            <a:r>
-              <a:rPr lang="en-US" smtClean="0"/>
-              <a:t>size</a:t>
-            </a:r>
-            <a:endParaRPr lang="en-US" dirty="0" smtClean="0"/>
-          </a:p>
-          <a:p>
-            <a:r>
-              <a:rPr lang="en-US" dirty="0" smtClean="0"/>
+              <a:t>in size</a:t>
+            </a:r>
+            <a:endParaRPr lang="en-US" dirty="0"/>
+          </a:p>
+          <a:p>
+            <a:r>
+              <a:rPr lang="en-US" dirty="0"/>
               <a:t>And an index to the log records (slot array)</a:t>
             </a:r>
-            <a:endParaRPr lang="en-US" dirty="0"/>
           </a:p>
         </p:txBody>
       </p:sp>
@@ -7744,21 +7668,21 @@
                 <a:gridCol w="1895475">
                   <a:extLst>
                     <a:ext uri="{9D8B030D-6E8A-4147-A177-3AD203B41FA5}">
-                      <a16:colId xmlns="" xmlns:a16="http://schemas.microsoft.com/office/drawing/2014/main" val="20000"/>
+                      <a16:colId xmlns:a16="http://schemas.microsoft.com/office/drawing/2014/main" val="20000"/>
                     </a:ext>
                   </a:extLst>
                 </a:gridCol>
                 <a:gridCol w="3171825">
                   <a:extLst>
                     <a:ext uri="{9D8B030D-6E8A-4147-A177-3AD203B41FA5}">
-                      <a16:colId xmlns="" xmlns:a16="http://schemas.microsoft.com/office/drawing/2014/main" val="20001"/>
+                      <a16:colId xmlns:a16="http://schemas.microsoft.com/office/drawing/2014/main" val="20001"/>
                     </a:ext>
                   </a:extLst>
                 </a:gridCol>
                 <a:gridCol w="3162300">
                   <a:extLst>
                     <a:ext uri="{9D8B030D-6E8A-4147-A177-3AD203B41FA5}">
-                      <a16:colId xmlns="" xmlns:a16="http://schemas.microsoft.com/office/drawing/2014/main" val="20002"/>
+                      <a16:colId xmlns:a16="http://schemas.microsoft.com/office/drawing/2014/main" val="20002"/>
                     </a:ext>
                   </a:extLst>
                 </a:gridCol>
@@ -7805,7 +7729,7 @@
                 </a:tc>
                 <a:extLst>
                   <a:ext uri="{0D108BD9-81ED-4DB2-BD59-A6C34878D82A}">
-                    <a16:rowId xmlns="" xmlns:a16="http://schemas.microsoft.com/office/drawing/2014/main" val="10000"/>
+                    <a16:rowId xmlns:a16="http://schemas.microsoft.com/office/drawing/2014/main" val="10000"/>
                   </a:ext>
                 </a:extLst>
               </a:tr>
@@ -7868,7 +7792,7 @@
                 </a:tc>
                 <a:extLst>
                   <a:ext uri="{0D108BD9-81ED-4DB2-BD59-A6C34878D82A}">
-                    <a16:rowId xmlns="" xmlns:a16="http://schemas.microsoft.com/office/drawing/2014/main" val="10001"/>
+                    <a16:rowId xmlns:a16="http://schemas.microsoft.com/office/drawing/2014/main" val="10001"/>
                   </a:ext>
                 </a:extLst>
               </a:tr>
@@ -7939,7 +7863,7 @@
                 </a:tc>
                 <a:extLst>
                   <a:ext uri="{0D108BD9-81ED-4DB2-BD59-A6C34878D82A}">
-                    <a16:rowId xmlns="" xmlns:a16="http://schemas.microsoft.com/office/drawing/2014/main" val="10002"/>
+                    <a16:rowId xmlns:a16="http://schemas.microsoft.com/office/drawing/2014/main" val="10002"/>
                   </a:ext>
                 </a:extLst>
               </a:tr>
@@ -7985,7 +7909,7 @@
                 </a:tc>
                 <a:extLst>
                   <a:ext uri="{0D108BD9-81ED-4DB2-BD59-A6C34878D82A}">
-                    <a16:rowId xmlns="" xmlns:a16="http://schemas.microsoft.com/office/drawing/2014/main" val="10003"/>
+                    <a16:rowId xmlns:a16="http://schemas.microsoft.com/office/drawing/2014/main" val="10003"/>
                   </a:ext>
                 </a:extLst>
               </a:tr>
@@ -8036,7 +7960,7 @@
                 </a:tc>
                 <a:extLst>
                   <a:ext uri="{0D108BD9-81ED-4DB2-BD59-A6C34878D82A}">
-                    <a16:rowId xmlns="" xmlns:a16="http://schemas.microsoft.com/office/drawing/2014/main" val="3543017676"/>
+                    <a16:rowId xmlns:a16="http://schemas.microsoft.com/office/drawing/2014/main" val="3543017676"/>
                   </a:ext>
                 </a:extLst>
               </a:tr>
@@ -9674,35 +9598,22 @@
             <a:pPr lvl="1"/>
             <a:r>
               <a:rPr lang="en-US" dirty="0"/>
-              <a:t>Simple </a:t>
-            </a:r>
-            <a:r>
-              <a:rPr lang="en-US" dirty="0" smtClean="0"/>
-              <a:t>recovery*: </a:t>
-            </a:r>
-            <a:r>
-              <a:rPr lang="en-US" dirty="0"/>
-              <a:t>Checkpoint</a:t>
+              <a:t>Simple recovery*: Checkpoint</a:t>
             </a:r>
           </a:p>
           <a:p>
             <a:pPr lvl="1"/>
             <a:r>
               <a:rPr lang="en-US" dirty="0"/>
-              <a:t>Full/bulked-log: Log </a:t>
-            </a:r>
-            <a:r>
-              <a:rPr lang="en-US" dirty="0" smtClean="0"/>
-              <a:t>Backup</a:t>
+              <a:t>Full/bulked-log: Log Backup</a:t>
             </a:r>
           </a:p>
           <a:p>
             <a:pPr lvl="1"/>
             <a:r>
-              <a:rPr lang="en-US" dirty="0" smtClean="0"/>
+              <a:rPr lang="en-US" dirty="0"/>
               <a:t>Change from Full or Bulked Logged to Simple**</a:t>
             </a:r>
-            <a:endParaRPr lang="en-US" dirty="0"/>
           </a:p>
           <a:p>
             <a:r>
@@ -9918,7 +9829,7 @@
               <a:buNone/>
             </a:pPr>
             <a:r>
-              <a:rPr lang="en-US" sz="1800" dirty="0" smtClean="0"/>
+              <a:rPr lang="en-US" sz="1800" dirty="0"/>
               <a:t>* More technically, when in “auto-truncate” mode.</a:t>
             </a:r>
           </a:p>
@@ -9927,10 +9838,9 @@
               <a:buNone/>
             </a:pPr>
             <a:r>
-              <a:rPr lang="en-US" sz="1800" dirty="0" smtClean="0"/>
+              <a:rPr lang="en-US" sz="1800" dirty="0"/>
               <a:t>** But this breaks the backup chain!</a:t>
             </a:r>
-            <a:endParaRPr lang="en-US" sz="1800" dirty="0"/>
           </a:p>
         </p:txBody>
       </p:sp>
@@ -10209,25 +10119,20 @@
           <a:p>
             <a:r>
               <a:rPr lang="en-US" dirty="0"/>
-              <a:t>Log records form a reverse linked list of operations within a transaction</a:t>
-            </a:r>
-            <a:r>
-              <a:rPr lang="en-US" dirty="0" smtClean="0"/>
-              <a:t>.</a:t>
-            </a:r>
-          </a:p>
-          <a:p>
-            <a:r>
-              <a:rPr lang="en-US" dirty="0" smtClean="0"/>
+              <a:t>Log records form a reverse linked list of operations within a transaction.</a:t>
+            </a:r>
+          </a:p>
+          <a:p>
+            <a:r>
+              <a:rPr lang="en-US" dirty="0"/>
               <a:t>Let’s suppose the yellow transaction needs to roll back.</a:t>
             </a:r>
           </a:p>
           <a:p>
             <a:r>
-              <a:rPr lang="en-US" dirty="0" smtClean="0"/>
+              <a:rPr lang="en-US" dirty="0"/>
               <a:t>The first record is for “begin transaction.”</a:t>
             </a:r>
-            <a:endParaRPr lang="en-US" dirty="0"/>
           </a:p>
         </p:txBody>
       </p:sp>
@@ -10328,13 +10233,13 @@
           <a:lstStyle/>
           <a:p>
             <a:r>
-              <a:rPr lang="en-US" dirty="0" smtClean="0"/>
+              <a:rPr lang="en-US" dirty="0"/>
               <a:t>SQL Server finds the last log record for the transaction.</a:t>
             </a:r>
           </a:p>
           <a:p>
             <a:r>
-              <a:rPr lang="en-US" dirty="0" smtClean="0"/>
+              <a:rPr lang="en-US" dirty="0"/>
               <a:t>SQL reverses the operation in the buffer pool.</a:t>
             </a:r>
           </a:p>
@@ -10437,16 +10342,15 @@
           <a:lstStyle/>
           <a:p>
             <a:r>
-              <a:rPr lang="en-US" dirty="0" smtClean="0"/>
+              <a:rPr lang="en-US" dirty="0"/>
               <a:t>Creates a new log record indicating that the operation was undone. This is called a “Compensation” record.</a:t>
             </a:r>
           </a:p>
           <a:p>
             <a:r>
-              <a:rPr lang="en-US" dirty="0" smtClean="0"/>
+              <a:rPr lang="en-US" dirty="0"/>
               <a:t>This record then points back to the second-to-last record.</a:t>
             </a:r>
-            <a:endParaRPr lang="en-US" dirty="0"/>
           </a:p>
         </p:txBody>
       </p:sp>
@@ -10692,10 +10596,9 @@
           <a:lstStyle/>
           <a:p>
             <a:r>
-              <a:rPr lang="en-US" dirty="0" smtClean="0"/>
+              <a:rPr lang="en-US" dirty="0"/>
               <a:t>The second to last operation is undone, and a compensation record is written that points back to the first record (the “begin transaction”).</a:t>
             </a:r>
-            <a:endParaRPr lang="en-US" dirty="0"/>
           </a:p>
         </p:txBody>
       </p:sp>
@@ -10796,10 +10699,9 @@
           <a:lstStyle/>
           <a:p>
             <a:r>
-              <a:rPr lang="en-US" dirty="0" smtClean="0"/>
+              <a:rPr lang="en-US" dirty="0"/>
               <a:t>Finally, an “abort transaction” log record is written.  It also points back to the “begin transaction” record.</a:t>
             </a:r>
-            <a:endParaRPr lang="en-US" dirty="0"/>
           </a:p>
         </p:txBody>
       </p:sp>
@@ -10895,24 +10797,23 @@
           <a:lstStyle/>
           <a:p>
             <a:r>
-              <a:rPr lang="en-US" dirty="0" smtClean="0"/>
+              <a:rPr lang="en-US" dirty="0"/>
               <a:t>Key takeaways:</a:t>
             </a:r>
           </a:p>
           <a:p>
             <a:pPr lvl="1"/>
             <a:r>
-              <a:rPr lang="en-US" dirty="0" smtClean="0"/>
+              <a:rPr lang="en-US" dirty="0"/>
               <a:t>Rollback operations generate log records</a:t>
             </a:r>
           </a:p>
           <a:p>
             <a:pPr lvl="1"/>
             <a:r>
-              <a:rPr lang="en-US" dirty="0" smtClean="0"/>
+              <a:rPr lang="en-US" dirty="0"/>
               <a:t>As the initial operations are performed, SQL Server will “reserve” log space to ensure that a rollback is possible.</a:t>
             </a:r>
-            <a:endParaRPr lang="en-US" dirty="0"/>
           </a:p>
         </p:txBody>
       </p:sp>
@@ -10987,10 +10888,9 @@
               <a:buNone/>
             </a:pPr>
             <a:r>
-              <a:rPr lang="en-US" dirty="0" smtClean="0"/>
+              <a:rPr lang="en-US" dirty="0"/>
               <a:t>Rollback operations</a:t>
             </a:r>
-            <a:endParaRPr lang="en-US" dirty="0"/>
           </a:p>
         </p:txBody>
       </p:sp>
@@ -11106,14 +11006,14 @@
                 <a:gridCol w="3048000">
                   <a:extLst>
                     <a:ext uri="{9D8B030D-6E8A-4147-A177-3AD203B41FA5}">
-                      <a16:colId xmlns="" xmlns:a16="http://schemas.microsoft.com/office/drawing/2014/main" val="20000"/>
+                      <a16:colId xmlns:a16="http://schemas.microsoft.com/office/drawing/2014/main" val="20000"/>
                     </a:ext>
                   </a:extLst>
                 </a:gridCol>
                 <a:gridCol w="3048000">
                   <a:extLst>
                     <a:ext uri="{9D8B030D-6E8A-4147-A177-3AD203B41FA5}">
-                      <a16:colId xmlns="" xmlns:a16="http://schemas.microsoft.com/office/drawing/2014/main" val="20001"/>
+                      <a16:colId xmlns:a16="http://schemas.microsoft.com/office/drawing/2014/main" val="20001"/>
                     </a:ext>
                   </a:extLst>
                 </a:gridCol>
@@ -11159,7 +11059,7 @@
                 </a:tc>
                 <a:extLst>
                   <a:ext uri="{0D108BD9-81ED-4DB2-BD59-A6C34878D82A}">
-                    <a16:rowId xmlns="" xmlns:a16="http://schemas.microsoft.com/office/drawing/2014/main" val="10000"/>
+                    <a16:rowId xmlns:a16="http://schemas.microsoft.com/office/drawing/2014/main" val="10000"/>
                   </a:ext>
                 </a:extLst>
               </a:tr>
@@ -11194,7 +11094,7 @@
                 </a:tc>
                 <a:extLst>
                   <a:ext uri="{0D108BD9-81ED-4DB2-BD59-A6C34878D82A}">
-                    <a16:rowId xmlns="" xmlns:a16="http://schemas.microsoft.com/office/drawing/2014/main" val="10001"/>
+                    <a16:rowId xmlns:a16="http://schemas.microsoft.com/office/drawing/2014/main" val="10001"/>
                   </a:ext>
                 </a:extLst>
               </a:tr>
@@ -11229,7 +11129,7 @@
                 </a:tc>
                 <a:extLst>
                   <a:ext uri="{0D108BD9-81ED-4DB2-BD59-A6C34878D82A}">
-                    <a16:rowId xmlns="" xmlns:a16="http://schemas.microsoft.com/office/drawing/2014/main" val="10002"/>
+                    <a16:rowId xmlns:a16="http://schemas.microsoft.com/office/drawing/2014/main" val="10002"/>
                   </a:ext>
                 </a:extLst>
               </a:tr>
@@ -11269,7 +11169,7 @@
                 </a:tc>
                 <a:extLst>
                   <a:ext uri="{0D108BD9-81ED-4DB2-BD59-A6C34878D82A}">
-                    <a16:rowId xmlns="" xmlns:a16="http://schemas.microsoft.com/office/drawing/2014/main" val="10003"/>
+                    <a16:rowId xmlns:a16="http://schemas.microsoft.com/office/drawing/2014/main" val="10003"/>
                   </a:ext>
                 </a:extLst>
               </a:tr>

</xml_diff>

<commit_message>
Add demo picture; minor corrections.
</commit_message>
<xml_diff>
--- a/TransactionLog.pptx
+++ b/TransactionLog.pptx
@@ -256,7 +256,7 @@
           <a:p>
             <a:fld id="{2EDCB34D-5EC2-4739-9693-E425457AC201}" type="datetimeFigureOut">
               <a:rPr lang="en-US" smtClean="0"/>
-              <a:t>12/5/2016</a:t>
+              <a:t>01/06/2017</a:t>
             </a:fld>
             <a:endParaRPr lang="en-US"/>
           </a:p>
@@ -1026,7 +1026,7 @@
             <a:fld id="{5942B21B-2ADA-A040-A652-A7305E1B99FE}" type="datetimeFigureOut">
               <a:rPr lang="en-US" smtClean="0"/>
               <a:pPr/>
-              <a:t>12/5/2016</a:t>
+              <a:t>01/06/2017</a:t>
             </a:fld>
             <a:endParaRPr lang="en-US" dirty="0"/>
           </a:p>
@@ -1216,7 +1216,7 @@
           <a:p>
             <a:fld id="{5942B21B-2ADA-A040-A652-A7305E1B99FE}" type="datetimeFigureOut">
               <a:rPr lang="en-US" smtClean="0"/>
-              <a:t>12/5/2016</a:t>
+              <a:t>01/06/2017</a:t>
             </a:fld>
             <a:endParaRPr lang="en-US"/>
           </a:p>
@@ -1340,7 +1340,7 @@
             <a:fld id="{5942B21B-2ADA-A040-A652-A7305E1B99FE}" type="datetimeFigureOut">
               <a:rPr lang="en-US" smtClean="0"/>
               <a:pPr/>
-              <a:t>12/5/2016</a:t>
+              <a:t>01/06/2017</a:t>
             </a:fld>
             <a:r>
               <a:rPr lang="en-US"/>
@@ -1611,7 +1611,7 @@
             <a:fld id="{5942B21B-2ADA-A040-A652-A7305E1B99FE}" type="datetimeFigureOut">
               <a:rPr lang="en-US" smtClean="0"/>
               <a:pPr/>
-              <a:t>12/5/2016</a:t>
+              <a:t>01/06/2017</a:t>
             </a:fld>
             <a:r>
               <a:rPr lang="en-US" dirty="0"/>
@@ -1881,7 +1881,7 @@
             <a:fld id="{5942B21B-2ADA-A040-A652-A7305E1B99FE}" type="datetimeFigureOut">
               <a:rPr lang="en-US" smtClean="0"/>
               <a:pPr/>
-              <a:t>12/5/2016</a:t>
+              <a:t>01/06/2017</a:t>
             </a:fld>
             <a:r>
               <a:rPr lang="en-US" dirty="0"/>
@@ -2221,7 +2221,7 @@
             <a:fld id="{5942B21B-2ADA-A040-A652-A7305E1B99FE}" type="datetimeFigureOut">
               <a:rPr lang="en-US" smtClean="0"/>
               <a:pPr/>
-              <a:t>12/5/2016</a:t>
+              <a:t>01/06/2017</a:t>
             </a:fld>
             <a:r>
               <a:rPr lang="en-US" dirty="0"/>
@@ -2562,7 +2562,7 @@
             <a:fld id="{5942B21B-2ADA-A040-A652-A7305E1B99FE}" type="datetimeFigureOut">
               <a:rPr lang="en-US" smtClean="0"/>
               <a:pPr/>
-              <a:t>12/5/2016</a:t>
+              <a:t>01/06/2017</a:t>
             </a:fld>
             <a:r>
               <a:rPr lang="en-US" dirty="0"/>
@@ -3077,7 +3077,7 @@
             <a:fld id="{5942B21B-2ADA-A040-A652-A7305E1B99FE}" type="datetimeFigureOut">
               <a:rPr lang="en-US" smtClean="0"/>
               <a:pPr/>
-              <a:t>12/5/2016</a:t>
+              <a:t>01/06/2017</a:t>
             </a:fld>
             <a:r>
               <a:rPr lang="en-US" dirty="0"/>
@@ -3286,7 +3286,7 @@
             <a:fld id="{5942B21B-2ADA-A040-A652-A7305E1B99FE}" type="datetimeFigureOut">
               <a:rPr lang="en-US" smtClean="0"/>
               <a:pPr/>
-              <a:t>12/5/2016</a:t>
+              <a:t>01/06/2017</a:t>
             </a:fld>
             <a:r>
               <a:rPr lang="en-US" dirty="0"/>
@@ -3473,7 +3473,7 @@
             <a:fld id="{5942B21B-2ADA-A040-A652-A7305E1B99FE}" type="datetimeFigureOut">
               <a:rPr lang="en-US" smtClean="0"/>
               <a:pPr/>
-              <a:t>12/5/2016</a:t>
+              <a:t>01/06/2017</a:t>
             </a:fld>
             <a:r>
               <a:rPr lang="en-US" dirty="0"/>
@@ -3804,7 +3804,7 @@
             <a:fld id="{5942B21B-2ADA-A040-A652-A7305E1B99FE}" type="datetimeFigureOut">
               <a:rPr lang="en-US" smtClean="0"/>
               <a:pPr/>
-              <a:t>12/5/2016</a:t>
+              <a:t>01/06/2017</a:t>
             </a:fld>
             <a:r>
               <a:rPr lang="en-US" dirty="0"/>
@@ -4112,7 +4112,7 @@
             <a:fld id="{5942B21B-2ADA-A040-A652-A7305E1B99FE}" type="datetimeFigureOut">
               <a:rPr lang="en-US" smtClean="0"/>
               <a:pPr/>
-              <a:t>12/5/2016</a:t>
+              <a:t>01/06/2017</a:t>
             </a:fld>
             <a:r>
               <a:rPr lang="en-US" dirty="0"/>
@@ -4391,7 +4391,7 @@
             <a:fld id="{5942B21B-2ADA-A040-A652-A7305E1B99FE}" type="datetimeFigureOut">
               <a:rPr lang="en-US" smtClean="0"/>
               <a:pPr/>
-              <a:t>12/5/2016</a:t>
+              <a:t>01/06/2017</a:t>
             </a:fld>
             <a:r>
               <a:rPr lang="en-US" dirty="0"/>
@@ -5254,12 +5254,14 @@
           <a:noFill/>
         </p:spPr>
         <p:txBody>
-          <a:bodyPr/>
+          <a:bodyPr>
+            <a:normAutofit lnSpcReduction="10000"/>
+          </a:bodyPr>
           <a:lstStyle/>
           <a:p>
             <a:r>
               <a:rPr lang="en-US" dirty="0"/>
-              <a:t>VLFs can be in one of three statuses:</a:t>
+              <a:t>VLFs can be in one of several statuses:</a:t>
             </a:r>
           </a:p>
           <a:p>
@@ -5270,7 +5272,18 @@
                   <a:srgbClr val="92D050"/>
                 </a:solidFill>
               </a:rPr>
-              <a:t>Inactive</a:t>
+              <a:t>Inactive (never used)</a:t>
+            </a:r>
+          </a:p>
+          <a:p>
+            <a:pPr lvl="1"/>
+            <a:r>
+              <a:rPr lang="en-US" dirty="0">
+                <a:solidFill>
+                  <a:srgbClr val="92D050"/>
+                </a:solidFill>
+              </a:rPr>
+              <a:t>Inactive (previously used)</a:t>
             </a:r>
           </a:p>
           <a:p>
@@ -5294,16 +5307,15 @@
               </a:rPr>
               <a:t>Active (not usable)</a:t>
             </a:r>
-            <a:endParaRPr lang="en-US" dirty="0">
-              <a:solidFill>
-                <a:schemeClr val="tx1"/>
-              </a:solidFill>
-            </a:endParaRPr>
-          </a:p>
-          <a:p>
-            <a:r>
-              <a:rPr lang="en-US" dirty="0"/>
-              <a:t>Only one VLF is current at a time.</a:t>
+          </a:p>
+          <a:p>
+            <a:r>
+              <a:rPr lang="en-US" dirty="0" smtClean="0"/>
+              <a:t>Only </a:t>
+            </a:r>
+            <a:r>
+              <a:rPr lang="en-US" dirty="0"/>
+              <a:t>one VLF is current at a time.</a:t>
             </a:r>
           </a:p>
           <a:p>
@@ -5878,8 +5890,13 @@
           <a:p>
             <a:r>
               <a:rPr lang="en-US" dirty="0"/>
-              <a:t>Eventually the log will be truncated</a:t>
-            </a:r>
+              <a:t>Eventually the log will be </a:t>
+            </a:r>
+            <a:r>
+              <a:rPr lang="en-US" dirty="0" smtClean="0"/>
+              <a:t>“truncated” or “cleared”</a:t>
+            </a:r>
+            <a:endParaRPr lang="en-US" dirty="0"/>
           </a:p>
           <a:p>
             <a:endParaRPr lang="en-US" dirty="0"/>
@@ -7668,21 +7685,21 @@
                 <a:gridCol w="1895475">
                   <a:extLst>
                     <a:ext uri="{9D8B030D-6E8A-4147-A177-3AD203B41FA5}">
-                      <a16:colId xmlns:a16="http://schemas.microsoft.com/office/drawing/2014/main" val="20000"/>
+                      <a16:colId xmlns:a16="http://schemas.microsoft.com/office/drawing/2014/main" xmlns="" val="20000"/>
                     </a:ext>
                   </a:extLst>
                 </a:gridCol>
                 <a:gridCol w="3171825">
                   <a:extLst>
                     <a:ext uri="{9D8B030D-6E8A-4147-A177-3AD203B41FA5}">
-                      <a16:colId xmlns:a16="http://schemas.microsoft.com/office/drawing/2014/main" val="20001"/>
+                      <a16:colId xmlns:a16="http://schemas.microsoft.com/office/drawing/2014/main" xmlns="" val="20001"/>
                     </a:ext>
                   </a:extLst>
                 </a:gridCol>
                 <a:gridCol w="3162300">
                   <a:extLst>
                     <a:ext uri="{9D8B030D-6E8A-4147-A177-3AD203B41FA5}">
-                      <a16:colId xmlns:a16="http://schemas.microsoft.com/office/drawing/2014/main" val="20002"/>
+                      <a16:colId xmlns:a16="http://schemas.microsoft.com/office/drawing/2014/main" xmlns="" val="20002"/>
                     </a:ext>
                   </a:extLst>
                 </a:gridCol>
@@ -7729,7 +7746,7 @@
                 </a:tc>
                 <a:extLst>
                   <a:ext uri="{0D108BD9-81ED-4DB2-BD59-A6C34878D82A}">
-                    <a16:rowId xmlns:a16="http://schemas.microsoft.com/office/drawing/2014/main" val="10000"/>
+                    <a16:rowId xmlns:a16="http://schemas.microsoft.com/office/drawing/2014/main" xmlns="" val="10000"/>
                   </a:ext>
                 </a:extLst>
               </a:tr>
@@ -7792,7 +7809,7 @@
                 </a:tc>
                 <a:extLst>
                   <a:ext uri="{0D108BD9-81ED-4DB2-BD59-A6C34878D82A}">
-                    <a16:rowId xmlns:a16="http://schemas.microsoft.com/office/drawing/2014/main" val="10001"/>
+                    <a16:rowId xmlns:a16="http://schemas.microsoft.com/office/drawing/2014/main" xmlns="" val="10001"/>
                   </a:ext>
                 </a:extLst>
               </a:tr>
@@ -7863,7 +7880,7 @@
                 </a:tc>
                 <a:extLst>
                   <a:ext uri="{0D108BD9-81ED-4DB2-BD59-A6C34878D82A}">
-                    <a16:rowId xmlns:a16="http://schemas.microsoft.com/office/drawing/2014/main" val="10002"/>
+                    <a16:rowId xmlns:a16="http://schemas.microsoft.com/office/drawing/2014/main" xmlns="" val="10002"/>
                   </a:ext>
                 </a:extLst>
               </a:tr>
@@ -7909,7 +7926,7 @@
                 </a:tc>
                 <a:extLst>
                   <a:ext uri="{0D108BD9-81ED-4DB2-BD59-A6C34878D82A}">
-                    <a16:rowId xmlns:a16="http://schemas.microsoft.com/office/drawing/2014/main" val="10003"/>
+                    <a16:rowId xmlns:a16="http://schemas.microsoft.com/office/drawing/2014/main" xmlns="" val="10003"/>
                   </a:ext>
                 </a:extLst>
               </a:tr>
@@ -7960,7 +7977,7 @@
                 </a:tc>
                 <a:extLst>
                   <a:ext uri="{0D108BD9-81ED-4DB2-BD59-A6C34878D82A}">
-                    <a16:rowId xmlns:a16="http://schemas.microsoft.com/office/drawing/2014/main" val="3543017676"/>
+                    <a16:rowId xmlns:a16="http://schemas.microsoft.com/office/drawing/2014/main" xmlns="" val="3543017676"/>
                   </a:ext>
                 </a:extLst>
               </a:tr>
@@ -8215,6 +8232,30 @@
           </a:p>
         </p:txBody>
       </p:sp>
+      <p:pic>
+        <p:nvPicPr>
+          <p:cNvPr id="4" name="Picture 3"/>
+          <p:cNvPicPr>
+            <a:picLocks noChangeAspect="1"/>
+          </p:cNvPicPr>
+          <p:nvPr/>
+        </p:nvPicPr>
+        <p:blipFill>
+          <a:blip r:embed="rId2"/>
+          <a:stretch>
+            <a:fillRect/>
+          </a:stretch>
+        </p:blipFill>
+        <p:spPr>
+          <a:xfrm>
+            <a:off x="763071" y="1653000"/>
+            <a:ext cx="7617858" cy="3552000"/>
+          </a:xfrm>
+          <a:prstGeom prst="rect">
+            <a:avLst/>
+          </a:prstGeom>
+        </p:spPr>
+      </p:pic>
     </p:spTree>
     <p:extLst>
       <p:ext uri="{BB962C8B-B14F-4D97-AF65-F5344CB8AC3E}">
@@ -8406,6 +8447,30 @@
           </a:p>
         </p:txBody>
       </p:sp>
+      <p:pic>
+        <p:nvPicPr>
+          <p:cNvPr id="4" name="Picture 3"/>
+          <p:cNvPicPr>
+            <a:picLocks noChangeAspect="1"/>
+          </p:cNvPicPr>
+          <p:nvPr/>
+        </p:nvPicPr>
+        <p:blipFill>
+          <a:blip r:embed="rId2"/>
+          <a:stretch>
+            <a:fillRect/>
+          </a:stretch>
+        </p:blipFill>
+        <p:spPr>
+          <a:xfrm>
+            <a:off x="763071" y="1653000"/>
+            <a:ext cx="7617858" cy="3552000"/>
+          </a:xfrm>
+          <a:prstGeom prst="rect">
+            <a:avLst/>
+          </a:prstGeom>
+        </p:spPr>
+      </p:pic>
     </p:spTree>
     <p:extLst>
       <p:ext uri="{BB962C8B-B14F-4D97-AF65-F5344CB8AC3E}">
@@ -8610,6 +8675,30 @@
           </a:p>
         </p:txBody>
       </p:sp>
+      <p:pic>
+        <p:nvPicPr>
+          <p:cNvPr id="4" name="Picture 3"/>
+          <p:cNvPicPr>
+            <a:picLocks noChangeAspect="1"/>
+          </p:cNvPicPr>
+          <p:nvPr/>
+        </p:nvPicPr>
+        <p:blipFill>
+          <a:blip r:embed="rId2"/>
+          <a:stretch>
+            <a:fillRect/>
+          </a:stretch>
+        </p:blipFill>
+        <p:spPr>
+          <a:xfrm>
+            <a:off x="763071" y="1653000"/>
+            <a:ext cx="7617858" cy="3552000"/>
+          </a:xfrm>
+          <a:prstGeom prst="rect">
+            <a:avLst/>
+          </a:prstGeom>
+        </p:spPr>
+      </p:pic>
     </p:spTree>
     <p:extLst>
       <p:ext uri="{BB962C8B-B14F-4D97-AF65-F5344CB8AC3E}">
@@ -9936,6 +10025,30 @@
           </a:p>
         </p:txBody>
       </p:sp>
+      <p:pic>
+        <p:nvPicPr>
+          <p:cNvPr id="4" name="Picture 3"/>
+          <p:cNvPicPr>
+            <a:picLocks noChangeAspect="1"/>
+          </p:cNvPicPr>
+          <p:nvPr/>
+        </p:nvPicPr>
+        <p:blipFill>
+          <a:blip r:embed="rId2"/>
+          <a:stretch>
+            <a:fillRect/>
+          </a:stretch>
+        </p:blipFill>
+        <p:spPr>
+          <a:xfrm>
+            <a:off x="837716" y="1970241"/>
+            <a:ext cx="7617858" cy="3552000"/>
+          </a:xfrm>
+          <a:prstGeom prst="rect">
+            <a:avLst/>
+          </a:prstGeom>
+        </p:spPr>
+      </p:pic>
     </p:spTree>
     <p:extLst>
       <p:ext uri="{BB962C8B-B14F-4D97-AF65-F5344CB8AC3E}">
@@ -10894,6 +11007,30 @@
           </a:p>
         </p:txBody>
       </p:sp>
+      <p:pic>
+        <p:nvPicPr>
+          <p:cNvPr id="4" name="Picture 3"/>
+          <p:cNvPicPr>
+            <a:picLocks noChangeAspect="1"/>
+          </p:cNvPicPr>
+          <p:nvPr/>
+        </p:nvPicPr>
+        <p:blipFill>
+          <a:blip r:embed="rId2"/>
+          <a:stretch>
+            <a:fillRect/>
+          </a:stretch>
+        </p:blipFill>
+        <p:spPr>
+          <a:xfrm>
+            <a:off x="763071" y="1653000"/>
+            <a:ext cx="7617858" cy="3552000"/>
+          </a:xfrm>
+          <a:prstGeom prst="rect">
+            <a:avLst/>
+          </a:prstGeom>
+        </p:spPr>
+      </p:pic>
     </p:spTree>
     <p:extLst>
       <p:ext uri="{BB962C8B-B14F-4D97-AF65-F5344CB8AC3E}">
@@ -11006,14 +11143,14 @@
                 <a:gridCol w="3048000">
                   <a:extLst>
                     <a:ext uri="{9D8B030D-6E8A-4147-A177-3AD203B41FA5}">
-                      <a16:colId xmlns:a16="http://schemas.microsoft.com/office/drawing/2014/main" val="20000"/>
+                      <a16:colId xmlns:a16="http://schemas.microsoft.com/office/drawing/2014/main" xmlns="" val="20000"/>
                     </a:ext>
                   </a:extLst>
                 </a:gridCol>
                 <a:gridCol w="3048000">
                   <a:extLst>
                     <a:ext uri="{9D8B030D-6E8A-4147-A177-3AD203B41FA5}">
-                      <a16:colId xmlns:a16="http://schemas.microsoft.com/office/drawing/2014/main" val="20001"/>
+                      <a16:colId xmlns:a16="http://schemas.microsoft.com/office/drawing/2014/main" xmlns="" val="20001"/>
                     </a:ext>
                   </a:extLst>
                 </a:gridCol>
@@ -11059,7 +11196,7 @@
                 </a:tc>
                 <a:extLst>
                   <a:ext uri="{0D108BD9-81ED-4DB2-BD59-A6C34878D82A}">
-                    <a16:rowId xmlns:a16="http://schemas.microsoft.com/office/drawing/2014/main" val="10000"/>
+                    <a16:rowId xmlns:a16="http://schemas.microsoft.com/office/drawing/2014/main" xmlns="" val="10000"/>
                   </a:ext>
                 </a:extLst>
               </a:tr>
@@ -11094,7 +11231,7 @@
                 </a:tc>
                 <a:extLst>
                   <a:ext uri="{0D108BD9-81ED-4DB2-BD59-A6C34878D82A}">
-                    <a16:rowId xmlns:a16="http://schemas.microsoft.com/office/drawing/2014/main" val="10001"/>
+                    <a16:rowId xmlns:a16="http://schemas.microsoft.com/office/drawing/2014/main" xmlns="" val="10001"/>
                   </a:ext>
                 </a:extLst>
               </a:tr>
@@ -11129,7 +11266,7 @@
                 </a:tc>
                 <a:extLst>
                   <a:ext uri="{0D108BD9-81ED-4DB2-BD59-A6C34878D82A}">
-                    <a16:rowId xmlns:a16="http://schemas.microsoft.com/office/drawing/2014/main" val="10002"/>
+                    <a16:rowId xmlns:a16="http://schemas.microsoft.com/office/drawing/2014/main" xmlns="" val="10002"/>
                   </a:ext>
                 </a:extLst>
               </a:tr>
@@ -11169,7 +11306,7 @@
                 </a:tc>
                 <a:extLst>
                   <a:ext uri="{0D108BD9-81ED-4DB2-BD59-A6C34878D82A}">
-                    <a16:rowId xmlns:a16="http://schemas.microsoft.com/office/drawing/2014/main" val="10003"/>
+                    <a16:rowId xmlns:a16="http://schemas.microsoft.com/office/drawing/2014/main" xmlns="" val="10003"/>
                   </a:ext>
                 </a:extLst>
               </a:tr>
@@ -11566,8 +11703,37 @@
             <a:pPr lvl="2"/>
             <a:r>
               <a:rPr lang="en-US" dirty="0"/>
-              <a:t>Can be time-consuming due to zero-initialization</a:t>
-            </a:r>
+              <a:t>Can be time-consuming due to </a:t>
+            </a:r>
+            <a:r>
+              <a:rPr lang="en-US" dirty="0" smtClean="0"/>
+              <a:t>zero-initialization</a:t>
+            </a:r>
+          </a:p>
+          <a:p>
+            <a:r>
+              <a:rPr lang="en-US" dirty="0" smtClean="0"/>
+              <a:t>However, plan for auto-growth</a:t>
+            </a:r>
+          </a:p>
+          <a:p>
+            <a:pPr lvl="1"/>
+            <a:r>
+              <a:rPr lang="en-US" dirty="0" smtClean="0"/>
+              <a:t>Set reasonable auto-growth parameters</a:t>
+            </a:r>
+          </a:p>
+          <a:p>
+            <a:pPr lvl="1"/>
+            <a:r>
+              <a:rPr lang="en-US" dirty="0" smtClean="0"/>
+              <a:t>Fixed growth amount, </a:t>
+            </a:r>
+            <a:r>
+              <a:rPr lang="en-US" smtClean="0"/>
+              <a:t>not percentage</a:t>
+            </a:r>
+            <a:endParaRPr lang="en-US" dirty="0"/>
           </a:p>
         </p:txBody>
       </p:sp>
@@ -11648,6 +11814,30 @@
           </a:p>
         </p:txBody>
       </p:sp>
+      <p:pic>
+        <p:nvPicPr>
+          <p:cNvPr id="4" name="Picture 3"/>
+          <p:cNvPicPr>
+            <a:picLocks noChangeAspect="1"/>
+          </p:cNvPicPr>
+          <p:nvPr/>
+        </p:nvPicPr>
+        <p:blipFill>
+          <a:blip r:embed="rId2"/>
+          <a:stretch>
+            <a:fillRect/>
+          </a:stretch>
+        </p:blipFill>
+        <p:spPr>
+          <a:xfrm>
+            <a:off x="763071" y="1653000"/>
+            <a:ext cx="7617858" cy="3552000"/>
+          </a:xfrm>
+          <a:prstGeom prst="rect">
+            <a:avLst/>
+          </a:prstGeom>
+        </p:spPr>
+      </p:pic>
     </p:spTree>
     <p:extLst>
       <p:ext uri="{BB962C8B-B14F-4D97-AF65-F5344CB8AC3E}">

</xml_diff>

<commit_message>
Note that rollbacks are single-threaded operations.
</commit_message>
<xml_diff>
--- a/TransactionLog.pptx
+++ b/TransactionLog.pptx
@@ -256,7 +256,7 @@
           <a:p>
             <a:fld id="{2EDCB34D-5EC2-4739-9693-E425457AC201}" type="datetimeFigureOut">
               <a:rPr lang="en-US" smtClean="0"/>
-              <a:t>01/06/2017</a:t>
+              <a:t>01/23/2017</a:t>
             </a:fld>
             <a:endParaRPr lang="en-US"/>
           </a:p>
@@ -1026,7 +1026,7 @@
             <a:fld id="{5942B21B-2ADA-A040-A652-A7305E1B99FE}" type="datetimeFigureOut">
               <a:rPr lang="en-US" smtClean="0"/>
               <a:pPr/>
-              <a:t>01/06/2017</a:t>
+              <a:t>01/23/2017</a:t>
             </a:fld>
             <a:endParaRPr lang="en-US" dirty="0"/>
           </a:p>
@@ -1216,7 +1216,7 @@
           <a:p>
             <a:fld id="{5942B21B-2ADA-A040-A652-A7305E1B99FE}" type="datetimeFigureOut">
               <a:rPr lang="en-US" smtClean="0"/>
-              <a:t>01/06/2017</a:t>
+              <a:t>01/23/2017</a:t>
             </a:fld>
             <a:endParaRPr lang="en-US"/>
           </a:p>
@@ -1340,7 +1340,7 @@
             <a:fld id="{5942B21B-2ADA-A040-A652-A7305E1B99FE}" type="datetimeFigureOut">
               <a:rPr lang="en-US" smtClean="0"/>
               <a:pPr/>
-              <a:t>01/06/2017</a:t>
+              <a:t>01/23/2017</a:t>
             </a:fld>
             <a:r>
               <a:rPr lang="en-US"/>
@@ -1611,7 +1611,7 @@
             <a:fld id="{5942B21B-2ADA-A040-A652-A7305E1B99FE}" type="datetimeFigureOut">
               <a:rPr lang="en-US" smtClean="0"/>
               <a:pPr/>
-              <a:t>01/06/2017</a:t>
+              <a:t>01/23/2017</a:t>
             </a:fld>
             <a:r>
               <a:rPr lang="en-US" dirty="0"/>
@@ -1881,7 +1881,7 @@
             <a:fld id="{5942B21B-2ADA-A040-A652-A7305E1B99FE}" type="datetimeFigureOut">
               <a:rPr lang="en-US" smtClean="0"/>
               <a:pPr/>
-              <a:t>01/06/2017</a:t>
+              <a:t>01/23/2017</a:t>
             </a:fld>
             <a:r>
               <a:rPr lang="en-US" dirty="0"/>
@@ -2221,7 +2221,7 @@
             <a:fld id="{5942B21B-2ADA-A040-A652-A7305E1B99FE}" type="datetimeFigureOut">
               <a:rPr lang="en-US" smtClean="0"/>
               <a:pPr/>
-              <a:t>01/06/2017</a:t>
+              <a:t>01/23/2017</a:t>
             </a:fld>
             <a:r>
               <a:rPr lang="en-US" dirty="0"/>
@@ -2562,7 +2562,7 @@
             <a:fld id="{5942B21B-2ADA-A040-A652-A7305E1B99FE}" type="datetimeFigureOut">
               <a:rPr lang="en-US" smtClean="0"/>
               <a:pPr/>
-              <a:t>01/06/2017</a:t>
+              <a:t>01/23/2017</a:t>
             </a:fld>
             <a:r>
               <a:rPr lang="en-US" dirty="0"/>
@@ -3077,7 +3077,7 @@
             <a:fld id="{5942B21B-2ADA-A040-A652-A7305E1B99FE}" type="datetimeFigureOut">
               <a:rPr lang="en-US" smtClean="0"/>
               <a:pPr/>
-              <a:t>01/06/2017</a:t>
+              <a:t>01/23/2017</a:t>
             </a:fld>
             <a:r>
               <a:rPr lang="en-US" dirty="0"/>
@@ -3286,7 +3286,7 @@
             <a:fld id="{5942B21B-2ADA-A040-A652-A7305E1B99FE}" type="datetimeFigureOut">
               <a:rPr lang="en-US" smtClean="0"/>
               <a:pPr/>
-              <a:t>01/06/2017</a:t>
+              <a:t>01/23/2017</a:t>
             </a:fld>
             <a:r>
               <a:rPr lang="en-US" dirty="0"/>
@@ -3473,7 +3473,7 @@
             <a:fld id="{5942B21B-2ADA-A040-A652-A7305E1B99FE}" type="datetimeFigureOut">
               <a:rPr lang="en-US" smtClean="0"/>
               <a:pPr/>
-              <a:t>01/06/2017</a:t>
+              <a:t>01/23/2017</a:t>
             </a:fld>
             <a:r>
               <a:rPr lang="en-US" dirty="0"/>
@@ -3804,7 +3804,7 @@
             <a:fld id="{5942B21B-2ADA-A040-A652-A7305E1B99FE}" type="datetimeFigureOut">
               <a:rPr lang="en-US" smtClean="0"/>
               <a:pPr/>
-              <a:t>01/06/2017</a:t>
+              <a:t>01/23/2017</a:t>
             </a:fld>
             <a:r>
               <a:rPr lang="en-US" dirty="0"/>
@@ -4112,7 +4112,7 @@
             <a:fld id="{5942B21B-2ADA-A040-A652-A7305E1B99FE}" type="datetimeFigureOut">
               <a:rPr lang="en-US" smtClean="0"/>
               <a:pPr/>
-              <a:t>01/06/2017</a:t>
+              <a:t>01/23/2017</a:t>
             </a:fld>
             <a:r>
               <a:rPr lang="en-US" dirty="0"/>
@@ -4391,7 +4391,7 @@
             <a:fld id="{5942B21B-2ADA-A040-A652-A7305E1B99FE}" type="datetimeFigureOut">
               <a:rPr lang="en-US" smtClean="0"/>
               <a:pPr/>
-              <a:t>01/06/2017</a:t>
+              <a:t>01/23/2017</a:t>
             </a:fld>
             <a:r>
               <a:rPr lang="en-US" dirty="0"/>
@@ -7685,21 +7685,21 @@
                 <a:gridCol w="1895475">
                   <a:extLst>
                     <a:ext uri="{9D8B030D-6E8A-4147-A177-3AD203B41FA5}">
-                      <a16:colId xmlns:a16="http://schemas.microsoft.com/office/drawing/2014/main" xmlns="" val="20000"/>
+                      <a16:colId xmlns="" xmlns:a16="http://schemas.microsoft.com/office/drawing/2014/main" val="20000"/>
                     </a:ext>
                   </a:extLst>
                 </a:gridCol>
                 <a:gridCol w="3171825">
                   <a:extLst>
                     <a:ext uri="{9D8B030D-6E8A-4147-A177-3AD203B41FA5}">
-                      <a16:colId xmlns:a16="http://schemas.microsoft.com/office/drawing/2014/main" xmlns="" val="20001"/>
+                      <a16:colId xmlns="" xmlns:a16="http://schemas.microsoft.com/office/drawing/2014/main" val="20001"/>
                     </a:ext>
                   </a:extLst>
                 </a:gridCol>
                 <a:gridCol w="3162300">
                   <a:extLst>
                     <a:ext uri="{9D8B030D-6E8A-4147-A177-3AD203B41FA5}">
-                      <a16:colId xmlns:a16="http://schemas.microsoft.com/office/drawing/2014/main" xmlns="" val="20002"/>
+                      <a16:colId xmlns="" xmlns:a16="http://schemas.microsoft.com/office/drawing/2014/main" val="20002"/>
                     </a:ext>
                   </a:extLst>
                 </a:gridCol>
@@ -7746,7 +7746,7 @@
                 </a:tc>
                 <a:extLst>
                   <a:ext uri="{0D108BD9-81ED-4DB2-BD59-A6C34878D82A}">
-                    <a16:rowId xmlns:a16="http://schemas.microsoft.com/office/drawing/2014/main" xmlns="" val="10000"/>
+                    <a16:rowId xmlns="" xmlns:a16="http://schemas.microsoft.com/office/drawing/2014/main" val="10000"/>
                   </a:ext>
                 </a:extLst>
               </a:tr>
@@ -7809,7 +7809,7 @@
                 </a:tc>
                 <a:extLst>
                   <a:ext uri="{0D108BD9-81ED-4DB2-BD59-A6C34878D82A}">
-                    <a16:rowId xmlns:a16="http://schemas.microsoft.com/office/drawing/2014/main" xmlns="" val="10001"/>
+                    <a16:rowId xmlns="" xmlns:a16="http://schemas.microsoft.com/office/drawing/2014/main" val="10001"/>
                   </a:ext>
                 </a:extLst>
               </a:tr>
@@ -7880,7 +7880,7 @@
                 </a:tc>
                 <a:extLst>
                   <a:ext uri="{0D108BD9-81ED-4DB2-BD59-A6C34878D82A}">
-                    <a16:rowId xmlns:a16="http://schemas.microsoft.com/office/drawing/2014/main" xmlns="" val="10002"/>
+                    <a16:rowId xmlns="" xmlns:a16="http://schemas.microsoft.com/office/drawing/2014/main" val="10002"/>
                   </a:ext>
                 </a:extLst>
               </a:tr>
@@ -7926,7 +7926,7 @@
                 </a:tc>
                 <a:extLst>
                   <a:ext uri="{0D108BD9-81ED-4DB2-BD59-A6C34878D82A}">
-                    <a16:rowId xmlns:a16="http://schemas.microsoft.com/office/drawing/2014/main" xmlns="" val="10003"/>
+                    <a16:rowId xmlns="" xmlns:a16="http://schemas.microsoft.com/office/drawing/2014/main" val="10003"/>
                   </a:ext>
                 </a:extLst>
               </a:tr>
@@ -7977,7 +7977,7 @@
                 </a:tc>
                 <a:extLst>
                   <a:ext uri="{0D108BD9-81ED-4DB2-BD59-A6C34878D82A}">
-                    <a16:rowId xmlns:a16="http://schemas.microsoft.com/office/drawing/2014/main" xmlns="" val="3543017676"/>
+                    <a16:rowId xmlns="" xmlns:a16="http://schemas.microsoft.com/office/drawing/2014/main" val="3543017676"/>
                   </a:ext>
                 </a:extLst>
               </a:tr>
@@ -10153,8 +10153,19 @@
             <a:pPr lvl="1"/>
             <a:r>
               <a:rPr lang="en-US" dirty="0"/>
-              <a:t>Restore operations</a:t>
-            </a:r>
+              <a:t>Restore </a:t>
+            </a:r>
+            <a:r>
+              <a:rPr lang="en-US" dirty="0" smtClean="0"/>
+              <a:t>operations</a:t>
+            </a:r>
+          </a:p>
+          <a:p>
+            <a:r>
+              <a:rPr lang="en-US" dirty="0" smtClean="0"/>
+              <a:t>Rollback operations are single-threaded</a:t>
+            </a:r>
+            <a:endParaRPr lang="en-US" dirty="0"/>
           </a:p>
         </p:txBody>
       </p:sp>
@@ -10918,14 +10929,22 @@
             <a:pPr lvl="1"/>
             <a:r>
               <a:rPr lang="en-US" dirty="0"/>
-              <a:t>Rollback operations generate log records</a:t>
+              <a:t>Rollback operations generate log </a:t>
+            </a:r>
+            <a:r>
+              <a:rPr lang="en-US" dirty="0" smtClean="0"/>
+              <a:t>records</a:t>
             </a:r>
           </a:p>
           <a:p>
             <a:pPr lvl="1"/>
             <a:r>
-              <a:rPr lang="en-US" dirty="0"/>
-              <a:t>As the initial operations are performed, SQL Server will “reserve” log space to ensure that a rollback is possible.</a:t>
+              <a:rPr lang="en-US" dirty="0" smtClean="0"/>
+              <a:t>As </a:t>
+            </a:r>
+            <a:r>
+              <a:rPr lang="en-US" dirty="0"/>
+              <a:t>the initial operations are performed, SQL Server will “reserve” log space to ensure that a rollback is possible.</a:t>
             </a:r>
           </a:p>
         </p:txBody>
@@ -11143,14 +11162,14 @@
                 <a:gridCol w="3048000">
                   <a:extLst>
                     <a:ext uri="{9D8B030D-6E8A-4147-A177-3AD203B41FA5}">
-                      <a16:colId xmlns:a16="http://schemas.microsoft.com/office/drawing/2014/main" xmlns="" val="20000"/>
+                      <a16:colId xmlns="" xmlns:a16="http://schemas.microsoft.com/office/drawing/2014/main" val="20000"/>
                     </a:ext>
                   </a:extLst>
                 </a:gridCol>
                 <a:gridCol w="3048000">
                   <a:extLst>
                     <a:ext uri="{9D8B030D-6E8A-4147-A177-3AD203B41FA5}">
-                      <a16:colId xmlns:a16="http://schemas.microsoft.com/office/drawing/2014/main" xmlns="" val="20001"/>
+                      <a16:colId xmlns="" xmlns:a16="http://schemas.microsoft.com/office/drawing/2014/main" val="20001"/>
                     </a:ext>
                   </a:extLst>
                 </a:gridCol>
@@ -11196,7 +11215,7 @@
                 </a:tc>
                 <a:extLst>
                   <a:ext uri="{0D108BD9-81ED-4DB2-BD59-A6C34878D82A}">
-                    <a16:rowId xmlns:a16="http://schemas.microsoft.com/office/drawing/2014/main" xmlns="" val="10000"/>
+                    <a16:rowId xmlns="" xmlns:a16="http://schemas.microsoft.com/office/drawing/2014/main" val="10000"/>
                   </a:ext>
                 </a:extLst>
               </a:tr>
@@ -11231,7 +11250,7 @@
                 </a:tc>
                 <a:extLst>
                   <a:ext uri="{0D108BD9-81ED-4DB2-BD59-A6C34878D82A}">
-                    <a16:rowId xmlns:a16="http://schemas.microsoft.com/office/drawing/2014/main" xmlns="" val="10001"/>
+                    <a16:rowId xmlns="" xmlns:a16="http://schemas.microsoft.com/office/drawing/2014/main" val="10001"/>
                   </a:ext>
                 </a:extLst>
               </a:tr>
@@ -11266,7 +11285,7 @@
                 </a:tc>
                 <a:extLst>
                   <a:ext uri="{0D108BD9-81ED-4DB2-BD59-A6C34878D82A}">
-                    <a16:rowId xmlns:a16="http://schemas.microsoft.com/office/drawing/2014/main" xmlns="" val="10002"/>
+                    <a16:rowId xmlns="" xmlns:a16="http://schemas.microsoft.com/office/drawing/2014/main" val="10002"/>
                   </a:ext>
                 </a:extLst>
               </a:tr>
@@ -11306,7 +11325,7 @@
                 </a:tc>
                 <a:extLst>
                   <a:ext uri="{0D108BD9-81ED-4DB2-BD59-A6C34878D82A}">
-                    <a16:rowId xmlns:a16="http://schemas.microsoft.com/office/drawing/2014/main" xmlns="" val="10003"/>
+                    <a16:rowId xmlns="" xmlns:a16="http://schemas.microsoft.com/office/drawing/2014/main" val="10003"/>
                   </a:ext>
                 </a:extLst>
               </a:tr>

</xml_diff>

<commit_message>
Note that indirect checkpoints are off by default in 2012, 2014.
</commit_message>
<xml_diff>
--- a/TransactionLog.pptx
+++ b/TransactionLog.pptx
@@ -256,7 +256,7 @@
           <a:p>
             <a:fld id="{2EDCB34D-5EC2-4739-9693-E425457AC201}" type="datetimeFigureOut">
               <a:rPr lang="en-US" smtClean="0"/>
-              <a:t>01/23/2017</a:t>
+              <a:t>02/08/2017</a:t>
             </a:fld>
             <a:endParaRPr lang="en-US"/>
           </a:p>
@@ -1026,7 +1026,7 @@
             <a:fld id="{5942B21B-2ADA-A040-A652-A7305E1B99FE}" type="datetimeFigureOut">
               <a:rPr lang="en-US" smtClean="0"/>
               <a:pPr/>
-              <a:t>01/23/2017</a:t>
+              <a:t>02/08/2017</a:t>
             </a:fld>
             <a:endParaRPr lang="en-US" dirty="0"/>
           </a:p>
@@ -1216,7 +1216,7 @@
           <a:p>
             <a:fld id="{5942B21B-2ADA-A040-A652-A7305E1B99FE}" type="datetimeFigureOut">
               <a:rPr lang="en-US" smtClean="0"/>
-              <a:t>01/23/2017</a:t>
+              <a:t>02/08/2017</a:t>
             </a:fld>
             <a:endParaRPr lang="en-US"/>
           </a:p>
@@ -1340,7 +1340,7 @@
             <a:fld id="{5942B21B-2ADA-A040-A652-A7305E1B99FE}" type="datetimeFigureOut">
               <a:rPr lang="en-US" smtClean="0"/>
               <a:pPr/>
-              <a:t>01/23/2017</a:t>
+              <a:t>02/08/2017</a:t>
             </a:fld>
             <a:r>
               <a:rPr lang="en-US"/>
@@ -1611,7 +1611,7 @@
             <a:fld id="{5942B21B-2ADA-A040-A652-A7305E1B99FE}" type="datetimeFigureOut">
               <a:rPr lang="en-US" smtClean="0"/>
               <a:pPr/>
-              <a:t>01/23/2017</a:t>
+              <a:t>02/08/2017</a:t>
             </a:fld>
             <a:r>
               <a:rPr lang="en-US" dirty="0"/>
@@ -1881,7 +1881,7 @@
             <a:fld id="{5942B21B-2ADA-A040-A652-A7305E1B99FE}" type="datetimeFigureOut">
               <a:rPr lang="en-US" smtClean="0"/>
               <a:pPr/>
-              <a:t>01/23/2017</a:t>
+              <a:t>02/08/2017</a:t>
             </a:fld>
             <a:r>
               <a:rPr lang="en-US" dirty="0"/>
@@ -2221,7 +2221,7 @@
             <a:fld id="{5942B21B-2ADA-A040-A652-A7305E1B99FE}" type="datetimeFigureOut">
               <a:rPr lang="en-US" smtClean="0"/>
               <a:pPr/>
-              <a:t>01/23/2017</a:t>
+              <a:t>02/08/2017</a:t>
             </a:fld>
             <a:r>
               <a:rPr lang="en-US" dirty="0"/>
@@ -2562,7 +2562,7 @@
             <a:fld id="{5942B21B-2ADA-A040-A652-A7305E1B99FE}" type="datetimeFigureOut">
               <a:rPr lang="en-US" smtClean="0"/>
               <a:pPr/>
-              <a:t>01/23/2017</a:t>
+              <a:t>02/08/2017</a:t>
             </a:fld>
             <a:r>
               <a:rPr lang="en-US" dirty="0"/>
@@ -3077,7 +3077,7 @@
             <a:fld id="{5942B21B-2ADA-A040-A652-A7305E1B99FE}" type="datetimeFigureOut">
               <a:rPr lang="en-US" smtClean="0"/>
               <a:pPr/>
-              <a:t>01/23/2017</a:t>
+              <a:t>02/08/2017</a:t>
             </a:fld>
             <a:r>
               <a:rPr lang="en-US" dirty="0"/>
@@ -3286,7 +3286,7 @@
             <a:fld id="{5942B21B-2ADA-A040-A652-A7305E1B99FE}" type="datetimeFigureOut">
               <a:rPr lang="en-US" smtClean="0"/>
               <a:pPr/>
-              <a:t>01/23/2017</a:t>
+              <a:t>02/08/2017</a:t>
             </a:fld>
             <a:r>
               <a:rPr lang="en-US" dirty="0"/>
@@ -3473,7 +3473,7 @@
             <a:fld id="{5942B21B-2ADA-A040-A652-A7305E1B99FE}" type="datetimeFigureOut">
               <a:rPr lang="en-US" smtClean="0"/>
               <a:pPr/>
-              <a:t>01/23/2017</a:t>
+              <a:t>02/08/2017</a:t>
             </a:fld>
             <a:r>
               <a:rPr lang="en-US" dirty="0"/>
@@ -3804,7 +3804,7 @@
             <a:fld id="{5942B21B-2ADA-A040-A652-A7305E1B99FE}" type="datetimeFigureOut">
               <a:rPr lang="en-US" smtClean="0"/>
               <a:pPr/>
-              <a:t>01/23/2017</a:t>
+              <a:t>02/08/2017</a:t>
             </a:fld>
             <a:r>
               <a:rPr lang="en-US" dirty="0"/>
@@ -4112,7 +4112,7 @@
             <a:fld id="{5942B21B-2ADA-A040-A652-A7305E1B99FE}" type="datetimeFigureOut">
               <a:rPr lang="en-US" smtClean="0"/>
               <a:pPr/>
-              <a:t>01/23/2017</a:t>
+              <a:t>02/08/2017</a:t>
             </a:fld>
             <a:r>
               <a:rPr lang="en-US" dirty="0"/>
@@ -4391,7 +4391,7 @@
             <a:fld id="{5942B21B-2ADA-A040-A652-A7305E1B99FE}" type="datetimeFigureOut">
               <a:rPr lang="en-US" smtClean="0"/>
               <a:pPr/>
-              <a:t>01/23/2017</a:t>
+              <a:t>02/08/2017</a:t>
             </a:fld>
             <a:r>
               <a:rPr lang="en-US" dirty="0"/>
@@ -7685,21 +7685,21 @@
                 <a:gridCol w="1895475">
                   <a:extLst>
                     <a:ext uri="{9D8B030D-6E8A-4147-A177-3AD203B41FA5}">
-                      <a16:colId xmlns="" xmlns:a16="http://schemas.microsoft.com/office/drawing/2014/main" val="20000"/>
+                      <a16:colId xmlns:a16="http://schemas.microsoft.com/office/drawing/2014/main" xmlns="" val="20000"/>
                     </a:ext>
                   </a:extLst>
                 </a:gridCol>
                 <a:gridCol w="3171825">
                   <a:extLst>
                     <a:ext uri="{9D8B030D-6E8A-4147-A177-3AD203B41FA5}">
-                      <a16:colId xmlns="" xmlns:a16="http://schemas.microsoft.com/office/drawing/2014/main" val="20001"/>
+                      <a16:colId xmlns:a16="http://schemas.microsoft.com/office/drawing/2014/main" xmlns="" val="20001"/>
                     </a:ext>
                   </a:extLst>
                 </a:gridCol>
                 <a:gridCol w="3162300">
                   <a:extLst>
                     <a:ext uri="{9D8B030D-6E8A-4147-A177-3AD203B41FA5}">
-                      <a16:colId xmlns="" xmlns:a16="http://schemas.microsoft.com/office/drawing/2014/main" val="20002"/>
+                      <a16:colId xmlns:a16="http://schemas.microsoft.com/office/drawing/2014/main" xmlns="" val="20002"/>
                     </a:ext>
                   </a:extLst>
                 </a:gridCol>
@@ -7746,7 +7746,7 @@
                 </a:tc>
                 <a:extLst>
                   <a:ext uri="{0D108BD9-81ED-4DB2-BD59-A6C34878D82A}">
-                    <a16:rowId xmlns="" xmlns:a16="http://schemas.microsoft.com/office/drawing/2014/main" val="10000"/>
+                    <a16:rowId xmlns:a16="http://schemas.microsoft.com/office/drawing/2014/main" xmlns="" val="10000"/>
                   </a:ext>
                 </a:extLst>
               </a:tr>
@@ -7809,7 +7809,7 @@
                 </a:tc>
                 <a:extLst>
                   <a:ext uri="{0D108BD9-81ED-4DB2-BD59-A6C34878D82A}">
-                    <a16:rowId xmlns="" xmlns:a16="http://schemas.microsoft.com/office/drawing/2014/main" val="10001"/>
+                    <a16:rowId xmlns:a16="http://schemas.microsoft.com/office/drawing/2014/main" xmlns="" val="10001"/>
                   </a:ext>
                 </a:extLst>
               </a:tr>
@@ -7880,7 +7880,7 @@
                 </a:tc>
                 <a:extLst>
                   <a:ext uri="{0D108BD9-81ED-4DB2-BD59-A6C34878D82A}">
-                    <a16:rowId xmlns="" xmlns:a16="http://schemas.microsoft.com/office/drawing/2014/main" val="10002"/>
+                    <a16:rowId xmlns:a16="http://schemas.microsoft.com/office/drawing/2014/main" xmlns="" val="10002"/>
                   </a:ext>
                 </a:extLst>
               </a:tr>
@@ -7926,7 +7926,7 @@
                 </a:tc>
                 <a:extLst>
                   <a:ext uri="{0D108BD9-81ED-4DB2-BD59-A6C34878D82A}">
-                    <a16:rowId xmlns="" xmlns:a16="http://schemas.microsoft.com/office/drawing/2014/main" val="10003"/>
+                    <a16:rowId xmlns:a16="http://schemas.microsoft.com/office/drawing/2014/main" xmlns="" val="10003"/>
                   </a:ext>
                 </a:extLst>
               </a:tr>
@@ -7977,7 +7977,7 @@
                 </a:tc>
                 <a:extLst>
                   <a:ext uri="{0D108BD9-81ED-4DB2-BD59-A6C34878D82A}">
-                    <a16:rowId xmlns="" xmlns:a16="http://schemas.microsoft.com/office/drawing/2014/main" val="3543017676"/>
+                    <a16:rowId xmlns:a16="http://schemas.microsoft.com/office/drawing/2014/main" xmlns="" val="3543017676"/>
                   </a:ext>
                 </a:extLst>
               </a:tr>
@@ -9063,7 +9063,7 @@
         <p:spPr/>
         <p:txBody>
           <a:bodyPr>
-            <a:normAutofit fontScale="92500" lnSpcReduction="20000"/>
+            <a:normAutofit fontScale="85000" lnSpcReduction="10000"/>
           </a:bodyPr>
           <a:lstStyle/>
           <a:p>
@@ -9108,32 +9108,18 @@
                 <a:latin typeface="Courier New" panose="02070309020205020404" pitchFamily="49" charset="0"/>
                 <a:cs typeface="Courier New" panose="02070309020205020404" pitchFamily="49" charset="0"/>
               </a:rPr>
-              <a:t>recovery interval (</a:t>
-            </a:r>
-            <a:r>
-              <a:rPr lang="en-US" sz="1700">
-                <a:latin typeface="Courier New" panose="02070309020205020404" pitchFamily="49" charset="0"/>
-                <a:cs typeface="Courier New" panose="02070309020205020404" pitchFamily="49" charset="0"/>
-              </a:rPr>
-              <a:t>min)</a:t>
-            </a:r>
-            <a:r>
-              <a:rPr lang="en-US" sz="1600"/>
+              <a:t>recovery interval (min)</a:t>
+            </a:r>
+            <a:r>
+              <a:rPr lang="en-US" sz="1600" dirty="0"/>
               <a:t>'</a:t>
-            </a:r>
-            <a:r>
-              <a:rPr lang="en-US" sz="1700">
-                <a:latin typeface="Courier New" panose="02070309020205020404" pitchFamily="49" charset="0"/>
-                <a:cs typeface="Courier New" panose="02070309020205020404" pitchFamily="49" charset="0"/>
-              </a:rPr>
-              <a:t>, </a:t>
             </a:r>
             <a:r>
               <a:rPr lang="en-US" sz="1700" dirty="0">
                 <a:latin typeface="Courier New" panose="02070309020205020404" pitchFamily="49" charset="0"/>
                 <a:cs typeface="Courier New" panose="02070309020205020404" pitchFamily="49" charset="0"/>
               </a:rPr>
-              <a:t>2</a:t>
+              <a:t>, 2</a:t>
             </a:r>
             <a:r>
               <a:rPr lang="en-US" dirty="0"/>
@@ -9195,9 +9181,21 @@
               <a:t> = 2 minutes</a:t>
             </a:r>
             <a:r>
-              <a:rPr lang="en-US" dirty="0"/>
+              <a:rPr lang="en-US" dirty="0" smtClean="0"/>
               <a:t>]</a:t>
             </a:r>
+          </a:p>
+          <a:p>
+            <a:pPr lvl="1"/>
+            <a:r>
+              <a:rPr lang="en-US" dirty="0" smtClean="0"/>
+              <a:t>Off by default in 2012, 2014; on </a:t>
+            </a:r>
+            <a:r>
+              <a:rPr lang="en-US" smtClean="0"/>
+              <a:t>by default in 2016</a:t>
+            </a:r>
+            <a:endParaRPr lang="en-US" dirty="0"/>
           </a:p>
           <a:p>
             <a:r>
@@ -11162,14 +11160,14 @@
                 <a:gridCol w="3048000">
                   <a:extLst>
                     <a:ext uri="{9D8B030D-6E8A-4147-A177-3AD203B41FA5}">
-                      <a16:colId xmlns="" xmlns:a16="http://schemas.microsoft.com/office/drawing/2014/main" val="20000"/>
+                      <a16:colId xmlns:a16="http://schemas.microsoft.com/office/drawing/2014/main" xmlns="" val="20000"/>
                     </a:ext>
                   </a:extLst>
                 </a:gridCol>
                 <a:gridCol w="3048000">
                   <a:extLst>
                     <a:ext uri="{9D8B030D-6E8A-4147-A177-3AD203B41FA5}">
-                      <a16:colId xmlns="" xmlns:a16="http://schemas.microsoft.com/office/drawing/2014/main" val="20001"/>
+                      <a16:colId xmlns:a16="http://schemas.microsoft.com/office/drawing/2014/main" xmlns="" val="20001"/>
                     </a:ext>
                   </a:extLst>
                 </a:gridCol>
@@ -11215,7 +11213,7 @@
                 </a:tc>
                 <a:extLst>
                   <a:ext uri="{0D108BD9-81ED-4DB2-BD59-A6C34878D82A}">
-                    <a16:rowId xmlns="" xmlns:a16="http://schemas.microsoft.com/office/drawing/2014/main" val="10000"/>
+                    <a16:rowId xmlns:a16="http://schemas.microsoft.com/office/drawing/2014/main" xmlns="" val="10000"/>
                   </a:ext>
                 </a:extLst>
               </a:tr>
@@ -11250,7 +11248,7 @@
                 </a:tc>
                 <a:extLst>
                   <a:ext uri="{0D108BD9-81ED-4DB2-BD59-A6C34878D82A}">
-                    <a16:rowId xmlns="" xmlns:a16="http://schemas.microsoft.com/office/drawing/2014/main" val="10001"/>
+                    <a16:rowId xmlns:a16="http://schemas.microsoft.com/office/drawing/2014/main" xmlns="" val="10001"/>
                   </a:ext>
                 </a:extLst>
               </a:tr>
@@ -11285,7 +11283,7 @@
                 </a:tc>
                 <a:extLst>
                   <a:ext uri="{0D108BD9-81ED-4DB2-BD59-A6C34878D82A}">
-                    <a16:rowId xmlns="" xmlns:a16="http://schemas.microsoft.com/office/drawing/2014/main" val="10002"/>
+                    <a16:rowId xmlns:a16="http://schemas.microsoft.com/office/drawing/2014/main" xmlns="" val="10002"/>
                   </a:ext>
                 </a:extLst>
               </a:tr>
@@ -11325,7 +11323,7 @@
                 </a:tc>
                 <a:extLst>
                   <a:ext uri="{0D108BD9-81ED-4DB2-BD59-A6C34878D82A}">
-                    <a16:rowId xmlns="" xmlns:a16="http://schemas.microsoft.com/office/drawing/2014/main" val="10003"/>
+                    <a16:rowId xmlns:a16="http://schemas.microsoft.com/office/drawing/2014/main" xmlns="" val="10003"/>
                   </a:ext>
                 </a:extLst>
               </a:tr>

</xml_diff>

<commit_message>
Update title slide for SQL Saturday 600.
</commit_message>
<xml_diff>
--- a/TransactionLog.pptx
+++ b/TransactionLog.pptx
@@ -5024,8 +5024,20 @@
               <a:buNone/>
             </a:pPr>
             <a:r>
-              <a:rPr lang="en-US" dirty="0"/>
-              <a:t>Nashville, TN – January 14, 2017</a:t>
+              <a:rPr lang="en-US" dirty="0" smtClean="0"/>
+              <a:t>Chicago, IL </a:t>
+            </a:r>
+            <a:r>
+              <a:rPr lang="en-US"/>
+              <a:t>– </a:t>
+            </a:r>
+            <a:r>
+              <a:rPr lang="en-US" smtClean="0"/>
+              <a:t>March 11, </a:t>
+            </a:r>
+            <a:r>
+              <a:rPr lang="en-US" dirty="0"/>
+              <a:t>2017</a:t>
             </a:r>
           </a:p>
         </p:txBody>
@@ -7685,21 +7697,21 @@
                 <a:gridCol w="1895475">
                   <a:extLst>
                     <a:ext uri="{9D8B030D-6E8A-4147-A177-3AD203B41FA5}">
-                      <a16:colId xmlns:a16="http://schemas.microsoft.com/office/drawing/2014/main" xmlns="" val="20000"/>
+                      <a16:colId xmlns="" xmlns:a16="http://schemas.microsoft.com/office/drawing/2014/main" val="20000"/>
                     </a:ext>
                   </a:extLst>
                 </a:gridCol>
                 <a:gridCol w="3171825">
                   <a:extLst>
                     <a:ext uri="{9D8B030D-6E8A-4147-A177-3AD203B41FA5}">
-                      <a16:colId xmlns:a16="http://schemas.microsoft.com/office/drawing/2014/main" xmlns="" val="20001"/>
+                      <a16:colId xmlns="" xmlns:a16="http://schemas.microsoft.com/office/drawing/2014/main" val="20001"/>
                     </a:ext>
                   </a:extLst>
                 </a:gridCol>
                 <a:gridCol w="3162300">
                   <a:extLst>
                     <a:ext uri="{9D8B030D-6E8A-4147-A177-3AD203B41FA5}">
-                      <a16:colId xmlns:a16="http://schemas.microsoft.com/office/drawing/2014/main" xmlns="" val="20002"/>
+                      <a16:colId xmlns="" xmlns:a16="http://schemas.microsoft.com/office/drawing/2014/main" val="20002"/>
                     </a:ext>
                   </a:extLst>
                 </a:gridCol>
@@ -7746,7 +7758,7 @@
                 </a:tc>
                 <a:extLst>
                   <a:ext uri="{0D108BD9-81ED-4DB2-BD59-A6C34878D82A}">
-                    <a16:rowId xmlns:a16="http://schemas.microsoft.com/office/drawing/2014/main" xmlns="" val="10000"/>
+                    <a16:rowId xmlns="" xmlns:a16="http://schemas.microsoft.com/office/drawing/2014/main" val="10000"/>
                   </a:ext>
                 </a:extLst>
               </a:tr>
@@ -7809,7 +7821,7 @@
                 </a:tc>
                 <a:extLst>
                   <a:ext uri="{0D108BD9-81ED-4DB2-BD59-A6C34878D82A}">
-                    <a16:rowId xmlns:a16="http://schemas.microsoft.com/office/drawing/2014/main" xmlns="" val="10001"/>
+                    <a16:rowId xmlns="" xmlns:a16="http://schemas.microsoft.com/office/drawing/2014/main" val="10001"/>
                   </a:ext>
                 </a:extLst>
               </a:tr>
@@ -7880,7 +7892,7 @@
                 </a:tc>
                 <a:extLst>
                   <a:ext uri="{0D108BD9-81ED-4DB2-BD59-A6C34878D82A}">
-                    <a16:rowId xmlns:a16="http://schemas.microsoft.com/office/drawing/2014/main" xmlns="" val="10002"/>
+                    <a16:rowId xmlns="" xmlns:a16="http://schemas.microsoft.com/office/drawing/2014/main" val="10002"/>
                   </a:ext>
                 </a:extLst>
               </a:tr>
@@ -7926,7 +7938,7 @@
                 </a:tc>
                 <a:extLst>
                   <a:ext uri="{0D108BD9-81ED-4DB2-BD59-A6C34878D82A}">
-                    <a16:rowId xmlns:a16="http://schemas.microsoft.com/office/drawing/2014/main" xmlns="" val="10003"/>
+                    <a16:rowId xmlns="" xmlns:a16="http://schemas.microsoft.com/office/drawing/2014/main" val="10003"/>
                   </a:ext>
                 </a:extLst>
               </a:tr>
@@ -7977,7 +7989,7 @@
                 </a:tc>
                 <a:extLst>
                   <a:ext uri="{0D108BD9-81ED-4DB2-BD59-A6C34878D82A}">
-                    <a16:rowId xmlns:a16="http://schemas.microsoft.com/office/drawing/2014/main" xmlns="" val="3543017676"/>
+                    <a16:rowId xmlns="" xmlns:a16="http://schemas.microsoft.com/office/drawing/2014/main" val="3543017676"/>
                   </a:ext>
                 </a:extLst>
               </a:tr>
@@ -11160,14 +11172,14 @@
                 <a:gridCol w="3048000">
                   <a:extLst>
                     <a:ext uri="{9D8B030D-6E8A-4147-A177-3AD203B41FA5}">
-                      <a16:colId xmlns:a16="http://schemas.microsoft.com/office/drawing/2014/main" xmlns="" val="20000"/>
+                      <a16:colId xmlns="" xmlns:a16="http://schemas.microsoft.com/office/drawing/2014/main" val="20000"/>
                     </a:ext>
                   </a:extLst>
                 </a:gridCol>
                 <a:gridCol w="3048000">
                   <a:extLst>
                     <a:ext uri="{9D8B030D-6E8A-4147-A177-3AD203B41FA5}">
-                      <a16:colId xmlns:a16="http://schemas.microsoft.com/office/drawing/2014/main" xmlns="" val="20001"/>
+                      <a16:colId xmlns="" xmlns:a16="http://schemas.microsoft.com/office/drawing/2014/main" val="20001"/>
                     </a:ext>
                   </a:extLst>
                 </a:gridCol>
@@ -11213,7 +11225,7 @@
                 </a:tc>
                 <a:extLst>
                   <a:ext uri="{0D108BD9-81ED-4DB2-BD59-A6C34878D82A}">
-                    <a16:rowId xmlns:a16="http://schemas.microsoft.com/office/drawing/2014/main" xmlns="" val="10000"/>
+                    <a16:rowId xmlns="" xmlns:a16="http://schemas.microsoft.com/office/drawing/2014/main" val="10000"/>
                   </a:ext>
                 </a:extLst>
               </a:tr>
@@ -11248,7 +11260,7 @@
                 </a:tc>
                 <a:extLst>
                   <a:ext uri="{0D108BD9-81ED-4DB2-BD59-A6C34878D82A}">
-                    <a16:rowId xmlns:a16="http://schemas.microsoft.com/office/drawing/2014/main" xmlns="" val="10001"/>
+                    <a16:rowId xmlns="" xmlns:a16="http://schemas.microsoft.com/office/drawing/2014/main" val="10001"/>
                   </a:ext>
                 </a:extLst>
               </a:tr>
@@ -11283,7 +11295,7 @@
                 </a:tc>
                 <a:extLst>
                   <a:ext uri="{0D108BD9-81ED-4DB2-BD59-A6C34878D82A}">
-                    <a16:rowId xmlns:a16="http://schemas.microsoft.com/office/drawing/2014/main" xmlns="" val="10002"/>
+                    <a16:rowId xmlns="" xmlns:a16="http://schemas.microsoft.com/office/drawing/2014/main" val="10002"/>
                   </a:ext>
                 </a:extLst>
               </a:tr>
@@ -11323,7 +11335,7 @@
                 </a:tc>
                 <a:extLst>
                   <a:ext uri="{0D108BD9-81ED-4DB2-BD59-A6C34878D82A}">
-                    <a16:rowId xmlns:a16="http://schemas.microsoft.com/office/drawing/2014/main" xmlns="" val="10003"/>
+                    <a16:rowId xmlns="" xmlns:a16="http://schemas.microsoft.com/office/drawing/2014/main" val="10003"/>
                   </a:ext>
                 </a:extLst>
               </a:tr>

</xml_diff>

<commit_message>
Clarifications on Checkpoint Process slide.
</commit_message>
<xml_diff>
--- a/TransactionLog.pptx
+++ b/TransactionLog.pptx
@@ -256,7 +256,7 @@
           <a:p>
             <a:fld id="{2EDCB34D-5EC2-4739-9693-E425457AC201}" type="datetimeFigureOut">
               <a:rPr lang="en-US" smtClean="0"/>
-              <a:t>02/08/2017</a:t>
+              <a:t>02/22/2017</a:t>
             </a:fld>
             <a:endParaRPr lang="en-US"/>
           </a:p>
@@ -1026,7 +1026,7 @@
             <a:fld id="{5942B21B-2ADA-A040-A652-A7305E1B99FE}" type="datetimeFigureOut">
               <a:rPr lang="en-US" smtClean="0"/>
               <a:pPr/>
-              <a:t>02/08/2017</a:t>
+              <a:t>02/22/2017</a:t>
             </a:fld>
             <a:endParaRPr lang="en-US" dirty="0"/>
           </a:p>
@@ -1216,7 +1216,7 @@
           <a:p>
             <a:fld id="{5942B21B-2ADA-A040-A652-A7305E1B99FE}" type="datetimeFigureOut">
               <a:rPr lang="en-US" smtClean="0"/>
-              <a:t>02/08/2017</a:t>
+              <a:t>02/22/2017</a:t>
             </a:fld>
             <a:endParaRPr lang="en-US"/>
           </a:p>
@@ -1340,7 +1340,7 @@
             <a:fld id="{5942B21B-2ADA-A040-A652-A7305E1B99FE}" type="datetimeFigureOut">
               <a:rPr lang="en-US" smtClean="0"/>
               <a:pPr/>
-              <a:t>02/08/2017</a:t>
+              <a:t>02/22/2017</a:t>
             </a:fld>
             <a:r>
               <a:rPr lang="en-US"/>
@@ -1611,7 +1611,7 @@
             <a:fld id="{5942B21B-2ADA-A040-A652-A7305E1B99FE}" type="datetimeFigureOut">
               <a:rPr lang="en-US" smtClean="0"/>
               <a:pPr/>
-              <a:t>02/08/2017</a:t>
+              <a:t>02/22/2017</a:t>
             </a:fld>
             <a:r>
               <a:rPr lang="en-US" dirty="0"/>
@@ -1881,7 +1881,7 @@
             <a:fld id="{5942B21B-2ADA-A040-A652-A7305E1B99FE}" type="datetimeFigureOut">
               <a:rPr lang="en-US" smtClean="0"/>
               <a:pPr/>
-              <a:t>02/08/2017</a:t>
+              <a:t>02/22/2017</a:t>
             </a:fld>
             <a:r>
               <a:rPr lang="en-US" dirty="0"/>
@@ -2221,7 +2221,7 @@
             <a:fld id="{5942B21B-2ADA-A040-A652-A7305E1B99FE}" type="datetimeFigureOut">
               <a:rPr lang="en-US" smtClean="0"/>
               <a:pPr/>
-              <a:t>02/08/2017</a:t>
+              <a:t>02/22/2017</a:t>
             </a:fld>
             <a:r>
               <a:rPr lang="en-US" dirty="0"/>
@@ -2562,7 +2562,7 @@
             <a:fld id="{5942B21B-2ADA-A040-A652-A7305E1B99FE}" type="datetimeFigureOut">
               <a:rPr lang="en-US" smtClean="0"/>
               <a:pPr/>
-              <a:t>02/08/2017</a:t>
+              <a:t>02/22/2017</a:t>
             </a:fld>
             <a:r>
               <a:rPr lang="en-US" dirty="0"/>
@@ -3077,7 +3077,7 @@
             <a:fld id="{5942B21B-2ADA-A040-A652-A7305E1B99FE}" type="datetimeFigureOut">
               <a:rPr lang="en-US" smtClean="0"/>
               <a:pPr/>
-              <a:t>02/08/2017</a:t>
+              <a:t>02/22/2017</a:t>
             </a:fld>
             <a:r>
               <a:rPr lang="en-US" dirty="0"/>
@@ -3286,7 +3286,7 @@
             <a:fld id="{5942B21B-2ADA-A040-A652-A7305E1B99FE}" type="datetimeFigureOut">
               <a:rPr lang="en-US" smtClean="0"/>
               <a:pPr/>
-              <a:t>02/08/2017</a:t>
+              <a:t>02/22/2017</a:t>
             </a:fld>
             <a:r>
               <a:rPr lang="en-US" dirty="0"/>
@@ -3473,7 +3473,7 @@
             <a:fld id="{5942B21B-2ADA-A040-A652-A7305E1B99FE}" type="datetimeFigureOut">
               <a:rPr lang="en-US" smtClean="0"/>
               <a:pPr/>
-              <a:t>02/08/2017</a:t>
+              <a:t>02/22/2017</a:t>
             </a:fld>
             <a:r>
               <a:rPr lang="en-US" dirty="0"/>
@@ -3804,7 +3804,7 @@
             <a:fld id="{5942B21B-2ADA-A040-A652-A7305E1B99FE}" type="datetimeFigureOut">
               <a:rPr lang="en-US" smtClean="0"/>
               <a:pPr/>
-              <a:t>02/08/2017</a:t>
+              <a:t>02/22/2017</a:t>
             </a:fld>
             <a:r>
               <a:rPr lang="en-US" dirty="0"/>
@@ -4112,7 +4112,7 @@
             <a:fld id="{5942B21B-2ADA-A040-A652-A7305E1B99FE}" type="datetimeFigureOut">
               <a:rPr lang="en-US" smtClean="0"/>
               <a:pPr/>
-              <a:t>02/08/2017</a:t>
+              <a:t>02/22/2017</a:t>
             </a:fld>
             <a:r>
               <a:rPr lang="en-US" dirty="0"/>
@@ -4391,7 +4391,7 @@
             <a:fld id="{5942B21B-2ADA-A040-A652-A7305E1B99FE}" type="datetimeFigureOut">
               <a:rPr lang="en-US" smtClean="0"/>
               <a:pPr/>
-              <a:t>02/08/2017</a:t>
+              <a:t>02/22/2017</a:t>
             </a:fld>
             <a:r>
               <a:rPr lang="en-US" dirty="0"/>
@@ -7697,21 +7697,21 @@
                 <a:gridCol w="1895475">
                   <a:extLst>
                     <a:ext uri="{9D8B030D-6E8A-4147-A177-3AD203B41FA5}">
-                      <a16:colId xmlns="" xmlns:a16="http://schemas.microsoft.com/office/drawing/2014/main" val="20000"/>
+                      <a16:colId xmlns:a16="http://schemas.microsoft.com/office/drawing/2014/main" xmlns="" val="20000"/>
                     </a:ext>
                   </a:extLst>
                 </a:gridCol>
                 <a:gridCol w="3171825">
                   <a:extLst>
                     <a:ext uri="{9D8B030D-6E8A-4147-A177-3AD203B41FA5}">
-                      <a16:colId xmlns="" xmlns:a16="http://schemas.microsoft.com/office/drawing/2014/main" val="20001"/>
+                      <a16:colId xmlns:a16="http://schemas.microsoft.com/office/drawing/2014/main" xmlns="" val="20001"/>
                     </a:ext>
                   </a:extLst>
                 </a:gridCol>
                 <a:gridCol w="3162300">
                   <a:extLst>
                     <a:ext uri="{9D8B030D-6E8A-4147-A177-3AD203B41FA5}">
-                      <a16:colId xmlns="" xmlns:a16="http://schemas.microsoft.com/office/drawing/2014/main" val="20002"/>
+                      <a16:colId xmlns:a16="http://schemas.microsoft.com/office/drawing/2014/main" xmlns="" val="20002"/>
                     </a:ext>
                   </a:extLst>
                 </a:gridCol>
@@ -7758,7 +7758,7 @@
                 </a:tc>
                 <a:extLst>
                   <a:ext uri="{0D108BD9-81ED-4DB2-BD59-A6C34878D82A}">
-                    <a16:rowId xmlns="" xmlns:a16="http://schemas.microsoft.com/office/drawing/2014/main" val="10000"/>
+                    <a16:rowId xmlns:a16="http://schemas.microsoft.com/office/drawing/2014/main" xmlns="" val="10000"/>
                   </a:ext>
                 </a:extLst>
               </a:tr>
@@ -7821,7 +7821,7 @@
                 </a:tc>
                 <a:extLst>
                   <a:ext uri="{0D108BD9-81ED-4DB2-BD59-A6C34878D82A}">
-                    <a16:rowId xmlns="" xmlns:a16="http://schemas.microsoft.com/office/drawing/2014/main" val="10001"/>
+                    <a16:rowId xmlns:a16="http://schemas.microsoft.com/office/drawing/2014/main" xmlns="" val="10001"/>
                   </a:ext>
                 </a:extLst>
               </a:tr>
@@ -7892,7 +7892,7 @@
                 </a:tc>
                 <a:extLst>
                   <a:ext uri="{0D108BD9-81ED-4DB2-BD59-A6C34878D82A}">
-                    <a16:rowId xmlns="" xmlns:a16="http://schemas.microsoft.com/office/drawing/2014/main" val="10002"/>
+                    <a16:rowId xmlns:a16="http://schemas.microsoft.com/office/drawing/2014/main" xmlns="" val="10002"/>
                   </a:ext>
                 </a:extLst>
               </a:tr>
@@ -7938,7 +7938,7 @@
                 </a:tc>
                 <a:extLst>
                   <a:ext uri="{0D108BD9-81ED-4DB2-BD59-A6C34878D82A}">
-                    <a16:rowId xmlns="" xmlns:a16="http://schemas.microsoft.com/office/drawing/2014/main" val="10003"/>
+                    <a16:rowId xmlns:a16="http://schemas.microsoft.com/office/drawing/2014/main" xmlns="" val="10003"/>
                   </a:ext>
                 </a:extLst>
               </a:tr>
@@ -7989,7 +7989,7 @@
                 </a:tc>
                 <a:extLst>
                   <a:ext uri="{0D108BD9-81ED-4DB2-BD59-A6C34878D82A}">
-                    <a16:rowId xmlns="" xmlns:a16="http://schemas.microsoft.com/office/drawing/2014/main" val="3543017676"/>
+                    <a16:rowId xmlns:a16="http://schemas.microsoft.com/office/drawing/2014/main" xmlns="" val="3543017676"/>
                   </a:ext>
                 </a:extLst>
               </a:tr>
@@ -9311,9 +9311,35 @@
           <a:lstStyle/>
           <a:p>
             <a:r>
-              <a:rPr lang="en-US" dirty="0"/>
-              <a:t>Write to log (checkpoint start)</a:t>
-            </a:r>
+              <a:rPr lang="en-US" dirty="0">
+                <a:solidFill>
+                  <a:schemeClr val="accent1">
+                    <a:lumMod val="60000"/>
+                    <a:lumOff val="40000"/>
+                  </a:schemeClr>
+                </a:solidFill>
+              </a:rPr>
+              <a:t>Write to </a:t>
+            </a:r>
+            <a:r>
+              <a:rPr lang="en-US" dirty="0" smtClean="0">
+                <a:solidFill>
+                  <a:schemeClr val="accent1">
+                    <a:lumMod val="60000"/>
+                    <a:lumOff val="40000"/>
+                  </a:schemeClr>
+                </a:solidFill>
+              </a:rPr>
+              <a:t>log: checkpoint start</a:t>
+            </a:r>
+            <a:endParaRPr lang="en-US" dirty="0">
+              <a:solidFill>
+                <a:schemeClr val="accent1">
+                  <a:lumMod val="60000"/>
+                  <a:lumOff val="40000"/>
+                </a:schemeClr>
+              </a:solidFill>
+            </a:endParaRPr>
           </a:p>
           <a:p>
             <a:pPr lvl="1"/>
@@ -9323,6 +9349,7 @@
             </a:r>
           </a:p>
           <a:p>
+            <a:pPr lvl="1"/>
             <a:r>
               <a:rPr lang="en-US" dirty="0"/>
               <a:t>Flush the log</a:t>
@@ -9336,21 +9363,85 @@
           </a:p>
           <a:p>
             <a:r>
-              <a:rPr lang="en-US" dirty="0"/>
-              <a:t>Update boot page with log ID corresponding to checkpoint start</a:t>
-            </a:r>
-          </a:p>
-          <a:p>
-            <a:r>
-              <a:rPr lang="en-US" dirty="0"/>
-              <a:t>Clear the log (SIMPLE recovery)</a:t>
-            </a:r>
-          </a:p>
-          <a:p>
-            <a:r>
-              <a:rPr lang="en-US" dirty="0"/>
-              <a:t>Write to log (checkpoint finish)</a:t>
-            </a:r>
+              <a:rPr lang="en-US" dirty="0">
+                <a:solidFill>
+                  <a:schemeClr val="accent1">
+                    <a:lumMod val="60000"/>
+                    <a:lumOff val="40000"/>
+                  </a:schemeClr>
+                </a:solidFill>
+              </a:rPr>
+              <a:t>Update boot page with </a:t>
+            </a:r>
+            <a:r>
+              <a:rPr lang="en-US" dirty="0" smtClean="0">
+                <a:solidFill>
+                  <a:schemeClr val="accent1">
+                    <a:lumMod val="60000"/>
+                    <a:lumOff val="40000"/>
+                  </a:schemeClr>
+                </a:solidFill>
+              </a:rPr>
+              <a:t>LSN </a:t>
+            </a:r>
+            <a:r>
+              <a:rPr lang="en-US" dirty="0">
+                <a:solidFill>
+                  <a:schemeClr val="accent1">
+                    <a:lumMod val="60000"/>
+                    <a:lumOff val="40000"/>
+                  </a:schemeClr>
+                </a:solidFill>
+              </a:rPr>
+              <a:t>corresponding to checkpoint start</a:t>
+            </a:r>
+          </a:p>
+          <a:p>
+            <a:r>
+              <a:rPr lang="en-US" dirty="0" smtClean="0"/>
+              <a:t>(If SIMPLE </a:t>
+            </a:r>
+            <a:r>
+              <a:rPr lang="en-US" dirty="0"/>
+              <a:t>recovery</a:t>
+            </a:r>
+            <a:r>
+              <a:rPr lang="en-US" dirty="0" smtClean="0"/>
+              <a:t>) clear the log</a:t>
+            </a:r>
+            <a:endParaRPr lang="en-US" dirty="0"/>
+          </a:p>
+          <a:p>
+            <a:r>
+              <a:rPr lang="en-US" dirty="0">
+                <a:solidFill>
+                  <a:schemeClr val="accent1">
+                    <a:lumMod val="60000"/>
+                    <a:lumOff val="40000"/>
+                  </a:schemeClr>
+                </a:solidFill>
+              </a:rPr>
+              <a:t>Write to </a:t>
+            </a:r>
+            <a:r>
+              <a:rPr lang="en-US" dirty="0" smtClean="0">
+                <a:solidFill>
+                  <a:schemeClr val="accent1">
+                    <a:lumMod val="60000"/>
+                    <a:lumOff val="40000"/>
+                  </a:schemeClr>
+                </a:solidFill>
+              </a:rPr>
+              <a:t>log: checkpoint finish</a:t>
+            </a:r>
+            <a:endParaRPr lang="en-US" dirty="0">
+              <a:solidFill>
+                <a:schemeClr val="accent1">
+                  <a:lumMod val="60000"/>
+                  <a:lumOff val="40000"/>
+                </a:schemeClr>
+              </a:solidFill>
+            </a:endParaRPr>
           </a:p>
         </p:txBody>
       </p:sp>
@@ -11172,14 +11263,14 @@
                 <a:gridCol w="3048000">
                   <a:extLst>
                     <a:ext uri="{9D8B030D-6E8A-4147-A177-3AD203B41FA5}">
-                      <a16:colId xmlns="" xmlns:a16="http://schemas.microsoft.com/office/drawing/2014/main" val="20000"/>
+                      <a16:colId xmlns:a16="http://schemas.microsoft.com/office/drawing/2014/main" xmlns="" val="20000"/>
                     </a:ext>
                   </a:extLst>
                 </a:gridCol>
                 <a:gridCol w="3048000">
                   <a:extLst>
                     <a:ext uri="{9D8B030D-6E8A-4147-A177-3AD203B41FA5}">
-                      <a16:colId xmlns="" xmlns:a16="http://schemas.microsoft.com/office/drawing/2014/main" val="20001"/>
+                      <a16:colId xmlns:a16="http://schemas.microsoft.com/office/drawing/2014/main" xmlns="" val="20001"/>
                     </a:ext>
                   </a:extLst>
                 </a:gridCol>
@@ -11225,7 +11316,7 @@
                 </a:tc>
                 <a:extLst>
                   <a:ext uri="{0D108BD9-81ED-4DB2-BD59-A6C34878D82A}">
-                    <a16:rowId xmlns="" xmlns:a16="http://schemas.microsoft.com/office/drawing/2014/main" val="10000"/>
+                    <a16:rowId xmlns:a16="http://schemas.microsoft.com/office/drawing/2014/main" xmlns="" val="10000"/>
                   </a:ext>
                 </a:extLst>
               </a:tr>
@@ -11260,7 +11351,7 @@
                 </a:tc>
                 <a:extLst>
                   <a:ext uri="{0D108BD9-81ED-4DB2-BD59-A6C34878D82A}">
-                    <a16:rowId xmlns="" xmlns:a16="http://schemas.microsoft.com/office/drawing/2014/main" val="10001"/>
+                    <a16:rowId xmlns:a16="http://schemas.microsoft.com/office/drawing/2014/main" xmlns="" val="10001"/>
                   </a:ext>
                 </a:extLst>
               </a:tr>
@@ -11295,7 +11386,7 @@
                 </a:tc>
                 <a:extLst>
                   <a:ext uri="{0D108BD9-81ED-4DB2-BD59-A6C34878D82A}">
-                    <a16:rowId xmlns="" xmlns:a16="http://schemas.microsoft.com/office/drawing/2014/main" val="10002"/>
+                    <a16:rowId xmlns:a16="http://schemas.microsoft.com/office/drawing/2014/main" xmlns="" val="10002"/>
                   </a:ext>
                 </a:extLst>
               </a:tr>
@@ -11335,7 +11426,7 @@
                 </a:tc>
                 <a:extLst>
                   <a:ext uri="{0D108BD9-81ED-4DB2-BD59-A6C34878D82A}">
-                    <a16:rowId xmlns="" xmlns:a16="http://schemas.microsoft.com/office/drawing/2014/main" val="10003"/>
+                    <a16:rowId xmlns:a16="http://schemas.microsoft.com/office/drawing/2014/main" xmlns="" val="10003"/>
                   </a:ext>
                 </a:extLst>
               </a:tr>

</xml_diff>

<commit_message>
Split up recovery models slide.
</commit_message>
<xml_diff>
--- a/TransactionLog.pptx
+++ b/TransactionLog.pptx
@@ -5,7 +5,7 @@
     <p:sldMasterId id="2147483648" r:id="rId1"/>
   </p:sldMasterIdLst>
   <p:notesMasterIdLst>
-    <p:notesMasterId r:id="rId51"/>
+    <p:notesMasterId r:id="rId54"/>
   </p:notesMasterIdLst>
   <p:sldIdLst>
     <p:sldId id="328" r:id="rId2"/>
@@ -41,22 +41,25 @@
     <p:sldId id="361" r:id="rId32"/>
     <p:sldId id="353" r:id="rId33"/>
     <p:sldId id="352" r:id="rId34"/>
-    <p:sldId id="355" r:id="rId35"/>
-    <p:sldId id="366" r:id="rId36"/>
-    <p:sldId id="368" r:id="rId37"/>
-    <p:sldId id="369" r:id="rId38"/>
-    <p:sldId id="373" r:id="rId39"/>
-    <p:sldId id="374" r:id="rId40"/>
-    <p:sldId id="375" r:id="rId41"/>
-    <p:sldId id="376" r:id="rId42"/>
-    <p:sldId id="377" r:id="rId43"/>
-    <p:sldId id="372" r:id="rId44"/>
-    <p:sldId id="357" r:id="rId45"/>
-    <p:sldId id="359" r:id="rId46"/>
-    <p:sldId id="365" r:id="rId47"/>
-    <p:sldId id="367" r:id="rId48"/>
-    <p:sldId id="370" r:id="rId49"/>
-    <p:sldId id="371" r:id="rId50"/>
+    <p:sldId id="378" r:id="rId35"/>
+    <p:sldId id="379" r:id="rId36"/>
+    <p:sldId id="380" r:id="rId37"/>
+    <p:sldId id="355" r:id="rId38"/>
+    <p:sldId id="366" r:id="rId39"/>
+    <p:sldId id="368" r:id="rId40"/>
+    <p:sldId id="369" r:id="rId41"/>
+    <p:sldId id="373" r:id="rId42"/>
+    <p:sldId id="374" r:id="rId43"/>
+    <p:sldId id="375" r:id="rId44"/>
+    <p:sldId id="376" r:id="rId45"/>
+    <p:sldId id="377" r:id="rId46"/>
+    <p:sldId id="372" r:id="rId47"/>
+    <p:sldId id="357" r:id="rId48"/>
+    <p:sldId id="359" r:id="rId49"/>
+    <p:sldId id="365" r:id="rId50"/>
+    <p:sldId id="367" r:id="rId51"/>
+    <p:sldId id="370" r:id="rId52"/>
+    <p:sldId id="371" r:id="rId53"/>
   </p:sldIdLst>
   <p:sldSz cx="9144000" cy="6858000" type="screen4x3"/>
   <p:notesSz cx="6858000" cy="9144000"/>
@@ -772,7 +775,7 @@
           <a:p>
             <a:fld id="{ADDBA41D-AE03-4F1C-B074-B56312AFAE46}" type="slidenum">
               <a:rPr lang="en-US" smtClean="0"/>
-              <a:t>34</a:t>
+              <a:t>37</a:t>
             </a:fld>
             <a:endParaRPr lang="en-US"/>
           </a:p>
@@ -9600,8 +9603,13 @@
           <a:p>
             <a:r>
               <a:rPr lang="en-US" dirty="0"/>
-              <a:t>Recovery Models</a:t>
-            </a:r>
+              <a:t>Recovery </a:t>
+            </a:r>
+            <a:r>
+              <a:rPr lang="en-US" dirty="0" smtClean="0"/>
+              <a:t>Models</a:t>
+            </a:r>
+            <a:endParaRPr lang="en-US" dirty="0"/>
           </a:p>
         </p:txBody>
       </p:sp>
@@ -9618,7 +9626,7 @@
         <p:spPr/>
         <p:txBody>
           <a:bodyPr>
-            <a:normAutofit fontScale="92500" lnSpcReduction="10000"/>
+            <a:normAutofit/>
           </a:bodyPr>
           <a:lstStyle/>
           <a:p>
@@ -9630,75 +9638,24 @@
           <a:p>
             <a:pPr lvl="1"/>
             <a:r>
-              <a:rPr lang="en-US" dirty="0"/>
-              <a:t>Simple recovery model</a:t>
-            </a:r>
-          </a:p>
-          <a:p>
-            <a:pPr lvl="2"/>
-            <a:r>
-              <a:rPr lang="en-US" dirty="0"/>
-              <a:t>All changes logged, but can be discarded on commit</a:t>
-            </a:r>
-          </a:p>
-          <a:p>
-            <a:pPr lvl="2"/>
-            <a:r>
-              <a:rPr lang="en-US" dirty="0"/>
-              <a:t>Can only recover to the latest full backup</a:t>
-            </a:r>
+              <a:rPr lang="en-US" dirty="0" smtClean="0"/>
+              <a:t>Simple</a:t>
+            </a:r>
+            <a:endParaRPr lang="en-US" dirty="0"/>
           </a:p>
           <a:p>
             <a:pPr lvl="1"/>
             <a:r>
-              <a:rPr lang="en-US" dirty="0"/>
-              <a:t>Full recovery model</a:t>
-            </a:r>
-          </a:p>
-          <a:p>
-            <a:pPr lvl="2"/>
-            <a:r>
-              <a:rPr lang="en-US" dirty="0"/>
-              <a:t>Log records must be kept until log backup completed</a:t>
-            </a:r>
-          </a:p>
-          <a:p>
-            <a:pPr lvl="2"/>
-            <a:r>
-              <a:rPr lang="en-US" dirty="0"/>
-              <a:t>Can recover to an arbitrary point in time</a:t>
-            </a:r>
+              <a:rPr lang="en-US" dirty="0" smtClean="0"/>
+              <a:t>Full</a:t>
+            </a:r>
+            <a:endParaRPr lang="en-US" dirty="0"/>
           </a:p>
           <a:p>
             <a:pPr lvl="1"/>
             <a:r>
-              <a:rPr lang="en-US" dirty="0"/>
-              <a:t>Bulk-logged recovery model</a:t>
-            </a:r>
-          </a:p>
-          <a:p>
-            <a:pPr lvl="2"/>
-            <a:r>
-              <a:rPr lang="en-US" dirty="0"/>
-              <a:t>Similar to full model, but some changes are only “noted” rather than fully logged</a:t>
-            </a:r>
-          </a:p>
-          <a:p>
-            <a:pPr lvl="2"/>
-            <a:r>
-              <a:rPr lang="en-US" dirty="0"/>
-              <a:t>Log backups still include all changes</a:t>
-            </a:r>
-          </a:p>
-          <a:p>
-            <a:pPr lvl="2"/>
-            <a:r>
-              <a:rPr lang="en-US" dirty="0"/>
-              <a:t>Point-in-time recovery </a:t>
-            </a:r>
-            <a:r>
-              <a:rPr lang="en-US"/>
-              <a:t>not possible</a:t>
+              <a:rPr lang="en-US" dirty="0" smtClean="0"/>
+              <a:t>Bulk-logged</a:t>
             </a:r>
             <a:endParaRPr lang="en-US" dirty="0"/>
           </a:p>
@@ -9750,6 +9707,361 @@
           <a:lstStyle/>
           <a:p>
             <a:r>
+              <a:rPr lang="en-US" dirty="0" smtClean="0"/>
+              <a:t>Simple Recovery </a:t>
+            </a:r>
+            <a:r>
+              <a:rPr lang="en-US" dirty="0" smtClean="0"/>
+              <a:t>Model</a:t>
+            </a:r>
+            <a:endParaRPr lang="en-US" dirty="0"/>
+          </a:p>
+        </p:txBody>
+      </p:sp>
+      <p:sp>
+        <p:nvSpPr>
+          <p:cNvPr id="3" name="Content Placeholder 2"/>
+          <p:cNvSpPr>
+            <a:spLocks noGrp="1"/>
+          </p:cNvSpPr>
+          <p:nvPr>
+            <p:ph idx="1"/>
+          </p:nvPr>
+        </p:nvSpPr>
+        <p:spPr/>
+        <p:txBody>
+          <a:bodyPr>
+            <a:normAutofit/>
+          </a:bodyPr>
+          <a:lstStyle/>
+          <a:p>
+            <a:r>
+              <a:rPr lang="en-US" dirty="0" smtClean="0"/>
+              <a:t>Commonly used for test systems or low-volume production systems</a:t>
+            </a:r>
+          </a:p>
+          <a:p>
+            <a:pPr lvl="1"/>
+            <a:r>
+              <a:rPr lang="en-US" dirty="0" smtClean="0"/>
+              <a:t>What is your recovery point objective?</a:t>
+            </a:r>
+            <a:endParaRPr lang="en-US" dirty="0" smtClean="0"/>
+          </a:p>
+          <a:p>
+            <a:r>
+              <a:rPr lang="en-US" dirty="0" smtClean="0"/>
+              <a:t>All </a:t>
+            </a:r>
+            <a:r>
+              <a:rPr lang="en-US" dirty="0"/>
+              <a:t>changes logged, but can be </a:t>
+            </a:r>
+            <a:r>
+              <a:rPr lang="en-US" dirty="0" smtClean="0"/>
+              <a:t>“discarded” </a:t>
+            </a:r>
+            <a:r>
+              <a:rPr lang="en-US" dirty="0"/>
+              <a:t>on commit</a:t>
+            </a:r>
+          </a:p>
+          <a:p>
+            <a:r>
+              <a:rPr lang="en-US" dirty="0"/>
+              <a:t>Can only </a:t>
+            </a:r>
+            <a:r>
+              <a:rPr lang="en-US" dirty="0" smtClean="0"/>
+              <a:t>recover </a:t>
+            </a:r>
+            <a:r>
+              <a:rPr lang="en-US" dirty="0"/>
+              <a:t>to the latest full </a:t>
+            </a:r>
+            <a:r>
+              <a:rPr lang="en-US" dirty="0" smtClean="0"/>
+              <a:t>backup</a:t>
+            </a:r>
+            <a:endParaRPr lang="en-US" dirty="0"/>
+          </a:p>
+        </p:txBody>
+      </p:sp>
+    </p:spTree>
+    <p:extLst>
+      <p:ext uri="{BB962C8B-B14F-4D97-AF65-F5344CB8AC3E}">
+        <p14:creationId xmlns:p14="http://schemas.microsoft.com/office/powerpoint/2010/main" val="2301797226"/>
+      </p:ext>
+    </p:extLst>
+  </p:cSld>
+  <p:clrMapOvr>
+    <a:masterClrMapping/>
+  </p:clrMapOvr>
+</p:sld>
+</file>
+
+<file path=ppt/slides/slide35.xml><?xml version="1.0" encoding="utf-8"?>
+<p:sld xmlns:a="http://schemas.openxmlformats.org/drawingml/2006/main" xmlns:r="http://schemas.openxmlformats.org/officeDocument/2006/relationships" xmlns:p="http://schemas.openxmlformats.org/presentationml/2006/main">
+  <p:cSld>
+    <p:spTree>
+      <p:nvGrpSpPr>
+        <p:cNvPr id="1" name=""/>
+        <p:cNvGrpSpPr/>
+        <p:nvPr/>
+      </p:nvGrpSpPr>
+      <p:grpSpPr>
+        <a:xfrm>
+          <a:off x="0" y="0"/>
+          <a:ext cx="0" cy="0"/>
+          <a:chOff x="0" y="0"/>
+          <a:chExt cx="0" cy="0"/>
+        </a:xfrm>
+      </p:grpSpPr>
+      <p:sp>
+        <p:nvSpPr>
+          <p:cNvPr id="2" name="Title 1"/>
+          <p:cNvSpPr>
+            <a:spLocks noGrp="1"/>
+          </p:cNvSpPr>
+          <p:nvPr>
+            <p:ph type="title"/>
+          </p:nvPr>
+        </p:nvSpPr>
+        <p:spPr/>
+        <p:txBody>
+          <a:bodyPr/>
+          <a:lstStyle/>
+          <a:p>
+            <a:r>
+              <a:rPr lang="en-US" dirty="0" smtClean="0"/>
+              <a:t>Full Recovery </a:t>
+            </a:r>
+            <a:r>
+              <a:rPr lang="en-US" dirty="0" smtClean="0"/>
+              <a:t>Model</a:t>
+            </a:r>
+            <a:endParaRPr lang="en-US" dirty="0"/>
+          </a:p>
+        </p:txBody>
+      </p:sp>
+      <p:sp>
+        <p:nvSpPr>
+          <p:cNvPr id="3" name="Content Placeholder 2"/>
+          <p:cNvSpPr>
+            <a:spLocks noGrp="1"/>
+          </p:cNvSpPr>
+          <p:nvPr>
+            <p:ph idx="1"/>
+          </p:nvPr>
+        </p:nvSpPr>
+        <p:spPr/>
+        <p:txBody>
+          <a:bodyPr>
+            <a:normAutofit/>
+          </a:bodyPr>
+          <a:lstStyle/>
+          <a:p>
+            <a:r>
+              <a:rPr lang="en-US" dirty="0" smtClean="0"/>
+              <a:t>Probably the most common recovery model for production systems</a:t>
+            </a:r>
+          </a:p>
+          <a:p>
+            <a:pPr lvl="1"/>
+            <a:r>
+              <a:rPr lang="en-US" dirty="0"/>
+              <a:t>What is your recovery point objective</a:t>
+            </a:r>
+            <a:r>
+              <a:rPr lang="en-US" dirty="0" smtClean="0"/>
+              <a:t>?</a:t>
+            </a:r>
+            <a:endParaRPr lang="en-US" dirty="0" smtClean="0"/>
+          </a:p>
+          <a:p>
+            <a:r>
+              <a:rPr lang="en-US" dirty="0" smtClean="0"/>
+              <a:t>Log </a:t>
+            </a:r>
+            <a:r>
+              <a:rPr lang="en-US" dirty="0"/>
+              <a:t>records must be kept until log backup completed</a:t>
+            </a:r>
+          </a:p>
+          <a:p>
+            <a:r>
+              <a:rPr lang="en-US" dirty="0"/>
+              <a:t>Can recover to an arbitrary point in </a:t>
+            </a:r>
+            <a:r>
+              <a:rPr lang="en-US" dirty="0" smtClean="0"/>
+              <a:t>time</a:t>
+            </a:r>
+            <a:endParaRPr lang="en-US" dirty="0"/>
+          </a:p>
+        </p:txBody>
+      </p:sp>
+    </p:spTree>
+    <p:extLst>
+      <p:ext uri="{BB962C8B-B14F-4D97-AF65-F5344CB8AC3E}">
+        <p14:creationId xmlns:p14="http://schemas.microsoft.com/office/powerpoint/2010/main" val="933691385"/>
+      </p:ext>
+    </p:extLst>
+  </p:cSld>
+  <p:clrMapOvr>
+    <a:masterClrMapping/>
+  </p:clrMapOvr>
+</p:sld>
+</file>
+
+<file path=ppt/slides/slide36.xml><?xml version="1.0" encoding="utf-8"?>
+<p:sld xmlns:a="http://schemas.openxmlformats.org/drawingml/2006/main" xmlns:r="http://schemas.openxmlformats.org/officeDocument/2006/relationships" xmlns:p="http://schemas.openxmlformats.org/presentationml/2006/main">
+  <p:cSld>
+    <p:spTree>
+      <p:nvGrpSpPr>
+        <p:cNvPr id="1" name=""/>
+        <p:cNvGrpSpPr/>
+        <p:nvPr/>
+      </p:nvGrpSpPr>
+      <p:grpSpPr>
+        <a:xfrm>
+          <a:off x="0" y="0"/>
+          <a:ext cx="0" cy="0"/>
+          <a:chOff x="0" y="0"/>
+          <a:chExt cx="0" cy="0"/>
+        </a:xfrm>
+      </p:grpSpPr>
+      <p:sp>
+        <p:nvSpPr>
+          <p:cNvPr id="2" name="Title 1"/>
+          <p:cNvSpPr>
+            <a:spLocks noGrp="1"/>
+          </p:cNvSpPr>
+          <p:nvPr>
+            <p:ph type="title"/>
+          </p:nvPr>
+        </p:nvSpPr>
+        <p:spPr/>
+        <p:txBody>
+          <a:bodyPr/>
+          <a:lstStyle/>
+          <a:p>
+            <a:r>
+              <a:rPr lang="en-US" dirty="0" smtClean="0"/>
+              <a:t>Bulk-logged Recovery </a:t>
+            </a:r>
+            <a:r>
+              <a:rPr lang="en-US" dirty="0" smtClean="0"/>
+              <a:t>Model</a:t>
+            </a:r>
+            <a:endParaRPr lang="en-US" dirty="0"/>
+          </a:p>
+        </p:txBody>
+      </p:sp>
+      <p:sp>
+        <p:nvSpPr>
+          <p:cNvPr id="3" name="Content Placeholder 2"/>
+          <p:cNvSpPr>
+            <a:spLocks noGrp="1"/>
+          </p:cNvSpPr>
+          <p:nvPr>
+            <p:ph idx="1"/>
+          </p:nvPr>
+        </p:nvSpPr>
+        <p:spPr/>
+        <p:txBody>
+          <a:bodyPr>
+            <a:normAutofit/>
+          </a:bodyPr>
+          <a:lstStyle/>
+          <a:p>
+            <a:r>
+              <a:rPr lang="en-US" dirty="0" smtClean="0"/>
+              <a:t>Not frequently used, perhaps temporarily during maintenance windows</a:t>
+            </a:r>
+          </a:p>
+          <a:p>
+            <a:pPr lvl="1"/>
+            <a:r>
+              <a:rPr lang="en-US" dirty="0"/>
+              <a:t>What is your recovery point objective</a:t>
+            </a:r>
+            <a:r>
+              <a:rPr lang="en-US" dirty="0" smtClean="0"/>
+              <a:t>?</a:t>
+            </a:r>
+            <a:endParaRPr lang="en-US" dirty="0" smtClean="0"/>
+          </a:p>
+          <a:p>
+            <a:r>
+              <a:rPr lang="en-US" dirty="0" smtClean="0"/>
+              <a:t>Similar </a:t>
+            </a:r>
+            <a:r>
+              <a:rPr lang="en-US" dirty="0"/>
+              <a:t>to full model, but some changes are only “noted” rather than fully logged</a:t>
+            </a:r>
+          </a:p>
+          <a:p>
+            <a:r>
+              <a:rPr lang="en-US" dirty="0"/>
+              <a:t>Log backups still include all changes</a:t>
+            </a:r>
+          </a:p>
+          <a:p>
+            <a:r>
+              <a:rPr lang="en-US" dirty="0"/>
+              <a:t>Point-in-time recovery not possible</a:t>
+            </a:r>
+          </a:p>
+        </p:txBody>
+      </p:sp>
+    </p:spTree>
+    <p:extLst>
+      <p:ext uri="{BB962C8B-B14F-4D97-AF65-F5344CB8AC3E}">
+        <p14:creationId xmlns:p14="http://schemas.microsoft.com/office/powerpoint/2010/main" val="3984488222"/>
+      </p:ext>
+    </p:extLst>
+  </p:cSld>
+  <p:clrMapOvr>
+    <a:masterClrMapping/>
+  </p:clrMapOvr>
+</p:sld>
+</file>
+
+<file path=ppt/slides/slide37.xml><?xml version="1.0" encoding="utf-8"?>
+<p:sld xmlns:a="http://schemas.openxmlformats.org/drawingml/2006/main" xmlns:r="http://schemas.openxmlformats.org/officeDocument/2006/relationships" xmlns:p="http://schemas.openxmlformats.org/presentationml/2006/main">
+  <p:cSld>
+    <p:spTree>
+      <p:nvGrpSpPr>
+        <p:cNvPr id="1" name=""/>
+        <p:cNvGrpSpPr/>
+        <p:nvPr/>
+      </p:nvGrpSpPr>
+      <p:grpSpPr>
+        <a:xfrm>
+          <a:off x="0" y="0"/>
+          <a:ext cx="0" cy="0"/>
+          <a:chOff x="0" y="0"/>
+          <a:chExt cx="0" cy="0"/>
+        </a:xfrm>
+      </p:grpSpPr>
+      <p:sp>
+        <p:nvSpPr>
+          <p:cNvPr id="2" name="Title 1"/>
+          <p:cNvSpPr>
+            <a:spLocks noGrp="1"/>
+          </p:cNvSpPr>
+          <p:nvPr>
+            <p:ph type="title"/>
+          </p:nvPr>
+        </p:nvSpPr>
+        <p:spPr/>
+        <p:txBody>
+          <a:bodyPr/>
+          <a:lstStyle/>
+          <a:p>
+            <a:r>
               <a:rPr lang="en-US" dirty="0"/>
               <a:t>Clearing the Log</a:t>
             </a:r>
@@ -10047,7 +10359,7 @@
 </p:sld>
 </file>
 
-<file path=ppt/slides/slide35.xml><?xml version="1.0" encoding="utf-8"?>
+<file path=ppt/slides/slide38.xml><?xml version="1.0" encoding="utf-8"?>
 <p:sld xmlns:a="http://schemas.openxmlformats.org/drawingml/2006/main" xmlns:r="http://schemas.openxmlformats.org/officeDocument/2006/relationships" xmlns:p="http://schemas.openxmlformats.org/presentationml/2006/main">
   <p:cSld>
     <p:spTree>
@@ -10163,7 +10475,7 @@
 </p:sld>
 </file>
 
-<file path=ppt/slides/slide36.xml><?xml version="1.0" encoding="utf-8"?>
+<file path=ppt/slides/slide39.xml><?xml version="1.0" encoding="utf-8"?>
 <p:sld xmlns:a="http://schemas.openxmlformats.org/drawingml/2006/main" xmlns:r="http://schemas.openxmlformats.org/officeDocument/2006/relationships" xmlns:p="http://schemas.openxmlformats.org/presentationml/2006/main">
   <p:cSld>
     <p:spTree>
@@ -10283,7 +10595,152 @@
 </p:sld>
 </file>
 
-<file path=ppt/slides/slide37.xml><?xml version="1.0" encoding="utf-8"?>
+<file path=ppt/slides/slide4.xml><?xml version="1.0" encoding="utf-8"?>
+<p:sld xmlns:a="http://schemas.openxmlformats.org/drawingml/2006/main" xmlns:r="http://schemas.openxmlformats.org/officeDocument/2006/relationships" xmlns:p="http://schemas.openxmlformats.org/presentationml/2006/main">
+  <p:cSld>
+    <p:spTree>
+      <p:nvGrpSpPr>
+        <p:cNvPr id="1" name=""/>
+        <p:cNvGrpSpPr/>
+        <p:nvPr/>
+      </p:nvGrpSpPr>
+      <p:grpSpPr>
+        <a:xfrm>
+          <a:off x="0" y="0"/>
+          <a:ext cx="0" cy="0"/>
+          <a:chOff x="0" y="0"/>
+          <a:chExt cx="0" cy="0"/>
+        </a:xfrm>
+      </p:grpSpPr>
+      <p:sp>
+        <p:nvSpPr>
+          <p:cNvPr id="2" name="Title 1"/>
+          <p:cNvSpPr>
+            <a:spLocks noGrp="1"/>
+          </p:cNvSpPr>
+          <p:nvPr>
+            <p:ph type="title"/>
+          </p:nvPr>
+        </p:nvSpPr>
+        <p:spPr/>
+        <p:txBody>
+          <a:bodyPr/>
+          <a:lstStyle/>
+          <a:p>
+            <a:r>
+              <a:rPr lang="en-US" dirty="0"/>
+              <a:t>Purpose of the Transaction Log</a:t>
+            </a:r>
+          </a:p>
+        </p:txBody>
+      </p:sp>
+      <p:sp>
+        <p:nvSpPr>
+          <p:cNvPr id="3" name="Content Placeholder 2"/>
+          <p:cNvSpPr>
+            <a:spLocks noGrp="1"/>
+          </p:cNvSpPr>
+          <p:nvPr>
+            <p:ph idx="1"/>
+          </p:nvPr>
+        </p:nvSpPr>
+        <p:spPr/>
+        <p:txBody>
+          <a:bodyPr>
+            <a:normAutofit fontScale="92500" lnSpcReduction="10000"/>
+          </a:bodyPr>
+          <a:lstStyle/>
+          <a:p>
+            <a:r>
+              <a:rPr lang="en-US" dirty="0"/>
+              <a:t>Primary purposes</a:t>
+            </a:r>
+          </a:p>
+          <a:p>
+            <a:pPr lvl="1"/>
+            <a:r>
+              <a:rPr lang="en-US" dirty="0"/>
+              <a:t>Durability</a:t>
+            </a:r>
+          </a:p>
+          <a:p>
+            <a:pPr lvl="2"/>
+            <a:r>
+              <a:rPr lang="en-US" dirty="0"/>
+              <a:t>Write-ahead logging</a:t>
+            </a:r>
+          </a:p>
+          <a:p>
+            <a:pPr lvl="2"/>
+            <a:r>
+              <a:rPr lang="en-US" dirty="0"/>
+              <a:t>Crash recovery / restore operations</a:t>
+            </a:r>
+          </a:p>
+          <a:p>
+            <a:pPr lvl="1"/>
+            <a:r>
+              <a:rPr lang="en-US" dirty="0"/>
+              <a:t>Atomicity</a:t>
+            </a:r>
+          </a:p>
+          <a:p>
+            <a:pPr lvl="1"/>
+            <a:r>
+              <a:rPr lang="en-US" dirty="0"/>
+              <a:t>Thought experiment</a:t>
+            </a:r>
+          </a:p>
+          <a:p>
+            <a:pPr lvl="2"/>
+            <a:r>
+              <a:rPr lang="en-US" dirty="0"/>
+              <a:t>What would SQL be like without a transaction log?</a:t>
+            </a:r>
+          </a:p>
+          <a:p>
+            <a:r>
+              <a:rPr lang="en-US" dirty="0"/>
+              <a:t>Secondary purposes</a:t>
+            </a:r>
+          </a:p>
+          <a:p>
+            <a:pPr lvl="1"/>
+            <a:r>
+              <a:rPr lang="en-US" dirty="0"/>
+              <a:t>Log reader (replication, CDC)</a:t>
+            </a:r>
+          </a:p>
+          <a:p>
+            <a:pPr lvl="1"/>
+            <a:r>
+              <a:rPr lang="en-US" dirty="0"/>
+              <a:t>Mirroring / Availability Groups / log shipping</a:t>
+            </a:r>
+          </a:p>
+          <a:p>
+            <a:pPr lvl="1"/>
+            <a:r>
+              <a:rPr lang="en-US" dirty="0"/>
+              <a:t>Snapshots</a:t>
+            </a:r>
+          </a:p>
+        </p:txBody>
+      </p:sp>
+    </p:spTree>
+    <p:extLst>
+      <p:ext uri="{BB962C8B-B14F-4D97-AF65-F5344CB8AC3E}">
+        <p14:creationId xmlns:p14="http://schemas.microsoft.com/office/powerpoint/2010/main" val="1146920383"/>
+      </p:ext>
+    </p:extLst>
+  </p:cSld>
+  <p:clrMapOvr>
+    <a:masterClrMapping/>
+  </p:clrMapOvr>
+</p:sld>
+</file>
+
+<file path=ppt/slides/slide40.xml><?xml version="1.0" encoding="utf-8"?>
 <p:sld xmlns:a="http://schemas.openxmlformats.org/drawingml/2006/main" xmlns:r="http://schemas.openxmlformats.org/officeDocument/2006/relationships" xmlns:p="http://schemas.openxmlformats.org/presentationml/2006/main">
   <p:cSld>
     <p:spTree>
@@ -10398,7 +10855,7 @@
 </p:sld>
 </file>
 
-<file path=ppt/slides/slide38.xml><?xml version="1.0" encoding="utf-8"?>
+<file path=ppt/slides/slide41.xml><?xml version="1.0" encoding="utf-8"?>
 <p:sld xmlns:a="http://schemas.openxmlformats.org/drawingml/2006/main" xmlns:r="http://schemas.openxmlformats.org/officeDocument/2006/relationships" xmlns:p="http://schemas.openxmlformats.org/presentationml/2006/main">
   <p:cSld>
     <p:spTree>
@@ -10507,7 +10964,7 @@
 </p:sld>
 </file>
 
-<file path=ppt/slides/slide39.xml><?xml version="1.0" encoding="utf-8"?>
+<file path=ppt/slides/slide42.xml><?xml version="1.0" encoding="utf-8"?>
 <p:sld xmlns:a="http://schemas.openxmlformats.org/drawingml/2006/main" xmlns:r="http://schemas.openxmlformats.org/officeDocument/2006/relationships" xmlns:p="http://schemas.openxmlformats.org/presentationml/2006/main">
   <p:cSld>
     <p:spTree>
@@ -10616,152 +11073,7 @@
 </p:sld>
 </file>
 
-<file path=ppt/slides/slide4.xml><?xml version="1.0" encoding="utf-8"?>
-<p:sld xmlns:a="http://schemas.openxmlformats.org/drawingml/2006/main" xmlns:r="http://schemas.openxmlformats.org/officeDocument/2006/relationships" xmlns:p="http://schemas.openxmlformats.org/presentationml/2006/main">
-  <p:cSld>
-    <p:spTree>
-      <p:nvGrpSpPr>
-        <p:cNvPr id="1" name=""/>
-        <p:cNvGrpSpPr/>
-        <p:nvPr/>
-      </p:nvGrpSpPr>
-      <p:grpSpPr>
-        <a:xfrm>
-          <a:off x="0" y="0"/>
-          <a:ext cx="0" cy="0"/>
-          <a:chOff x="0" y="0"/>
-          <a:chExt cx="0" cy="0"/>
-        </a:xfrm>
-      </p:grpSpPr>
-      <p:sp>
-        <p:nvSpPr>
-          <p:cNvPr id="2" name="Title 1"/>
-          <p:cNvSpPr>
-            <a:spLocks noGrp="1"/>
-          </p:cNvSpPr>
-          <p:nvPr>
-            <p:ph type="title"/>
-          </p:nvPr>
-        </p:nvSpPr>
-        <p:spPr/>
-        <p:txBody>
-          <a:bodyPr/>
-          <a:lstStyle/>
-          <a:p>
-            <a:r>
-              <a:rPr lang="en-US" dirty="0"/>
-              <a:t>Purpose of the Transaction Log</a:t>
-            </a:r>
-          </a:p>
-        </p:txBody>
-      </p:sp>
-      <p:sp>
-        <p:nvSpPr>
-          <p:cNvPr id="3" name="Content Placeholder 2"/>
-          <p:cNvSpPr>
-            <a:spLocks noGrp="1"/>
-          </p:cNvSpPr>
-          <p:nvPr>
-            <p:ph idx="1"/>
-          </p:nvPr>
-        </p:nvSpPr>
-        <p:spPr/>
-        <p:txBody>
-          <a:bodyPr>
-            <a:normAutofit fontScale="92500" lnSpcReduction="10000"/>
-          </a:bodyPr>
-          <a:lstStyle/>
-          <a:p>
-            <a:r>
-              <a:rPr lang="en-US" dirty="0"/>
-              <a:t>Primary purposes</a:t>
-            </a:r>
-          </a:p>
-          <a:p>
-            <a:pPr lvl="1"/>
-            <a:r>
-              <a:rPr lang="en-US" dirty="0"/>
-              <a:t>Durability</a:t>
-            </a:r>
-          </a:p>
-          <a:p>
-            <a:pPr lvl="2"/>
-            <a:r>
-              <a:rPr lang="en-US" dirty="0"/>
-              <a:t>Write-ahead logging</a:t>
-            </a:r>
-          </a:p>
-          <a:p>
-            <a:pPr lvl="2"/>
-            <a:r>
-              <a:rPr lang="en-US" dirty="0"/>
-              <a:t>Crash recovery / restore operations</a:t>
-            </a:r>
-          </a:p>
-          <a:p>
-            <a:pPr lvl="1"/>
-            <a:r>
-              <a:rPr lang="en-US" dirty="0"/>
-              <a:t>Atomicity</a:t>
-            </a:r>
-          </a:p>
-          <a:p>
-            <a:pPr lvl="1"/>
-            <a:r>
-              <a:rPr lang="en-US" dirty="0"/>
-              <a:t>Thought experiment</a:t>
-            </a:r>
-          </a:p>
-          <a:p>
-            <a:pPr lvl="2"/>
-            <a:r>
-              <a:rPr lang="en-US" dirty="0"/>
-              <a:t>What would SQL be like without a transaction log?</a:t>
-            </a:r>
-          </a:p>
-          <a:p>
-            <a:r>
-              <a:rPr lang="en-US" dirty="0"/>
-              <a:t>Secondary purposes</a:t>
-            </a:r>
-          </a:p>
-          <a:p>
-            <a:pPr lvl="1"/>
-            <a:r>
-              <a:rPr lang="en-US" dirty="0"/>
-              <a:t>Log reader (replication, CDC)</a:t>
-            </a:r>
-          </a:p>
-          <a:p>
-            <a:pPr lvl="1"/>
-            <a:r>
-              <a:rPr lang="en-US" dirty="0"/>
-              <a:t>Mirroring / Availability Groups / log shipping</a:t>
-            </a:r>
-          </a:p>
-          <a:p>
-            <a:pPr lvl="1"/>
-            <a:r>
-              <a:rPr lang="en-US" dirty="0"/>
-              <a:t>Snapshots</a:t>
-            </a:r>
-          </a:p>
-        </p:txBody>
-      </p:sp>
-    </p:spTree>
-    <p:extLst>
-      <p:ext uri="{BB962C8B-B14F-4D97-AF65-F5344CB8AC3E}">
-        <p14:creationId xmlns:p14="http://schemas.microsoft.com/office/powerpoint/2010/main" val="1146920383"/>
-      </p:ext>
-    </p:extLst>
-  </p:cSld>
-  <p:clrMapOvr>
-    <a:masterClrMapping/>
-  </p:clrMapOvr>
-</p:sld>
-</file>
-
-<file path=ppt/slides/slide40.xml><?xml version="1.0" encoding="utf-8"?>
+<file path=ppt/slides/slide43.xml><?xml version="1.0" encoding="utf-8"?>
 <p:sld xmlns:a="http://schemas.openxmlformats.org/drawingml/2006/main" xmlns:r="http://schemas.openxmlformats.org/officeDocument/2006/relationships" xmlns:p="http://schemas.openxmlformats.org/presentationml/2006/main">
   <p:cSld>
     <p:spTree>
@@ -10864,7 +11176,7 @@
 </p:sld>
 </file>
 
-<file path=ppt/slides/slide41.xml><?xml version="1.0" encoding="utf-8"?>
+<file path=ppt/slides/slide44.xml><?xml version="1.0" encoding="utf-8"?>
 <p:sld xmlns:a="http://schemas.openxmlformats.org/drawingml/2006/main" xmlns:r="http://schemas.openxmlformats.org/officeDocument/2006/relationships" xmlns:p="http://schemas.openxmlformats.org/presentationml/2006/main">
   <p:cSld>
     <p:spTree>
@@ -10967,7 +11279,7 @@
 </p:sld>
 </file>
 
-<file path=ppt/slides/slide42.xml><?xml version="1.0" encoding="utf-8"?>
+<file path=ppt/slides/slide45.xml><?xml version="1.0" encoding="utf-8"?>
 <p:sld xmlns:a="http://schemas.openxmlformats.org/drawingml/2006/main" xmlns:r="http://schemas.openxmlformats.org/officeDocument/2006/relationships" xmlns:p="http://schemas.openxmlformats.org/presentationml/2006/main">
   <p:cSld>
     <p:spTree>
@@ -11063,7 +11375,7 @@
 </p:sld>
 </file>
 
-<file path=ppt/slides/slide43.xml><?xml version="1.0" encoding="utf-8"?>
+<file path=ppt/slides/slide46.xml><?xml version="1.0" encoding="utf-8"?>
 <p:sld xmlns:a="http://schemas.openxmlformats.org/drawingml/2006/main" xmlns:r="http://schemas.openxmlformats.org/officeDocument/2006/relationships" xmlns:p="http://schemas.openxmlformats.org/presentationml/2006/main">
   <p:cSld>
     <p:spTree>
@@ -11164,7 +11476,7 @@
 </p:sld>
 </file>
 
-<file path=ppt/slides/slide44.xml><?xml version="1.0" encoding="utf-8"?>
+<file path=ppt/slides/slide47.xml><?xml version="1.0" encoding="utf-8"?>
 <p:sld xmlns:a="http://schemas.openxmlformats.org/drawingml/2006/main" xmlns:r="http://schemas.openxmlformats.org/officeDocument/2006/relationships" xmlns:p="http://schemas.openxmlformats.org/presentationml/2006/main">
   <p:cSld>
     <p:spTree>
@@ -11628,7 +11940,7 @@
 </p:sld>
 </file>
 
-<file path=ppt/slides/slide45.xml><?xml version="1.0" encoding="utf-8"?>
+<file path=ppt/slides/slide48.xml><?xml version="1.0" encoding="utf-8"?>
 <p:sld xmlns:a="http://schemas.openxmlformats.org/drawingml/2006/main" xmlns:r="http://schemas.openxmlformats.org/officeDocument/2006/relationships" xmlns:p="http://schemas.openxmlformats.org/presentationml/2006/main">
   <p:cSld>
     <p:spTree>
@@ -11746,7 +12058,7 @@
 </p:sld>
 </file>
 
-<file path=ppt/slides/slide46.xml><?xml version="1.0" encoding="utf-8"?>
+<file path=ppt/slides/slide49.xml><?xml version="1.0" encoding="utf-8"?>
 <p:sld xmlns:a="http://schemas.openxmlformats.org/drawingml/2006/main" xmlns:r="http://schemas.openxmlformats.org/officeDocument/2006/relationships" xmlns:p="http://schemas.openxmlformats.org/presentationml/2006/main">
   <p:cSld>
     <p:spTree>
@@ -11870,7 +12182,137 @@
 </p:sld>
 </file>
 
-<file path=ppt/slides/slide47.xml><?xml version="1.0" encoding="utf-8"?>
+<file path=ppt/slides/slide5.xml><?xml version="1.0" encoding="utf-8"?>
+<p:sld xmlns:a="http://schemas.openxmlformats.org/drawingml/2006/main" xmlns:r="http://schemas.openxmlformats.org/officeDocument/2006/relationships" xmlns:p="http://schemas.openxmlformats.org/presentationml/2006/main">
+  <p:cSld>
+    <p:spTree>
+      <p:nvGrpSpPr>
+        <p:cNvPr id="1" name=""/>
+        <p:cNvGrpSpPr/>
+        <p:nvPr/>
+      </p:nvGrpSpPr>
+      <p:grpSpPr>
+        <a:xfrm>
+          <a:off x="0" y="0"/>
+          <a:ext cx="0" cy="0"/>
+          <a:chOff x="0" y="0"/>
+          <a:chExt cx="0" cy="0"/>
+        </a:xfrm>
+      </p:grpSpPr>
+      <p:sp>
+        <p:nvSpPr>
+          <p:cNvPr id="2" name="Title 1"/>
+          <p:cNvSpPr>
+            <a:spLocks noGrp="1"/>
+          </p:cNvSpPr>
+          <p:nvPr>
+            <p:ph type="title"/>
+          </p:nvPr>
+        </p:nvSpPr>
+        <p:spPr/>
+        <p:txBody>
+          <a:bodyPr/>
+          <a:lstStyle/>
+          <a:p>
+            <a:r>
+              <a:rPr lang="en-US" dirty="0"/>
+              <a:t>What Goes in the Transaction Log?</a:t>
+            </a:r>
+          </a:p>
+        </p:txBody>
+      </p:sp>
+      <p:sp>
+        <p:nvSpPr>
+          <p:cNvPr id="3" name="Content Placeholder 2"/>
+          <p:cNvSpPr>
+            <a:spLocks noGrp="1"/>
+          </p:cNvSpPr>
+          <p:nvPr>
+            <p:ph idx="1"/>
+          </p:nvPr>
+        </p:nvSpPr>
+        <p:spPr/>
+        <p:txBody>
+          <a:bodyPr/>
+          <a:lstStyle/>
+          <a:p>
+            <a:r>
+              <a:rPr lang="en-US" u="sng" dirty="0"/>
+              <a:t>Everything</a:t>
+            </a:r>
+            <a:r>
+              <a:rPr lang="en-US" dirty="0"/>
+              <a:t> that modifies the state </a:t>
+            </a:r>
+            <a:r>
+              <a:rPr lang="en-US" u="sng" dirty="0"/>
+              <a:t>any</a:t>
+            </a:r>
+            <a:r>
+              <a:rPr lang="en-US" dirty="0"/>
+              <a:t> database in SQL</a:t>
+            </a:r>
+          </a:p>
+          <a:p>
+            <a:pPr lvl="1"/>
+            <a:r>
+              <a:rPr lang="en-US" dirty="0"/>
+              <a:t>Includes data to </a:t>
+            </a:r>
+            <a:r>
+              <a:rPr lang="en-US" b="1" dirty="0"/>
+              <a:t>redo</a:t>
+            </a:r>
+            <a:r>
+              <a:rPr lang="en-US" dirty="0"/>
+              <a:t> an operation</a:t>
+            </a:r>
+          </a:p>
+          <a:p>
+            <a:pPr lvl="1"/>
+            <a:r>
+              <a:rPr lang="en-US" dirty="0"/>
+              <a:t>Includes data to </a:t>
+            </a:r>
+            <a:r>
+              <a:rPr lang="en-US" b="1" dirty="0"/>
+              <a:t>undo</a:t>
+            </a:r>
+            <a:r>
+              <a:rPr lang="en-US" dirty="0"/>
+              <a:t> an operation</a:t>
+            </a:r>
+          </a:p>
+          <a:p>
+            <a:r>
+              <a:rPr lang="en-US" sz="2400" dirty="0"/>
+              <a:t>Very limited exceptions for some </a:t>
+            </a:r>
+            <a:r>
+              <a:rPr lang="en-US" sz="2400" dirty="0" err="1"/>
+              <a:t>tempdb</a:t>
+            </a:r>
+            <a:r>
+              <a:rPr lang="en-US" sz="2400" dirty="0"/>
+              <a:t> operations</a:t>
+            </a:r>
+          </a:p>
+        </p:txBody>
+      </p:sp>
+    </p:spTree>
+    <p:extLst>
+      <p:ext uri="{BB962C8B-B14F-4D97-AF65-F5344CB8AC3E}">
+        <p14:creationId xmlns:p14="http://schemas.microsoft.com/office/powerpoint/2010/main" val="1907664427"/>
+      </p:ext>
+    </p:extLst>
+  </p:cSld>
+  <p:clrMapOvr>
+    <a:masterClrMapping/>
+  </p:clrMapOvr>
+</p:sld>
+</file>
+
+<file path=ppt/slides/slide50.xml><?xml version="1.0" encoding="utf-8"?>
 <p:sld xmlns:a="http://schemas.openxmlformats.org/drawingml/2006/main" xmlns:r="http://schemas.openxmlformats.org/officeDocument/2006/relationships" xmlns:p="http://schemas.openxmlformats.org/presentationml/2006/main">
   <p:cSld>
     <p:spTree>
@@ -11971,7 +12413,7 @@
 </p:sld>
 </file>
 
-<file path=ppt/slides/slide48.xml><?xml version="1.0" encoding="utf-8"?>
+<file path=ppt/slides/slide51.xml><?xml version="1.0" encoding="utf-8"?>
 <p:sld xmlns:a="http://schemas.openxmlformats.org/drawingml/2006/main" xmlns:r="http://schemas.openxmlformats.org/officeDocument/2006/relationships" xmlns:p="http://schemas.openxmlformats.org/presentationml/2006/main">
   <p:cSld>
     <p:spTree>
@@ -12203,7 +12645,7 @@
 </p:sld>
 </file>
 
-<file path=ppt/slides/slide49.xml><?xml version="1.0" encoding="utf-8"?>
+<file path=ppt/slides/slide52.xml><?xml version="1.0" encoding="utf-8"?>
 <p:sld xmlns:a="http://schemas.openxmlformats.org/drawingml/2006/main" xmlns:r="http://schemas.openxmlformats.org/officeDocument/2006/relationships" xmlns:p="http://schemas.openxmlformats.org/presentationml/2006/main">
   <p:cSld>
     <p:spTree>
@@ -12342,136 +12784,6 @@
     <p:extLst>
       <p:ext uri="{BB962C8B-B14F-4D97-AF65-F5344CB8AC3E}">
         <p14:creationId xmlns:p14="http://schemas.microsoft.com/office/powerpoint/2010/main" val="340294112"/>
-      </p:ext>
-    </p:extLst>
-  </p:cSld>
-  <p:clrMapOvr>
-    <a:masterClrMapping/>
-  </p:clrMapOvr>
-</p:sld>
-</file>
-
-<file path=ppt/slides/slide5.xml><?xml version="1.0" encoding="utf-8"?>
-<p:sld xmlns:a="http://schemas.openxmlformats.org/drawingml/2006/main" xmlns:r="http://schemas.openxmlformats.org/officeDocument/2006/relationships" xmlns:p="http://schemas.openxmlformats.org/presentationml/2006/main">
-  <p:cSld>
-    <p:spTree>
-      <p:nvGrpSpPr>
-        <p:cNvPr id="1" name=""/>
-        <p:cNvGrpSpPr/>
-        <p:nvPr/>
-      </p:nvGrpSpPr>
-      <p:grpSpPr>
-        <a:xfrm>
-          <a:off x="0" y="0"/>
-          <a:ext cx="0" cy="0"/>
-          <a:chOff x="0" y="0"/>
-          <a:chExt cx="0" cy="0"/>
-        </a:xfrm>
-      </p:grpSpPr>
-      <p:sp>
-        <p:nvSpPr>
-          <p:cNvPr id="2" name="Title 1"/>
-          <p:cNvSpPr>
-            <a:spLocks noGrp="1"/>
-          </p:cNvSpPr>
-          <p:nvPr>
-            <p:ph type="title"/>
-          </p:nvPr>
-        </p:nvSpPr>
-        <p:spPr/>
-        <p:txBody>
-          <a:bodyPr/>
-          <a:lstStyle/>
-          <a:p>
-            <a:r>
-              <a:rPr lang="en-US" dirty="0"/>
-              <a:t>What Goes in the Transaction Log?</a:t>
-            </a:r>
-          </a:p>
-        </p:txBody>
-      </p:sp>
-      <p:sp>
-        <p:nvSpPr>
-          <p:cNvPr id="3" name="Content Placeholder 2"/>
-          <p:cNvSpPr>
-            <a:spLocks noGrp="1"/>
-          </p:cNvSpPr>
-          <p:nvPr>
-            <p:ph idx="1"/>
-          </p:nvPr>
-        </p:nvSpPr>
-        <p:spPr/>
-        <p:txBody>
-          <a:bodyPr/>
-          <a:lstStyle/>
-          <a:p>
-            <a:r>
-              <a:rPr lang="en-US" u="sng" dirty="0"/>
-              <a:t>Everything</a:t>
-            </a:r>
-            <a:r>
-              <a:rPr lang="en-US" dirty="0"/>
-              <a:t> that modifies the state </a:t>
-            </a:r>
-            <a:r>
-              <a:rPr lang="en-US" u="sng" dirty="0"/>
-              <a:t>any</a:t>
-            </a:r>
-            <a:r>
-              <a:rPr lang="en-US" dirty="0"/>
-              <a:t> database in SQL</a:t>
-            </a:r>
-          </a:p>
-          <a:p>
-            <a:pPr lvl="1"/>
-            <a:r>
-              <a:rPr lang="en-US" dirty="0"/>
-              <a:t>Includes data to </a:t>
-            </a:r>
-            <a:r>
-              <a:rPr lang="en-US" b="1" dirty="0"/>
-              <a:t>redo</a:t>
-            </a:r>
-            <a:r>
-              <a:rPr lang="en-US" dirty="0"/>
-              <a:t> an operation</a:t>
-            </a:r>
-          </a:p>
-          <a:p>
-            <a:pPr lvl="1"/>
-            <a:r>
-              <a:rPr lang="en-US" dirty="0"/>
-              <a:t>Includes data to </a:t>
-            </a:r>
-            <a:r>
-              <a:rPr lang="en-US" b="1" dirty="0"/>
-              <a:t>undo</a:t>
-            </a:r>
-            <a:r>
-              <a:rPr lang="en-US" dirty="0"/>
-              <a:t> an operation</a:t>
-            </a:r>
-          </a:p>
-          <a:p>
-            <a:r>
-              <a:rPr lang="en-US" sz="2400" dirty="0"/>
-              <a:t>Very limited exceptions for some </a:t>
-            </a:r>
-            <a:r>
-              <a:rPr lang="en-US" sz="2400" dirty="0" err="1"/>
-              <a:t>tempdb</a:t>
-            </a:r>
-            <a:r>
-              <a:rPr lang="en-US" sz="2400" dirty="0"/>
-              <a:t> operations</a:t>
-            </a:r>
-          </a:p>
-        </p:txBody>
-      </p:sp>
-    </p:spTree>
-    <p:extLst>
-      <p:ext uri="{BB962C8B-B14F-4D97-AF65-F5344CB8AC3E}">
-        <p14:creationId xmlns:p14="http://schemas.microsoft.com/office/powerpoint/2010/main" val="1907664427"/>
       </p:ext>
     </p:extLst>
   </p:cSld>

</xml_diff>

<commit_message>
Clearing aka truncating the log - misnamed.
</commit_message>
<xml_diff>
--- a/TransactionLog.pptx
+++ b/TransactionLog.pptx
@@ -8748,7 +8748,7 @@
           <a:p>
             <a:r>
               <a:rPr lang="en-US" dirty="0"/>
-              <a:t>Related commands/function</a:t>
+              <a:t>Related command/function</a:t>
             </a:r>
           </a:p>
         </p:txBody>
@@ -9247,7 +9247,7 @@
 </file>
 
 <file path=ppt/slides/slide31.xml><?xml version="1.0" encoding="utf-8"?>
-<p:sld xmlns:a="http://schemas.openxmlformats.org/drawingml/2006/main" xmlns:r="http://schemas.openxmlformats.org/officeDocument/2006/relationships" xmlns:p="http://schemas.openxmlformats.org/presentationml/2006/main">
+<p:sld xmlns:a="http://schemas.openxmlformats.org/drawingml/2006/main" xmlns:r="http://schemas.openxmlformats.org/officeDocument/2006/relationships" xmlns:p="http://schemas.openxmlformats.org/presentationml/2006/main" show="0">
   <p:cSld>
     <p:spTree>
       <p:nvGrpSpPr>
@@ -9909,7 +9909,7 @@
           <a:p>
             <a:r>
               <a:rPr lang="en-US" dirty="0"/>
-              <a:t>Clearing the Log</a:t>
+              <a:t>Clearing* the Log (aka Truncating*)</a:t>
             </a:r>
           </a:p>
         </p:txBody>
@@ -9946,7 +9946,7 @@
             <a:pPr lvl="1"/>
             <a:r>
               <a:rPr lang="en-US" dirty="0"/>
-              <a:t>Simple recovery*: Checkpoint</a:t>
+              <a:t>Simple recovery**: Checkpoint</a:t>
             </a:r>
           </a:p>
           <a:p>
@@ -9960,7 +9960,7 @@
             <a:pPr lvl="1"/>
             <a:r>
               <a:rPr lang="en-US" dirty="0"/>
-              <a:t>Change from Full or Bulked Logged to Simple**</a:t>
+              <a:t>Change from Full or Bulked Logged to Simple***</a:t>
             </a:r>
           </a:p>
           <a:p>
@@ -10025,7 +10025,7 @@
         <p:spPr>
           <a:xfrm>
             <a:off x="209550" y="6126163"/>
-            <a:ext cx="6800850" cy="600075"/>
+            <a:ext cx="6800850" cy="731837"/>
           </a:xfrm>
           <a:prstGeom prst="rect">
             <a:avLst/>
@@ -10033,7 +10033,7 @@
         </p:spPr>
         <p:txBody>
           <a:bodyPr vert="horz" lIns="91440" tIns="45720" rIns="91440" bIns="45720" rtlCol="0">
-            <a:normAutofit fontScale="92500" lnSpcReduction="20000"/>
+            <a:normAutofit fontScale="85000" lnSpcReduction="20000"/>
           </a:bodyPr>
           <a:lstStyle>
             <a:lvl1pPr marL="342900" indent="-342900" algn="l" defTabSz="457200" rtl="0" eaLnBrk="1" latinLnBrk="0" hangingPunct="1">
@@ -10178,8 +10178,21 @@
             </a:pPr>
             <a:r>
               <a:rPr lang="en-US" sz="1800" dirty="0"/>
-              <a:t>* More technically, when in “auto-truncate” mode.</a:t>
-            </a:r>
+              <a:t>* Horribly misnamed!  This </a:t>
+            </a:r>
+            <a:r>
+              <a:rPr lang="en-US" sz="1800"/>
+              <a:t>process clears </a:t>
+            </a:r>
+            <a:r>
+              <a:rPr lang="en-US" sz="1800" dirty="0"/>
+              <a:t>nothing and </a:t>
+            </a:r>
+            <a:r>
+              <a:rPr lang="en-US" sz="1800"/>
+              <a:t>truncates nothing.</a:t>
+            </a:r>
+            <a:endParaRPr lang="en-US" sz="1800" dirty="0"/>
           </a:p>
           <a:p>
             <a:pPr marL="57150" indent="0">
@@ -10187,7 +10200,16 @@
             </a:pPr>
             <a:r>
               <a:rPr lang="en-US" sz="1800" dirty="0"/>
-              <a:t>** But this breaks the backup chain!</a:t>
+              <a:t>** More technically, when in “auto-truncate” mode.</a:t>
+            </a:r>
+          </a:p>
+          <a:p>
+            <a:pPr marL="57150" indent="0">
+              <a:buNone/>
+            </a:pPr>
+            <a:r>
+              <a:rPr lang="en-US" sz="1800" dirty="0"/>
+              <a:t>*** But this breaks the backup chain!</a:t>
             </a:r>
           </a:p>
         </p:txBody>

</xml_diff>

<commit_message>
Change title slide date and location.
</commit_message>
<xml_diff>
--- a/TransactionLog.pptx
+++ b/TransactionLog.pptx
@@ -259,7 +259,7 @@
           <a:p>
             <a:fld id="{2EDCB34D-5EC2-4739-9693-E425457AC201}" type="datetimeFigureOut">
               <a:rPr lang="en-US" smtClean="0"/>
-              <a:t>3/14/2017</a:t>
+              <a:t>03/15/2017</a:t>
             </a:fld>
             <a:endParaRPr lang="en-US"/>
           </a:p>
@@ -1029,7 +1029,7 @@
             <a:fld id="{5942B21B-2ADA-A040-A652-A7305E1B99FE}" type="datetimeFigureOut">
               <a:rPr lang="en-US" smtClean="0"/>
               <a:pPr/>
-              <a:t>3/14/2017</a:t>
+              <a:t>03/15/2017</a:t>
             </a:fld>
             <a:endParaRPr lang="en-US" dirty="0"/>
           </a:p>
@@ -1219,7 +1219,7 @@
           <a:p>
             <a:fld id="{5942B21B-2ADA-A040-A652-A7305E1B99FE}" type="datetimeFigureOut">
               <a:rPr lang="en-US" smtClean="0"/>
-              <a:t>3/14/2017</a:t>
+              <a:t>03/15/2017</a:t>
             </a:fld>
             <a:endParaRPr lang="en-US"/>
           </a:p>
@@ -1343,7 +1343,7 @@
             <a:fld id="{5942B21B-2ADA-A040-A652-A7305E1B99FE}" type="datetimeFigureOut">
               <a:rPr lang="en-US" smtClean="0"/>
               <a:pPr/>
-              <a:t>3/14/2017</a:t>
+              <a:t>03/15/2017</a:t>
             </a:fld>
             <a:r>
               <a:rPr lang="en-US"/>
@@ -1614,7 +1614,7 @@
             <a:fld id="{5942B21B-2ADA-A040-A652-A7305E1B99FE}" type="datetimeFigureOut">
               <a:rPr lang="en-US" smtClean="0"/>
               <a:pPr/>
-              <a:t>3/14/2017</a:t>
+              <a:t>03/15/2017</a:t>
             </a:fld>
             <a:r>
               <a:rPr lang="en-US" dirty="0"/>
@@ -1884,7 +1884,7 @@
             <a:fld id="{5942B21B-2ADA-A040-A652-A7305E1B99FE}" type="datetimeFigureOut">
               <a:rPr lang="en-US" smtClean="0"/>
               <a:pPr/>
-              <a:t>3/14/2017</a:t>
+              <a:t>03/15/2017</a:t>
             </a:fld>
             <a:r>
               <a:rPr lang="en-US" dirty="0"/>
@@ -2224,7 +2224,7 @@
             <a:fld id="{5942B21B-2ADA-A040-A652-A7305E1B99FE}" type="datetimeFigureOut">
               <a:rPr lang="en-US" smtClean="0"/>
               <a:pPr/>
-              <a:t>3/14/2017</a:t>
+              <a:t>03/15/2017</a:t>
             </a:fld>
             <a:r>
               <a:rPr lang="en-US" dirty="0"/>
@@ -2565,7 +2565,7 @@
             <a:fld id="{5942B21B-2ADA-A040-A652-A7305E1B99FE}" type="datetimeFigureOut">
               <a:rPr lang="en-US" smtClean="0"/>
               <a:pPr/>
-              <a:t>3/14/2017</a:t>
+              <a:t>03/15/2017</a:t>
             </a:fld>
             <a:r>
               <a:rPr lang="en-US" dirty="0"/>
@@ -3080,7 +3080,7 @@
             <a:fld id="{5942B21B-2ADA-A040-A652-A7305E1B99FE}" type="datetimeFigureOut">
               <a:rPr lang="en-US" smtClean="0"/>
               <a:pPr/>
-              <a:t>3/14/2017</a:t>
+              <a:t>03/15/2017</a:t>
             </a:fld>
             <a:r>
               <a:rPr lang="en-US" dirty="0"/>
@@ -3289,7 +3289,7 @@
             <a:fld id="{5942B21B-2ADA-A040-A652-A7305E1B99FE}" type="datetimeFigureOut">
               <a:rPr lang="en-US" smtClean="0"/>
               <a:pPr/>
-              <a:t>3/14/2017</a:t>
+              <a:t>03/15/2017</a:t>
             </a:fld>
             <a:r>
               <a:rPr lang="en-US" dirty="0"/>
@@ -3476,7 +3476,7 @@
             <a:fld id="{5942B21B-2ADA-A040-A652-A7305E1B99FE}" type="datetimeFigureOut">
               <a:rPr lang="en-US" smtClean="0"/>
               <a:pPr/>
-              <a:t>3/14/2017</a:t>
+              <a:t>03/15/2017</a:t>
             </a:fld>
             <a:r>
               <a:rPr lang="en-US" dirty="0"/>
@@ -3807,7 +3807,7 @@
             <a:fld id="{5942B21B-2ADA-A040-A652-A7305E1B99FE}" type="datetimeFigureOut">
               <a:rPr lang="en-US" smtClean="0"/>
               <a:pPr/>
-              <a:t>3/14/2017</a:t>
+              <a:t>03/15/2017</a:t>
             </a:fld>
             <a:r>
               <a:rPr lang="en-US" dirty="0"/>
@@ -4115,7 +4115,7 @@
             <a:fld id="{5942B21B-2ADA-A040-A652-A7305E1B99FE}" type="datetimeFigureOut">
               <a:rPr lang="en-US" smtClean="0"/>
               <a:pPr/>
-              <a:t>3/14/2017</a:t>
+              <a:t>03/15/2017</a:t>
             </a:fld>
             <a:r>
               <a:rPr lang="en-US" dirty="0"/>
@@ -4394,7 +4394,7 @@
             <a:fld id="{5942B21B-2ADA-A040-A652-A7305E1B99FE}" type="datetimeFigureOut">
               <a:rPr lang="en-US" smtClean="0"/>
               <a:pPr/>
-              <a:t>3/14/2017</a:t>
+              <a:t>03/15/2017</a:t>
             </a:fld>
             <a:r>
               <a:rPr lang="en-US" dirty="0"/>
@@ -4874,7 +4874,7 @@
         </p:spPr>
         <p:txBody>
           <a:bodyPr vert="horz" lIns="91440" tIns="45720" rIns="91440" bIns="45720" rtlCol="0">
-            <a:normAutofit lnSpcReduction="10000"/>
+            <a:normAutofit fontScale="85000" lnSpcReduction="10000"/>
           </a:bodyPr>
           <a:lstStyle>
             <a:lvl1pPr marL="342900" indent="-342900" algn="l" defTabSz="457200" rtl="0" eaLnBrk="1" latinLnBrk="0" hangingPunct="1">
@@ -5027,12 +5027,16 @@
               <a:buNone/>
             </a:pPr>
             <a:r>
-              <a:rPr lang="en-US" dirty="0"/>
-              <a:t>Chicago, IL </a:t>
-            </a:r>
-            <a:r>
-              <a:rPr lang="en-US"/>
-              <a:t>– March 11, </a:t>
+              <a:rPr lang="en-US" dirty="0" smtClean="0"/>
+              <a:t>Colorado Springs, CO </a:t>
+            </a:r>
+            <a:r>
+              <a:rPr lang="en-US" dirty="0"/>
+              <a:t>– March </a:t>
+            </a:r>
+            <a:r>
+              <a:rPr lang="en-US" dirty="0" smtClean="0"/>
+              <a:t>25, </a:t>
             </a:r>
             <a:r>
               <a:rPr lang="en-US" dirty="0"/>
@@ -7687,21 +7691,21 @@
                 <a:gridCol w="1895475">
                   <a:extLst>
                     <a:ext uri="{9D8B030D-6E8A-4147-A177-3AD203B41FA5}">
-                      <a16:colId xmlns:a16="http://schemas.microsoft.com/office/drawing/2014/main" val="20000"/>
+                      <a16:colId xmlns:a16="http://schemas.microsoft.com/office/drawing/2014/main" xmlns="" val="20000"/>
                     </a:ext>
                   </a:extLst>
                 </a:gridCol>
                 <a:gridCol w="3171825">
                   <a:extLst>
                     <a:ext uri="{9D8B030D-6E8A-4147-A177-3AD203B41FA5}">
-                      <a16:colId xmlns:a16="http://schemas.microsoft.com/office/drawing/2014/main" val="20001"/>
+                      <a16:colId xmlns:a16="http://schemas.microsoft.com/office/drawing/2014/main" xmlns="" val="20001"/>
                     </a:ext>
                   </a:extLst>
                 </a:gridCol>
                 <a:gridCol w="3162300">
                   <a:extLst>
                     <a:ext uri="{9D8B030D-6E8A-4147-A177-3AD203B41FA5}">
-                      <a16:colId xmlns:a16="http://schemas.microsoft.com/office/drawing/2014/main" val="20002"/>
+                      <a16:colId xmlns:a16="http://schemas.microsoft.com/office/drawing/2014/main" xmlns="" val="20002"/>
                     </a:ext>
                   </a:extLst>
                 </a:gridCol>
@@ -7748,7 +7752,7 @@
                 </a:tc>
                 <a:extLst>
                   <a:ext uri="{0D108BD9-81ED-4DB2-BD59-A6C34878D82A}">
-                    <a16:rowId xmlns:a16="http://schemas.microsoft.com/office/drawing/2014/main" val="10000"/>
+                    <a16:rowId xmlns:a16="http://schemas.microsoft.com/office/drawing/2014/main" xmlns="" val="10000"/>
                   </a:ext>
                 </a:extLst>
               </a:tr>
@@ -7811,7 +7815,7 @@
                 </a:tc>
                 <a:extLst>
                   <a:ext uri="{0D108BD9-81ED-4DB2-BD59-A6C34878D82A}">
-                    <a16:rowId xmlns:a16="http://schemas.microsoft.com/office/drawing/2014/main" val="10001"/>
+                    <a16:rowId xmlns:a16="http://schemas.microsoft.com/office/drawing/2014/main" xmlns="" val="10001"/>
                   </a:ext>
                 </a:extLst>
               </a:tr>
@@ -7882,7 +7886,7 @@
                 </a:tc>
                 <a:extLst>
                   <a:ext uri="{0D108BD9-81ED-4DB2-BD59-A6C34878D82A}">
-                    <a16:rowId xmlns:a16="http://schemas.microsoft.com/office/drawing/2014/main" val="10002"/>
+                    <a16:rowId xmlns:a16="http://schemas.microsoft.com/office/drawing/2014/main" xmlns="" val="10002"/>
                   </a:ext>
                 </a:extLst>
               </a:tr>
@@ -7928,7 +7932,7 @@
                 </a:tc>
                 <a:extLst>
                   <a:ext uri="{0D108BD9-81ED-4DB2-BD59-A6C34878D82A}">
-                    <a16:rowId xmlns:a16="http://schemas.microsoft.com/office/drawing/2014/main" val="10003"/>
+                    <a16:rowId xmlns:a16="http://schemas.microsoft.com/office/drawing/2014/main" xmlns="" val="10003"/>
                   </a:ext>
                 </a:extLst>
               </a:tr>
@@ -7979,7 +7983,7 @@
                 </a:tc>
                 <a:extLst>
                   <a:ext uri="{0D108BD9-81ED-4DB2-BD59-A6C34878D82A}">
-                    <a16:rowId xmlns:a16="http://schemas.microsoft.com/office/drawing/2014/main" val="3543017676"/>
+                    <a16:rowId xmlns:a16="http://schemas.microsoft.com/office/drawing/2014/main" xmlns="" val="3543017676"/>
                   </a:ext>
                 </a:extLst>
               </a:tr>
@@ -9376,6 +9380,14 @@
   <p:clrMapOvr>
     <a:masterClrMapping/>
   </p:clrMapOvr>
+  <mc:AlternateContent xmlns:mc="http://schemas.openxmlformats.org/markup-compatibility/2006">
+    <mc:Choice xmlns:p14="http://schemas.microsoft.com/office/powerpoint/2010/main" Requires="p14">
+      <p:transition spd="slow" p14:dur="2000"/>
+    </mc:Choice>
+    <mc:Fallback>
+      <p:transition spd="slow"/>
+    </mc:Fallback>
+  </mc:AlternateContent>
 </p:sld>
 </file>
 
@@ -11430,14 +11442,14 @@
                 <a:gridCol w="3048000">
                   <a:extLst>
                     <a:ext uri="{9D8B030D-6E8A-4147-A177-3AD203B41FA5}">
-                      <a16:colId xmlns:a16="http://schemas.microsoft.com/office/drawing/2014/main" val="20000"/>
+                      <a16:colId xmlns:a16="http://schemas.microsoft.com/office/drawing/2014/main" xmlns="" val="20000"/>
                     </a:ext>
                   </a:extLst>
                 </a:gridCol>
                 <a:gridCol w="3048000">
                   <a:extLst>
                     <a:ext uri="{9D8B030D-6E8A-4147-A177-3AD203B41FA5}">
-                      <a16:colId xmlns:a16="http://schemas.microsoft.com/office/drawing/2014/main" val="20001"/>
+                      <a16:colId xmlns:a16="http://schemas.microsoft.com/office/drawing/2014/main" xmlns="" val="20001"/>
                     </a:ext>
                   </a:extLst>
                 </a:gridCol>
@@ -11483,7 +11495,7 @@
                 </a:tc>
                 <a:extLst>
                   <a:ext uri="{0D108BD9-81ED-4DB2-BD59-A6C34878D82A}">
-                    <a16:rowId xmlns:a16="http://schemas.microsoft.com/office/drawing/2014/main" val="10000"/>
+                    <a16:rowId xmlns:a16="http://schemas.microsoft.com/office/drawing/2014/main" xmlns="" val="10000"/>
                   </a:ext>
                 </a:extLst>
               </a:tr>
@@ -11518,7 +11530,7 @@
                 </a:tc>
                 <a:extLst>
                   <a:ext uri="{0D108BD9-81ED-4DB2-BD59-A6C34878D82A}">
-                    <a16:rowId xmlns:a16="http://schemas.microsoft.com/office/drawing/2014/main" val="10001"/>
+                    <a16:rowId xmlns:a16="http://schemas.microsoft.com/office/drawing/2014/main" xmlns="" val="10001"/>
                   </a:ext>
                 </a:extLst>
               </a:tr>
@@ -11553,7 +11565,7 @@
                 </a:tc>
                 <a:extLst>
                   <a:ext uri="{0D108BD9-81ED-4DB2-BD59-A6C34878D82A}">
-                    <a16:rowId xmlns:a16="http://schemas.microsoft.com/office/drawing/2014/main" val="10002"/>
+                    <a16:rowId xmlns:a16="http://schemas.microsoft.com/office/drawing/2014/main" xmlns="" val="10002"/>
                   </a:ext>
                 </a:extLst>
               </a:tr>
@@ -11593,7 +11605,7 @@
                 </a:tc>
                 <a:extLst>
                   <a:ext uri="{0D108BD9-81ED-4DB2-BD59-A6C34878D82A}">
-                    <a16:rowId xmlns:a16="http://schemas.microsoft.com/office/drawing/2014/main" val="10003"/>
+                    <a16:rowId xmlns:a16="http://schemas.microsoft.com/office/drawing/2014/main" xmlns="" val="10003"/>
                   </a:ext>
                 </a:extLst>
               </a:tr>

</xml_diff>

<commit_message>
PerfMon counters to monitor.
</commit_message>
<xml_diff>
--- a/TransactionLog.pptx
+++ b/TransactionLog.pptx
@@ -5,7 +5,7 @@
     <p:sldMasterId id="2147483648" r:id="rId1"/>
   </p:sldMasterIdLst>
   <p:notesMasterIdLst>
-    <p:notesMasterId r:id="rId55"/>
+    <p:notesMasterId r:id="rId56"/>
   </p:notesMasterIdLst>
   <p:sldIdLst>
     <p:sldId id="262" r:id="rId2"/>
@@ -60,7 +60,8 @@
     <p:sldId id="310" r:id="rId51"/>
     <p:sldId id="311" r:id="rId52"/>
     <p:sldId id="312" r:id="rId53"/>
-    <p:sldId id="313" r:id="rId54"/>
+    <p:sldId id="315" r:id="rId54"/>
+    <p:sldId id="313" r:id="rId55"/>
   </p:sldIdLst>
   <p:sldSz cx="9144000" cy="6858000" type="screen4x3"/>
   <p:notesSz cx="7010400" cy="9296400"/>
@@ -260,7 +261,7 @@
           <a:p>
             <a:fld id="{636FE61D-3D09-4319-BAB8-31CF8C26DA82}" type="datetimeFigureOut">
               <a:rPr lang="en-US" smtClean="0"/>
-              <a:t>03/22/2017</a:t>
+              <a:t>03/23/2017</a:t>
             </a:fld>
             <a:endParaRPr lang="en-US"/>
           </a:p>
@@ -7148,21 +7149,21 @@
                 <a:gridCol w="1895475">
                   <a:extLst>
                     <a:ext uri="{9D8B030D-6E8A-4147-A177-3AD203B41FA5}">
-                      <a16:colId xmlns="" xmlns:a16="http://schemas.microsoft.com/office/drawing/2014/main" val="20000"/>
+                      <a16:colId xmlns:a16="http://schemas.microsoft.com/office/drawing/2014/main" xmlns="" val="20000"/>
                     </a:ext>
                   </a:extLst>
                 </a:gridCol>
                 <a:gridCol w="3171825">
                   <a:extLst>
                     <a:ext uri="{9D8B030D-6E8A-4147-A177-3AD203B41FA5}">
-                      <a16:colId xmlns="" xmlns:a16="http://schemas.microsoft.com/office/drawing/2014/main" val="20001"/>
+                      <a16:colId xmlns:a16="http://schemas.microsoft.com/office/drawing/2014/main" xmlns="" val="20001"/>
                     </a:ext>
                   </a:extLst>
                 </a:gridCol>
                 <a:gridCol w="3162300">
                   <a:extLst>
                     <a:ext uri="{9D8B030D-6E8A-4147-A177-3AD203B41FA5}">
-                      <a16:colId xmlns="" xmlns:a16="http://schemas.microsoft.com/office/drawing/2014/main" val="20002"/>
+                      <a16:colId xmlns:a16="http://schemas.microsoft.com/office/drawing/2014/main" xmlns="" val="20002"/>
                     </a:ext>
                   </a:extLst>
                 </a:gridCol>
@@ -7209,7 +7210,7 @@
                 </a:tc>
                 <a:extLst>
                   <a:ext uri="{0D108BD9-81ED-4DB2-BD59-A6C34878D82A}">
-                    <a16:rowId xmlns="" xmlns:a16="http://schemas.microsoft.com/office/drawing/2014/main" val="10000"/>
+                    <a16:rowId xmlns:a16="http://schemas.microsoft.com/office/drawing/2014/main" xmlns="" val="10000"/>
                   </a:ext>
                 </a:extLst>
               </a:tr>
@@ -7272,7 +7273,7 @@
                 </a:tc>
                 <a:extLst>
                   <a:ext uri="{0D108BD9-81ED-4DB2-BD59-A6C34878D82A}">
-                    <a16:rowId xmlns="" xmlns:a16="http://schemas.microsoft.com/office/drawing/2014/main" val="10001"/>
+                    <a16:rowId xmlns:a16="http://schemas.microsoft.com/office/drawing/2014/main" xmlns="" val="10001"/>
                   </a:ext>
                 </a:extLst>
               </a:tr>
@@ -7343,7 +7344,7 @@
                 </a:tc>
                 <a:extLst>
                   <a:ext uri="{0D108BD9-81ED-4DB2-BD59-A6C34878D82A}">
-                    <a16:rowId xmlns="" xmlns:a16="http://schemas.microsoft.com/office/drawing/2014/main" val="10002"/>
+                    <a16:rowId xmlns:a16="http://schemas.microsoft.com/office/drawing/2014/main" xmlns="" val="10002"/>
                   </a:ext>
                 </a:extLst>
               </a:tr>
@@ -7389,7 +7390,7 @@
                 </a:tc>
                 <a:extLst>
                   <a:ext uri="{0D108BD9-81ED-4DB2-BD59-A6C34878D82A}">
-                    <a16:rowId xmlns="" xmlns:a16="http://schemas.microsoft.com/office/drawing/2014/main" val="10003"/>
+                    <a16:rowId xmlns:a16="http://schemas.microsoft.com/office/drawing/2014/main" xmlns="" val="10003"/>
                   </a:ext>
                 </a:extLst>
               </a:tr>
@@ -7440,7 +7441,7 @@
                 </a:tc>
                 <a:extLst>
                   <a:ext uri="{0D108BD9-81ED-4DB2-BD59-A6C34878D82A}">
-                    <a16:rowId xmlns="" xmlns:a16="http://schemas.microsoft.com/office/drawing/2014/main" val="3543017676"/>
+                    <a16:rowId xmlns:a16="http://schemas.microsoft.com/office/drawing/2014/main" xmlns="" val="3543017676"/>
                   </a:ext>
                 </a:extLst>
               </a:tr>
@@ -11764,14 +11765,14 @@
                 <a:gridCol w="3048000">
                   <a:extLst>
                     <a:ext uri="{9D8B030D-6E8A-4147-A177-3AD203B41FA5}">
-                      <a16:colId xmlns="" xmlns:a16="http://schemas.microsoft.com/office/drawing/2014/main" val="20000"/>
+                      <a16:colId xmlns:a16="http://schemas.microsoft.com/office/drawing/2014/main" xmlns="" val="20000"/>
                     </a:ext>
                   </a:extLst>
                 </a:gridCol>
                 <a:gridCol w="3048000">
                   <a:extLst>
                     <a:ext uri="{9D8B030D-6E8A-4147-A177-3AD203B41FA5}">
-                      <a16:colId xmlns="" xmlns:a16="http://schemas.microsoft.com/office/drawing/2014/main" val="20001"/>
+                      <a16:colId xmlns:a16="http://schemas.microsoft.com/office/drawing/2014/main" xmlns="" val="20001"/>
                     </a:ext>
                   </a:extLst>
                 </a:gridCol>
@@ -11817,7 +11818,7 @@
                 </a:tc>
                 <a:extLst>
                   <a:ext uri="{0D108BD9-81ED-4DB2-BD59-A6C34878D82A}">
-                    <a16:rowId xmlns="" xmlns:a16="http://schemas.microsoft.com/office/drawing/2014/main" val="10000"/>
+                    <a16:rowId xmlns:a16="http://schemas.microsoft.com/office/drawing/2014/main" xmlns="" val="10000"/>
                   </a:ext>
                 </a:extLst>
               </a:tr>
@@ -11852,7 +11853,7 @@
                 </a:tc>
                 <a:extLst>
                   <a:ext uri="{0D108BD9-81ED-4DB2-BD59-A6C34878D82A}">
-                    <a16:rowId xmlns="" xmlns:a16="http://schemas.microsoft.com/office/drawing/2014/main" val="10001"/>
+                    <a16:rowId xmlns:a16="http://schemas.microsoft.com/office/drawing/2014/main" xmlns="" val="10001"/>
                   </a:ext>
                 </a:extLst>
               </a:tr>
@@ -11887,7 +11888,7 @@
                 </a:tc>
                 <a:extLst>
                   <a:ext uri="{0D108BD9-81ED-4DB2-BD59-A6C34878D82A}">
-                    <a16:rowId xmlns="" xmlns:a16="http://schemas.microsoft.com/office/drawing/2014/main" val="10002"/>
+                    <a16:rowId xmlns:a16="http://schemas.microsoft.com/office/drawing/2014/main" xmlns="" val="10002"/>
                   </a:ext>
                 </a:extLst>
               </a:tr>
@@ -11927,7 +11928,7 @@
                 </a:tc>
                 <a:extLst>
                   <a:ext uri="{0D108BD9-81ED-4DB2-BD59-A6C34878D82A}">
-                    <a16:rowId xmlns="" xmlns:a16="http://schemas.microsoft.com/office/drawing/2014/main" val="10003"/>
+                    <a16:rowId xmlns:a16="http://schemas.microsoft.com/office/drawing/2014/main" xmlns="" val="10003"/>
                   </a:ext>
                 </a:extLst>
               </a:tr>
@@ -12878,6 +12879,731 @@
           <a:lstStyle/>
           <a:p>
             <a:r>
+              <a:rPr lang="en-US" dirty="0" smtClean="0"/>
+              <a:t>Log Monitoring, continued</a:t>
+            </a:r>
+            <a:endParaRPr lang="en-US" dirty="0"/>
+          </a:p>
+        </p:txBody>
+      </p:sp>
+      <p:sp>
+        <p:nvSpPr>
+          <p:cNvPr id="3" name="Content Placeholder 2"/>
+          <p:cNvSpPr>
+            <a:spLocks noGrp="1"/>
+          </p:cNvSpPr>
+          <p:nvPr>
+            <p:ph idx="1"/>
+          </p:nvPr>
+        </p:nvSpPr>
+        <p:spPr/>
+        <p:txBody>
+          <a:bodyPr>
+            <a:normAutofit lnSpcReduction="10000"/>
+          </a:bodyPr>
+          <a:lstStyle/>
+          <a:p>
+            <a:r>
+              <a:rPr lang="en-US" dirty="0" err="1" smtClean="0"/>
+              <a:t>PerfMon</a:t>
+            </a:r>
+            <a:r>
+              <a:rPr lang="en-US" dirty="0" smtClean="0"/>
+              <a:t> counters</a:t>
+            </a:r>
+          </a:p>
+          <a:p>
+            <a:pPr lvl="1"/>
+            <a:r>
+              <a:rPr lang="en-US" dirty="0" smtClean="0"/>
+              <a:t>One row per counter per database (plus rollup)</a:t>
+            </a:r>
+          </a:p>
+          <a:p>
+            <a:pPr lvl="1"/>
+            <a:r>
+              <a:rPr lang="en-US" dirty="0"/>
+              <a:t>Paul </a:t>
+            </a:r>
+            <a:r>
+              <a:rPr lang="en-US"/>
+              <a:t>Randal </a:t>
+            </a:r>
+            <a:r>
+              <a:rPr lang="en-US" smtClean="0">
+                <a:hlinkClick r:id="rId2"/>
+              </a:rPr>
+              <a:t>explains</a:t>
+            </a:r>
+            <a:r>
+              <a:rPr lang="en-US" smtClean="0"/>
+              <a:t> what </a:t>
+            </a:r>
+            <a:r>
+              <a:rPr lang="en-US" dirty="0"/>
+              <a:t>to look for</a:t>
+            </a:r>
+            <a:r>
+              <a:rPr lang="en-US" dirty="0" smtClean="0"/>
+              <a:t>.</a:t>
+            </a:r>
+          </a:p>
+          <a:p>
+            <a:pPr lvl="1"/>
+            <a:endParaRPr lang="en-US" dirty="0" smtClean="0"/>
+          </a:p>
+          <a:p>
+            <a:pPr marL="0" indent="0">
+              <a:buNone/>
+            </a:pPr>
+            <a:r>
+              <a:rPr lang="en-US" sz="2400" dirty="0">
+                <a:solidFill>
+                  <a:srgbClr val="0000FF"/>
+                </a:solidFill>
+                <a:highlight>
+                  <a:srgbClr val="FFFFFF"/>
+                </a:highlight>
+                <a:latin typeface="Consolas" panose="020B0609020204030204" pitchFamily="49" charset="0"/>
+              </a:rPr>
+              <a:t>select</a:t>
+            </a:r>
+            <a:r>
+              <a:rPr lang="en-US" sz="2400" dirty="0">
+                <a:solidFill>
+                  <a:srgbClr val="000000"/>
+                </a:solidFill>
+                <a:highlight>
+                  <a:srgbClr val="FFFFFF"/>
+                </a:highlight>
+                <a:latin typeface="Consolas" panose="020B0609020204030204" pitchFamily="49" charset="0"/>
+              </a:rPr>
+              <a:t> </a:t>
+            </a:r>
+            <a:r>
+              <a:rPr lang="en-US" sz="2400" dirty="0" err="1">
+                <a:solidFill>
+                  <a:srgbClr val="FF00FF"/>
+                </a:solidFill>
+                <a:highlight>
+                  <a:srgbClr val="FFFFFF"/>
+                </a:highlight>
+                <a:latin typeface="Consolas" panose="020B0609020204030204" pitchFamily="49" charset="0"/>
+              </a:rPr>
+              <a:t>object_name</a:t>
+            </a:r>
+            <a:r>
+              <a:rPr lang="en-US" sz="2400" dirty="0">
+                <a:solidFill>
+                  <a:srgbClr val="808080"/>
+                </a:solidFill>
+                <a:highlight>
+                  <a:srgbClr val="FFFFFF"/>
+                </a:highlight>
+                <a:latin typeface="Consolas" panose="020B0609020204030204" pitchFamily="49" charset="0"/>
+              </a:rPr>
+              <a:t>,</a:t>
+            </a:r>
+            <a:r>
+              <a:rPr lang="en-US" sz="2400" dirty="0">
+                <a:solidFill>
+                  <a:srgbClr val="000000"/>
+                </a:solidFill>
+                <a:highlight>
+                  <a:srgbClr val="FFFFFF"/>
+                </a:highlight>
+                <a:latin typeface="Consolas" panose="020B0609020204030204" pitchFamily="49" charset="0"/>
+              </a:rPr>
+              <a:t> </a:t>
+            </a:r>
+            <a:r>
+              <a:rPr lang="en-US" sz="2400" dirty="0" err="1">
+                <a:solidFill>
+                  <a:srgbClr val="000000"/>
+                </a:solidFill>
+                <a:highlight>
+                  <a:srgbClr val="FFFFFF"/>
+                </a:highlight>
+                <a:latin typeface="Consolas" panose="020B0609020204030204" pitchFamily="49" charset="0"/>
+              </a:rPr>
+              <a:t>counter_name</a:t>
+            </a:r>
+            <a:r>
+              <a:rPr lang="en-US" sz="2400" dirty="0">
+                <a:solidFill>
+                  <a:srgbClr val="808080"/>
+                </a:solidFill>
+                <a:highlight>
+                  <a:srgbClr val="FFFFFF"/>
+                </a:highlight>
+                <a:latin typeface="Consolas" panose="020B0609020204030204" pitchFamily="49" charset="0"/>
+              </a:rPr>
+              <a:t>,</a:t>
+            </a:r>
+            <a:r>
+              <a:rPr lang="en-US" sz="2400" dirty="0">
+                <a:solidFill>
+                  <a:srgbClr val="000000"/>
+                </a:solidFill>
+                <a:highlight>
+                  <a:srgbClr val="FFFFFF"/>
+                </a:highlight>
+                <a:latin typeface="Consolas" panose="020B0609020204030204" pitchFamily="49" charset="0"/>
+              </a:rPr>
+              <a:t> </a:t>
+            </a:r>
+            <a:r>
+              <a:rPr lang="en-US" sz="2400" dirty="0" err="1">
+                <a:solidFill>
+                  <a:srgbClr val="000000"/>
+                </a:solidFill>
+                <a:highlight>
+                  <a:srgbClr val="FFFFFF"/>
+                </a:highlight>
+                <a:latin typeface="Consolas" panose="020B0609020204030204" pitchFamily="49" charset="0"/>
+              </a:rPr>
+              <a:t>instance_name</a:t>
+            </a:r>
+            <a:r>
+              <a:rPr lang="en-US" sz="2400" dirty="0">
+                <a:solidFill>
+                  <a:srgbClr val="808080"/>
+                </a:solidFill>
+                <a:highlight>
+                  <a:srgbClr val="FFFFFF"/>
+                </a:highlight>
+                <a:latin typeface="Consolas" panose="020B0609020204030204" pitchFamily="49" charset="0"/>
+              </a:rPr>
+              <a:t>,</a:t>
+            </a:r>
+            <a:r>
+              <a:rPr lang="en-US" sz="2400" dirty="0">
+                <a:solidFill>
+                  <a:srgbClr val="000000"/>
+                </a:solidFill>
+                <a:highlight>
+                  <a:srgbClr val="FFFFFF"/>
+                </a:highlight>
+                <a:latin typeface="Consolas" panose="020B0609020204030204" pitchFamily="49" charset="0"/>
+              </a:rPr>
+              <a:t> </a:t>
+            </a:r>
+            <a:r>
+              <a:rPr lang="en-US" sz="2400" dirty="0" err="1">
+                <a:solidFill>
+                  <a:srgbClr val="000000"/>
+                </a:solidFill>
+                <a:highlight>
+                  <a:srgbClr val="FFFFFF"/>
+                </a:highlight>
+                <a:latin typeface="Consolas" panose="020B0609020204030204" pitchFamily="49" charset="0"/>
+              </a:rPr>
+              <a:t>cntr_value</a:t>
+            </a:r>
+            <a:endParaRPr lang="en-US" sz="2400" dirty="0">
+              <a:solidFill>
+                <a:srgbClr val="000000"/>
+              </a:solidFill>
+              <a:highlight>
+                <a:srgbClr val="FFFFFF"/>
+              </a:highlight>
+              <a:latin typeface="Consolas" panose="020B0609020204030204" pitchFamily="49" charset="0"/>
+            </a:endParaRPr>
+          </a:p>
+          <a:p>
+            <a:pPr marL="0" indent="0">
+              <a:buNone/>
+            </a:pPr>
+            <a:r>
+              <a:rPr lang="en-US" sz="2400" dirty="0">
+                <a:solidFill>
+                  <a:srgbClr val="0000FF"/>
+                </a:solidFill>
+                <a:highlight>
+                  <a:srgbClr val="FFFFFF"/>
+                </a:highlight>
+                <a:latin typeface="Consolas" panose="020B0609020204030204" pitchFamily="49" charset="0"/>
+              </a:rPr>
+              <a:t>from</a:t>
+            </a:r>
+            <a:r>
+              <a:rPr lang="en-US" sz="2400" dirty="0">
+                <a:solidFill>
+                  <a:srgbClr val="000000"/>
+                </a:solidFill>
+                <a:highlight>
+                  <a:srgbClr val="FFFFFF"/>
+                </a:highlight>
+                <a:latin typeface="Consolas" panose="020B0609020204030204" pitchFamily="49" charset="0"/>
+              </a:rPr>
+              <a:t> </a:t>
+            </a:r>
+            <a:r>
+              <a:rPr lang="en-US" sz="2400" dirty="0" err="1">
+                <a:solidFill>
+                  <a:srgbClr val="00FF00"/>
+                </a:solidFill>
+                <a:highlight>
+                  <a:srgbClr val="FFFFFF"/>
+                </a:highlight>
+                <a:latin typeface="Consolas" panose="020B0609020204030204" pitchFamily="49" charset="0"/>
+              </a:rPr>
+              <a:t>sys</a:t>
+            </a:r>
+            <a:r>
+              <a:rPr lang="en-US" sz="2400" dirty="0" err="1">
+                <a:solidFill>
+                  <a:srgbClr val="808080"/>
+                </a:solidFill>
+                <a:highlight>
+                  <a:srgbClr val="FFFFFF"/>
+                </a:highlight>
+                <a:latin typeface="Consolas" panose="020B0609020204030204" pitchFamily="49" charset="0"/>
+              </a:rPr>
+              <a:t>.</a:t>
+            </a:r>
+            <a:r>
+              <a:rPr lang="en-US" sz="2400" dirty="0" err="1">
+                <a:solidFill>
+                  <a:srgbClr val="00FF00"/>
+                </a:solidFill>
+                <a:highlight>
+                  <a:srgbClr val="FFFFFF"/>
+                </a:highlight>
+                <a:latin typeface="Consolas" panose="020B0609020204030204" pitchFamily="49" charset="0"/>
+              </a:rPr>
+              <a:t>dm_os_performance_counters</a:t>
+            </a:r>
+            <a:endParaRPr lang="en-US" sz="2400" dirty="0">
+              <a:solidFill>
+                <a:srgbClr val="000000"/>
+              </a:solidFill>
+              <a:highlight>
+                <a:srgbClr val="FFFFFF"/>
+              </a:highlight>
+              <a:latin typeface="Consolas" panose="020B0609020204030204" pitchFamily="49" charset="0"/>
+            </a:endParaRPr>
+          </a:p>
+          <a:p>
+            <a:pPr marL="0" indent="0">
+              <a:buNone/>
+            </a:pPr>
+            <a:r>
+              <a:rPr lang="en-US" sz="2400" dirty="0">
+                <a:solidFill>
+                  <a:srgbClr val="0000FF"/>
+                </a:solidFill>
+                <a:highlight>
+                  <a:srgbClr val="FFFFFF"/>
+                </a:highlight>
+                <a:latin typeface="Consolas" panose="020B0609020204030204" pitchFamily="49" charset="0"/>
+              </a:rPr>
+              <a:t>where</a:t>
+            </a:r>
+            <a:r>
+              <a:rPr lang="en-US" sz="2400" dirty="0">
+                <a:solidFill>
+                  <a:srgbClr val="000000"/>
+                </a:solidFill>
+                <a:highlight>
+                  <a:srgbClr val="FFFFFF"/>
+                </a:highlight>
+                <a:latin typeface="Consolas" panose="020B0609020204030204" pitchFamily="49" charset="0"/>
+              </a:rPr>
+              <a:t> </a:t>
+            </a:r>
+            <a:r>
+              <a:rPr lang="en-US" sz="2400" dirty="0" err="1">
+                <a:solidFill>
+                  <a:srgbClr val="000000"/>
+                </a:solidFill>
+                <a:highlight>
+                  <a:srgbClr val="FFFFFF"/>
+                </a:highlight>
+                <a:latin typeface="Consolas" panose="020B0609020204030204" pitchFamily="49" charset="0"/>
+              </a:rPr>
+              <a:t>counter_name</a:t>
+            </a:r>
+            <a:r>
+              <a:rPr lang="en-US" sz="2400" dirty="0">
+                <a:solidFill>
+                  <a:srgbClr val="000000"/>
+                </a:solidFill>
+                <a:highlight>
+                  <a:srgbClr val="FFFFFF"/>
+                </a:highlight>
+                <a:latin typeface="Consolas" panose="020B0609020204030204" pitchFamily="49" charset="0"/>
+              </a:rPr>
+              <a:t> </a:t>
+            </a:r>
+            <a:r>
+              <a:rPr lang="en-US" sz="2400" dirty="0">
+                <a:solidFill>
+                  <a:srgbClr val="808080"/>
+                </a:solidFill>
+                <a:highlight>
+                  <a:srgbClr val="FFFFFF"/>
+                </a:highlight>
+                <a:latin typeface="Consolas" panose="020B0609020204030204" pitchFamily="49" charset="0"/>
+              </a:rPr>
+              <a:t>in</a:t>
+            </a:r>
+            <a:r>
+              <a:rPr lang="en-US" sz="2400" dirty="0">
+                <a:solidFill>
+                  <a:srgbClr val="0000FF"/>
+                </a:solidFill>
+                <a:highlight>
+                  <a:srgbClr val="FFFFFF"/>
+                </a:highlight>
+                <a:latin typeface="Consolas" panose="020B0609020204030204" pitchFamily="49" charset="0"/>
+              </a:rPr>
+              <a:t> </a:t>
+            </a:r>
+            <a:r>
+              <a:rPr lang="en-US" sz="2400" dirty="0">
+                <a:solidFill>
+                  <a:srgbClr val="808080"/>
+                </a:solidFill>
+                <a:highlight>
+                  <a:srgbClr val="FFFFFF"/>
+                </a:highlight>
+                <a:latin typeface="Consolas" panose="020B0609020204030204" pitchFamily="49" charset="0"/>
+              </a:rPr>
+              <a:t>(</a:t>
+            </a:r>
+            <a:r>
+              <a:rPr lang="en-US" sz="2400" dirty="0">
+                <a:solidFill>
+                  <a:srgbClr val="FF0000"/>
+                </a:solidFill>
+                <a:highlight>
+                  <a:srgbClr val="FFFFFF"/>
+                </a:highlight>
+                <a:latin typeface="Consolas" panose="020B0609020204030204" pitchFamily="49" charset="0"/>
+              </a:rPr>
+              <a:t>'Log Growths'</a:t>
+            </a:r>
+            <a:r>
+              <a:rPr lang="en-US" sz="2400" dirty="0">
+                <a:solidFill>
+                  <a:srgbClr val="808080"/>
+                </a:solidFill>
+                <a:highlight>
+                  <a:srgbClr val="FFFFFF"/>
+                </a:highlight>
+                <a:latin typeface="Consolas" panose="020B0609020204030204" pitchFamily="49" charset="0"/>
+              </a:rPr>
+              <a:t>,</a:t>
+            </a:r>
+            <a:r>
+              <a:rPr lang="en-US" sz="2400" dirty="0">
+                <a:solidFill>
+                  <a:srgbClr val="000000"/>
+                </a:solidFill>
+                <a:highlight>
+                  <a:srgbClr val="FFFFFF"/>
+                </a:highlight>
+                <a:latin typeface="Consolas" panose="020B0609020204030204" pitchFamily="49" charset="0"/>
+              </a:rPr>
+              <a:t> </a:t>
+            </a:r>
+            <a:r>
+              <a:rPr lang="en-US" sz="2400" dirty="0">
+                <a:solidFill>
+                  <a:srgbClr val="FF0000"/>
+                </a:solidFill>
+                <a:highlight>
+                  <a:srgbClr val="FFFFFF"/>
+                </a:highlight>
+                <a:latin typeface="Consolas" panose="020B0609020204030204" pitchFamily="49" charset="0"/>
+              </a:rPr>
+              <a:t>'Log Shrinks'</a:t>
+            </a:r>
+            <a:r>
+              <a:rPr lang="en-US" sz="2400" dirty="0">
+                <a:solidFill>
+                  <a:srgbClr val="808080"/>
+                </a:solidFill>
+                <a:highlight>
+                  <a:srgbClr val="FFFFFF"/>
+                </a:highlight>
+                <a:latin typeface="Consolas" panose="020B0609020204030204" pitchFamily="49" charset="0"/>
+              </a:rPr>
+              <a:t>,</a:t>
+            </a:r>
+            <a:r>
+              <a:rPr lang="en-US" sz="2400" dirty="0">
+                <a:solidFill>
+                  <a:srgbClr val="000000"/>
+                </a:solidFill>
+                <a:highlight>
+                  <a:srgbClr val="FFFFFF"/>
+                </a:highlight>
+                <a:latin typeface="Consolas" panose="020B0609020204030204" pitchFamily="49" charset="0"/>
+              </a:rPr>
+              <a:t> </a:t>
+            </a:r>
+            <a:r>
+              <a:rPr lang="en-US" sz="2400" dirty="0">
+                <a:solidFill>
+                  <a:srgbClr val="FF0000"/>
+                </a:solidFill>
+                <a:highlight>
+                  <a:srgbClr val="FFFFFF"/>
+                </a:highlight>
+                <a:latin typeface="Consolas" panose="020B0609020204030204" pitchFamily="49" charset="0"/>
+              </a:rPr>
+              <a:t>'Percent Log Used'</a:t>
+            </a:r>
+            <a:r>
+              <a:rPr lang="en-US" sz="2400" dirty="0">
+                <a:solidFill>
+                  <a:srgbClr val="808080"/>
+                </a:solidFill>
+                <a:highlight>
+                  <a:srgbClr val="FFFFFF"/>
+                </a:highlight>
+                <a:latin typeface="Consolas" panose="020B0609020204030204" pitchFamily="49" charset="0"/>
+              </a:rPr>
+              <a:t>,</a:t>
+            </a:r>
+            <a:r>
+              <a:rPr lang="en-US" sz="2400" dirty="0">
+                <a:solidFill>
+                  <a:srgbClr val="000000"/>
+                </a:solidFill>
+                <a:highlight>
+                  <a:srgbClr val="FFFFFF"/>
+                </a:highlight>
+                <a:latin typeface="Consolas" panose="020B0609020204030204" pitchFamily="49" charset="0"/>
+              </a:rPr>
+              <a:t> </a:t>
+            </a:r>
+            <a:r>
+              <a:rPr lang="en-US" sz="2400" dirty="0">
+                <a:solidFill>
+                  <a:srgbClr val="FF0000"/>
+                </a:solidFill>
+                <a:highlight>
+                  <a:srgbClr val="FFFFFF"/>
+                </a:highlight>
+                <a:latin typeface="Consolas" panose="020B0609020204030204" pitchFamily="49" charset="0"/>
+              </a:rPr>
+              <a:t>'Log Flush Waits/sec'</a:t>
+            </a:r>
+            <a:r>
+              <a:rPr lang="en-US" sz="2400" dirty="0">
+                <a:solidFill>
+                  <a:srgbClr val="808080"/>
+                </a:solidFill>
+                <a:highlight>
+                  <a:srgbClr val="FFFFFF"/>
+                </a:highlight>
+                <a:latin typeface="Consolas" panose="020B0609020204030204" pitchFamily="49" charset="0"/>
+              </a:rPr>
+              <a:t>,</a:t>
+            </a:r>
+            <a:r>
+              <a:rPr lang="en-US" sz="2400" dirty="0">
+                <a:solidFill>
+                  <a:srgbClr val="000000"/>
+                </a:solidFill>
+                <a:highlight>
+                  <a:srgbClr val="FFFFFF"/>
+                </a:highlight>
+                <a:latin typeface="Consolas" panose="020B0609020204030204" pitchFamily="49" charset="0"/>
+              </a:rPr>
+              <a:t> </a:t>
+            </a:r>
+            <a:r>
+              <a:rPr lang="en-US" sz="2400" dirty="0">
+                <a:solidFill>
+                  <a:srgbClr val="FF0000"/>
+                </a:solidFill>
+                <a:highlight>
+                  <a:srgbClr val="FFFFFF"/>
+                </a:highlight>
+                <a:latin typeface="Consolas" panose="020B0609020204030204" pitchFamily="49" charset="0"/>
+              </a:rPr>
+              <a:t>'Log Bytes Flushed/sec'</a:t>
+            </a:r>
+            <a:r>
+              <a:rPr lang="en-US" sz="2400" dirty="0">
+                <a:solidFill>
+                  <a:srgbClr val="808080"/>
+                </a:solidFill>
+                <a:highlight>
+                  <a:srgbClr val="FFFFFF"/>
+                </a:highlight>
+                <a:latin typeface="Consolas" panose="020B0609020204030204" pitchFamily="49" charset="0"/>
+              </a:rPr>
+              <a:t>,</a:t>
+            </a:r>
+            <a:r>
+              <a:rPr lang="en-US" sz="2400" dirty="0">
+                <a:solidFill>
+                  <a:srgbClr val="000000"/>
+                </a:solidFill>
+                <a:highlight>
+                  <a:srgbClr val="FFFFFF"/>
+                </a:highlight>
+                <a:latin typeface="Consolas" panose="020B0609020204030204" pitchFamily="49" charset="0"/>
+              </a:rPr>
+              <a:t> </a:t>
+            </a:r>
+            <a:r>
+              <a:rPr lang="en-US" sz="2400" dirty="0">
+                <a:solidFill>
+                  <a:srgbClr val="FF0000"/>
+                </a:solidFill>
+                <a:highlight>
+                  <a:srgbClr val="FFFFFF"/>
+                </a:highlight>
+                <a:latin typeface="Consolas" panose="020B0609020204030204" pitchFamily="49" charset="0"/>
+              </a:rPr>
+              <a:t>'Log Flushes/sec</a:t>
+            </a:r>
+            <a:r>
+              <a:rPr lang="en-US" sz="2400" dirty="0" smtClean="0">
+                <a:solidFill>
+                  <a:srgbClr val="FF0000"/>
+                </a:solidFill>
+                <a:highlight>
+                  <a:srgbClr val="FFFFFF"/>
+                </a:highlight>
+                <a:latin typeface="Consolas" panose="020B0609020204030204" pitchFamily="49" charset="0"/>
+              </a:rPr>
+              <a:t>'</a:t>
+            </a:r>
+            <a:r>
+              <a:rPr lang="en-US" sz="2400" dirty="0" smtClean="0">
+                <a:solidFill>
+                  <a:srgbClr val="808080"/>
+                </a:solidFill>
+                <a:highlight>
+                  <a:srgbClr val="FFFFFF"/>
+                </a:highlight>
+                <a:latin typeface="Consolas" panose="020B0609020204030204" pitchFamily="49" charset="0"/>
+              </a:rPr>
+              <a:t>);</a:t>
+            </a:r>
+            <a:endParaRPr lang="en-US" sz="2400" dirty="0">
+              <a:solidFill>
+                <a:srgbClr val="000000"/>
+              </a:solidFill>
+              <a:highlight>
+                <a:srgbClr val="FFFFFF"/>
+              </a:highlight>
+              <a:latin typeface="Consolas" panose="020B0609020204030204" pitchFamily="49" charset="0"/>
+            </a:endParaRPr>
+          </a:p>
+        </p:txBody>
+      </p:sp>
+      <p:sp>
+        <p:nvSpPr>
+          <p:cNvPr id="4" name="Footer Placeholder 3"/>
+          <p:cNvSpPr>
+            <a:spLocks noGrp="1"/>
+          </p:cNvSpPr>
+          <p:nvPr>
+            <p:ph type="ftr" sz="quarter" idx="3"/>
+          </p:nvPr>
+        </p:nvSpPr>
+        <p:spPr/>
+        <p:txBody>
+          <a:bodyPr/>
+          <a:lstStyle/>
+          <a:p>
+            <a:r>
+              <a:rPr lang="en-US" smtClean="0"/>
+              <a:t>3/25/2017</a:t>
+            </a:r>
+            <a:endParaRPr lang="en-US" dirty="0"/>
+          </a:p>
+        </p:txBody>
+      </p:sp>
+      <p:sp>
+        <p:nvSpPr>
+          <p:cNvPr id="5" name="Slide Number Placeholder 4"/>
+          <p:cNvSpPr>
+            <a:spLocks noGrp="1"/>
+          </p:cNvSpPr>
+          <p:nvPr>
+            <p:ph type="sldNum" sz="quarter" idx="4"/>
+          </p:nvPr>
+        </p:nvSpPr>
+        <p:spPr/>
+        <p:txBody>
+          <a:bodyPr/>
+          <a:lstStyle/>
+          <a:p>
+            <a:fld id="{87FD5303-69AD-2E4D-B18B-E5EED0F0A60B}" type="slidenum">
+              <a:rPr lang="en-US" smtClean="0"/>
+              <a:pPr/>
+              <a:t>53</a:t>
+            </a:fld>
+            <a:r>
+              <a:rPr lang="en-US" smtClean="0"/>
+              <a:t>  |  </a:t>
+            </a:r>
+            <a:endParaRPr lang="en-US" dirty="0"/>
+          </a:p>
+        </p:txBody>
+      </p:sp>
+    </p:spTree>
+    <p:extLst>
+      <p:ext uri="{BB962C8B-B14F-4D97-AF65-F5344CB8AC3E}">
+        <p14:creationId xmlns:p14="http://schemas.microsoft.com/office/powerpoint/2010/main" val="3620500893"/>
+      </p:ext>
+    </p:extLst>
+  </p:cSld>
+  <p:clrMapOvr>
+    <a:masterClrMapping/>
+  </p:clrMapOvr>
+  <p:timing>
+    <p:tnLst>
+      <p:par>
+        <p:cTn id="1" dur="indefinite" restart="never" nodeType="tmRoot"/>
+      </p:par>
+    </p:tnLst>
+  </p:timing>
+</p:sld>
+</file>
+
+<file path=ppt/slides/slide54.xml><?xml version="1.0" encoding="utf-8"?>
+<p:sld xmlns:a="http://schemas.openxmlformats.org/drawingml/2006/main" xmlns:r="http://schemas.openxmlformats.org/officeDocument/2006/relationships" xmlns:p="http://schemas.openxmlformats.org/presentationml/2006/main">
+  <p:cSld>
+    <p:spTree>
+      <p:nvGrpSpPr>
+        <p:cNvPr id="1" name=""/>
+        <p:cNvGrpSpPr/>
+        <p:nvPr/>
+      </p:nvGrpSpPr>
+      <p:grpSpPr>
+        <a:xfrm>
+          <a:off x="0" y="0"/>
+          <a:ext cx="0" cy="0"/>
+          <a:chOff x="0" y="0"/>
+          <a:chExt cx="0" cy="0"/>
+        </a:xfrm>
+      </p:grpSpPr>
+      <p:sp>
+        <p:nvSpPr>
+          <p:cNvPr id="2" name="Title 1"/>
+          <p:cNvSpPr>
+            <a:spLocks noGrp="1"/>
+          </p:cNvSpPr>
+          <p:nvPr>
+            <p:ph type="title"/>
+          </p:nvPr>
+        </p:nvSpPr>
+        <p:spPr/>
+        <p:txBody>
+          <a:bodyPr/>
+          <a:lstStyle/>
+          <a:p>
+            <a:r>
               <a:rPr lang="en-US" dirty="0"/>
               <a:t>Thank You</a:t>
             </a:r>
@@ -12990,6 +13716,13 @@
   <p:clrMapOvr>
     <a:masterClrMapping/>
   </p:clrMapOvr>
+  <p:timing>
+    <p:tnLst>
+      <p:par>
+        <p:cTn id="1" dur="indefinite" restart="never" nodeType="tmRoot"/>
+      </p:par>
+    </p:tnLst>
+  </p:timing>
 </p:sld>
 </file>
 

</xml_diff>

<commit_message>
Call out Log File Visualizer on appropriate demo slide.
</commit_message>
<xml_diff>
--- a/TransactionLog.pptx
+++ b/TransactionLog.pptx
@@ -7149,21 +7149,21 @@
                 <a:gridCol w="1895475">
                   <a:extLst>
                     <a:ext uri="{9D8B030D-6E8A-4147-A177-3AD203B41FA5}">
-                      <a16:colId xmlns:a16="http://schemas.microsoft.com/office/drawing/2014/main" xmlns="" val="20000"/>
+                      <a16:colId xmlns="" xmlns:a16="http://schemas.microsoft.com/office/drawing/2014/main" val="20000"/>
                     </a:ext>
                   </a:extLst>
                 </a:gridCol>
                 <a:gridCol w="3171825">
                   <a:extLst>
                     <a:ext uri="{9D8B030D-6E8A-4147-A177-3AD203B41FA5}">
-                      <a16:colId xmlns:a16="http://schemas.microsoft.com/office/drawing/2014/main" xmlns="" val="20001"/>
+                      <a16:colId xmlns="" xmlns:a16="http://schemas.microsoft.com/office/drawing/2014/main" val="20001"/>
                     </a:ext>
                   </a:extLst>
                 </a:gridCol>
                 <a:gridCol w="3162300">
                   <a:extLst>
                     <a:ext uri="{9D8B030D-6E8A-4147-A177-3AD203B41FA5}">
-                      <a16:colId xmlns:a16="http://schemas.microsoft.com/office/drawing/2014/main" xmlns="" val="20002"/>
+                      <a16:colId xmlns="" xmlns:a16="http://schemas.microsoft.com/office/drawing/2014/main" val="20002"/>
                     </a:ext>
                   </a:extLst>
                 </a:gridCol>
@@ -7210,7 +7210,7 @@
                 </a:tc>
                 <a:extLst>
                   <a:ext uri="{0D108BD9-81ED-4DB2-BD59-A6C34878D82A}">
-                    <a16:rowId xmlns:a16="http://schemas.microsoft.com/office/drawing/2014/main" xmlns="" val="10000"/>
+                    <a16:rowId xmlns="" xmlns:a16="http://schemas.microsoft.com/office/drawing/2014/main" val="10000"/>
                   </a:ext>
                 </a:extLst>
               </a:tr>
@@ -7273,7 +7273,7 @@
                 </a:tc>
                 <a:extLst>
                   <a:ext uri="{0D108BD9-81ED-4DB2-BD59-A6C34878D82A}">
-                    <a16:rowId xmlns:a16="http://schemas.microsoft.com/office/drawing/2014/main" xmlns="" val="10001"/>
+                    <a16:rowId xmlns="" xmlns:a16="http://schemas.microsoft.com/office/drawing/2014/main" val="10001"/>
                   </a:ext>
                 </a:extLst>
               </a:tr>
@@ -7344,7 +7344,7 @@
                 </a:tc>
                 <a:extLst>
                   <a:ext uri="{0D108BD9-81ED-4DB2-BD59-A6C34878D82A}">
-                    <a16:rowId xmlns:a16="http://schemas.microsoft.com/office/drawing/2014/main" xmlns="" val="10002"/>
+                    <a16:rowId xmlns="" xmlns:a16="http://schemas.microsoft.com/office/drawing/2014/main" val="10002"/>
                   </a:ext>
                 </a:extLst>
               </a:tr>
@@ -7390,7 +7390,7 @@
                 </a:tc>
                 <a:extLst>
                   <a:ext uri="{0D108BD9-81ED-4DB2-BD59-A6C34878D82A}">
-                    <a16:rowId xmlns:a16="http://schemas.microsoft.com/office/drawing/2014/main" xmlns="" val="10003"/>
+                    <a16:rowId xmlns="" xmlns:a16="http://schemas.microsoft.com/office/drawing/2014/main" val="10003"/>
                   </a:ext>
                 </a:extLst>
               </a:tr>
@@ -7441,7 +7441,7 @@
                 </a:tc>
                 <a:extLst>
                   <a:ext uri="{0D108BD9-81ED-4DB2-BD59-A6C34878D82A}">
-                    <a16:rowId xmlns:a16="http://schemas.microsoft.com/office/drawing/2014/main" xmlns="" val="3543017676"/>
+                    <a16:rowId xmlns="" xmlns:a16="http://schemas.microsoft.com/office/drawing/2014/main" val="3543017676"/>
                   </a:ext>
                 </a:extLst>
               </a:tr>
@@ -7906,8 +7906,26 @@
             </a:pPr>
             <a:r>
               <a:rPr lang="en-US" dirty="0"/>
-              <a:t>DBCC LOGINFO</a:t>
-            </a:r>
+              <a:t>DBCC </a:t>
+            </a:r>
+            <a:r>
+              <a:rPr lang="en-US" dirty="0" smtClean="0"/>
+              <a:t>LOGINFO</a:t>
+            </a:r>
+          </a:p>
+          <a:p>
+            <a:pPr marL="0" indent="0">
+              <a:buNone/>
+            </a:pPr>
+            <a:r>
+              <a:rPr lang="en-US" dirty="0"/>
+              <a:t>	</a:t>
+            </a:r>
+            <a:r>
+              <a:rPr lang="en-US" smtClean="0"/>
+              <a:t>	+ Log File Visualizer</a:t>
+            </a:r>
+            <a:endParaRPr lang="en-US" dirty="0" smtClean="0"/>
           </a:p>
         </p:txBody>
       </p:sp>
@@ -11765,14 +11783,14 @@
                 <a:gridCol w="3048000">
                   <a:extLst>
                     <a:ext uri="{9D8B030D-6E8A-4147-A177-3AD203B41FA5}">
-                      <a16:colId xmlns:a16="http://schemas.microsoft.com/office/drawing/2014/main" xmlns="" val="20000"/>
+                      <a16:colId xmlns="" xmlns:a16="http://schemas.microsoft.com/office/drawing/2014/main" val="20000"/>
                     </a:ext>
                   </a:extLst>
                 </a:gridCol>
                 <a:gridCol w="3048000">
                   <a:extLst>
                     <a:ext uri="{9D8B030D-6E8A-4147-A177-3AD203B41FA5}">
-                      <a16:colId xmlns:a16="http://schemas.microsoft.com/office/drawing/2014/main" xmlns="" val="20001"/>
+                      <a16:colId xmlns="" xmlns:a16="http://schemas.microsoft.com/office/drawing/2014/main" val="20001"/>
                     </a:ext>
                   </a:extLst>
                 </a:gridCol>
@@ -11818,7 +11836,7 @@
                 </a:tc>
                 <a:extLst>
                   <a:ext uri="{0D108BD9-81ED-4DB2-BD59-A6C34878D82A}">
-                    <a16:rowId xmlns:a16="http://schemas.microsoft.com/office/drawing/2014/main" xmlns="" val="10000"/>
+                    <a16:rowId xmlns="" xmlns:a16="http://schemas.microsoft.com/office/drawing/2014/main" val="10000"/>
                   </a:ext>
                 </a:extLst>
               </a:tr>
@@ -11853,7 +11871,7 @@
                 </a:tc>
                 <a:extLst>
                   <a:ext uri="{0D108BD9-81ED-4DB2-BD59-A6C34878D82A}">
-                    <a16:rowId xmlns:a16="http://schemas.microsoft.com/office/drawing/2014/main" xmlns="" val="10001"/>
+                    <a16:rowId xmlns="" xmlns:a16="http://schemas.microsoft.com/office/drawing/2014/main" val="10001"/>
                   </a:ext>
                 </a:extLst>
               </a:tr>
@@ -11888,7 +11906,7 @@
                 </a:tc>
                 <a:extLst>
                   <a:ext uri="{0D108BD9-81ED-4DB2-BD59-A6C34878D82A}">
-                    <a16:rowId xmlns:a16="http://schemas.microsoft.com/office/drawing/2014/main" xmlns="" val="10002"/>
+                    <a16:rowId xmlns="" xmlns:a16="http://schemas.microsoft.com/office/drawing/2014/main" val="10002"/>
                   </a:ext>
                 </a:extLst>
               </a:tr>
@@ -11928,7 +11946,7 @@
                 </a:tc>
                 <a:extLst>
                   <a:ext uri="{0D108BD9-81ED-4DB2-BD59-A6C34878D82A}">
-                    <a16:rowId xmlns:a16="http://schemas.microsoft.com/office/drawing/2014/main" xmlns="" val="10003"/>
+                    <a16:rowId xmlns="" xmlns:a16="http://schemas.microsoft.com/office/drawing/2014/main" val="10003"/>
                   </a:ext>
                 </a:extLst>
               </a:tr>
@@ -13667,15 +13685,7 @@
             <a:pPr lvl="1"/>
             <a:r>
               <a:rPr lang="en-US" dirty="0"/>
-              <a:t>SQL Server Log File Visualizer &amp; </a:t>
-            </a:r>
-            <a:r>
-              <a:rPr lang="en-US"/>
-              <a:t>LSN Converter </a:t>
-            </a:r>
-            <a:r>
-              <a:rPr lang="en-US" dirty="0"/>
-              <a:t>binaries &amp; source</a:t>
+              <a:t>SQL Server Log File Visualizer &amp; LSN Converter binaries &amp; source</a:t>
             </a:r>
           </a:p>
           <a:p>

</xml_diff>

<commit_message>
Re-add performance counters slide and demo slide modification.
</commit_message>
<xml_diff>
--- a/TransactionLog.pptx
+++ b/TransactionLog.pptx
@@ -5,7 +5,7 @@
     <p:sldMasterId id="2147483648" r:id="rId1"/>
   </p:sldMasterIdLst>
   <p:notesMasterIdLst>
-    <p:notesMasterId r:id="rId54"/>
+    <p:notesMasterId r:id="rId55"/>
   </p:notesMasterIdLst>
   <p:sldIdLst>
     <p:sldId id="328" r:id="rId2"/>
@@ -32,7 +32,7 @@
     <p:sldId id="348" r:id="rId23"/>
     <p:sldId id="364" r:id="rId24"/>
     <p:sldId id="349" r:id="rId25"/>
-    <p:sldId id="362" r:id="rId26"/>
+    <p:sldId id="382" r:id="rId26"/>
     <p:sldId id="350" r:id="rId27"/>
     <p:sldId id="363" r:id="rId28"/>
     <p:sldId id="351" r:id="rId29"/>
@@ -59,7 +59,8 @@
     <p:sldId id="365" r:id="rId50"/>
     <p:sldId id="367" r:id="rId51"/>
     <p:sldId id="370" r:id="rId52"/>
-    <p:sldId id="371" r:id="rId53"/>
+    <p:sldId id="381" r:id="rId53"/>
+    <p:sldId id="371" r:id="rId54"/>
   </p:sldIdLst>
   <p:sldSz cx="9144000" cy="6858000" type="screen4x3"/>
   <p:notesSz cx="6858000" cy="9144000"/>
@@ -259,7 +260,7 @@
           <a:p>
             <a:fld id="{2EDCB34D-5EC2-4739-9693-E425457AC201}" type="datetimeFigureOut">
               <a:rPr lang="en-US" smtClean="0"/>
-              <a:t>03/15/2017</a:t>
+              <a:t>03/27/2017</a:t>
             </a:fld>
             <a:endParaRPr lang="en-US"/>
           </a:p>
@@ -1029,7 +1030,7 @@
             <a:fld id="{5942B21B-2ADA-A040-A652-A7305E1B99FE}" type="datetimeFigureOut">
               <a:rPr lang="en-US" smtClean="0"/>
               <a:pPr/>
-              <a:t>03/15/2017</a:t>
+              <a:t>03/27/2017</a:t>
             </a:fld>
             <a:endParaRPr lang="en-US" dirty="0"/>
           </a:p>
@@ -1219,7 +1220,7 @@
           <a:p>
             <a:fld id="{5942B21B-2ADA-A040-A652-A7305E1B99FE}" type="datetimeFigureOut">
               <a:rPr lang="en-US" smtClean="0"/>
-              <a:t>03/15/2017</a:t>
+              <a:t>03/27/2017</a:t>
             </a:fld>
             <a:endParaRPr lang="en-US"/>
           </a:p>
@@ -1343,7 +1344,7 @@
             <a:fld id="{5942B21B-2ADA-A040-A652-A7305E1B99FE}" type="datetimeFigureOut">
               <a:rPr lang="en-US" smtClean="0"/>
               <a:pPr/>
-              <a:t>03/15/2017</a:t>
+              <a:t>03/27/2017</a:t>
             </a:fld>
             <a:r>
               <a:rPr lang="en-US"/>
@@ -1614,7 +1615,7 @@
             <a:fld id="{5942B21B-2ADA-A040-A652-A7305E1B99FE}" type="datetimeFigureOut">
               <a:rPr lang="en-US" smtClean="0"/>
               <a:pPr/>
-              <a:t>03/15/2017</a:t>
+              <a:t>03/27/2017</a:t>
             </a:fld>
             <a:r>
               <a:rPr lang="en-US" dirty="0"/>
@@ -1884,7 +1885,7 @@
             <a:fld id="{5942B21B-2ADA-A040-A652-A7305E1B99FE}" type="datetimeFigureOut">
               <a:rPr lang="en-US" smtClean="0"/>
               <a:pPr/>
-              <a:t>03/15/2017</a:t>
+              <a:t>03/27/2017</a:t>
             </a:fld>
             <a:r>
               <a:rPr lang="en-US" dirty="0"/>
@@ -2224,7 +2225,7 @@
             <a:fld id="{5942B21B-2ADA-A040-A652-A7305E1B99FE}" type="datetimeFigureOut">
               <a:rPr lang="en-US" smtClean="0"/>
               <a:pPr/>
-              <a:t>03/15/2017</a:t>
+              <a:t>03/27/2017</a:t>
             </a:fld>
             <a:r>
               <a:rPr lang="en-US" dirty="0"/>
@@ -2565,7 +2566,7 @@
             <a:fld id="{5942B21B-2ADA-A040-A652-A7305E1B99FE}" type="datetimeFigureOut">
               <a:rPr lang="en-US" smtClean="0"/>
               <a:pPr/>
-              <a:t>03/15/2017</a:t>
+              <a:t>03/27/2017</a:t>
             </a:fld>
             <a:r>
               <a:rPr lang="en-US" dirty="0"/>
@@ -3080,7 +3081,7 @@
             <a:fld id="{5942B21B-2ADA-A040-A652-A7305E1B99FE}" type="datetimeFigureOut">
               <a:rPr lang="en-US" smtClean="0"/>
               <a:pPr/>
-              <a:t>03/15/2017</a:t>
+              <a:t>03/27/2017</a:t>
             </a:fld>
             <a:r>
               <a:rPr lang="en-US" dirty="0"/>
@@ -3289,7 +3290,7 @@
             <a:fld id="{5942B21B-2ADA-A040-A652-A7305E1B99FE}" type="datetimeFigureOut">
               <a:rPr lang="en-US" smtClean="0"/>
               <a:pPr/>
-              <a:t>03/15/2017</a:t>
+              <a:t>03/27/2017</a:t>
             </a:fld>
             <a:r>
               <a:rPr lang="en-US" dirty="0"/>
@@ -3476,7 +3477,7 @@
             <a:fld id="{5942B21B-2ADA-A040-A652-A7305E1B99FE}" type="datetimeFigureOut">
               <a:rPr lang="en-US" smtClean="0"/>
               <a:pPr/>
-              <a:t>03/15/2017</a:t>
+              <a:t>03/27/2017</a:t>
             </a:fld>
             <a:r>
               <a:rPr lang="en-US" dirty="0"/>
@@ -3807,7 +3808,7 @@
             <a:fld id="{5942B21B-2ADA-A040-A652-A7305E1B99FE}" type="datetimeFigureOut">
               <a:rPr lang="en-US" smtClean="0"/>
               <a:pPr/>
-              <a:t>03/15/2017</a:t>
+              <a:t>03/27/2017</a:t>
             </a:fld>
             <a:r>
               <a:rPr lang="en-US" dirty="0"/>
@@ -4115,7 +4116,7 @@
             <a:fld id="{5942B21B-2ADA-A040-A652-A7305E1B99FE}" type="datetimeFigureOut">
               <a:rPr lang="en-US" smtClean="0"/>
               <a:pPr/>
-              <a:t>03/15/2017</a:t>
+              <a:t>03/27/2017</a:t>
             </a:fld>
             <a:r>
               <a:rPr lang="en-US" dirty="0"/>
@@ -4394,7 +4395,7 @@
             <a:fld id="{5942B21B-2ADA-A040-A652-A7305E1B99FE}" type="datetimeFigureOut">
               <a:rPr lang="en-US" smtClean="0"/>
               <a:pPr/>
-              <a:t>03/15/2017</a:t>
+              <a:t>03/27/2017</a:t>
             </a:fld>
             <a:r>
               <a:rPr lang="en-US" dirty="0"/>
@@ -7691,21 +7692,21 @@
                 <a:gridCol w="1895475">
                   <a:extLst>
                     <a:ext uri="{9D8B030D-6E8A-4147-A177-3AD203B41FA5}">
-                      <a16:colId xmlns:a16="http://schemas.microsoft.com/office/drawing/2014/main" xmlns="" val="20000"/>
+                      <a16:colId xmlns="" xmlns:a16="http://schemas.microsoft.com/office/drawing/2014/main" val="20000"/>
                     </a:ext>
                   </a:extLst>
                 </a:gridCol>
                 <a:gridCol w="3171825">
                   <a:extLst>
                     <a:ext uri="{9D8B030D-6E8A-4147-A177-3AD203B41FA5}">
-                      <a16:colId xmlns:a16="http://schemas.microsoft.com/office/drawing/2014/main" xmlns="" val="20001"/>
+                      <a16:colId xmlns="" xmlns:a16="http://schemas.microsoft.com/office/drawing/2014/main" val="20001"/>
                     </a:ext>
                   </a:extLst>
                 </a:gridCol>
                 <a:gridCol w="3162300">
                   <a:extLst>
                     <a:ext uri="{9D8B030D-6E8A-4147-A177-3AD203B41FA5}">
-                      <a16:colId xmlns:a16="http://schemas.microsoft.com/office/drawing/2014/main" xmlns="" val="20002"/>
+                      <a16:colId xmlns="" xmlns:a16="http://schemas.microsoft.com/office/drawing/2014/main" val="20002"/>
                     </a:ext>
                   </a:extLst>
                 </a:gridCol>
@@ -7752,7 +7753,7 @@
                 </a:tc>
                 <a:extLst>
                   <a:ext uri="{0D108BD9-81ED-4DB2-BD59-A6C34878D82A}">
-                    <a16:rowId xmlns:a16="http://schemas.microsoft.com/office/drawing/2014/main" xmlns="" val="10000"/>
+                    <a16:rowId xmlns="" xmlns:a16="http://schemas.microsoft.com/office/drawing/2014/main" val="10000"/>
                   </a:ext>
                 </a:extLst>
               </a:tr>
@@ -7815,7 +7816,7 @@
                 </a:tc>
                 <a:extLst>
                   <a:ext uri="{0D108BD9-81ED-4DB2-BD59-A6C34878D82A}">
-                    <a16:rowId xmlns:a16="http://schemas.microsoft.com/office/drawing/2014/main" xmlns="" val="10001"/>
+                    <a16:rowId xmlns="" xmlns:a16="http://schemas.microsoft.com/office/drawing/2014/main" val="10001"/>
                   </a:ext>
                 </a:extLst>
               </a:tr>
@@ -7886,7 +7887,7 @@
                 </a:tc>
                 <a:extLst>
                   <a:ext uri="{0D108BD9-81ED-4DB2-BD59-A6C34878D82A}">
-                    <a16:rowId xmlns:a16="http://schemas.microsoft.com/office/drawing/2014/main" xmlns="" val="10002"/>
+                    <a16:rowId xmlns="" xmlns:a16="http://schemas.microsoft.com/office/drawing/2014/main" val="10002"/>
                   </a:ext>
                 </a:extLst>
               </a:tr>
@@ -7932,7 +7933,7 @@
                 </a:tc>
                 <a:extLst>
                   <a:ext uri="{0D108BD9-81ED-4DB2-BD59-A6C34878D82A}">
-                    <a16:rowId xmlns:a16="http://schemas.microsoft.com/office/drawing/2014/main" xmlns="" val="10003"/>
+                    <a16:rowId xmlns="" xmlns:a16="http://schemas.microsoft.com/office/drawing/2014/main" val="10003"/>
                   </a:ext>
                 </a:extLst>
               </a:tr>
@@ -7983,7 +7984,7 @@
                 </a:tc>
                 <a:extLst>
                   <a:ext uri="{0D108BD9-81ED-4DB2-BD59-A6C34878D82A}">
-                    <a16:rowId xmlns:a16="http://schemas.microsoft.com/office/drawing/2014/main" xmlns="" val="3543017676"/>
+                    <a16:rowId xmlns="" xmlns:a16="http://schemas.microsoft.com/office/drawing/2014/main" val="3543017676"/>
                   </a:ext>
                 </a:extLst>
               </a:tr>
@@ -8448,8 +8449,26 @@
             </a:pPr>
             <a:r>
               <a:rPr lang="en-US" dirty="0"/>
-              <a:t>DBCC LOGINFO</a:t>
-            </a:r>
+              <a:t>DBCC </a:t>
+            </a:r>
+            <a:r>
+              <a:rPr lang="en-US" dirty="0" smtClean="0"/>
+              <a:t>LOGINFO</a:t>
+            </a:r>
+          </a:p>
+          <a:p>
+            <a:pPr marL="0" indent="0">
+              <a:buNone/>
+            </a:pPr>
+            <a:r>
+              <a:rPr lang="en-US" dirty="0"/>
+              <a:t>	</a:t>
+            </a:r>
+            <a:r>
+              <a:rPr lang="en-US" smtClean="0"/>
+              <a:t>	+ Log File Visualizer</a:t>
+            </a:r>
+            <a:endParaRPr lang="en-US" dirty="0" smtClean="0"/>
           </a:p>
         </p:txBody>
       </p:sp>
@@ -8480,7 +8499,7 @@
     </p:spTree>
     <p:extLst>
       <p:ext uri="{BB962C8B-B14F-4D97-AF65-F5344CB8AC3E}">
-        <p14:creationId xmlns:p14="http://schemas.microsoft.com/office/powerpoint/2010/main" val="4134537087"/>
+        <p14:creationId xmlns:p14="http://schemas.microsoft.com/office/powerpoint/2010/main" val="3548094933"/>
       </p:ext>
     </p:extLst>
   </p:cSld>
@@ -9380,11 +9399,11 @@
   <p:clrMapOvr>
     <a:masterClrMapping/>
   </p:clrMapOvr>
-  <mc:AlternateContent xmlns:mc="http://schemas.openxmlformats.org/markup-compatibility/2006">
-    <mc:Choice xmlns:p14="http://schemas.microsoft.com/office/powerpoint/2010/main" Requires="p14">
+  <mc:AlternateContent xmlns:mc="http://schemas.openxmlformats.org/markup-compatibility/2006" xmlns:p14="http://schemas.microsoft.com/office/powerpoint/2010/main">
+    <mc:Choice Requires="p14">
       <p:transition spd="slow" p14:dur="2000"/>
     </mc:Choice>
-    <mc:Fallback>
+    <mc:Fallback xmlns="">
       <p:transition spd="slow"/>
     </mc:Fallback>
   </mc:AlternateContent>
@@ -11442,14 +11461,14 @@
                 <a:gridCol w="3048000">
                   <a:extLst>
                     <a:ext uri="{9D8B030D-6E8A-4147-A177-3AD203B41FA5}">
-                      <a16:colId xmlns:a16="http://schemas.microsoft.com/office/drawing/2014/main" xmlns="" val="20000"/>
+                      <a16:colId xmlns="" xmlns:a16="http://schemas.microsoft.com/office/drawing/2014/main" val="20000"/>
                     </a:ext>
                   </a:extLst>
                 </a:gridCol>
                 <a:gridCol w="3048000">
                   <a:extLst>
                     <a:ext uri="{9D8B030D-6E8A-4147-A177-3AD203B41FA5}">
-                      <a16:colId xmlns:a16="http://schemas.microsoft.com/office/drawing/2014/main" xmlns="" val="20001"/>
+                      <a16:colId xmlns="" xmlns:a16="http://schemas.microsoft.com/office/drawing/2014/main" val="20001"/>
                     </a:ext>
                   </a:extLst>
                 </a:gridCol>
@@ -11495,7 +11514,7 @@
                 </a:tc>
                 <a:extLst>
                   <a:ext uri="{0D108BD9-81ED-4DB2-BD59-A6C34878D82A}">
-                    <a16:rowId xmlns:a16="http://schemas.microsoft.com/office/drawing/2014/main" xmlns="" val="10000"/>
+                    <a16:rowId xmlns="" xmlns:a16="http://schemas.microsoft.com/office/drawing/2014/main" val="10000"/>
                   </a:ext>
                 </a:extLst>
               </a:tr>
@@ -11530,7 +11549,7 @@
                 </a:tc>
                 <a:extLst>
                   <a:ext uri="{0D108BD9-81ED-4DB2-BD59-A6C34878D82A}">
-                    <a16:rowId xmlns:a16="http://schemas.microsoft.com/office/drawing/2014/main" xmlns="" val="10001"/>
+                    <a16:rowId xmlns="" xmlns:a16="http://schemas.microsoft.com/office/drawing/2014/main" val="10001"/>
                   </a:ext>
                 </a:extLst>
               </a:tr>
@@ -11565,7 +11584,7 @@
                 </a:tc>
                 <a:extLst>
                   <a:ext uri="{0D108BD9-81ED-4DB2-BD59-A6C34878D82A}">
-                    <a16:rowId xmlns:a16="http://schemas.microsoft.com/office/drawing/2014/main" xmlns="" val="10002"/>
+                    <a16:rowId xmlns="" xmlns:a16="http://schemas.microsoft.com/office/drawing/2014/main" val="10002"/>
                   </a:ext>
                 </a:extLst>
               </a:tr>
@@ -11605,7 +11624,7 @@
                 </a:tc>
                 <a:extLst>
                   <a:ext uri="{0D108BD9-81ED-4DB2-BD59-A6C34878D82A}">
-                    <a16:rowId xmlns:a16="http://schemas.microsoft.com/office/drawing/2014/main" xmlns="" val="10003"/>
+                    <a16:rowId xmlns="" xmlns:a16="http://schemas.microsoft.com/office/drawing/2014/main" val="10003"/>
                   </a:ext>
                 </a:extLst>
               </a:tr>
@@ -12509,6 +12528,731 @@
 </file>
 
 <file path=ppt/slides/slide52.xml><?xml version="1.0" encoding="utf-8"?>
+<p:sld xmlns:a="http://schemas.openxmlformats.org/drawingml/2006/main" xmlns:r="http://schemas.openxmlformats.org/officeDocument/2006/relationships" xmlns:p="http://schemas.openxmlformats.org/presentationml/2006/main">
+  <p:cSld>
+    <p:spTree>
+      <p:nvGrpSpPr>
+        <p:cNvPr id="1" name=""/>
+        <p:cNvGrpSpPr/>
+        <p:nvPr/>
+      </p:nvGrpSpPr>
+      <p:grpSpPr>
+        <a:xfrm>
+          <a:off x="0" y="0"/>
+          <a:ext cx="0" cy="0"/>
+          <a:chOff x="0" y="0"/>
+          <a:chExt cx="0" cy="0"/>
+        </a:xfrm>
+      </p:grpSpPr>
+      <p:sp>
+        <p:nvSpPr>
+          <p:cNvPr id="2" name="Title 1"/>
+          <p:cNvSpPr>
+            <a:spLocks noGrp="1"/>
+          </p:cNvSpPr>
+          <p:nvPr>
+            <p:ph type="title"/>
+          </p:nvPr>
+        </p:nvSpPr>
+        <p:spPr/>
+        <p:txBody>
+          <a:bodyPr/>
+          <a:lstStyle/>
+          <a:p>
+            <a:r>
+              <a:rPr lang="en-US" dirty="0" smtClean="0"/>
+              <a:t>Log Monitoring, continued</a:t>
+            </a:r>
+            <a:endParaRPr lang="en-US" dirty="0"/>
+          </a:p>
+        </p:txBody>
+      </p:sp>
+      <p:sp>
+        <p:nvSpPr>
+          <p:cNvPr id="3" name="Content Placeholder 2"/>
+          <p:cNvSpPr>
+            <a:spLocks noGrp="1"/>
+          </p:cNvSpPr>
+          <p:nvPr>
+            <p:ph idx="1"/>
+          </p:nvPr>
+        </p:nvSpPr>
+        <p:spPr/>
+        <p:txBody>
+          <a:bodyPr>
+            <a:normAutofit lnSpcReduction="10000"/>
+          </a:bodyPr>
+          <a:lstStyle/>
+          <a:p>
+            <a:r>
+              <a:rPr lang="en-US" dirty="0" err="1" smtClean="0"/>
+              <a:t>PerfMon</a:t>
+            </a:r>
+            <a:r>
+              <a:rPr lang="en-US" dirty="0" smtClean="0"/>
+              <a:t> counters</a:t>
+            </a:r>
+          </a:p>
+          <a:p>
+            <a:pPr lvl="1"/>
+            <a:r>
+              <a:rPr lang="en-US" dirty="0" smtClean="0"/>
+              <a:t>One row per counter per database (plus rollup)</a:t>
+            </a:r>
+          </a:p>
+          <a:p>
+            <a:pPr lvl="1"/>
+            <a:r>
+              <a:rPr lang="en-US" dirty="0"/>
+              <a:t>Paul </a:t>
+            </a:r>
+            <a:r>
+              <a:rPr lang="en-US"/>
+              <a:t>Randal </a:t>
+            </a:r>
+            <a:r>
+              <a:rPr lang="en-US" smtClean="0">
+                <a:hlinkClick r:id="rId2"/>
+              </a:rPr>
+              <a:t>explains</a:t>
+            </a:r>
+            <a:r>
+              <a:rPr lang="en-US" smtClean="0"/>
+              <a:t> what </a:t>
+            </a:r>
+            <a:r>
+              <a:rPr lang="en-US" dirty="0"/>
+              <a:t>to look for</a:t>
+            </a:r>
+            <a:r>
+              <a:rPr lang="en-US" dirty="0" smtClean="0"/>
+              <a:t>.</a:t>
+            </a:r>
+          </a:p>
+          <a:p>
+            <a:pPr lvl="1"/>
+            <a:endParaRPr lang="en-US" dirty="0" smtClean="0"/>
+          </a:p>
+          <a:p>
+            <a:pPr marL="0" indent="0">
+              <a:buNone/>
+            </a:pPr>
+            <a:r>
+              <a:rPr lang="en-US" sz="2400" dirty="0">
+                <a:solidFill>
+                  <a:srgbClr val="0000FF"/>
+                </a:solidFill>
+                <a:highlight>
+                  <a:srgbClr val="FFFFFF"/>
+                </a:highlight>
+                <a:latin typeface="Consolas" panose="020B0609020204030204" pitchFamily="49" charset="0"/>
+              </a:rPr>
+              <a:t>select</a:t>
+            </a:r>
+            <a:r>
+              <a:rPr lang="en-US" sz="2400" dirty="0">
+                <a:solidFill>
+                  <a:srgbClr val="000000"/>
+                </a:solidFill>
+                <a:highlight>
+                  <a:srgbClr val="FFFFFF"/>
+                </a:highlight>
+                <a:latin typeface="Consolas" panose="020B0609020204030204" pitchFamily="49" charset="0"/>
+              </a:rPr>
+              <a:t> </a:t>
+            </a:r>
+            <a:r>
+              <a:rPr lang="en-US" sz="2400" dirty="0" err="1">
+                <a:solidFill>
+                  <a:srgbClr val="FF00FF"/>
+                </a:solidFill>
+                <a:highlight>
+                  <a:srgbClr val="FFFFFF"/>
+                </a:highlight>
+                <a:latin typeface="Consolas" panose="020B0609020204030204" pitchFamily="49" charset="0"/>
+              </a:rPr>
+              <a:t>object_name</a:t>
+            </a:r>
+            <a:r>
+              <a:rPr lang="en-US" sz="2400" dirty="0">
+                <a:solidFill>
+                  <a:srgbClr val="808080"/>
+                </a:solidFill>
+                <a:highlight>
+                  <a:srgbClr val="FFFFFF"/>
+                </a:highlight>
+                <a:latin typeface="Consolas" panose="020B0609020204030204" pitchFamily="49" charset="0"/>
+              </a:rPr>
+              <a:t>,</a:t>
+            </a:r>
+            <a:r>
+              <a:rPr lang="en-US" sz="2400" dirty="0">
+                <a:solidFill>
+                  <a:srgbClr val="000000"/>
+                </a:solidFill>
+                <a:highlight>
+                  <a:srgbClr val="FFFFFF"/>
+                </a:highlight>
+                <a:latin typeface="Consolas" panose="020B0609020204030204" pitchFamily="49" charset="0"/>
+              </a:rPr>
+              <a:t> </a:t>
+            </a:r>
+            <a:r>
+              <a:rPr lang="en-US" sz="2400" dirty="0" err="1">
+                <a:solidFill>
+                  <a:srgbClr val="000000"/>
+                </a:solidFill>
+                <a:highlight>
+                  <a:srgbClr val="FFFFFF"/>
+                </a:highlight>
+                <a:latin typeface="Consolas" panose="020B0609020204030204" pitchFamily="49" charset="0"/>
+              </a:rPr>
+              <a:t>counter_name</a:t>
+            </a:r>
+            <a:r>
+              <a:rPr lang="en-US" sz="2400" dirty="0">
+                <a:solidFill>
+                  <a:srgbClr val="808080"/>
+                </a:solidFill>
+                <a:highlight>
+                  <a:srgbClr val="FFFFFF"/>
+                </a:highlight>
+                <a:latin typeface="Consolas" panose="020B0609020204030204" pitchFamily="49" charset="0"/>
+              </a:rPr>
+              <a:t>,</a:t>
+            </a:r>
+            <a:r>
+              <a:rPr lang="en-US" sz="2400" dirty="0">
+                <a:solidFill>
+                  <a:srgbClr val="000000"/>
+                </a:solidFill>
+                <a:highlight>
+                  <a:srgbClr val="FFFFFF"/>
+                </a:highlight>
+                <a:latin typeface="Consolas" panose="020B0609020204030204" pitchFamily="49" charset="0"/>
+              </a:rPr>
+              <a:t> </a:t>
+            </a:r>
+            <a:r>
+              <a:rPr lang="en-US" sz="2400" dirty="0" err="1">
+                <a:solidFill>
+                  <a:srgbClr val="000000"/>
+                </a:solidFill>
+                <a:highlight>
+                  <a:srgbClr val="FFFFFF"/>
+                </a:highlight>
+                <a:latin typeface="Consolas" panose="020B0609020204030204" pitchFamily="49" charset="0"/>
+              </a:rPr>
+              <a:t>instance_name</a:t>
+            </a:r>
+            <a:r>
+              <a:rPr lang="en-US" sz="2400" dirty="0">
+                <a:solidFill>
+                  <a:srgbClr val="808080"/>
+                </a:solidFill>
+                <a:highlight>
+                  <a:srgbClr val="FFFFFF"/>
+                </a:highlight>
+                <a:latin typeface="Consolas" panose="020B0609020204030204" pitchFamily="49" charset="0"/>
+              </a:rPr>
+              <a:t>,</a:t>
+            </a:r>
+            <a:r>
+              <a:rPr lang="en-US" sz="2400" dirty="0">
+                <a:solidFill>
+                  <a:srgbClr val="000000"/>
+                </a:solidFill>
+                <a:highlight>
+                  <a:srgbClr val="FFFFFF"/>
+                </a:highlight>
+                <a:latin typeface="Consolas" panose="020B0609020204030204" pitchFamily="49" charset="0"/>
+              </a:rPr>
+              <a:t> </a:t>
+            </a:r>
+            <a:r>
+              <a:rPr lang="en-US" sz="2400" dirty="0" err="1">
+                <a:solidFill>
+                  <a:srgbClr val="000000"/>
+                </a:solidFill>
+                <a:highlight>
+                  <a:srgbClr val="FFFFFF"/>
+                </a:highlight>
+                <a:latin typeface="Consolas" panose="020B0609020204030204" pitchFamily="49" charset="0"/>
+              </a:rPr>
+              <a:t>cntr_value</a:t>
+            </a:r>
+            <a:endParaRPr lang="en-US" sz="2400" dirty="0">
+              <a:solidFill>
+                <a:srgbClr val="000000"/>
+              </a:solidFill>
+              <a:highlight>
+                <a:srgbClr val="FFFFFF"/>
+              </a:highlight>
+              <a:latin typeface="Consolas" panose="020B0609020204030204" pitchFamily="49" charset="0"/>
+            </a:endParaRPr>
+          </a:p>
+          <a:p>
+            <a:pPr marL="0" indent="0">
+              <a:buNone/>
+            </a:pPr>
+            <a:r>
+              <a:rPr lang="en-US" sz="2400" dirty="0">
+                <a:solidFill>
+                  <a:srgbClr val="0000FF"/>
+                </a:solidFill>
+                <a:highlight>
+                  <a:srgbClr val="FFFFFF"/>
+                </a:highlight>
+                <a:latin typeface="Consolas" panose="020B0609020204030204" pitchFamily="49" charset="0"/>
+              </a:rPr>
+              <a:t>from</a:t>
+            </a:r>
+            <a:r>
+              <a:rPr lang="en-US" sz="2400" dirty="0">
+                <a:solidFill>
+                  <a:srgbClr val="000000"/>
+                </a:solidFill>
+                <a:highlight>
+                  <a:srgbClr val="FFFFFF"/>
+                </a:highlight>
+                <a:latin typeface="Consolas" panose="020B0609020204030204" pitchFamily="49" charset="0"/>
+              </a:rPr>
+              <a:t> </a:t>
+            </a:r>
+            <a:r>
+              <a:rPr lang="en-US" sz="2400" dirty="0" err="1">
+                <a:solidFill>
+                  <a:srgbClr val="00FF00"/>
+                </a:solidFill>
+                <a:highlight>
+                  <a:srgbClr val="FFFFFF"/>
+                </a:highlight>
+                <a:latin typeface="Consolas" panose="020B0609020204030204" pitchFamily="49" charset="0"/>
+              </a:rPr>
+              <a:t>sys</a:t>
+            </a:r>
+            <a:r>
+              <a:rPr lang="en-US" sz="2400" dirty="0" err="1">
+                <a:solidFill>
+                  <a:srgbClr val="808080"/>
+                </a:solidFill>
+                <a:highlight>
+                  <a:srgbClr val="FFFFFF"/>
+                </a:highlight>
+                <a:latin typeface="Consolas" panose="020B0609020204030204" pitchFamily="49" charset="0"/>
+              </a:rPr>
+              <a:t>.</a:t>
+            </a:r>
+            <a:r>
+              <a:rPr lang="en-US" sz="2400" dirty="0" err="1">
+                <a:solidFill>
+                  <a:srgbClr val="00FF00"/>
+                </a:solidFill>
+                <a:highlight>
+                  <a:srgbClr val="FFFFFF"/>
+                </a:highlight>
+                <a:latin typeface="Consolas" panose="020B0609020204030204" pitchFamily="49" charset="0"/>
+              </a:rPr>
+              <a:t>dm_os_performance_counters</a:t>
+            </a:r>
+            <a:endParaRPr lang="en-US" sz="2400" dirty="0">
+              <a:solidFill>
+                <a:srgbClr val="000000"/>
+              </a:solidFill>
+              <a:highlight>
+                <a:srgbClr val="FFFFFF"/>
+              </a:highlight>
+              <a:latin typeface="Consolas" panose="020B0609020204030204" pitchFamily="49" charset="0"/>
+            </a:endParaRPr>
+          </a:p>
+          <a:p>
+            <a:pPr marL="0" indent="0">
+              <a:buNone/>
+            </a:pPr>
+            <a:r>
+              <a:rPr lang="en-US" sz="2400" dirty="0">
+                <a:solidFill>
+                  <a:srgbClr val="0000FF"/>
+                </a:solidFill>
+                <a:highlight>
+                  <a:srgbClr val="FFFFFF"/>
+                </a:highlight>
+                <a:latin typeface="Consolas" panose="020B0609020204030204" pitchFamily="49" charset="0"/>
+              </a:rPr>
+              <a:t>where</a:t>
+            </a:r>
+            <a:r>
+              <a:rPr lang="en-US" sz="2400" dirty="0">
+                <a:solidFill>
+                  <a:srgbClr val="000000"/>
+                </a:solidFill>
+                <a:highlight>
+                  <a:srgbClr val="FFFFFF"/>
+                </a:highlight>
+                <a:latin typeface="Consolas" panose="020B0609020204030204" pitchFamily="49" charset="0"/>
+              </a:rPr>
+              <a:t> </a:t>
+            </a:r>
+            <a:r>
+              <a:rPr lang="en-US" sz="2400" dirty="0" err="1">
+                <a:solidFill>
+                  <a:srgbClr val="000000"/>
+                </a:solidFill>
+                <a:highlight>
+                  <a:srgbClr val="FFFFFF"/>
+                </a:highlight>
+                <a:latin typeface="Consolas" panose="020B0609020204030204" pitchFamily="49" charset="0"/>
+              </a:rPr>
+              <a:t>counter_name</a:t>
+            </a:r>
+            <a:r>
+              <a:rPr lang="en-US" sz="2400" dirty="0">
+                <a:solidFill>
+                  <a:srgbClr val="000000"/>
+                </a:solidFill>
+                <a:highlight>
+                  <a:srgbClr val="FFFFFF"/>
+                </a:highlight>
+                <a:latin typeface="Consolas" panose="020B0609020204030204" pitchFamily="49" charset="0"/>
+              </a:rPr>
+              <a:t> </a:t>
+            </a:r>
+            <a:r>
+              <a:rPr lang="en-US" sz="2400" dirty="0">
+                <a:solidFill>
+                  <a:srgbClr val="808080"/>
+                </a:solidFill>
+                <a:highlight>
+                  <a:srgbClr val="FFFFFF"/>
+                </a:highlight>
+                <a:latin typeface="Consolas" panose="020B0609020204030204" pitchFamily="49" charset="0"/>
+              </a:rPr>
+              <a:t>in</a:t>
+            </a:r>
+            <a:r>
+              <a:rPr lang="en-US" sz="2400" dirty="0">
+                <a:solidFill>
+                  <a:srgbClr val="0000FF"/>
+                </a:solidFill>
+                <a:highlight>
+                  <a:srgbClr val="FFFFFF"/>
+                </a:highlight>
+                <a:latin typeface="Consolas" panose="020B0609020204030204" pitchFamily="49" charset="0"/>
+              </a:rPr>
+              <a:t> </a:t>
+            </a:r>
+            <a:r>
+              <a:rPr lang="en-US" sz="2400" dirty="0">
+                <a:solidFill>
+                  <a:srgbClr val="808080"/>
+                </a:solidFill>
+                <a:highlight>
+                  <a:srgbClr val="FFFFFF"/>
+                </a:highlight>
+                <a:latin typeface="Consolas" panose="020B0609020204030204" pitchFamily="49" charset="0"/>
+              </a:rPr>
+              <a:t>(</a:t>
+            </a:r>
+            <a:r>
+              <a:rPr lang="en-US" sz="2400" dirty="0">
+                <a:solidFill>
+                  <a:srgbClr val="FF0000"/>
+                </a:solidFill>
+                <a:highlight>
+                  <a:srgbClr val="FFFFFF"/>
+                </a:highlight>
+                <a:latin typeface="Consolas" panose="020B0609020204030204" pitchFamily="49" charset="0"/>
+              </a:rPr>
+              <a:t>'Log Growths'</a:t>
+            </a:r>
+            <a:r>
+              <a:rPr lang="en-US" sz="2400" dirty="0">
+                <a:solidFill>
+                  <a:srgbClr val="808080"/>
+                </a:solidFill>
+                <a:highlight>
+                  <a:srgbClr val="FFFFFF"/>
+                </a:highlight>
+                <a:latin typeface="Consolas" panose="020B0609020204030204" pitchFamily="49" charset="0"/>
+              </a:rPr>
+              <a:t>,</a:t>
+            </a:r>
+            <a:r>
+              <a:rPr lang="en-US" sz="2400" dirty="0">
+                <a:solidFill>
+                  <a:srgbClr val="000000"/>
+                </a:solidFill>
+                <a:highlight>
+                  <a:srgbClr val="FFFFFF"/>
+                </a:highlight>
+                <a:latin typeface="Consolas" panose="020B0609020204030204" pitchFamily="49" charset="0"/>
+              </a:rPr>
+              <a:t> </a:t>
+            </a:r>
+            <a:r>
+              <a:rPr lang="en-US" sz="2400" dirty="0">
+                <a:solidFill>
+                  <a:srgbClr val="FF0000"/>
+                </a:solidFill>
+                <a:highlight>
+                  <a:srgbClr val="FFFFFF"/>
+                </a:highlight>
+                <a:latin typeface="Consolas" panose="020B0609020204030204" pitchFamily="49" charset="0"/>
+              </a:rPr>
+              <a:t>'Log Shrinks'</a:t>
+            </a:r>
+            <a:r>
+              <a:rPr lang="en-US" sz="2400" dirty="0">
+                <a:solidFill>
+                  <a:srgbClr val="808080"/>
+                </a:solidFill>
+                <a:highlight>
+                  <a:srgbClr val="FFFFFF"/>
+                </a:highlight>
+                <a:latin typeface="Consolas" panose="020B0609020204030204" pitchFamily="49" charset="0"/>
+              </a:rPr>
+              <a:t>,</a:t>
+            </a:r>
+            <a:r>
+              <a:rPr lang="en-US" sz="2400" dirty="0">
+                <a:solidFill>
+                  <a:srgbClr val="000000"/>
+                </a:solidFill>
+                <a:highlight>
+                  <a:srgbClr val="FFFFFF"/>
+                </a:highlight>
+                <a:latin typeface="Consolas" panose="020B0609020204030204" pitchFamily="49" charset="0"/>
+              </a:rPr>
+              <a:t> </a:t>
+            </a:r>
+            <a:r>
+              <a:rPr lang="en-US" sz="2400" dirty="0">
+                <a:solidFill>
+                  <a:srgbClr val="FF0000"/>
+                </a:solidFill>
+                <a:highlight>
+                  <a:srgbClr val="FFFFFF"/>
+                </a:highlight>
+                <a:latin typeface="Consolas" panose="020B0609020204030204" pitchFamily="49" charset="0"/>
+              </a:rPr>
+              <a:t>'Percent Log Used'</a:t>
+            </a:r>
+            <a:r>
+              <a:rPr lang="en-US" sz="2400" dirty="0">
+                <a:solidFill>
+                  <a:srgbClr val="808080"/>
+                </a:solidFill>
+                <a:highlight>
+                  <a:srgbClr val="FFFFFF"/>
+                </a:highlight>
+                <a:latin typeface="Consolas" panose="020B0609020204030204" pitchFamily="49" charset="0"/>
+              </a:rPr>
+              <a:t>,</a:t>
+            </a:r>
+            <a:r>
+              <a:rPr lang="en-US" sz="2400" dirty="0">
+                <a:solidFill>
+                  <a:srgbClr val="000000"/>
+                </a:solidFill>
+                <a:highlight>
+                  <a:srgbClr val="FFFFFF"/>
+                </a:highlight>
+                <a:latin typeface="Consolas" panose="020B0609020204030204" pitchFamily="49" charset="0"/>
+              </a:rPr>
+              <a:t> </a:t>
+            </a:r>
+            <a:r>
+              <a:rPr lang="en-US" sz="2400" dirty="0">
+                <a:solidFill>
+                  <a:srgbClr val="FF0000"/>
+                </a:solidFill>
+                <a:highlight>
+                  <a:srgbClr val="FFFFFF"/>
+                </a:highlight>
+                <a:latin typeface="Consolas" panose="020B0609020204030204" pitchFamily="49" charset="0"/>
+              </a:rPr>
+              <a:t>'Log Flush Waits/sec'</a:t>
+            </a:r>
+            <a:r>
+              <a:rPr lang="en-US" sz="2400" dirty="0">
+                <a:solidFill>
+                  <a:srgbClr val="808080"/>
+                </a:solidFill>
+                <a:highlight>
+                  <a:srgbClr val="FFFFFF"/>
+                </a:highlight>
+                <a:latin typeface="Consolas" panose="020B0609020204030204" pitchFamily="49" charset="0"/>
+              </a:rPr>
+              <a:t>,</a:t>
+            </a:r>
+            <a:r>
+              <a:rPr lang="en-US" sz="2400" dirty="0">
+                <a:solidFill>
+                  <a:srgbClr val="000000"/>
+                </a:solidFill>
+                <a:highlight>
+                  <a:srgbClr val="FFFFFF"/>
+                </a:highlight>
+                <a:latin typeface="Consolas" panose="020B0609020204030204" pitchFamily="49" charset="0"/>
+              </a:rPr>
+              <a:t> </a:t>
+            </a:r>
+            <a:r>
+              <a:rPr lang="en-US" sz="2400" dirty="0">
+                <a:solidFill>
+                  <a:srgbClr val="FF0000"/>
+                </a:solidFill>
+                <a:highlight>
+                  <a:srgbClr val="FFFFFF"/>
+                </a:highlight>
+                <a:latin typeface="Consolas" panose="020B0609020204030204" pitchFamily="49" charset="0"/>
+              </a:rPr>
+              <a:t>'Log Bytes Flushed/sec'</a:t>
+            </a:r>
+            <a:r>
+              <a:rPr lang="en-US" sz="2400" dirty="0">
+                <a:solidFill>
+                  <a:srgbClr val="808080"/>
+                </a:solidFill>
+                <a:highlight>
+                  <a:srgbClr val="FFFFFF"/>
+                </a:highlight>
+                <a:latin typeface="Consolas" panose="020B0609020204030204" pitchFamily="49" charset="0"/>
+              </a:rPr>
+              <a:t>,</a:t>
+            </a:r>
+            <a:r>
+              <a:rPr lang="en-US" sz="2400" dirty="0">
+                <a:solidFill>
+                  <a:srgbClr val="000000"/>
+                </a:solidFill>
+                <a:highlight>
+                  <a:srgbClr val="FFFFFF"/>
+                </a:highlight>
+                <a:latin typeface="Consolas" panose="020B0609020204030204" pitchFamily="49" charset="0"/>
+              </a:rPr>
+              <a:t> </a:t>
+            </a:r>
+            <a:r>
+              <a:rPr lang="en-US" sz="2400" dirty="0">
+                <a:solidFill>
+                  <a:srgbClr val="FF0000"/>
+                </a:solidFill>
+                <a:highlight>
+                  <a:srgbClr val="FFFFFF"/>
+                </a:highlight>
+                <a:latin typeface="Consolas" panose="020B0609020204030204" pitchFamily="49" charset="0"/>
+              </a:rPr>
+              <a:t>'Log Flushes/sec</a:t>
+            </a:r>
+            <a:r>
+              <a:rPr lang="en-US" sz="2400" dirty="0" smtClean="0">
+                <a:solidFill>
+                  <a:srgbClr val="FF0000"/>
+                </a:solidFill>
+                <a:highlight>
+                  <a:srgbClr val="FFFFFF"/>
+                </a:highlight>
+                <a:latin typeface="Consolas" panose="020B0609020204030204" pitchFamily="49" charset="0"/>
+              </a:rPr>
+              <a:t>'</a:t>
+            </a:r>
+            <a:r>
+              <a:rPr lang="en-US" sz="2400" dirty="0" smtClean="0">
+                <a:solidFill>
+                  <a:srgbClr val="808080"/>
+                </a:solidFill>
+                <a:highlight>
+                  <a:srgbClr val="FFFFFF"/>
+                </a:highlight>
+                <a:latin typeface="Consolas" panose="020B0609020204030204" pitchFamily="49" charset="0"/>
+              </a:rPr>
+              <a:t>);</a:t>
+            </a:r>
+            <a:endParaRPr lang="en-US" sz="2400" dirty="0">
+              <a:solidFill>
+                <a:srgbClr val="000000"/>
+              </a:solidFill>
+              <a:highlight>
+                <a:srgbClr val="FFFFFF"/>
+              </a:highlight>
+              <a:latin typeface="Consolas" panose="020B0609020204030204" pitchFamily="49" charset="0"/>
+            </a:endParaRPr>
+          </a:p>
+        </p:txBody>
+      </p:sp>
+      <p:sp>
+        <p:nvSpPr>
+          <p:cNvPr id="4" name="Footer Placeholder 3"/>
+          <p:cNvSpPr>
+            <a:spLocks noGrp="1"/>
+          </p:cNvSpPr>
+          <p:nvPr>
+            <p:ph type="ftr" sz="quarter" idx="3"/>
+          </p:nvPr>
+        </p:nvSpPr>
+        <p:spPr/>
+        <p:txBody>
+          <a:bodyPr/>
+          <a:lstStyle/>
+          <a:p>
+            <a:r>
+              <a:rPr lang="en-US" smtClean="0"/>
+              <a:t>3/25/2017</a:t>
+            </a:r>
+            <a:endParaRPr lang="en-US" dirty="0"/>
+          </a:p>
+        </p:txBody>
+      </p:sp>
+      <p:sp>
+        <p:nvSpPr>
+          <p:cNvPr id="5" name="Slide Number Placeholder 4"/>
+          <p:cNvSpPr>
+            <a:spLocks noGrp="1"/>
+          </p:cNvSpPr>
+          <p:nvPr>
+            <p:ph type="sldNum" sz="quarter" idx="4"/>
+          </p:nvPr>
+        </p:nvSpPr>
+        <p:spPr/>
+        <p:txBody>
+          <a:bodyPr/>
+          <a:lstStyle/>
+          <a:p>
+            <a:fld id="{87FD5303-69AD-2E4D-B18B-E5EED0F0A60B}" type="slidenum">
+              <a:rPr lang="en-US" smtClean="0"/>
+              <a:pPr/>
+              <a:t>52</a:t>
+            </a:fld>
+            <a:r>
+              <a:rPr lang="en-US" smtClean="0"/>
+              <a:t>  |  </a:t>
+            </a:r>
+            <a:endParaRPr lang="en-US" dirty="0"/>
+          </a:p>
+        </p:txBody>
+      </p:sp>
+    </p:spTree>
+    <p:extLst>
+      <p:ext uri="{BB962C8B-B14F-4D97-AF65-F5344CB8AC3E}">
+        <p14:creationId xmlns:p14="http://schemas.microsoft.com/office/powerpoint/2010/main" val="619546189"/>
+      </p:ext>
+    </p:extLst>
+  </p:cSld>
+  <p:clrMapOvr>
+    <a:masterClrMapping/>
+  </p:clrMapOvr>
+  <p:timing>
+    <p:tnLst>
+      <p:par>
+        <p:cTn id="1" dur="indefinite" restart="never" nodeType="tmRoot"/>
+      </p:par>
+    </p:tnLst>
+  </p:timing>
+</p:sld>
+</file>
+
+<file path=ppt/slides/slide53.xml><?xml version="1.0" encoding="utf-8"?>
 <p:sld xmlns:a="http://schemas.openxmlformats.org/drawingml/2006/main" xmlns:r="http://schemas.openxmlformats.org/officeDocument/2006/relationships" xmlns:p="http://schemas.openxmlformats.org/presentationml/2006/main">
   <p:cSld>
     <p:spTree>

</xml_diff>

<commit_message>
Reformat slide deck after applying new template.
</commit_message>
<xml_diff>
--- a/TransactionLog.pptx
+++ b/TransactionLog.pptx
@@ -264,7 +264,7 @@
           <a:p>
             <a:fld id="{18BF2EA9-CFC8-45FA-BD4C-CF2CA22F3AA1}" type="datetimeFigureOut">
               <a:rPr lang="en-US" smtClean="0"/>
-              <a:t>8/1/2017</a:t>
+              <a:t>08/02/2017</a:t>
             </a:fld>
             <a:endParaRPr lang="en-US"/>
           </a:p>
@@ -1749,7 +1749,7 @@
           <a:graphicData uri="http://schemas.openxmlformats.org/presentationml/2006/ole">
             <mc:AlternateContent xmlns:mc="http://schemas.openxmlformats.org/markup-compatibility/2006">
               <mc:Choice xmlns:v="urn:schemas-microsoft-com:vml" Requires="v">
-                <p:oleObj spid="_x0000_s1032" name="Image" r:id="rId10" imgW="2279520" imgH="1310400" progId="Photoshop.Image.18">
+                <p:oleObj spid="_x0000_s1034" name="Image" r:id="rId10" imgW="2279520" imgH="1310400" progId="Photoshop.Image.18">
                   <p:embed/>
                 </p:oleObj>
               </mc:Choice>
@@ -2127,7 +2127,7 @@
           <p:cNvPr id="2" name="Title 1">
             <a:extLst>
               <a:ext uri="{FF2B5EF4-FFF2-40B4-BE49-F238E27FC236}">
-                <a16:creationId xmlns:a16="http://schemas.microsoft.com/office/drawing/2014/main" id="{83E7BC17-A4CB-4C5C-8189-2BD06BE3E485}"/>
+                <a16:creationId xmlns:a16="http://schemas.microsoft.com/office/drawing/2014/main" xmlns="" id="{83E7BC17-A4CB-4C5C-8189-2BD06BE3E485}"/>
               </a:ext>
             </a:extLst>
           </p:cNvPr>
@@ -2189,7 +2189,7 @@
           <p:cNvPr id="3" name="Text Placeholder 2">
             <a:extLst>
               <a:ext uri="{FF2B5EF4-FFF2-40B4-BE49-F238E27FC236}">
-                <a16:creationId xmlns:a16="http://schemas.microsoft.com/office/drawing/2014/main" id="{580DE922-DD41-46E4-A789-EAF96778ABA6}"/>
+                <a16:creationId xmlns:a16="http://schemas.microsoft.com/office/drawing/2014/main" xmlns="" id="{580DE922-DD41-46E4-A789-EAF96778ABA6}"/>
               </a:ext>
             </a:extLst>
           </p:cNvPr>
@@ -2217,7 +2217,7 @@
           <p:cNvPr id="5" name="TextBox 4">
             <a:extLst>
               <a:ext uri="{FF2B5EF4-FFF2-40B4-BE49-F238E27FC236}">
-                <a16:creationId xmlns:a16="http://schemas.microsoft.com/office/drawing/2014/main" id="{13C0FC99-58B7-4BAC-A4C4-1F44433F31BD}"/>
+                <a16:creationId xmlns:a16="http://schemas.microsoft.com/office/drawing/2014/main" xmlns="" id="{13C0FC99-58B7-4BAC-A4C4-1F44433F31BD}"/>
               </a:ext>
             </a:extLst>
           </p:cNvPr>
@@ -2226,7 +2226,7 @@
         </p:nvSpPr>
         <p:spPr>
           <a:xfrm>
-            <a:off x="8392886" y="1796144"/>
+            <a:off x="8392092" y="5196483"/>
             <a:ext cx="2768033" cy="923330"/>
           </a:xfrm>
           <a:prstGeom prst="rect">
@@ -2327,7 +2327,7 @@
         <p:spPr>
           <a:xfrm>
             <a:off x="5553239" y="1512041"/>
-            <a:ext cx="4095111" cy="4276616"/>
+            <a:ext cx="5009363" cy="4276616"/>
           </a:xfrm>
           <a:noFill/>
         </p:spPr>
@@ -2337,13 +2337,20 @@
           </a:bodyPr>
           <a:lstStyle/>
           <a:p>
+            <a:pPr marL="571500" indent="-571500">
+              <a:buFont typeface="Arial" panose="020B0604020202020204" pitchFamily="34" charset="0"/>
+              <a:buChar char="•"/>
+            </a:pPr>
             <a:r>
               <a:rPr lang="en-US" dirty="0"/>
               <a:t>VLFs can be in one of several statuses:</a:t>
             </a:r>
           </a:p>
           <a:p>
-            <a:pPr lvl="1"/>
+            <a:pPr marL="1033227" lvl="1" indent="-457200">
+              <a:buFont typeface="Arial" panose="020B0604020202020204" pitchFamily="34" charset="0"/>
+              <a:buChar char="•"/>
+            </a:pPr>
             <a:r>
               <a:rPr lang="en-US" dirty="0">
                 <a:solidFill>
@@ -2354,7 +2361,10 @@
             </a:r>
           </a:p>
           <a:p>
-            <a:pPr lvl="1"/>
+            <a:pPr marL="1033227" lvl="1" indent="-457200">
+              <a:buFont typeface="Arial" panose="020B0604020202020204" pitchFamily="34" charset="0"/>
+              <a:buChar char="•"/>
+            </a:pPr>
             <a:r>
               <a:rPr lang="en-US" dirty="0">
                 <a:solidFill>
@@ -2365,7 +2375,10 @@
             </a:r>
           </a:p>
           <a:p>
-            <a:pPr lvl="1"/>
+            <a:pPr marL="1033227" lvl="1" indent="-457200">
+              <a:buFont typeface="Arial" panose="020B0604020202020204" pitchFamily="34" charset="0"/>
+              <a:buChar char="•"/>
+            </a:pPr>
             <a:r>
               <a:rPr lang="en-US" dirty="0">
                 <a:solidFill>
@@ -2376,7 +2389,10 @@
             </a:r>
           </a:p>
           <a:p>
-            <a:pPr lvl="1"/>
+            <a:pPr marL="1033227" lvl="1" indent="-457200">
+              <a:buFont typeface="Arial" panose="020B0604020202020204" pitchFamily="34" charset="0"/>
+              <a:buChar char="•"/>
+            </a:pPr>
             <a:r>
               <a:rPr lang="en-US" dirty="0">
                 <a:solidFill>
@@ -2387,6 +2403,10 @@
             </a:r>
           </a:p>
           <a:p>
+            <a:pPr marL="571500" indent="-571500">
+              <a:buFont typeface="Arial" panose="020B0604020202020204" pitchFamily="34" charset="0"/>
+              <a:buChar char="•"/>
+            </a:pPr>
             <a:r>
               <a:rPr lang="en-US" dirty="0"/>
               <a:t>Only one VLF is current at a time.</a:t>
@@ -2483,23 +2503,30 @@
         <p:spPr>
           <a:xfrm>
             <a:off x="5553239" y="1512041"/>
-            <a:ext cx="4095111" cy="4276616"/>
+            <a:ext cx="4940997" cy="4276616"/>
           </a:xfrm>
           <a:noFill/>
         </p:spPr>
         <p:txBody>
           <a:bodyPr>
-            <a:normAutofit fontScale="85000" lnSpcReduction="20000"/>
+            <a:normAutofit fontScale="85000" lnSpcReduction="10000"/>
           </a:bodyPr>
           <a:lstStyle/>
           <a:p>
+            <a:pPr marL="571500" indent="-571500">
+              <a:buFont typeface="Arial" panose="020B0604020202020204" pitchFamily="34" charset="0"/>
+              <a:buChar char="•"/>
+            </a:pPr>
             <a:r>
               <a:rPr lang="en-US" dirty="0"/>
               <a:t>VLFs can be in one of several statuses:</a:t>
             </a:r>
           </a:p>
           <a:p>
-            <a:pPr lvl="1"/>
+            <a:pPr marL="1033227" lvl="1" indent="-457200">
+              <a:buFont typeface="Arial" panose="020B0604020202020204" pitchFamily="34" charset="0"/>
+              <a:buChar char="•"/>
+            </a:pPr>
             <a:r>
               <a:rPr lang="en-US" dirty="0">
                 <a:solidFill>
@@ -2510,7 +2537,10 @@
             </a:r>
           </a:p>
           <a:p>
-            <a:pPr lvl="1"/>
+            <a:pPr marL="1033227" lvl="1" indent="-457200">
+              <a:buFont typeface="Arial" panose="020B0604020202020204" pitchFamily="34" charset="0"/>
+              <a:buChar char="•"/>
+            </a:pPr>
             <a:r>
               <a:rPr lang="en-US" dirty="0">
                 <a:solidFill>
@@ -2521,7 +2551,10 @@
             </a:r>
           </a:p>
           <a:p>
-            <a:pPr lvl="1"/>
+            <a:pPr marL="1033227" lvl="1" indent="-457200">
+              <a:buFont typeface="Arial" panose="020B0604020202020204" pitchFamily="34" charset="0"/>
+              <a:buChar char="•"/>
+            </a:pPr>
             <a:r>
               <a:rPr lang="en-US" dirty="0">
                 <a:solidFill>
@@ -2532,7 +2565,10 @@
             </a:r>
           </a:p>
           <a:p>
-            <a:pPr lvl="1"/>
+            <a:pPr marL="1033227" lvl="1" indent="-457200">
+              <a:buFont typeface="Arial" panose="020B0604020202020204" pitchFamily="34" charset="0"/>
+              <a:buChar char="•"/>
+            </a:pPr>
             <a:r>
               <a:rPr lang="en-US" dirty="0">
                 <a:solidFill>
@@ -2543,12 +2579,20 @@
             </a:r>
           </a:p>
           <a:p>
+            <a:pPr marL="571500" indent="-571500">
+              <a:buFont typeface="Arial" panose="020B0604020202020204" pitchFamily="34" charset="0"/>
+              <a:buChar char="•"/>
+            </a:pPr>
             <a:r>
               <a:rPr lang="en-US" dirty="0"/>
               <a:t>Only one VLF is current at a time.</a:t>
             </a:r>
           </a:p>
           <a:p>
+            <a:pPr marL="571500" indent="-571500">
+              <a:buFont typeface="Arial" panose="020B0604020202020204" pitchFamily="34" charset="0"/>
+              <a:buChar char="•"/>
+            </a:pPr>
             <a:r>
               <a:rPr lang="en-US" dirty="0"/>
               <a:t>VLFs are numbered.</a:t>
@@ -2648,7 +2692,7 @@
         <p:spPr>
           <a:xfrm>
             <a:off x="5553239" y="1512041"/>
-            <a:ext cx="4095111" cy="4276616"/>
+            <a:ext cx="4770081" cy="4276616"/>
           </a:xfrm>
           <a:noFill/>
         </p:spPr>
@@ -2656,6 +2700,10 @@
           <a:bodyPr/>
           <a:lstStyle/>
           <a:p>
+            <a:pPr marL="571500" indent="-571500">
+              <a:buFont typeface="Arial" panose="020B0604020202020204" pitchFamily="34" charset="0"/>
+              <a:buChar char="•"/>
+            </a:pPr>
             <a:r>
               <a:rPr lang="en-US" dirty="0"/>
               <a:t>As more records are added to the log, additional VLFs are allocated.</a:t>
@@ -2757,7 +2805,7 @@
         <p:spPr>
           <a:xfrm>
             <a:off x="5553239" y="1512041"/>
-            <a:ext cx="4095111" cy="4276616"/>
+            <a:ext cx="4778626" cy="4276616"/>
           </a:xfrm>
           <a:noFill/>
         </p:spPr>
@@ -2765,6 +2813,10 @@
           <a:bodyPr/>
           <a:lstStyle/>
           <a:p>
+            <a:pPr marL="571500" indent="-571500">
+              <a:buFont typeface="Arial" panose="020B0604020202020204" pitchFamily="34" charset="0"/>
+              <a:buChar char="•"/>
+            </a:pPr>
             <a:r>
               <a:rPr lang="en-US" dirty="0"/>
               <a:t>As more records are added to the log, additional VLFs are allocated.</a:t>
@@ -2866,28 +2918,40 @@
         <p:spPr>
           <a:xfrm>
             <a:off x="5553239" y="1512041"/>
-            <a:ext cx="4095111" cy="4276616"/>
+            <a:ext cx="4881176" cy="4276616"/>
           </a:xfrm>
           <a:noFill/>
         </p:spPr>
         <p:txBody>
           <a:bodyPr>
-            <a:normAutofit fontScale="92500"/>
+            <a:normAutofit lnSpcReduction="10000"/>
           </a:bodyPr>
           <a:lstStyle/>
           <a:p>
+            <a:pPr marL="571500" indent="-571500">
+              <a:buFont typeface="Arial" panose="020B0604020202020204" pitchFamily="34" charset="0"/>
+              <a:buChar char="•"/>
+            </a:pPr>
             <a:r>
               <a:rPr lang="en-US" dirty="0"/>
               <a:t>As more records are added to the log, additional VLFs are put in use.</a:t>
             </a:r>
           </a:p>
           <a:p>
+            <a:pPr marL="571500" indent="-571500">
+              <a:buFont typeface="Arial" panose="020B0604020202020204" pitchFamily="34" charset="0"/>
+              <a:buChar char="•"/>
+            </a:pPr>
             <a:r>
               <a:rPr lang="en-US" dirty="0"/>
               <a:t>Writing to the log is circular so long as VLF are available.</a:t>
             </a:r>
           </a:p>
           <a:p>
+            <a:pPr marL="571500" indent="-571500">
+              <a:buFont typeface="Arial" panose="020B0604020202020204" pitchFamily="34" charset="0"/>
+              <a:buChar char="•"/>
+            </a:pPr>
             <a:r>
               <a:rPr lang="en-US" dirty="0"/>
               <a:t>What happens next?</a:t>
@@ -2983,8 +3047,8 @@
         </p:nvSpPr>
         <p:spPr>
           <a:xfrm>
-            <a:off x="5553239" y="1512041"/>
-            <a:ext cx="4095111" cy="4276616"/>
+            <a:off x="4836920" y="1512041"/>
+            <a:ext cx="5623133" cy="4276616"/>
           </a:xfrm>
           <a:noFill/>
         </p:spPr>
@@ -2992,18 +3056,30 @@
           <a:bodyPr/>
           <a:lstStyle/>
           <a:p>
+            <a:pPr marL="571500" indent="-571500">
+              <a:buFont typeface="Arial" panose="020B0604020202020204" pitchFamily="34" charset="0"/>
+              <a:buChar char="•"/>
+            </a:pPr>
             <a:r>
               <a:rPr lang="en-US" dirty="0"/>
               <a:t>The log file has to grow</a:t>
             </a:r>
           </a:p>
           <a:p>
+            <a:pPr marL="571500" indent="-571500">
+              <a:buFont typeface="Arial" panose="020B0604020202020204" pitchFamily="34" charset="0"/>
+              <a:buChar char="•"/>
+            </a:pPr>
             <a:r>
               <a:rPr lang="en-US" dirty="0"/>
               <a:t>More VLFs are added</a:t>
             </a:r>
           </a:p>
           <a:p>
+            <a:pPr marL="571500" indent="-571500">
+              <a:buFont typeface="Arial" panose="020B0604020202020204" pitchFamily="34" charset="0"/>
+              <a:buChar char="•"/>
+            </a:pPr>
             <a:endParaRPr lang="en-US" dirty="0"/>
           </a:p>
         </p:txBody>
@@ -3096,8 +3172,8 @@
         </p:nvSpPr>
         <p:spPr>
           <a:xfrm>
-            <a:off x="5553239" y="1512041"/>
-            <a:ext cx="4095111" cy="4276616"/>
+            <a:off x="4828374" y="1512041"/>
+            <a:ext cx="5383849" cy="4276616"/>
           </a:xfrm>
           <a:noFill/>
         </p:spPr>
@@ -3105,24 +3181,40 @@
           <a:bodyPr/>
           <a:lstStyle/>
           <a:p>
+            <a:pPr marL="571500" indent="-571500">
+              <a:buFont typeface="Arial" panose="020B0604020202020204" pitchFamily="34" charset="0"/>
+              <a:buChar char="•"/>
+            </a:pPr>
             <a:r>
               <a:rPr lang="en-US" dirty="0"/>
               <a:t>The log file has to grow</a:t>
             </a:r>
           </a:p>
           <a:p>
+            <a:pPr marL="571500" indent="-571500">
+              <a:buFont typeface="Arial" panose="020B0604020202020204" pitchFamily="34" charset="0"/>
+              <a:buChar char="•"/>
+            </a:pPr>
             <a:r>
               <a:rPr lang="en-US" dirty="0"/>
               <a:t>More VLFs are added</a:t>
             </a:r>
           </a:p>
           <a:p>
+            <a:pPr marL="571500" indent="-571500">
+              <a:buFont typeface="Arial" panose="020B0604020202020204" pitchFamily="34" charset="0"/>
+              <a:buChar char="•"/>
+            </a:pPr>
             <a:r>
               <a:rPr lang="en-US" dirty="0"/>
               <a:t>Eventually the log will be “truncated” or “cleared”</a:t>
             </a:r>
           </a:p>
           <a:p>
+            <a:pPr marL="571500" indent="-571500">
+              <a:buFont typeface="Arial" panose="020B0604020202020204" pitchFamily="34" charset="0"/>
+              <a:buChar char="•"/>
+            </a:pPr>
             <a:endParaRPr lang="en-US" dirty="0"/>
           </a:p>
         </p:txBody>
@@ -3215,8 +3307,8 @@
         </p:nvSpPr>
         <p:spPr>
           <a:xfrm>
-            <a:off x="5553239" y="1512041"/>
-            <a:ext cx="4095111" cy="1052157"/>
+            <a:off x="5836777" y="1512041"/>
+            <a:ext cx="4178893" cy="1052157"/>
           </a:xfrm>
         </p:spPr>
         <p:txBody>
@@ -3225,6 +3317,10 @@
           </a:bodyPr>
           <a:lstStyle/>
           <a:p>
+            <a:pPr marL="571500" indent="-571500">
+              <a:buFont typeface="Arial" panose="020B0604020202020204" pitchFamily="34" charset="0"/>
+              <a:buChar char="•"/>
+            </a:pPr>
             <a:r>
               <a:rPr lang="en-US" dirty="0"/>
               <a:t>VLFs are also structured</a:t>
@@ -3380,27 +3476,40 @@
         </p:nvSpPr>
         <p:spPr>
           <a:xfrm>
-            <a:off x="1872140" y="3587950"/>
-            <a:ext cx="7776210" cy="2200706"/>
+            <a:off x="1333143" y="3738185"/>
+            <a:ext cx="8691073" cy="2200706"/>
           </a:xfrm>
         </p:spPr>
         <p:txBody>
-          <a:bodyPr/>
+          <a:bodyPr>
+            <a:normAutofit/>
+          </a:bodyPr>
           <a:lstStyle/>
           <a:p>
+            <a:pPr marL="571500" indent="-571500">
+              <a:buFont typeface="Arial" panose="020B0604020202020204" pitchFamily="34" charset="0"/>
+              <a:buChar char="•"/>
+            </a:pPr>
             <a:r>
               <a:rPr lang="en-US" dirty="0"/>
               <a:t>Again there is a header</a:t>
             </a:r>
           </a:p>
           <a:p>
+            <a:pPr marL="571500" indent="-571500">
+              <a:buFont typeface="Arial" panose="020B0604020202020204" pitchFamily="34" charset="0"/>
+              <a:buChar char="•"/>
+            </a:pPr>
             <a:r>
               <a:rPr lang="en-US" dirty="0"/>
               <a:t>Then a series of log blocks</a:t>
             </a:r>
           </a:p>
           <a:p>
-            <a:pPr lvl="1"/>
+            <a:pPr marL="1033227" lvl="1" indent="-457200">
+              <a:buFont typeface="Arial" panose="020B0604020202020204" pitchFamily="34" charset="0"/>
+              <a:buChar char="•"/>
+            </a:pPr>
             <a:r>
               <a:rPr lang="en-US" dirty="0"/>
               <a:t>In 512 byte increments up to 60K in size</a:t>
@@ -3496,40 +3605,50 @@
         </p:nvSpPr>
         <p:spPr>
           <a:xfrm>
-            <a:off x="1872140" y="3587950"/>
-            <a:ext cx="7776210" cy="2200706"/>
+            <a:off x="880216" y="3738185"/>
+            <a:ext cx="9443103" cy="2200706"/>
           </a:xfrm>
         </p:spPr>
         <p:txBody>
           <a:bodyPr>
-            <a:normAutofit fontScale="85000" lnSpcReduction="10000"/>
+            <a:normAutofit fontScale="92500" lnSpcReduction="10000"/>
           </a:bodyPr>
           <a:lstStyle/>
           <a:p>
+            <a:pPr marL="571500" indent="-571500">
+              <a:buFont typeface="Arial" panose="020B0604020202020204" pitchFamily="34" charset="0"/>
+              <a:buChar char="•"/>
+            </a:pPr>
             <a:r>
               <a:rPr lang="en-US" dirty="0"/>
               <a:t>As expected, starts with a header</a:t>
             </a:r>
           </a:p>
           <a:p>
+            <a:pPr marL="571500" indent="-571500">
+              <a:buFont typeface="Arial" panose="020B0604020202020204" pitchFamily="34" charset="0"/>
+              <a:buChar char="•"/>
+            </a:pPr>
             <a:r>
               <a:rPr lang="en-US" dirty="0"/>
               <a:t>Then a series of log records</a:t>
             </a:r>
           </a:p>
           <a:p>
-            <a:pPr lvl="1"/>
-            <a:r>
-              <a:rPr lang="en-US" dirty="0"/>
-              <a:t>Completely variable </a:t>
-            </a:r>
-            <a:r>
-              <a:rPr lang="en-US"/>
-              <a:t>in size</a:t>
-            </a:r>
-            <a:endParaRPr lang="en-US" dirty="0"/>
-          </a:p>
-          <a:p>
+            <a:pPr marL="1033227" lvl="1" indent="-457200">
+              <a:buFont typeface="Arial" panose="020B0604020202020204" pitchFamily="34" charset="0"/>
+              <a:buChar char="•"/>
+            </a:pPr>
+            <a:r>
+              <a:rPr lang="en-US" dirty="0"/>
+              <a:t>Completely variable in size</a:t>
+            </a:r>
+          </a:p>
+          <a:p>
+            <a:pPr marL="571500" indent="-571500">
+              <a:buFont typeface="Arial" panose="020B0604020202020204" pitchFamily="34" charset="0"/>
+              <a:buChar char="•"/>
+            </a:pPr>
             <a:r>
               <a:rPr lang="en-US" dirty="0"/>
               <a:t>And an index to the log records (slot array)</a:t>
@@ -4635,8 +4754,8 @@
         </p:nvSpPr>
         <p:spPr>
           <a:xfrm>
-            <a:off x="1872140" y="3587950"/>
-            <a:ext cx="7776210" cy="2200706"/>
+            <a:off x="1008403" y="3587950"/>
+            <a:ext cx="9408919" cy="2200706"/>
           </a:xfrm>
         </p:spPr>
         <p:txBody>
@@ -4645,26 +4764,40 @@
           </a:bodyPr>
           <a:lstStyle/>
           <a:p>
+            <a:pPr marL="571500" indent="-571500">
+              <a:buFont typeface="Arial" panose="020B0604020202020204" pitchFamily="34" charset="0"/>
+              <a:buChar char="•"/>
+            </a:pPr>
             <a:r>
               <a:rPr lang="en-US" dirty="0"/>
               <a:t>Of course, a header</a:t>
             </a:r>
           </a:p>
           <a:p>
-            <a:pPr lvl="1"/>
+            <a:pPr marL="1033227" lvl="1" indent="-457200">
+              <a:buFont typeface="Arial" panose="020B0604020202020204" pitchFamily="34" charset="0"/>
+              <a:buChar char="•"/>
+            </a:pPr>
             <a:r>
               <a:rPr lang="en-US" dirty="0"/>
               <a:t>Record type, transaction ID, length, pointer to previous transaction record, etc.</a:t>
             </a:r>
           </a:p>
           <a:p>
+            <a:pPr marL="571500" indent="-571500">
+              <a:buFont typeface="Arial" panose="020B0604020202020204" pitchFamily="34" charset="0"/>
+              <a:buChar char="•"/>
+            </a:pPr>
             <a:r>
               <a:rPr lang="en-US" dirty="0"/>
               <a:t>Payload</a:t>
             </a:r>
           </a:p>
           <a:p>
-            <a:pPr lvl="1"/>
+            <a:pPr marL="1033227" lvl="1" indent="-457200">
+              <a:buFont typeface="Arial" panose="020B0604020202020204" pitchFamily="34" charset="0"/>
+              <a:buChar char="•"/>
+            </a:pPr>
             <a:r>
               <a:rPr lang="en-US" dirty="0"/>
               <a:t>Before/after image of changes</a:t>
@@ -4765,42 +4898,79 @@
           </a:bodyPr>
           <a:lstStyle/>
           <a:p>
+            <a:pPr marL="571500" indent="-571500">
+              <a:buFont typeface="Arial" panose="020B0604020202020204" pitchFamily="34" charset="0"/>
+              <a:buChar char="•"/>
+            </a:pPr>
             <a:r>
               <a:rPr lang="en-US" dirty="0"/>
               <a:t>Each log record can be uniquely identified by its Log Sequence Number (LSN)</a:t>
             </a:r>
           </a:p>
           <a:p>
+            <a:pPr marL="571500" indent="-571500">
+              <a:buFont typeface="Arial" panose="020B0604020202020204" pitchFamily="34" charset="0"/>
+              <a:buChar char="•"/>
+            </a:pPr>
             <a:r>
               <a:rPr lang="en-US" dirty="0"/>
               <a:t>An LSN is composed of three parts</a:t>
             </a:r>
           </a:p>
           <a:p>
-            <a:pPr lvl="1"/>
+            <a:pPr marL="1033227" lvl="1" indent="-457200">
+              <a:buFont typeface="Arial" panose="020B0604020202020204" pitchFamily="34" charset="0"/>
+              <a:buChar char="•"/>
+            </a:pPr>
             <a:r>
               <a:rPr lang="en-US" dirty="0"/>
               <a:t>VLF number</a:t>
             </a:r>
           </a:p>
           <a:p>
-            <a:pPr lvl="1"/>
+            <a:pPr marL="1033227" lvl="1" indent="-457200">
+              <a:buFont typeface="Arial" panose="020B0604020202020204" pitchFamily="34" charset="0"/>
+              <a:buChar char="•"/>
+            </a:pPr>
             <a:r>
               <a:rPr lang="en-US" dirty="0"/>
               <a:t>Log Block offset (512-byte chunks, not necessarily contiguous)</a:t>
             </a:r>
           </a:p>
           <a:p>
-            <a:pPr lvl="1"/>
+            <a:pPr marL="1033227" lvl="1" indent="-457200">
+              <a:buFont typeface="Arial" panose="020B0604020202020204" pitchFamily="34" charset="0"/>
+              <a:buChar char="•"/>
+            </a:pPr>
             <a:r>
               <a:rPr lang="en-US" dirty="0"/>
               <a:t>Log Record number (slot number)</a:t>
             </a:r>
           </a:p>
           <a:p>
-            <a:r>
-              <a:rPr lang="en-US" dirty="0"/>
-              <a:t>The LSN is in a very real way a pointer into the (logical) log file</a:t>
+            <a:pPr marL="571500" indent="-571500">
+              <a:buFont typeface="Arial" panose="020B0604020202020204" pitchFamily="34" charset="0"/>
+              <a:buChar char="•"/>
+            </a:pPr>
+            <a:r>
+              <a:rPr lang="en-US" dirty="0"/>
+              <a:t>The LSN </a:t>
+            </a:r>
+            <a:r>
+              <a:rPr lang="en-US" dirty="0" smtClean="0"/>
+              <a:t>is, </a:t>
+            </a:r>
+            <a:r>
+              <a:rPr lang="en-US" dirty="0"/>
+              <a:t>in a very real </a:t>
+            </a:r>
+            <a:r>
+              <a:rPr lang="en-US" dirty="0" smtClean="0"/>
+              <a:t>way, </a:t>
+            </a:r>
+            <a:r>
+              <a:rPr lang="en-US" dirty="0"/>
+              <a:t>a pointer into the (logical) log file</a:t>
             </a:r>
           </a:p>
         </p:txBody>
@@ -4912,21 +5082,21 @@
                 <a:gridCol w="4304521">
                   <a:extLst>
                     <a:ext uri="{9D8B030D-6E8A-4147-A177-3AD203B41FA5}">
-                      <a16:colId xmlns:a16="http://schemas.microsoft.com/office/drawing/2014/main" val="20000"/>
+                      <a16:colId xmlns:a16="http://schemas.microsoft.com/office/drawing/2014/main" xmlns="" val="20000"/>
                     </a:ext>
                   </a:extLst>
                 </a:gridCol>
                 <a:gridCol w="3525078">
                   <a:extLst>
                     <a:ext uri="{9D8B030D-6E8A-4147-A177-3AD203B41FA5}">
-                      <a16:colId xmlns:a16="http://schemas.microsoft.com/office/drawing/2014/main" val="20001"/>
+                      <a16:colId xmlns:a16="http://schemas.microsoft.com/office/drawing/2014/main" xmlns="" val="20001"/>
                     </a:ext>
                   </a:extLst>
                 </a:gridCol>
                 <a:gridCol w="2970400">
                   <a:extLst>
                     <a:ext uri="{9D8B030D-6E8A-4147-A177-3AD203B41FA5}">
-                      <a16:colId xmlns:a16="http://schemas.microsoft.com/office/drawing/2014/main" val="20002"/>
+                      <a16:colId xmlns:a16="http://schemas.microsoft.com/office/drawing/2014/main" xmlns="" val="20002"/>
                     </a:ext>
                   </a:extLst>
                 </a:gridCol>
@@ -4973,7 +5143,7 @@
                 </a:tc>
                 <a:extLst>
                   <a:ext uri="{0D108BD9-81ED-4DB2-BD59-A6C34878D82A}">
-                    <a16:rowId xmlns:a16="http://schemas.microsoft.com/office/drawing/2014/main" val="10000"/>
+                    <a16:rowId xmlns:a16="http://schemas.microsoft.com/office/drawing/2014/main" xmlns="" val="10000"/>
                   </a:ext>
                 </a:extLst>
               </a:tr>
@@ -5036,7 +5206,7 @@
                 </a:tc>
                 <a:extLst>
                   <a:ext uri="{0D108BD9-81ED-4DB2-BD59-A6C34878D82A}">
-                    <a16:rowId xmlns:a16="http://schemas.microsoft.com/office/drawing/2014/main" val="10001"/>
+                    <a16:rowId xmlns:a16="http://schemas.microsoft.com/office/drawing/2014/main" xmlns="" val="10001"/>
                   </a:ext>
                 </a:extLst>
               </a:tr>
@@ -5107,7 +5277,7 @@
                 </a:tc>
                 <a:extLst>
                   <a:ext uri="{0D108BD9-81ED-4DB2-BD59-A6C34878D82A}">
-                    <a16:rowId xmlns:a16="http://schemas.microsoft.com/office/drawing/2014/main" val="10002"/>
+                    <a16:rowId xmlns:a16="http://schemas.microsoft.com/office/drawing/2014/main" xmlns="" val="10002"/>
                   </a:ext>
                 </a:extLst>
               </a:tr>
@@ -5153,7 +5323,7 @@
                 </a:tc>
                 <a:extLst>
                   <a:ext uri="{0D108BD9-81ED-4DB2-BD59-A6C34878D82A}">
-                    <a16:rowId xmlns:a16="http://schemas.microsoft.com/office/drawing/2014/main" val="10003"/>
+                    <a16:rowId xmlns:a16="http://schemas.microsoft.com/office/drawing/2014/main" xmlns="" val="10003"/>
                   </a:ext>
                 </a:extLst>
               </a:tr>
@@ -5204,7 +5374,7 @@
                 </a:tc>
                 <a:extLst>
                   <a:ext uri="{0D108BD9-81ED-4DB2-BD59-A6C34878D82A}">
-                    <a16:rowId xmlns:a16="http://schemas.microsoft.com/office/drawing/2014/main" val="3543017676"/>
+                    <a16:rowId xmlns:a16="http://schemas.microsoft.com/office/drawing/2014/main" xmlns="" val="3543017676"/>
                   </a:ext>
                 </a:extLst>
               </a:tr>
@@ -5988,19 +6158,30 @@
           <a:bodyPr/>
           <a:lstStyle/>
           <a:p>
+            <a:pPr marL="571500" indent="-571500">
+              <a:buFont typeface="Arial" panose="020B0604020202020204" pitchFamily="34" charset="0"/>
+              <a:buChar char="•"/>
+            </a:pPr>
             <a:r>
               <a:rPr lang="en-US" dirty="0"/>
               <a:t>DBCC SQLPERF(LOGSPACE)</a:t>
             </a:r>
           </a:p>
           <a:p>
-            <a:pPr lvl="1"/>
+            <a:pPr marL="1033227" lvl="1" indent="-457200">
+              <a:buFont typeface="Arial" panose="020B0604020202020204" pitchFamily="34" charset="0"/>
+              <a:buChar char="•"/>
+            </a:pPr>
             <a:r>
               <a:rPr lang="en-US" dirty="0"/>
               <a:t>Log size, percent used per database</a:t>
             </a:r>
           </a:p>
           <a:p>
+            <a:pPr marL="571500" indent="-571500">
+              <a:buFont typeface="Arial" panose="020B0604020202020204" pitchFamily="34" charset="0"/>
+              <a:buChar char="•"/>
+            </a:pPr>
             <a:r>
               <a:rPr lang="en-US" dirty="0" err="1"/>
               <a:t>fn_dump_dblog</a:t>
@@ -6008,7 +6189,10 @@
             <a:endParaRPr lang="en-US" dirty="0"/>
           </a:p>
           <a:p>
-            <a:pPr lvl="1"/>
+            <a:pPr marL="1033227" lvl="1" indent="-457200">
+              <a:buFont typeface="Arial" panose="020B0604020202020204" pitchFamily="34" charset="0"/>
+              <a:buChar char="•"/>
+            </a:pPr>
             <a:r>
               <a:rPr lang="en-US" dirty="0"/>
               <a:t>Similar to </a:t>
@@ -6019,13 +6203,8 @@
             </a:r>
             <a:r>
               <a:rPr lang="en-US" dirty="0"/>
-              <a:t>, but reads </a:t>
-            </a:r>
-            <a:r>
-              <a:rPr lang="en-US"/>
-              <a:t>from backup file</a:t>
-            </a:r>
-            <a:endParaRPr lang="en-US" dirty="0"/>
+              <a:t>, but reads from backup file</a:t>
+            </a:r>
           </a:p>
         </p:txBody>
       </p:sp>
@@ -6096,13 +6275,20 @@
           <a:bodyPr/>
           <a:lstStyle/>
           <a:p>
+            <a:pPr marL="571500" indent="-571500">
+              <a:buFont typeface="Arial" panose="020B0604020202020204" pitchFamily="34" charset="0"/>
+              <a:buChar char="•"/>
+            </a:pPr>
             <a:r>
               <a:rPr lang="en-US" dirty="0"/>
               <a:t>Process of writing dirty pages from the buffer pool to disk</a:t>
             </a:r>
           </a:p>
           <a:p>
-            <a:pPr lvl="1"/>
+            <a:pPr marL="1033227" lvl="1" indent="-457200">
+              <a:buFont typeface="Arial" panose="020B0604020202020204" pitchFamily="34" charset="0"/>
+              <a:buChar char="•"/>
+            </a:pPr>
             <a:r>
               <a:rPr lang="en-US" dirty="0"/>
               <a:t>Irrespective of transaction completion</a:t>
@@ -6180,36 +6366,60 @@
           <a:bodyPr/>
           <a:lstStyle/>
           <a:p>
+            <a:pPr marL="571500" indent="-571500">
+              <a:buFont typeface="Arial" panose="020B0604020202020204" pitchFamily="34" charset="0"/>
+              <a:buChar char="•"/>
+            </a:pPr>
             <a:r>
               <a:rPr lang="en-US" dirty="0"/>
               <a:t>Purpose of the transaction log</a:t>
             </a:r>
           </a:p>
           <a:p>
+            <a:pPr marL="571500" indent="-571500">
+              <a:buFont typeface="Arial" panose="020B0604020202020204" pitchFamily="34" charset="0"/>
+              <a:buChar char="•"/>
+            </a:pPr>
             <a:r>
               <a:rPr lang="en-US" dirty="0"/>
               <a:t>Organization of the transaction log</a:t>
             </a:r>
           </a:p>
           <a:p>
+            <a:pPr marL="571500" indent="-571500">
+              <a:buFont typeface="Arial" panose="020B0604020202020204" pitchFamily="34" charset="0"/>
+              <a:buChar char="•"/>
+            </a:pPr>
             <a:r>
               <a:rPr lang="en-US" dirty="0"/>
               <a:t>Flushing &amp; clearing the log / checkpoints</a:t>
             </a:r>
           </a:p>
           <a:p>
+            <a:pPr marL="571500" indent="-571500">
+              <a:buFont typeface="Arial" panose="020B0604020202020204" pitchFamily="34" charset="0"/>
+              <a:buChar char="•"/>
+            </a:pPr>
             <a:r>
               <a:rPr lang="en-US" dirty="0"/>
               <a:t>Rollback operations</a:t>
             </a:r>
           </a:p>
           <a:p>
+            <a:pPr marL="571500" indent="-571500">
+              <a:buFont typeface="Arial" panose="020B0604020202020204" pitchFamily="34" charset="0"/>
+              <a:buChar char="•"/>
+            </a:pPr>
             <a:r>
               <a:rPr lang="en-US" dirty="0"/>
               <a:t>VLF fragmentation</a:t>
             </a:r>
           </a:p>
           <a:p>
+            <a:pPr marL="571500" indent="-571500">
+              <a:buFont typeface="Arial" panose="020B0604020202020204" pitchFamily="34" charset="0"/>
+              <a:buChar char="•"/>
+            </a:pPr>
             <a:r>
               <a:rPr lang="en-US" dirty="0"/>
               <a:t>Log monitoring</a:t>
@@ -6286,157 +6496,345 @@
           </a:bodyPr>
           <a:lstStyle/>
           <a:p>
+            <a:pPr marL="571500" indent="-571500">
+              <a:buFont typeface="Arial" panose="020B0604020202020204" pitchFamily="34" charset="0"/>
+              <a:buChar char="•"/>
+            </a:pPr>
             <a:r>
               <a:rPr lang="en-US" dirty="0"/>
               <a:t>Automatic</a:t>
             </a:r>
           </a:p>
           <a:p>
-            <a:pPr lvl="1"/>
+            <a:pPr marL="1033227" lvl="1" indent="-457200">
+              <a:buFont typeface="Arial" panose="020B0604020202020204" pitchFamily="34" charset="0"/>
+              <a:buChar char="•"/>
+            </a:pPr>
             <a:r>
               <a:rPr lang="en-US" dirty="0"/>
               <a:t>Period background thread</a:t>
             </a:r>
           </a:p>
           <a:p>
-            <a:pPr lvl="1"/>
-            <a:r>
-              <a:rPr lang="en-US" dirty="0"/>
-              <a:t>Instance-wide [</a:t>
-            </a:r>
-            <a:r>
-              <a:rPr lang="en-US" sz="1606" dirty="0" err="1">
-                <a:latin typeface="Courier New" panose="02070309020205020404" pitchFamily="49" charset="0"/>
-                <a:cs typeface="Courier New" panose="02070309020205020404" pitchFamily="49" charset="0"/>
+            <a:pPr marL="1033227" lvl="1" indent="-457200">
+              <a:buFont typeface="Arial" panose="020B0604020202020204" pitchFamily="34" charset="0"/>
+              <a:buChar char="•"/>
+            </a:pPr>
+            <a:r>
+              <a:rPr lang="en-US" dirty="0"/>
+              <a:t>Instance-wide </a:t>
+            </a:r>
+            <a:r>
+              <a:rPr lang="en-US" dirty="0" smtClean="0"/>
+              <a:t>[</a:t>
+            </a:r>
+            <a:r>
+              <a:rPr lang="en-US" sz="2400" dirty="0" err="1">
+                <a:solidFill>
+                  <a:srgbClr val="800000"/>
+                </a:solidFill>
+                <a:highlight>
+                  <a:srgbClr val="FFFFFF"/>
+                </a:highlight>
+                <a:latin typeface="Consolas" panose="020B0609020204030204" pitchFamily="49" charset="0"/>
               </a:rPr>
               <a:t>sp_configure</a:t>
             </a:r>
             <a:r>
-              <a:rPr lang="en-US" sz="1606" dirty="0">
-                <a:latin typeface="Courier New" panose="02070309020205020404" pitchFamily="49" charset="0"/>
-                <a:cs typeface="Courier New" panose="02070309020205020404" pitchFamily="49" charset="0"/>
+              <a:rPr lang="en-US" sz="2400" dirty="0">
+                <a:solidFill>
+                  <a:srgbClr val="000000"/>
+                </a:solidFill>
+                <a:highlight>
+                  <a:srgbClr val="FFFFFF"/>
+                </a:highlight>
+                <a:latin typeface="Consolas" panose="020B0609020204030204" pitchFamily="49" charset="0"/>
               </a:rPr>
               <a:t> </a:t>
             </a:r>
             <a:r>
-              <a:rPr lang="en-US" sz="1701" dirty="0"/>
-              <a:t>'</a:t>
-            </a:r>
-            <a:r>
-              <a:rPr lang="en-US" sz="1606" dirty="0">
-                <a:latin typeface="Courier New" panose="02070309020205020404" pitchFamily="49" charset="0"/>
-                <a:cs typeface="Courier New" panose="02070309020205020404" pitchFamily="49" charset="0"/>
+              <a:rPr lang="en-US" sz="2400" dirty="0">
+                <a:solidFill>
+                  <a:srgbClr val="FF0000"/>
+                </a:solidFill>
+                <a:highlight>
+                  <a:srgbClr val="FFFFFF"/>
+                </a:highlight>
+                <a:latin typeface="Consolas" panose="020B0609020204030204" pitchFamily="49" charset="0"/>
               </a:rPr>
-              <a:t>recovery interval (min)</a:t>
-            </a:r>
-            <a:r>
-              <a:rPr lang="en-US" sz="1512" dirty="0"/>
-              <a:t>'</a:t>
-            </a:r>
-            <a:r>
-              <a:rPr lang="en-US" sz="1606" dirty="0">
-                <a:latin typeface="Courier New" panose="02070309020205020404" pitchFamily="49" charset="0"/>
-                <a:cs typeface="Courier New" panose="02070309020205020404" pitchFamily="49" charset="0"/>
+              <a:t>'recovery interval (min)'</a:t>
+            </a:r>
+            <a:r>
+              <a:rPr lang="en-US" sz="2400" dirty="0">
+                <a:solidFill>
+                  <a:srgbClr val="808080"/>
+                </a:solidFill>
+                <a:highlight>
+                  <a:srgbClr val="FFFFFF"/>
+                </a:highlight>
+                <a:latin typeface="Consolas" panose="020B0609020204030204" pitchFamily="49" charset="0"/>
               </a:rPr>
-              <a:t>, 2</a:t>
-            </a:r>
-            <a:r>
-              <a:rPr lang="en-US" dirty="0"/>
+              <a:t>,</a:t>
+            </a:r>
+            <a:r>
+              <a:rPr lang="en-US" sz="2400" dirty="0">
+                <a:solidFill>
+                  <a:srgbClr val="000000"/>
+                </a:solidFill>
+                <a:highlight>
+                  <a:srgbClr val="FFFFFF"/>
+                </a:highlight>
+                <a:latin typeface="Consolas" panose="020B0609020204030204" pitchFamily="49" charset="0"/>
+              </a:rPr>
+              <a:t> 2</a:t>
+            </a:r>
+            <a:r>
+              <a:rPr lang="en-US" dirty="0" smtClean="0"/>
               <a:t>]</a:t>
             </a:r>
-          </a:p>
-          <a:p>
+            <a:endParaRPr lang="en-US" dirty="0"/>
+          </a:p>
+          <a:p>
+            <a:pPr marL="571500" indent="-571500">
+              <a:buFont typeface="Arial" panose="020B0604020202020204" pitchFamily="34" charset="0"/>
+              <a:buChar char="•"/>
+            </a:pPr>
             <a:r>
               <a:rPr lang="en-US" dirty="0"/>
               <a:t>Indirect (2012+)</a:t>
             </a:r>
           </a:p>
           <a:p>
-            <a:pPr lvl="1"/>
+            <a:pPr marL="1033227" lvl="1" indent="-457200">
+              <a:buFont typeface="Arial" panose="020B0604020202020204" pitchFamily="34" charset="0"/>
+              <a:buChar char="•"/>
+            </a:pPr>
             <a:r>
               <a:rPr lang="en-US" dirty="0"/>
               <a:t>Database-specific</a:t>
             </a:r>
           </a:p>
           <a:p>
-            <a:pPr lvl="1"/>
-            <a:r>
-              <a:rPr lang="en-US" dirty="0"/>
+            <a:pPr marL="1033227" lvl="1" indent="-457200">
+              <a:buFont typeface="Arial" panose="020B0604020202020204" pitchFamily="34" charset="0"/>
+              <a:buChar char="•"/>
+            </a:pPr>
+            <a:r>
+              <a:rPr lang="en-US" dirty="0" smtClean="0"/>
               <a:t>[</a:t>
             </a:r>
             <a:r>
-              <a:rPr lang="en-US" sz="1606" dirty="0">
-                <a:latin typeface="Courier New" panose="02070309020205020404" pitchFamily="49" charset="0"/>
-                <a:cs typeface="Courier New" panose="02070309020205020404" pitchFamily="49" charset="0"/>
+              <a:rPr lang="en-US" sz="2400" dirty="0">
+                <a:solidFill>
+                  <a:srgbClr val="0000FF"/>
+                </a:solidFill>
+                <a:highlight>
+                  <a:srgbClr val="FFFFFF"/>
+                </a:highlight>
+                <a:latin typeface="Consolas" panose="020B0609020204030204" pitchFamily="49" charset="0"/>
               </a:rPr>
-              <a:t>alter database </a:t>
-            </a:r>
-            <a:r>
-              <a:rPr lang="en-US" sz="1606" dirty="0" err="1">
-                <a:latin typeface="Courier New" panose="02070309020205020404" pitchFamily="49" charset="0"/>
-                <a:cs typeface="Courier New" panose="02070309020205020404" pitchFamily="49" charset="0"/>
+              <a:t>alter</a:t>
+            </a:r>
+            <a:r>
+              <a:rPr lang="en-US" sz="2400" dirty="0">
+                <a:solidFill>
+                  <a:srgbClr val="000000"/>
+                </a:solidFill>
+                <a:highlight>
+                  <a:srgbClr val="FFFFFF"/>
+                </a:highlight>
+                <a:latin typeface="Consolas" panose="020B0609020204030204" pitchFamily="49" charset="0"/>
+              </a:rPr>
+              <a:t> </a:t>
+            </a:r>
+            <a:r>
+              <a:rPr lang="en-US" sz="2400" dirty="0">
+                <a:solidFill>
+                  <a:srgbClr val="0000FF"/>
+                </a:solidFill>
+                <a:highlight>
+                  <a:srgbClr val="FFFFFF"/>
+                </a:highlight>
+                <a:latin typeface="Consolas" panose="020B0609020204030204" pitchFamily="49" charset="0"/>
+              </a:rPr>
+              <a:t>database</a:t>
+            </a:r>
+            <a:r>
+              <a:rPr lang="en-US" sz="2400" dirty="0">
+                <a:solidFill>
+                  <a:srgbClr val="000000"/>
+                </a:solidFill>
+                <a:highlight>
+                  <a:srgbClr val="FFFFFF"/>
+                </a:highlight>
+                <a:latin typeface="Consolas" panose="020B0609020204030204" pitchFamily="49" charset="0"/>
+              </a:rPr>
+              <a:t> </a:t>
+            </a:r>
+            <a:r>
+              <a:rPr lang="en-US" sz="2400" dirty="0" err="1">
+                <a:solidFill>
+                  <a:srgbClr val="000000"/>
+                </a:solidFill>
+                <a:highlight>
+                  <a:srgbClr val="FFFFFF"/>
+                </a:highlight>
+                <a:latin typeface="Consolas" panose="020B0609020204030204" pitchFamily="49" charset="0"/>
               </a:rPr>
               <a:t>myDB</a:t>
             </a:r>
             <a:r>
-              <a:rPr lang="en-US" sz="1606" dirty="0">
-                <a:latin typeface="Courier New" panose="02070309020205020404" pitchFamily="49" charset="0"/>
-                <a:cs typeface="Courier New" panose="02070309020205020404" pitchFamily="49" charset="0"/>
+              <a:rPr lang="en-US" sz="2400" dirty="0">
+                <a:solidFill>
+                  <a:srgbClr val="000000"/>
+                </a:solidFill>
+                <a:highlight>
+                  <a:srgbClr val="FFFFFF"/>
+                </a:highlight>
+                <a:latin typeface="Consolas" panose="020B0609020204030204" pitchFamily="49" charset="0"/>
               </a:rPr>
-              <a:t> set </a:t>
-            </a:r>
-            <a:r>
-              <a:rPr lang="en-US" sz="1606" dirty="0" err="1">
-                <a:latin typeface="Courier New" panose="02070309020205020404" pitchFamily="49" charset="0"/>
-                <a:cs typeface="Courier New" panose="02070309020205020404" pitchFamily="49" charset="0"/>
+              <a:t> </a:t>
+            </a:r>
+            <a:r>
+              <a:rPr lang="en-US" sz="2400" dirty="0">
+                <a:solidFill>
+                  <a:srgbClr val="0000FF"/>
+                </a:solidFill>
+                <a:highlight>
+                  <a:srgbClr val="FFFFFF"/>
+                </a:highlight>
+                <a:latin typeface="Consolas" panose="020B0609020204030204" pitchFamily="49" charset="0"/>
+              </a:rPr>
+              <a:t>set</a:t>
+            </a:r>
+            <a:r>
+              <a:rPr lang="en-US" sz="2400" dirty="0">
+                <a:solidFill>
+                  <a:srgbClr val="000000"/>
+                </a:solidFill>
+                <a:highlight>
+                  <a:srgbClr val="FFFFFF"/>
+                </a:highlight>
+                <a:latin typeface="Consolas" panose="020B0609020204030204" pitchFamily="49" charset="0"/>
+              </a:rPr>
+              <a:t> </a:t>
+            </a:r>
+            <a:r>
+              <a:rPr lang="en-US" sz="2400" dirty="0" err="1">
+                <a:solidFill>
+                  <a:srgbClr val="000000"/>
+                </a:solidFill>
+                <a:highlight>
+                  <a:srgbClr val="FFFFFF"/>
+                </a:highlight>
+                <a:latin typeface="Consolas" panose="020B0609020204030204" pitchFamily="49" charset="0"/>
               </a:rPr>
               <a:t>target_recovery_time</a:t>
             </a:r>
             <a:r>
-              <a:rPr lang="en-US" sz="1606" dirty="0">
-                <a:latin typeface="Courier New" panose="02070309020205020404" pitchFamily="49" charset="0"/>
-                <a:cs typeface="Courier New" panose="02070309020205020404" pitchFamily="49" charset="0"/>
+              <a:rPr lang="en-US" sz="2400" dirty="0">
+                <a:solidFill>
+                  <a:srgbClr val="000000"/>
+                </a:solidFill>
+                <a:highlight>
+                  <a:srgbClr val="FFFFFF"/>
+                </a:highlight>
+                <a:latin typeface="Consolas" panose="020B0609020204030204" pitchFamily="49" charset="0"/>
               </a:rPr>
-              <a:t> = 2 minutes</a:t>
-            </a:r>
-            <a:r>
-              <a:rPr lang="en-US" dirty="0"/>
+              <a:t> </a:t>
+            </a:r>
+            <a:r>
+              <a:rPr lang="en-US" sz="2400" dirty="0">
+                <a:solidFill>
+                  <a:srgbClr val="808080"/>
+                </a:solidFill>
+                <a:highlight>
+                  <a:srgbClr val="FFFFFF"/>
+                </a:highlight>
+                <a:latin typeface="Consolas" panose="020B0609020204030204" pitchFamily="49" charset="0"/>
+              </a:rPr>
+              <a:t>=</a:t>
+            </a:r>
+            <a:r>
+              <a:rPr lang="en-US" sz="2400" dirty="0">
+                <a:solidFill>
+                  <a:srgbClr val="000000"/>
+                </a:solidFill>
+                <a:highlight>
+                  <a:srgbClr val="FFFFFF"/>
+                </a:highlight>
+                <a:latin typeface="Consolas" panose="020B0609020204030204" pitchFamily="49" charset="0"/>
+              </a:rPr>
+              <a:t> 2 </a:t>
+            </a:r>
+            <a:r>
+              <a:rPr lang="en-US" sz="2400" dirty="0">
+                <a:solidFill>
+                  <a:srgbClr val="0000FF"/>
+                </a:solidFill>
+                <a:highlight>
+                  <a:srgbClr val="FFFFFF"/>
+                </a:highlight>
+                <a:latin typeface="Consolas" panose="020B0609020204030204" pitchFamily="49" charset="0"/>
+              </a:rPr>
+              <a:t>minutes</a:t>
+            </a:r>
+            <a:r>
+              <a:rPr lang="en-US" dirty="0" smtClean="0"/>
               <a:t>]</a:t>
             </a:r>
-          </a:p>
-          <a:p>
-            <a:pPr lvl="1"/>
-            <a:r>
-              <a:rPr lang="en-US" dirty="0"/>
-              <a:t>Off by default in 2012, 2014; on </a:t>
-            </a:r>
-            <a:r>
-              <a:rPr lang="en-US"/>
-              <a:t>by default in 2016</a:t>
-            </a:r>
             <a:endParaRPr lang="en-US" dirty="0"/>
           </a:p>
           <a:p>
+            <a:pPr marL="1033227" lvl="1" indent="-457200">
+              <a:buFont typeface="Arial" panose="020B0604020202020204" pitchFamily="34" charset="0"/>
+              <a:buChar char="•"/>
+            </a:pPr>
+            <a:r>
+              <a:rPr lang="en-US" dirty="0"/>
+              <a:t>Off by default in 2012, 2014; on by default in </a:t>
+            </a:r>
+            <a:r>
+              <a:rPr lang="en-US" dirty="0" smtClean="0"/>
+              <a:t>2016+</a:t>
+            </a:r>
+            <a:endParaRPr lang="en-US" dirty="0"/>
+          </a:p>
+          <a:p>
+            <a:pPr marL="571500" indent="-571500">
+              <a:buFont typeface="Arial" panose="020B0604020202020204" pitchFamily="34" charset="0"/>
+              <a:buChar char="•"/>
+            </a:pPr>
             <a:r>
               <a:rPr lang="en-US" dirty="0"/>
               <a:t>Internal</a:t>
             </a:r>
           </a:p>
           <a:p>
-            <a:pPr lvl="1"/>
+            <a:pPr marL="1033227" lvl="1" indent="-457200">
+              <a:buFont typeface="Arial" panose="020B0604020202020204" pitchFamily="34" charset="0"/>
+              <a:buChar char="•"/>
+            </a:pPr>
             <a:r>
               <a:rPr lang="en-US" dirty="0"/>
               <a:t>During operations such as backup, snapshots, shutdown</a:t>
             </a:r>
           </a:p>
           <a:p>
+            <a:pPr marL="571500" indent="-571500">
+              <a:buFont typeface="Arial" panose="020B0604020202020204" pitchFamily="34" charset="0"/>
+              <a:buChar char="•"/>
+            </a:pPr>
             <a:r>
               <a:rPr lang="en-US" dirty="0"/>
               <a:t>Manual</a:t>
             </a:r>
           </a:p>
           <a:p>
-            <a:pPr lvl="1"/>
+            <a:pPr marL="1033227" lvl="1" indent="-457200">
+              <a:buFont typeface="Arial" panose="020B0604020202020204" pitchFamily="34" charset="0"/>
+              <a:buChar char="•"/>
+            </a:pPr>
             <a:r>
               <a:rPr lang="en-US" dirty="0"/>
               <a:t>CHECKPOINT command</a:t>
@@ -6516,65 +6914,82 @@
           </a:bodyPr>
           <a:lstStyle/>
           <a:p>
+            <a:pPr marL="571500" indent="-571500">
+              <a:buFont typeface="Arial" panose="020B0604020202020204" pitchFamily="34" charset="0"/>
+              <a:buChar char="•"/>
+            </a:pPr>
             <a:r>
               <a:rPr lang="en-US" dirty="0">
                 <a:solidFill>
-                  <a:schemeClr val="accent1">
-                    <a:lumMod val="60000"/>
-                    <a:lumOff val="40000"/>
-                  </a:schemeClr>
+                  <a:srgbClr val="0070C0"/>
                 </a:solidFill>
               </a:rPr>
               <a:t>Write to log: checkpoint start</a:t>
             </a:r>
           </a:p>
           <a:p>
-            <a:pPr lvl="1"/>
+            <a:pPr marL="1033227" lvl="1" indent="-457200">
+              <a:buFont typeface="Arial" panose="020B0604020202020204" pitchFamily="34" charset="0"/>
+              <a:buChar char="•"/>
+            </a:pPr>
             <a:r>
               <a:rPr lang="en-US" dirty="0"/>
               <a:t>Also info about any uncommitted transactions</a:t>
             </a:r>
           </a:p>
           <a:p>
-            <a:pPr lvl="1"/>
+            <a:pPr marL="1033227" lvl="1" indent="-457200">
+              <a:buFont typeface="Arial" panose="020B0604020202020204" pitchFamily="34" charset="0"/>
+              <a:buChar char="•"/>
+            </a:pPr>
             <a:r>
               <a:rPr lang="en-US" dirty="0"/>
               <a:t>Flush the log</a:t>
             </a:r>
           </a:p>
           <a:p>
+            <a:pPr marL="571500" indent="-571500">
+              <a:buFont typeface="Arial" panose="020B0604020202020204" pitchFamily="34" charset="0"/>
+              <a:buChar char="•"/>
+            </a:pPr>
             <a:r>
               <a:rPr lang="en-US" dirty="0"/>
               <a:t>Identify dirty pages; write to disk</a:t>
             </a:r>
           </a:p>
           <a:p>
+            <a:pPr marL="571500" indent="-571500">
+              <a:buFont typeface="Arial" panose="020B0604020202020204" pitchFamily="34" charset="0"/>
+              <a:buChar char="•"/>
+            </a:pPr>
             <a:r>
               <a:rPr lang="en-US" dirty="0">
                 <a:solidFill>
-                  <a:schemeClr val="accent1">
-                    <a:lumMod val="60000"/>
-                    <a:lumOff val="40000"/>
-                  </a:schemeClr>
+                  <a:srgbClr val="0070C0"/>
                 </a:solidFill>
               </a:rPr>
               <a:t>Update boot page with LSN corresponding to checkpoint start</a:t>
             </a:r>
           </a:p>
           <a:p>
+            <a:pPr marL="571500" indent="-571500">
+              <a:buFont typeface="Arial" panose="020B0604020202020204" pitchFamily="34" charset="0"/>
+              <a:buChar char="•"/>
+            </a:pPr>
             <a:r>
               <a:rPr lang="en-US" dirty="0"/>
               <a:t>(If SIMPLE recovery) clear the log</a:t>
             </a:r>
           </a:p>
           <a:p>
+            <a:pPr marL="571500" indent="-571500">
+              <a:buFont typeface="Arial" panose="020B0604020202020204" pitchFamily="34" charset="0"/>
+              <a:buChar char="•"/>
+            </a:pPr>
             <a:r>
               <a:rPr lang="en-US" dirty="0">
                 <a:solidFill>
-                  <a:schemeClr val="accent1">
-                    <a:lumMod val="60000"/>
-                    <a:lumOff val="40000"/>
-                  </a:schemeClr>
+                  <a:srgbClr val="0070C0"/>
                 </a:solidFill>
               </a:rPr>
               <a:t>Write to log: checkpoint finish</a:t>
@@ -6592,6 +7007,14 @@
   <p:clrMapOvr>
     <a:masterClrMapping/>
   </p:clrMapOvr>
+  <mc:AlternateContent xmlns:mc="http://schemas.openxmlformats.org/markup-compatibility/2006">
+    <mc:Choice xmlns:p14="http://schemas.microsoft.com/office/powerpoint/2010/main" Requires="p14">
+      <p:transition spd="slow" p14:dur="2000"/>
+    </mc:Choice>
+    <mc:Fallback>
+      <p:transition spd="slow"/>
+    </mc:Fallback>
+  </mc:AlternateContent>
 </p:sld>
 </file>
 
@@ -6649,40 +7072,60 @@
           <a:bodyPr/>
           <a:lstStyle/>
           <a:p>
+            <a:pPr marL="571500" indent="-571500">
+              <a:buFont typeface="Arial" panose="020B0604020202020204" pitchFamily="34" charset="0"/>
+              <a:buChar char="•"/>
+            </a:pPr>
             <a:r>
               <a:rPr lang="en-US" dirty="0"/>
               <a:t>Flushing = closing a log block</a:t>
             </a:r>
           </a:p>
           <a:p>
+            <a:pPr marL="571500" indent="-571500">
+              <a:buFont typeface="Arial" panose="020B0604020202020204" pitchFamily="34" charset="0"/>
+              <a:buChar char="•"/>
+            </a:pPr>
             <a:r>
               <a:rPr lang="en-US" dirty="0"/>
               <a:t>Triggers</a:t>
             </a:r>
           </a:p>
           <a:p>
-            <a:pPr lvl="1"/>
+            <a:pPr marL="1033227" lvl="1" indent="-457200">
+              <a:buFont typeface="Arial" panose="020B0604020202020204" pitchFamily="34" charset="0"/>
+              <a:buChar char="•"/>
+            </a:pPr>
             <a:r>
               <a:rPr lang="en-US" dirty="0"/>
               <a:t>60K limit reached</a:t>
             </a:r>
           </a:p>
           <a:p>
-            <a:pPr lvl="1"/>
+            <a:pPr marL="1033227" lvl="1" indent="-457200">
+              <a:buFont typeface="Arial" panose="020B0604020202020204" pitchFamily="34" charset="0"/>
+              <a:buChar char="•"/>
+            </a:pPr>
             <a:r>
               <a:rPr lang="en-US" dirty="0"/>
               <a:t>Transaction commits</a:t>
             </a:r>
           </a:p>
           <a:p>
-            <a:pPr lvl="1"/>
+            <a:pPr marL="1033227" lvl="1" indent="-457200">
+              <a:buFont typeface="Arial" panose="020B0604020202020204" pitchFamily="34" charset="0"/>
+              <a:buChar char="•"/>
+            </a:pPr>
             <a:r>
               <a:rPr lang="en-US" dirty="0"/>
               <a:t>Transaction rollbacks</a:t>
             </a:r>
           </a:p>
           <a:p>
-            <a:pPr lvl="1"/>
+            <a:pPr marL="1033227" lvl="1" indent="-457200">
+              <a:buFont typeface="Arial" panose="020B0604020202020204" pitchFamily="34" charset="0"/>
+              <a:buChar char="•"/>
+            </a:pPr>
             <a:r>
               <a:rPr lang="en-US" dirty="0"/>
               <a:t>Checkpoint</a:t>
@@ -6759,27 +7202,40 @@
           </a:bodyPr>
           <a:lstStyle/>
           <a:p>
+            <a:pPr marL="571500" indent="-571500">
+              <a:buFont typeface="Arial" panose="020B0604020202020204" pitchFamily="34" charset="0"/>
+              <a:buChar char="•"/>
+            </a:pPr>
             <a:r>
               <a:rPr lang="en-US" dirty="0"/>
               <a:t>Impacts how SQL logs changes</a:t>
             </a:r>
           </a:p>
           <a:p>
-            <a:pPr lvl="1"/>
+            <a:pPr marL="1033227" lvl="1" indent="-457200">
+              <a:buFont typeface="Arial" panose="020B0604020202020204" pitchFamily="34" charset="0"/>
+              <a:buChar char="•"/>
+            </a:pPr>
             <a:r>
               <a:rPr lang="en-US" dirty="0"/>
               <a:t>Simple</a:t>
             </a:r>
           </a:p>
           <a:p>
-            <a:pPr lvl="1"/>
+            <a:pPr marL="1033227" lvl="1" indent="-457200">
+              <a:buFont typeface="Arial" panose="020B0604020202020204" pitchFamily="34" charset="0"/>
+              <a:buChar char="•"/>
+            </a:pPr>
             <a:r>
               <a:rPr lang="en-US" dirty="0"/>
               <a:t>Full</a:t>
             </a:r>
           </a:p>
           <a:p>
-            <a:pPr lvl="1"/>
+            <a:pPr marL="1033227" lvl="1" indent="-457200">
+              <a:buFont typeface="Arial" panose="020B0604020202020204" pitchFamily="34" charset="0"/>
+              <a:buChar char="•"/>
+            </a:pPr>
             <a:r>
               <a:rPr lang="en-US" dirty="0"/>
               <a:t>Bulk-logged</a:t>
@@ -6856,25 +7312,40 @@
           </a:bodyPr>
           <a:lstStyle/>
           <a:p>
+            <a:pPr marL="571500" indent="-571500">
+              <a:buFont typeface="Arial" panose="020B0604020202020204" pitchFamily="34" charset="0"/>
+              <a:buChar char="•"/>
+            </a:pPr>
             <a:r>
               <a:rPr lang="en-US" dirty="0"/>
               <a:t>Commonly used for test systems or low-volume production systems</a:t>
             </a:r>
           </a:p>
           <a:p>
-            <a:pPr lvl="1"/>
+            <a:pPr marL="1033227" lvl="1" indent="-457200">
+              <a:buFont typeface="Arial" panose="020B0604020202020204" pitchFamily="34" charset="0"/>
+              <a:buChar char="•"/>
+            </a:pPr>
             <a:r>
               <a:rPr lang="en-US" dirty="0"/>
               <a:t>What is your recovery point objective?</a:t>
             </a:r>
           </a:p>
           <a:p>
+            <a:pPr marL="571500" indent="-571500">
+              <a:buFont typeface="Arial" panose="020B0604020202020204" pitchFamily="34" charset="0"/>
+              <a:buChar char="•"/>
+            </a:pPr>
             <a:r>
               <a:rPr lang="en-US" dirty="0"/>
               <a:t>All changes logged, but can be “discarded” on commit</a:t>
             </a:r>
           </a:p>
           <a:p>
+            <a:pPr marL="571500" indent="-571500">
+              <a:buFont typeface="Arial" panose="020B0604020202020204" pitchFamily="34" charset="0"/>
+              <a:buChar char="•"/>
+            </a:pPr>
             <a:r>
               <a:rPr lang="en-US" dirty="0"/>
               <a:t>Can only recover to the latest full backup</a:t>
@@ -6951,25 +7422,40 @@
           </a:bodyPr>
           <a:lstStyle/>
           <a:p>
+            <a:pPr marL="571500" indent="-571500">
+              <a:buFont typeface="Arial" panose="020B0604020202020204" pitchFamily="34" charset="0"/>
+              <a:buChar char="•"/>
+            </a:pPr>
             <a:r>
               <a:rPr lang="en-US" dirty="0"/>
               <a:t>Probably the most common recovery model for production systems</a:t>
             </a:r>
           </a:p>
           <a:p>
-            <a:pPr lvl="1"/>
+            <a:pPr marL="1033227" lvl="1" indent="-457200">
+              <a:buFont typeface="Arial" panose="020B0604020202020204" pitchFamily="34" charset="0"/>
+              <a:buChar char="•"/>
+            </a:pPr>
             <a:r>
               <a:rPr lang="en-US" dirty="0"/>
               <a:t>What is your recovery point objective?</a:t>
             </a:r>
           </a:p>
           <a:p>
+            <a:pPr marL="571500" indent="-571500">
+              <a:buFont typeface="Arial" panose="020B0604020202020204" pitchFamily="34" charset="0"/>
+              <a:buChar char="•"/>
+            </a:pPr>
             <a:r>
               <a:rPr lang="en-US" dirty="0"/>
               <a:t>Log records must be kept until log backup completed</a:t>
             </a:r>
           </a:p>
           <a:p>
+            <a:pPr marL="571500" indent="-571500">
+              <a:buFont typeface="Arial" panose="020B0604020202020204" pitchFamily="34" charset="0"/>
+              <a:buChar char="•"/>
+            </a:pPr>
             <a:r>
               <a:rPr lang="en-US" dirty="0"/>
               <a:t>Can recover to an arbitrary point in time</a:t>
@@ -7046,31 +7532,50 @@
           </a:bodyPr>
           <a:lstStyle/>
           <a:p>
+            <a:pPr marL="571500" indent="-571500">
+              <a:buFont typeface="Arial" panose="020B0604020202020204" pitchFamily="34" charset="0"/>
+              <a:buChar char="•"/>
+            </a:pPr>
             <a:r>
               <a:rPr lang="en-US" dirty="0"/>
               <a:t>Not frequently used, perhaps temporarily during maintenance windows</a:t>
             </a:r>
           </a:p>
           <a:p>
-            <a:pPr lvl="1"/>
+            <a:pPr marL="1033227" lvl="1" indent="-457200">
+              <a:buFont typeface="Arial" panose="020B0604020202020204" pitchFamily="34" charset="0"/>
+              <a:buChar char="•"/>
+            </a:pPr>
             <a:r>
               <a:rPr lang="en-US" dirty="0"/>
               <a:t>What is your recovery point objective?</a:t>
             </a:r>
           </a:p>
           <a:p>
+            <a:pPr marL="571500" indent="-571500">
+              <a:buFont typeface="Arial" panose="020B0604020202020204" pitchFamily="34" charset="0"/>
+              <a:buChar char="•"/>
+            </a:pPr>
             <a:r>
               <a:rPr lang="en-US" dirty="0"/>
               <a:t>Similar to full model, but some changes are only “noted” rather than fully logged</a:t>
             </a:r>
           </a:p>
           <a:p>
+            <a:pPr marL="571500" indent="-571500">
+              <a:buFont typeface="Arial" panose="020B0604020202020204" pitchFamily="34" charset="0"/>
+              <a:buChar char="•"/>
+            </a:pPr>
             <a:r>
               <a:rPr lang="en-US" dirty="0"/>
               <a:t>Log backups still include all changes</a:t>
             </a:r>
           </a:p>
           <a:p>
+            <a:pPr marL="571500" indent="-571500">
+              <a:buFont typeface="Arial" panose="020B0604020202020204" pitchFamily="34" charset="0"/>
+              <a:buChar char="•"/>
+            </a:pPr>
             <a:r>
               <a:rPr lang="en-US" dirty="0"/>
               <a:t>Point-in-time recovery not possible</a:t>
@@ -7140,74 +7645,112 @@
             <p:ph idx="1"/>
           </p:nvPr>
         </p:nvSpPr>
-        <p:spPr/>
+        <p:spPr>
+          <a:xfrm>
+            <a:off x="361038" y="1111463"/>
+            <a:ext cx="10800000" cy="4554399"/>
+          </a:xfrm>
+        </p:spPr>
         <p:txBody>
           <a:bodyPr>
-            <a:normAutofit fontScale="92500" lnSpcReduction="20000"/>
+            <a:normAutofit fontScale="85000" lnSpcReduction="20000"/>
           </a:bodyPr>
           <a:lstStyle/>
           <a:p>
+            <a:pPr marL="571500" indent="-571500">
+              <a:buFont typeface="Arial" panose="020B0604020202020204" pitchFamily="34" charset="0"/>
+              <a:buChar char="•"/>
+            </a:pPr>
             <a:r>
               <a:rPr lang="en-US" dirty="0"/>
               <a:t>Marks unneeded portions of log as inactive</a:t>
             </a:r>
           </a:p>
           <a:p>
+            <a:pPr marL="571500" indent="-571500">
+              <a:buFont typeface="Arial" panose="020B0604020202020204" pitchFamily="34" charset="0"/>
+              <a:buChar char="•"/>
+            </a:pPr>
             <a:r>
               <a:rPr lang="en-US" dirty="0"/>
               <a:t>Triggers:</a:t>
             </a:r>
           </a:p>
           <a:p>
-            <a:pPr lvl="1"/>
+            <a:pPr marL="1033227" lvl="1" indent="-457200">
+              <a:buFont typeface="Arial" panose="020B0604020202020204" pitchFamily="34" charset="0"/>
+              <a:buChar char="•"/>
+            </a:pPr>
             <a:r>
               <a:rPr lang="en-US" dirty="0"/>
               <a:t>Simple recovery**: Checkpoint</a:t>
             </a:r>
           </a:p>
           <a:p>
-            <a:pPr lvl="1"/>
+            <a:pPr marL="1033227" lvl="1" indent="-457200">
+              <a:buFont typeface="Arial" panose="020B0604020202020204" pitchFamily="34" charset="0"/>
+              <a:buChar char="•"/>
+            </a:pPr>
             <a:r>
               <a:rPr lang="en-US" dirty="0"/>
               <a:t>Full/bulked-log: Log Backup</a:t>
             </a:r>
           </a:p>
           <a:p>
-            <a:pPr lvl="1"/>
+            <a:pPr marL="1033227" lvl="1" indent="-457200">
+              <a:buFont typeface="Arial" panose="020B0604020202020204" pitchFamily="34" charset="0"/>
+              <a:buChar char="•"/>
+            </a:pPr>
             <a:r>
               <a:rPr lang="en-US" dirty="0"/>
               <a:t>Change from Full or Bulked Logged to Simple***</a:t>
             </a:r>
           </a:p>
           <a:p>
+            <a:pPr marL="571500" indent="-571500">
+              <a:buFont typeface="Arial" panose="020B0604020202020204" pitchFamily="34" charset="0"/>
+              <a:buChar char="•"/>
+            </a:pPr>
             <a:r>
               <a:rPr lang="en-US" dirty="0"/>
               <a:t>Why can’t the log clear?</a:t>
             </a:r>
           </a:p>
           <a:p>
-            <a:pPr lvl="1"/>
+            <a:pPr marL="1033227" lvl="1" indent="-457200">
+              <a:buFont typeface="Arial" panose="020B0604020202020204" pitchFamily="34" charset="0"/>
+              <a:buChar char="•"/>
+            </a:pPr>
             <a:r>
               <a:rPr lang="en-US" dirty="0"/>
               <a:t>Pending log backup</a:t>
             </a:r>
           </a:p>
           <a:p>
-            <a:pPr lvl="1"/>
+            <a:pPr marL="1033227" lvl="1" indent="-457200">
+              <a:buFont typeface="Arial" panose="020B0604020202020204" pitchFamily="34" charset="0"/>
+              <a:buChar char="•"/>
+            </a:pPr>
             <a:r>
               <a:rPr lang="en-US" dirty="0"/>
               <a:t>Active replication / CDC / AG / mirroring</a:t>
             </a:r>
           </a:p>
           <a:p>
-            <a:pPr lvl="1"/>
+            <a:pPr marL="1033227" lvl="1" indent="-457200">
+              <a:buFont typeface="Arial" panose="020B0604020202020204" pitchFamily="34" charset="0"/>
+              <a:buChar char="•"/>
+            </a:pPr>
             <a:r>
               <a:rPr lang="en-US" dirty="0"/>
               <a:t>Long-running transaction</a:t>
             </a:r>
           </a:p>
           <a:p>
-            <a:pPr lvl="1"/>
+            <a:pPr marL="1033227" lvl="1" indent="-457200">
+              <a:buFont typeface="Arial" panose="020B0604020202020204" pitchFamily="34" charset="0"/>
+              <a:buChar char="•"/>
+            </a:pPr>
             <a:r>
               <a:rPr lang="en-US" dirty="0"/>
               <a:t>See </a:t>
@@ -7240,8 +7783,8 @@
         </p:nvSpPr>
         <p:spPr>
           <a:xfrm>
-            <a:off x="6213430" y="5291605"/>
-            <a:ext cx="4946695" cy="1008569"/>
+            <a:off x="6213431" y="5016381"/>
+            <a:ext cx="4500170" cy="1283793"/>
           </a:xfrm>
           <a:prstGeom prst="rect">
             <a:avLst/>
@@ -7254,7 +7797,7 @@
         </p:spPr>
         <p:txBody>
           <a:bodyPr vert="horz" lIns="86402" tIns="43201" rIns="86402" bIns="43201" rtlCol="0">
-            <a:normAutofit fontScale="92500" lnSpcReduction="20000"/>
+            <a:normAutofit fontScale="92500" lnSpcReduction="10000"/>
           </a:bodyPr>
           <a:lstStyle>
             <a:lvl1pPr marL="342900" indent="-342900" algn="l" defTabSz="457200" rtl="0" eaLnBrk="1" latinLnBrk="0" hangingPunct="1">
@@ -7432,6 +7975,13 @@
   <p:clrMapOvr>
     <a:masterClrMapping/>
   </p:clrMapOvr>
+  <p:timing>
+    <p:tnLst>
+      <p:par>
+        <p:cTn id="1" dur="indefinite" restart="never" nodeType="tmRoot"/>
+      </p:par>
+    </p:tnLst>
+  </p:timing>
 </p:sld>
 </file>
 
@@ -7539,6 +8089,13 @@
   <p:clrMapOvr>
     <a:masterClrMapping/>
   </p:clrMapOvr>
+  <p:timing>
+    <p:tnLst>
+      <p:par>
+        <p:cTn id="1" dur="indefinite" restart="never" nodeType="tmRoot"/>
+      </p:par>
+    </p:tnLst>
+  </p:timing>
 </p:sld>
 </file>
 
@@ -7596,47 +8153,70 @@
           <a:bodyPr/>
           <a:lstStyle/>
           <a:p>
+            <a:pPr marL="571500" indent="-571500">
+              <a:buFont typeface="Arial" panose="020B0604020202020204" pitchFamily="34" charset="0"/>
+              <a:buChar char="•"/>
+            </a:pPr>
             <a:r>
               <a:rPr lang="en-US" dirty="0"/>
               <a:t>When a transaction cannot complete, it must rollback</a:t>
             </a:r>
           </a:p>
           <a:p>
-            <a:pPr lvl="1"/>
+            <a:pPr marL="1033227" lvl="1" indent="-457200">
+              <a:buFont typeface="Arial" panose="020B0604020202020204" pitchFamily="34" charset="0"/>
+              <a:buChar char="•"/>
+            </a:pPr>
             <a:r>
               <a:rPr lang="en-US" dirty="0"/>
               <a:t>ROLLBACK TRANSACTION command</a:t>
             </a:r>
           </a:p>
           <a:p>
-            <a:pPr lvl="1"/>
+            <a:pPr marL="1033227" lvl="1" indent="-457200">
+              <a:buFont typeface="Arial" panose="020B0604020202020204" pitchFamily="34" charset="0"/>
+              <a:buChar char="•"/>
+            </a:pPr>
             <a:r>
               <a:rPr lang="en-US" dirty="0"/>
               <a:t>Connection is abandoned</a:t>
             </a:r>
           </a:p>
           <a:p>
-            <a:pPr lvl="2"/>
+            <a:pPr marL="1494953" lvl="2" indent="-342900">
+              <a:buFont typeface="Arial" panose="020B0604020202020204" pitchFamily="34" charset="0"/>
+              <a:buChar char="•"/>
+            </a:pPr>
             <a:r>
               <a:rPr lang="en-US" dirty="0"/>
               <a:t>Network failure, KILL, severe errors, client crash</a:t>
             </a:r>
           </a:p>
           <a:p>
-            <a:pPr lvl="1"/>
+            <a:pPr marL="1033227" lvl="1" indent="-457200">
+              <a:buFont typeface="Arial" panose="020B0604020202020204" pitchFamily="34" charset="0"/>
+              <a:buChar char="•"/>
+            </a:pPr>
             <a:r>
               <a:rPr lang="en-US" dirty="0"/>
               <a:t>Non-graceful shutdown of SQL (crash recovery)</a:t>
             </a:r>
           </a:p>
           <a:p>
-            <a:pPr lvl="1"/>
+            <a:pPr marL="1033227" lvl="1" indent="-457200">
+              <a:buFont typeface="Arial" panose="020B0604020202020204" pitchFamily="34" charset="0"/>
+              <a:buChar char="•"/>
+            </a:pPr>
             <a:r>
               <a:rPr lang="en-US" dirty="0"/>
               <a:t>Restore operations</a:t>
             </a:r>
           </a:p>
           <a:p>
+            <a:pPr marL="571500" indent="-571500">
+              <a:buFont typeface="Arial" panose="020B0604020202020204" pitchFamily="34" charset="0"/>
+              <a:buChar char="•"/>
+            </a:pPr>
             <a:r>
               <a:rPr lang="en-US" dirty="0"/>
               <a:t>Rollback operations are single-threaded</a:t>
@@ -7713,75 +8293,110 @@
           </a:bodyPr>
           <a:lstStyle/>
           <a:p>
+            <a:pPr marL="571500" indent="-571500">
+              <a:buFont typeface="Arial" panose="020B0604020202020204" pitchFamily="34" charset="0"/>
+              <a:buChar char="•"/>
+            </a:pPr>
             <a:r>
               <a:rPr lang="en-US" dirty="0"/>
               <a:t>Primary purposes</a:t>
             </a:r>
           </a:p>
           <a:p>
-            <a:pPr lvl="1"/>
+            <a:pPr marL="1033227" lvl="1" indent="-457200">
+              <a:buFont typeface="Arial" panose="020B0604020202020204" pitchFamily="34" charset="0"/>
+              <a:buChar char="•"/>
+            </a:pPr>
             <a:r>
               <a:rPr lang="en-US" dirty="0"/>
               <a:t>Durability</a:t>
             </a:r>
           </a:p>
           <a:p>
-            <a:pPr lvl="2"/>
+            <a:pPr marL="1494953" lvl="2" indent="-342900">
+              <a:buFont typeface="Arial" panose="020B0604020202020204" pitchFamily="34" charset="0"/>
+              <a:buChar char="•"/>
+            </a:pPr>
             <a:r>
               <a:rPr lang="en-US" dirty="0"/>
               <a:t>Write-ahead logging</a:t>
             </a:r>
           </a:p>
           <a:p>
-            <a:pPr lvl="2"/>
+            <a:pPr marL="1494953" lvl="2" indent="-342900">
+              <a:buFont typeface="Arial" panose="020B0604020202020204" pitchFamily="34" charset="0"/>
+              <a:buChar char="•"/>
+            </a:pPr>
             <a:r>
               <a:rPr lang="en-US" dirty="0"/>
               <a:t>Crash recovery / restore operations</a:t>
             </a:r>
           </a:p>
           <a:p>
-            <a:pPr lvl="1"/>
+            <a:pPr marL="1033227" lvl="1" indent="-457200">
+              <a:buFont typeface="Arial" panose="020B0604020202020204" pitchFamily="34" charset="0"/>
+              <a:buChar char="•"/>
+            </a:pPr>
             <a:r>
               <a:rPr lang="en-US" dirty="0"/>
               <a:t>Atomicity</a:t>
             </a:r>
           </a:p>
           <a:p>
-            <a:pPr lvl="1"/>
+            <a:pPr marL="1033227" lvl="1" indent="-457200">
+              <a:buFont typeface="Arial" panose="020B0604020202020204" pitchFamily="34" charset="0"/>
+              <a:buChar char="•"/>
+            </a:pPr>
             <a:r>
               <a:rPr lang="en-US" dirty="0"/>
               <a:t>Thought experiment</a:t>
             </a:r>
           </a:p>
           <a:p>
-            <a:pPr lvl="2"/>
+            <a:pPr marL="1494953" lvl="2" indent="-342900">
+              <a:buFont typeface="Arial" panose="020B0604020202020204" pitchFamily="34" charset="0"/>
+              <a:buChar char="•"/>
+            </a:pPr>
             <a:r>
               <a:rPr lang="en-US" dirty="0"/>
               <a:t>What would SQL be like without a transaction log?</a:t>
             </a:r>
           </a:p>
           <a:p>
+            <a:pPr marL="571500" indent="-571500">
+              <a:buFont typeface="Arial" panose="020B0604020202020204" pitchFamily="34" charset="0"/>
+              <a:buChar char="•"/>
+            </a:pPr>
             <a:r>
               <a:rPr lang="en-US" dirty="0"/>
               <a:t>Secondary purposes</a:t>
             </a:r>
           </a:p>
           <a:p>
-            <a:pPr lvl="1"/>
+            <a:pPr marL="1033227" lvl="1" indent="-457200">
+              <a:buFont typeface="Arial" panose="020B0604020202020204" pitchFamily="34" charset="0"/>
+              <a:buChar char="•"/>
+            </a:pPr>
             <a:r>
               <a:rPr lang="en-US" dirty="0"/>
               <a:t>Log reader (replication, CDC)</a:t>
             </a:r>
           </a:p>
           <a:p>
-            <a:pPr lvl="1"/>
+            <a:pPr marL="1033227" lvl="1" indent="-457200">
+              <a:buFont typeface="Arial" panose="020B0604020202020204" pitchFamily="34" charset="0"/>
+              <a:buChar char="•"/>
+            </a:pPr>
             <a:r>
               <a:rPr lang="en-US" dirty="0"/>
               <a:t>Mirroring / Availability Groups / log shipping</a:t>
             </a:r>
           </a:p>
           <a:p>
-            <a:pPr lvl="1"/>
+            <a:pPr marL="1033227" lvl="1" indent="-457200">
+              <a:buFont typeface="Arial" panose="020B0604020202020204" pitchFamily="34" charset="0"/>
+              <a:buChar char="•"/>
+            </a:pPr>
             <a:r>
               <a:rPr lang="en-US" dirty="0"/>
               <a:t>Snapshots</a:t>
@@ -7854,7 +8469,7 @@
         <p:spPr>
           <a:xfrm>
             <a:off x="5552878" y="1512041"/>
-            <a:ext cx="4095471" cy="4276616"/>
+            <a:ext cx="5160722" cy="4276616"/>
           </a:xfrm>
         </p:spPr>
         <p:txBody>
@@ -7863,18 +8478,30 @@
           </a:bodyPr>
           <a:lstStyle/>
           <a:p>
+            <a:pPr marL="571500" indent="-571500">
+              <a:buFont typeface="Arial" panose="020B0604020202020204" pitchFamily="34" charset="0"/>
+              <a:buChar char="•"/>
+            </a:pPr>
             <a:r>
               <a:rPr lang="en-US" dirty="0"/>
               <a:t>Log records form a reverse linked list of operations within a transaction.</a:t>
             </a:r>
           </a:p>
           <a:p>
+            <a:pPr marL="571500" indent="-571500">
+              <a:buFont typeface="Arial" panose="020B0604020202020204" pitchFamily="34" charset="0"/>
+              <a:buChar char="•"/>
+            </a:pPr>
             <a:r>
               <a:rPr lang="en-US" dirty="0"/>
               <a:t>Let’s suppose the yellow transaction needs to roll back.</a:t>
             </a:r>
           </a:p>
           <a:p>
+            <a:pPr marL="571500" indent="-571500">
+              <a:buFont typeface="Arial" panose="020B0604020202020204" pitchFamily="34" charset="0"/>
+              <a:buChar char="•"/>
+            </a:pPr>
             <a:r>
               <a:rPr lang="en-US" dirty="0"/>
               <a:t>The first record is for “begin transaction.”</a:t>
@@ -7971,21 +8598,31 @@
         <p:spPr>
           <a:xfrm>
             <a:off x="5552878" y="1512041"/>
-            <a:ext cx="4095471" cy="4276616"/>
+            <a:ext cx="5026815" cy="4276616"/>
           </a:xfrm>
         </p:spPr>
         <p:txBody>
-          <a:bodyPr/>
+          <a:bodyPr>
+            <a:normAutofit/>
+          </a:bodyPr>
           <a:lstStyle/>
           <a:p>
-            <a:r>
-              <a:rPr lang="en-US" dirty="0"/>
+            <a:pPr marL="571500" indent="-571500">
+              <a:buFont typeface="Arial" panose="020B0604020202020204" pitchFamily="34" charset="0"/>
+              <a:buChar char="•"/>
+            </a:pPr>
+            <a:r>
+              <a:rPr lang="en-US" sz="3300" dirty="0"/>
               <a:t>SQL Server finds the last log record for the transaction.</a:t>
             </a:r>
           </a:p>
           <a:p>
-            <a:r>
-              <a:rPr lang="en-US" dirty="0"/>
+            <a:pPr marL="571500" indent="-571500">
+              <a:buFont typeface="Arial" panose="020B0604020202020204" pitchFamily="34" charset="0"/>
+              <a:buChar char="•"/>
+            </a:pPr>
+            <a:r>
+              <a:rPr lang="en-US" sz="3300" dirty="0"/>
               <a:t>SQL reverses the operation in the buffer pool.</a:t>
             </a:r>
           </a:p>
@@ -8080,21 +8717,29 @@
         <p:spPr>
           <a:xfrm>
             <a:off x="5552878" y="1512041"/>
-            <a:ext cx="4095471" cy="4276616"/>
+            <a:ext cx="5291735" cy="4276616"/>
           </a:xfrm>
         </p:spPr>
         <p:txBody>
           <a:bodyPr>
-            <a:normAutofit fontScale="92500" lnSpcReduction="10000"/>
+            <a:normAutofit fontScale="92500"/>
           </a:bodyPr>
           <a:lstStyle/>
           <a:p>
+            <a:pPr marL="571500" indent="-571500">
+              <a:buFont typeface="Arial" panose="020B0604020202020204" pitchFamily="34" charset="0"/>
+              <a:buChar char="•"/>
+            </a:pPr>
             <a:r>
               <a:rPr lang="en-US" dirty="0"/>
               <a:t>Creates a new log record indicating that the operation was undone. This is called a “Compensation” record.</a:t>
             </a:r>
           </a:p>
           <a:p>
+            <a:pPr marL="571500" indent="-571500">
+              <a:buFont typeface="Arial" panose="020B0604020202020204" pitchFamily="34" charset="0"/>
+              <a:buChar char="•"/>
+            </a:pPr>
             <a:r>
               <a:rPr lang="en-US" dirty="0"/>
               <a:t>This record then points back to the second-to-last record.</a:t>
@@ -8191,17 +8836,21 @@
         <p:spPr>
           <a:xfrm>
             <a:off x="5552878" y="1512041"/>
-            <a:ext cx="4095471" cy="4276616"/>
+            <a:ext cx="5160722" cy="4276616"/>
           </a:xfrm>
         </p:spPr>
         <p:txBody>
           <a:bodyPr>
-            <a:normAutofit lnSpcReduction="10000"/>
+            <a:normAutofit/>
           </a:bodyPr>
           <a:lstStyle/>
           <a:p>
-            <a:r>
-              <a:rPr lang="en-US" dirty="0"/>
+            <a:pPr marL="571500" indent="-571500">
+              <a:buFont typeface="Arial" panose="020B0604020202020204" pitchFamily="34" charset="0"/>
+              <a:buChar char="•"/>
+            </a:pPr>
+            <a:r>
+              <a:rPr lang="en-US" sz="3300" dirty="0"/>
               <a:t>The second to last operation is undone, and a compensation record is written that points back to the first record (the “begin transaction”).</a:t>
             </a:r>
           </a:p>
@@ -8296,15 +8945,21 @@
         <p:spPr>
           <a:xfrm>
             <a:off x="5552878" y="1512041"/>
-            <a:ext cx="4095471" cy="4276616"/>
+            <a:ext cx="5035361" cy="4276616"/>
           </a:xfrm>
         </p:spPr>
         <p:txBody>
-          <a:bodyPr/>
+          <a:bodyPr>
+            <a:normAutofit/>
+          </a:bodyPr>
           <a:lstStyle/>
           <a:p>
-            <a:r>
-              <a:rPr lang="en-US" dirty="0"/>
+            <a:pPr marL="457200" indent="-457200">
+              <a:buFont typeface="Arial" panose="020B0604020202020204" pitchFamily="34" charset="0"/>
+              <a:buChar char="•"/>
+            </a:pPr>
+            <a:r>
+              <a:rPr lang="en-US" sz="3300" dirty="0"/>
               <a:t>Finally, an “abort transaction” log record is written.  It also points back to the “begin transaction” record.</a:t>
             </a:r>
           </a:p>
@@ -8401,20 +9056,30 @@
           <a:bodyPr/>
           <a:lstStyle/>
           <a:p>
+            <a:pPr marL="571500" indent="-571500">
+              <a:buFont typeface="Arial" panose="020B0604020202020204" pitchFamily="34" charset="0"/>
+              <a:buChar char="•"/>
+            </a:pPr>
             <a:r>
               <a:rPr lang="en-US" dirty="0"/>
               <a:t>Key takeaways:</a:t>
             </a:r>
           </a:p>
           <a:p>
-            <a:pPr lvl="1"/>
+            <a:pPr marL="1033227" lvl="1" indent="-457200">
+              <a:buFont typeface="Arial" panose="020B0604020202020204" pitchFamily="34" charset="0"/>
+              <a:buChar char="•"/>
+            </a:pPr>
             <a:r>
               <a:rPr lang="en-US" dirty="0"/>
               <a:t>Rollback operations generate log records</a:t>
             </a:r>
           </a:p>
           <a:p>
-            <a:pPr lvl="1"/>
+            <a:pPr marL="1033227" lvl="1" indent="-457200">
+              <a:buFont typeface="Arial" panose="020B0604020202020204" pitchFamily="34" charset="0"/>
+              <a:buChar char="•"/>
+            </a:pPr>
             <a:r>
               <a:rPr lang="en-US" dirty="0"/>
               <a:t>As the initial operations are performed, SQL Server will “reserve” log space to ensure that a rollback is possible.</a:t>
@@ -8629,14 +9294,14 @@
                 <a:gridCol w="3034700">
                   <a:extLst>
                     <a:ext uri="{9D8B030D-6E8A-4147-A177-3AD203B41FA5}">
-                      <a16:colId xmlns:a16="http://schemas.microsoft.com/office/drawing/2014/main" val="20000"/>
+                      <a16:colId xmlns:a16="http://schemas.microsoft.com/office/drawing/2014/main" xmlns="" val="20000"/>
                     </a:ext>
                   </a:extLst>
                 </a:gridCol>
                 <a:gridCol w="3034700">
                   <a:extLst>
                     <a:ext uri="{9D8B030D-6E8A-4147-A177-3AD203B41FA5}">
-                      <a16:colId xmlns:a16="http://schemas.microsoft.com/office/drawing/2014/main" val="20001"/>
+                      <a16:colId xmlns:a16="http://schemas.microsoft.com/office/drawing/2014/main" xmlns="" val="20001"/>
                     </a:ext>
                   </a:extLst>
                 </a:gridCol>
@@ -8682,7 +9347,7 @@
                 </a:tc>
                 <a:extLst>
                   <a:ext uri="{0D108BD9-81ED-4DB2-BD59-A6C34878D82A}">
-                    <a16:rowId xmlns:a16="http://schemas.microsoft.com/office/drawing/2014/main" val="10000"/>
+                    <a16:rowId xmlns:a16="http://schemas.microsoft.com/office/drawing/2014/main" xmlns="" val="10000"/>
                   </a:ext>
                 </a:extLst>
               </a:tr>
@@ -8717,7 +9382,7 @@
                 </a:tc>
                 <a:extLst>
                   <a:ext uri="{0D108BD9-81ED-4DB2-BD59-A6C34878D82A}">
-                    <a16:rowId xmlns:a16="http://schemas.microsoft.com/office/drawing/2014/main" val="10001"/>
+                    <a16:rowId xmlns:a16="http://schemas.microsoft.com/office/drawing/2014/main" xmlns="" val="10001"/>
                   </a:ext>
                 </a:extLst>
               </a:tr>
@@ -8752,7 +9417,7 @@
                 </a:tc>
                 <a:extLst>
                   <a:ext uri="{0D108BD9-81ED-4DB2-BD59-A6C34878D82A}">
-                    <a16:rowId xmlns:a16="http://schemas.microsoft.com/office/drawing/2014/main" val="10002"/>
+                    <a16:rowId xmlns:a16="http://schemas.microsoft.com/office/drawing/2014/main" xmlns="" val="10002"/>
                   </a:ext>
                 </a:extLst>
               </a:tr>
@@ -8792,7 +9457,7 @@
                 </a:tc>
                 <a:extLst>
                   <a:ext uri="{0D108BD9-81ED-4DB2-BD59-A6C34878D82A}">
-                    <a16:rowId xmlns:a16="http://schemas.microsoft.com/office/drawing/2014/main" val="10003"/>
+                    <a16:rowId xmlns:a16="http://schemas.microsoft.com/office/drawing/2014/main" xmlns="" val="10003"/>
                   </a:ext>
                 </a:extLst>
               </a:tr>
@@ -9063,27 +9728,40 @@
           </a:bodyPr>
           <a:lstStyle/>
           <a:p>
+            <a:pPr marL="571500" indent="-571500">
+              <a:buFont typeface="Arial" panose="020B0604020202020204" pitchFamily="34" charset="0"/>
+              <a:buChar char="•"/>
+            </a:pPr>
             <a:r>
               <a:rPr lang="en-US" dirty="0"/>
               <a:t>Too many VLFs create performance problems (“VLF Fragmentation”)</a:t>
             </a:r>
           </a:p>
           <a:p>
-            <a:pPr lvl="1"/>
+            <a:pPr marL="1033227" lvl="1" indent="-457200">
+              <a:buFont typeface="Arial" panose="020B0604020202020204" pitchFamily="34" charset="0"/>
+              <a:buChar char="•"/>
+            </a:pPr>
             <a:r>
               <a:rPr lang="en-US" dirty="0"/>
               <a:t>Slows noticeably any time log is read</a:t>
             </a:r>
           </a:p>
           <a:p>
-            <a:pPr lvl="2"/>
+            <a:pPr marL="1494953" lvl="2" indent="-342900">
+              <a:buFont typeface="Arial" panose="020B0604020202020204" pitchFamily="34" charset="0"/>
+              <a:buChar char="•"/>
+            </a:pPr>
             <a:r>
               <a:rPr lang="en-US" dirty="0"/>
               <a:t>Start-up time for database, log reader, backup &amp; restore, etc.</a:t>
             </a:r>
           </a:p>
           <a:p>
-            <a:pPr lvl="1"/>
+            <a:pPr marL="1033227" lvl="1" indent="-457200">
+              <a:buFont typeface="Arial" panose="020B0604020202020204" pitchFamily="34" charset="0"/>
+              <a:buChar char="•"/>
+            </a:pPr>
             <a:r>
               <a:rPr lang="en-US" dirty="0"/>
               <a:t>But smaller VLFs are faster to allocate (zero-</a:t>
@@ -9098,13 +9776,20 @@
             </a:r>
           </a:p>
           <a:p>
+            <a:pPr marL="571500" indent="-571500">
+              <a:buFont typeface="Arial" panose="020B0604020202020204" pitchFamily="34" charset="0"/>
+              <a:buChar char="•"/>
+            </a:pPr>
             <a:r>
               <a:rPr lang="en-US" dirty="0"/>
               <a:t>Too few VLFs also create performance problems</a:t>
             </a:r>
           </a:p>
           <a:p>
-            <a:pPr lvl="1"/>
+            <a:pPr marL="1033227" lvl="1" indent="-457200">
+              <a:buFont typeface="Arial" panose="020B0604020202020204" pitchFamily="34" charset="0"/>
+              <a:buChar char="•"/>
+            </a:pPr>
             <a:r>
               <a:rPr lang="en-US" dirty="0"/>
               <a:t>Clearing the log, especially when long-running transactions are happening</a:t>
@@ -9179,56 +9864,74 @@
           <a:bodyPr/>
           <a:lstStyle/>
           <a:p>
+            <a:pPr marL="571500" indent="-571500">
+              <a:buFont typeface="Arial" panose="020B0604020202020204" pitchFamily="34" charset="0"/>
+              <a:buChar char="•"/>
+            </a:pPr>
             <a:r>
               <a:rPr lang="en-US" dirty="0"/>
               <a:t>Why?</a:t>
             </a:r>
           </a:p>
           <a:p>
-            <a:pPr lvl="1"/>
+            <a:pPr marL="1033227" lvl="1" indent="-457200">
+              <a:buFont typeface="Arial" panose="020B0604020202020204" pitchFamily="34" charset="0"/>
+              <a:buChar char="•"/>
+            </a:pPr>
             <a:r>
               <a:rPr lang="en-US" dirty="0"/>
               <a:t>Eliminate VLF fragmentation</a:t>
             </a:r>
           </a:p>
           <a:p>
-            <a:pPr lvl="1"/>
+            <a:pPr marL="1033227" lvl="1" indent="-457200">
+              <a:buFont typeface="Arial" panose="020B0604020202020204" pitchFamily="34" charset="0"/>
+              <a:buChar char="•"/>
+            </a:pPr>
             <a:r>
               <a:rPr lang="en-US" dirty="0"/>
               <a:t>Avoid log growth during user operations</a:t>
             </a:r>
           </a:p>
           <a:p>
-            <a:pPr lvl="2"/>
+            <a:pPr marL="1494953" lvl="2" indent="-342900">
+              <a:buFont typeface="Arial" panose="020B0604020202020204" pitchFamily="34" charset="0"/>
+              <a:buChar char="•"/>
+            </a:pPr>
             <a:r>
               <a:rPr lang="en-US" dirty="0"/>
               <a:t>Can be time-consuming due to zero-initialization</a:t>
             </a:r>
           </a:p>
           <a:p>
+            <a:pPr marL="571500" indent="-571500">
+              <a:buFont typeface="Arial" panose="020B0604020202020204" pitchFamily="34" charset="0"/>
+              <a:buChar char="•"/>
+            </a:pPr>
             <a:r>
               <a:rPr lang="en-US" dirty="0"/>
               <a:t>However, plan for auto-growth</a:t>
             </a:r>
           </a:p>
           <a:p>
-            <a:pPr lvl="1"/>
+            <a:pPr marL="1033227" lvl="1" indent="-457200">
+              <a:buFont typeface="Arial" panose="020B0604020202020204" pitchFamily="34" charset="0"/>
+              <a:buChar char="•"/>
+            </a:pPr>
             <a:r>
               <a:rPr lang="en-US" dirty="0"/>
               <a:t>Set reasonable auto-growth parameters</a:t>
             </a:r>
           </a:p>
           <a:p>
-            <a:pPr lvl="1"/>
-            <a:r>
-              <a:rPr lang="en-US" dirty="0"/>
-              <a:t>Fixed growth amount, </a:t>
-            </a:r>
-            <a:r>
-              <a:rPr lang="en-US"/>
-              <a:t>not percentage</a:t>
-            </a:r>
-            <a:endParaRPr lang="en-US" dirty="0"/>
+            <a:pPr marL="1033227" lvl="1" indent="-457200">
+              <a:buFont typeface="Arial" panose="020B0604020202020204" pitchFamily="34" charset="0"/>
+              <a:buChar char="•"/>
+            </a:pPr>
+            <a:r>
+              <a:rPr lang="en-US" dirty="0"/>
+              <a:t>Fixed growth amount, not percentage</a:t>
+            </a:r>
           </a:p>
         </p:txBody>
       </p:sp>
@@ -9299,6 +10002,10 @@
           <a:bodyPr/>
           <a:lstStyle/>
           <a:p>
+            <a:pPr marL="571500" indent="-571500">
+              <a:buFont typeface="Arial" panose="020B0604020202020204" pitchFamily="34" charset="0"/>
+              <a:buChar char="•"/>
+            </a:pPr>
             <a:r>
               <a:rPr lang="en-US" u="sng" dirty="0"/>
               <a:t>Everything</a:t>
@@ -9317,7 +10024,10 @@
             </a:r>
           </a:p>
           <a:p>
-            <a:pPr lvl="1"/>
+            <a:pPr marL="1033227" lvl="1" indent="-457200">
+              <a:buFont typeface="Arial" panose="020B0604020202020204" pitchFamily="34" charset="0"/>
+              <a:buChar char="•"/>
+            </a:pPr>
             <a:r>
               <a:rPr lang="en-US" dirty="0"/>
               <a:t>Includes data to </a:t>
@@ -9332,7 +10042,10 @@
             </a:r>
           </a:p>
           <a:p>
-            <a:pPr lvl="1"/>
+            <a:pPr marL="1033227" lvl="1" indent="-457200">
+              <a:buFont typeface="Arial" panose="020B0604020202020204" pitchFamily="34" charset="0"/>
+              <a:buChar char="•"/>
+            </a:pPr>
             <a:r>
               <a:rPr lang="en-US" dirty="0"/>
               <a:t>Includes data to </a:t>
@@ -9347,6 +10060,10 @@
             </a:r>
           </a:p>
           <a:p>
+            <a:pPr marL="342900" indent="-342900">
+              <a:buFont typeface="Arial" panose="020B0604020202020204" pitchFamily="34" charset="0"/>
+              <a:buChar char="•"/>
+            </a:pPr>
             <a:r>
               <a:rPr lang="en-US" sz="2268" dirty="0"/>
               <a:t>Very limited exceptions for some </a:t>
@@ -9529,46 +10246,59 @@
           </a:bodyPr>
           <a:lstStyle/>
           <a:p>
-            <a:r>
-              <a:rPr lang="en-US" dirty="0"/>
+            <a:pPr marL="571500" indent="-571500">
+              <a:buFont typeface="Arial" panose="020B0604020202020204" pitchFamily="34" charset="0"/>
+              <a:buChar char="•"/>
+            </a:pPr>
+            <a:r>
+              <a:rPr lang="en-US" sz="3200" dirty="0"/>
               <a:t>Watch your VLF count</a:t>
             </a:r>
           </a:p>
           <a:p>
-            <a:r>
-              <a:rPr lang="en-US" dirty="0"/>
-              <a:t>Monitor log </a:t>
-            </a:r>
-            <a:r>
-              <a:rPr lang="en-US"/>
-              <a:t>size over time</a:t>
-            </a:r>
-            <a:endParaRPr lang="en-US" dirty="0"/>
-          </a:p>
-          <a:p>
-            <a:r>
-              <a:rPr lang="en-US" dirty="0"/>
+            <a:pPr marL="571500" indent="-571500">
+              <a:buFont typeface="Arial" panose="020B0604020202020204" pitchFamily="34" charset="0"/>
+              <a:buChar char="•"/>
+            </a:pPr>
+            <a:r>
+              <a:rPr lang="en-US" sz="3200" dirty="0"/>
+              <a:t>Monitor log size over time</a:t>
+            </a:r>
+          </a:p>
+          <a:p>
+            <a:pPr marL="571500" indent="-571500">
+              <a:buFont typeface="Arial" panose="020B0604020202020204" pitchFamily="34" charset="0"/>
+              <a:buChar char="•"/>
+            </a:pPr>
+            <a:r>
+              <a:rPr lang="en-US" sz="3200" dirty="0"/>
               <a:t>Set SQL Alerts on:</a:t>
             </a:r>
           </a:p>
           <a:p>
-            <a:pPr lvl="1"/>
-            <a:r>
-              <a:rPr lang="en-US" dirty="0"/>
+            <a:pPr marL="1033227" lvl="1" indent="-457200">
+              <a:buFont typeface="Arial" panose="020B0604020202020204" pitchFamily="34" charset="0"/>
+              <a:buChar char="•"/>
+            </a:pPr>
+            <a:r>
+              <a:rPr lang="en-US" sz="2800" dirty="0"/>
               <a:t>Severity 17 errors (will alert on log full)</a:t>
             </a:r>
           </a:p>
           <a:p>
-            <a:pPr lvl="1"/>
-            <a:r>
-              <a:rPr lang="en-US" dirty="0"/>
+            <a:pPr marL="1033227" lvl="1" indent="-457200">
+              <a:buFont typeface="Arial" panose="020B0604020202020204" pitchFamily="34" charset="0"/>
+              <a:buChar char="•"/>
+            </a:pPr>
+            <a:r>
+              <a:rPr lang="en-US" sz="2800" dirty="0"/>
               <a:t>Error 5145</a:t>
             </a:r>
           </a:p>
           <a:p>
             <a:pPr lvl="2"/>
             <a:r>
-              <a:rPr lang="en-US" sz="1701" b="1" dirty="0" err="1">
+              <a:rPr lang="en-US" sz="2000" b="1" dirty="0" err="1">
                 <a:solidFill>
                   <a:srgbClr val="FF0000"/>
                 </a:solidFill>
@@ -9578,7 +10308,7 @@
               <a:t>Autogrow</a:t>
             </a:r>
             <a:r>
-              <a:rPr lang="en-US" sz="1701" b="1" dirty="0">
+              <a:rPr lang="en-US" sz="2000" b="1" dirty="0">
                 <a:solidFill>
                   <a:srgbClr val="FF0000"/>
                 </a:solidFill>
@@ -9589,16 +10319,19 @@
             </a:r>
           </a:p>
           <a:p>
-            <a:pPr lvl="1"/>
-            <a:r>
-              <a:rPr lang="en-US" dirty="0"/>
+            <a:pPr marL="1033227" lvl="1" indent="-457200">
+              <a:buFont typeface="Arial" panose="020B0604020202020204" pitchFamily="34" charset="0"/>
+              <a:buChar char="•"/>
+            </a:pPr>
+            <a:r>
+              <a:rPr lang="en-US" sz="2800" dirty="0"/>
               <a:t>Error 5144</a:t>
             </a:r>
           </a:p>
           <a:p>
             <a:pPr lvl="2"/>
             <a:r>
-              <a:rPr lang="en-US" sz="1701" b="1" dirty="0" err="1">
+              <a:rPr lang="en-US" sz="2000" b="1" dirty="0" err="1">
                 <a:solidFill>
                   <a:srgbClr val="FF0000"/>
                 </a:solidFill>
@@ -9608,7 +10341,7 @@
               <a:t>Autogrow</a:t>
             </a:r>
             <a:r>
-              <a:rPr lang="en-US" sz="1701" b="1" dirty="0">
+              <a:rPr lang="en-US" sz="2000" b="1" dirty="0">
                 <a:solidFill>
                   <a:srgbClr val="FF0000"/>
                 </a:solidFill>
@@ -9618,7 +10351,7 @@
               <a:t> of file </a:t>
             </a:r>
             <a:r>
-              <a:rPr lang="en-US" sz="1701" dirty="0">
+              <a:rPr lang="en-US" sz="2000" dirty="0">
                 <a:solidFill>
                   <a:srgbClr val="FF0000"/>
                 </a:solidFill>
@@ -9626,7 +10359,7 @@
               <a:t>'</a:t>
             </a:r>
             <a:r>
-              <a:rPr lang="en-US" sz="1701" b="1" dirty="0">
+              <a:rPr lang="en-US" sz="2000" b="1" dirty="0">
                 <a:solidFill>
                   <a:srgbClr val="FF0000"/>
                 </a:solidFill>
@@ -9636,7 +10369,7 @@
               <a:t>…</a:t>
             </a:r>
             <a:r>
-              <a:rPr lang="en-US" sz="1701" dirty="0">
+              <a:rPr lang="en-US" sz="2000" dirty="0">
                 <a:solidFill>
                   <a:srgbClr val="FF0000"/>
                 </a:solidFill>
@@ -9644,7 +10377,7 @@
               <a:t>'</a:t>
             </a:r>
             <a:r>
-              <a:rPr lang="en-US" sz="1701" b="1" dirty="0">
+              <a:rPr lang="en-US" sz="2000" b="1" dirty="0">
                 <a:solidFill>
                   <a:srgbClr val="FF0000"/>
                 </a:solidFill>
@@ -9654,7 +10387,7 @@
               <a:t> in database </a:t>
             </a:r>
             <a:r>
-              <a:rPr lang="en-US" sz="1701" dirty="0">
+              <a:rPr lang="en-US" sz="2000" dirty="0">
                 <a:solidFill>
                   <a:srgbClr val="FF0000"/>
                 </a:solidFill>
@@ -9662,7 +10395,7 @@
               <a:t>'</a:t>
             </a:r>
             <a:r>
-              <a:rPr lang="en-US" sz="1701" b="1" dirty="0">
+              <a:rPr lang="en-US" sz="2000" b="1" dirty="0">
                 <a:solidFill>
                   <a:srgbClr val="FF0000"/>
                 </a:solidFill>
@@ -9672,7 +10405,7 @@
               <a:t>…</a:t>
             </a:r>
             <a:r>
-              <a:rPr lang="en-US" sz="1701" dirty="0">
+              <a:rPr lang="en-US" sz="2000" dirty="0">
                 <a:solidFill>
                   <a:srgbClr val="FF0000"/>
                 </a:solidFill>
@@ -9680,7 +10413,7 @@
               <a:t>'</a:t>
             </a:r>
             <a:r>
-              <a:rPr lang="en-US" sz="1701" b="1" dirty="0">
+              <a:rPr lang="en-US" sz="2000" b="1" dirty="0">
                 <a:solidFill>
                   <a:srgbClr val="FF0000"/>
                 </a:solidFill>
@@ -9761,6 +10494,10 @@
           </a:bodyPr>
           <a:lstStyle/>
           <a:p>
+            <a:pPr marL="571500" indent="-571500">
+              <a:buFont typeface="Arial" panose="020B0604020202020204" pitchFamily="34" charset="0"/>
+              <a:buChar char="•"/>
+            </a:pPr>
             <a:r>
               <a:rPr lang="en-US" dirty="0" err="1"/>
               <a:t>PerfMon</a:t>
@@ -9771,35 +10508,33 @@
             </a:r>
           </a:p>
           <a:p>
-            <a:pPr lvl="1"/>
+            <a:pPr marL="1033227" lvl="1" indent="-457200">
+              <a:buFont typeface="Arial" panose="020B0604020202020204" pitchFamily="34" charset="0"/>
+              <a:buChar char="•"/>
+            </a:pPr>
             <a:r>
               <a:rPr lang="en-US" dirty="0"/>
               <a:t>One row per counter per database (plus rollup)</a:t>
             </a:r>
           </a:p>
           <a:p>
-            <a:pPr lvl="1"/>
-            <a:r>
-              <a:rPr lang="en-US" dirty="0"/>
-              <a:t>Paul </a:t>
-            </a:r>
-            <a:r>
-              <a:rPr lang="en-US"/>
-              <a:t>Randal </a:t>
-            </a:r>
-            <a:r>
-              <a:rPr lang="en-US">
+            <a:pPr marL="1033227" lvl="1" indent="-457200">
+              <a:buFont typeface="Arial" panose="020B0604020202020204" pitchFamily="34" charset="0"/>
+              <a:buChar char="•"/>
+            </a:pPr>
+            <a:r>
+              <a:rPr lang="en-US" dirty="0"/>
+              <a:t>Paul Randal </a:t>
+            </a:r>
+            <a:r>
+              <a:rPr lang="en-US" dirty="0">
                 <a:hlinkClick r:id="rId2"/>
               </a:rPr>
               <a:t>explains</a:t>
             </a:r>
             <a:r>
-              <a:rPr lang="en-US"/>
-              <a:t> what </a:t>
-            </a:r>
-            <a:r>
-              <a:rPr lang="en-US" dirty="0"/>
-              <a:t>to look for.</a:t>
+              <a:rPr lang="en-US" dirty="0"/>
+              <a:t> what to look for.</a:t>
             </a:r>
           </a:p>
           <a:p>
@@ -10469,28 +11204,40 @@
             </a:r>
           </a:p>
           <a:p>
-            <a:pPr lvl="1"/>
+            <a:pPr marL="1033227" lvl="1" indent="-457200">
+              <a:buFont typeface="Arial" panose="020B0604020202020204" pitchFamily="34" charset="0"/>
+              <a:buChar char="•"/>
+            </a:pPr>
             <a:r>
               <a:rPr lang="en-US" dirty="0"/>
               <a:t>Slide deck</a:t>
             </a:r>
           </a:p>
           <a:p>
-            <a:pPr lvl="1"/>
+            <a:pPr marL="1033227" lvl="1" indent="-457200">
+              <a:buFont typeface="Arial" panose="020B0604020202020204" pitchFamily="34" charset="0"/>
+              <a:buChar char="•"/>
+            </a:pPr>
             <a:r>
               <a:rPr lang="en-US" dirty="0"/>
               <a:t>Scripts</a:t>
             </a:r>
           </a:p>
           <a:p>
-            <a:pPr lvl="1"/>
+            <a:pPr marL="1033227" lvl="1" indent="-457200">
+              <a:buFont typeface="Arial" panose="020B0604020202020204" pitchFamily="34" charset="0"/>
+              <a:buChar char="•"/>
+            </a:pPr>
             <a:r>
               <a:rPr lang="en-US" dirty="0"/>
               <a:t>Sample database</a:t>
             </a:r>
           </a:p>
           <a:p>
-            <a:pPr lvl="1"/>
+            <a:pPr marL="1033227" lvl="1" indent="-457200">
+              <a:buFont typeface="Arial" panose="020B0604020202020204" pitchFamily="34" charset="0"/>
+              <a:buChar char="•"/>
+            </a:pPr>
             <a:r>
               <a:rPr lang="en-US" dirty="0"/>
               <a:t>SQL Server Log File Visualizer &amp; LSN Converter binaries &amp; source</a:t>
@@ -10508,10 +11255,7 @@
             <a:r>
               <a:rPr lang="en-US" dirty="0">
                 <a:solidFill>
-                  <a:schemeClr val="accent1">
-                    <a:lumMod val="60000"/>
-                    <a:lumOff val="40000"/>
-                  </a:schemeClr>
+                  <a:srgbClr val="0070C0"/>
                 </a:solidFill>
               </a:rPr>
               <a:t>brian@tf3604.com	• @tf3604</a:t>
@@ -10586,27 +11330,40 @@
           <a:bodyPr/>
           <a:lstStyle/>
           <a:p>
+            <a:pPr marL="571500" indent="-571500">
+              <a:buFont typeface="Arial" panose="020B0604020202020204" pitchFamily="34" charset="0"/>
+              <a:buChar char="•"/>
+            </a:pPr>
             <a:r>
               <a:rPr lang="en-US" dirty="0"/>
               <a:t>Logical Log File</a:t>
             </a:r>
           </a:p>
           <a:p>
-            <a:pPr lvl="1"/>
+            <a:pPr marL="1033227" lvl="1" indent="-457200">
+              <a:buFont typeface="Arial" panose="020B0604020202020204" pitchFamily="34" charset="0"/>
+              <a:buChar char="•"/>
+            </a:pPr>
             <a:r>
               <a:rPr lang="en-US" dirty="0"/>
               <a:t>Always growing</a:t>
             </a:r>
           </a:p>
           <a:p>
-            <a:pPr lvl="1"/>
+            <a:pPr marL="1033227" lvl="1" indent="-457200">
+              <a:buFont typeface="Arial" panose="020B0604020202020204" pitchFamily="34" charset="0"/>
+              <a:buChar char="•"/>
+            </a:pPr>
             <a:r>
               <a:rPr lang="en-US" dirty="0"/>
               <a:t>Write once / read many</a:t>
             </a:r>
           </a:p>
           <a:p>
-            <a:pPr lvl="2"/>
+            <a:pPr marL="1494953" lvl="2" indent="-342900">
+              <a:buFont typeface="Arial" panose="020B0604020202020204" pitchFamily="34" charset="0"/>
+              <a:buChar char="•"/>
+            </a:pPr>
             <a:r>
               <a:rPr lang="en-US" dirty="0"/>
               <a:t>After being written, log records are </a:t>
@@ -10621,27 +11378,40 @@
             </a:r>
           </a:p>
           <a:p>
+            <a:pPr marL="571500" indent="-571500">
+              <a:buFont typeface="Arial" panose="020B0604020202020204" pitchFamily="34" charset="0"/>
+              <a:buChar char="•"/>
+            </a:pPr>
             <a:r>
               <a:rPr lang="en-US" dirty="0"/>
               <a:t>Physical Log File</a:t>
             </a:r>
           </a:p>
           <a:p>
-            <a:pPr lvl="1"/>
+            <a:pPr marL="1033227" lvl="1" indent="-457200">
+              <a:buFont typeface="Arial" panose="020B0604020202020204" pitchFamily="34" charset="0"/>
+              <a:buChar char="•"/>
+            </a:pPr>
             <a:r>
               <a:rPr lang="en-US" dirty="0"/>
               <a:t>Only grows when full (or manually grown)</a:t>
             </a:r>
           </a:p>
           <a:p>
-            <a:pPr lvl="1"/>
+            <a:pPr marL="1033227" lvl="1" indent="-457200">
+              <a:buFont typeface="Arial" panose="020B0604020202020204" pitchFamily="34" charset="0"/>
+              <a:buChar char="•"/>
+            </a:pPr>
             <a:r>
               <a:rPr lang="en-US" dirty="0"/>
               <a:t>Divided into virtual log files (VLFs)</a:t>
             </a:r>
           </a:p>
           <a:p>
-            <a:pPr lvl="1"/>
+            <a:pPr marL="1033227" lvl="1" indent="-457200">
+              <a:buFont typeface="Arial" panose="020B0604020202020204" pitchFamily="34" charset="0"/>
+              <a:buChar char="•"/>
+            </a:pPr>
             <a:r>
               <a:rPr lang="en-US" dirty="0"/>
               <a:t>VLFs are inactivated when possible and over-written</a:t>
@@ -10714,13 +11484,17 @@
         <p:spPr>
           <a:xfrm>
             <a:off x="5553239" y="1512041"/>
-            <a:ext cx="4095111" cy="4276616"/>
+            <a:ext cx="4641894" cy="4276616"/>
           </a:xfrm>
         </p:spPr>
         <p:txBody>
           <a:bodyPr/>
           <a:lstStyle/>
           <a:p>
+            <a:pPr marL="571500" indent="-571500">
+              <a:buFont typeface="Arial" panose="020B0604020202020204" pitchFamily="34" charset="0"/>
+              <a:buChar char="•"/>
+            </a:pPr>
             <a:r>
               <a:rPr lang="en-US" dirty="0"/>
               <a:t>The Transaction Log is just a file …</a:t>
@@ -10816,20 +11590,28 @@
         </p:nvSpPr>
         <p:spPr>
           <a:xfrm>
-            <a:off x="5553239" y="1512041"/>
-            <a:ext cx="4095111" cy="4276616"/>
+            <a:off x="5553238" y="1512041"/>
+            <a:ext cx="4752989" cy="4276616"/>
           </a:xfrm>
         </p:spPr>
         <p:txBody>
           <a:bodyPr/>
           <a:lstStyle/>
           <a:p>
+            <a:pPr marL="571500" indent="-571500">
+              <a:buFont typeface="Arial" panose="020B0604020202020204" pitchFamily="34" charset="0"/>
+              <a:buChar char="•"/>
+            </a:pPr>
             <a:r>
               <a:rPr lang="en-US" dirty="0"/>
               <a:t>The Transaction Log is just a file …</a:t>
             </a:r>
           </a:p>
           <a:p>
+            <a:pPr marL="571500" indent="-571500">
+              <a:buFont typeface="Arial" panose="020B0604020202020204" pitchFamily="34" charset="0"/>
+              <a:buChar char="•"/>
+            </a:pPr>
             <a:r>
               <a:rPr lang="en-US" dirty="0"/>
               <a:t>With a bit of header information …</a:t>
@@ -10926,34 +11708,49 @@
         <p:spPr>
           <a:xfrm>
             <a:off x="5553239" y="1512041"/>
-            <a:ext cx="4095111" cy="4276616"/>
+            <a:ext cx="4505161" cy="4276616"/>
           </a:xfrm>
         </p:spPr>
         <p:txBody>
           <a:bodyPr>
-            <a:normAutofit lnSpcReduction="10000"/>
+            <a:normAutofit fontScale="92500"/>
           </a:bodyPr>
           <a:lstStyle/>
           <a:p>
+            <a:pPr marL="571500" indent="-571500">
+              <a:buFont typeface="Arial" panose="020B0604020202020204" pitchFamily="34" charset="0"/>
+              <a:buChar char="•"/>
+            </a:pPr>
             <a:r>
               <a:rPr lang="en-US" dirty="0"/>
               <a:t>The Transaction Log is just a file …</a:t>
             </a:r>
           </a:p>
           <a:p>
+            <a:pPr marL="571500" indent="-571500">
+              <a:buFont typeface="Arial" panose="020B0604020202020204" pitchFamily="34" charset="0"/>
+              <a:buChar char="•"/>
+            </a:pPr>
             <a:r>
               <a:rPr lang="en-US" dirty="0"/>
               <a:t>With a bit of header information …</a:t>
             </a:r>
           </a:p>
           <a:p>
+            <a:pPr marL="571500" indent="-571500">
+              <a:buFont typeface="Arial" panose="020B0604020202020204" pitchFamily="34" charset="0"/>
+              <a:buChar char="•"/>
+            </a:pPr>
             <a:r>
               <a:rPr lang="en-US" dirty="0"/>
               <a:t>Then divided into Virtual Log Files.</a:t>
             </a:r>
           </a:p>
           <a:p>
-            <a:pPr lvl="1"/>
+            <a:pPr marL="1033227" lvl="1" indent="-457200">
+              <a:buFont typeface="Arial" panose="020B0604020202020204" pitchFamily="34" charset="0"/>
+              <a:buChar char="•"/>
+            </a:pPr>
             <a:r>
               <a:rPr lang="en-US" dirty="0"/>
               <a:t>Not necessarily of equal size</a:t>

</xml_diff>

<commit_message>
Note about compensation = anti-operation and about breaking up large DML due to log space reservation.
</commit_message>
<xml_diff>
--- a/TransactionLog.pptx
+++ b/TransactionLog.pptx
@@ -264,7 +264,7 @@
           <a:p>
             <a:fld id="{18BF2EA9-CFC8-45FA-BD4C-CF2CA22F3AA1}" type="datetimeFigureOut">
               <a:rPr lang="en-US" smtClean="0"/>
-              <a:t>08/02/2017</a:t>
+              <a:t>08/07/2017</a:t>
             </a:fld>
             <a:endParaRPr lang="en-US"/>
           </a:p>
@@ -1749,7 +1749,7 @@
           <a:graphicData uri="http://schemas.openxmlformats.org/presentationml/2006/ole">
             <mc:AlternateContent xmlns:mc="http://schemas.openxmlformats.org/markup-compatibility/2006">
               <mc:Choice xmlns:v="urn:schemas-microsoft-com:vml" Requires="v">
-                <p:oleObj spid="_x0000_s1034" name="Image" r:id="rId10" imgW="2279520" imgH="1310400" progId="Photoshop.Image.18">
+                <p:oleObj spid="_x0000_s1036" name="Image" r:id="rId10" imgW="2279520" imgH="1310400" progId="Photoshop.Image.18">
                   <p:embed/>
                 </p:oleObj>
               </mc:Choice>
@@ -2127,7 +2127,7 @@
           <p:cNvPr id="2" name="Title 1">
             <a:extLst>
               <a:ext uri="{FF2B5EF4-FFF2-40B4-BE49-F238E27FC236}">
-                <a16:creationId xmlns:a16="http://schemas.microsoft.com/office/drawing/2014/main" xmlns="" id="{83E7BC17-A4CB-4C5C-8189-2BD06BE3E485}"/>
+                <a16:creationId xmlns="" xmlns:a16="http://schemas.microsoft.com/office/drawing/2014/main" id="{83E7BC17-A4CB-4C5C-8189-2BD06BE3E485}"/>
               </a:ext>
             </a:extLst>
           </p:cNvPr>
@@ -2189,7 +2189,7 @@
           <p:cNvPr id="3" name="Text Placeholder 2">
             <a:extLst>
               <a:ext uri="{FF2B5EF4-FFF2-40B4-BE49-F238E27FC236}">
-                <a16:creationId xmlns:a16="http://schemas.microsoft.com/office/drawing/2014/main" xmlns="" id="{580DE922-DD41-46E4-A789-EAF96778ABA6}"/>
+                <a16:creationId xmlns="" xmlns:a16="http://schemas.microsoft.com/office/drawing/2014/main" id="{580DE922-DD41-46E4-A789-EAF96778ABA6}"/>
               </a:ext>
             </a:extLst>
           </p:cNvPr>
@@ -2217,7 +2217,7 @@
           <p:cNvPr id="5" name="TextBox 4">
             <a:extLst>
               <a:ext uri="{FF2B5EF4-FFF2-40B4-BE49-F238E27FC236}">
-                <a16:creationId xmlns:a16="http://schemas.microsoft.com/office/drawing/2014/main" xmlns="" id="{13C0FC99-58B7-4BAC-A4C4-1F44433F31BD}"/>
+                <a16:creationId xmlns="" xmlns:a16="http://schemas.microsoft.com/office/drawing/2014/main" id="{13C0FC99-58B7-4BAC-A4C4-1F44433F31BD}"/>
               </a:ext>
             </a:extLst>
           </p:cNvPr>
@@ -5082,21 +5082,21 @@
                 <a:gridCol w="4304521">
                   <a:extLst>
                     <a:ext uri="{9D8B030D-6E8A-4147-A177-3AD203B41FA5}">
-                      <a16:colId xmlns:a16="http://schemas.microsoft.com/office/drawing/2014/main" xmlns="" val="20000"/>
+                      <a16:colId xmlns="" xmlns:a16="http://schemas.microsoft.com/office/drawing/2014/main" val="20000"/>
                     </a:ext>
                   </a:extLst>
                 </a:gridCol>
                 <a:gridCol w="3525078">
                   <a:extLst>
                     <a:ext uri="{9D8B030D-6E8A-4147-A177-3AD203B41FA5}">
-                      <a16:colId xmlns:a16="http://schemas.microsoft.com/office/drawing/2014/main" xmlns="" val="20001"/>
+                      <a16:colId xmlns="" xmlns:a16="http://schemas.microsoft.com/office/drawing/2014/main" val="20001"/>
                     </a:ext>
                   </a:extLst>
                 </a:gridCol>
                 <a:gridCol w="2970400">
                   <a:extLst>
                     <a:ext uri="{9D8B030D-6E8A-4147-A177-3AD203B41FA5}">
-                      <a16:colId xmlns:a16="http://schemas.microsoft.com/office/drawing/2014/main" xmlns="" val="20002"/>
+                      <a16:colId xmlns="" xmlns:a16="http://schemas.microsoft.com/office/drawing/2014/main" val="20002"/>
                     </a:ext>
                   </a:extLst>
                 </a:gridCol>
@@ -5143,7 +5143,7 @@
                 </a:tc>
                 <a:extLst>
                   <a:ext uri="{0D108BD9-81ED-4DB2-BD59-A6C34878D82A}">
-                    <a16:rowId xmlns:a16="http://schemas.microsoft.com/office/drawing/2014/main" xmlns="" val="10000"/>
+                    <a16:rowId xmlns="" xmlns:a16="http://schemas.microsoft.com/office/drawing/2014/main" val="10000"/>
                   </a:ext>
                 </a:extLst>
               </a:tr>
@@ -5206,7 +5206,7 @@
                 </a:tc>
                 <a:extLst>
                   <a:ext uri="{0D108BD9-81ED-4DB2-BD59-A6C34878D82A}">
-                    <a16:rowId xmlns:a16="http://schemas.microsoft.com/office/drawing/2014/main" xmlns="" val="10001"/>
+                    <a16:rowId xmlns="" xmlns:a16="http://schemas.microsoft.com/office/drawing/2014/main" val="10001"/>
                   </a:ext>
                 </a:extLst>
               </a:tr>
@@ -5277,7 +5277,7 @@
                 </a:tc>
                 <a:extLst>
                   <a:ext uri="{0D108BD9-81ED-4DB2-BD59-A6C34878D82A}">
-                    <a16:rowId xmlns:a16="http://schemas.microsoft.com/office/drawing/2014/main" xmlns="" val="10002"/>
+                    <a16:rowId xmlns="" xmlns:a16="http://schemas.microsoft.com/office/drawing/2014/main" val="10002"/>
                   </a:ext>
                 </a:extLst>
               </a:tr>
@@ -5323,7 +5323,7 @@
                 </a:tc>
                 <a:extLst>
                   <a:ext uri="{0D108BD9-81ED-4DB2-BD59-A6C34878D82A}">
-                    <a16:rowId xmlns:a16="http://schemas.microsoft.com/office/drawing/2014/main" xmlns="" val="10003"/>
+                    <a16:rowId xmlns="" xmlns:a16="http://schemas.microsoft.com/office/drawing/2014/main" val="10003"/>
                   </a:ext>
                 </a:extLst>
               </a:tr>
@@ -5374,7 +5374,7 @@
                 </a:tc>
                 <a:extLst>
                   <a:ext uri="{0D108BD9-81ED-4DB2-BD59-A6C34878D82A}">
-                    <a16:rowId xmlns:a16="http://schemas.microsoft.com/office/drawing/2014/main" xmlns="" val="3543017676"/>
+                    <a16:rowId xmlns="" xmlns:a16="http://schemas.microsoft.com/office/drawing/2014/main" val="3543017676"/>
                   </a:ext>
                 </a:extLst>
               </a:tr>
@@ -5861,7 +5861,7 @@
         </p:blipFill>
         <p:spPr>
           <a:xfrm>
-            <a:off x="2161159" y="1561932"/>
+            <a:off x="2973010" y="2101657"/>
             <a:ext cx="7198170" cy="3356311"/>
           </a:xfrm>
           <a:prstGeom prst="rect">
@@ -7007,11 +7007,11 @@
   <p:clrMapOvr>
     <a:masterClrMapping/>
   </p:clrMapOvr>
-  <mc:AlternateContent xmlns:mc="http://schemas.openxmlformats.org/markup-compatibility/2006">
-    <mc:Choice xmlns:p14="http://schemas.microsoft.com/office/powerpoint/2010/main" Requires="p14">
+  <mc:AlternateContent xmlns:mc="http://schemas.openxmlformats.org/markup-compatibility/2006" xmlns:p14="http://schemas.microsoft.com/office/powerpoint/2010/main">
+    <mc:Choice Requires="p14">
       <p:transition spd="slow" p14:dur="2000"/>
     </mc:Choice>
-    <mc:Fallback>
+    <mc:Fallback xmlns="">
       <p:transition spd="slow"/>
     </mc:Fallback>
   </mc:AlternateContent>
@@ -8722,7 +8722,7 @@
         </p:spPr>
         <p:txBody>
           <a:bodyPr>
-            <a:normAutofit fontScale="92500"/>
+            <a:normAutofit fontScale="92500" lnSpcReduction="10000"/>
           </a:bodyPr>
           <a:lstStyle/>
           <a:p>
@@ -8732,8 +8732,13 @@
             </a:pPr>
             <a:r>
               <a:rPr lang="en-US" dirty="0"/>
-              <a:t>Creates a new log record indicating that the operation was undone. This is called a “Compensation” record.</a:t>
-            </a:r>
+              <a:t>Creates a new log record indicating that the operation was undone. This is called a “Compensation” </a:t>
+            </a:r>
+            <a:r>
+              <a:rPr lang="en-US" dirty="0" smtClean="0"/>
+              <a:t>record (or “anti-operation”).</a:t>
+            </a:r>
+            <a:endParaRPr lang="en-US" dirty="0"/>
           </a:p>
           <a:p>
             <a:pPr marL="571500" indent="-571500">
@@ -9082,8 +9087,31 @@
             </a:pPr>
             <a:r>
               <a:rPr lang="en-US" dirty="0"/>
-              <a:t>As the initial operations are performed, SQL Server will “reserve” log space to ensure that a rollback is possible.</a:t>
-            </a:r>
+              <a:t>As the initial operations are performed, SQL Server will “reserve” log space to ensure that a rollback is possible</a:t>
+            </a:r>
+            <a:r>
+              <a:rPr lang="en-US" dirty="0" smtClean="0"/>
+              <a:t>.</a:t>
+            </a:r>
+          </a:p>
+          <a:p>
+            <a:pPr marL="1609253" lvl="2" indent="-457200">
+              <a:buFont typeface="Arial" panose="020B0604020202020204" pitchFamily="34" charset="0"/>
+              <a:buChar char="•"/>
+            </a:pPr>
+            <a:r>
+              <a:rPr lang="en-US" dirty="0" smtClean="0"/>
+              <a:t>Very large DML operations will reserve a lot of log space (and will prevent the log from clearing while in process).  </a:t>
+            </a:r>
+            <a:r>
+              <a:rPr lang="en-US" dirty="0" smtClean="0"/>
+              <a:t>Often better to split up into </a:t>
+            </a:r>
+            <a:r>
+              <a:rPr lang="en-US" smtClean="0"/>
+              <a:t>smaller transactions.</a:t>
+            </a:r>
+            <a:endParaRPr lang="en-US" dirty="0"/>
           </a:p>
         </p:txBody>
       </p:sp>
@@ -9294,14 +9322,14 @@
                 <a:gridCol w="3034700">
                   <a:extLst>
                     <a:ext uri="{9D8B030D-6E8A-4147-A177-3AD203B41FA5}">
-                      <a16:colId xmlns:a16="http://schemas.microsoft.com/office/drawing/2014/main" xmlns="" val="20000"/>
+                      <a16:colId xmlns="" xmlns:a16="http://schemas.microsoft.com/office/drawing/2014/main" val="20000"/>
                     </a:ext>
                   </a:extLst>
                 </a:gridCol>
                 <a:gridCol w="3034700">
                   <a:extLst>
                     <a:ext uri="{9D8B030D-6E8A-4147-A177-3AD203B41FA5}">
-                      <a16:colId xmlns:a16="http://schemas.microsoft.com/office/drawing/2014/main" xmlns="" val="20001"/>
+                      <a16:colId xmlns="" xmlns:a16="http://schemas.microsoft.com/office/drawing/2014/main" val="20001"/>
                     </a:ext>
                   </a:extLst>
                 </a:gridCol>
@@ -9347,7 +9375,7 @@
                 </a:tc>
                 <a:extLst>
                   <a:ext uri="{0D108BD9-81ED-4DB2-BD59-A6C34878D82A}">
-                    <a16:rowId xmlns:a16="http://schemas.microsoft.com/office/drawing/2014/main" xmlns="" val="10000"/>
+                    <a16:rowId xmlns="" xmlns:a16="http://schemas.microsoft.com/office/drawing/2014/main" val="10000"/>
                   </a:ext>
                 </a:extLst>
               </a:tr>
@@ -9382,7 +9410,7 @@
                 </a:tc>
                 <a:extLst>
                   <a:ext uri="{0D108BD9-81ED-4DB2-BD59-A6C34878D82A}">
-                    <a16:rowId xmlns:a16="http://schemas.microsoft.com/office/drawing/2014/main" xmlns="" val="10001"/>
+                    <a16:rowId xmlns="" xmlns:a16="http://schemas.microsoft.com/office/drawing/2014/main" val="10001"/>
                   </a:ext>
                 </a:extLst>
               </a:tr>
@@ -9417,7 +9445,7 @@
                 </a:tc>
                 <a:extLst>
                   <a:ext uri="{0D108BD9-81ED-4DB2-BD59-A6C34878D82A}">
-                    <a16:rowId xmlns:a16="http://schemas.microsoft.com/office/drawing/2014/main" xmlns="" val="10002"/>
+                    <a16:rowId xmlns="" xmlns:a16="http://schemas.microsoft.com/office/drawing/2014/main" val="10002"/>
                   </a:ext>
                 </a:extLst>
               </a:tr>
@@ -9457,7 +9485,7 @@
                 </a:tc>
                 <a:extLst>
                   <a:ext uri="{0D108BD9-81ED-4DB2-BD59-A6C34878D82A}">
-                    <a16:rowId xmlns:a16="http://schemas.microsoft.com/office/drawing/2014/main" xmlns="" val="10003"/>
+                    <a16:rowId xmlns="" xmlns:a16="http://schemas.microsoft.com/office/drawing/2014/main" val="10003"/>
                   </a:ext>
                 </a:extLst>
               </a:tr>

</xml_diff>

<commit_message>
Add slide for new sys.dm_db_log_info DMV.
</commit_message>
<xml_diff>
--- a/TransactionLog.pptx
+++ b/TransactionLog.pptx
@@ -5,7 +5,7 @@
     <p:sldMasterId id="2147483648" r:id="rId1"/>
   </p:sldMasterIdLst>
   <p:notesMasterIdLst>
-    <p:notesMasterId r:id="rId55"/>
+    <p:notesMasterId r:id="rId56"/>
   </p:notesMasterIdLst>
   <p:sldIdLst>
     <p:sldId id="309" r:id="rId2"/>
@@ -32,35 +32,36 @@
     <p:sldId id="277" r:id="rId23"/>
     <p:sldId id="278" r:id="rId24"/>
     <p:sldId id="279" r:id="rId25"/>
-    <p:sldId id="280" r:id="rId26"/>
-    <p:sldId id="281" r:id="rId27"/>
-    <p:sldId id="282" r:id="rId28"/>
-    <p:sldId id="283" r:id="rId29"/>
-    <p:sldId id="284" r:id="rId30"/>
-    <p:sldId id="285" r:id="rId31"/>
-    <p:sldId id="286" r:id="rId32"/>
-    <p:sldId id="287" r:id="rId33"/>
-    <p:sldId id="288" r:id="rId34"/>
-    <p:sldId id="289" r:id="rId35"/>
-    <p:sldId id="290" r:id="rId36"/>
-    <p:sldId id="291" r:id="rId37"/>
-    <p:sldId id="292" r:id="rId38"/>
-    <p:sldId id="293" r:id="rId39"/>
-    <p:sldId id="294" r:id="rId40"/>
-    <p:sldId id="295" r:id="rId41"/>
-    <p:sldId id="296" r:id="rId42"/>
-    <p:sldId id="297" r:id="rId43"/>
-    <p:sldId id="298" r:id="rId44"/>
-    <p:sldId id="299" r:id="rId45"/>
-    <p:sldId id="300" r:id="rId46"/>
-    <p:sldId id="301" r:id="rId47"/>
-    <p:sldId id="302" r:id="rId48"/>
-    <p:sldId id="303" r:id="rId49"/>
-    <p:sldId id="304" r:id="rId50"/>
-    <p:sldId id="305" r:id="rId51"/>
-    <p:sldId id="306" r:id="rId52"/>
-    <p:sldId id="307" r:id="rId53"/>
-    <p:sldId id="308" r:id="rId54"/>
+    <p:sldId id="310" r:id="rId26"/>
+    <p:sldId id="280" r:id="rId27"/>
+    <p:sldId id="281" r:id="rId28"/>
+    <p:sldId id="282" r:id="rId29"/>
+    <p:sldId id="283" r:id="rId30"/>
+    <p:sldId id="284" r:id="rId31"/>
+    <p:sldId id="285" r:id="rId32"/>
+    <p:sldId id="286" r:id="rId33"/>
+    <p:sldId id="287" r:id="rId34"/>
+    <p:sldId id="288" r:id="rId35"/>
+    <p:sldId id="289" r:id="rId36"/>
+    <p:sldId id="290" r:id="rId37"/>
+    <p:sldId id="291" r:id="rId38"/>
+    <p:sldId id="292" r:id="rId39"/>
+    <p:sldId id="293" r:id="rId40"/>
+    <p:sldId id="294" r:id="rId41"/>
+    <p:sldId id="295" r:id="rId42"/>
+    <p:sldId id="296" r:id="rId43"/>
+    <p:sldId id="297" r:id="rId44"/>
+    <p:sldId id="298" r:id="rId45"/>
+    <p:sldId id="299" r:id="rId46"/>
+    <p:sldId id="300" r:id="rId47"/>
+    <p:sldId id="301" r:id="rId48"/>
+    <p:sldId id="302" r:id="rId49"/>
+    <p:sldId id="303" r:id="rId50"/>
+    <p:sldId id="304" r:id="rId51"/>
+    <p:sldId id="305" r:id="rId52"/>
+    <p:sldId id="306" r:id="rId53"/>
+    <p:sldId id="307" r:id="rId54"/>
+    <p:sldId id="308" r:id="rId55"/>
   </p:sldIdLst>
   <p:sldSz cx="11520488" cy="6480175"/>
   <p:notesSz cx="6858000" cy="9144000"/>
@@ -264,7 +265,7 @@
           <a:p>
             <a:fld id="{18BF2EA9-CFC8-45FA-BD4C-CF2CA22F3AA1}" type="datetimeFigureOut">
               <a:rPr lang="en-US" smtClean="0"/>
-              <a:t>9/17/2017</a:t>
+              <a:t>05/15/2018</a:t>
             </a:fld>
             <a:endParaRPr lang="en-US"/>
           </a:p>
@@ -668,6 +669,252 @@
           <a:lstStyle/>
           <a:p>
             <a:r>
+              <a:rPr lang="en-US" dirty="0" smtClean="0"/>
+              <a:t>Differences:</a:t>
+            </a:r>
+          </a:p>
+          <a:p>
+            <a:pPr marL="171450" indent="-171450">
+              <a:buFont typeface="Arial" panose="020B0604020202020204" pitchFamily="34" charset="0"/>
+              <a:buChar char="•"/>
+            </a:pPr>
+            <a:r>
+              <a:rPr lang="en-US" baseline="0" dirty="0" smtClean="0"/>
+              <a:t>No “</a:t>
+            </a:r>
+            <a:r>
+              <a:rPr lang="en-US" baseline="0" dirty="0" err="1" smtClean="0"/>
+              <a:t>RecoveryUnitId</a:t>
+            </a:r>
+            <a:r>
+              <a:rPr lang="en-US" baseline="0" dirty="0" smtClean="0"/>
+              <a:t>”</a:t>
+            </a:r>
+          </a:p>
+          <a:p>
+            <a:pPr marL="171450" indent="-171450">
+              <a:buFont typeface="Arial" panose="020B0604020202020204" pitchFamily="34" charset="0"/>
+              <a:buChar char="•"/>
+            </a:pPr>
+            <a:r>
+              <a:rPr lang="en-US" baseline="0" dirty="0" smtClean="0"/>
+              <a:t>Extra columns: “</a:t>
+            </a:r>
+            <a:r>
+              <a:rPr lang="en-US" baseline="0" dirty="0" err="1" smtClean="0"/>
+              <a:t>database_id</a:t>
+            </a:r>
+            <a:r>
+              <a:rPr lang="en-US" baseline="0" dirty="0" smtClean="0"/>
+              <a:t>” and “</a:t>
+            </a:r>
+            <a:r>
+              <a:rPr lang="en-US" baseline="0" dirty="0" err="1" smtClean="0"/>
+              <a:t>first_lsn</a:t>
+            </a:r>
+            <a:r>
+              <a:rPr lang="en-US" baseline="0" dirty="0" smtClean="0"/>
+              <a:t>”</a:t>
+            </a:r>
+          </a:p>
+          <a:p>
+            <a:pPr marL="171450" indent="-171450">
+              <a:buFont typeface="Arial" panose="020B0604020202020204" pitchFamily="34" charset="0"/>
+              <a:buChar char="•"/>
+            </a:pPr>
+            <a:r>
+              <a:rPr lang="en-US" baseline="0" dirty="0" smtClean="0"/>
+              <a:t>Different data types (“</a:t>
+            </a:r>
+            <a:r>
+              <a:rPr lang="en-US" baseline="0" dirty="0" err="1" smtClean="0"/>
+              <a:t>vlf_sequence_number</a:t>
+            </a:r>
+            <a:r>
+              <a:rPr lang="en-US" baseline="0" dirty="0" smtClean="0"/>
+              <a:t>” is </a:t>
+            </a:r>
+            <a:r>
+              <a:rPr lang="en-US" baseline="0" dirty="0" err="1" smtClean="0"/>
+              <a:t>bigint</a:t>
+            </a:r>
+            <a:r>
+              <a:rPr lang="en-US" baseline="0" dirty="0" smtClean="0"/>
+              <a:t>, “parity” is </a:t>
+            </a:r>
+            <a:r>
+              <a:rPr lang="en-US" baseline="0" dirty="0" err="1" smtClean="0"/>
+              <a:t>tinyint</a:t>
+            </a:r>
+            <a:r>
+              <a:rPr lang="en-US" baseline="0" dirty="0" smtClean="0"/>
+              <a:t>)</a:t>
+            </a:r>
+          </a:p>
+          <a:p>
+            <a:pPr marL="171450" indent="-171450">
+              <a:buFont typeface="Arial" panose="020B0604020202020204" pitchFamily="34" charset="0"/>
+              <a:buChar char="•"/>
+            </a:pPr>
+            <a:r>
+              <a:rPr lang="en-US" baseline="0" dirty="0" smtClean="0"/>
+              <a:t>“</a:t>
+            </a:r>
+            <a:r>
+              <a:rPr lang="en-US" baseline="0" dirty="0" err="1" smtClean="0"/>
+              <a:t>vlf_create_lsn</a:t>
+            </a:r>
+            <a:r>
+              <a:rPr lang="en-US" baseline="0" dirty="0" smtClean="0"/>
+              <a:t>” is in hexadecimal colon-separated format (vs decimal)</a:t>
+            </a:r>
+          </a:p>
+          <a:p>
+            <a:pPr marL="171450" indent="-171450">
+              <a:buFont typeface="Arial" panose="020B0604020202020204" pitchFamily="34" charset="0"/>
+              <a:buChar char="•"/>
+            </a:pPr>
+            <a:r>
+              <a:rPr lang="en-US" baseline="0" dirty="0" smtClean="0"/>
+              <a:t>Has “</a:t>
+            </a:r>
+            <a:r>
+              <a:rPr lang="en-US" baseline="0" dirty="0" err="1" smtClean="0"/>
+              <a:t>vlf_first_lsn</a:t>
+            </a:r>
+            <a:r>
+              <a:rPr lang="en-US" baseline="0" dirty="0" smtClean="0"/>
+              <a:t>” column</a:t>
+            </a:r>
+          </a:p>
+          <a:p>
+            <a:pPr marL="171450" indent="-171450">
+              <a:buFont typeface="Arial" panose="020B0604020202020204" pitchFamily="34" charset="0"/>
+              <a:buChar char="•"/>
+            </a:pPr>
+            <a:r>
+              <a:rPr lang="en-US" baseline="0" dirty="0" smtClean="0"/>
+              <a:t>Has “</a:t>
+            </a:r>
+            <a:r>
+              <a:rPr lang="en-US" baseline="0" dirty="0" err="1" smtClean="0"/>
+              <a:t>vlf_active</a:t>
+            </a:r>
+            <a:r>
+              <a:rPr lang="en-US" baseline="0" dirty="0" smtClean="0"/>
+              <a:t>” bit column</a:t>
+            </a:r>
+          </a:p>
+          <a:p>
+            <a:pPr marL="171450" indent="-171450">
+              <a:buFont typeface="Arial" panose="020B0604020202020204" pitchFamily="34" charset="0"/>
+              <a:buChar char="•"/>
+            </a:pPr>
+            <a:r>
+              <a:rPr lang="en-US" baseline="0" dirty="0" smtClean="0"/>
+              <a:t>“</a:t>
+            </a:r>
+            <a:r>
+              <a:rPr lang="en-US" baseline="0" dirty="0" err="1" smtClean="0"/>
+              <a:t>vlf_begin_offset</a:t>
+            </a:r>
+            <a:r>
+              <a:rPr lang="en-US" baseline="0" dirty="0" smtClean="0"/>
+              <a:t>” and “</a:t>
+            </a:r>
+            <a:r>
+              <a:rPr lang="en-US" baseline="0" dirty="0" err="1" smtClean="0"/>
+              <a:t>vlf_size_mb</a:t>
+            </a:r>
+            <a:r>
+              <a:rPr lang="en-US" baseline="0" dirty="0" smtClean="0"/>
+              <a:t>” are in megabytes (vs bytes)</a:t>
+            </a:r>
+            <a:endParaRPr lang="en-US" dirty="0" smtClean="0"/>
+          </a:p>
+        </p:txBody>
+      </p:sp>
+      <p:sp>
+        <p:nvSpPr>
+          <p:cNvPr id="4" name="Slide Number Placeholder 3"/>
+          <p:cNvSpPr>
+            <a:spLocks noGrp="1"/>
+          </p:cNvSpPr>
+          <p:nvPr>
+            <p:ph type="sldNum" sz="quarter" idx="10"/>
+          </p:nvPr>
+        </p:nvSpPr>
+        <p:spPr/>
+        <p:txBody>
+          <a:bodyPr/>
+          <a:lstStyle/>
+          <a:p>
+            <a:fld id="{E6006AB3-B303-49B7-80DE-AE281F223BBD}" type="slidenum">
+              <a:rPr lang="en-US" smtClean="0"/>
+              <a:t>25</a:t>
+            </a:fld>
+            <a:endParaRPr lang="en-US"/>
+          </a:p>
+        </p:txBody>
+      </p:sp>
+    </p:spTree>
+    <p:extLst>
+      <p:ext uri="{BB962C8B-B14F-4D97-AF65-F5344CB8AC3E}">
+        <p14:creationId xmlns:p14="http://schemas.microsoft.com/office/powerpoint/2010/main" val="2349625907"/>
+      </p:ext>
+    </p:extLst>
+  </p:cSld>
+  <p:clrMapOvr>
+    <a:masterClrMapping/>
+  </p:clrMapOvr>
+</p:notes>
+</file>
+
+<file path=ppt/notesSlides/notesSlide3.xml><?xml version="1.0" encoding="utf-8"?>
+<p:notes xmlns:a="http://schemas.openxmlformats.org/drawingml/2006/main" xmlns:r="http://schemas.openxmlformats.org/officeDocument/2006/relationships" xmlns:p="http://schemas.openxmlformats.org/presentationml/2006/main">
+  <p:cSld>
+    <p:spTree>
+      <p:nvGrpSpPr>
+        <p:cNvPr id="1" name=""/>
+        <p:cNvGrpSpPr/>
+        <p:nvPr/>
+      </p:nvGrpSpPr>
+      <p:grpSpPr>
+        <a:xfrm>
+          <a:off x="0" y="0"/>
+          <a:ext cx="0" cy="0"/>
+          <a:chOff x="0" y="0"/>
+          <a:chExt cx="0" cy="0"/>
+        </a:xfrm>
+      </p:grpSpPr>
+      <p:sp>
+        <p:nvSpPr>
+          <p:cNvPr id="2" name="Slide Image Placeholder 1"/>
+          <p:cNvSpPr>
+            <a:spLocks noGrp="1" noRot="1" noChangeAspect="1"/>
+          </p:cNvSpPr>
+          <p:nvPr>
+            <p:ph type="sldImg"/>
+          </p:nvPr>
+        </p:nvSpPr>
+        <p:spPr/>
+      </p:sp>
+      <p:sp>
+        <p:nvSpPr>
+          <p:cNvPr id="3" name="Notes Placeholder 2"/>
+          <p:cNvSpPr>
+            <a:spLocks noGrp="1"/>
+          </p:cNvSpPr>
+          <p:nvPr>
+            <p:ph type="body" idx="1"/>
+          </p:nvPr>
+        </p:nvSpPr>
+        <p:spPr/>
+        <p:txBody>
+          <a:bodyPr/>
+          <a:lstStyle/>
+          <a:p>
+            <a:r>
               <a:rPr lang="en-US" dirty="0"/>
               <a:t>Auto-truncate mode means that the database (1) is in the Simple recovery model, or no</a:t>
             </a:r>
@@ -696,7 +943,7 @@
           <a:p>
             <a:fld id="{ADDBA41D-AE03-4F1C-B074-B56312AFAE46}" type="slidenum">
               <a:rPr lang="en-US" smtClean="0"/>
-              <a:t>37</a:t>
+              <a:t>38</a:t>
             </a:fld>
             <a:endParaRPr lang="en-US"/>
           </a:p>
@@ -1749,7 +1996,7 @@
           <a:graphicData uri="http://schemas.openxmlformats.org/presentationml/2006/ole">
             <mc:AlternateContent xmlns:mc="http://schemas.openxmlformats.org/markup-compatibility/2006">
               <mc:Choice xmlns:v="urn:schemas-microsoft-com:vml" Requires="v">
-                <p:oleObj spid="_x0000_s1041" name="Image" r:id="rId10" imgW="2279520" imgH="1310400" progId="Photoshop.Image.18">
+                <p:oleObj spid="_x0000_s1044" name="Image" r:id="rId10" imgW="2279520" imgH="1310400" progId="Photoshop.Image.18">
                   <p:embed/>
                 </p:oleObj>
               </mc:Choice>
@@ -2127,7 +2374,7 @@
           <p:cNvPr id="2" name="Title 1">
             <a:extLst>
               <a:ext uri="{FF2B5EF4-FFF2-40B4-BE49-F238E27FC236}">
-                <a16:creationId xmlns:a16="http://schemas.microsoft.com/office/drawing/2014/main" id="{83E7BC17-A4CB-4C5C-8189-2BD06BE3E485}"/>
+                <a16:creationId xmlns:a16="http://schemas.microsoft.com/office/drawing/2014/main" xmlns="" id="{83E7BC17-A4CB-4C5C-8189-2BD06BE3E485}"/>
               </a:ext>
             </a:extLst>
           </p:cNvPr>
@@ -2189,7 +2436,7 @@
           <p:cNvPr id="3" name="Text Placeholder 2">
             <a:extLst>
               <a:ext uri="{FF2B5EF4-FFF2-40B4-BE49-F238E27FC236}">
-                <a16:creationId xmlns:a16="http://schemas.microsoft.com/office/drawing/2014/main" id="{580DE922-DD41-46E4-A789-EAF96778ABA6}"/>
+                <a16:creationId xmlns:a16="http://schemas.microsoft.com/office/drawing/2014/main" xmlns="" id="{580DE922-DD41-46E4-A789-EAF96778ABA6}"/>
               </a:ext>
             </a:extLst>
           </p:cNvPr>
@@ -2217,7 +2464,7 @@
           <p:cNvPr id="5" name="TextBox 4">
             <a:extLst>
               <a:ext uri="{FF2B5EF4-FFF2-40B4-BE49-F238E27FC236}">
-                <a16:creationId xmlns:a16="http://schemas.microsoft.com/office/drawing/2014/main" id="{13C0FC99-58B7-4BAC-A4C4-1F44433F31BD}"/>
+                <a16:creationId xmlns:a16="http://schemas.microsoft.com/office/drawing/2014/main" xmlns="" id="{13C0FC99-58B7-4BAC-A4C4-1F44433F31BD}"/>
               </a:ext>
             </a:extLst>
           </p:cNvPr>
@@ -5067,21 +5314,21 @@
                 <a:gridCol w="4304521">
                   <a:extLst>
                     <a:ext uri="{9D8B030D-6E8A-4147-A177-3AD203B41FA5}">
-                      <a16:colId xmlns:a16="http://schemas.microsoft.com/office/drawing/2014/main" val="20000"/>
+                      <a16:colId xmlns:a16="http://schemas.microsoft.com/office/drawing/2014/main" xmlns="" val="20000"/>
                     </a:ext>
                   </a:extLst>
                 </a:gridCol>
                 <a:gridCol w="3525078">
                   <a:extLst>
                     <a:ext uri="{9D8B030D-6E8A-4147-A177-3AD203B41FA5}">
-                      <a16:colId xmlns:a16="http://schemas.microsoft.com/office/drawing/2014/main" val="20001"/>
+                      <a16:colId xmlns:a16="http://schemas.microsoft.com/office/drawing/2014/main" xmlns="" val="20001"/>
                     </a:ext>
                   </a:extLst>
                 </a:gridCol>
                 <a:gridCol w="2970400">
                   <a:extLst>
                     <a:ext uri="{9D8B030D-6E8A-4147-A177-3AD203B41FA5}">
-                      <a16:colId xmlns:a16="http://schemas.microsoft.com/office/drawing/2014/main" val="20002"/>
+                      <a16:colId xmlns:a16="http://schemas.microsoft.com/office/drawing/2014/main" xmlns="" val="20002"/>
                     </a:ext>
                   </a:extLst>
                 </a:gridCol>
@@ -5128,7 +5375,7 @@
                 </a:tc>
                 <a:extLst>
                   <a:ext uri="{0D108BD9-81ED-4DB2-BD59-A6C34878D82A}">
-                    <a16:rowId xmlns:a16="http://schemas.microsoft.com/office/drawing/2014/main" val="10000"/>
+                    <a16:rowId xmlns:a16="http://schemas.microsoft.com/office/drawing/2014/main" xmlns="" val="10000"/>
                   </a:ext>
                 </a:extLst>
               </a:tr>
@@ -5191,7 +5438,7 @@
                 </a:tc>
                 <a:extLst>
                   <a:ext uri="{0D108BD9-81ED-4DB2-BD59-A6C34878D82A}">
-                    <a16:rowId xmlns:a16="http://schemas.microsoft.com/office/drawing/2014/main" val="10001"/>
+                    <a16:rowId xmlns:a16="http://schemas.microsoft.com/office/drawing/2014/main" xmlns="" val="10001"/>
                   </a:ext>
                 </a:extLst>
               </a:tr>
@@ -5262,7 +5509,7 @@
                 </a:tc>
                 <a:extLst>
                   <a:ext uri="{0D108BD9-81ED-4DB2-BD59-A6C34878D82A}">
-                    <a16:rowId xmlns:a16="http://schemas.microsoft.com/office/drawing/2014/main" val="10002"/>
+                    <a16:rowId xmlns:a16="http://schemas.microsoft.com/office/drawing/2014/main" xmlns="" val="10002"/>
                   </a:ext>
                 </a:extLst>
               </a:tr>
@@ -5308,7 +5555,7 @@
                 </a:tc>
                 <a:extLst>
                   <a:ext uri="{0D108BD9-81ED-4DB2-BD59-A6C34878D82A}">
-                    <a16:rowId xmlns:a16="http://schemas.microsoft.com/office/drawing/2014/main" val="10003"/>
+                    <a16:rowId xmlns:a16="http://schemas.microsoft.com/office/drawing/2014/main" xmlns="" val="10003"/>
                   </a:ext>
                 </a:extLst>
               </a:tr>
@@ -5359,7 +5606,7 @@
                 </a:tc>
                 <a:extLst>
                   <a:ext uri="{0D108BD9-81ED-4DB2-BD59-A6C34878D82A}">
-                    <a16:rowId xmlns:a16="http://schemas.microsoft.com/office/drawing/2014/main" val="3543017676"/>
+                    <a16:rowId xmlns:a16="http://schemas.microsoft.com/office/drawing/2014/main" xmlns="" val="3543017676"/>
                   </a:ext>
                 </a:extLst>
               </a:tr>
@@ -5791,6 +6038,141 @@
           <a:lstStyle/>
           <a:p>
             <a:r>
+              <a:rPr lang="en-US" dirty="0" err="1"/>
+              <a:t>s</a:t>
+            </a:r>
+            <a:r>
+              <a:rPr lang="en-US" dirty="0" err="1" smtClean="0"/>
+              <a:t>ys.dm_db_log_info</a:t>
+            </a:r>
+            <a:r>
+              <a:rPr lang="en-US" dirty="0" smtClean="0"/>
+              <a:t>(</a:t>
+            </a:r>
+            <a:r>
+              <a:rPr lang="en-US" dirty="0" err="1" smtClean="0"/>
+              <a:t>db_id</a:t>
+            </a:r>
+            <a:r>
+              <a:rPr lang="en-US" dirty="0" smtClean="0"/>
+              <a:t>)</a:t>
+            </a:r>
+            <a:endParaRPr lang="en-US" dirty="0"/>
+          </a:p>
+        </p:txBody>
+      </p:sp>
+      <p:sp>
+        <p:nvSpPr>
+          <p:cNvPr id="3" name="Content Placeholder 2"/>
+          <p:cNvSpPr>
+            <a:spLocks noGrp="1"/>
+          </p:cNvSpPr>
+          <p:nvPr>
+            <p:ph idx="1"/>
+          </p:nvPr>
+        </p:nvSpPr>
+        <p:spPr>
+          <a:xfrm>
+            <a:off x="361038" y="1330537"/>
+            <a:ext cx="10800000" cy="1272963"/>
+          </a:xfrm>
+        </p:spPr>
+        <p:txBody>
+          <a:bodyPr>
+            <a:normAutofit fontScale="77500" lnSpcReduction="20000"/>
+          </a:bodyPr>
+          <a:lstStyle/>
+          <a:p>
+            <a:r>
+              <a:rPr lang="en-US" dirty="0" smtClean="0"/>
+              <a:t>Documented, supported version of DBCC LOGINFO</a:t>
+            </a:r>
+          </a:p>
+          <a:p>
+            <a:r>
+              <a:rPr lang="en-US" dirty="0" smtClean="0"/>
+              <a:t>SQL Server 2016 SP2+</a:t>
+            </a:r>
+          </a:p>
+          <a:p>
+            <a:r>
+              <a:rPr lang="en-US" dirty="0" smtClean="0"/>
+              <a:t>Subtle differences from DBCC LOGINFO</a:t>
+            </a:r>
+            <a:endParaRPr lang="en-US" dirty="0"/>
+          </a:p>
+        </p:txBody>
+      </p:sp>
+      <p:pic>
+        <p:nvPicPr>
+          <p:cNvPr id="6" name="Picture 5"/>
+          <p:cNvPicPr>
+            <a:picLocks noChangeAspect="1"/>
+          </p:cNvPicPr>
+          <p:nvPr/>
+        </p:nvPicPr>
+        <p:blipFill>
+          <a:blip r:embed="rId3"/>
+          <a:stretch>
+            <a:fillRect/>
+          </a:stretch>
+        </p:blipFill>
+        <p:spPr>
+          <a:xfrm>
+            <a:off x="361038" y="3240086"/>
+            <a:ext cx="10564072" cy="1149033"/>
+          </a:xfrm>
+          <a:prstGeom prst="rect">
+            <a:avLst/>
+          </a:prstGeom>
+        </p:spPr>
+      </p:pic>
+    </p:spTree>
+    <p:extLst>
+      <p:ext uri="{BB962C8B-B14F-4D97-AF65-F5344CB8AC3E}">
+        <p14:creationId xmlns:p14="http://schemas.microsoft.com/office/powerpoint/2010/main" val="456026589"/>
+      </p:ext>
+    </p:extLst>
+  </p:cSld>
+  <p:clrMapOvr>
+    <a:masterClrMapping/>
+  </p:clrMapOvr>
+</p:sld>
+</file>
+
+<file path=ppt/slides/slide26.xml><?xml version="1.0" encoding="utf-8"?>
+<p:sld xmlns:a="http://schemas.openxmlformats.org/drawingml/2006/main" xmlns:r="http://schemas.openxmlformats.org/officeDocument/2006/relationships" xmlns:p="http://schemas.openxmlformats.org/presentationml/2006/main">
+  <p:cSld>
+    <p:spTree>
+      <p:nvGrpSpPr>
+        <p:cNvPr id="1" name=""/>
+        <p:cNvGrpSpPr/>
+        <p:nvPr/>
+      </p:nvGrpSpPr>
+      <p:grpSpPr>
+        <a:xfrm>
+          <a:off x="0" y="0"/>
+          <a:ext cx="0" cy="0"/>
+          <a:chOff x="0" y="0"/>
+          <a:chExt cx="0" cy="0"/>
+        </a:xfrm>
+      </p:grpSpPr>
+      <p:sp>
+        <p:nvSpPr>
+          <p:cNvPr id="2" name="Title 1"/>
+          <p:cNvSpPr>
+            <a:spLocks noGrp="1"/>
+          </p:cNvSpPr>
+          <p:nvPr>
+            <p:ph type="title"/>
+          </p:nvPr>
+        </p:nvSpPr>
+        <p:spPr/>
+        <p:txBody>
+          <a:bodyPr/>
+          <a:lstStyle/>
+          <a:p>
+            <a:r>
               <a:rPr lang="en-US" dirty="0"/>
               <a:t>Demo</a:t>
             </a:r>
@@ -5867,7 +6249,7 @@
 </p:sld>
 </file>
 
-<file path=ppt/slides/slide26.xml><?xml version="1.0" encoding="utf-8"?>
+<file path=ppt/slides/slide27.xml><?xml version="1.0" encoding="utf-8"?>
 <p:sld xmlns:a="http://schemas.openxmlformats.org/drawingml/2006/main" xmlns:r="http://schemas.openxmlformats.org/officeDocument/2006/relationships" xmlns:p="http://schemas.openxmlformats.org/presentationml/2006/main">
   <p:cSld>
     <p:spTree>
@@ -5990,7 +6372,7 @@
 </p:sld>
 </file>
 
-<file path=ppt/slides/slide27.xml><?xml version="1.0" encoding="utf-8"?>
+<file path=ppt/slides/slide28.xml><?xml version="1.0" encoding="utf-8"?>
 <p:sld xmlns:a="http://schemas.openxmlformats.org/drawingml/2006/main" xmlns:r="http://schemas.openxmlformats.org/officeDocument/2006/relationships" xmlns:p="http://schemas.openxmlformats.org/presentationml/2006/main">
   <p:cSld>
     <p:spTree>
@@ -6089,123 +6471,6 @@
 </p:sld>
 </file>
 
-<file path=ppt/slides/slide28.xml><?xml version="1.0" encoding="utf-8"?>
-<p:sld xmlns:a="http://schemas.openxmlformats.org/drawingml/2006/main" xmlns:r="http://schemas.openxmlformats.org/officeDocument/2006/relationships" xmlns:p="http://schemas.openxmlformats.org/presentationml/2006/main">
-  <p:cSld>
-    <p:spTree>
-      <p:nvGrpSpPr>
-        <p:cNvPr id="1" name=""/>
-        <p:cNvGrpSpPr/>
-        <p:nvPr/>
-      </p:nvGrpSpPr>
-      <p:grpSpPr>
-        <a:xfrm>
-          <a:off x="0" y="0"/>
-          <a:ext cx="0" cy="0"/>
-          <a:chOff x="0" y="0"/>
-          <a:chExt cx="0" cy="0"/>
-        </a:xfrm>
-      </p:grpSpPr>
-      <p:sp>
-        <p:nvSpPr>
-          <p:cNvPr id="2" name="Title 1"/>
-          <p:cNvSpPr>
-            <a:spLocks noGrp="1"/>
-          </p:cNvSpPr>
-          <p:nvPr>
-            <p:ph type="title"/>
-          </p:nvPr>
-        </p:nvSpPr>
-        <p:spPr/>
-        <p:txBody>
-          <a:bodyPr/>
-          <a:lstStyle/>
-          <a:p>
-            <a:r>
-              <a:rPr lang="en-US" dirty="0"/>
-              <a:t>Related command/function</a:t>
-            </a:r>
-          </a:p>
-        </p:txBody>
-      </p:sp>
-      <p:sp>
-        <p:nvSpPr>
-          <p:cNvPr id="3" name="Content Placeholder 2"/>
-          <p:cNvSpPr>
-            <a:spLocks noGrp="1"/>
-          </p:cNvSpPr>
-          <p:nvPr>
-            <p:ph idx="1"/>
-          </p:nvPr>
-        </p:nvSpPr>
-        <p:spPr/>
-        <p:txBody>
-          <a:bodyPr/>
-          <a:lstStyle/>
-          <a:p>
-            <a:pPr marL="571500" indent="-571500">
-              <a:buFont typeface="Arial" panose="020B0604020202020204" pitchFamily="34" charset="0"/>
-              <a:buChar char="•"/>
-            </a:pPr>
-            <a:r>
-              <a:rPr lang="en-US" dirty="0"/>
-              <a:t>DBCC SQLPERF(LOGSPACE)</a:t>
-            </a:r>
-          </a:p>
-          <a:p>
-            <a:pPr marL="1033227" lvl="1" indent="-457200">
-              <a:buFont typeface="Arial" panose="020B0604020202020204" pitchFamily="34" charset="0"/>
-              <a:buChar char="•"/>
-            </a:pPr>
-            <a:r>
-              <a:rPr lang="en-US" dirty="0"/>
-              <a:t>Log size, percent used per database</a:t>
-            </a:r>
-          </a:p>
-          <a:p>
-            <a:pPr marL="571500" indent="-571500">
-              <a:buFont typeface="Arial" panose="020B0604020202020204" pitchFamily="34" charset="0"/>
-              <a:buChar char="•"/>
-            </a:pPr>
-            <a:r>
-              <a:rPr lang="en-US" dirty="0" err="1"/>
-              <a:t>fn_dump_dblog</a:t>
-            </a:r>
-            <a:endParaRPr lang="en-US" dirty="0"/>
-          </a:p>
-          <a:p>
-            <a:pPr marL="1033227" lvl="1" indent="-457200">
-              <a:buFont typeface="Arial" panose="020B0604020202020204" pitchFamily="34" charset="0"/>
-              <a:buChar char="•"/>
-            </a:pPr>
-            <a:r>
-              <a:rPr lang="en-US" dirty="0"/>
-              <a:t>Similar to </a:t>
-            </a:r>
-            <a:r>
-              <a:rPr lang="en-US" dirty="0" err="1"/>
-              <a:t>fn_dblog</a:t>
-            </a:r>
-            <a:r>
-              <a:rPr lang="en-US" dirty="0"/>
-              <a:t>, but reads from backup file</a:t>
-            </a:r>
-          </a:p>
-        </p:txBody>
-      </p:sp>
-    </p:spTree>
-    <p:extLst>
-      <p:ext uri="{BB962C8B-B14F-4D97-AF65-F5344CB8AC3E}">
-        <p14:creationId xmlns:p14="http://schemas.microsoft.com/office/powerpoint/2010/main" val="1422630287"/>
-      </p:ext>
-    </p:extLst>
-  </p:cSld>
-  <p:clrMapOvr>
-    <a:masterClrMapping/>
-  </p:clrMapOvr>
-</p:sld>
-</file>
-
 <file path=ppt/slides/slide29.xml><?xml version="1.0" encoding="utf-8"?>
 <p:sld xmlns:a="http://schemas.openxmlformats.org/drawingml/2006/main" xmlns:r="http://schemas.openxmlformats.org/officeDocument/2006/relationships" xmlns:p="http://schemas.openxmlformats.org/presentationml/2006/main">
   <p:cSld>
@@ -6240,7 +6505,7 @@
           <a:p>
             <a:r>
               <a:rPr lang="en-US" dirty="0"/>
-              <a:t>Checkpoint</a:t>
+              <a:t>Related command/function</a:t>
             </a:r>
           </a:p>
         </p:txBody>
@@ -6266,7 +6531,7 @@
             </a:pPr>
             <a:r>
               <a:rPr lang="en-US" dirty="0"/>
-              <a:t>Process of writing dirty pages from the buffer pool to disk</a:t>
+              <a:t>DBCC SQLPERF(LOGSPACE)</a:t>
             </a:r>
           </a:p>
           <a:p>
@@ -6276,18 +6541,44 @@
             </a:pPr>
             <a:r>
               <a:rPr lang="en-US" dirty="0"/>
-              <a:t>Irrespective of transaction completion</a:t>
-            </a:r>
-          </a:p>
-          <a:p>
+              <a:t>Log size, percent used per database</a:t>
+            </a:r>
+          </a:p>
+          <a:p>
+            <a:pPr marL="571500" indent="-571500">
+              <a:buFont typeface="Arial" panose="020B0604020202020204" pitchFamily="34" charset="0"/>
+              <a:buChar char="•"/>
+            </a:pPr>
+            <a:r>
+              <a:rPr lang="en-US" dirty="0" err="1"/>
+              <a:t>fn_dump_dblog</a:t>
+            </a:r>
             <a:endParaRPr lang="en-US" dirty="0"/>
+          </a:p>
+          <a:p>
+            <a:pPr marL="1033227" lvl="1" indent="-457200">
+              <a:buFont typeface="Arial" panose="020B0604020202020204" pitchFamily="34" charset="0"/>
+              <a:buChar char="•"/>
+            </a:pPr>
+            <a:r>
+              <a:rPr lang="en-US" dirty="0"/>
+              <a:t>Similar to </a:t>
+            </a:r>
+            <a:r>
+              <a:rPr lang="en-US" dirty="0" err="1"/>
+              <a:t>fn_dblog</a:t>
+            </a:r>
+            <a:r>
+              <a:rPr lang="en-US" dirty="0"/>
+              <a:t>, but reads from backup file</a:t>
+            </a:r>
           </a:p>
         </p:txBody>
       </p:sp>
     </p:spTree>
     <p:extLst>
       <p:ext uri="{BB962C8B-B14F-4D97-AF65-F5344CB8AC3E}">
-        <p14:creationId xmlns:p14="http://schemas.microsoft.com/office/powerpoint/2010/main" val="2574264670"/>
+        <p14:creationId xmlns:p14="http://schemas.microsoft.com/office/powerpoint/2010/main" val="1422630287"/>
       </p:ext>
     </p:extLst>
   </p:cSld>
@@ -6459,6 +6750,97 @@
           <a:p>
             <a:r>
               <a:rPr lang="en-US" dirty="0"/>
+              <a:t>Checkpoint</a:t>
+            </a:r>
+          </a:p>
+        </p:txBody>
+      </p:sp>
+      <p:sp>
+        <p:nvSpPr>
+          <p:cNvPr id="3" name="Content Placeholder 2"/>
+          <p:cNvSpPr>
+            <a:spLocks noGrp="1"/>
+          </p:cNvSpPr>
+          <p:nvPr>
+            <p:ph idx="1"/>
+          </p:nvPr>
+        </p:nvSpPr>
+        <p:spPr/>
+        <p:txBody>
+          <a:bodyPr/>
+          <a:lstStyle/>
+          <a:p>
+            <a:pPr marL="571500" indent="-571500">
+              <a:buFont typeface="Arial" panose="020B0604020202020204" pitchFamily="34" charset="0"/>
+              <a:buChar char="•"/>
+            </a:pPr>
+            <a:r>
+              <a:rPr lang="en-US" dirty="0"/>
+              <a:t>Process of writing dirty pages from the buffer pool to disk</a:t>
+            </a:r>
+          </a:p>
+          <a:p>
+            <a:pPr marL="1033227" lvl="1" indent="-457200">
+              <a:buFont typeface="Arial" panose="020B0604020202020204" pitchFamily="34" charset="0"/>
+              <a:buChar char="•"/>
+            </a:pPr>
+            <a:r>
+              <a:rPr lang="en-US" dirty="0"/>
+              <a:t>Irrespective of transaction completion</a:t>
+            </a:r>
+          </a:p>
+          <a:p>
+            <a:endParaRPr lang="en-US" dirty="0"/>
+          </a:p>
+        </p:txBody>
+      </p:sp>
+    </p:spTree>
+    <p:extLst>
+      <p:ext uri="{BB962C8B-B14F-4D97-AF65-F5344CB8AC3E}">
+        <p14:creationId xmlns:p14="http://schemas.microsoft.com/office/powerpoint/2010/main" val="2574264670"/>
+      </p:ext>
+    </p:extLst>
+  </p:cSld>
+  <p:clrMapOvr>
+    <a:masterClrMapping/>
+  </p:clrMapOvr>
+</p:sld>
+</file>
+
+<file path=ppt/slides/slide31.xml><?xml version="1.0" encoding="utf-8"?>
+<p:sld xmlns:a="http://schemas.openxmlformats.org/drawingml/2006/main" xmlns:r="http://schemas.openxmlformats.org/officeDocument/2006/relationships" xmlns:p="http://schemas.openxmlformats.org/presentationml/2006/main">
+  <p:cSld>
+    <p:spTree>
+      <p:nvGrpSpPr>
+        <p:cNvPr id="1" name=""/>
+        <p:cNvGrpSpPr/>
+        <p:nvPr/>
+      </p:nvGrpSpPr>
+      <p:grpSpPr>
+        <a:xfrm>
+          <a:off x="0" y="0"/>
+          <a:ext cx="0" cy="0"/>
+          <a:chOff x="0" y="0"/>
+          <a:chExt cx="0" cy="0"/>
+        </a:xfrm>
+      </p:grpSpPr>
+      <p:sp>
+        <p:nvSpPr>
+          <p:cNvPr id="2" name="Title 1"/>
+          <p:cNvSpPr>
+            <a:spLocks noGrp="1"/>
+          </p:cNvSpPr>
+          <p:nvPr>
+            <p:ph type="title"/>
+          </p:nvPr>
+        </p:nvSpPr>
+        <p:spPr/>
+        <p:txBody>
+          <a:bodyPr/>
+          <a:lstStyle/>
+          <a:p>
+            <a:r>
+              <a:rPr lang="en-US" dirty="0"/>
               <a:t>Checkpoint Types</a:t>
             </a:r>
           </a:p>
@@ -6832,7 +7214,7 @@
 </p:sld>
 </file>
 
-<file path=ppt/slides/slide31.xml><?xml version="1.0" encoding="utf-8"?>
+<file path=ppt/slides/slide32.xml><?xml version="1.0" encoding="utf-8"?>
 <p:sld xmlns:a="http://schemas.openxmlformats.org/drawingml/2006/main" xmlns:r="http://schemas.openxmlformats.org/officeDocument/2006/relationships" xmlns:p="http://schemas.openxmlformats.org/presentationml/2006/main" show="0">
   <p:cSld>
     <p:spTree>
@@ -6981,134 +7363,14 @@
   <p:clrMapOvr>
     <a:masterClrMapping/>
   </p:clrMapOvr>
-</p:sld>
-</file>
-
-<file path=ppt/slides/slide32.xml><?xml version="1.0" encoding="utf-8"?>
-<p:sld xmlns:a="http://schemas.openxmlformats.org/drawingml/2006/main" xmlns:r="http://schemas.openxmlformats.org/officeDocument/2006/relationships" xmlns:p="http://schemas.openxmlformats.org/presentationml/2006/main">
-  <p:cSld>
-    <p:spTree>
-      <p:nvGrpSpPr>
-        <p:cNvPr id="1" name=""/>
-        <p:cNvGrpSpPr/>
-        <p:nvPr/>
-      </p:nvGrpSpPr>
-      <p:grpSpPr>
-        <a:xfrm>
-          <a:off x="0" y="0"/>
-          <a:ext cx="0" cy="0"/>
-          <a:chOff x="0" y="0"/>
-          <a:chExt cx="0" cy="0"/>
-        </a:xfrm>
-      </p:grpSpPr>
-      <p:sp>
-        <p:nvSpPr>
-          <p:cNvPr id="2" name="Title 1"/>
-          <p:cNvSpPr>
-            <a:spLocks noGrp="1"/>
-          </p:cNvSpPr>
-          <p:nvPr>
-            <p:ph type="title"/>
-          </p:nvPr>
-        </p:nvSpPr>
-        <p:spPr/>
-        <p:txBody>
-          <a:bodyPr/>
-          <a:lstStyle/>
-          <a:p>
-            <a:r>
-              <a:rPr lang="en-US" dirty="0"/>
-              <a:t>Flushing the Log</a:t>
-            </a:r>
-          </a:p>
-        </p:txBody>
-      </p:sp>
-      <p:sp>
-        <p:nvSpPr>
-          <p:cNvPr id="3" name="Content Placeholder 2"/>
-          <p:cNvSpPr>
-            <a:spLocks noGrp="1"/>
-          </p:cNvSpPr>
-          <p:nvPr>
-            <p:ph idx="1"/>
-          </p:nvPr>
-        </p:nvSpPr>
-        <p:spPr/>
-        <p:txBody>
-          <a:bodyPr/>
-          <a:lstStyle/>
-          <a:p>
-            <a:pPr marL="571500" indent="-571500">
-              <a:buFont typeface="Arial" panose="020B0604020202020204" pitchFamily="34" charset="0"/>
-              <a:buChar char="•"/>
-            </a:pPr>
-            <a:r>
-              <a:rPr lang="en-US" dirty="0"/>
-              <a:t>Flushing = closing a log block</a:t>
-            </a:r>
-          </a:p>
-          <a:p>
-            <a:pPr marL="571500" indent="-571500">
-              <a:buFont typeface="Arial" panose="020B0604020202020204" pitchFamily="34" charset="0"/>
-              <a:buChar char="•"/>
-            </a:pPr>
-            <a:r>
-              <a:rPr lang="en-US" dirty="0"/>
-              <a:t>Triggers</a:t>
-            </a:r>
-          </a:p>
-          <a:p>
-            <a:pPr marL="1033227" lvl="1" indent="-457200">
-              <a:buFont typeface="Arial" panose="020B0604020202020204" pitchFamily="34" charset="0"/>
-              <a:buChar char="•"/>
-            </a:pPr>
-            <a:r>
-              <a:rPr lang="en-US" dirty="0"/>
-              <a:t>60K limit reached</a:t>
-            </a:r>
-          </a:p>
-          <a:p>
-            <a:pPr marL="1033227" lvl="1" indent="-457200">
-              <a:buFont typeface="Arial" panose="020B0604020202020204" pitchFamily="34" charset="0"/>
-              <a:buChar char="•"/>
-            </a:pPr>
-            <a:r>
-              <a:rPr lang="en-US" dirty="0"/>
-              <a:t>Transaction commits</a:t>
-            </a:r>
-          </a:p>
-          <a:p>
-            <a:pPr marL="1033227" lvl="1" indent="-457200">
-              <a:buFont typeface="Arial" panose="020B0604020202020204" pitchFamily="34" charset="0"/>
-              <a:buChar char="•"/>
-            </a:pPr>
-            <a:r>
-              <a:rPr lang="en-US" dirty="0"/>
-              <a:t>Transaction rollbacks</a:t>
-            </a:r>
-          </a:p>
-          <a:p>
-            <a:pPr marL="1033227" lvl="1" indent="-457200">
-              <a:buFont typeface="Arial" panose="020B0604020202020204" pitchFamily="34" charset="0"/>
-              <a:buChar char="•"/>
-            </a:pPr>
-            <a:r>
-              <a:rPr lang="en-US" dirty="0"/>
-              <a:t>Checkpoint</a:t>
-            </a:r>
-          </a:p>
-        </p:txBody>
-      </p:sp>
-    </p:spTree>
-    <p:extLst>
-      <p:ext uri="{BB962C8B-B14F-4D97-AF65-F5344CB8AC3E}">
-        <p14:creationId xmlns:p14="http://schemas.microsoft.com/office/powerpoint/2010/main" val="3377537013"/>
-      </p:ext>
-    </p:extLst>
-  </p:cSld>
-  <p:clrMapOvr>
-    <a:masterClrMapping/>
-  </p:clrMapOvr>
+  <mc:AlternateContent xmlns:mc="http://schemas.openxmlformats.org/markup-compatibility/2006">
+    <mc:Choice xmlns:p14="http://schemas.microsoft.com/office/powerpoint/2010/main" Requires="p14">
+      <p:transition spd="slow" p14:dur="2000"/>
+    </mc:Choice>
+    <mc:Fallback>
+      <p:transition spd="slow"/>
+    </mc:Fallback>
+  </mc:AlternateContent>
 </p:sld>
 </file>
 
@@ -7146,7 +7408,7 @@
           <a:p>
             <a:r>
               <a:rPr lang="en-US" dirty="0"/>
-              <a:t>Recovery Models</a:t>
+              <a:t>Flushing the Log</a:t>
             </a:r>
           </a:p>
         </p:txBody>
@@ -7163,9 +7425,7 @@
         </p:nvSpPr>
         <p:spPr/>
         <p:txBody>
-          <a:bodyPr>
-            <a:normAutofit/>
-          </a:bodyPr>
+          <a:bodyPr/>
           <a:lstStyle/>
           <a:p>
             <a:pPr marL="571500" indent="-571500">
@@ -7174,7 +7434,17 @@
             </a:pPr>
             <a:r>
               <a:rPr lang="en-US" dirty="0"/>
-              <a:t>Impacts how SQL logs changes</a:t>
+              <a:t>Flushing = closing a log block</a:t>
+            </a:r>
+          </a:p>
+          <a:p>
+            <a:pPr marL="571500" indent="-571500">
+              <a:buFont typeface="Arial" panose="020B0604020202020204" pitchFamily="34" charset="0"/>
+              <a:buChar char="•"/>
+            </a:pPr>
+            <a:r>
+              <a:rPr lang="en-US" dirty="0"/>
+              <a:t>Triggers</a:t>
             </a:r>
           </a:p>
           <a:p>
@@ -7184,7 +7454,7 @@
             </a:pPr>
             <a:r>
               <a:rPr lang="en-US" dirty="0"/>
-              <a:t>Simple</a:t>
+              <a:t>60K limit reached</a:t>
             </a:r>
           </a:p>
           <a:p>
@@ -7194,7 +7464,7 @@
             </a:pPr>
             <a:r>
               <a:rPr lang="en-US" dirty="0"/>
-              <a:t>Full</a:t>
+              <a:t>Transaction commits</a:t>
             </a:r>
           </a:p>
           <a:p>
@@ -7204,7 +7474,17 @@
             </a:pPr>
             <a:r>
               <a:rPr lang="en-US" dirty="0"/>
-              <a:t>Bulk-logged</a:t>
+              <a:t>Transaction rollbacks</a:t>
+            </a:r>
+          </a:p>
+          <a:p>
+            <a:pPr marL="1033227" lvl="1" indent="-457200">
+              <a:buFont typeface="Arial" panose="020B0604020202020204" pitchFamily="34" charset="0"/>
+              <a:buChar char="•"/>
+            </a:pPr>
+            <a:r>
+              <a:rPr lang="en-US" dirty="0"/>
+              <a:t>Checkpoint</a:t>
             </a:r>
           </a:p>
         </p:txBody>
@@ -7212,7 +7492,7 @@
     </p:spTree>
     <p:extLst>
       <p:ext uri="{BB962C8B-B14F-4D97-AF65-F5344CB8AC3E}">
-        <p14:creationId xmlns:p14="http://schemas.microsoft.com/office/powerpoint/2010/main" val="1914948786"/>
+        <p14:creationId xmlns:p14="http://schemas.microsoft.com/office/powerpoint/2010/main" val="3377537013"/>
       </p:ext>
     </p:extLst>
   </p:cSld>
@@ -7256,7 +7536,7 @@
           <a:p>
             <a:r>
               <a:rPr lang="en-US" dirty="0"/>
-              <a:t>Simple Recovery Model</a:t>
+              <a:t>Recovery Models</a:t>
             </a:r>
           </a:p>
         </p:txBody>
@@ -7284,7 +7564,7 @@
             </a:pPr>
             <a:r>
               <a:rPr lang="en-US" dirty="0"/>
-              <a:t>Commonly used for test systems or low-volume production systems</a:t>
+              <a:t>Impacts how SQL logs changes</a:t>
             </a:r>
           </a:p>
           <a:p>
@@ -7294,27 +7574,27 @@
             </a:pPr>
             <a:r>
               <a:rPr lang="en-US" dirty="0"/>
-              <a:t>What is your recovery point objective?</a:t>
-            </a:r>
-          </a:p>
-          <a:p>
-            <a:pPr marL="571500" indent="-571500">
-              <a:buFont typeface="Arial" panose="020B0604020202020204" pitchFamily="34" charset="0"/>
-              <a:buChar char="•"/>
-            </a:pPr>
-            <a:r>
-              <a:rPr lang="en-US" dirty="0"/>
-              <a:t>All changes logged, but can be “discarded” on commit</a:t>
-            </a:r>
-          </a:p>
-          <a:p>
-            <a:pPr marL="571500" indent="-571500">
-              <a:buFont typeface="Arial" panose="020B0604020202020204" pitchFamily="34" charset="0"/>
-              <a:buChar char="•"/>
-            </a:pPr>
-            <a:r>
-              <a:rPr lang="en-US" dirty="0"/>
-              <a:t>Can only recover to the latest full backup</a:t>
+              <a:t>Simple</a:t>
+            </a:r>
+          </a:p>
+          <a:p>
+            <a:pPr marL="1033227" lvl="1" indent="-457200">
+              <a:buFont typeface="Arial" panose="020B0604020202020204" pitchFamily="34" charset="0"/>
+              <a:buChar char="•"/>
+            </a:pPr>
+            <a:r>
+              <a:rPr lang="en-US" dirty="0"/>
+              <a:t>Full</a:t>
+            </a:r>
+          </a:p>
+          <a:p>
+            <a:pPr marL="1033227" lvl="1" indent="-457200">
+              <a:buFont typeface="Arial" panose="020B0604020202020204" pitchFamily="34" charset="0"/>
+              <a:buChar char="•"/>
+            </a:pPr>
+            <a:r>
+              <a:rPr lang="en-US" dirty="0"/>
+              <a:t>Bulk-logged</a:t>
             </a:r>
           </a:p>
         </p:txBody>
@@ -7322,7 +7602,7 @@
     </p:spTree>
     <p:extLst>
       <p:ext uri="{BB962C8B-B14F-4D97-AF65-F5344CB8AC3E}">
-        <p14:creationId xmlns:p14="http://schemas.microsoft.com/office/powerpoint/2010/main" val="1653144033"/>
+        <p14:creationId xmlns:p14="http://schemas.microsoft.com/office/powerpoint/2010/main" val="1914948786"/>
       </p:ext>
     </p:extLst>
   </p:cSld>
@@ -7366,7 +7646,7 @@
           <a:p>
             <a:r>
               <a:rPr lang="en-US" dirty="0"/>
-              <a:t>Full Recovery Model</a:t>
+              <a:t>Simple Recovery Model</a:t>
             </a:r>
           </a:p>
         </p:txBody>
@@ -7394,7 +7674,7 @@
             </a:pPr>
             <a:r>
               <a:rPr lang="en-US" dirty="0"/>
-              <a:t>Probably the most common recovery model for production systems</a:t>
+              <a:t>Commonly used for test systems or low-volume production systems</a:t>
             </a:r>
           </a:p>
           <a:p>
@@ -7414,7 +7694,7 @@
             </a:pPr>
             <a:r>
               <a:rPr lang="en-US" dirty="0"/>
-              <a:t>Log records must be kept until log backup completed</a:t>
+              <a:t>All changes logged, but can be “discarded” on commit</a:t>
             </a:r>
           </a:p>
           <a:p>
@@ -7424,7 +7704,7 @@
             </a:pPr>
             <a:r>
               <a:rPr lang="en-US" dirty="0"/>
-              <a:t>Can recover to an arbitrary point in time</a:t>
+              <a:t>Can only recover to the latest full backup</a:t>
             </a:r>
           </a:p>
         </p:txBody>
@@ -7432,7 +7712,7 @@
     </p:spTree>
     <p:extLst>
       <p:ext uri="{BB962C8B-B14F-4D97-AF65-F5344CB8AC3E}">
-        <p14:creationId xmlns:p14="http://schemas.microsoft.com/office/powerpoint/2010/main" val="1597510221"/>
+        <p14:creationId xmlns:p14="http://schemas.microsoft.com/office/powerpoint/2010/main" val="1653144033"/>
       </p:ext>
     </p:extLst>
   </p:cSld>
@@ -7476,7 +7756,7 @@
           <a:p>
             <a:r>
               <a:rPr lang="en-US" dirty="0"/>
-              <a:t>Bulk-logged Recovery Model</a:t>
+              <a:t>Full Recovery Model</a:t>
             </a:r>
           </a:p>
         </p:txBody>
@@ -7504,7 +7784,7 @@
             </a:pPr>
             <a:r>
               <a:rPr lang="en-US" dirty="0"/>
-              <a:t>Not frequently used, perhaps temporarily during maintenance windows</a:t>
+              <a:t>Probably the most common recovery model for production systems</a:t>
             </a:r>
           </a:p>
           <a:p>
@@ -7524,7 +7804,7 @@
             </a:pPr>
             <a:r>
               <a:rPr lang="en-US" dirty="0"/>
-              <a:t>Similar to full model, but some changes are only “noted” rather than fully logged</a:t>
+              <a:t>Log records must be kept until log backup completed</a:t>
             </a:r>
           </a:p>
           <a:p>
@@ -7534,17 +7814,7 @@
             </a:pPr>
             <a:r>
               <a:rPr lang="en-US" dirty="0"/>
-              <a:t>Log backups still include all changes</a:t>
-            </a:r>
-          </a:p>
-          <a:p>
-            <a:pPr marL="571500" indent="-571500">
-              <a:buFont typeface="Arial" panose="020B0604020202020204" pitchFamily="34" charset="0"/>
-              <a:buChar char="•"/>
-            </a:pPr>
-            <a:r>
-              <a:rPr lang="en-US" dirty="0"/>
-              <a:t>Point-in-time recovery not possible</a:t>
+              <a:t>Can recover to an arbitrary point in time</a:t>
             </a:r>
           </a:p>
         </p:txBody>
@@ -7552,7 +7822,7 @@
     </p:spTree>
     <p:extLst>
       <p:ext uri="{BB962C8B-B14F-4D97-AF65-F5344CB8AC3E}">
-        <p14:creationId xmlns:p14="http://schemas.microsoft.com/office/powerpoint/2010/main" val="3951071790"/>
+        <p14:creationId xmlns:p14="http://schemas.microsoft.com/office/powerpoint/2010/main" val="1597510221"/>
       </p:ext>
     </p:extLst>
   </p:cSld>
@@ -7596,6 +7866,126 @@
           <a:p>
             <a:r>
               <a:rPr lang="en-US" dirty="0"/>
+              <a:t>Bulk-logged Recovery Model</a:t>
+            </a:r>
+          </a:p>
+        </p:txBody>
+      </p:sp>
+      <p:sp>
+        <p:nvSpPr>
+          <p:cNvPr id="3" name="Content Placeholder 2"/>
+          <p:cNvSpPr>
+            <a:spLocks noGrp="1"/>
+          </p:cNvSpPr>
+          <p:nvPr>
+            <p:ph idx="1"/>
+          </p:nvPr>
+        </p:nvSpPr>
+        <p:spPr/>
+        <p:txBody>
+          <a:bodyPr>
+            <a:normAutofit/>
+          </a:bodyPr>
+          <a:lstStyle/>
+          <a:p>
+            <a:pPr marL="571500" indent="-571500">
+              <a:buFont typeface="Arial" panose="020B0604020202020204" pitchFamily="34" charset="0"/>
+              <a:buChar char="•"/>
+            </a:pPr>
+            <a:r>
+              <a:rPr lang="en-US" dirty="0"/>
+              <a:t>Not frequently used, perhaps temporarily during maintenance windows</a:t>
+            </a:r>
+          </a:p>
+          <a:p>
+            <a:pPr marL="1033227" lvl="1" indent="-457200">
+              <a:buFont typeface="Arial" panose="020B0604020202020204" pitchFamily="34" charset="0"/>
+              <a:buChar char="•"/>
+            </a:pPr>
+            <a:r>
+              <a:rPr lang="en-US" dirty="0"/>
+              <a:t>What is your recovery point objective?</a:t>
+            </a:r>
+          </a:p>
+          <a:p>
+            <a:pPr marL="571500" indent="-571500">
+              <a:buFont typeface="Arial" panose="020B0604020202020204" pitchFamily="34" charset="0"/>
+              <a:buChar char="•"/>
+            </a:pPr>
+            <a:r>
+              <a:rPr lang="en-US" dirty="0"/>
+              <a:t>Similar to full model, but some changes are only “noted” rather than fully logged</a:t>
+            </a:r>
+          </a:p>
+          <a:p>
+            <a:pPr marL="571500" indent="-571500">
+              <a:buFont typeface="Arial" panose="020B0604020202020204" pitchFamily="34" charset="0"/>
+              <a:buChar char="•"/>
+            </a:pPr>
+            <a:r>
+              <a:rPr lang="en-US" dirty="0"/>
+              <a:t>Log backups still include all changes</a:t>
+            </a:r>
+          </a:p>
+          <a:p>
+            <a:pPr marL="571500" indent="-571500">
+              <a:buFont typeface="Arial" panose="020B0604020202020204" pitchFamily="34" charset="0"/>
+              <a:buChar char="•"/>
+            </a:pPr>
+            <a:r>
+              <a:rPr lang="en-US" dirty="0"/>
+              <a:t>Point-in-time recovery not possible</a:t>
+            </a:r>
+          </a:p>
+        </p:txBody>
+      </p:sp>
+    </p:spTree>
+    <p:extLst>
+      <p:ext uri="{BB962C8B-B14F-4D97-AF65-F5344CB8AC3E}">
+        <p14:creationId xmlns:p14="http://schemas.microsoft.com/office/powerpoint/2010/main" val="3951071790"/>
+      </p:ext>
+    </p:extLst>
+  </p:cSld>
+  <p:clrMapOvr>
+    <a:masterClrMapping/>
+  </p:clrMapOvr>
+</p:sld>
+</file>
+
+<file path=ppt/slides/slide38.xml><?xml version="1.0" encoding="utf-8"?>
+<p:sld xmlns:a="http://schemas.openxmlformats.org/drawingml/2006/main" xmlns:r="http://schemas.openxmlformats.org/officeDocument/2006/relationships" xmlns:p="http://schemas.openxmlformats.org/presentationml/2006/main">
+  <p:cSld>
+    <p:spTree>
+      <p:nvGrpSpPr>
+        <p:cNvPr id="1" name=""/>
+        <p:cNvGrpSpPr/>
+        <p:nvPr/>
+      </p:nvGrpSpPr>
+      <p:grpSpPr>
+        <a:xfrm>
+          <a:off x="0" y="0"/>
+          <a:ext cx="0" cy="0"/>
+          <a:chOff x="0" y="0"/>
+          <a:chExt cx="0" cy="0"/>
+        </a:xfrm>
+      </p:grpSpPr>
+      <p:sp>
+        <p:nvSpPr>
+          <p:cNvPr id="2" name="Title 1"/>
+          <p:cNvSpPr>
+            <a:spLocks noGrp="1"/>
+          </p:cNvSpPr>
+          <p:nvPr>
+            <p:ph type="title"/>
+          </p:nvPr>
+        </p:nvSpPr>
+        <p:spPr/>
+        <p:txBody>
+          <a:bodyPr/>
+          <a:lstStyle/>
+          <a:p>
+            <a:r>
+              <a:rPr lang="en-US" dirty="0"/>
               <a:t>Clearing* the Log (aka Truncating*)</a:t>
             </a:r>
           </a:p>
@@ -7944,7 +8334,7 @@
 </p:sld>
 </file>
 
-<file path=ppt/slides/slide38.xml><?xml version="1.0" encoding="utf-8"?>
+<file path=ppt/slides/slide39.xml><?xml version="1.0" encoding="utf-8"?>
 <p:sld xmlns:a="http://schemas.openxmlformats.org/drawingml/2006/main" xmlns:r="http://schemas.openxmlformats.org/officeDocument/2006/relationships" xmlns:p="http://schemas.openxmlformats.org/presentationml/2006/main">
   <p:cSld>
     <p:spTree>
@@ -8051,144 +8441,6 @@
 </p:sld>
 </file>
 
-<file path=ppt/slides/slide39.xml><?xml version="1.0" encoding="utf-8"?>
-<p:sld xmlns:a="http://schemas.openxmlformats.org/drawingml/2006/main" xmlns:r="http://schemas.openxmlformats.org/officeDocument/2006/relationships" xmlns:p="http://schemas.openxmlformats.org/presentationml/2006/main">
-  <p:cSld>
-    <p:spTree>
-      <p:nvGrpSpPr>
-        <p:cNvPr id="1" name=""/>
-        <p:cNvGrpSpPr/>
-        <p:nvPr/>
-      </p:nvGrpSpPr>
-      <p:grpSpPr>
-        <a:xfrm>
-          <a:off x="0" y="0"/>
-          <a:ext cx="0" cy="0"/>
-          <a:chOff x="0" y="0"/>
-          <a:chExt cx="0" cy="0"/>
-        </a:xfrm>
-      </p:grpSpPr>
-      <p:sp>
-        <p:nvSpPr>
-          <p:cNvPr id="2" name="Title 1"/>
-          <p:cNvSpPr>
-            <a:spLocks noGrp="1"/>
-          </p:cNvSpPr>
-          <p:nvPr>
-            <p:ph type="title"/>
-          </p:nvPr>
-        </p:nvSpPr>
-        <p:spPr/>
-        <p:txBody>
-          <a:bodyPr/>
-          <a:lstStyle/>
-          <a:p>
-            <a:r>
-              <a:rPr lang="en-US" dirty="0"/>
-              <a:t>Rolling Back a Transaction</a:t>
-            </a:r>
-          </a:p>
-        </p:txBody>
-      </p:sp>
-      <p:sp>
-        <p:nvSpPr>
-          <p:cNvPr id="3" name="Content Placeholder 2"/>
-          <p:cNvSpPr>
-            <a:spLocks noGrp="1"/>
-          </p:cNvSpPr>
-          <p:nvPr>
-            <p:ph idx="1"/>
-          </p:nvPr>
-        </p:nvSpPr>
-        <p:spPr/>
-        <p:txBody>
-          <a:bodyPr/>
-          <a:lstStyle/>
-          <a:p>
-            <a:pPr marL="571500" indent="-571500">
-              <a:buFont typeface="Arial" panose="020B0604020202020204" pitchFamily="34" charset="0"/>
-              <a:buChar char="•"/>
-            </a:pPr>
-            <a:r>
-              <a:rPr lang="en-US" dirty="0"/>
-              <a:t>When a transaction cannot complete, it must rollback</a:t>
-            </a:r>
-          </a:p>
-          <a:p>
-            <a:pPr marL="1033227" lvl="1" indent="-457200">
-              <a:buFont typeface="Arial" panose="020B0604020202020204" pitchFamily="34" charset="0"/>
-              <a:buChar char="•"/>
-            </a:pPr>
-            <a:r>
-              <a:rPr lang="en-US" dirty="0"/>
-              <a:t>ROLLBACK TRANSACTION command</a:t>
-            </a:r>
-          </a:p>
-          <a:p>
-            <a:pPr marL="1033227" lvl="1" indent="-457200">
-              <a:buFont typeface="Arial" panose="020B0604020202020204" pitchFamily="34" charset="0"/>
-              <a:buChar char="•"/>
-            </a:pPr>
-            <a:r>
-              <a:rPr lang="en-US" dirty="0"/>
-              <a:t>Connection is abandoned</a:t>
-            </a:r>
-          </a:p>
-          <a:p>
-            <a:pPr marL="1494953" lvl="2" indent="-342900">
-              <a:buFont typeface="Arial" panose="020B0604020202020204" pitchFamily="34" charset="0"/>
-              <a:buChar char="•"/>
-            </a:pPr>
-            <a:r>
-              <a:rPr lang="en-US" dirty="0"/>
-              <a:t>Network failure, KILL, severe errors, client crash</a:t>
-            </a:r>
-          </a:p>
-          <a:p>
-            <a:pPr marL="1033227" lvl="1" indent="-457200">
-              <a:buFont typeface="Arial" panose="020B0604020202020204" pitchFamily="34" charset="0"/>
-              <a:buChar char="•"/>
-            </a:pPr>
-            <a:r>
-              <a:rPr lang="en-US" dirty="0"/>
-              <a:t>Non-graceful shutdown of SQL (crash recovery)</a:t>
-            </a:r>
-          </a:p>
-          <a:p>
-            <a:pPr marL="1033227" lvl="1" indent="-457200">
-              <a:buFont typeface="Arial" panose="020B0604020202020204" pitchFamily="34" charset="0"/>
-              <a:buChar char="•"/>
-            </a:pPr>
-            <a:r>
-              <a:rPr lang="en-US" dirty="0"/>
-              <a:t>Restore operations</a:t>
-            </a:r>
-          </a:p>
-          <a:p>
-            <a:pPr marL="571500" indent="-571500">
-              <a:buFont typeface="Arial" panose="020B0604020202020204" pitchFamily="34" charset="0"/>
-              <a:buChar char="•"/>
-            </a:pPr>
-            <a:r>
-              <a:rPr lang="en-US" dirty="0"/>
-              <a:t>Rollback operations are single-threaded</a:t>
-            </a:r>
-          </a:p>
-        </p:txBody>
-      </p:sp>
-    </p:spTree>
-    <p:extLst>
-      <p:ext uri="{BB962C8B-B14F-4D97-AF65-F5344CB8AC3E}">
-        <p14:creationId xmlns:p14="http://schemas.microsoft.com/office/powerpoint/2010/main" val="3290201266"/>
-      </p:ext>
-    </p:extLst>
-  </p:cSld>
-  <p:clrMapOvr>
-    <a:masterClrMapping/>
-  </p:clrMapOvr>
-</p:sld>
-</file>
-
 <file path=ppt/slides/slide4.xml><?xml version="1.0" encoding="utf-8"?>
 <p:sld xmlns:a="http://schemas.openxmlformats.org/drawingml/2006/main" xmlns:r="http://schemas.openxmlformats.org/officeDocument/2006/relationships" xmlns:p="http://schemas.openxmlformats.org/presentationml/2006/main">
   <p:cSld>
@@ -8370,6 +8622,144 @@
 </file>
 
 <file path=ppt/slides/slide40.xml><?xml version="1.0" encoding="utf-8"?>
+<p:sld xmlns:a="http://schemas.openxmlformats.org/drawingml/2006/main" xmlns:r="http://schemas.openxmlformats.org/officeDocument/2006/relationships" xmlns:p="http://schemas.openxmlformats.org/presentationml/2006/main">
+  <p:cSld>
+    <p:spTree>
+      <p:nvGrpSpPr>
+        <p:cNvPr id="1" name=""/>
+        <p:cNvGrpSpPr/>
+        <p:nvPr/>
+      </p:nvGrpSpPr>
+      <p:grpSpPr>
+        <a:xfrm>
+          <a:off x="0" y="0"/>
+          <a:ext cx="0" cy="0"/>
+          <a:chOff x="0" y="0"/>
+          <a:chExt cx="0" cy="0"/>
+        </a:xfrm>
+      </p:grpSpPr>
+      <p:sp>
+        <p:nvSpPr>
+          <p:cNvPr id="2" name="Title 1"/>
+          <p:cNvSpPr>
+            <a:spLocks noGrp="1"/>
+          </p:cNvSpPr>
+          <p:nvPr>
+            <p:ph type="title"/>
+          </p:nvPr>
+        </p:nvSpPr>
+        <p:spPr/>
+        <p:txBody>
+          <a:bodyPr/>
+          <a:lstStyle/>
+          <a:p>
+            <a:r>
+              <a:rPr lang="en-US" dirty="0"/>
+              <a:t>Rolling Back a Transaction</a:t>
+            </a:r>
+          </a:p>
+        </p:txBody>
+      </p:sp>
+      <p:sp>
+        <p:nvSpPr>
+          <p:cNvPr id="3" name="Content Placeholder 2"/>
+          <p:cNvSpPr>
+            <a:spLocks noGrp="1"/>
+          </p:cNvSpPr>
+          <p:nvPr>
+            <p:ph idx="1"/>
+          </p:nvPr>
+        </p:nvSpPr>
+        <p:spPr/>
+        <p:txBody>
+          <a:bodyPr/>
+          <a:lstStyle/>
+          <a:p>
+            <a:pPr marL="571500" indent="-571500">
+              <a:buFont typeface="Arial" panose="020B0604020202020204" pitchFamily="34" charset="0"/>
+              <a:buChar char="•"/>
+            </a:pPr>
+            <a:r>
+              <a:rPr lang="en-US" dirty="0"/>
+              <a:t>When a transaction cannot complete, it must rollback</a:t>
+            </a:r>
+          </a:p>
+          <a:p>
+            <a:pPr marL="1033227" lvl="1" indent="-457200">
+              <a:buFont typeface="Arial" panose="020B0604020202020204" pitchFamily="34" charset="0"/>
+              <a:buChar char="•"/>
+            </a:pPr>
+            <a:r>
+              <a:rPr lang="en-US" dirty="0"/>
+              <a:t>ROLLBACK TRANSACTION command</a:t>
+            </a:r>
+          </a:p>
+          <a:p>
+            <a:pPr marL="1033227" lvl="1" indent="-457200">
+              <a:buFont typeface="Arial" panose="020B0604020202020204" pitchFamily="34" charset="0"/>
+              <a:buChar char="•"/>
+            </a:pPr>
+            <a:r>
+              <a:rPr lang="en-US" dirty="0"/>
+              <a:t>Connection is abandoned</a:t>
+            </a:r>
+          </a:p>
+          <a:p>
+            <a:pPr marL="1494953" lvl="2" indent="-342900">
+              <a:buFont typeface="Arial" panose="020B0604020202020204" pitchFamily="34" charset="0"/>
+              <a:buChar char="•"/>
+            </a:pPr>
+            <a:r>
+              <a:rPr lang="en-US" dirty="0"/>
+              <a:t>Network failure, KILL, severe errors, client crash</a:t>
+            </a:r>
+          </a:p>
+          <a:p>
+            <a:pPr marL="1033227" lvl="1" indent="-457200">
+              <a:buFont typeface="Arial" panose="020B0604020202020204" pitchFamily="34" charset="0"/>
+              <a:buChar char="•"/>
+            </a:pPr>
+            <a:r>
+              <a:rPr lang="en-US" dirty="0"/>
+              <a:t>Non-graceful shutdown of SQL (crash recovery)</a:t>
+            </a:r>
+          </a:p>
+          <a:p>
+            <a:pPr marL="1033227" lvl="1" indent="-457200">
+              <a:buFont typeface="Arial" panose="020B0604020202020204" pitchFamily="34" charset="0"/>
+              <a:buChar char="•"/>
+            </a:pPr>
+            <a:r>
+              <a:rPr lang="en-US" dirty="0"/>
+              <a:t>Restore operations</a:t>
+            </a:r>
+          </a:p>
+          <a:p>
+            <a:pPr marL="571500" indent="-571500">
+              <a:buFont typeface="Arial" panose="020B0604020202020204" pitchFamily="34" charset="0"/>
+              <a:buChar char="•"/>
+            </a:pPr>
+            <a:r>
+              <a:rPr lang="en-US" dirty="0"/>
+              <a:t>Rollback operations are single-threaded</a:t>
+            </a:r>
+          </a:p>
+        </p:txBody>
+      </p:sp>
+    </p:spTree>
+    <p:extLst>
+      <p:ext uri="{BB962C8B-B14F-4D97-AF65-F5344CB8AC3E}">
+        <p14:creationId xmlns:p14="http://schemas.microsoft.com/office/powerpoint/2010/main" val="3290201266"/>
+      </p:ext>
+    </p:extLst>
+  </p:cSld>
+  <p:clrMapOvr>
+    <a:masterClrMapping/>
+  </p:clrMapOvr>
+</p:sld>
+</file>
+
+<file path=ppt/slides/slide41.xml><?xml version="1.0" encoding="utf-8"?>
 <p:sld xmlns:a="http://schemas.openxmlformats.org/drawingml/2006/main" xmlns:r="http://schemas.openxmlformats.org/officeDocument/2006/relationships" xmlns:p="http://schemas.openxmlformats.org/presentationml/2006/main">
   <p:cSld>
     <p:spTree>
@@ -8498,7 +8888,7 @@
 </p:sld>
 </file>
 
-<file path=ppt/slides/slide41.xml><?xml version="1.0" encoding="utf-8"?>
+<file path=ppt/slides/slide42.xml><?xml version="1.0" encoding="utf-8"?>
 <p:sld xmlns:a="http://schemas.openxmlformats.org/drawingml/2006/main" xmlns:r="http://schemas.openxmlformats.org/officeDocument/2006/relationships" xmlns:p="http://schemas.openxmlformats.org/presentationml/2006/main">
   <p:cSld>
     <p:spTree>
@@ -8617,7 +9007,7 @@
 </p:sld>
 </file>
 
-<file path=ppt/slides/slide42.xml><?xml version="1.0" encoding="utf-8"?>
+<file path=ppt/slides/slide43.xml><?xml version="1.0" encoding="utf-8"?>
 <p:sld xmlns:a="http://schemas.openxmlformats.org/drawingml/2006/main" xmlns:r="http://schemas.openxmlformats.org/officeDocument/2006/relationships" xmlns:p="http://schemas.openxmlformats.org/presentationml/2006/main">
   <p:cSld>
     <p:spTree>
@@ -8736,7 +9126,7 @@
 </p:sld>
 </file>
 
-<file path=ppt/slides/slide43.xml><?xml version="1.0" encoding="utf-8"?>
+<file path=ppt/slides/slide44.xml><?xml version="1.0" encoding="utf-8"?>
 <p:sld xmlns:a="http://schemas.openxmlformats.org/drawingml/2006/main" xmlns:r="http://schemas.openxmlformats.org/officeDocument/2006/relationships" xmlns:p="http://schemas.openxmlformats.org/presentationml/2006/main">
   <p:cSld>
     <p:spTree>
@@ -8845,7 +9235,7 @@
 </p:sld>
 </file>
 
-<file path=ppt/slides/slide44.xml><?xml version="1.0" encoding="utf-8"?>
+<file path=ppt/slides/slide45.xml><?xml version="1.0" encoding="utf-8"?>
 <p:sld xmlns:a="http://schemas.openxmlformats.org/drawingml/2006/main" xmlns:r="http://schemas.openxmlformats.org/officeDocument/2006/relationships" xmlns:p="http://schemas.openxmlformats.org/presentationml/2006/main">
   <p:cSld>
     <p:spTree>
@@ -8954,7 +9344,7 @@
 </p:sld>
 </file>
 
-<file path=ppt/slides/slide45.xml><?xml version="1.0" encoding="utf-8"?>
+<file path=ppt/slides/slide46.xml><?xml version="1.0" encoding="utf-8"?>
 <p:sld xmlns:a="http://schemas.openxmlformats.org/drawingml/2006/main" xmlns:r="http://schemas.openxmlformats.org/officeDocument/2006/relationships" xmlns:p="http://schemas.openxmlformats.org/presentationml/2006/main">
   <p:cSld>
     <p:spTree>
@@ -9067,7 +9457,7 @@
 </p:sld>
 </file>
 
-<file path=ppt/slides/slide46.xml><?xml version="1.0" encoding="utf-8"?>
+<file path=ppt/slides/slide47.xml><?xml version="1.0" encoding="utf-8"?>
 <p:sld xmlns:a="http://schemas.openxmlformats.org/drawingml/2006/main" xmlns:r="http://schemas.openxmlformats.org/officeDocument/2006/relationships" xmlns:p="http://schemas.openxmlformats.org/presentationml/2006/main">
   <p:cSld>
     <p:spTree>
@@ -9165,7 +9555,7 @@
 </p:sld>
 </file>
 
-<file path=ppt/slides/slide47.xml><?xml version="1.0" encoding="utf-8"?>
+<file path=ppt/slides/slide48.xml><?xml version="1.0" encoding="utf-8"?>
 <p:sld xmlns:a="http://schemas.openxmlformats.org/drawingml/2006/main" xmlns:r="http://schemas.openxmlformats.org/officeDocument/2006/relationships" xmlns:p="http://schemas.openxmlformats.org/presentationml/2006/main">
   <p:cSld>
     <p:spTree>
@@ -9261,14 +9651,14 @@
                 <a:gridCol w="3034700">
                   <a:extLst>
                     <a:ext uri="{9D8B030D-6E8A-4147-A177-3AD203B41FA5}">
-                      <a16:colId xmlns:a16="http://schemas.microsoft.com/office/drawing/2014/main" val="20000"/>
+                      <a16:colId xmlns:a16="http://schemas.microsoft.com/office/drawing/2014/main" xmlns="" val="20000"/>
                     </a:ext>
                   </a:extLst>
                 </a:gridCol>
                 <a:gridCol w="3034700">
                   <a:extLst>
                     <a:ext uri="{9D8B030D-6E8A-4147-A177-3AD203B41FA5}">
-                      <a16:colId xmlns:a16="http://schemas.microsoft.com/office/drawing/2014/main" val="20001"/>
+                      <a16:colId xmlns:a16="http://schemas.microsoft.com/office/drawing/2014/main" xmlns="" val="20001"/>
                     </a:ext>
                   </a:extLst>
                 </a:gridCol>
@@ -9314,7 +9704,7 @@
                 </a:tc>
                 <a:extLst>
                   <a:ext uri="{0D108BD9-81ED-4DB2-BD59-A6C34878D82A}">
-                    <a16:rowId xmlns:a16="http://schemas.microsoft.com/office/drawing/2014/main" val="10000"/>
+                    <a16:rowId xmlns:a16="http://schemas.microsoft.com/office/drawing/2014/main" xmlns="" val="10000"/>
                   </a:ext>
                 </a:extLst>
               </a:tr>
@@ -9349,7 +9739,7 @@
                 </a:tc>
                 <a:extLst>
                   <a:ext uri="{0D108BD9-81ED-4DB2-BD59-A6C34878D82A}">
-                    <a16:rowId xmlns:a16="http://schemas.microsoft.com/office/drawing/2014/main" val="10001"/>
+                    <a16:rowId xmlns:a16="http://schemas.microsoft.com/office/drawing/2014/main" xmlns="" val="10001"/>
                   </a:ext>
                 </a:extLst>
               </a:tr>
@@ -9384,7 +9774,7 @@
                 </a:tc>
                 <a:extLst>
                   <a:ext uri="{0D108BD9-81ED-4DB2-BD59-A6C34878D82A}">
-                    <a16:rowId xmlns:a16="http://schemas.microsoft.com/office/drawing/2014/main" val="10002"/>
+                    <a16:rowId xmlns:a16="http://schemas.microsoft.com/office/drawing/2014/main" xmlns="" val="10002"/>
                   </a:ext>
                 </a:extLst>
               </a:tr>
@@ -9424,7 +9814,7 @@
                 </a:tc>
                 <a:extLst>
                   <a:ext uri="{0D108BD9-81ED-4DB2-BD59-A6C34878D82A}">
-                    <a16:rowId xmlns:a16="http://schemas.microsoft.com/office/drawing/2014/main" val="10003"/>
+                    <a16:rowId xmlns:a16="http://schemas.microsoft.com/office/drawing/2014/main" xmlns="" val="10003"/>
                   </a:ext>
                 </a:extLst>
               </a:tr>
@@ -9630,144 +10020,6 @@
     <p:extLst>
       <p:ext uri="{BB962C8B-B14F-4D97-AF65-F5344CB8AC3E}">
         <p14:creationId xmlns:p14="http://schemas.microsoft.com/office/powerpoint/2010/main" val="1499913864"/>
-      </p:ext>
-    </p:extLst>
-  </p:cSld>
-  <p:clrMapOvr>
-    <a:masterClrMapping/>
-  </p:clrMapOvr>
-</p:sld>
-</file>
-
-<file path=ppt/slides/slide48.xml><?xml version="1.0" encoding="utf-8"?>
-<p:sld xmlns:a="http://schemas.openxmlformats.org/drawingml/2006/main" xmlns:r="http://schemas.openxmlformats.org/officeDocument/2006/relationships" xmlns:p="http://schemas.openxmlformats.org/presentationml/2006/main">
-  <p:cSld>
-    <p:spTree>
-      <p:nvGrpSpPr>
-        <p:cNvPr id="1" name=""/>
-        <p:cNvGrpSpPr/>
-        <p:nvPr/>
-      </p:nvGrpSpPr>
-      <p:grpSpPr>
-        <a:xfrm>
-          <a:off x="0" y="0"/>
-          <a:ext cx="0" cy="0"/>
-          <a:chOff x="0" y="0"/>
-          <a:chExt cx="0" cy="0"/>
-        </a:xfrm>
-      </p:grpSpPr>
-      <p:sp>
-        <p:nvSpPr>
-          <p:cNvPr id="2" name="Title 1"/>
-          <p:cNvSpPr>
-            <a:spLocks noGrp="1"/>
-          </p:cNvSpPr>
-          <p:nvPr>
-            <p:ph type="title"/>
-          </p:nvPr>
-        </p:nvSpPr>
-        <p:spPr/>
-        <p:txBody>
-          <a:bodyPr/>
-          <a:lstStyle/>
-          <a:p>
-            <a:r>
-              <a:rPr lang="en-US" dirty="0"/>
-              <a:t>VLF Trade-Offs</a:t>
-            </a:r>
-          </a:p>
-        </p:txBody>
-      </p:sp>
-      <p:sp>
-        <p:nvSpPr>
-          <p:cNvPr id="3" name="Content Placeholder 2"/>
-          <p:cNvSpPr>
-            <a:spLocks noGrp="1"/>
-          </p:cNvSpPr>
-          <p:nvPr>
-            <p:ph idx="1"/>
-          </p:nvPr>
-        </p:nvSpPr>
-        <p:spPr/>
-        <p:txBody>
-          <a:bodyPr>
-            <a:normAutofit/>
-          </a:bodyPr>
-          <a:lstStyle/>
-          <a:p>
-            <a:pPr marL="571500" indent="-571500">
-              <a:buFont typeface="Arial" panose="020B0604020202020204" pitchFamily="34" charset="0"/>
-              <a:buChar char="•"/>
-            </a:pPr>
-            <a:r>
-              <a:rPr lang="en-US" dirty="0"/>
-              <a:t>Too many VLFs create performance problems (“VLF Fragmentation”)</a:t>
-            </a:r>
-          </a:p>
-          <a:p>
-            <a:pPr marL="1033227" lvl="1" indent="-457200">
-              <a:buFont typeface="Arial" panose="020B0604020202020204" pitchFamily="34" charset="0"/>
-              <a:buChar char="•"/>
-            </a:pPr>
-            <a:r>
-              <a:rPr lang="en-US" dirty="0"/>
-              <a:t>Slows noticeably any time log is read</a:t>
-            </a:r>
-          </a:p>
-          <a:p>
-            <a:pPr marL="1494953" lvl="2" indent="-342900">
-              <a:buFont typeface="Arial" panose="020B0604020202020204" pitchFamily="34" charset="0"/>
-              <a:buChar char="•"/>
-            </a:pPr>
-            <a:r>
-              <a:rPr lang="en-US" dirty="0"/>
-              <a:t>Start-up time for database, log reader, backup &amp; restore, etc.</a:t>
-            </a:r>
-          </a:p>
-          <a:p>
-            <a:pPr marL="1033227" lvl="1" indent="-457200">
-              <a:buFont typeface="Arial" panose="020B0604020202020204" pitchFamily="34" charset="0"/>
-              <a:buChar char="•"/>
-            </a:pPr>
-            <a:r>
-              <a:rPr lang="en-US" dirty="0"/>
-              <a:t>But smaller VLFs are faster to allocate (zero-</a:t>
-            </a:r>
-            <a:r>
-              <a:rPr lang="en-US" dirty="0" err="1"/>
-              <a:t>init</a:t>
-            </a:r>
-            <a:r>
-              <a:rPr lang="en-US" dirty="0"/>
-              <a:t>)</a:t>
-            </a:r>
-          </a:p>
-          <a:p>
-            <a:pPr marL="571500" indent="-571500">
-              <a:buFont typeface="Arial" panose="020B0604020202020204" pitchFamily="34" charset="0"/>
-              <a:buChar char="•"/>
-            </a:pPr>
-            <a:r>
-              <a:rPr lang="en-US" dirty="0"/>
-              <a:t>Too few VLFs also create performance problems</a:t>
-            </a:r>
-          </a:p>
-          <a:p>
-            <a:pPr marL="1033227" lvl="1" indent="-457200">
-              <a:buFont typeface="Arial" panose="020B0604020202020204" pitchFamily="34" charset="0"/>
-              <a:buChar char="•"/>
-            </a:pPr>
-            <a:r>
-              <a:rPr lang="en-US" dirty="0"/>
-              <a:t>Clearing the log, especially when long-running transactions are happening</a:t>
-            </a:r>
-          </a:p>
-        </p:txBody>
-      </p:sp>
-    </p:spTree>
-    <p:extLst>
-      <p:ext uri="{BB962C8B-B14F-4D97-AF65-F5344CB8AC3E}">
-        <p14:creationId xmlns:p14="http://schemas.microsoft.com/office/powerpoint/2010/main" val="4210259203"/>
       </p:ext>
     </p:extLst>
   </p:cSld>
@@ -9811,7 +10063,7 @@
           <a:p>
             <a:r>
               <a:rPr lang="en-US" dirty="0"/>
-              <a:t>Pre-Allocating the Log</a:t>
+              <a:t>VLF Trade-Offs</a:t>
             </a:r>
           </a:p>
         </p:txBody>
@@ -9828,7 +10080,9 @@
         </p:nvSpPr>
         <p:spPr/>
         <p:txBody>
-          <a:bodyPr/>
+          <a:bodyPr>
+            <a:normAutofit/>
+          </a:bodyPr>
           <a:lstStyle/>
           <a:p>
             <a:pPr marL="571500" indent="-571500">
@@ -9837,7 +10091,7 @@
             </a:pPr>
             <a:r>
               <a:rPr lang="en-US" dirty="0"/>
-              <a:t>Why?</a:t>
+              <a:t>Too many VLFs create performance problems (“VLF Fragmentation”)</a:t>
             </a:r>
           </a:p>
           <a:p>
@@ -9847,7 +10101,17 @@
             </a:pPr>
             <a:r>
               <a:rPr lang="en-US" dirty="0"/>
-              <a:t>Eliminate VLF fragmentation</a:t>
+              <a:t>Slows noticeably any time log is read</a:t>
+            </a:r>
+          </a:p>
+          <a:p>
+            <a:pPr marL="1494953" lvl="2" indent="-342900">
+              <a:buFont typeface="Arial" panose="020B0604020202020204" pitchFamily="34" charset="0"/>
+              <a:buChar char="•"/>
+            </a:pPr>
+            <a:r>
+              <a:rPr lang="en-US" dirty="0"/>
+              <a:t>Start-up time for database, log reader, backup &amp; restore, etc.</a:t>
             </a:r>
           </a:p>
           <a:p>
@@ -9857,17 +10121,15 @@
             </a:pPr>
             <a:r>
               <a:rPr lang="en-US" dirty="0"/>
-              <a:t>Avoid log growth during user operations</a:t>
-            </a:r>
-          </a:p>
-          <a:p>
-            <a:pPr marL="1494953" lvl="2" indent="-342900">
-              <a:buFont typeface="Arial" panose="020B0604020202020204" pitchFamily="34" charset="0"/>
-              <a:buChar char="•"/>
-            </a:pPr>
-            <a:r>
-              <a:rPr lang="en-US" dirty="0"/>
-              <a:t>Can be time-consuming due to zero-initialization</a:t>
+              <a:t>But smaller VLFs are faster to allocate (zero-</a:t>
+            </a:r>
+            <a:r>
+              <a:rPr lang="en-US" dirty="0" err="1"/>
+              <a:t>init</a:t>
+            </a:r>
+            <a:r>
+              <a:rPr lang="en-US" dirty="0"/>
+              <a:t>)</a:t>
             </a:r>
           </a:p>
           <a:p>
@@ -9877,7 +10139,7 @@
             </a:pPr>
             <a:r>
               <a:rPr lang="en-US" dirty="0"/>
-              <a:t>However, plan for auto-growth</a:t>
+              <a:t>Too few VLFs also create performance problems</a:t>
             </a:r>
           </a:p>
           <a:p>
@@ -9887,17 +10149,7 @@
             </a:pPr>
             <a:r>
               <a:rPr lang="en-US" dirty="0"/>
-              <a:t>Set reasonable auto-growth parameters</a:t>
-            </a:r>
-          </a:p>
-          <a:p>
-            <a:pPr marL="1033227" lvl="1" indent="-457200">
-              <a:buFont typeface="Arial" panose="020B0604020202020204" pitchFamily="34" charset="0"/>
-              <a:buChar char="•"/>
-            </a:pPr>
-            <a:r>
-              <a:rPr lang="en-US" dirty="0"/>
-              <a:t>Fixed growth amount, not percentage</a:t>
+              <a:t>Clearing the log, especially when long-running transactions are happening</a:t>
             </a:r>
           </a:p>
         </p:txBody>
@@ -9905,7 +10157,7 @@
     </p:spTree>
     <p:extLst>
       <p:ext uri="{BB962C8B-B14F-4D97-AF65-F5344CB8AC3E}">
-        <p14:creationId xmlns:p14="http://schemas.microsoft.com/office/powerpoint/2010/main" val="1244144183"/>
+        <p14:creationId xmlns:p14="http://schemas.microsoft.com/office/powerpoint/2010/main" val="4210259203"/>
       </p:ext>
     </p:extLst>
   </p:cSld>
@@ -10060,6 +10312,144 @@
 </file>
 
 <file path=ppt/slides/slide50.xml><?xml version="1.0" encoding="utf-8"?>
+<p:sld xmlns:a="http://schemas.openxmlformats.org/drawingml/2006/main" xmlns:r="http://schemas.openxmlformats.org/officeDocument/2006/relationships" xmlns:p="http://schemas.openxmlformats.org/presentationml/2006/main">
+  <p:cSld>
+    <p:spTree>
+      <p:nvGrpSpPr>
+        <p:cNvPr id="1" name=""/>
+        <p:cNvGrpSpPr/>
+        <p:nvPr/>
+      </p:nvGrpSpPr>
+      <p:grpSpPr>
+        <a:xfrm>
+          <a:off x="0" y="0"/>
+          <a:ext cx="0" cy="0"/>
+          <a:chOff x="0" y="0"/>
+          <a:chExt cx="0" cy="0"/>
+        </a:xfrm>
+      </p:grpSpPr>
+      <p:sp>
+        <p:nvSpPr>
+          <p:cNvPr id="2" name="Title 1"/>
+          <p:cNvSpPr>
+            <a:spLocks noGrp="1"/>
+          </p:cNvSpPr>
+          <p:nvPr>
+            <p:ph type="title"/>
+          </p:nvPr>
+        </p:nvSpPr>
+        <p:spPr/>
+        <p:txBody>
+          <a:bodyPr/>
+          <a:lstStyle/>
+          <a:p>
+            <a:r>
+              <a:rPr lang="en-US" dirty="0"/>
+              <a:t>Pre-Allocating the Log</a:t>
+            </a:r>
+          </a:p>
+        </p:txBody>
+      </p:sp>
+      <p:sp>
+        <p:nvSpPr>
+          <p:cNvPr id="3" name="Content Placeholder 2"/>
+          <p:cNvSpPr>
+            <a:spLocks noGrp="1"/>
+          </p:cNvSpPr>
+          <p:nvPr>
+            <p:ph idx="1"/>
+          </p:nvPr>
+        </p:nvSpPr>
+        <p:spPr/>
+        <p:txBody>
+          <a:bodyPr/>
+          <a:lstStyle/>
+          <a:p>
+            <a:pPr marL="571500" indent="-571500">
+              <a:buFont typeface="Arial" panose="020B0604020202020204" pitchFamily="34" charset="0"/>
+              <a:buChar char="•"/>
+            </a:pPr>
+            <a:r>
+              <a:rPr lang="en-US" dirty="0"/>
+              <a:t>Why?</a:t>
+            </a:r>
+          </a:p>
+          <a:p>
+            <a:pPr marL="1033227" lvl="1" indent="-457200">
+              <a:buFont typeface="Arial" panose="020B0604020202020204" pitchFamily="34" charset="0"/>
+              <a:buChar char="•"/>
+            </a:pPr>
+            <a:r>
+              <a:rPr lang="en-US" dirty="0"/>
+              <a:t>Eliminate VLF fragmentation</a:t>
+            </a:r>
+          </a:p>
+          <a:p>
+            <a:pPr marL="1033227" lvl="1" indent="-457200">
+              <a:buFont typeface="Arial" panose="020B0604020202020204" pitchFamily="34" charset="0"/>
+              <a:buChar char="•"/>
+            </a:pPr>
+            <a:r>
+              <a:rPr lang="en-US" dirty="0"/>
+              <a:t>Avoid log growth during user operations</a:t>
+            </a:r>
+          </a:p>
+          <a:p>
+            <a:pPr marL="1494953" lvl="2" indent="-342900">
+              <a:buFont typeface="Arial" panose="020B0604020202020204" pitchFamily="34" charset="0"/>
+              <a:buChar char="•"/>
+            </a:pPr>
+            <a:r>
+              <a:rPr lang="en-US" dirty="0"/>
+              <a:t>Can be time-consuming due to zero-initialization</a:t>
+            </a:r>
+          </a:p>
+          <a:p>
+            <a:pPr marL="571500" indent="-571500">
+              <a:buFont typeface="Arial" panose="020B0604020202020204" pitchFamily="34" charset="0"/>
+              <a:buChar char="•"/>
+            </a:pPr>
+            <a:r>
+              <a:rPr lang="en-US" dirty="0"/>
+              <a:t>However, plan for auto-growth</a:t>
+            </a:r>
+          </a:p>
+          <a:p>
+            <a:pPr marL="1033227" lvl="1" indent="-457200">
+              <a:buFont typeface="Arial" panose="020B0604020202020204" pitchFamily="34" charset="0"/>
+              <a:buChar char="•"/>
+            </a:pPr>
+            <a:r>
+              <a:rPr lang="en-US" dirty="0"/>
+              <a:t>Set reasonable auto-growth parameters</a:t>
+            </a:r>
+          </a:p>
+          <a:p>
+            <a:pPr marL="1033227" lvl="1" indent="-457200">
+              <a:buFont typeface="Arial" panose="020B0604020202020204" pitchFamily="34" charset="0"/>
+              <a:buChar char="•"/>
+            </a:pPr>
+            <a:r>
+              <a:rPr lang="en-US" dirty="0"/>
+              <a:t>Fixed growth amount, not percentage</a:t>
+            </a:r>
+          </a:p>
+        </p:txBody>
+      </p:sp>
+    </p:spTree>
+    <p:extLst>
+      <p:ext uri="{BB962C8B-B14F-4D97-AF65-F5344CB8AC3E}">
+        <p14:creationId xmlns:p14="http://schemas.microsoft.com/office/powerpoint/2010/main" val="1244144183"/>
+      </p:ext>
+    </p:extLst>
+  </p:cSld>
+  <p:clrMapOvr>
+    <a:masterClrMapping/>
+  </p:clrMapOvr>
+</p:sld>
+</file>
+
+<file path=ppt/slides/slide51.xml><?xml version="1.0" encoding="utf-8"?>
 <p:sld xmlns:a="http://schemas.openxmlformats.org/drawingml/2006/main" xmlns:r="http://schemas.openxmlformats.org/officeDocument/2006/relationships" xmlns:p="http://schemas.openxmlformats.org/presentationml/2006/main">
   <p:cSld>
     <p:spTree>
@@ -10157,254 +10547,6 @@
 </p:sld>
 </file>
 
-<file path=ppt/slides/slide51.xml><?xml version="1.0" encoding="utf-8"?>
-<p:sld xmlns:a="http://schemas.openxmlformats.org/drawingml/2006/main" xmlns:r="http://schemas.openxmlformats.org/officeDocument/2006/relationships" xmlns:p="http://schemas.openxmlformats.org/presentationml/2006/main">
-  <p:cSld>
-    <p:spTree>
-      <p:nvGrpSpPr>
-        <p:cNvPr id="1" name=""/>
-        <p:cNvGrpSpPr/>
-        <p:nvPr/>
-      </p:nvGrpSpPr>
-      <p:grpSpPr>
-        <a:xfrm>
-          <a:off x="0" y="0"/>
-          <a:ext cx="0" cy="0"/>
-          <a:chOff x="0" y="0"/>
-          <a:chExt cx="0" cy="0"/>
-        </a:xfrm>
-      </p:grpSpPr>
-      <p:sp>
-        <p:nvSpPr>
-          <p:cNvPr id="2" name="Title 1"/>
-          <p:cNvSpPr>
-            <a:spLocks noGrp="1"/>
-          </p:cNvSpPr>
-          <p:nvPr>
-            <p:ph type="title"/>
-          </p:nvPr>
-        </p:nvSpPr>
-        <p:spPr/>
-        <p:txBody>
-          <a:bodyPr/>
-          <a:lstStyle/>
-          <a:p>
-            <a:r>
-              <a:rPr lang="en-US" dirty="0"/>
-              <a:t>Log Monitoring</a:t>
-            </a:r>
-          </a:p>
-        </p:txBody>
-      </p:sp>
-      <p:sp>
-        <p:nvSpPr>
-          <p:cNvPr id="3" name="Content Placeholder 2"/>
-          <p:cNvSpPr>
-            <a:spLocks noGrp="1"/>
-          </p:cNvSpPr>
-          <p:nvPr>
-            <p:ph idx="1"/>
-          </p:nvPr>
-        </p:nvSpPr>
-        <p:spPr/>
-        <p:txBody>
-          <a:bodyPr>
-            <a:normAutofit/>
-          </a:bodyPr>
-          <a:lstStyle/>
-          <a:p>
-            <a:pPr marL="571500" indent="-571500">
-              <a:buFont typeface="Arial" panose="020B0604020202020204" pitchFamily="34" charset="0"/>
-              <a:buChar char="•"/>
-            </a:pPr>
-            <a:r>
-              <a:rPr lang="en-US" sz="3200" dirty="0"/>
-              <a:t>Watch your VLF count</a:t>
-            </a:r>
-          </a:p>
-          <a:p>
-            <a:pPr marL="571500" indent="-571500">
-              <a:buFont typeface="Arial" panose="020B0604020202020204" pitchFamily="34" charset="0"/>
-              <a:buChar char="•"/>
-            </a:pPr>
-            <a:r>
-              <a:rPr lang="en-US" sz="3200" dirty="0"/>
-              <a:t>Monitor log size over time</a:t>
-            </a:r>
-          </a:p>
-          <a:p>
-            <a:pPr marL="571500" indent="-571500">
-              <a:buFont typeface="Arial" panose="020B0604020202020204" pitchFamily="34" charset="0"/>
-              <a:buChar char="•"/>
-            </a:pPr>
-            <a:r>
-              <a:rPr lang="en-US" sz="3200" dirty="0"/>
-              <a:t>Set SQL Alerts on:</a:t>
-            </a:r>
-          </a:p>
-          <a:p>
-            <a:pPr marL="1033227" lvl="1" indent="-457200">
-              <a:buFont typeface="Arial" panose="020B0604020202020204" pitchFamily="34" charset="0"/>
-              <a:buChar char="•"/>
-            </a:pPr>
-            <a:r>
-              <a:rPr lang="en-US" sz="2800" dirty="0"/>
-              <a:t>Severity 17 errors (will alert on log full)</a:t>
-            </a:r>
-          </a:p>
-          <a:p>
-            <a:pPr marL="1033227" lvl="1" indent="-457200">
-              <a:buFont typeface="Arial" panose="020B0604020202020204" pitchFamily="34" charset="0"/>
-              <a:buChar char="•"/>
-            </a:pPr>
-            <a:r>
-              <a:rPr lang="en-US" sz="2800" dirty="0"/>
-              <a:t>Error 5145</a:t>
-            </a:r>
-          </a:p>
-          <a:p>
-            <a:pPr lvl="2"/>
-            <a:r>
-              <a:rPr lang="en-US" sz="2000" b="1" dirty="0" err="1">
-                <a:solidFill>
-                  <a:srgbClr val="FF0000"/>
-                </a:solidFill>
-                <a:latin typeface="Courier New" panose="02070309020205020404" pitchFamily="49" charset="0"/>
-                <a:cs typeface="Courier New" panose="02070309020205020404" pitchFamily="49" charset="0"/>
-              </a:rPr>
-              <a:t>Autogrow</a:t>
-            </a:r>
-            <a:r>
-              <a:rPr lang="en-US" sz="2000" b="1" dirty="0">
-                <a:solidFill>
-                  <a:srgbClr val="FF0000"/>
-                </a:solidFill>
-                <a:latin typeface="Courier New" panose="02070309020205020404" pitchFamily="49" charset="0"/>
-                <a:cs typeface="Courier New" panose="02070309020205020404" pitchFamily="49" charset="0"/>
-              </a:rPr>
-              <a:t> of file '…' in database '…' was cancelled by user or timed out after xx milliseconds.</a:t>
-            </a:r>
-          </a:p>
-          <a:p>
-            <a:pPr marL="1033227" lvl="1" indent="-457200">
-              <a:buFont typeface="Arial" panose="020B0604020202020204" pitchFamily="34" charset="0"/>
-              <a:buChar char="•"/>
-            </a:pPr>
-            <a:r>
-              <a:rPr lang="en-US" sz="2800" dirty="0"/>
-              <a:t>Error 5144</a:t>
-            </a:r>
-          </a:p>
-          <a:p>
-            <a:pPr lvl="2"/>
-            <a:r>
-              <a:rPr lang="en-US" sz="2000" b="1" dirty="0" err="1">
-                <a:solidFill>
-                  <a:srgbClr val="FF0000"/>
-                </a:solidFill>
-                <a:latin typeface="Courier New" panose="02070309020205020404" pitchFamily="49" charset="0"/>
-                <a:cs typeface="Courier New" panose="02070309020205020404" pitchFamily="49" charset="0"/>
-              </a:rPr>
-              <a:t>Autogrow</a:t>
-            </a:r>
-            <a:r>
-              <a:rPr lang="en-US" sz="2000" b="1" dirty="0">
-                <a:solidFill>
-                  <a:srgbClr val="FF0000"/>
-                </a:solidFill>
-                <a:latin typeface="Courier New" panose="02070309020205020404" pitchFamily="49" charset="0"/>
-                <a:cs typeface="Courier New" panose="02070309020205020404" pitchFamily="49" charset="0"/>
-              </a:rPr>
-              <a:t> of file </a:t>
-            </a:r>
-            <a:r>
-              <a:rPr lang="en-US" sz="2000" dirty="0">
-                <a:solidFill>
-                  <a:srgbClr val="FF0000"/>
-                </a:solidFill>
-              </a:rPr>
-              <a:t>'</a:t>
-            </a:r>
-            <a:r>
-              <a:rPr lang="en-US" sz="2000" b="1" dirty="0">
-                <a:solidFill>
-                  <a:srgbClr val="FF0000"/>
-                </a:solidFill>
-                <a:latin typeface="Courier New" panose="02070309020205020404" pitchFamily="49" charset="0"/>
-                <a:cs typeface="Courier New" panose="02070309020205020404" pitchFamily="49" charset="0"/>
-              </a:rPr>
-              <a:t>…</a:t>
-            </a:r>
-            <a:r>
-              <a:rPr lang="en-US" sz="2000" dirty="0">
-                <a:solidFill>
-                  <a:srgbClr val="FF0000"/>
-                </a:solidFill>
-              </a:rPr>
-              <a:t>'</a:t>
-            </a:r>
-            <a:r>
-              <a:rPr lang="en-US" sz="2000" b="1" dirty="0">
-                <a:solidFill>
-                  <a:srgbClr val="FF0000"/>
-                </a:solidFill>
-                <a:latin typeface="Courier New" panose="02070309020205020404" pitchFamily="49" charset="0"/>
-                <a:cs typeface="Courier New" panose="02070309020205020404" pitchFamily="49" charset="0"/>
-              </a:rPr>
-              <a:t> in database </a:t>
-            </a:r>
-            <a:r>
-              <a:rPr lang="en-US" sz="2000" dirty="0">
-                <a:solidFill>
-                  <a:srgbClr val="FF0000"/>
-                </a:solidFill>
-              </a:rPr>
-              <a:t>'</a:t>
-            </a:r>
-            <a:r>
-              <a:rPr lang="en-US" sz="2000" b="1" dirty="0">
-                <a:solidFill>
-                  <a:srgbClr val="FF0000"/>
-                </a:solidFill>
-                <a:latin typeface="Courier New" panose="02070309020205020404" pitchFamily="49" charset="0"/>
-                <a:cs typeface="Courier New" panose="02070309020205020404" pitchFamily="49" charset="0"/>
-              </a:rPr>
-              <a:t>…</a:t>
-            </a:r>
-            <a:r>
-              <a:rPr lang="en-US" sz="2000" dirty="0">
-                <a:solidFill>
-                  <a:srgbClr val="FF0000"/>
-                </a:solidFill>
-              </a:rPr>
-              <a:t>'</a:t>
-            </a:r>
-            <a:r>
-              <a:rPr lang="en-US" sz="2000" b="1" dirty="0">
-                <a:solidFill>
-                  <a:srgbClr val="FF0000"/>
-                </a:solidFill>
-                <a:latin typeface="Courier New" panose="02070309020205020404" pitchFamily="49" charset="0"/>
-                <a:cs typeface="Courier New" panose="02070309020205020404" pitchFamily="49" charset="0"/>
-              </a:rPr>
-              <a:t> took xx milliseconds.</a:t>
-            </a:r>
-          </a:p>
-        </p:txBody>
-      </p:sp>
-    </p:spTree>
-    <p:extLst>
-      <p:ext uri="{BB962C8B-B14F-4D97-AF65-F5344CB8AC3E}">
-        <p14:creationId xmlns:p14="http://schemas.microsoft.com/office/powerpoint/2010/main" val="2965217731"/>
-      </p:ext>
-    </p:extLst>
-  </p:cSld>
-  <p:clrMapOvr>
-    <a:masterClrMapping/>
-  </p:clrMapOvr>
-</p:sld>
-</file>
-
 <file path=ppt/slides/slide52.xml><?xml version="1.0" encoding="utf-8"?>
 <p:sld xmlns:a="http://schemas.openxmlformats.org/drawingml/2006/main" xmlns:r="http://schemas.openxmlformats.org/officeDocument/2006/relationships" xmlns:p="http://schemas.openxmlformats.org/presentationml/2006/main">
   <p:cSld>
@@ -10439,6 +10581,254 @@
           <a:p>
             <a:r>
               <a:rPr lang="en-US" dirty="0"/>
+              <a:t>Log Monitoring</a:t>
+            </a:r>
+          </a:p>
+        </p:txBody>
+      </p:sp>
+      <p:sp>
+        <p:nvSpPr>
+          <p:cNvPr id="3" name="Content Placeholder 2"/>
+          <p:cNvSpPr>
+            <a:spLocks noGrp="1"/>
+          </p:cNvSpPr>
+          <p:nvPr>
+            <p:ph idx="1"/>
+          </p:nvPr>
+        </p:nvSpPr>
+        <p:spPr/>
+        <p:txBody>
+          <a:bodyPr>
+            <a:normAutofit/>
+          </a:bodyPr>
+          <a:lstStyle/>
+          <a:p>
+            <a:pPr marL="571500" indent="-571500">
+              <a:buFont typeface="Arial" panose="020B0604020202020204" pitchFamily="34" charset="0"/>
+              <a:buChar char="•"/>
+            </a:pPr>
+            <a:r>
+              <a:rPr lang="en-US" sz="3200" dirty="0"/>
+              <a:t>Watch your VLF count</a:t>
+            </a:r>
+          </a:p>
+          <a:p>
+            <a:pPr marL="571500" indent="-571500">
+              <a:buFont typeface="Arial" panose="020B0604020202020204" pitchFamily="34" charset="0"/>
+              <a:buChar char="•"/>
+            </a:pPr>
+            <a:r>
+              <a:rPr lang="en-US" sz="3200" dirty="0"/>
+              <a:t>Monitor log size over time</a:t>
+            </a:r>
+          </a:p>
+          <a:p>
+            <a:pPr marL="571500" indent="-571500">
+              <a:buFont typeface="Arial" panose="020B0604020202020204" pitchFamily="34" charset="0"/>
+              <a:buChar char="•"/>
+            </a:pPr>
+            <a:r>
+              <a:rPr lang="en-US" sz="3200" dirty="0"/>
+              <a:t>Set SQL Alerts on:</a:t>
+            </a:r>
+          </a:p>
+          <a:p>
+            <a:pPr marL="1033227" lvl="1" indent="-457200">
+              <a:buFont typeface="Arial" panose="020B0604020202020204" pitchFamily="34" charset="0"/>
+              <a:buChar char="•"/>
+            </a:pPr>
+            <a:r>
+              <a:rPr lang="en-US" sz="2800" dirty="0"/>
+              <a:t>Severity 17 errors (will alert on log full)</a:t>
+            </a:r>
+          </a:p>
+          <a:p>
+            <a:pPr marL="1033227" lvl="1" indent="-457200">
+              <a:buFont typeface="Arial" panose="020B0604020202020204" pitchFamily="34" charset="0"/>
+              <a:buChar char="•"/>
+            </a:pPr>
+            <a:r>
+              <a:rPr lang="en-US" sz="2800" dirty="0"/>
+              <a:t>Error 5145</a:t>
+            </a:r>
+          </a:p>
+          <a:p>
+            <a:pPr lvl="2"/>
+            <a:r>
+              <a:rPr lang="en-US" sz="2000" b="1" dirty="0" err="1">
+                <a:solidFill>
+                  <a:srgbClr val="FF0000"/>
+                </a:solidFill>
+                <a:latin typeface="Courier New" panose="02070309020205020404" pitchFamily="49" charset="0"/>
+                <a:cs typeface="Courier New" panose="02070309020205020404" pitchFamily="49" charset="0"/>
+              </a:rPr>
+              <a:t>Autogrow</a:t>
+            </a:r>
+            <a:r>
+              <a:rPr lang="en-US" sz="2000" b="1" dirty="0">
+                <a:solidFill>
+                  <a:srgbClr val="FF0000"/>
+                </a:solidFill>
+                <a:latin typeface="Courier New" panose="02070309020205020404" pitchFamily="49" charset="0"/>
+                <a:cs typeface="Courier New" panose="02070309020205020404" pitchFamily="49" charset="0"/>
+              </a:rPr>
+              <a:t> of file '…' in database '…' was cancelled by user or timed out after xx milliseconds.</a:t>
+            </a:r>
+          </a:p>
+          <a:p>
+            <a:pPr marL="1033227" lvl="1" indent="-457200">
+              <a:buFont typeface="Arial" panose="020B0604020202020204" pitchFamily="34" charset="0"/>
+              <a:buChar char="•"/>
+            </a:pPr>
+            <a:r>
+              <a:rPr lang="en-US" sz="2800" dirty="0"/>
+              <a:t>Error 5144</a:t>
+            </a:r>
+          </a:p>
+          <a:p>
+            <a:pPr lvl="2"/>
+            <a:r>
+              <a:rPr lang="en-US" sz="2000" b="1" dirty="0" err="1">
+                <a:solidFill>
+                  <a:srgbClr val="FF0000"/>
+                </a:solidFill>
+                <a:latin typeface="Courier New" panose="02070309020205020404" pitchFamily="49" charset="0"/>
+                <a:cs typeface="Courier New" panose="02070309020205020404" pitchFamily="49" charset="0"/>
+              </a:rPr>
+              <a:t>Autogrow</a:t>
+            </a:r>
+            <a:r>
+              <a:rPr lang="en-US" sz="2000" b="1" dirty="0">
+                <a:solidFill>
+                  <a:srgbClr val="FF0000"/>
+                </a:solidFill>
+                <a:latin typeface="Courier New" panose="02070309020205020404" pitchFamily="49" charset="0"/>
+                <a:cs typeface="Courier New" panose="02070309020205020404" pitchFamily="49" charset="0"/>
+              </a:rPr>
+              <a:t> of file </a:t>
+            </a:r>
+            <a:r>
+              <a:rPr lang="en-US" sz="2000" dirty="0">
+                <a:solidFill>
+                  <a:srgbClr val="FF0000"/>
+                </a:solidFill>
+              </a:rPr>
+              <a:t>'</a:t>
+            </a:r>
+            <a:r>
+              <a:rPr lang="en-US" sz="2000" b="1" dirty="0">
+                <a:solidFill>
+                  <a:srgbClr val="FF0000"/>
+                </a:solidFill>
+                <a:latin typeface="Courier New" panose="02070309020205020404" pitchFamily="49" charset="0"/>
+                <a:cs typeface="Courier New" panose="02070309020205020404" pitchFamily="49" charset="0"/>
+              </a:rPr>
+              <a:t>…</a:t>
+            </a:r>
+            <a:r>
+              <a:rPr lang="en-US" sz="2000" dirty="0">
+                <a:solidFill>
+                  <a:srgbClr val="FF0000"/>
+                </a:solidFill>
+              </a:rPr>
+              <a:t>'</a:t>
+            </a:r>
+            <a:r>
+              <a:rPr lang="en-US" sz="2000" b="1" dirty="0">
+                <a:solidFill>
+                  <a:srgbClr val="FF0000"/>
+                </a:solidFill>
+                <a:latin typeface="Courier New" panose="02070309020205020404" pitchFamily="49" charset="0"/>
+                <a:cs typeface="Courier New" panose="02070309020205020404" pitchFamily="49" charset="0"/>
+              </a:rPr>
+              <a:t> in database </a:t>
+            </a:r>
+            <a:r>
+              <a:rPr lang="en-US" sz="2000" dirty="0">
+                <a:solidFill>
+                  <a:srgbClr val="FF0000"/>
+                </a:solidFill>
+              </a:rPr>
+              <a:t>'</a:t>
+            </a:r>
+            <a:r>
+              <a:rPr lang="en-US" sz="2000" b="1" dirty="0">
+                <a:solidFill>
+                  <a:srgbClr val="FF0000"/>
+                </a:solidFill>
+                <a:latin typeface="Courier New" panose="02070309020205020404" pitchFamily="49" charset="0"/>
+                <a:cs typeface="Courier New" panose="02070309020205020404" pitchFamily="49" charset="0"/>
+              </a:rPr>
+              <a:t>…</a:t>
+            </a:r>
+            <a:r>
+              <a:rPr lang="en-US" sz="2000" dirty="0">
+                <a:solidFill>
+                  <a:srgbClr val="FF0000"/>
+                </a:solidFill>
+              </a:rPr>
+              <a:t>'</a:t>
+            </a:r>
+            <a:r>
+              <a:rPr lang="en-US" sz="2000" b="1" dirty="0">
+                <a:solidFill>
+                  <a:srgbClr val="FF0000"/>
+                </a:solidFill>
+                <a:latin typeface="Courier New" panose="02070309020205020404" pitchFamily="49" charset="0"/>
+                <a:cs typeface="Courier New" panose="02070309020205020404" pitchFamily="49" charset="0"/>
+              </a:rPr>
+              <a:t> took xx milliseconds.</a:t>
+            </a:r>
+          </a:p>
+        </p:txBody>
+      </p:sp>
+    </p:spTree>
+    <p:extLst>
+      <p:ext uri="{BB962C8B-B14F-4D97-AF65-F5344CB8AC3E}">
+        <p14:creationId xmlns:p14="http://schemas.microsoft.com/office/powerpoint/2010/main" val="2965217731"/>
+      </p:ext>
+    </p:extLst>
+  </p:cSld>
+  <p:clrMapOvr>
+    <a:masterClrMapping/>
+  </p:clrMapOvr>
+</p:sld>
+</file>
+
+<file path=ppt/slides/slide53.xml><?xml version="1.0" encoding="utf-8"?>
+<p:sld xmlns:a="http://schemas.openxmlformats.org/drawingml/2006/main" xmlns:r="http://schemas.openxmlformats.org/officeDocument/2006/relationships" xmlns:p="http://schemas.openxmlformats.org/presentationml/2006/main">
+  <p:cSld>
+    <p:spTree>
+      <p:nvGrpSpPr>
+        <p:cNvPr id="1" name=""/>
+        <p:cNvGrpSpPr/>
+        <p:nvPr/>
+      </p:nvGrpSpPr>
+      <p:grpSpPr>
+        <a:xfrm>
+          <a:off x="0" y="0"/>
+          <a:ext cx="0" cy="0"/>
+          <a:chOff x="0" y="0"/>
+          <a:chExt cx="0" cy="0"/>
+        </a:xfrm>
+      </p:grpSpPr>
+      <p:sp>
+        <p:nvSpPr>
+          <p:cNvPr id="2" name="Title 1"/>
+          <p:cNvSpPr>
+            <a:spLocks noGrp="1"/>
+          </p:cNvSpPr>
+          <p:nvPr>
+            <p:ph type="title"/>
+          </p:nvPr>
+        </p:nvSpPr>
+        <p:spPr/>
+        <p:txBody>
+          <a:bodyPr/>
+          <a:lstStyle/>
+          <a:p>
+            <a:r>
+              <a:rPr lang="en-US" dirty="0"/>
               <a:t>Log Monitoring, continued</a:t>
             </a:r>
           </a:p>
@@ -11076,7 +11466,7 @@
             <a:fld id="{87FD5303-69AD-2E4D-B18B-E5EED0F0A60B}" type="slidenum">
               <a:rPr lang="en-US" smtClean="0"/>
               <a:pPr/>
-              <a:t>52</a:t>
+              <a:t>53</a:t>
             </a:fld>
             <a:r>
               <a:rPr lang="en-US"/>
@@ -11099,7 +11489,7 @@
 </p:sld>
 </file>
 
-<file path=ppt/slides/slide53.xml><?xml version="1.0" encoding="utf-8"?>
+<file path=ppt/slides/slide54.xml><?xml version="1.0" encoding="utf-8"?>
 <p:sld xmlns:a="http://schemas.openxmlformats.org/drawingml/2006/main" xmlns:r="http://schemas.openxmlformats.org/officeDocument/2006/relationships" xmlns:p="http://schemas.openxmlformats.org/presentationml/2006/main">
   <p:cSld>
     <p:spTree>

</xml_diff>

<commit_message>
Added reference to Tiger Team VLF script.
</commit_message>
<xml_diff>
--- a/TransactionLog.pptx
+++ b/TransactionLog.pptx
@@ -5,7 +5,7 @@
     <p:sldMasterId id="2147483648" r:id="rId1"/>
   </p:sldMasterIdLst>
   <p:notesMasterIdLst>
-    <p:notesMasterId r:id="rId56"/>
+    <p:notesMasterId r:id="rId57"/>
   </p:notesMasterIdLst>
   <p:sldIdLst>
     <p:sldId id="309" r:id="rId2"/>
@@ -59,9 +59,10 @@
     <p:sldId id="303" r:id="rId50"/>
     <p:sldId id="304" r:id="rId51"/>
     <p:sldId id="305" r:id="rId52"/>
-    <p:sldId id="306" r:id="rId53"/>
-    <p:sldId id="307" r:id="rId54"/>
-    <p:sldId id="308" r:id="rId55"/>
+    <p:sldId id="311" r:id="rId53"/>
+    <p:sldId id="306" r:id="rId54"/>
+    <p:sldId id="307" r:id="rId55"/>
+    <p:sldId id="308" r:id="rId56"/>
   </p:sldIdLst>
   <p:sldSz cx="11520488" cy="6480175"/>
   <p:notesSz cx="6858000" cy="9144000"/>
@@ -265,7 +266,7 @@
           <a:p>
             <a:fld id="{18BF2EA9-CFC8-45FA-BD4C-CF2CA22F3AA1}" type="datetimeFigureOut">
               <a:rPr lang="en-US" smtClean="0"/>
-              <a:t>05/15/2018</a:t>
+              <a:t>07/25/2018</a:t>
             </a:fld>
             <a:endParaRPr lang="en-US"/>
           </a:p>
@@ -1996,7 +1997,7 @@
           <a:graphicData uri="http://schemas.openxmlformats.org/presentationml/2006/ole">
             <mc:AlternateContent xmlns:mc="http://schemas.openxmlformats.org/markup-compatibility/2006">
               <mc:Choice xmlns:v="urn:schemas-microsoft-com:vml" Requires="v">
-                <p:oleObj spid="_x0000_s1044" name="Image" r:id="rId10" imgW="2279520" imgH="1310400" progId="Photoshop.Image.18">
+                <p:oleObj spid="_x0000_s1045" name="Image" r:id="rId10" imgW="2279520" imgH="1310400" progId="Photoshop.Image.18">
                   <p:embed/>
                 </p:oleObj>
               </mc:Choice>
@@ -2374,7 +2375,7 @@
           <p:cNvPr id="2" name="Title 1">
             <a:extLst>
               <a:ext uri="{FF2B5EF4-FFF2-40B4-BE49-F238E27FC236}">
-                <a16:creationId xmlns:a16="http://schemas.microsoft.com/office/drawing/2014/main" xmlns="" id="{83E7BC17-A4CB-4C5C-8189-2BD06BE3E485}"/>
+                <a16:creationId xmlns="" xmlns:a16="http://schemas.microsoft.com/office/drawing/2014/main" id="{83E7BC17-A4CB-4C5C-8189-2BD06BE3E485}"/>
               </a:ext>
             </a:extLst>
           </p:cNvPr>
@@ -2436,7 +2437,7 @@
           <p:cNvPr id="3" name="Text Placeholder 2">
             <a:extLst>
               <a:ext uri="{FF2B5EF4-FFF2-40B4-BE49-F238E27FC236}">
-                <a16:creationId xmlns:a16="http://schemas.microsoft.com/office/drawing/2014/main" xmlns="" id="{580DE922-DD41-46E4-A789-EAF96778ABA6}"/>
+                <a16:creationId xmlns="" xmlns:a16="http://schemas.microsoft.com/office/drawing/2014/main" id="{580DE922-DD41-46E4-A789-EAF96778ABA6}"/>
               </a:ext>
             </a:extLst>
           </p:cNvPr>
@@ -2464,7 +2465,7 @@
           <p:cNvPr id="5" name="TextBox 4">
             <a:extLst>
               <a:ext uri="{FF2B5EF4-FFF2-40B4-BE49-F238E27FC236}">
-                <a16:creationId xmlns:a16="http://schemas.microsoft.com/office/drawing/2014/main" xmlns="" id="{13C0FC99-58B7-4BAC-A4C4-1F44433F31BD}"/>
+                <a16:creationId xmlns="" xmlns:a16="http://schemas.microsoft.com/office/drawing/2014/main" id="{13C0FC99-58B7-4BAC-A4C4-1F44433F31BD}"/>
               </a:ext>
             </a:extLst>
           </p:cNvPr>
@@ -5314,21 +5315,21 @@
                 <a:gridCol w="4304521">
                   <a:extLst>
                     <a:ext uri="{9D8B030D-6E8A-4147-A177-3AD203B41FA5}">
-                      <a16:colId xmlns:a16="http://schemas.microsoft.com/office/drawing/2014/main" xmlns="" val="20000"/>
+                      <a16:colId xmlns="" xmlns:a16="http://schemas.microsoft.com/office/drawing/2014/main" val="20000"/>
                     </a:ext>
                   </a:extLst>
                 </a:gridCol>
                 <a:gridCol w="3525078">
                   <a:extLst>
                     <a:ext uri="{9D8B030D-6E8A-4147-A177-3AD203B41FA5}">
-                      <a16:colId xmlns:a16="http://schemas.microsoft.com/office/drawing/2014/main" xmlns="" val="20001"/>
+                      <a16:colId xmlns="" xmlns:a16="http://schemas.microsoft.com/office/drawing/2014/main" val="20001"/>
                     </a:ext>
                   </a:extLst>
                 </a:gridCol>
                 <a:gridCol w="2970400">
                   <a:extLst>
                     <a:ext uri="{9D8B030D-6E8A-4147-A177-3AD203B41FA5}">
-                      <a16:colId xmlns:a16="http://schemas.microsoft.com/office/drawing/2014/main" xmlns="" val="20002"/>
+                      <a16:colId xmlns="" xmlns:a16="http://schemas.microsoft.com/office/drawing/2014/main" val="20002"/>
                     </a:ext>
                   </a:extLst>
                 </a:gridCol>
@@ -5375,7 +5376,7 @@
                 </a:tc>
                 <a:extLst>
                   <a:ext uri="{0D108BD9-81ED-4DB2-BD59-A6C34878D82A}">
-                    <a16:rowId xmlns:a16="http://schemas.microsoft.com/office/drawing/2014/main" xmlns="" val="10000"/>
+                    <a16:rowId xmlns="" xmlns:a16="http://schemas.microsoft.com/office/drawing/2014/main" val="10000"/>
                   </a:ext>
                 </a:extLst>
               </a:tr>
@@ -5438,7 +5439,7 @@
                 </a:tc>
                 <a:extLst>
                   <a:ext uri="{0D108BD9-81ED-4DB2-BD59-A6C34878D82A}">
-                    <a16:rowId xmlns:a16="http://schemas.microsoft.com/office/drawing/2014/main" xmlns="" val="10001"/>
+                    <a16:rowId xmlns="" xmlns:a16="http://schemas.microsoft.com/office/drawing/2014/main" val="10001"/>
                   </a:ext>
                 </a:extLst>
               </a:tr>
@@ -5509,7 +5510,7 @@
                 </a:tc>
                 <a:extLst>
                   <a:ext uri="{0D108BD9-81ED-4DB2-BD59-A6C34878D82A}">
-                    <a16:rowId xmlns:a16="http://schemas.microsoft.com/office/drawing/2014/main" xmlns="" val="10002"/>
+                    <a16:rowId xmlns="" xmlns:a16="http://schemas.microsoft.com/office/drawing/2014/main" val="10002"/>
                   </a:ext>
                 </a:extLst>
               </a:tr>
@@ -5555,7 +5556,7 @@
                 </a:tc>
                 <a:extLst>
                   <a:ext uri="{0D108BD9-81ED-4DB2-BD59-A6C34878D82A}">
-                    <a16:rowId xmlns:a16="http://schemas.microsoft.com/office/drawing/2014/main" xmlns="" val="10003"/>
+                    <a16:rowId xmlns="" xmlns:a16="http://schemas.microsoft.com/office/drawing/2014/main" val="10003"/>
                   </a:ext>
                 </a:extLst>
               </a:tr>
@@ -5606,7 +5607,7 @@
                 </a:tc>
                 <a:extLst>
                   <a:ext uri="{0D108BD9-81ED-4DB2-BD59-A6C34878D82A}">
-                    <a16:rowId xmlns:a16="http://schemas.microsoft.com/office/drawing/2014/main" xmlns="" val="3543017676"/>
+                    <a16:rowId xmlns="" xmlns:a16="http://schemas.microsoft.com/office/drawing/2014/main" val="3543017676"/>
                   </a:ext>
                 </a:extLst>
               </a:tr>
@@ -7363,11 +7364,11 @@
   <p:clrMapOvr>
     <a:masterClrMapping/>
   </p:clrMapOvr>
-  <mc:AlternateContent xmlns:mc="http://schemas.openxmlformats.org/markup-compatibility/2006">
-    <mc:Choice xmlns:p14="http://schemas.microsoft.com/office/powerpoint/2010/main" Requires="p14">
+  <mc:AlternateContent xmlns:mc="http://schemas.openxmlformats.org/markup-compatibility/2006" xmlns:p14="http://schemas.microsoft.com/office/powerpoint/2010/main">
+    <mc:Choice Requires="p14">
       <p:transition spd="slow" p14:dur="2000"/>
     </mc:Choice>
-    <mc:Fallback>
+    <mc:Fallback xmlns="">
       <p:transition spd="slow"/>
     </mc:Fallback>
   </mc:AlternateContent>
@@ -9651,14 +9652,14 @@
                 <a:gridCol w="3034700">
                   <a:extLst>
                     <a:ext uri="{9D8B030D-6E8A-4147-A177-3AD203B41FA5}">
-                      <a16:colId xmlns:a16="http://schemas.microsoft.com/office/drawing/2014/main" xmlns="" val="20000"/>
+                      <a16:colId xmlns="" xmlns:a16="http://schemas.microsoft.com/office/drawing/2014/main" val="20000"/>
                     </a:ext>
                   </a:extLst>
                 </a:gridCol>
                 <a:gridCol w="3034700">
                   <a:extLst>
                     <a:ext uri="{9D8B030D-6E8A-4147-A177-3AD203B41FA5}">
-                      <a16:colId xmlns:a16="http://schemas.microsoft.com/office/drawing/2014/main" xmlns="" val="20001"/>
+                      <a16:colId xmlns="" xmlns:a16="http://schemas.microsoft.com/office/drawing/2014/main" val="20001"/>
                     </a:ext>
                   </a:extLst>
                 </a:gridCol>
@@ -9704,7 +9705,7 @@
                 </a:tc>
                 <a:extLst>
                   <a:ext uri="{0D108BD9-81ED-4DB2-BD59-A6C34878D82A}">
-                    <a16:rowId xmlns:a16="http://schemas.microsoft.com/office/drawing/2014/main" xmlns="" val="10000"/>
+                    <a16:rowId xmlns="" xmlns:a16="http://schemas.microsoft.com/office/drawing/2014/main" val="10000"/>
                   </a:ext>
                 </a:extLst>
               </a:tr>
@@ -9739,7 +9740,7 @@
                 </a:tc>
                 <a:extLst>
                   <a:ext uri="{0D108BD9-81ED-4DB2-BD59-A6C34878D82A}">
-                    <a16:rowId xmlns:a16="http://schemas.microsoft.com/office/drawing/2014/main" xmlns="" val="10001"/>
+                    <a16:rowId xmlns="" xmlns:a16="http://schemas.microsoft.com/office/drawing/2014/main" val="10001"/>
                   </a:ext>
                 </a:extLst>
               </a:tr>
@@ -9774,7 +9775,7 @@
                 </a:tc>
                 <a:extLst>
                   <a:ext uri="{0D108BD9-81ED-4DB2-BD59-A6C34878D82A}">
-                    <a16:rowId xmlns:a16="http://schemas.microsoft.com/office/drawing/2014/main" xmlns="" val="10002"/>
+                    <a16:rowId xmlns="" xmlns:a16="http://schemas.microsoft.com/office/drawing/2014/main" val="10002"/>
                   </a:ext>
                 </a:extLst>
               </a:tr>
@@ -9814,7 +9815,7 @@
                 </a:tc>
                 <a:extLst>
                   <a:ext uri="{0D108BD9-81ED-4DB2-BD59-A6C34878D82A}">
-                    <a16:rowId xmlns:a16="http://schemas.microsoft.com/office/drawing/2014/main" xmlns="" val="10003"/>
+                    <a16:rowId xmlns="" xmlns:a16="http://schemas.microsoft.com/office/drawing/2014/main" val="10003"/>
                   </a:ext>
                 </a:extLst>
               </a:tr>
@@ -10580,9 +10581,10 @@
           <a:lstStyle/>
           <a:p>
             <a:r>
-              <a:rPr lang="en-US" dirty="0"/>
-              <a:t>Log Monitoring</a:t>
-            </a:r>
+              <a:rPr lang="en-US" dirty="0" smtClean="0"/>
+              <a:t>Controlling VLFs</a:t>
+            </a:r>
+            <a:endParaRPr lang="en-US" dirty="0"/>
           </a:p>
         </p:txBody>
       </p:sp>
@@ -10598,9 +10600,7 @@
         </p:nvSpPr>
         <p:spPr/>
         <p:txBody>
-          <a:bodyPr>
-            <a:normAutofit/>
-          </a:bodyPr>
+          <a:bodyPr/>
           <a:lstStyle/>
           <a:p>
             <a:pPr marL="571500" indent="-571500">
@@ -10608,184 +10608,52 @@
               <a:buChar char="•"/>
             </a:pPr>
             <a:r>
-              <a:rPr lang="en-US" sz="3200" dirty="0"/>
-              <a:t>Watch your VLF count</a:t>
-            </a:r>
-          </a:p>
-          <a:p>
-            <a:pPr marL="571500" indent="-571500">
-              <a:buFont typeface="Arial" panose="020B0604020202020204" pitchFamily="34" charset="0"/>
-              <a:buChar char="•"/>
-            </a:pPr>
-            <a:r>
-              <a:rPr lang="en-US" sz="3200" dirty="0"/>
-              <a:t>Monitor log size over time</a:t>
-            </a:r>
-          </a:p>
-          <a:p>
-            <a:pPr marL="571500" indent="-571500">
-              <a:buFont typeface="Arial" panose="020B0604020202020204" pitchFamily="34" charset="0"/>
-              <a:buChar char="•"/>
-            </a:pPr>
-            <a:r>
-              <a:rPr lang="en-US" sz="3200" dirty="0"/>
-              <a:t>Set SQL Alerts on:</a:t>
-            </a:r>
-          </a:p>
-          <a:p>
-            <a:pPr marL="1033227" lvl="1" indent="-457200">
-              <a:buFont typeface="Arial" panose="020B0604020202020204" pitchFamily="34" charset="0"/>
-              <a:buChar char="•"/>
-            </a:pPr>
-            <a:r>
-              <a:rPr lang="en-US" sz="2800" dirty="0"/>
-              <a:t>Severity 17 errors (will alert on log full)</a:t>
-            </a:r>
-          </a:p>
-          <a:p>
-            <a:pPr marL="1033227" lvl="1" indent="-457200">
-              <a:buFont typeface="Arial" panose="020B0604020202020204" pitchFamily="34" charset="0"/>
-              <a:buChar char="•"/>
-            </a:pPr>
-            <a:r>
-              <a:rPr lang="en-US" sz="2800" dirty="0"/>
-              <a:t>Error 5145</a:t>
-            </a:r>
-          </a:p>
-          <a:p>
-            <a:pPr lvl="2"/>
-            <a:r>
-              <a:rPr lang="en-US" sz="2000" b="1" dirty="0" err="1">
-                <a:solidFill>
-                  <a:srgbClr val="FF0000"/>
-                </a:solidFill>
-                <a:latin typeface="Courier New" panose="02070309020205020404" pitchFamily="49" charset="0"/>
-                <a:cs typeface="Courier New" panose="02070309020205020404" pitchFamily="49" charset="0"/>
+              <a:rPr lang="en-US" dirty="0" smtClean="0"/>
+              <a:t>See the MS Tiger Team solution</a:t>
+            </a:r>
+          </a:p>
+          <a:p>
+            <a:pPr marL="1147527" lvl="1" indent="-571500">
+              <a:buFont typeface="Arial" panose="020B0604020202020204" pitchFamily="34" charset="0"/>
+              <a:buChar char="•"/>
+            </a:pPr>
+            <a:r>
+              <a:rPr lang="en-US" dirty="0" smtClean="0"/>
+              <a:t>A bit of a hammer – it generates scripts for all databases on the instance</a:t>
+            </a:r>
+          </a:p>
+          <a:p>
+            <a:pPr marL="1147527" lvl="1" indent="-571500">
+              <a:buFont typeface="Arial" panose="020B0604020202020204" pitchFamily="34" charset="0"/>
+              <a:buChar char="•"/>
+            </a:pPr>
+            <a:r>
+              <a:rPr lang="en-US" dirty="0" smtClean="0"/>
+              <a:t>Review the generated script before running it</a:t>
+            </a:r>
+          </a:p>
+          <a:p>
+            <a:pPr marL="1147527" lvl="1" indent="-571500">
+              <a:buFont typeface="Arial" panose="020B0604020202020204" pitchFamily="34" charset="0"/>
+              <a:buChar char="•"/>
+            </a:pPr>
+            <a:endParaRPr lang="en-US" dirty="0"/>
+          </a:p>
+          <a:p>
+            <a:r>
+              <a:rPr lang="en-US" sz="2400" dirty="0">
+                <a:hlinkClick r:id="rId2"/>
               </a:rPr>
-              <a:t>Autogrow</a:t>
-            </a:r>
-            <a:r>
-              <a:rPr lang="en-US" sz="2000" b="1" dirty="0">
-                <a:solidFill>
-                  <a:srgbClr val="FF0000"/>
-                </a:solidFill>
-                <a:latin typeface="Courier New" panose="02070309020205020404" pitchFamily="49" charset="0"/>
-                <a:cs typeface="Courier New" panose="02070309020205020404" pitchFamily="49" charset="0"/>
-              </a:rPr>
-              <a:t> of file '…' in database '…' was cancelled by user or timed out after xx milliseconds.</a:t>
-            </a:r>
-          </a:p>
-          <a:p>
-            <a:pPr marL="1033227" lvl="1" indent="-457200">
-              <a:buFont typeface="Arial" panose="020B0604020202020204" pitchFamily="34" charset="0"/>
-              <a:buChar char="•"/>
-            </a:pPr>
-            <a:r>
-              <a:rPr lang="en-US" sz="2800" dirty="0"/>
-              <a:t>Error 5144</a:t>
-            </a:r>
-          </a:p>
-          <a:p>
-            <a:pPr lvl="2"/>
-            <a:r>
-              <a:rPr lang="en-US" sz="2000" b="1" dirty="0" err="1">
-                <a:solidFill>
-                  <a:srgbClr val="FF0000"/>
-                </a:solidFill>
-                <a:latin typeface="Courier New" panose="02070309020205020404" pitchFamily="49" charset="0"/>
-                <a:cs typeface="Courier New" panose="02070309020205020404" pitchFamily="49" charset="0"/>
-              </a:rPr>
-              <a:t>Autogrow</a:t>
-            </a:r>
-            <a:r>
-              <a:rPr lang="en-US" sz="2000" b="1" dirty="0">
-                <a:solidFill>
-                  <a:srgbClr val="FF0000"/>
-                </a:solidFill>
-                <a:latin typeface="Courier New" panose="02070309020205020404" pitchFamily="49" charset="0"/>
-                <a:cs typeface="Courier New" panose="02070309020205020404" pitchFamily="49" charset="0"/>
-              </a:rPr>
-              <a:t> of file </a:t>
-            </a:r>
-            <a:r>
-              <a:rPr lang="en-US" sz="2000" dirty="0">
-                <a:solidFill>
-                  <a:srgbClr val="FF0000"/>
-                </a:solidFill>
-              </a:rPr>
-              <a:t>'</a:t>
-            </a:r>
-            <a:r>
-              <a:rPr lang="en-US" sz="2000" b="1" dirty="0">
-                <a:solidFill>
-                  <a:srgbClr val="FF0000"/>
-                </a:solidFill>
-                <a:latin typeface="Courier New" panose="02070309020205020404" pitchFamily="49" charset="0"/>
-                <a:cs typeface="Courier New" panose="02070309020205020404" pitchFamily="49" charset="0"/>
-              </a:rPr>
-              <a:t>…</a:t>
-            </a:r>
-            <a:r>
-              <a:rPr lang="en-US" sz="2000" dirty="0">
-                <a:solidFill>
-                  <a:srgbClr val="FF0000"/>
-                </a:solidFill>
-              </a:rPr>
-              <a:t>'</a:t>
-            </a:r>
-            <a:r>
-              <a:rPr lang="en-US" sz="2000" b="1" dirty="0">
-                <a:solidFill>
-                  <a:srgbClr val="FF0000"/>
-                </a:solidFill>
-                <a:latin typeface="Courier New" panose="02070309020205020404" pitchFamily="49" charset="0"/>
-                <a:cs typeface="Courier New" panose="02070309020205020404" pitchFamily="49" charset="0"/>
-              </a:rPr>
-              <a:t> in database </a:t>
-            </a:r>
-            <a:r>
-              <a:rPr lang="en-US" sz="2000" dirty="0">
-                <a:solidFill>
-                  <a:srgbClr val="FF0000"/>
-                </a:solidFill>
-              </a:rPr>
-              <a:t>'</a:t>
-            </a:r>
-            <a:r>
-              <a:rPr lang="en-US" sz="2000" b="1" dirty="0">
-                <a:solidFill>
-                  <a:srgbClr val="FF0000"/>
-                </a:solidFill>
-                <a:latin typeface="Courier New" panose="02070309020205020404" pitchFamily="49" charset="0"/>
-                <a:cs typeface="Courier New" panose="02070309020205020404" pitchFamily="49" charset="0"/>
-              </a:rPr>
-              <a:t>…</a:t>
-            </a:r>
-            <a:r>
-              <a:rPr lang="en-US" sz="2000" dirty="0">
-                <a:solidFill>
-                  <a:srgbClr val="FF0000"/>
-                </a:solidFill>
-              </a:rPr>
-              <a:t>'</a:t>
-            </a:r>
-            <a:r>
-              <a:rPr lang="en-US" sz="2000" b="1" dirty="0">
-                <a:solidFill>
-                  <a:srgbClr val="FF0000"/>
-                </a:solidFill>
-                <a:latin typeface="Courier New" panose="02070309020205020404" pitchFamily="49" charset="0"/>
-                <a:cs typeface="Courier New" panose="02070309020205020404" pitchFamily="49" charset="0"/>
-              </a:rPr>
-              <a:t> took xx milliseconds.</a:t>
-            </a:r>
+              <a:t>https://github.com/Microsoft/tigertoolbox/tree/master/Fixing-VLFs</a:t>
+            </a:r>
+            <a:endParaRPr lang="en-US" sz="2400" dirty="0"/>
           </a:p>
         </p:txBody>
       </p:sp>
     </p:spTree>
     <p:extLst>
       <p:ext uri="{BB962C8B-B14F-4D97-AF65-F5344CB8AC3E}">
-        <p14:creationId xmlns:p14="http://schemas.microsoft.com/office/powerpoint/2010/main" val="2965217731"/>
+        <p14:creationId xmlns:p14="http://schemas.microsoft.com/office/powerpoint/2010/main" val="3027963439"/>
       </p:ext>
     </p:extLst>
   </p:cSld>
@@ -10829,6 +10697,254 @@
           <a:p>
             <a:r>
               <a:rPr lang="en-US" dirty="0"/>
+              <a:t>Log Monitoring</a:t>
+            </a:r>
+          </a:p>
+        </p:txBody>
+      </p:sp>
+      <p:sp>
+        <p:nvSpPr>
+          <p:cNvPr id="3" name="Content Placeholder 2"/>
+          <p:cNvSpPr>
+            <a:spLocks noGrp="1"/>
+          </p:cNvSpPr>
+          <p:nvPr>
+            <p:ph idx="1"/>
+          </p:nvPr>
+        </p:nvSpPr>
+        <p:spPr/>
+        <p:txBody>
+          <a:bodyPr>
+            <a:normAutofit/>
+          </a:bodyPr>
+          <a:lstStyle/>
+          <a:p>
+            <a:pPr marL="571500" indent="-571500">
+              <a:buFont typeface="Arial" panose="020B0604020202020204" pitchFamily="34" charset="0"/>
+              <a:buChar char="•"/>
+            </a:pPr>
+            <a:r>
+              <a:rPr lang="en-US" sz="3200" dirty="0"/>
+              <a:t>Watch your VLF count</a:t>
+            </a:r>
+          </a:p>
+          <a:p>
+            <a:pPr marL="571500" indent="-571500">
+              <a:buFont typeface="Arial" panose="020B0604020202020204" pitchFamily="34" charset="0"/>
+              <a:buChar char="•"/>
+            </a:pPr>
+            <a:r>
+              <a:rPr lang="en-US" sz="3200" dirty="0"/>
+              <a:t>Monitor log size over time</a:t>
+            </a:r>
+          </a:p>
+          <a:p>
+            <a:pPr marL="571500" indent="-571500">
+              <a:buFont typeface="Arial" panose="020B0604020202020204" pitchFamily="34" charset="0"/>
+              <a:buChar char="•"/>
+            </a:pPr>
+            <a:r>
+              <a:rPr lang="en-US" sz="3200" dirty="0"/>
+              <a:t>Set SQL Alerts on:</a:t>
+            </a:r>
+          </a:p>
+          <a:p>
+            <a:pPr marL="1033227" lvl="1" indent="-457200">
+              <a:buFont typeface="Arial" panose="020B0604020202020204" pitchFamily="34" charset="0"/>
+              <a:buChar char="•"/>
+            </a:pPr>
+            <a:r>
+              <a:rPr lang="en-US" sz="2800" dirty="0"/>
+              <a:t>Severity 17 errors (will alert on log full)</a:t>
+            </a:r>
+          </a:p>
+          <a:p>
+            <a:pPr marL="1033227" lvl="1" indent="-457200">
+              <a:buFont typeface="Arial" panose="020B0604020202020204" pitchFamily="34" charset="0"/>
+              <a:buChar char="•"/>
+            </a:pPr>
+            <a:r>
+              <a:rPr lang="en-US" sz="2800" dirty="0"/>
+              <a:t>Error 5145</a:t>
+            </a:r>
+          </a:p>
+          <a:p>
+            <a:pPr lvl="2"/>
+            <a:r>
+              <a:rPr lang="en-US" sz="2000" b="1" dirty="0" err="1">
+                <a:solidFill>
+                  <a:srgbClr val="FF0000"/>
+                </a:solidFill>
+                <a:latin typeface="Courier New" panose="02070309020205020404" pitchFamily="49" charset="0"/>
+                <a:cs typeface="Courier New" panose="02070309020205020404" pitchFamily="49" charset="0"/>
+              </a:rPr>
+              <a:t>Autogrow</a:t>
+            </a:r>
+            <a:r>
+              <a:rPr lang="en-US" sz="2000" b="1" dirty="0">
+                <a:solidFill>
+                  <a:srgbClr val="FF0000"/>
+                </a:solidFill>
+                <a:latin typeface="Courier New" panose="02070309020205020404" pitchFamily="49" charset="0"/>
+                <a:cs typeface="Courier New" panose="02070309020205020404" pitchFamily="49" charset="0"/>
+              </a:rPr>
+              <a:t> of file '…' in database '…' was cancelled by user or timed out after xx milliseconds.</a:t>
+            </a:r>
+          </a:p>
+          <a:p>
+            <a:pPr marL="1033227" lvl="1" indent="-457200">
+              <a:buFont typeface="Arial" panose="020B0604020202020204" pitchFamily="34" charset="0"/>
+              <a:buChar char="•"/>
+            </a:pPr>
+            <a:r>
+              <a:rPr lang="en-US" sz="2800" dirty="0"/>
+              <a:t>Error 5144</a:t>
+            </a:r>
+          </a:p>
+          <a:p>
+            <a:pPr lvl="2"/>
+            <a:r>
+              <a:rPr lang="en-US" sz="2000" b="1" dirty="0" err="1">
+                <a:solidFill>
+                  <a:srgbClr val="FF0000"/>
+                </a:solidFill>
+                <a:latin typeface="Courier New" panose="02070309020205020404" pitchFamily="49" charset="0"/>
+                <a:cs typeface="Courier New" panose="02070309020205020404" pitchFamily="49" charset="0"/>
+              </a:rPr>
+              <a:t>Autogrow</a:t>
+            </a:r>
+            <a:r>
+              <a:rPr lang="en-US" sz="2000" b="1" dirty="0">
+                <a:solidFill>
+                  <a:srgbClr val="FF0000"/>
+                </a:solidFill>
+                <a:latin typeface="Courier New" panose="02070309020205020404" pitchFamily="49" charset="0"/>
+                <a:cs typeface="Courier New" panose="02070309020205020404" pitchFamily="49" charset="0"/>
+              </a:rPr>
+              <a:t> of file </a:t>
+            </a:r>
+            <a:r>
+              <a:rPr lang="en-US" sz="2000" dirty="0">
+                <a:solidFill>
+                  <a:srgbClr val="FF0000"/>
+                </a:solidFill>
+              </a:rPr>
+              <a:t>'</a:t>
+            </a:r>
+            <a:r>
+              <a:rPr lang="en-US" sz="2000" b="1" dirty="0">
+                <a:solidFill>
+                  <a:srgbClr val="FF0000"/>
+                </a:solidFill>
+                <a:latin typeface="Courier New" panose="02070309020205020404" pitchFamily="49" charset="0"/>
+                <a:cs typeface="Courier New" panose="02070309020205020404" pitchFamily="49" charset="0"/>
+              </a:rPr>
+              <a:t>…</a:t>
+            </a:r>
+            <a:r>
+              <a:rPr lang="en-US" sz="2000" dirty="0">
+                <a:solidFill>
+                  <a:srgbClr val="FF0000"/>
+                </a:solidFill>
+              </a:rPr>
+              <a:t>'</a:t>
+            </a:r>
+            <a:r>
+              <a:rPr lang="en-US" sz="2000" b="1" dirty="0">
+                <a:solidFill>
+                  <a:srgbClr val="FF0000"/>
+                </a:solidFill>
+                <a:latin typeface="Courier New" panose="02070309020205020404" pitchFamily="49" charset="0"/>
+                <a:cs typeface="Courier New" panose="02070309020205020404" pitchFamily="49" charset="0"/>
+              </a:rPr>
+              <a:t> in database </a:t>
+            </a:r>
+            <a:r>
+              <a:rPr lang="en-US" sz="2000" dirty="0">
+                <a:solidFill>
+                  <a:srgbClr val="FF0000"/>
+                </a:solidFill>
+              </a:rPr>
+              <a:t>'</a:t>
+            </a:r>
+            <a:r>
+              <a:rPr lang="en-US" sz="2000" b="1" dirty="0">
+                <a:solidFill>
+                  <a:srgbClr val="FF0000"/>
+                </a:solidFill>
+                <a:latin typeface="Courier New" panose="02070309020205020404" pitchFamily="49" charset="0"/>
+                <a:cs typeface="Courier New" panose="02070309020205020404" pitchFamily="49" charset="0"/>
+              </a:rPr>
+              <a:t>…</a:t>
+            </a:r>
+            <a:r>
+              <a:rPr lang="en-US" sz="2000" dirty="0">
+                <a:solidFill>
+                  <a:srgbClr val="FF0000"/>
+                </a:solidFill>
+              </a:rPr>
+              <a:t>'</a:t>
+            </a:r>
+            <a:r>
+              <a:rPr lang="en-US" sz="2000" b="1" dirty="0">
+                <a:solidFill>
+                  <a:srgbClr val="FF0000"/>
+                </a:solidFill>
+                <a:latin typeface="Courier New" panose="02070309020205020404" pitchFamily="49" charset="0"/>
+                <a:cs typeface="Courier New" panose="02070309020205020404" pitchFamily="49" charset="0"/>
+              </a:rPr>
+              <a:t> took xx milliseconds.</a:t>
+            </a:r>
+          </a:p>
+        </p:txBody>
+      </p:sp>
+    </p:spTree>
+    <p:extLst>
+      <p:ext uri="{BB962C8B-B14F-4D97-AF65-F5344CB8AC3E}">
+        <p14:creationId xmlns:p14="http://schemas.microsoft.com/office/powerpoint/2010/main" val="2965217731"/>
+      </p:ext>
+    </p:extLst>
+  </p:cSld>
+  <p:clrMapOvr>
+    <a:masterClrMapping/>
+  </p:clrMapOvr>
+</p:sld>
+</file>
+
+<file path=ppt/slides/slide54.xml><?xml version="1.0" encoding="utf-8"?>
+<p:sld xmlns:a="http://schemas.openxmlformats.org/drawingml/2006/main" xmlns:r="http://schemas.openxmlformats.org/officeDocument/2006/relationships" xmlns:p="http://schemas.openxmlformats.org/presentationml/2006/main">
+  <p:cSld>
+    <p:spTree>
+      <p:nvGrpSpPr>
+        <p:cNvPr id="1" name=""/>
+        <p:cNvGrpSpPr/>
+        <p:nvPr/>
+      </p:nvGrpSpPr>
+      <p:grpSpPr>
+        <a:xfrm>
+          <a:off x="0" y="0"/>
+          <a:ext cx="0" cy="0"/>
+          <a:chOff x="0" y="0"/>
+          <a:chExt cx="0" cy="0"/>
+        </a:xfrm>
+      </p:grpSpPr>
+      <p:sp>
+        <p:nvSpPr>
+          <p:cNvPr id="2" name="Title 1"/>
+          <p:cNvSpPr>
+            <a:spLocks noGrp="1"/>
+          </p:cNvSpPr>
+          <p:nvPr>
+            <p:ph type="title"/>
+          </p:nvPr>
+        </p:nvSpPr>
+        <p:spPr/>
+        <p:txBody>
+          <a:bodyPr/>
+          <a:lstStyle/>
+          <a:p>
+            <a:r>
+              <a:rPr lang="en-US" dirty="0"/>
               <a:t>Log Monitoring, continued</a:t>
             </a:r>
           </a:p>
@@ -11466,7 +11582,7 @@
             <a:fld id="{87FD5303-69AD-2E4D-B18B-E5EED0F0A60B}" type="slidenum">
               <a:rPr lang="en-US" smtClean="0"/>
               <a:pPr/>
-              <a:t>53</a:t>
+              <a:t>54</a:t>
             </a:fld>
             <a:r>
               <a:rPr lang="en-US"/>
@@ -11489,7 +11605,7 @@
 </p:sld>
 </file>
 
-<file path=ppt/slides/slide54.xml><?xml version="1.0" encoding="utf-8"?>
+<file path=ppt/slides/slide55.xml><?xml version="1.0" encoding="utf-8"?>
 <p:sld xmlns:a="http://schemas.openxmlformats.org/drawingml/2006/main" xmlns:r="http://schemas.openxmlformats.org/officeDocument/2006/relationships" xmlns:p="http://schemas.openxmlformats.org/presentationml/2006/main">
   <p:cSld>
     <p:spTree>

</xml_diff>

<commit_message>
Update About Me slide.
</commit_message>
<xml_diff>
--- a/TransactionLog.pptx
+++ b/TransactionLog.pptx
@@ -9,7 +9,7 @@
   </p:notesMasterIdLst>
   <p:sldIdLst>
     <p:sldId id="309" r:id="rId2"/>
-    <p:sldId id="257" r:id="rId3"/>
+    <p:sldId id="312" r:id="rId3"/>
     <p:sldId id="258" r:id="rId4"/>
     <p:sldId id="259" r:id="rId5"/>
     <p:sldId id="260" r:id="rId6"/>
@@ -266,7 +266,7 @@
           <a:p>
             <a:fld id="{18BF2EA9-CFC8-45FA-BD4C-CF2CA22F3AA1}" type="datetimeFigureOut">
               <a:rPr lang="en-US" smtClean="0"/>
-              <a:t>07/25/2018</a:t>
+              <a:t>05/22/2019</a:t>
             </a:fld>
             <a:endParaRPr lang="en-US"/>
           </a:p>
@@ -1997,7 +1997,7 @@
           <a:graphicData uri="http://schemas.openxmlformats.org/presentationml/2006/ole">
             <mc:AlternateContent xmlns:mc="http://schemas.openxmlformats.org/markup-compatibility/2006">
               <mc:Choice xmlns:v="urn:schemas-microsoft-com:vml" Requires="v">
-                <p:oleObj spid="_x0000_s1045" name="Image" r:id="rId10" imgW="2279520" imgH="1310400" progId="Photoshop.Image.18">
+                <p:oleObj spid="_x0000_s1046" name="Image" r:id="rId10" imgW="2279520" imgH="1310400" progId="Photoshop.Image.18">
                   <p:embed/>
                 </p:oleObj>
               </mc:Choice>
@@ -2375,7 +2375,7 @@
           <p:cNvPr id="2" name="Title 1">
             <a:extLst>
               <a:ext uri="{FF2B5EF4-FFF2-40B4-BE49-F238E27FC236}">
-                <a16:creationId xmlns="" xmlns:a16="http://schemas.microsoft.com/office/drawing/2014/main" id="{83E7BC17-A4CB-4C5C-8189-2BD06BE3E485}"/>
+                <a16:creationId xmlns:a16="http://schemas.microsoft.com/office/drawing/2014/main" xmlns="" id="{83E7BC17-A4CB-4C5C-8189-2BD06BE3E485}"/>
               </a:ext>
             </a:extLst>
           </p:cNvPr>
@@ -2437,7 +2437,7 @@
           <p:cNvPr id="3" name="Text Placeholder 2">
             <a:extLst>
               <a:ext uri="{FF2B5EF4-FFF2-40B4-BE49-F238E27FC236}">
-                <a16:creationId xmlns="" xmlns:a16="http://schemas.microsoft.com/office/drawing/2014/main" id="{580DE922-DD41-46E4-A789-EAF96778ABA6}"/>
+                <a16:creationId xmlns:a16="http://schemas.microsoft.com/office/drawing/2014/main" xmlns="" id="{580DE922-DD41-46E4-A789-EAF96778ABA6}"/>
               </a:ext>
             </a:extLst>
           </p:cNvPr>
@@ -2465,7 +2465,7 @@
           <p:cNvPr id="5" name="TextBox 4">
             <a:extLst>
               <a:ext uri="{FF2B5EF4-FFF2-40B4-BE49-F238E27FC236}">
-                <a16:creationId xmlns="" xmlns:a16="http://schemas.microsoft.com/office/drawing/2014/main" id="{13C0FC99-58B7-4BAC-A4C4-1F44433F31BD}"/>
+                <a16:creationId xmlns:a16="http://schemas.microsoft.com/office/drawing/2014/main" xmlns="" id="{13C0FC99-58B7-4BAC-A4C4-1F44433F31BD}"/>
               </a:ext>
             </a:extLst>
           </p:cNvPr>
@@ -2521,6 +2521,13 @@
   <p:clrMapOvr>
     <a:masterClrMapping/>
   </p:clrMapOvr>
+  <p:timing>
+    <p:tnLst>
+      <p:par>
+        <p:cTn id="1" dur="indefinite" restart="never" nodeType="tmRoot"/>
+      </p:par>
+    </p:tnLst>
+  </p:timing>
 </p:sld>
 </file>
 
@@ -3969,8 +3976,8 @@
         </p:nvSpPr>
         <p:spPr>
           <a:xfrm>
-            <a:off x="1872139" y="1512041"/>
-            <a:ext cx="7776210" cy="1971338"/>
+            <a:off x="7367452" y="1528181"/>
+            <a:ext cx="3831771" cy="3665808"/>
           </a:xfrm>
           <a:prstGeom prst="rect">
             <a:avLst/>
@@ -4119,8 +4126,12 @@
           </a:lstStyle>
           <a:p>
             <a:r>
+              <a:rPr lang="en-US" sz="2835"/>
+              <a:t>20+ </a:t>
+            </a:r>
+            <a:r>
               <a:rPr lang="en-US" sz="2835" dirty="0"/>
-              <a:t>15+ Years working with SQL Server</a:t>
+              <a:t>Years working with SQL Server</a:t>
             </a:r>
           </a:p>
           <a:p>
@@ -4156,11 +4167,17 @@
             <p:ph type="title"/>
           </p:nvPr>
         </p:nvSpPr>
-        <p:spPr/>
+        <p:spPr>
+          <a:xfrm>
+            <a:off x="1937289" y="1907936"/>
+            <a:ext cx="3740699" cy="720000"/>
+          </a:xfrm>
+        </p:spPr>
         <p:txBody>
           <a:bodyPr/>
           <a:lstStyle/>
           <a:p>
+            <a:pPr algn="ctr"/>
             <a:r>
               <a:rPr lang="en-US" dirty="0"/>
               <a:t>Brian Hansen</a:t>
@@ -4186,7 +4203,7 @@
         </p:blipFill>
         <p:spPr>
           <a:xfrm>
-            <a:off x="6391304" y="3499202"/>
+            <a:off x="4275093" y="3233117"/>
             <a:ext cx="2805790" cy="932385"/>
           </a:xfrm>
         </p:spPr>
@@ -4207,7 +4224,7 @@
         </p:blipFill>
         <p:spPr>
           <a:xfrm>
-            <a:off x="1872139" y="4077714"/>
+            <a:off x="574562" y="3826507"/>
             <a:ext cx="378721" cy="307567"/>
           </a:xfrm>
           <a:prstGeom prst="rect">
@@ -4231,7 +4248,7 @@
         </p:blipFill>
         <p:spPr>
           <a:xfrm>
-            <a:off x="1872139" y="3494807"/>
+            <a:off x="574562" y="3243600"/>
             <a:ext cx="378721" cy="378721"/>
           </a:xfrm>
           <a:prstGeom prst="rect">
@@ -4255,7 +4272,7 @@
         </p:blipFill>
         <p:spPr>
           <a:xfrm>
-            <a:off x="1872140" y="4543907"/>
+            <a:off x="2726580" y="957531"/>
             <a:ext cx="2367147" cy="570650"/>
           </a:xfrm>
           <a:prstGeom prst="rect">
@@ -4273,7 +4290,7 @@
         </p:nvSpPr>
         <p:spPr>
           <a:xfrm>
-            <a:off x="2408162" y="3990003"/>
+            <a:off x="1110585" y="3738796"/>
             <a:ext cx="3662247" cy="426706"/>
           </a:xfrm>
           <a:prstGeom prst="rect">
@@ -4442,7 +4459,7 @@
         </p:nvSpPr>
         <p:spPr>
           <a:xfrm>
-            <a:off x="2408163" y="3532661"/>
+            <a:off x="1110586" y="3281454"/>
             <a:ext cx="3662247" cy="426706"/>
           </a:xfrm>
           <a:prstGeom prst="rect">
@@ -4611,7 +4628,7 @@
         </p:nvSpPr>
         <p:spPr>
           <a:xfrm>
-            <a:off x="6391304" y="4474498"/>
+            <a:off x="4275093" y="4208413"/>
             <a:ext cx="2996559" cy="426706"/>
           </a:xfrm>
           <a:prstGeom prst="rect">
@@ -4780,8 +4797,8 @@
         </p:nvSpPr>
         <p:spPr>
           <a:xfrm>
-            <a:off x="1440129" y="5186238"/>
-            <a:ext cx="8640232" cy="426706"/>
+            <a:off x="574562" y="5329280"/>
+            <a:ext cx="10433072" cy="426706"/>
           </a:xfrm>
           <a:prstGeom prst="rect">
             <a:avLst/>
@@ -4934,7 +4951,7 @@
             </a:pPr>
             <a:r>
               <a:rPr lang="en-US" sz="2835" dirty="0"/>
-              <a:t>www.tf3604.com/log</a:t>
+              <a:t>www.tf3604.com/poshadmin</a:t>
             </a:r>
           </a:p>
         </p:txBody>
@@ -4942,7 +4959,7 @@
     </p:spTree>
     <p:extLst>
       <p:ext uri="{BB962C8B-B14F-4D97-AF65-F5344CB8AC3E}">
-        <p14:creationId xmlns:p14="http://schemas.microsoft.com/office/powerpoint/2010/main" val="2315486946"/>
+        <p14:creationId xmlns:p14="http://schemas.microsoft.com/office/powerpoint/2010/main" val="2091737157"/>
       </p:ext>
     </p:extLst>
   </p:cSld>
@@ -5315,21 +5332,21 @@
                 <a:gridCol w="4304521">
                   <a:extLst>
                     <a:ext uri="{9D8B030D-6E8A-4147-A177-3AD203B41FA5}">
-                      <a16:colId xmlns="" xmlns:a16="http://schemas.microsoft.com/office/drawing/2014/main" val="20000"/>
+                      <a16:colId xmlns:a16="http://schemas.microsoft.com/office/drawing/2014/main" xmlns="" val="20000"/>
                     </a:ext>
                   </a:extLst>
                 </a:gridCol>
                 <a:gridCol w="3525078">
                   <a:extLst>
                     <a:ext uri="{9D8B030D-6E8A-4147-A177-3AD203B41FA5}">
-                      <a16:colId xmlns="" xmlns:a16="http://schemas.microsoft.com/office/drawing/2014/main" val="20001"/>
+                      <a16:colId xmlns:a16="http://schemas.microsoft.com/office/drawing/2014/main" xmlns="" val="20001"/>
                     </a:ext>
                   </a:extLst>
                 </a:gridCol>
                 <a:gridCol w="2970400">
                   <a:extLst>
                     <a:ext uri="{9D8B030D-6E8A-4147-A177-3AD203B41FA5}">
-                      <a16:colId xmlns="" xmlns:a16="http://schemas.microsoft.com/office/drawing/2014/main" val="20002"/>
+                      <a16:colId xmlns:a16="http://schemas.microsoft.com/office/drawing/2014/main" xmlns="" val="20002"/>
                     </a:ext>
                   </a:extLst>
                 </a:gridCol>
@@ -5376,7 +5393,7 @@
                 </a:tc>
                 <a:extLst>
                   <a:ext uri="{0D108BD9-81ED-4DB2-BD59-A6C34878D82A}">
-                    <a16:rowId xmlns="" xmlns:a16="http://schemas.microsoft.com/office/drawing/2014/main" val="10000"/>
+                    <a16:rowId xmlns:a16="http://schemas.microsoft.com/office/drawing/2014/main" xmlns="" val="10000"/>
                   </a:ext>
                 </a:extLst>
               </a:tr>
@@ -5439,7 +5456,7 @@
                 </a:tc>
                 <a:extLst>
                   <a:ext uri="{0D108BD9-81ED-4DB2-BD59-A6C34878D82A}">
-                    <a16:rowId xmlns="" xmlns:a16="http://schemas.microsoft.com/office/drawing/2014/main" val="10001"/>
+                    <a16:rowId xmlns:a16="http://schemas.microsoft.com/office/drawing/2014/main" xmlns="" val="10001"/>
                   </a:ext>
                 </a:extLst>
               </a:tr>
@@ -5510,7 +5527,7 @@
                 </a:tc>
                 <a:extLst>
                   <a:ext uri="{0D108BD9-81ED-4DB2-BD59-A6C34878D82A}">
-                    <a16:rowId xmlns="" xmlns:a16="http://schemas.microsoft.com/office/drawing/2014/main" val="10002"/>
+                    <a16:rowId xmlns:a16="http://schemas.microsoft.com/office/drawing/2014/main" xmlns="" val="10002"/>
                   </a:ext>
                 </a:extLst>
               </a:tr>
@@ -5556,7 +5573,7 @@
                 </a:tc>
                 <a:extLst>
                   <a:ext uri="{0D108BD9-81ED-4DB2-BD59-A6C34878D82A}">
-                    <a16:rowId xmlns="" xmlns:a16="http://schemas.microsoft.com/office/drawing/2014/main" val="10003"/>
+                    <a16:rowId xmlns:a16="http://schemas.microsoft.com/office/drawing/2014/main" xmlns="" val="10003"/>
                   </a:ext>
                 </a:extLst>
               </a:tr>
@@ -5607,7 +5624,7 @@
                 </a:tc>
                 <a:extLst>
                   <a:ext uri="{0D108BD9-81ED-4DB2-BD59-A6C34878D82A}">
-                    <a16:rowId xmlns="" xmlns:a16="http://schemas.microsoft.com/office/drawing/2014/main" val="3543017676"/>
+                    <a16:rowId xmlns:a16="http://schemas.microsoft.com/office/drawing/2014/main" xmlns="" val="3543017676"/>
                   </a:ext>
                 </a:extLst>
               </a:tr>
@@ -6714,6 +6731,13 @@
   <p:clrMapOvr>
     <a:masterClrMapping/>
   </p:clrMapOvr>
+  <p:timing>
+    <p:tnLst>
+      <p:par>
+        <p:cTn id="1" dur="indefinite" restart="never" nodeType="tmRoot"/>
+      </p:par>
+    </p:tnLst>
+  </p:timing>
 </p:sld>
 </file>
 
@@ -8619,6 +8643,13 @@
   <p:clrMapOvr>
     <a:masterClrMapping/>
   </p:clrMapOvr>
+  <p:timing>
+    <p:tnLst>
+      <p:par>
+        <p:cTn id="1" dur="indefinite" restart="never" nodeType="tmRoot"/>
+      </p:par>
+    </p:tnLst>
+  </p:timing>
 </p:sld>
 </file>
 
@@ -9652,14 +9683,14 @@
                 <a:gridCol w="3034700">
                   <a:extLst>
                     <a:ext uri="{9D8B030D-6E8A-4147-A177-3AD203B41FA5}">
-                      <a16:colId xmlns="" xmlns:a16="http://schemas.microsoft.com/office/drawing/2014/main" val="20000"/>
+                      <a16:colId xmlns:a16="http://schemas.microsoft.com/office/drawing/2014/main" xmlns="" val="20000"/>
                     </a:ext>
                   </a:extLst>
                 </a:gridCol>
                 <a:gridCol w="3034700">
                   <a:extLst>
                     <a:ext uri="{9D8B030D-6E8A-4147-A177-3AD203B41FA5}">
-                      <a16:colId xmlns="" xmlns:a16="http://schemas.microsoft.com/office/drawing/2014/main" val="20001"/>
+                      <a16:colId xmlns:a16="http://schemas.microsoft.com/office/drawing/2014/main" xmlns="" val="20001"/>
                     </a:ext>
                   </a:extLst>
                 </a:gridCol>
@@ -9705,7 +9736,7 @@
                 </a:tc>
                 <a:extLst>
                   <a:ext uri="{0D108BD9-81ED-4DB2-BD59-A6C34878D82A}">
-                    <a16:rowId xmlns="" xmlns:a16="http://schemas.microsoft.com/office/drawing/2014/main" val="10000"/>
+                    <a16:rowId xmlns:a16="http://schemas.microsoft.com/office/drawing/2014/main" xmlns="" val="10000"/>
                   </a:ext>
                 </a:extLst>
               </a:tr>
@@ -9740,7 +9771,7 @@
                 </a:tc>
                 <a:extLst>
                   <a:ext uri="{0D108BD9-81ED-4DB2-BD59-A6C34878D82A}">
-                    <a16:rowId xmlns="" xmlns:a16="http://schemas.microsoft.com/office/drawing/2014/main" val="10001"/>
+                    <a16:rowId xmlns:a16="http://schemas.microsoft.com/office/drawing/2014/main" xmlns="" val="10001"/>
                   </a:ext>
                 </a:extLst>
               </a:tr>
@@ -9775,7 +9806,7 @@
                 </a:tc>
                 <a:extLst>
                   <a:ext uri="{0D108BD9-81ED-4DB2-BD59-A6C34878D82A}">
-                    <a16:rowId xmlns="" xmlns:a16="http://schemas.microsoft.com/office/drawing/2014/main" val="10002"/>
+                    <a16:rowId xmlns:a16="http://schemas.microsoft.com/office/drawing/2014/main" xmlns="" val="10002"/>
                   </a:ext>
                 </a:extLst>
               </a:tr>
@@ -9815,7 +9846,7 @@
                 </a:tc>
                 <a:extLst>
                   <a:ext uri="{0D108BD9-81ED-4DB2-BD59-A6C34878D82A}">
-                    <a16:rowId xmlns="" xmlns:a16="http://schemas.microsoft.com/office/drawing/2014/main" val="10003"/>
+                    <a16:rowId xmlns:a16="http://schemas.microsoft.com/office/drawing/2014/main" xmlns="" val="10003"/>
                   </a:ext>
                 </a:extLst>
               </a:tr>
@@ -10309,6 +10340,13 @@
   <p:clrMapOvr>
     <a:masterClrMapping/>
   </p:clrMapOvr>
+  <p:timing>
+    <p:tnLst>
+      <p:par>
+        <p:cTn id="1" dur="indefinite" restart="never" nodeType="tmRoot"/>
+      </p:par>
+    </p:tnLst>
+  </p:timing>
 </p:sld>
 </file>
 
@@ -11922,6 +11960,13 @@
   <p:clrMapOvr>
     <a:masterClrMapping/>
   </p:clrMapOvr>
+  <p:timing>
+    <p:tnLst>
+      <p:par>
+        <p:cTn id="1" dur="indefinite" restart="never" nodeType="tmRoot"/>
+      </p:par>
+    </p:tnLst>
+  </p:timing>
 </p:sld>
 </file>
 

</xml_diff>

<commit_message>
Update title slide for Virginia Beach.
</commit_message>
<xml_diff>
--- a/TransactionLog.pptx
+++ b/TransactionLog.pptx
@@ -180,10 +180,6 @@
 </p:presentation>
 </file>
 
-<file path=ppt/revisionInfo.xml><?xml version="1.0" encoding="utf-8"?>
-<p1510:revInfo xmlns:a="http://schemas.openxmlformats.org/drawingml/2006/main" xmlns:r="http://schemas.openxmlformats.org/officeDocument/2006/relationships" xmlns:p1510="http://schemas.microsoft.com/office/powerpoint/2015/10/main"/>
-</file>
-
 <file path=ppt/notesMasters/notesMaster1.xml><?xml version="1.0" encoding="utf-8"?>
 <p:notesMaster xmlns:a="http://schemas.openxmlformats.org/drawingml/2006/main" xmlns:r="http://schemas.openxmlformats.org/officeDocument/2006/relationships" xmlns:p="http://schemas.openxmlformats.org/presentationml/2006/main">
   <p:cSld>
@@ -266,7 +262,7 @@
           <a:p>
             <a:fld id="{18BF2EA9-CFC8-45FA-BD4C-CF2CA22F3AA1}" type="datetimeFigureOut">
               <a:rPr lang="en-US" smtClean="0"/>
-              <a:t>05/22/2019</a:t>
+              <a:t>6/1/2019</a:t>
             </a:fld>
             <a:endParaRPr lang="en-US"/>
           </a:p>
@@ -670,7 +666,7 @@
           <a:lstStyle/>
           <a:p>
             <a:r>
-              <a:rPr lang="en-US" dirty="0" smtClean="0"/>
+              <a:rPr lang="en-US" dirty="0"/>
               <a:t>Differences:</a:t>
             </a:r>
           </a:p>
@@ -680,15 +676,15 @@
               <a:buChar char="•"/>
             </a:pPr>
             <a:r>
-              <a:rPr lang="en-US" baseline="0" dirty="0" smtClean="0"/>
+              <a:rPr lang="en-US" baseline="0" dirty="0"/>
               <a:t>No “</a:t>
             </a:r>
             <a:r>
-              <a:rPr lang="en-US" baseline="0" dirty="0" err="1" smtClean="0"/>
+              <a:rPr lang="en-US" baseline="0" dirty="0" err="1"/>
               <a:t>RecoveryUnitId</a:t>
             </a:r>
             <a:r>
-              <a:rPr lang="en-US" baseline="0" dirty="0" smtClean="0"/>
+              <a:rPr lang="en-US" baseline="0" dirty="0"/>
               <a:t>”</a:t>
             </a:r>
           </a:p>
@@ -698,23 +694,23 @@
               <a:buChar char="•"/>
             </a:pPr>
             <a:r>
-              <a:rPr lang="en-US" baseline="0" dirty="0" smtClean="0"/>
+              <a:rPr lang="en-US" baseline="0" dirty="0"/>
               <a:t>Extra columns: “</a:t>
             </a:r>
             <a:r>
-              <a:rPr lang="en-US" baseline="0" dirty="0" err="1" smtClean="0"/>
+              <a:rPr lang="en-US" baseline="0" dirty="0" err="1"/>
               <a:t>database_id</a:t>
             </a:r>
             <a:r>
-              <a:rPr lang="en-US" baseline="0" dirty="0" smtClean="0"/>
+              <a:rPr lang="en-US" baseline="0" dirty="0"/>
               <a:t>” and “</a:t>
             </a:r>
             <a:r>
-              <a:rPr lang="en-US" baseline="0" dirty="0" err="1" smtClean="0"/>
+              <a:rPr lang="en-US" baseline="0" dirty="0" err="1"/>
               <a:t>first_lsn</a:t>
             </a:r>
             <a:r>
-              <a:rPr lang="en-US" baseline="0" dirty="0" smtClean="0"/>
+              <a:rPr lang="en-US" baseline="0" dirty="0"/>
               <a:t>”</a:t>
             </a:r>
           </a:p>
@@ -724,31 +720,31 @@
               <a:buChar char="•"/>
             </a:pPr>
             <a:r>
-              <a:rPr lang="en-US" baseline="0" dirty="0" smtClean="0"/>
+              <a:rPr lang="en-US" baseline="0" dirty="0"/>
               <a:t>Different data types (“</a:t>
             </a:r>
             <a:r>
-              <a:rPr lang="en-US" baseline="0" dirty="0" err="1" smtClean="0"/>
+              <a:rPr lang="en-US" baseline="0" dirty="0" err="1"/>
               <a:t>vlf_sequence_number</a:t>
             </a:r>
             <a:r>
-              <a:rPr lang="en-US" baseline="0" dirty="0" smtClean="0"/>
+              <a:rPr lang="en-US" baseline="0" dirty="0"/>
               <a:t>” is </a:t>
             </a:r>
             <a:r>
-              <a:rPr lang="en-US" baseline="0" dirty="0" err="1" smtClean="0"/>
+              <a:rPr lang="en-US" baseline="0" dirty="0" err="1"/>
               <a:t>bigint</a:t>
             </a:r>
             <a:r>
-              <a:rPr lang="en-US" baseline="0" dirty="0" smtClean="0"/>
+              <a:rPr lang="en-US" baseline="0" dirty="0"/>
               <a:t>, “parity” is </a:t>
             </a:r>
             <a:r>
-              <a:rPr lang="en-US" baseline="0" dirty="0" err="1" smtClean="0"/>
+              <a:rPr lang="en-US" baseline="0" dirty="0" err="1"/>
               <a:t>tinyint</a:t>
             </a:r>
             <a:r>
-              <a:rPr lang="en-US" baseline="0" dirty="0" smtClean="0"/>
+              <a:rPr lang="en-US" baseline="0" dirty="0"/>
               <a:t>)</a:t>
             </a:r>
           </a:p>
@@ -758,15 +754,15 @@
               <a:buChar char="•"/>
             </a:pPr>
             <a:r>
-              <a:rPr lang="en-US" baseline="0" dirty="0" smtClean="0"/>
+              <a:rPr lang="en-US" baseline="0" dirty="0"/>
               <a:t>“</a:t>
             </a:r>
             <a:r>
-              <a:rPr lang="en-US" baseline="0" dirty="0" err="1" smtClean="0"/>
+              <a:rPr lang="en-US" baseline="0" dirty="0" err="1"/>
               <a:t>vlf_create_lsn</a:t>
             </a:r>
             <a:r>
-              <a:rPr lang="en-US" baseline="0" dirty="0" smtClean="0"/>
+              <a:rPr lang="en-US" baseline="0" dirty="0"/>
               <a:t>” is in hexadecimal colon-separated format (vs decimal)</a:t>
             </a:r>
           </a:p>
@@ -776,15 +772,15 @@
               <a:buChar char="•"/>
             </a:pPr>
             <a:r>
-              <a:rPr lang="en-US" baseline="0" dirty="0" smtClean="0"/>
+              <a:rPr lang="en-US" baseline="0" dirty="0"/>
               <a:t>Has “</a:t>
             </a:r>
             <a:r>
-              <a:rPr lang="en-US" baseline="0" dirty="0" err="1" smtClean="0"/>
+              <a:rPr lang="en-US" baseline="0" dirty="0" err="1"/>
               <a:t>vlf_first_lsn</a:t>
             </a:r>
             <a:r>
-              <a:rPr lang="en-US" baseline="0" dirty="0" smtClean="0"/>
+              <a:rPr lang="en-US" baseline="0" dirty="0"/>
               <a:t>” column</a:t>
             </a:r>
           </a:p>
@@ -794,15 +790,15 @@
               <a:buChar char="•"/>
             </a:pPr>
             <a:r>
-              <a:rPr lang="en-US" baseline="0" dirty="0" smtClean="0"/>
+              <a:rPr lang="en-US" baseline="0" dirty="0"/>
               <a:t>Has “</a:t>
             </a:r>
             <a:r>
-              <a:rPr lang="en-US" baseline="0" dirty="0" err="1" smtClean="0"/>
+              <a:rPr lang="en-US" baseline="0" dirty="0" err="1"/>
               <a:t>vlf_active</a:t>
             </a:r>
             <a:r>
-              <a:rPr lang="en-US" baseline="0" dirty="0" smtClean="0"/>
+              <a:rPr lang="en-US" baseline="0" dirty="0"/>
               <a:t>” bit column</a:t>
             </a:r>
           </a:p>
@@ -812,26 +808,26 @@
               <a:buChar char="•"/>
             </a:pPr>
             <a:r>
-              <a:rPr lang="en-US" baseline="0" dirty="0" smtClean="0"/>
+              <a:rPr lang="en-US" baseline="0" dirty="0"/>
               <a:t>“</a:t>
             </a:r>
             <a:r>
-              <a:rPr lang="en-US" baseline="0" dirty="0" err="1" smtClean="0"/>
+              <a:rPr lang="en-US" baseline="0" dirty="0" err="1"/>
               <a:t>vlf_begin_offset</a:t>
             </a:r>
             <a:r>
-              <a:rPr lang="en-US" baseline="0" dirty="0" smtClean="0"/>
+              <a:rPr lang="en-US" baseline="0" dirty="0"/>
               <a:t>” and “</a:t>
             </a:r>
             <a:r>
-              <a:rPr lang="en-US" baseline="0" dirty="0" err="1" smtClean="0"/>
+              <a:rPr lang="en-US" baseline="0" dirty="0" err="1"/>
               <a:t>vlf_size_mb</a:t>
             </a:r>
             <a:r>
-              <a:rPr lang="en-US" baseline="0" dirty="0" smtClean="0"/>
+              <a:rPr lang="en-US" baseline="0" dirty="0"/>
               <a:t>” are in megabytes (vs bytes)</a:t>
             </a:r>
-            <a:endParaRPr lang="en-US" dirty="0" smtClean="0"/>
+            <a:endParaRPr lang="en-US" dirty="0"/>
           </a:p>
         </p:txBody>
       </p:sp>
@@ -1997,7 +1993,7 @@
           <a:graphicData uri="http://schemas.openxmlformats.org/presentationml/2006/ole">
             <mc:AlternateContent xmlns:mc="http://schemas.openxmlformats.org/markup-compatibility/2006">
               <mc:Choice xmlns:v="urn:schemas-microsoft-com:vml" Requires="v">
-                <p:oleObj spid="_x0000_s1046" name="Image" r:id="rId10" imgW="2279520" imgH="1310400" progId="Photoshop.Image.18">
+                <p:oleObj spid="_x0000_s1047" name="Image" r:id="rId10" imgW="2279520" imgH="1310400" progId="Photoshop.Image.18">
                   <p:embed/>
                 </p:oleObj>
               </mc:Choice>
@@ -2375,7 +2371,7 @@
           <p:cNvPr id="2" name="Title 1">
             <a:extLst>
               <a:ext uri="{FF2B5EF4-FFF2-40B4-BE49-F238E27FC236}">
-                <a16:creationId xmlns:a16="http://schemas.microsoft.com/office/drawing/2014/main" xmlns="" id="{83E7BC17-A4CB-4C5C-8189-2BD06BE3E485}"/>
+                <a16:creationId xmlns:a16="http://schemas.microsoft.com/office/drawing/2014/main" id="{83E7BC17-A4CB-4C5C-8189-2BD06BE3E485}"/>
               </a:ext>
             </a:extLst>
           </p:cNvPr>
@@ -2437,7 +2433,7 @@
           <p:cNvPr id="3" name="Text Placeholder 2">
             <a:extLst>
               <a:ext uri="{FF2B5EF4-FFF2-40B4-BE49-F238E27FC236}">
-                <a16:creationId xmlns:a16="http://schemas.microsoft.com/office/drawing/2014/main" xmlns="" id="{580DE922-DD41-46E4-A789-EAF96778ABA6}"/>
+                <a16:creationId xmlns:a16="http://schemas.microsoft.com/office/drawing/2014/main" id="{580DE922-DD41-46E4-A789-EAF96778ABA6}"/>
               </a:ext>
             </a:extLst>
           </p:cNvPr>
@@ -2465,7 +2461,7 @@
           <p:cNvPr id="5" name="TextBox 4">
             <a:extLst>
               <a:ext uri="{FF2B5EF4-FFF2-40B4-BE49-F238E27FC236}">
-                <a16:creationId xmlns:a16="http://schemas.microsoft.com/office/drawing/2014/main" xmlns="" id="{13C0FC99-58B7-4BAC-A4C4-1F44433F31BD}"/>
+                <a16:creationId xmlns:a16="http://schemas.microsoft.com/office/drawing/2014/main" id="{13C0FC99-58B7-4BAC-A4C4-1F44433F31BD}"/>
               </a:ext>
             </a:extLst>
           </p:cNvPr>
@@ -2491,23 +2487,22 @@
             <a:pPr algn="r"/>
             <a:r>
               <a:rPr lang="en-US" dirty="0"/>
-              <a:t>SQL Saturday #631</a:t>
+              <a:t>SQL Saturday #839</a:t>
             </a:r>
           </a:p>
           <a:p>
             <a:pPr algn="r"/>
             <a:r>
               <a:rPr lang="en-US" dirty="0"/>
-              <a:t>Wausau, Wisconsin</a:t>
+              <a:t>Virginia Beach, Virginia</a:t>
             </a:r>
           </a:p>
           <a:p>
             <a:pPr algn="r"/>
             <a:r>
-              <a:rPr lang="en-US"/>
-              <a:t>16 September 2017</a:t>
-            </a:r>
-            <a:endParaRPr lang="en-US" dirty="0"/>
+              <a:rPr lang="en-US" dirty="0"/>
+              <a:t>8 June 2019</a:t>
+            </a:r>
           </a:p>
         </p:txBody>
       </p:sp>
@@ -2521,13 +2516,6 @@
   <p:clrMapOvr>
     <a:masterClrMapping/>
   </p:clrMapOvr>
-  <p:timing>
-    <p:tnLst>
-      <p:par>
-        <p:cTn id="1" dur="indefinite" restart="never" nodeType="tmRoot"/>
-      </p:par>
-    </p:tnLst>
-  </p:timing>
 </p:sld>
 </file>
 
@@ -5332,21 +5320,21 @@
                 <a:gridCol w="4304521">
                   <a:extLst>
                     <a:ext uri="{9D8B030D-6E8A-4147-A177-3AD203B41FA5}">
-                      <a16:colId xmlns:a16="http://schemas.microsoft.com/office/drawing/2014/main" xmlns="" val="20000"/>
+                      <a16:colId xmlns:a16="http://schemas.microsoft.com/office/drawing/2014/main" val="20000"/>
                     </a:ext>
                   </a:extLst>
                 </a:gridCol>
                 <a:gridCol w="3525078">
                   <a:extLst>
                     <a:ext uri="{9D8B030D-6E8A-4147-A177-3AD203B41FA5}">
-                      <a16:colId xmlns:a16="http://schemas.microsoft.com/office/drawing/2014/main" xmlns="" val="20001"/>
+                      <a16:colId xmlns:a16="http://schemas.microsoft.com/office/drawing/2014/main" val="20001"/>
                     </a:ext>
                   </a:extLst>
                 </a:gridCol>
                 <a:gridCol w="2970400">
                   <a:extLst>
                     <a:ext uri="{9D8B030D-6E8A-4147-A177-3AD203B41FA5}">
-                      <a16:colId xmlns:a16="http://schemas.microsoft.com/office/drawing/2014/main" xmlns="" val="20002"/>
+                      <a16:colId xmlns:a16="http://schemas.microsoft.com/office/drawing/2014/main" val="20002"/>
                     </a:ext>
                   </a:extLst>
                 </a:gridCol>
@@ -5393,7 +5381,7 @@
                 </a:tc>
                 <a:extLst>
                   <a:ext uri="{0D108BD9-81ED-4DB2-BD59-A6C34878D82A}">
-                    <a16:rowId xmlns:a16="http://schemas.microsoft.com/office/drawing/2014/main" xmlns="" val="10000"/>
+                    <a16:rowId xmlns:a16="http://schemas.microsoft.com/office/drawing/2014/main" val="10000"/>
                   </a:ext>
                 </a:extLst>
               </a:tr>
@@ -5456,7 +5444,7 @@
                 </a:tc>
                 <a:extLst>
                   <a:ext uri="{0D108BD9-81ED-4DB2-BD59-A6C34878D82A}">
-                    <a16:rowId xmlns:a16="http://schemas.microsoft.com/office/drawing/2014/main" xmlns="" val="10001"/>
+                    <a16:rowId xmlns:a16="http://schemas.microsoft.com/office/drawing/2014/main" val="10001"/>
                   </a:ext>
                 </a:extLst>
               </a:tr>
@@ -5527,7 +5515,7 @@
                 </a:tc>
                 <a:extLst>
                   <a:ext uri="{0D108BD9-81ED-4DB2-BD59-A6C34878D82A}">
-                    <a16:rowId xmlns:a16="http://schemas.microsoft.com/office/drawing/2014/main" xmlns="" val="10002"/>
+                    <a16:rowId xmlns:a16="http://schemas.microsoft.com/office/drawing/2014/main" val="10002"/>
                   </a:ext>
                 </a:extLst>
               </a:tr>
@@ -5573,7 +5561,7 @@
                 </a:tc>
                 <a:extLst>
                   <a:ext uri="{0D108BD9-81ED-4DB2-BD59-A6C34878D82A}">
-                    <a16:rowId xmlns:a16="http://schemas.microsoft.com/office/drawing/2014/main" xmlns="" val="10003"/>
+                    <a16:rowId xmlns:a16="http://schemas.microsoft.com/office/drawing/2014/main" val="10003"/>
                   </a:ext>
                 </a:extLst>
               </a:tr>
@@ -5624,7 +5612,7 @@
                 </a:tc>
                 <a:extLst>
                   <a:ext uri="{0D108BD9-81ED-4DB2-BD59-A6C34878D82A}">
-                    <a16:rowId xmlns:a16="http://schemas.microsoft.com/office/drawing/2014/main" xmlns="" val="3543017676"/>
+                    <a16:rowId xmlns:a16="http://schemas.microsoft.com/office/drawing/2014/main" val="3543017676"/>
                   </a:ext>
                 </a:extLst>
               </a:tr>
@@ -6057,25 +6045,20 @@
           <a:p>
             <a:r>
               <a:rPr lang="en-US" dirty="0" err="1"/>
-              <a:t>s</a:t>
-            </a:r>
-            <a:r>
-              <a:rPr lang="en-US" dirty="0" err="1" smtClean="0"/>
-              <a:t>ys.dm_db_log_info</a:t>
-            </a:r>
-            <a:r>
-              <a:rPr lang="en-US" dirty="0" smtClean="0"/>
+              <a:t>sys.dm_db_log_info</a:t>
+            </a:r>
+            <a:r>
+              <a:rPr lang="en-US" dirty="0"/>
               <a:t>(</a:t>
             </a:r>
             <a:r>
-              <a:rPr lang="en-US" dirty="0" err="1" smtClean="0"/>
+              <a:rPr lang="en-US" dirty="0" err="1"/>
               <a:t>db_id</a:t>
             </a:r>
             <a:r>
-              <a:rPr lang="en-US" dirty="0" smtClean="0"/>
+              <a:rPr lang="en-US" dirty="0"/>
               <a:t>)</a:t>
             </a:r>
-            <a:endParaRPr lang="en-US" dirty="0"/>
           </a:p>
         </p:txBody>
       </p:sp>
@@ -6102,22 +6085,21 @@
           <a:lstStyle/>
           <a:p>
             <a:r>
-              <a:rPr lang="en-US" dirty="0" smtClean="0"/>
+              <a:rPr lang="en-US" dirty="0"/>
               <a:t>Documented, supported version of DBCC LOGINFO</a:t>
             </a:r>
           </a:p>
           <a:p>
             <a:r>
-              <a:rPr lang="en-US" dirty="0" smtClean="0"/>
+              <a:rPr lang="en-US" dirty="0"/>
               <a:t>SQL Server 2016 SP2+</a:t>
             </a:r>
           </a:p>
           <a:p>
             <a:r>
-              <a:rPr lang="en-US" dirty="0" smtClean="0"/>
+              <a:rPr lang="en-US" dirty="0"/>
               <a:t>Subtle differences from DBCC LOGINFO</a:t>
             </a:r>
-            <a:endParaRPr lang="en-US" dirty="0"/>
           </a:p>
         </p:txBody>
       </p:sp>
@@ -6731,13 +6713,6 @@
   <p:clrMapOvr>
     <a:masterClrMapping/>
   </p:clrMapOvr>
-  <p:timing>
-    <p:tnLst>
-      <p:par>
-        <p:cTn id="1" dur="indefinite" restart="never" nodeType="tmRoot"/>
-      </p:par>
-    </p:tnLst>
-  </p:timing>
 </p:sld>
 </file>
 
@@ -7388,14 +7363,6 @@
   <p:clrMapOvr>
     <a:masterClrMapping/>
   </p:clrMapOvr>
-  <mc:AlternateContent xmlns:mc="http://schemas.openxmlformats.org/markup-compatibility/2006" xmlns:p14="http://schemas.microsoft.com/office/powerpoint/2010/main">
-    <mc:Choice Requires="p14">
-      <p:transition spd="slow" p14:dur="2000"/>
-    </mc:Choice>
-    <mc:Fallback xmlns="">
-      <p:transition spd="slow"/>
-    </mc:Fallback>
-  </mc:AlternateContent>
 </p:sld>
 </file>
 
@@ -8643,13 +8610,6 @@
   <p:clrMapOvr>
     <a:masterClrMapping/>
   </p:clrMapOvr>
-  <p:timing>
-    <p:tnLst>
-      <p:par>
-        <p:cTn id="1" dur="indefinite" restart="never" nodeType="tmRoot"/>
-      </p:par>
-    </p:tnLst>
-  </p:timing>
 </p:sld>
 </file>
 
@@ -9683,14 +9643,14 @@
                 <a:gridCol w="3034700">
                   <a:extLst>
                     <a:ext uri="{9D8B030D-6E8A-4147-A177-3AD203B41FA5}">
-                      <a16:colId xmlns:a16="http://schemas.microsoft.com/office/drawing/2014/main" xmlns="" val="20000"/>
+                      <a16:colId xmlns:a16="http://schemas.microsoft.com/office/drawing/2014/main" val="20000"/>
                     </a:ext>
                   </a:extLst>
                 </a:gridCol>
                 <a:gridCol w="3034700">
                   <a:extLst>
                     <a:ext uri="{9D8B030D-6E8A-4147-A177-3AD203B41FA5}">
-                      <a16:colId xmlns:a16="http://schemas.microsoft.com/office/drawing/2014/main" xmlns="" val="20001"/>
+                      <a16:colId xmlns:a16="http://schemas.microsoft.com/office/drawing/2014/main" val="20001"/>
                     </a:ext>
                   </a:extLst>
                 </a:gridCol>
@@ -9736,7 +9696,7 @@
                 </a:tc>
                 <a:extLst>
                   <a:ext uri="{0D108BD9-81ED-4DB2-BD59-A6C34878D82A}">
-                    <a16:rowId xmlns:a16="http://schemas.microsoft.com/office/drawing/2014/main" xmlns="" val="10000"/>
+                    <a16:rowId xmlns:a16="http://schemas.microsoft.com/office/drawing/2014/main" val="10000"/>
                   </a:ext>
                 </a:extLst>
               </a:tr>
@@ -9771,7 +9731,7 @@
                 </a:tc>
                 <a:extLst>
                   <a:ext uri="{0D108BD9-81ED-4DB2-BD59-A6C34878D82A}">
-                    <a16:rowId xmlns:a16="http://schemas.microsoft.com/office/drawing/2014/main" xmlns="" val="10001"/>
+                    <a16:rowId xmlns:a16="http://schemas.microsoft.com/office/drawing/2014/main" val="10001"/>
                   </a:ext>
                 </a:extLst>
               </a:tr>
@@ -9806,7 +9766,7 @@
                 </a:tc>
                 <a:extLst>
                   <a:ext uri="{0D108BD9-81ED-4DB2-BD59-A6C34878D82A}">
-                    <a16:rowId xmlns:a16="http://schemas.microsoft.com/office/drawing/2014/main" xmlns="" val="10002"/>
+                    <a16:rowId xmlns:a16="http://schemas.microsoft.com/office/drawing/2014/main" val="10002"/>
                   </a:ext>
                 </a:extLst>
               </a:tr>
@@ -9846,7 +9806,7 @@
                 </a:tc>
                 <a:extLst>
                   <a:ext uri="{0D108BD9-81ED-4DB2-BD59-A6C34878D82A}">
-                    <a16:rowId xmlns:a16="http://schemas.microsoft.com/office/drawing/2014/main" xmlns="" val="10003"/>
+                    <a16:rowId xmlns:a16="http://schemas.microsoft.com/office/drawing/2014/main" val="10003"/>
                   </a:ext>
                 </a:extLst>
               </a:tr>
@@ -10340,13 +10300,6 @@
   <p:clrMapOvr>
     <a:masterClrMapping/>
   </p:clrMapOvr>
-  <p:timing>
-    <p:tnLst>
-      <p:par>
-        <p:cTn id="1" dur="indefinite" restart="never" nodeType="tmRoot"/>
-      </p:par>
-    </p:tnLst>
-  </p:timing>
 </p:sld>
 </file>
 
@@ -10619,10 +10572,9 @@
           <a:lstStyle/>
           <a:p>
             <a:r>
-              <a:rPr lang="en-US" dirty="0" smtClean="0"/>
+              <a:rPr lang="en-US" dirty="0"/>
               <a:t>Controlling VLFs</a:t>
             </a:r>
-            <a:endParaRPr lang="en-US" dirty="0"/>
           </a:p>
         </p:txBody>
       </p:sp>
@@ -10646,7 +10598,7 @@
               <a:buChar char="•"/>
             </a:pPr>
             <a:r>
-              <a:rPr lang="en-US" dirty="0" smtClean="0"/>
+              <a:rPr lang="en-US" dirty="0"/>
               <a:t>See the MS Tiger Team solution</a:t>
             </a:r>
           </a:p>
@@ -10656,7 +10608,7 @@
               <a:buChar char="•"/>
             </a:pPr>
             <a:r>
-              <a:rPr lang="en-US" dirty="0" smtClean="0"/>
+              <a:rPr lang="en-US" dirty="0"/>
               <a:t>A bit of a hammer – it generates scripts for all databases on the instance</a:t>
             </a:r>
           </a:p>
@@ -10666,7 +10618,7 @@
               <a:buChar char="•"/>
             </a:pPr>
             <a:r>
-              <a:rPr lang="en-US" dirty="0" smtClean="0"/>
+              <a:rPr lang="en-US" dirty="0"/>
               <a:t>Review the generated script before running it</a:t>
             </a:r>
           </a:p>
@@ -11960,13 +11912,6 @@
   <p:clrMapOvr>
     <a:masterClrMapping/>
   </p:clrMapOvr>
-  <p:timing>
-    <p:tnLst>
-      <p:par>
-        <p:cTn id="1" dur="indefinite" restart="never" nodeType="tmRoot"/>
-      </p:par>
-    </p:tnLst>
-  </p:timing>
 </p:sld>
 </file>
 

</xml_diff>

<commit_message>
Update demo slide (updated clip art).
</commit_message>
<xml_diff>
--- a/TransactionLog.pptx
+++ b/TransactionLog.pptx
@@ -5,7 +5,7 @@
     <p:sldMasterId id="2147483648" r:id="rId1"/>
   </p:sldMasterIdLst>
   <p:notesMasterIdLst>
-    <p:notesMasterId r:id="rId57"/>
+    <p:notesMasterId r:id="rId58"/>
   </p:notesMasterIdLst>
   <p:sldIdLst>
     <p:sldId id="309" r:id="rId2"/>
@@ -30,39 +30,40 @@
     <p:sldId id="275" r:id="rId21"/>
     <p:sldId id="276" r:id="rId22"/>
     <p:sldId id="277" r:id="rId23"/>
-    <p:sldId id="278" r:id="rId24"/>
+    <p:sldId id="313" r:id="rId24"/>
     <p:sldId id="279" r:id="rId25"/>
     <p:sldId id="310" r:id="rId26"/>
     <p:sldId id="280" r:id="rId27"/>
-    <p:sldId id="281" r:id="rId28"/>
-    <p:sldId id="282" r:id="rId29"/>
-    <p:sldId id="283" r:id="rId30"/>
-    <p:sldId id="284" r:id="rId31"/>
-    <p:sldId id="285" r:id="rId32"/>
-    <p:sldId id="286" r:id="rId33"/>
-    <p:sldId id="287" r:id="rId34"/>
-    <p:sldId id="288" r:id="rId35"/>
-    <p:sldId id="289" r:id="rId36"/>
-    <p:sldId id="290" r:id="rId37"/>
-    <p:sldId id="291" r:id="rId38"/>
-    <p:sldId id="292" r:id="rId39"/>
-    <p:sldId id="293" r:id="rId40"/>
-    <p:sldId id="294" r:id="rId41"/>
-    <p:sldId id="295" r:id="rId42"/>
-    <p:sldId id="296" r:id="rId43"/>
-    <p:sldId id="297" r:id="rId44"/>
-    <p:sldId id="298" r:id="rId45"/>
-    <p:sldId id="299" r:id="rId46"/>
-    <p:sldId id="300" r:id="rId47"/>
-    <p:sldId id="301" r:id="rId48"/>
-    <p:sldId id="302" r:id="rId49"/>
-    <p:sldId id="303" r:id="rId50"/>
-    <p:sldId id="304" r:id="rId51"/>
-    <p:sldId id="305" r:id="rId52"/>
-    <p:sldId id="311" r:id="rId53"/>
-    <p:sldId id="306" r:id="rId54"/>
-    <p:sldId id="307" r:id="rId55"/>
-    <p:sldId id="308" r:id="rId56"/>
+    <p:sldId id="314" r:id="rId28"/>
+    <p:sldId id="281" r:id="rId29"/>
+    <p:sldId id="315" r:id="rId30"/>
+    <p:sldId id="283" r:id="rId31"/>
+    <p:sldId id="284" r:id="rId32"/>
+    <p:sldId id="285" r:id="rId33"/>
+    <p:sldId id="286" r:id="rId34"/>
+    <p:sldId id="287" r:id="rId35"/>
+    <p:sldId id="288" r:id="rId36"/>
+    <p:sldId id="289" r:id="rId37"/>
+    <p:sldId id="290" r:id="rId38"/>
+    <p:sldId id="291" r:id="rId39"/>
+    <p:sldId id="292" r:id="rId40"/>
+    <p:sldId id="316" r:id="rId41"/>
+    <p:sldId id="294" r:id="rId42"/>
+    <p:sldId id="295" r:id="rId43"/>
+    <p:sldId id="296" r:id="rId44"/>
+    <p:sldId id="297" r:id="rId45"/>
+    <p:sldId id="298" r:id="rId46"/>
+    <p:sldId id="299" r:id="rId47"/>
+    <p:sldId id="300" r:id="rId48"/>
+    <p:sldId id="317" r:id="rId49"/>
+    <p:sldId id="302" r:id="rId50"/>
+    <p:sldId id="303" r:id="rId51"/>
+    <p:sldId id="304" r:id="rId52"/>
+    <p:sldId id="318" r:id="rId53"/>
+    <p:sldId id="311" r:id="rId54"/>
+    <p:sldId id="306" r:id="rId55"/>
+    <p:sldId id="307" r:id="rId56"/>
+    <p:sldId id="308" r:id="rId57"/>
   </p:sldIdLst>
   <p:sldSz cx="11520488" cy="6480175"/>
   <p:notesSz cx="6858000" cy="9144000"/>
@@ -667,167 +668,8 @@
           <a:p>
             <a:r>
               <a:rPr lang="en-US" dirty="0"/>
-              <a:t>Differences:</a:t>
-            </a:r>
-          </a:p>
-          <a:p>
-            <a:pPr marL="171450" indent="-171450">
-              <a:buFont typeface="Arial" panose="020B0604020202020204" pitchFamily="34" charset="0"/>
-              <a:buChar char="•"/>
-            </a:pPr>
-            <a:r>
-              <a:rPr lang="en-US" baseline="0" dirty="0"/>
-              <a:t>No “</a:t>
-            </a:r>
-            <a:r>
-              <a:rPr lang="en-US" baseline="0" dirty="0" err="1"/>
-              <a:t>RecoveryUnitId</a:t>
-            </a:r>
-            <a:r>
-              <a:rPr lang="en-US" baseline="0" dirty="0"/>
-              <a:t>”</a:t>
-            </a:r>
-          </a:p>
-          <a:p>
-            <a:pPr marL="171450" indent="-171450">
-              <a:buFont typeface="Arial" panose="020B0604020202020204" pitchFamily="34" charset="0"/>
-              <a:buChar char="•"/>
-            </a:pPr>
-            <a:r>
-              <a:rPr lang="en-US" baseline="0" dirty="0"/>
-              <a:t>Extra columns: “</a:t>
-            </a:r>
-            <a:r>
-              <a:rPr lang="en-US" baseline="0" dirty="0" err="1"/>
-              <a:t>database_id</a:t>
-            </a:r>
-            <a:r>
-              <a:rPr lang="en-US" baseline="0" dirty="0"/>
-              <a:t>” and “</a:t>
-            </a:r>
-            <a:r>
-              <a:rPr lang="en-US" baseline="0" dirty="0" err="1"/>
-              <a:t>first_lsn</a:t>
-            </a:r>
-            <a:r>
-              <a:rPr lang="en-US" baseline="0" dirty="0"/>
-              <a:t>”</a:t>
-            </a:r>
-          </a:p>
-          <a:p>
-            <a:pPr marL="171450" indent="-171450">
-              <a:buFont typeface="Arial" panose="020B0604020202020204" pitchFamily="34" charset="0"/>
-              <a:buChar char="•"/>
-            </a:pPr>
-            <a:r>
-              <a:rPr lang="en-US" baseline="0" dirty="0"/>
-              <a:t>Different data types (“</a:t>
-            </a:r>
-            <a:r>
-              <a:rPr lang="en-US" baseline="0" dirty="0" err="1"/>
-              <a:t>vlf_sequence_number</a:t>
-            </a:r>
-            <a:r>
-              <a:rPr lang="en-US" baseline="0" dirty="0"/>
-              <a:t>” is </a:t>
-            </a:r>
-            <a:r>
-              <a:rPr lang="en-US" baseline="0" dirty="0" err="1"/>
-              <a:t>bigint</a:t>
-            </a:r>
-            <a:r>
-              <a:rPr lang="en-US" baseline="0" dirty="0"/>
-              <a:t>, “parity” is </a:t>
-            </a:r>
-            <a:r>
-              <a:rPr lang="en-US" baseline="0" dirty="0" err="1"/>
-              <a:t>tinyint</a:t>
-            </a:r>
-            <a:r>
-              <a:rPr lang="en-US" baseline="0" dirty="0"/>
-              <a:t>)</a:t>
-            </a:r>
-          </a:p>
-          <a:p>
-            <a:pPr marL="171450" indent="-171450">
-              <a:buFont typeface="Arial" panose="020B0604020202020204" pitchFamily="34" charset="0"/>
-              <a:buChar char="•"/>
-            </a:pPr>
-            <a:r>
-              <a:rPr lang="en-US" baseline="0" dirty="0"/>
-              <a:t>“</a:t>
-            </a:r>
-            <a:r>
-              <a:rPr lang="en-US" baseline="0" dirty="0" err="1"/>
-              <a:t>vlf_create_lsn</a:t>
-            </a:r>
-            <a:r>
-              <a:rPr lang="en-US" baseline="0" dirty="0"/>
-              <a:t>” is in hexadecimal colon-separated format (vs decimal)</a:t>
-            </a:r>
-          </a:p>
-          <a:p>
-            <a:pPr marL="171450" indent="-171450">
-              <a:buFont typeface="Arial" panose="020B0604020202020204" pitchFamily="34" charset="0"/>
-              <a:buChar char="•"/>
-            </a:pPr>
-            <a:r>
-              <a:rPr lang="en-US" baseline="0" dirty="0"/>
-              <a:t>Has “</a:t>
-            </a:r>
-            <a:r>
-              <a:rPr lang="en-US" baseline="0" dirty="0" err="1"/>
-              <a:t>vlf_first_lsn</a:t>
-            </a:r>
-            <a:r>
-              <a:rPr lang="en-US" baseline="0" dirty="0"/>
-              <a:t>” column</a:t>
-            </a:r>
-          </a:p>
-          <a:p>
-            <a:pPr marL="171450" indent="-171450">
-              <a:buFont typeface="Arial" panose="020B0604020202020204" pitchFamily="34" charset="0"/>
-              <a:buChar char="•"/>
-            </a:pPr>
-            <a:r>
-              <a:rPr lang="en-US" baseline="0" dirty="0"/>
-              <a:t>Has “</a:t>
-            </a:r>
-            <a:r>
-              <a:rPr lang="en-US" baseline="0" dirty="0" err="1"/>
-              <a:t>vlf_active</a:t>
-            </a:r>
-            <a:r>
-              <a:rPr lang="en-US" baseline="0" dirty="0"/>
-              <a:t>” bit column</a:t>
-            </a:r>
-          </a:p>
-          <a:p>
-            <a:pPr marL="171450" indent="-171450">
-              <a:buFont typeface="Arial" panose="020B0604020202020204" pitchFamily="34" charset="0"/>
-              <a:buChar char="•"/>
-            </a:pPr>
-            <a:r>
-              <a:rPr lang="en-US" baseline="0" dirty="0"/>
-              <a:t>“</a:t>
-            </a:r>
-            <a:r>
-              <a:rPr lang="en-US" baseline="0" dirty="0" err="1"/>
-              <a:t>vlf_begin_offset</a:t>
-            </a:r>
-            <a:r>
-              <a:rPr lang="en-US" baseline="0" dirty="0"/>
-              <a:t>” and “</a:t>
-            </a:r>
-            <a:r>
-              <a:rPr lang="en-US" baseline="0" dirty="0" err="1"/>
-              <a:t>vlf_size_mb</a:t>
-            </a:r>
-            <a:r>
-              <a:rPr lang="en-US" baseline="0" dirty="0"/>
-              <a:t>” are in megabytes (vs bytes)</a:t>
-            </a:r>
-            <a:endParaRPr lang="en-US" dirty="0"/>
+              <a:t>Scripts 020 through ???</a:t>
+            </a:r>
           </a:p>
         </p:txBody>
       </p:sp>
@@ -846,9 +688,9 @@
           <a:bodyPr/>
           <a:lstStyle/>
           <a:p>
-            <a:fld id="{E6006AB3-B303-49B7-80DE-AE281F223BBD}" type="slidenum">
+            <a:fld id="{FF7EEA9B-F69F-4E8E-9D98-532317352FF8}" type="slidenum">
               <a:rPr lang="en-US" smtClean="0"/>
-              <a:t>25</a:t>
+              <a:t>23</a:t>
             </a:fld>
             <a:endParaRPr lang="en-US"/>
           </a:p>
@@ -857,7 +699,7 @@
     </p:spTree>
     <p:extLst>
       <p:ext uri="{BB962C8B-B14F-4D97-AF65-F5344CB8AC3E}">
-        <p14:creationId xmlns:p14="http://schemas.microsoft.com/office/powerpoint/2010/main" val="2349625907"/>
+        <p14:creationId xmlns:p14="http://schemas.microsoft.com/office/powerpoint/2010/main" val="431759132"/>
       </p:ext>
     </p:extLst>
   </p:cSld>
@@ -913,6 +755,426 @@
           <a:p>
             <a:r>
               <a:rPr lang="en-US" dirty="0"/>
+              <a:t>Differences:</a:t>
+            </a:r>
+          </a:p>
+          <a:p>
+            <a:pPr marL="171450" indent="-171450">
+              <a:buFont typeface="Arial" panose="020B0604020202020204" pitchFamily="34" charset="0"/>
+              <a:buChar char="•"/>
+            </a:pPr>
+            <a:r>
+              <a:rPr lang="en-US" baseline="0" dirty="0"/>
+              <a:t>No “</a:t>
+            </a:r>
+            <a:r>
+              <a:rPr lang="en-US" baseline="0" dirty="0" err="1"/>
+              <a:t>RecoveryUnitId</a:t>
+            </a:r>
+            <a:r>
+              <a:rPr lang="en-US" baseline="0" dirty="0"/>
+              <a:t>”</a:t>
+            </a:r>
+          </a:p>
+          <a:p>
+            <a:pPr marL="171450" indent="-171450">
+              <a:buFont typeface="Arial" panose="020B0604020202020204" pitchFamily="34" charset="0"/>
+              <a:buChar char="•"/>
+            </a:pPr>
+            <a:r>
+              <a:rPr lang="en-US" baseline="0" dirty="0"/>
+              <a:t>Extra columns: “</a:t>
+            </a:r>
+            <a:r>
+              <a:rPr lang="en-US" baseline="0" dirty="0" err="1"/>
+              <a:t>database_id</a:t>
+            </a:r>
+            <a:r>
+              <a:rPr lang="en-US" baseline="0" dirty="0"/>
+              <a:t>” and “</a:t>
+            </a:r>
+            <a:r>
+              <a:rPr lang="en-US" baseline="0" dirty="0" err="1"/>
+              <a:t>first_lsn</a:t>
+            </a:r>
+            <a:r>
+              <a:rPr lang="en-US" baseline="0" dirty="0"/>
+              <a:t>”</a:t>
+            </a:r>
+          </a:p>
+          <a:p>
+            <a:pPr marL="171450" indent="-171450">
+              <a:buFont typeface="Arial" panose="020B0604020202020204" pitchFamily="34" charset="0"/>
+              <a:buChar char="•"/>
+            </a:pPr>
+            <a:r>
+              <a:rPr lang="en-US" baseline="0" dirty="0"/>
+              <a:t>Different data types (“</a:t>
+            </a:r>
+            <a:r>
+              <a:rPr lang="en-US" baseline="0" dirty="0" err="1"/>
+              <a:t>vlf_sequence_number</a:t>
+            </a:r>
+            <a:r>
+              <a:rPr lang="en-US" baseline="0" dirty="0"/>
+              <a:t>” is </a:t>
+            </a:r>
+            <a:r>
+              <a:rPr lang="en-US" baseline="0" dirty="0" err="1"/>
+              <a:t>bigint</a:t>
+            </a:r>
+            <a:r>
+              <a:rPr lang="en-US" baseline="0" dirty="0"/>
+              <a:t>, “parity” is </a:t>
+            </a:r>
+            <a:r>
+              <a:rPr lang="en-US" baseline="0" dirty="0" err="1"/>
+              <a:t>tinyint</a:t>
+            </a:r>
+            <a:r>
+              <a:rPr lang="en-US" baseline="0" dirty="0"/>
+              <a:t>)</a:t>
+            </a:r>
+          </a:p>
+          <a:p>
+            <a:pPr marL="171450" indent="-171450">
+              <a:buFont typeface="Arial" panose="020B0604020202020204" pitchFamily="34" charset="0"/>
+              <a:buChar char="•"/>
+            </a:pPr>
+            <a:r>
+              <a:rPr lang="en-US" baseline="0" dirty="0"/>
+              <a:t>“</a:t>
+            </a:r>
+            <a:r>
+              <a:rPr lang="en-US" baseline="0" dirty="0" err="1"/>
+              <a:t>vlf_create_lsn</a:t>
+            </a:r>
+            <a:r>
+              <a:rPr lang="en-US" baseline="0" dirty="0"/>
+              <a:t>” is in hexadecimal colon-separated format (vs decimal)</a:t>
+            </a:r>
+          </a:p>
+          <a:p>
+            <a:pPr marL="171450" indent="-171450">
+              <a:buFont typeface="Arial" panose="020B0604020202020204" pitchFamily="34" charset="0"/>
+              <a:buChar char="•"/>
+            </a:pPr>
+            <a:r>
+              <a:rPr lang="en-US" baseline="0" dirty="0"/>
+              <a:t>Has “</a:t>
+            </a:r>
+            <a:r>
+              <a:rPr lang="en-US" baseline="0" dirty="0" err="1"/>
+              <a:t>vlf_first_lsn</a:t>
+            </a:r>
+            <a:r>
+              <a:rPr lang="en-US" baseline="0" dirty="0"/>
+              <a:t>” column</a:t>
+            </a:r>
+          </a:p>
+          <a:p>
+            <a:pPr marL="171450" indent="-171450">
+              <a:buFont typeface="Arial" panose="020B0604020202020204" pitchFamily="34" charset="0"/>
+              <a:buChar char="•"/>
+            </a:pPr>
+            <a:r>
+              <a:rPr lang="en-US" baseline="0" dirty="0"/>
+              <a:t>Has “</a:t>
+            </a:r>
+            <a:r>
+              <a:rPr lang="en-US" baseline="0" dirty="0" err="1"/>
+              <a:t>vlf_active</a:t>
+            </a:r>
+            <a:r>
+              <a:rPr lang="en-US" baseline="0" dirty="0"/>
+              <a:t>” bit column</a:t>
+            </a:r>
+          </a:p>
+          <a:p>
+            <a:pPr marL="171450" indent="-171450">
+              <a:buFont typeface="Arial" panose="020B0604020202020204" pitchFamily="34" charset="0"/>
+              <a:buChar char="•"/>
+            </a:pPr>
+            <a:r>
+              <a:rPr lang="en-US" baseline="0" dirty="0"/>
+              <a:t>“</a:t>
+            </a:r>
+            <a:r>
+              <a:rPr lang="en-US" baseline="0" dirty="0" err="1"/>
+              <a:t>vlf_begin_offset</a:t>
+            </a:r>
+            <a:r>
+              <a:rPr lang="en-US" baseline="0" dirty="0"/>
+              <a:t>” and “</a:t>
+            </a:r>
+            <a:r>
+              <a:rPr lang="en-US" baseline="0" dirty="0" err="1"/>
+              <a:t>vlf_size_mb</a:t>
+            </a:r>
+            <a:r>
+              <a:rPr lang="en-US" baseline="0" dirty="0"/>
+              <a:t>” are in megabytes (vs bytes)</a:t>
+            </a:r>
+            <a:endParaRPr lang="en-US" dirty="0"/>
+          </a:p>
+        </p:txBody>
+      </p:sp>
+      <p:sp>
+        <p:nvSpPr>
+          <p:cNvPr id="4" name="Slide Number Placeholder 3"/>
+          <p:cNvSpPr>
+            <a:spLocks noGrp="1"/>
+          </p:cNvSpPr>
+          <p:nvPr>
+            <p:ph type="sldNum" sz="quarter" idx="10"/>
+          </p:nvPr>
+        </p:nvSpPr>
+        <p:spPr/>
+        <p:txBody>
+          <a:bodyPr/>
+          <a:lstStyle/>
+          <a:p>
+            <a:fld id="{E6006AB3-B303-49B7-80DE-AE281F223BBD}" type="slidenum">
+              <a:rPr lang="en-US" smtClean="0"/>
+              <a:t>25</a:t>
+            </a:fld>
+            <a:endParaRPr lang="en-US"/>
+          </a:p>
+        </p:txBody>
+      </p:sp>
+    </p:spTree>
+    <p:extLst>
+      <p:ext uri="{BB962C8B-B14F-4D97-AF65-F5344CB8AC3E}">
+        <p14:creationId xmlns:p14="http://schemas.microsoft.com/office/powerpoint/2010/main" val="2349625907"/>
+      </p:ext>
+    </p:extLst>
+  </p:cSld>
+  <p:clrMapOvr>
+    <a:masterClrMapping/>
+  </p:clrMapOvr>
+</p:notes>
+</file>
+
+<file path=ppt/notesSlides/notesSlide4.xml><?xml version="1.0" encoding="utf-8"?>
+<p:notes xmlns:a="http://schemas.openxmlformats.org/drawingml/2006/main" xmlns:r="http://schemas.openxmlformats.org/officeDocument/2006/relationships" xmlns:p="http://schemas.openxmlformats.org/presentationml/2006/main">
+  <p:cSld>
+    <p:spTree>
+      <p:nvGrpSpPr>
+        <p:cNvPr id="1" name=""/>
+        <p:cNvGrpSpPr/>
+        <p:nvPr/>
+      </p:nvGrpSpPr>
+      <p:grpSpPr>
+        <a:xfrm>
+          <a:off x="0" y="0"/>
+          <a:ext cx="0" cy="0"/>
+          <a:chOff x="0" y="0"/>
+          <a:chExt cx="0" cy="0"/>
+        </a:xfrm>
+      </p:grpSpPr>
+      <p:sp>
+        <p:nvSpPr>
+          <p:cNvPr id="2" name="Slide Image Placeholder 1"/>
+          <p:cNvSpPr>
+            <a:spLocks noGrp="1" noRot="1" noChangeAspect="1"/>
+          </p:cNvSpPr>
+          <p:nvPr>
+            <p:ph type="sldImg"/>
+          </p:nvPr>
+        </p:nvSpPr>
+        <p:spPr/>
+      </p:sp>
+      <p:sp>
+        <p:nvSpPr>
+          <p:cNvPr id="3" name="Notes Placeholder 2"/>
+          <p:cNvSpPr>
+            <a:spLocks noGrp="1"/>
+          </p:cNvSpPr>
+          <p:nvPr>
+            <p:ph type="body" idx="1"/>
+          </p:nvPr>
+        </p:nvSpPr>
+        <p:spPr/>
+        <p:txBody>
+          <a:bodyPr/>
+          <a:lstStyle/>
+          <a:p>
+            <a:r>
+              <a:rPr lang="en-US" dirty="0"/>
+              <a:t>Scripts 020 through ???</a:t>
+            </a:r>
+          </a:p>
+        </p:txBody>
+      </p:sp>
+      <p:sp>
+        <p:nvSpPr>
+          <p:cNvPr id="4" name="Slide Number Placeholder 3"/>
+          <p:cNvSpPr>
+            <a:spLocks noGrp="1"/>
+          </p:cNvSpPr>
+          <p:nvPr>
+            <p:ph type="sldNum" sz="quarter" idx="10"/>
+          </p:nvPr>
+        </p:nvSpPr>
+        <p:spPr/>
+        <p:txBody>
+          <a:bodyPr/>
+          <a:lstStyle/>
+          <a:p>
+            <a:fld id="{FF7EEA9B-F69F-4E8E-9D98-532317352FF8}" type="slidenum">
+              <a:rPr lang="en-US" smtClean="0"/>
+              <a:t>27</a:t>
+            </a:fld>
+            <a:endParaRPr lang="en-US"/>
+          </a:p>
+        </p:txBody>
+      </p:sp>
+    </p:spTree>
+    <p:extLst>
+      <p:ext uri="{BB962C8B-B14F-4D97-AF65-F5344CB8AC3E}">
+        <p14:creationId xmlns:p14="http://schemas.microsoft.com/office/powerpoint/2010/main" val="643600282"/>
+      </p:ext>
+    </p:extLst>
+  </p:cSld>
+  <p:clrMapOvr>
+    <a:masterClrMapping/>
+  </p:clrMapOvr>
+</p:notes>
+</file>
+
+<file path=ppt/notesSlides/notesSlide5.xml><?xml version="1.0" encoding="utf-8"?>
+<p:notes xmlns:a="http://schemas.openxmlformats.org/drawingml/2006/main" xmlns:r="http://schemas.openxmlformats.org/officeDocument/2006/relationships" xmlns:p="http://schemas.openxmlformats.org/presentationml/2006/main">
+  <p:cSld>
+    <p:spTree>
+      <p:nvGrpSpPr>
+        <p:cNvPr id="1" name=""/>
+        <p:cNvGrpSpPr/>
+        <p:nvPr/>
+      </p:nvGrpSpPr>
+      <p:grpSpPr>
+        <a:xfrm>
+          <a:off x="0" y="0"/>
+          <a:ext cx="0" cy="0"/>
+          <a:chOff x="0" y="0"/>
+          <a:chExt cx="0" cy="0"/>
+        </a:xfrm>
+      </p:grpSpPr>
+      <p:sp>
+        <p:nvSpPr>
+          <p:cNvPr id="2" name="Slide Image Placeholder 1"/>
+          <p:cNvSpPr>
+            <a:spLocks noGrp="1" noRot="1" noChangeAspect="1"/>
+          </p:cNvSpPr>
+          <p:nvPr>
+            <p:ph type="sldImg"/>
+          </p:nvPr>
+        </p:nvSpPr>
+        <p:spPr/>
+      </p:sp>
+      <p:sp>
+        <p:nvSpPr>
+          <p:cNvPr id="3" name="Notes Placeholder 2"/>
+          <p:cNvSpPr>
+            <a:spLocks noGrp="1"/>
+          </p:cNvSpPr>
+          <p:nvPr>
+            <p:ph type="body" idx="1"/>
+          </p:nvPr>
+        </p:nvSpPr>
+        <p:spPr/>
+        <p:txBody>
+          <a:bodyPr/>
+          <a:lstStyle/>
+          <a:p>
+            <a:r>
+              <a:rPr lang="en-US" dirty="0"/>
+              <a:t>Scripts 020 through ???</a:t>
+            </a:r>
+          </a:p>
+        </p:txBody>
+      </p:sp>
+      <p:sp>
+        <p:nvSpPr>
+          <p:cNvPr id="4" name="Slide Number Placeholder 3"/>
+          <p:cNvSpPr>
+            <a:spLocks noGrp="1"/>
+          </p:cNvSpPr>
+          <p:nvPr>
+            <p:ph type="sldNum" sz="quarter" idx="10"/>
+          </p:nvPr>
+        </p:nvSpPr>
+        <p:spPr/>
+        <p:txBody>
+          <a:bodyPr/>
+          <a:lstStyle/>
+          <a:p>
+            <a:fld id="{FF7EEA9B-F69F-4E8E-9D98-532317352FF8}" type="slidenum">
+              <a:rPr lang="en-US" smtClean="0"/>
+              <a:t>29</a:t>
+            </a:fld>
+            <a:endParaRPr lang="en-US"/>
+          </a:p>
+        </p:txBody>
+      </p:sp>
+    </p:spTree>
+    <p:extLst>
+      <p:ext uri="{BB962C8B-B14F-4D97-AF65-F5344CB8AC3E}">
+        <p14:creationId xmlns:p14="http://schemas.microsoft.com/office/powerpoint/2010/main" val="350657029"/>
+      </p:ext>
+    </p:extLst>
+  </p:cSld>
+  <p:clrMapOvr>
+    <a:masterClrMapping/>
+  </p:clrMapOvr>
+</p:notes>
+</file>
+
+<file path=ppt/notesSlides/notesSlide6.xml><?xml version="1.0" encoding="utf-8"?>
+<p:notes xmlns:a="http://schemas.openxmlformats.org/drawingml/2006/main" xmlns:r="http://schemas.openxmlformats.org/officeDocument/2006/relationships" xmlns:p="http://schemas.openxmlformats.org/presentationml/2006/main">
+  <p:cSld>
+    <p:spTree>
+      <p:nvGrpSpPr>
+        <p:cNvPr id="1" name=""/>
+        <p:cNvGrpSpPr/>
+        <p:nvPr/>
+      </p:nvGrpSpPr>
+      <p:grpSpPr>
+        <a:xfrm>
+          <a:off x="0" y="0"/>
+          <a:ext cx="0" cy="0"/>
+          <a:chOff x="0" y="0"/>
+          <a:chExt cx="0" cy="0"/>
+        </a:xfrm>
+      </p:grpSpPr>
+      <p:sp>
+        <p:nvSpPr>
+          <p:cNvPr id="2" name="Slide Image Placeholder 1"/>
+          <p:cNvSpPr>
+            <a:spLocks noGrp="1" noRot="1" noChangeAspect="1"/>
+          </p:cNvSpPr>
+          <p:nvPr>
+            <p:ph type="sldImg"/>
+          </p:nvPr>
+        </p:nvSpPr>
+        <p:spPr/>
+      </p:sp>
+      <p:sp>
+        <p:nvSpPr>
+          <p:cNvPr id="3" name="Notes Placeholder 2"/>
+          <p:cNvSpPr>
+            <a:spLocks noGrp="1"/>
+          </p:cNvSpPr>
+          <p:nvPr>
+            <p:ph type="body" idx="1"/>
+          </p:nvPr>
+        </p:nvSpPr>
+        <p:spPr/>
+        <p:txBody>
+          <a:bodyPr/>
+          <a:lstStyle/>
+          <a:p>
+            <a:r>
+              <a:rPr lang="en-US" dirty="0"/>
               <a:t>Auto-truncate mode means that the database (1) is in the Simple recovery model, or no</a:t>
             </a:r>
             <a:r>
@@ -940,7 +1202,7 @@
           <a:p>
             <a:fld id="{ADDBA41D-AE03-4F1C-B074-B56312AFAE46}" type="slidenum">
               <a:rPr lang="en-US" smtClean="0"/>
-              <a:t>38</a:t>
+              <a:t>39</a:t>
             </a:fld>
             <a:endParaRPr lang="en-US"/>
           </a:p>
@@ -950,6 +1212,267 @@
     <p:extLst>
       <p:ext uri="{BB962C8B-B14F-4D97-AF65-F5344CB8AC3E}">
         <p14:creationId xmlns:p14="http://schemas.microsoft.com/office/powerpoint/2010/main" val="3529904622"/>
+      </p:ext>
+    </p:extLst>
+  </p:cSld>
+  <p:clrMapOvr>
+    <a:masterClrMapping/>
+  </p:clrMapOvr>
+</p:notes>
+</file>
+
+<file path=ppt/notesSlides/notesSlide7.xml><?xml version="1.0" encoding="utf-8"?>
+<p:notes xmlns:a="http://schemas.openxmlformats.org/drawingml/2006/main" xmlns:r="http://schemas.openxmlformats.org/officeDocument/2006/relationships" xmlns:p="http://schemas.openxmlformats.org/presentationml/2006/main">
+  <p:cSld>
+    <p:spTree>
+      <p:nvGrpSpPr>
+        <p:cNvPr id="1" name=""/>
+        <p:cNvGrpSpPr/>
+        <p:nvPr/>
+      </p:nvGrpSpPr>
+      <p:grpSpPr>
+        <a:xfrm>
+          <a:off x="0" y="0"/>
+          <a:ext cx="0" cy="0"/>
+          <a:chOff x="0" y="0"/>
+          <a:chExt cx="0" cy="0"/>
+        </a:xfrm>
+      </p:grpSpPr>
+      <p:sp>
+        <p:nvSpPr>
+          <p:cNvPr id="2" name="Slide Image Placeholder 1"/>
+          <p:cNvSpPr>
+            <a:spLocks noGrp="1" noRot="1" noChangeAspect="1"/>
+          </p:cNvSpPr>
+          <p:nvPr>
+            <p:ph type="sldImg"/>
+          </p:nvPr>
+        </p:nvSpPr>
+        <p:spPr/>
+      </p:sp>
+      <p:sp>
+        <p:nvSpPr>
+          <p:cNvPr id="3" name="Notes Placeholder 2"/>
+          <p:cNvSpPr>
+            <a:spLocks noGrp="1"/>
+          </p:cNvSpPr>
+          <p:nvPr>
+            <p:ph type="body" idx="1"/>
+          </p:nvPr>
+        </p:nvSpPr>
+        <p:spPr/>
+        <p:txBody>
+          <a:bodyPr/>
+          <a:lstStyle/>
+          <a:p>
+            <a:r>
+              <a:rPr lang="en-US" dirty="0"/>
+              <a:t>Scripts 020 through ???</a:t>
+            </a:r>
+          </a:p>
+        </p:txBody>
+      </p:sp>
+      <p:sp>
+        <p:nvSpPr>
+          <p:cNvPr id="4" name="Slide Number Placeholder 3"/>
+          <p:cNvSpPr>
+            <a:spLocks noGrp="1"/>
+          </p:cNvSpPr>
+          <p:nvPr>
+            <p:ph type="sldNum" sz="quarter" idx="10"/>
+          </p:nvPr>
+        </p:nvSpPr>
+        <p:spPr/>
+        <p:txBody>
+          <a:bodyPr/>
+          <a:lstStyle/>
+          <a:p>
+            <a:fld id="{FF7EEA9B-F69F-4E8E-9D98-532317352FF8}" type="slidenum">
+              <a:rPr lang="en-US" smtClean="0"/>
+              <a:t>40</a:t>
+            </a:fld>
+            <a:endParaRPr lang="en-US"/>
+          </a:p>
+        </p:txBody>
+      </p:sp>
+    </p:spTree>
+    <p:extLst>
+      <p:ext uri="{BB962C8B-B14F-4D97-AF65-F5344CB8AC3E}">
+        <p14:creationId xmlns:p14="http://schemas.microsoft.com/office/powerpoint/2010/main" val="1801400904"/>
+      </p:ext>
+    </p:extLst>
+  </p:cSld>
+  <p:clrMapOvr>
+    <a:masterClrMapping/>
+  </p:clrMapOvr>
+</p:notes>
+</file>
+
+<file path=ppt/notesSlides/notesSlide8.xml><?xml version="1.0" encoding="utf-8"?>
+<p:notes xmlns:a="http://schemas.openxmlformats.org/drawingml/2006/main" xmlns:r="http://schemas.openxmlformats.org/officeDocument/2006/relationships" xmlns:p="http://schemas.openxmlformats.org/presentationml/2006/main">
+  <p:cSld>
+    <p:spTree>
+      <p:nvGrpSpPr>
+        <p:cNvPr id="1" name=""/>
+        <p:cNvGrpSpPr/>
+        <p:nvPr/>
+      </p:nvGrpSpPr>
+      <p:grpSpPr>
+        <a:xfrm>
+          <a:off x="0" y="0"/>
+          <a:ext cx="0" cy="0"/>
+          <a:chOff x="0" y="0"/>
+          <a:chExt cx="0" cy="0"/>
+        </a:xfrm>
+      </p:grpSpPr>
+      <p:sp>
+        <p:nvSpPr>
+          <p:cNvPr id="2" name="Slide Image Placeholder 1"/>
+          <p:cNvSpPr>
+            <a:spLocks noGrp="1" noRot="1" noChangeAspect="1"/>
+          </p:cNvSpPr>
+          <p:nvPr>
+            <p:ph type="sldImg"/>
+          </p:nvPr>
+        </p:nvSpPr>
+        <p:spPr/>
+      </p:sp>
+      <p:sp>
+        <p:nvSpPr>
+          <p:cNvPr id="3" name="Notes Placeholder 2"/>
+          <p:cNvSpPr>
+            <a:spLocks noGrp="1"/>
+          </p:cNvSpPr>
+          <p:nvPr>
+            <p:ph type="body" idx="1"/>
+          </p:nvPr>
+        </p:nvSpPr>
+        <p:spPr/>
+        <p:txBody>
+          <a:bodyPr/>
+          <a:lstStyle/>
+          <a:p>
+            <a:r>
+              <a:rPr lang="en-US" dirty="0"/>
+              <a:t>Scripts 020 through ???</a:t>
+            </a:r>
+          </a:p>
+        </p:txBody>
+      </p:sp>
+      <p:sp>
+        <p:nvSpPr>
+          <p:cNvPr id="4" name="Slide Number Placeholder 3"/>
+          <p:cNvSpPr>
+            <a:spLocks noGrp="1"/>
+          </p:cNvSpPr>
+          <p:nvPr>
+            <p:ph type="sldNum" sz="quarter" idx="10"/>
+          </p:nvPr>
+        </p:nvSpPr>
+        <p:spPr/>
+        <p:txBody>
+          <a:bodyPr/>
+          <a:lstStyle/>
+          <a:p>
+            <a:fld id="{FF7EEA9B-F69F-4E8E-9D98-532317352FF8}" type="slidenum">
+              <a:rPr lang="en-US" smtClean="0"/>
+              <a:t>48</a:t>
+            </a:fld>
+            <a:endParaRPr lang="en-US"/>
+          </a:p>
+        </p:txBody>
+      </p:sp>
+    </p:spTree>
+    <p:extLst>
+      <p:ext uri="{BB962C8B-B14F-4D97-AF65-F5344CB8AC3E}">
+        <p14:creationId xmlns:p14="http://schemas.microsoft.com/office/powerpoint/2010/main" val="4104969536"/>
+      </p:ext>
+    </p:extLst>
+  </p:cSld>
+  <p:clrMapOvr>
+    <a:masterClrMapping/>
+  </p:clrMapOvr>
+</p:notes>
+</file>
+
+<file path=ppt/notesSlides/notesSlide9.xml><?xml version="1.0" encoding="utf-8"?>
+<p:notes xmlns:a="http://schemas.openxmlformats.org/drawingml/2006/main" xmlns:r="http://schemas.openxmlformats.org/officeDocument/2006/relationships" xmlns:p="http://schemas.openxmlformats.org/presentationml/2006/main">
+  <p:cSld>
+    <p:spTree>
+      <p:nvGrpSpPr>
+        <p:cNvPr id="1" name=""/>
+        <p:cNvGrpSpPr/>
+        <p:nvPr/>
+      </p:nvGrpSpPr>
+      <p:grpSpPr>
+        <a:xfrm>
+          <a:off x="0" y="0"/>
+          <a:ext cx="0" cy="0"/>
+          <a:chOff x="0" y="0"/>
+          <a:chExt cx="0" cy="0"/>
+        </a:xfrm>
+      </p:grpSpPr>
+      <p:sp>
+        <p:nvSpPr>
+          <p:cNvPr id="2" name="Slide Image Placeholder 1"/>
+          <p:cNvSpPr>
+            <a:spLocks noGrp="1" noRot="1" noChangeAspect="1"/>
+          </p:cNvSpPr>
+          <p:nvPr>
+            <p:ph type="sldImg"/>
+          </p:nvPr>
+        </p:nvSpPr>
+        <p:spPr/>
+      </p:sp>
+      <p:sp>
+        <p:nvSpPr>
+          <p:cNvPr id="3" name="Notes Placeholder 2"/>
+          <p:cNvSpPr>
+            <a:spLocks noGrp="1"/>
+          </p:cNvSpPr>
+          <p:nvPr>
+            <p:ph type="body" idx="1"/>
+          </p:nvPr>
+        </p:nvSpPr>
+        <p:spPr/>
+        <p:txBody>
+          <a:bodyPr/>
+          <a:lstStyle/>
+          <a:p>
+            <a:r>
+              <a:rPr lang="en-US" dirty="0"/>
+              <a:t>Scripts 020 through ???</a:t>
+            </a:r>
+          </a:p>
+        </p:txBody>
+      </p:sp>
+      <p:sp>
+        <p:nvSpPr>
+          <p:cNvPr id="4" name="Slide Number Placeholder 3"/>
+          <p:cNvSpPr>
+            <a:spLocks noGrp="1"/>
+          </p:cNvSpPr>
+          <p:nvPr>
+            <p:ph type="sldNum" sz="quarter" idx="10"/>
+          </p:nvPr>
+        </p:nvSpPr>
+        <p:spPr/>
+        <p:txBody>
+          <a:bodyPr/>
+          <a:lstStyle/>
+          <a:p>
+            <a:fld id="{FF7EEA9B-F69F-4E8E-9D98-532317352FF8}" type="slidenum">
+              <a:rPr lang="en-US" smtClean="0"/>
+              <a:t>52</a:t>
+            </a:fld>
+            <a:endParaRPr lang="en-US"/>
+          </a:p>
+        </p:txBody>
+      </p:sp>
+    </p:spTree>
+    <p:extLst>
+      <p:ext uri="{BB962C8B-B14F-4D97-AF65-F5344CB8AC3E}">
+        <p14:creationId xmlns:p14="http://schemas.microsoft.com/office/powerpoint/2010/main" val="147987204"/>
       </p:ext>
     </p:extLst>
   </p:cSld>
@@ -1993,7 +2516,7 @@
           <a:graphicData uri="http://schemas.openxmlformats.org/presentationml/2006/ole">
             <mc:AlternateContent xmlns:mc="http://schemas.openxmlformats.org/markup-compatibility/2006">
               <mc:Choice xmlns:v="urn:schemas-microsoft-com:vml" Requires="v">
-                <p:oleObj spid="_x0000_s1047" name="Image" r:id="rId10" imgW="2279520" imgH="1310400" progId="Photoshop.Image.18">
+                <p:oleObj spid="_x0000_s1048" name="Image" r:id="rId10" imgW="2279520" imgH="1310400" progId="Photoshop.Image.18">
                   <p:embed/>
                 </p:oleObj>
               </mc:Choice>
@@ -5821,7 +6344,13 @@
       </p:grpSpPr>
       <p:sp>
         <p:nvSpPr>
-          <p:cNvPr id="2" name="Title 1"/>
+          <p:cNvPr id="2" name="Title 1">
+            <a:extLst>
+              <a:ext uri="{FF2B5EF4-FFF2-40B4-BE49-F238E27FC236}">
+                <a16:creationId xmlns:a16="http://schemas.microsoft.com/office/drawing/2014/main" id="{FEF5F440-7918-4A6B-9C7C-C25F5B4AB5DD}"/>
+              </a:ext>
+            </a:extLst>
+          </p:cNvPr>
           <p:cNvSpPr>
             <a:spLocks noGrp="1"/>
           </p:cNvSpPr>
@@ -5843,7 +6372,13 @@
       </p:sp>
       <p:sp>
         <p:nvSpPr>
-          <p:cNvPr id="3" name="Content Placeholder 2"/>
+          <p:cNvPr id="3" name="Content Placeholder 2">
+            <a:extLst>
+              <a:ext uri="{FF2B5EF4-FFF2-40B4-BE49-F238E27FC236}">
+                <a16:creationId xmlns:a16="http://schemas.microsoft.com/office/drawing/2014/main" id="{9E20F2C1-4D76-4D3B-8502-4FA0575D48CD}"/>
+              </a:ext>
+            </a:extLst>
+          </p:cNvPr>
           <p:cNvSpPr>
             <a:spLocks noGrp="1"/>
           </p:cNvSpPr>
@@ -5851,9 +6386,16 @@
             <p:ph idx="1"/>
           </p:nvPr>
         </p:nvSpPr>
-        <p:spPr/>
-        <p:txBody>
-          <a:bodyPr/>
+        <p:spPr>
+          <a:xfrm>
+            <a:off x="640106" y="1302682"/>
+            <a:ext cx="8123055" cy="4405846"/>
+          </a:xfrm>
+        </p:spPr>
+        <p:txBody>
+          <a:bodyPr>
+            <a:normAutofit/>
+          </a:bodyPr>
           <a:lstStyle/>
           <a:p>
             <a:r>
@@ -5865,22 +6407,22 @@
       </p:sp>
       <p:pic>
         <p:nvPicPr>
-          <p:cNvPr id="4" name="Picture 3"/>
+          <p:cNvPr id="5" name="Picture 4"/>
           <p:cNvPicPr>
             <a:picLocks noChangeAspect="1"/>
           </p:cNvPicPr>
           <p:nvPr/>
         </p:nvPicPr>
         <p:blipFill>
-          <a:blip r:embed="rId2"/>
+          <a:blip r:embed="rId3"/>
           <a:stretch>
             <a:fillRect/>
           </a:stretch>
         </p:blipFill>
         <p:spPr>
           <a:xfrm>
-            <a:off x="2161159" y="1561932"/>
-            <a:ext cx="7198170" cy="3356311"/>
+            <a:off x="493776" y="2011680"/>
+            <a:ext cx="8666495" cy="4032504"/>
           </a:xfrm>
           <a:prstGeom prst="rect">
             <a:avLst/>
@@ -5890,7 +6432,7 @@
     </p:spTree>
     <p:extLst>
       <p:ext uri="{BB962C8B-B14F-4D97-AF65-F5344CB8AC3E}">
-        <p14:creationId xmlns:p14="http://schemas.microsoft.com/office/powerpoint/2010/main" val="3535187058"/>
+        <p14:creationId xmlns:p14="http://schemas.microsoft.com/office/powerpoint/2010/main" val="3578620822"/>
       </p:ext>
     </p:extLst>
   </p:cSld>
@@ -6202,13 +6744,8 @@
           <a:p>
             <a:r>
               <a:rPr lang="en-US" dirty="0"/>
-              <a:t>	</a:t>
-            </a:r>
-            <a:r>
-              <a:rPr lang="en-US"/>
-              <a:t>	+ Log File Visualizer</a:t>
-            </a:r>
-            <a:endParaRPr lang="en-US" dirty="0"/>
+              <a:t>		+ Log File Visualizer</a:t>
+            </a:r>
           </a:p>
         </p:txBody>
       </p:sp>
@@ -6268,6 +6805,129 @@
       </p:grpSpPr>
       <p:sp>
         <p:nvSpPr>
+          <p:cNvPr id="2" name="Title 1">
+            <a:extLst>
+              <a:ext uri="{FF2B5EF4-FFF2-40B4-BE49-F238E27FC236}">
+                <a16:creationId xmlns:a16="http://schemas.microsoft.com/office/drawing/2014/main" id="{FEF5F440-7918-4A6B-9C7C-C25F5B4AB5DD}"/>
+              </a:ext>
+            </a:extLst>
+          </p:cNvPr>
+          <p:cNvSpPr>
+            <a:spLocks noGrp="1"/>
+          </p:cNvSpPr>
+          <p:nvPr>
+            <p:ph type="title"/>
+          </p:nvPr>
+        </p:nvSpPr>
+        <p:spPr/>
+        <p:txBody>
+          <a:bodyPr/>
+          <a:lstStyle/>
+          <a:p>
+            <a:r>
+              <a:rPr lang="en-US" dirty="0"/>
+              <a:t>Demo</a:t>
+            </a:r>
+          </a:p>
+        </p:txBody>
+      </p:sp>
+      <p:sp>
+        <p:nvSpPr>
+          <p:cNvPr id="3" name="Content Placeholder 2">
+            <a:extLst>
+              <a:ext uri="{FF2B5EF4-FFF2-40B4-BE49-F238E27FC236}">
+                <a16:creationId xmlns:a16="http://schemas.microsoft.com/office/drawing/2014/main" id="{9E20F2C1-4D76-4D3B-8502-4FA0575D48CD}"/>
+              </a:ext>
+            </a:extLst>
+          </p:cNvPr>
+          <p:cNvSpPr>
+            <a:spLocks noGrp="1"/>
+          </p:cNvSpPr>
+          <p:nvPr>
+            <p:ph idx="1"/>
+          </p:nvPr>
+        </p:nvSpPr>
+        <p:spPr>
+          <a:xfrm>
+            <a:off x="640106" y="1302682"/>
+            <a:ext cx="8123055" cy="4405846"/>
+          </a:xfrm>
+        </p:spPr>
+        <p:txBody>
+          <a:bodyPr>
+            <a:normAutofit/>
+          </a:bodyPr>
+          <a:lstStyle/>
+          <a:p>
+            <a:r>
+              <a:rPr lang="en-US" dirty="0"/>
+              <a:t>DBCC LOGINFO</a:t>
+            </a:r>
+          </a:p>
+          <a:p>
+            <a:r>
+              <a:rPr lang="en-US" dirty="0"/>
+              <a:t>		+ Log File Visualizer</a:t>
+            </a:r>
+          </a:p>
+        </p:txBody>
+      </p:sp>
+      <p:pic>
+        <p:nvPicPr>
+          <p:cNvPr id="5" name="Picture 4"/>
+          <p:cNvPicPr>
+            <a:picLocks noChangeAspect="1"/>
+          </p:cNvPicPr>
+          <p:nvPr/>
+        </p:nvPicPr>
+        <p:blipFill>
+          <a:blip r:embed="rId3"/>
+          <a:stretch>
+            <a:fillRect/>
+          </a:stretch>
+        </p:blipFill>
+        <p:spPr>
+          <a:xfrm>
+            <a:off x="493776" y="2011680"/>
+            <a:ext cx="8666495" cy="4032504"/>
+          </a:xfrm>
+          <a:prstGeom prst="rect">
+            <a:avLst/>
+          </a:prstGeom>
+        </p:spPr>
+      </p:pic>
+    </p:spTree>
+    <p:extLst>
+      <p:ext uri="{BB962C8B-B14F-4D97-AF65-F5344CB8AC3E}">
+        <p14:creationId xmlns:p14="http://schemas.microsoft.com/office/powerpoint/2010/main" val="3068166840"/>
+      </p:ext>
+    </p:extLst>
+  </p:cSld>
+  <p:clrMapOvr>
+    <a:masterClrMapping/>
+  </p:clrMapOvr>
+</p:sld>
+</file>
+
+<file path=ppt/slides/slide28.xml><?xml version="1.0" encoding="utf-8"?>
+<p:sld xmlns:a="http://schemas.openxmlformats.org/drawingml/2006/main" xmlns:r="http://schemas.openxmlformats.org/officeDocument/2006/relationships" xmlns:p="http://schemas.openxmlformats.org/presentationml/2006/main">
+  <p:cSld>
+    <p:spTree>
+      <p:nvGrpSpPr>
+        <p:cNvPr id="1" name=""/>
+        <p:cNvGrpSpPr/>
+        <p:nvPr/>
+      </p:nvGrpSpPr>
+      <p:grpSpPr>
+        <a:xfrm>
+          <a:off x="0" y="0"/>
+          <a:ext cx="0" cy="0"/>
+          <a:chOff x="0" y="0"/>
+          <a:chExt cx="0" cy="0"/>
+        </a:xfrm>
+      </p:grpSpPr>
+      <p:sp>
+        <p:nvSpPr>
           <p:cNvPr id="2" name="Title 1"/>
           <p:cNvSpPr>
             <a:spLocks noGrp="1"/>
@@ -6372,105 +7032,6 @@
 </p:sld>
 </file>
 
-<file path=ppt/slides/slide28.xml><?xml version="1.0" encoding="utf-8"?>
-<p:sld xmlns:a="http://schemas.openxmlformats.org/drawingml/2006/main" xmlns:r="http://schemas.openxmlformats.org/officeDocument/2006/relationships" xmlns:p="http://schemas.openxmlformats.org/presentationml/2006/main">
-  <p:cSld>
-    <p:spTree>
-      <p:nvGrpSpPr>
-        <p:cNvPr id="1" name=""/>
-        <p:cNvGrpSpPr/>
-        <p:nvPr/>
-      </p:nvGrpSpPr>
-      <p:grpSpPr>
-        <a:xfrm>
-          <a:off x="0" y="0"/>
-          <a:ext cx="0" cy="0"/>
-          <a:chOff x="0" y="0"/>
-          <a:chExt cx="0" cy="0"/>
-        </a:xfrm>
-      </p:grpSpPr>
-      <p:sp>
-        <p:nvSpPr>
-          <p:cNvPr id="2" name="Title 1"/>
-          <p:cNvSpPr>
-            <a:spLocks noGrp="1"/>
-          </p:cNvSpPr>
-          <p:nvPr>
-            <p:ph type="title"/>
-          </p:nvPr>
-        </p:nvSpPr>
-        <p:spPr/>
-        <p:txBody>
-          <a:bodyPr/>
-          <a:lstStyle/>
-          <a:p>
-            <a:r>
-              <a:rPr lang="en-US" dirty="0"/>
-              <a:t>Demo</a:t>
-            </a:r>
-          </a:p>
-        </p:txBody>
-      </p:sp>
-      <p:sp>
-        <p:nvSpPr>
-          <p:cNvPr id="3" name="Content Placeholder 2"/>
-          <p:cNvSpPr>
-            <a:spLocks noGrp="1"/>
-          </p:cNvSpPr>
-          <p:nvPr>
-            <p:ph idx="1"/>
-          </p:nvPr>
-        </p:nvSpPr>
-        <p:spPr/>
-        <p:txBody>
-          <a:bodyPr/>
-          <a:lstStyle/>
-          <a:p>
-            <a:r>
-              <a:rPr lang="en-US" dirty="0" err="1"/>
-              <a:t>fn_dblog</a:t>
-            </a:r>
-            <a:endParaRPr lang="en-US" dirty="0"/>
-          </a:p>
-        </p:txBody>
-      </p:sp>
-      <p:pic>
-        <p:nvPicPr>
-          <p:cNvPr id="4" name="Picture 3"/>
-          <p:cNvPicPr>
-            <a:picLocks noChangeAspect="1"/>
-          </p:cNvPicPr>
-          <p:nvPr/>
-        </p:nvPicPr>
-        <p:blipFill>
-          <a:blip r:embed="rId2"/>
-          <a:stretch>
-            <a:fillRect/>
-          </a:stretch>
-        </p:blipFill>
-        <p:spPr>
-          <a:xfrm>
-            <a:off x="2161159" y="1561932"/>
-            <a:ext cx="7198170" cy="3356311"/>
-          </a:xfrm>
-          <a:prstGeom prst="rect">
-            <a:avLst/>
-          </a:prstGeom>
-        </p:spPr>
-      </p:pic>
-    </p:spTree>
-    <p:extLst>
-      <p:ext uri="{BB962C8B-B14F-4D97-AF65-F5344CB8AC3E}">
-        <p14:creationId xmlns:p14="http://schemas.microsoft.com/office/powerpoint/2010/main" val="964295781"/>
-      </p:ext>
-    </p:extLst>
-  </p:cSld>
-  <p:clrMapOvr>
-    <a:masterClrMapping/>
-  </p:clrMapOvr>
-</p:sld>
-</file>
-
 <file path=ppt/slides/slide29.xml><?xml version="1.0" encoding="utf-8"?>
 <p:sld xmlns:a="http://schemas.openxmlformats.org/drawingml/2006/main" xmlns:r="http://schemas.openxmlformats.org/officeDocument/2006/relationships" xmlns:p="http://schemas.openxmlformats.org/presentationml/2006/main">
   <p:cSld>
@@ -6490,7 +7051,13 @@
       </p:grpSpPr>
       <p:sp>
         <p:nvSpPr>
-          <p:cNvPr id="2" name="Title 1"/>
+          <p:cNvPr id="2" name="Title 1">
+            <a:extLst>
+              <a:ext uri="{FF2B5EF4-FFF2-40B4-BE49-F238E27FC236}">
+                <a16:creationId xmlns:a16="http://schemas.microsoft.com/office/drawing/2014/main" id="{FEF5F440-7918-4A6B-9C7C-C25F5B4AB5DD}"/>
+              </a:ext>
+            </a:extLst>
+          </p:cNvPr>
           <p:cNvSpPr>
             <a:spLocks noGrp="1"/>
           </p:cNvSpPr>
@@ -6505,14 +7072,20 @@
           <a:p>
             <a:r>
               <a:rPr lang="en-US" dirty="0"/>
-              <a:t>Related command/function</a:t>
-            </a:r>
-          </a:p>
-        </p:txBody>
-      </p:sp>
-      <p:sp>
-        <p:nvSpPr>
-          <p:cNvPr id="3" name="Content Placeholder 2"/>
+              <a:t>Demo</a:t>
+            </a:r>
+          </a:p>
+        </p:txBody>
+      </p:sp>
+      <p:sp>
+        <p:nvSpPr>
+          <p:cNvPr id="3" name="Content Placeholder 2">
+            <a:extLst>
+              <a:ext uri="{FF2B5EF4-FFF2-40B4-BE49-F238E27FC236}">
+                <a16:creationId xmlns:a16="http://schemas.microsoft.com/office/drawing/2014/main" id="{9E20F2C1-4D76-4D3B-8502-4FA0575D48CD}"/>
+              </a:ext>
+            </a:extLst>
+          </p:cNvPr>
           <p:cNvSpPr>
             <a:spLocks noGrp="1"/>
           </p:cNvSpPr>
@@ -6520,65 +7093,54 @@
             <p:ph idx="1"/>
           </p:nvPr>
         </p:nvSpPr>
-        <p:spPr/>
-        <p:txBody>
-          <a:bodyPr/>
-          <a:lstStyle/>
-          <a:p>
-            <a:pPr marL="571500" indent="-571500">
-              <a:buFont typeface="Arial" panose="020B0604020202020204" pitchFamily="34" charset="0"/>
-              <a:buChar char="•"/>
-            </a:pPr>
-            <a:r>
-              <a:rPr lang="en-US" dirty="0"/>
-              <a:t>DBCC SQLPERF(LOGSPACE)</a:t>
-            </a:r>
-          </a:p>
-          <a:p>
-            <a:pPr marL="1033227" lvl="1" indent="-457200">
-              <a:buFont typeface="Arial" panose="020B0604020202020204" pitchFamily="34" charset="0"/>
-              <a:buChar char="•"/>
-            </a:pPr>
-            <a:r>
-              <a:rPr lang="en-US" dirty="0"/>
-              <a:t>Log size, percent used per database</a:t>
-            </a:r>
-          </a:p>
-          <a:p>
-            <a:pPr marL="571500" indent="-571500">
-              <a:buFont typeface="Arial" panose="020B0604020202020204" pitchFamily="34" charset="0"/>
-              <a:buChar char="•"/>
-            </a:pPr>
-            <a:r>
-              <a:rPr lang="en-US" dirty="0" err="1"/>
-              <a:t>fn_dump_dblog</a:t>
-            </a:r>
-            <a:endParaRPr lang="en-US" dirty="0"/>
-          </a:p>
-          <a:p>
-            <a:pPr marL="1033227" lvl="1" indent="-457200">
-              <a:buFont typeface="Arial" panose="020B0604020202020204" pitchFamily="34" charset="0"/>
-              <a:buChar char="•"/>
-            </a:pPr>
-            <a:r>
-              <a:rPr lang="en-US" dirty="0"/>
-              <a:t>Similar to </a:t>
-            </a:r>
+        <p:spPr>
+          <a:xfrm>
+            <a:off x="640106" y="1302682"/>
+            <a:ext cx="8123055" cy="4405846"/>
+          </a:xfrm>
+        </p:spPr>
+        <p:txBody>
+          <a:bodyPr>
+            <a:normAutofit/>
+          </a:bodyPr>
+          <a:lstStyle/>
+          <a:p>
             <a:r>
               <a:rPr lang="en-US" dirty="0" err="1"/>
               <a:t>fn_dblog</a:t>
             </a:r>
-            <a:r>
-              <a:rPr lang="en-US" dirty="0"/>
-              <a:t>, but reads from backup file</a:t>
-            </a:r>
-          </a:p>
-        </p:txBody>
-      </p:sp>
+            <a:endParaRPr lang="en-US" dirty="0"/>
+          </a:p>
+        </p:txBody>
+      </p:sp>
+      <p:pic>
+        <p:nvPicPr>
+          <p:cNvPr id="5" name="Picture 4"/>
+          <p:cNvPicPr>
+            <a:picLocks noChangeAspect="1"/>
+          </p:cNvPicPr>
+          <p:nvPr/>
+        </p:nvPicPr>
+        <p:blipFill>
+          <a:blip r:embed="rId3"/>
+          <a:stretch>
+            <a:fillRect/>
+          </a:stretch>
+        </p:blipFill>
+        <p:spPr>
+          <a:xfrm>
+            <a:off x="493776" y="2011680"/>
+            <a:ext cx="8666495" cy="4032504"/>
+          </a:xfrm>
+          <a:prstGeom prst="rect">
+            <a:avLst/>
+          </a:prstGeom>
+        </p:spPr>
+      </p:pic>
     </p:spTree>
     <p:extLst>
       <p:ext uri="{BB962C8B-B14F-4D97-AF65-F5344CB8AC3E}">
-        <p14:creationId xmlns:p14="http://schemas.microsoft.com/office/powerpoint/2010/main" val="1422630287"/>
+        <p14:creationId xmlns:p14="http://schemas.microsoft.com/office/powerpoint/2010/main" val="3858891275"/>
       </p:ext>
     </p:extLst>
   </p:cSld>
@@ -6750,7 +7312,7 @@
           <a:p>
             <a:r>
               <a:rPr lang="en-US" dirty="0"/>
-              <a:t>Checkpoint</a:t>
+              <a:t>Related command/function</a:t>
             </a:r>
           </a:p>
         </p:txBody>
@@ -6776,7 +7338,7 @@
             </a:pPr>
             <a:r>
               <a:rPr lang="en-US" dirty="0"/>
-              <a:t>Process of writing dirty pages from the buffer pool to disk</a:t>
+              <a:t>DBCC SQLPERF(LOGSPACE)</a:t>
             </a:r>
           </a:p>
           <a:p>
@@ -6786,18 +7348,44 @@
             </a:pPr>
             <a:r>
               <a:rPr lang="en-US" dirty="0"/>
-              <a:t>Irrespective of transaction completion</a:t>
-            </a:r>
-          </a:p>
-          <a:p>
+              <a:t>Log size, percent used per database</a:t>
+            </a:r>
+          </a:p>
+          <a:p>
+            <a:pPr marL="571500" indent="-571500">
+              <a:buFont typeface="Arial" panose="020B0604020202020204" pitchFamily="34" charset="0"/>
+              <a:buChar char="•"/>
+            </a:pPr>
+            <a:r>
+              <a:rPr lang="en-US" dirty="0" err="1"/>
+              <a:t>fn_dump_dblog</a:t>
+            </a:r>
             <a:endParaRPr lang="en-US" dirty="0"/>
+          </a:p>
+          <a:p>
+            <a:pPr marL="1033227" lvl="1" indent="-457200">
+              <a:buFont typeface="Arial" panose="020B0604020202020204" pitchFamily="34" charset="0"/>
+              <a:buChar char="•"/>
+            </a:pPr>
+            <a:r>
+              <a:rPr lang="en-US" dirty="0"/>
+              <a:t>Similar to </a:t>
+            </a:r>
+            <a:r>
+              <a:rPr lang="en-US" dirty="0" err="1"/>
+              <a:t>fn_dblog</a:t>
+            </a:r>
+            <a:r>
+              <a:rPr lang="en-US" dirty="0"/>
+              <a:t>, but reads from backup file</a:t>
+            </a:r>
           </a:p>
         </p:txBody>
       </p:sp>
     </p:spTree>
     <p:extLst>
       <p:ext uri="{BB962C8B-B14F-4D97-AF65-F5344CB8AC3E}">
-        <p14:creationId xmlns:p14="http://schemas.microsoft.com/office/powerpoint/2010/main" val="2574264670"/>
+        <p14:creationId xmlns:p14="http://schemas.microsoft.com/office/powerpoint/2010/main" val="1422630287"/>
       </p:ext>
     </p:extLst>
   </p:cSld>
@@ -6841,6 +7429,97 @@
           <a:p>
             <a:r>
               <a:rPr lang="en-US" dirty="0"/>
+              <a:t>Checkpoint</a:t>
+            </a:r>
+          </a:p>
+        </p:txBody>
+      </p:sp>
+      <p:sp>
+        <p:nvSpPr>
+          <p:cNvPr id="3" name="Content Placeholder 2"/>
+          <p:cNvSpPr>
+            <a:spLocks noGrp="1"/>
+          </p:cNvSpPr>
+          <p:nvPr>
+            <p:ph idx="1"/>
+          </p:nvPr>
+        </p:nvSpPr>
+        <p:spPr/>
+        <p:txBody>
+          <a:bodyPr/>
+          <a:lstStyle/>
+          <a:p>
+            <a:pPr marL="571500" indent="-571500">
+              <a:buFont typeface="Arial" panose="020B0604020202020204" pitchFamily="34" charset="0"/>
+              <a:buChar char="•"/>
+            </a:pPr>
+            <a:r>
+              <a:rPr lang="en-US" dirty="0"/>
+              <a:t>Process of writing dirty pages from the buffer pool to disk</a:t>
+            </a:r>
+          </a:p>
+          <a:p>
+            <a:pPr marL="1033227" lvl="1" indent="-457200">
+              <a:buFont typeface="Arial" panose="020B0604020202020204" pitchFamily="34" charset="0"/>
+              <a:buChar char="•"/>
+            </a:pPr>
+            <a:r>
+              <a:rPr lang="en-US" dirty="0"/>
+              <a:t>Irrespective of transaction completion</a:t>
+            </a:r>
+          </a:p>
+          <a:p>
+            <a:endParaRPr lang="en-US" dirty="0"/>
+          </a:p>
+        </p:txBody>
+      </p:sp>
+    </p:spTree>
+    <p:extLst>
+      <p:ext uri="{BB962C8B-B14F-4D97-AF65-F5344CB8AC3E}">
+        <p14:creationId xmlns:p14="http://schemas.microsoft.com/office/powerpoint/2010/main" val="2574264670"/>
+      </p:ext>
+    </p:extLst>
+  </p:cSld>
+  <p:clrMapOvr>
+    <a:masterClrMapping/>
+  </p:clrMapOvr>
+</p:sld>
+</file>
+
+<file path=ppt/slides/slide32.xml><?xml version="1.0" encoding="utf-8"?>
+<p:sld xmlns:a="http://schemas.openxmlformats.org/drawingml/2006/main" xmlns:r="http://schemas.openxmlformats.org/officeDocument/2006/relationships" xmlns:p="http://schemas.openxmlformats.org/presentationml/2006/main">
+  <p:cSld>
+    <p:spTree>
+      <p:nvGrpSpPr>
+        <p:cNvPr id="1" name=""/>
+        <p:cNvGrpSpPr/>
+        <p:nvPr/>
+      </p:nvGrpSpPr>
+      <p:grpSpPr>
+        <a:xfrm>
+          <a:off x="0" y="0"/>
+          <a:ext cx="0" cy="0"/>
+          <a:chOff x="0" y="0"/>
+          <a:chExt cx="0" cy="0"/>
+        </a:xfrm>
+      </p:grpSpPr>
+      <p:sp>
+        <p:nvSpPr>
+          <p:cNvPr id="2" name="Title 1"/>
+          <p:cNvSpPr>
+            <a:spLocks noGrp="1"/>
+          </p:cNvSpPr>
+          <p:nvPr>
+            <p:ph type="title"/>
+          </p:nvPr>
+        </p:nvSpPr>
+        <p:spPr/>
+        <p:txBody>
+          <a:bodyPr/>
+          <a:lstStyle/>
+          <a:p>
+            <a:r>
+              <a:rPr lang="en-US" dirty="0"/>
               <a:t>Checkpoint Types</a:t>
             </a:r>
           </a:p>
@@ -7214,7 +7893,7 @@
 </p:sld>
 </file>
 
-<file path=ppt/slides/slide32.xml><?xml version="1.0" encoding="utf-8"?>
+<file path=ppt/slides/slide33.xml><?xml version="1.0" encoding="utf-8"?>
 <p:sld xmlns:a="http://schemas.openxmlformats.org/drawingml/2006/main" xmlns:r="http://schemas.openxmlformats.org/officeDocument/2006/relationships" xmlns:p="http://schemas.openxmlformats.org/presentationml/2006/main" show="0">
   <p:cSld>
     <p:spTree>
@@ -7357,134 +8036,6 @@
     <p:extLst>
       <p:ext uri="{BB962C8B-B14F-4D97-AF65-F5344CB8AC3E}">
         <p14:creationId xmlns:p14="http://schemas.microsoft.com/office/powerpoint/2010/main" val="2693807859"/>
-      </p:ext>
-    </p:extLst>
-  </p:cSld>
-  <p:clrMapOvr>
-    <a:masterClrMapping/>
-  </p:clrMapOvr>
-</p:sld>
-</file>
-
-<file path=ppt/slides/slide33.xml><?xml version="1.0" encoding="utf-8"?>
-<p:sld xmlns:a="http://schemas.openxmlformats.org/drawingml/2006/main" xmlns:r="http://schemas.openxmlformats.org/officeDocument/2006/relationships" xmlns:p="http://schemas.openxmlformats.org/presentationml/2006/main">
-  <p:cSld>
-    <p:spTree>
-      <p:nvGrpSpPr>
-        <p:cNvPr id="1" name=""/>
-        <p:cNvGrpSpPr/>
-        <p:nvPr/>
-      </p:nvGrpSpPr>
-      <p:grpSpPr>
-        <a:xfrm>
-          <a:off x="0" y="0"/>
-          <a:ext cx="0" cy="0"/>
-          <a:chOff x="0" y="0"/>
-          <a:chExt cx="0" cy="0"/>
-        </a:xfrm>
-      </p:grpSpPr>
-      <p:sp>
-        <p:nvSpPr>
-          <p:cNvPr id="2" name="Title 1"/>
-          <p:cNvSpPr>
-            <a:spLocks noGrp="1"/>
-          </p:cNvSpPr>
-          <p:nvPr>
-            <p:ph type="title"/>
-          </p:nvPr>
-        </p:nvSpPr>
-        <p:spPr/>
-        <p:txBody>
-          <a:bodyPr/>
-          <a:lstStyle/>
-          <a:p>
-            <a:r>
-              <a:rPr lang="en-US" dirty="0"/>
-              <a:t>Flushing the Log</a:t>
-            </a:r>
-          </a:p>
-        </p:txBody>
-      </p:sp>
-      <p:sp>
-        <p:nvSpPr>
-          <p:cNvPr id="3" name="Content Placeholder 2"/>
-          <p:cNvSpPr>
-            <a:spLocks noGrp="1"/>
-          </p:cNvSpPr>
-          <p:nvPr>
-            <p:ph idx="1"/>
-          </p:nvPr>
-        </p:nvSpPr>
-        <p:spPr/>
-        <p:txBody>
-          <a:bodyPr/>
-          <a:lstStyle/>
-          <a:p>
-            <a:pPr marL="571500" indent="-571500">
-              <a:buFont typeface="Arial" panose="020B0604020202020204" pitchFamily="34" charset="0"/>
-              <a:buChar char="•"/>
-            </a:pPr>
-            <a:r>
-              <a:rPr lang="en-US" dirty="0"/>
-              <a:t>Flushing = closing a log block</a:t>
-            </a:r>
-          </a:p>
-          <a:p>
-            <a:pPr marL="571500" indent="-571500">
-              <a:buFont typeface="Arial" panose="020B0604020202020204" pitchFamily="34" charset="0"/>
-              <a:buChar char="•"/>
-            </a:pPr>
-            <a:r>
-              <a:rPr lang="en-US" dirty="0"/>
-              <a:t>Triggers</a:t>
-            </a:r>
-          </a:p>
-          <a:p>
-            <a:pPr marL="1033227" lvl="1" indent="-457200">
-              <a:buFont typeface="Arial" panose="020B0604020202020204" pitchFamily="34" charset="0"/>
-              <a:buChar char="•"/>
-            </a:pPr>
-            <a:r>
-              <a:rPr lang="en-US" dirty="0"/>
-              <a:t>60K limit reached</a:t>
-            </a:r>
-          </a:p>
-          <a:p>
-            <a:pPr marL="1033227" lvl="1" indent="-457200">
-              <a:buFont typeface="Arial" panose="020B0604020202020204" pitchFamily="34" charset="0"/>
-              <a:buChar char="•"/>
-            </a:pPr>
-            <a:r>
-              <a:rPr lang="en-US" dirty="0"/>
-              <a:t>Transaction commits</a:t>
-            </a:r>
-          </a:p>
-          <a:p>
-            <a:pPr marL="1033227" lvl="1" indent="-457200">
-              <a:buFont typeface="Arial" panose="020B0604020202020204" pitchFamily="34" charset="0"/>
-              <a:buChar char="•"/>
-            </a:pPr>
-            <a:r>
-              <a:rPr lang="en-US" dirty="0"/>
-              <a:t>Transaction rollbacks</a:t>
-            </a:r>
-          </a:p>
-          <a:p>
-            <a:pPr marL="1033227" lvl="1" indent="-457200">
-              <a:buFont typeface="Arial" panose="020B0604020202020204" pitchFamily="34" charset="0"/>
-              <a:buChar char="•"/>
-            </a:pPr>
-            <a:r>
-              <a:rPr lang="en-US" dirty="0"/>
-              <a:t>Checkpoint</a:t>
-            </a:r>
-          </a:p>
-        </p:txBody>
-      </p:sp>
-    </p:spTree>
-    <p:extLst>
-      <p:ext uri="{BB962C8B-B14F-4D97-AF65-F5344CB8AC3E}">
-        <p14:creationId xmlns:p14="http://schemas.microsoft.com/office/powerpoint/2010/main" val="3377537013"/>
       </p:ext>
     </p:extLst>
   </p:cSld>
@@ -7528,7 +8079,7 @@
           <a:p>
             <a:r>
               <a:rPr lang="en-US" dirty="0"/>
-              <a:t>Recovery Models</a:t>
+              <a:t>Flushing the Log</a:t>
             </a:r>
           </a:p>
         </p:txBody>
@@ -7545,9 +8096,7 @@
         </p:nvSpPr>
         <p:spPr/>
         <p:txBody>
-          <a:bodyPr>
-            <a:normAutofit/>
-          </a:bodyPr>
+          <a:bodyPr/>
           <a:lstStyle/>
           <a:p>
             <a:pPr marL="571500" indent="-571500">
@@ -7556,7 +8105,17 @@
             </a:pPr>
             <a:r>
               <a:rPr lang="en-US" dirty="0"/>
-              <a:t>Impacts how SQL logs changes</a:t>
+              <a:t>Flushing = closing a log block</a:t>
+            </a:r>
+          </a:p>
+          <a:p>
+            <a:pPr marL="571500" indent="-571500">
+              <a:buFont typeface="Arial" panose="020B0604020202020204" pitchFamily="34" charset="0"/>
+              <a:buChar char="•"/>
+            </a:pPr>
+            <a:r>
+              <a:rPr lang="en-US" dirty="0"/>
+              <a:t>Triggers</a:t>
             </a:r>
           </a:p>
           <a:p>
@@ -7566,7 +8125,7 @@
             </a:pPr>
             <a:r>
               <a:rPr lang="en-US" dirty="0"/>
-              <a:t>Simple</a:t>
+              <a:t>60K limit reached</a:t>
             </a:r>
           </a:p>
           <a:p>
@@ -7576,7 +8135,7 @@
             </a:pPr>
             <a:r>
               <a:rPr lang="en-US" dirty="0"/>
-              <a:t>Full</a:t>
+              <a:t>Transaction commits</a:t>
             </a:r>
           </a:p>
           <a:p>
@@ -7586,7 +8145,17 @@
             </a:pPr>
             <a:r>
               <a:rPr lang="en-US" dirty="0"/>
-              <a:t>Bulk-logged</a:t>
+              <a:t>Transaction rollbacks</a:t>
+            </a:r>
+          </a:p>
+          <a:p>
+            <a:pPr marL="1033227" lvl="1" indent="-457200">
+              <a:buFont typeface="Arial" panose="020B0604020202020204" pitchFamily="34" charset="0"/>
+              <a:buChar char="•"/>
+            </a:pPr>
+            <a:r>
+              <a:rPr lang="en-US" dirty="0"/>
+              <a:t>Checkpoint</a:t>
             </a:r>
           </a:p>
         </p:txBody>
@@ -7594,7 +8163,7 @@
     </p:spTree>
     <p:extLst>
       <p:ext uri="{BB962C8B-B14F-4D97-AF65-F5344CB8AC3E}">
-        <p14:creationId xmlns:p14="http://schemas.microsoft.com/office/powerpoint/2010/main" val="1914948786"/>
+        <p14:creationId xmlns:p14="http://schemas.microsoft.com/office/powerpoint/2010/main" val="3377537013"/>
       </p:ext>
     </p:extLst>
   </p:cSld>
@@ -7638,7 +8207,7 @@
           <a:p>
             <a:r>
               <a:rPr lang="en-US" dirty="0"/>
-              <a:t>Simple Recovery Model</a:t>
+              <a:t>Recovery Models</a:t>
             </a:r>
           </a:p>
         </p:txBody>
@@ -7666,7 +8235,7 @@
             </a:pPr>
             <a:r>
               <a:rPr lang="en-US" dirty="0"/>
-              <a:t>Commonly used for test systems or low-volume production systems</a:t>
+              <a:t>Impacts how SQL logs changes</a:t>
             </a:r>
           </a:p>
           <a:p>
@@ -7676,27 +8245,27 @@
             </a:pPr>
             <a:r>
               <a:rPr lang="en-US" dirty="0"/>
-              <a:t>What is your recovery point objective?</a:t>
-            </a:r>
-          </a:p>
-          <a:p>
-            <a:pPr marL="571500" indent="-571500">
-              <a:buFont typeface="Arial" panose="020B0604020202020204" pitchFamily="34" charset="0"/>
-              <a:buChar char="•"/>
-            </a:pPr>
-            <a:r>
-              <a:rPr lang="en-US" dirty="0"/>
-              <a:t>All changes logged, but can be “discarded” on commit</a:t>
-            </a:r>
-          </a:p>
-          <a:p>
-            <a:pPr marL="571500" indent="-571500">
-              <a:buFont typeface="Arial" panose="020B0604020202020204" pitchFamily="34" charset="0"/>
-              <a:buChar char="•"/>
-            </a:pPr>
-            <a:r>
-              <a:rPr lang="en-US" dirty="0"/>
-              <a:t>Can only recover to the latest full backup</a:t>
+              <a:t>Simple</a:t>
+            </a:r>
+          </a:p>
+          <a:p>
+            <a:pPr marL="1033227" lvl="1" indent="-457200">
+              <a:buFont typeface="Arial" panose="020B0604020202020204" pitchFamily="34" charset="0"/>
+              <a:buChar char="•"/>
+            </a:pPr>
+            <a:r>
+              <a:rPr lang="en-US" dirty="0"/>
+              <a:t>Full</a:t>
+            </a:r>
+          </a:p>
+          <a:p>
+            <a:pPr marL="1033227" lvl="1" indent="-457200">
+              <a:buFont typeface="Arial" panose="020B0604020202020204" pitchFamily="34" charset="0"/>
+              <a:buChar char="•"/>
+            </a:pPr>
+            <a:r>
+              <a:rPr lang="en-US" dirty="0"/>
+              <a:t>Bulk-logged</a:t>
             </a:r>
           </a:p>
         </p:txBody>
@@ -7704,7 +8273,7 @@
     </p:spTree>
     <p:extLst>
       <p:ext uri="{BB962C8B-B14F-4D97-AF65-F5344CB8AC3E}">
-        <p14:creationId xmlns:p14="http://schemas.microsoft.com/office/powerpoint/2010/main" val="1653144033"/>
+        <p14:creationId xmlns:p14="http://schemas.microsoft.com/office/powerpoint/2010/main" val="1914948786"/>
       </p:ext>
     </p:extLst>
   </p:cSld>
@@ -7748,7 +8317,7 @@
           <a:p>
             <a:r>
               <a:rPr lang="en-US" dirty="0"/>
-              <a:t>Full Recovery Model</a:t>
+              <a:t>Simple Recovery Model</a:t>
             </a:r>
           </a:p>
         </p:txBody>
@@ -7776,7 +8345,7 @@
             </a:pPr>
             <a:r>
               <a:rPr lang="en-US" dirty="0"/>
-              <a:t>Probably the most common recovery model for production systems</a:t>
+              <a:t>Commonly used for test systems or low-volume production systems</a:t>
             </a:r>
           </a:p>
           <a:p>
@@ -7796,7 +8365,7 @@
             </a:pPr>
             <a:r>
               <a:rPr lang="en-US" dirty="0"/>
-              <a:t>Log records must be kept until log backup completed</a:t>
+              <a:t>All changes logged, but can be “discarded” on commit</a:t>
             </a:r>
           </a:p>
           <a:p>
@@ -7806,7 +8375,7 @@
             </a:pPr>
             <a:r>
               <a:rPr lang="en-US" dirty="0"/>
-              <a:t>Can recover to an arbitrary point in time</a:t>
+              <a:t>Can only recover to the latest full backup</a:t>
             </a:r>
           </a:p>
         </p:txBody>
@@ -7814,7 +8383,7 @@
     </p:spTree>
     <p:extLst>
       <p:ext uri="{BB962C8B-B14F-4D97-AF65-F5344CB8AC3E}">
-        <p14:creationId xmlns:p14="http://schemas.microsoft.com/office/powerpoint/2010/main" val="1597510221"/>
+        <p14:creationId xmlns:p14="http://schemas.microsoft.com/office/powerpoint/2010/main" val="1653144033"/>
       </p:ext>
     </p:extLst>
   </p:cSld>
@@ -7858,7 +8427,7 @@
           <a:p>
             <a:r>
               <a:rPr lang="en-US" dirty="0"/>
-              <a:t>Bulk-logged Recovery Model</a:t>
+              <a:t>Full Recovery Model</a:t>
             </a:r>
           </a:p>
         </p:txBody>
@@ -7886,7 +8455,7 @@
             </a:pPr>
             <a:r>
               <a:rPr lang="en-US" dirty="0"/>
-              <a:t>Not frequently used, perhaps temporarily during maintenance windows</a:t>
+              <a:t>Probably the most common recovery model for production systems</a:t>
             </a:r>
           </a:p>
           <a:p>
@@ -7906,7 +8475,7 @@
             </a:pPr>
             <a:r>
               <a:rPr lang="en-US" dirty="0"/>
-              <a:t>Similar to full model, but some changes are only “noted” rather than fully logged</a:t>
+              <a:t>Log records must be kept until log backup completed</a:t>
             </a:r>
           </a:p>
           <a:p>
@@ -7916,17 +8485,7 @@
             </a:pPr>
             <a:r>
               <a:rPr lang="en-US" dirty="0"/>
-              <a:t>Log backups still include all changes</a:t>
-            </a:r>
-          </a:p>
-          <a:p>
-            <a:pPr marL="571500" indent="-571500">
-              <a:buFont typeface="Arial" panose="020B0604020202020204" pitchFamily="34" charset="0"/>
-              <a:buChar char="•"/>
-            </a:pPr>
-            <a:r>
-              <a:rPr lang="en-US" dirty="0"/>
-              <a:t>Point-in-time recovery not possible</a:t>
+              <a:t>Can recover to an arbitrary point in time</a:t>
             </a:r>
           </a:p>
         </p:txBody>
@@ -7934,7 +8493,7 @@
     </p:spTree>
     <p:extLst>
       <p:ext uri="{BB962C8B-B14F-4D97-AF65-F5344CB8AC3E}">
-        <p14:creationId xmlns:p14="http://schemas.microsoft.com/office/powerpoint/2010/main" val="3951071790"/>
+        <p14:creationId xmlns:p14="http://schemas.microsoft.com/office/powerpoint/2010/main" val="1597510221"/>
       </p:ext>
     </p:extLst>
   </p:cSld>
@@ -7978,7 +8537,7 @@
           <a:p>
             <a:r>
               <a:rPr lang="en-US" dirty="0"/>
-              <a:t>Clearing* the Log (aka Truncating*)</a:t>
+              <a:t>Bulk-logged Recovery Model</a:t>
             </a:r>
           </a:p>
         </p:txBody>
@@ -7993,15 +8552,10 @@
             <p:ph idx="1"/>
           </p:nvPr>
         </p:nvSpPr>
-        <p:spPr>
-          <a:xfrm>
-            <a:off x="361038" y="1111463"/>
-            <a:ext cx="10800000" cy="4554399"/>
-          </a:xfrm>
-        </p:spPr>
+        <p:spPr/>
         <p:txBody>
           <a:bodyPr>
-            <a:normAutofit fontScale="85000" lnSpcReduction="20000"/>
+            <a:normAutofit/>
           </a:bodyPr>
           <a:lstStyle/>
           <a:p>
@@ -8011,7 +8565,17 @@
             </a:pPr>
             <a:r>
               <a:rPr lang="en-US" dirty="0"/>
-              <a:t>Marks unneeded portions of log as inactive</a:t>
+              <a:t>Not frequently used, perhaps temporarily during maintenance windows</a:t>
+            </a:r>
+          </a:p>
+          <a:p>
+            <a:pPr marL="1033227" lvl="1" indent="-457200">
+              <a:buFont typeface="Arial" panose="020B0604020202020204" pitchFamily="34" charset="0"/>
+              <a:buChar char="•"/>
+            </a:pPr>
+            <a:r>
+              <a:rPr lang="en-US" dirty="0"/>
+              <a:t>What is your recovery point objective?</a:t>
             </a:r>
           </a:p>
           <a:p>
@@ -8021,37 +8585,7 @@
             </a:pPr>
             <a:r>
               <a:rPr lang="en-US" dirty="0"/>
-              <a:t>Triggers:</a:t>
-            </a:r>
-          </a:p>
-          <a:p>
-            <a:pPr marL="1033227" lvl="1" indent="-457200">
-              <a:buFont typeface="Arial" panose="020B0604020202020204" pitchFamily="34" charset="0"/>
-              <a:buChar char="•"/>
-            </a:pPr>
-            <a:r>
-              <a:rPr lang="en-US" dirty="0"/>
-              <a:t>Simple recovery**: Checkpoint</a:t>
-            </a:r>
-          </a:p>
-          <a:p>
-            <a:pPr marL="1033227" lvl="1" indent="-457200">
-              <a:buFont typeface="Arial" panose="020B0604020202020204" pitchFamily="34" charset="0"/>
-              <a:buChar char="•"/>
-            </a:pPr>
-            <a:r>
-              <a:rPr lang="en-US" dirty="0"/>
-              <a:t>Full/bulked-log: Log Backup</a:t>
-            </a:r>
-          </a:p>
-          <a:p>
-            <a:pPr marL="1033227" lvl="1" indent="-457200">
-              <a:buFont typeface="Arial" panose="020B0604020202020204" pitchFamily="34" charset="0"/>
-              <a:buChar char="•"/>
-            </a:pPr>
-            <a:r>
-              <a:rPr lang="en-US" dirty="0"/>
-              <a:t>Change from Full or Bulked Logged to Simple***</a:t>
+              <a:t>Similar to full model, but some changes are only “noted” rather than fully logged</a:t>
             </a:r>
           </a:p>
           <a:p>
@@ -8061,254 +8595,17 @@
             </a:pPr>
             <a:r>
               <a:rPr lang="en-US" dirty="0"/>
-              <a:t>Why can’t the log clear?</a:t>
-            </a:r>
-          </a:p>
-          <a:p>
-            <a:pPr marL="1033227" lvl="1" indent="-457200">
-              <a:buFont typeface="Arial" panose="020B0604020202020204" pitchFamily="34" charset="0"/>
-              <a:buChar char="•"/>
-            </a:pPr>
-            <a:r>
-              <a:rPr lang="en-US" dirty="0"/>
-              <a:t>Pending log backup</a:t>
-            </a:r>
-          </a:p>
-          <a:p>
-            <a:pPr marL="1033227" lvl="1" indent="-457200">
-              <a:buFont typeface="Arial" panose="020B0604020202020204" pitchFamily="34" charset="0"/>
-              <a:buChar char="•"/>
-            </a:pPr>
-            <a:r>
-              <a:rPr lang="en-US" dirty="0"/>
-              <a:t>Active replication / CDC / AG / mirroring</a:t>
-            </a:r>
-          </a:p>
-          <a:p>
-            <a:pPr marL="1033227" lvl="1" indent="-457200">
-              <a:buFont typeface="Arial" panose="020B0604020202020204" pitchFamily="34" charset="0"/>
-              <a:buChar char="•"/>
-            </a:pPr>
-            <a:r>
-              <a:rPr lang="en-US" dirty="0"/>
-              <a:t>Long-running transaction</a:t>
-            </a:r>
-          </a:p>
-          <a:p>
-            <a:pPr marL="1033227" lvl="1" indent="-457200">
-              <a:buFont typeface="Arial" panose="020B0604020202020204" pitchFamily="34" charset="0"/>
-              <a:buChar char="•"/>
-            </a:pPr>
-            <a:r>
-              <a:rPr lang="en-US" dirty="0"/>
-              <a:t>See </a:t>
-            </a:r>
-            <a:r>
-              <a:rPr lang="en-US" sz="1890" b="1" dirty="0" err="1">
-                <a:latin typeface="Courier New" panose="02070309020205020404" pitchFamily="49" charset="0"/>
-                <a:cs typeface="Courier New" panose="02070309020205020404" pitchFamily="49" charset="0"/>
-              </a:rPr>
-              <a:t>sys.databases.log_reuse_wait_desc</a:t>
-            </a:r>
-            <a:endParaRPr lang="en-US" sz="1890" b="1" dirty="0">
-              <a:latin typeface="Courier New" panose="02070309020205020404" pitchFamily="49" charset="0"/>
-              <a:cs typeface="Courier New" panose="02070309020205020404" pitchFamily="49" charset="0"/>
-            </a:endParaRPr>
-          </a:p>
-          <a:p>
-            <a:pPr lvl="1"/>
-            <a:endParaRPr lang="en-US" dirty="0"/>
-          </a:p>
-        </p:txBody>
-      </p:sp>
-      <p:sp>
-        <p:nvSpPr>
-          <p:cNvPr id="4" name="Content Placeholder 2"/>
-          <p:cNvSpPr txBox="1">
-            <a:spLocks/>
-          </p:cNvSpPr>
-          <p:nvPr/>
-        </p:nvSpPr>
-        <p:spPr>
-          <a:xfrm>
-            <a:off x="6213431" y="5016381"/>
-            <a:ext cx="4500170" cy="1283793"/>
-          </a:xfrm>
-          <a:prstGeom prst="rect">
-            <a:avLst/>
-          </a:prstGeom>
-          <a:ln>
-            <a:solidFill>
-              <a:schemeClr val="accent1"/>
-            </a:solidFill>
-          </a:ln>
-        </p:spPr>
-        <p:txBody>
-          <a:bodyPr vert="horz" lIns="86402" tIns="43201" rIns="86402" bIns="43201" rtlCol="0">
-            <a:normAutofit fontScale="92500" lnSpcReduction="10000"/>
-          </a:bodyPr>
-          <a:lstStyle>
-            <a:lvl1pPr marL="342900" indent="-342900" algn="l" defTabSz="457200" rtl="0" eaLnBrk="1" latinLnBrk="0" hangingPunct="1">
-              <a:spcBef>
-                <a:spcPct val="20000"/>
-              </a:spcBef>
-              <a:buFont typeface="Wingdings" charset="2"/>
-              <a:buChar char="§"/>
-              <a:defRPr sz="3000" kern="1200">
-                <a:solidFill>
-                  <a:schemeClr val="tx2"/>
-                </a:solidFill>
-                <a:latin typeface="+mn-lt"/>
-                <a:ea typeface="+mn-ea"/>
-                <a:cs typeface="+mn-cs"/>
-              </a:defRPr>
-            </a:lvl1pPr>
-            <a:lvl2pPr marL="742950" indent="-285750" algn="l" defTabSz="457200" rtl="0" eaLnBrk="1" latinLnBrk="0" hangingPunct="1">
-              <a:spcBef>
-                <a:spcPct val="20000"/>
-              </a:spcBef>
-              <a:buFont typeface="Wingdings" charset="2"/>
-              <a:buChar char="§"/>
-              <a:defRPr sz="2600" kern="1200">
-                <a:solidFill>
-                  <a:srgbClr val="474947"/>
-                </a:solidFill>
-                <a:latin typeface="+mn-lt"/>
-                <a:ea typeface="+mn-ea"/>
-                <a:cs typeface="+mn-cs"/>
-              </a:defRPr>
-            </a:lvl2pPr>
-            <a:lvl3pPr marL="1143000" indent="-228600" algn="l" defTabSz="457200" rtl="0" eaLnBrk="1" latinLnBrk="0" hangingPunct="1">
-              <a:spcBef>
-                <a:spcPct val="20000"/>
-              </a:spcBef>
-              <a:buFont typeface="Wingdings" charset="2"/>
-              <a:buChar char="§"/>
-              <a:defRPr sz="2200" kern="1200">
-                <a:solidFill>
-                  <a:srgbClr val="474947"/>
-                </a:solidFill>
-                <a:latin typeface="+mn-lt"/>
-                <a:ea typeface="+mn-ea"/>
-                <a:cs typeface="+mn-cs"/>
-              </a:defRPr>
-            </a:lvl3pPr>
-            <a:lvl4pPr marL="1600200" indent="-228600" algn="l" defTabSz="457200" rtl="0" eaLnBrk="1" latinLnBrk="0" hangingPunct="1">
-              <a:spcBef>
-                <a:spcPct val="20000"/>
-              </a:spcBef>
-              <a:buFont typeface="Wingdings" charset="2"/>
-              <a:buChar char="§"/>
-              <a:defRPr sz="2000" kern="1200">
-                <a:solidFill>
-                  <a:srgbClr val="474947"/>
-                </a:solidFill>
-                <a:latin typeface="+mn-lt"/>
-                <a:ea typeface="+mn-ea"/>
-                <a:cs typeface="+mn-cs"/>
-              </a:defRPr>
-            </a:lvl4pPr>
-            <a:lvl5pPr marL="2057400" indent="-228600" algn="l" defTabSz="457200" rtl="0" eaLnBrk="1" latinLnBrk="0" hangingPunct="1">
-              <a:spcBef>
-                <a:spcPct val="20000"/>
-              </a:spcBef>
-              <a:buFont typeface="Wingdings" charset="2"/>
-              <a:buChar char="§"/>
-              <a:defRPr sz="1800" kern="1200">
-                <a:solidFill>
-                  <a:srgbClr val="474947"/>
-                </a:solidFill>
-                <a:latin typeface="+mn-lt"/>
-                <a:ea typeface="+mn-ea"/>
-                <a:cs typeface="+mn-cs"/>
-              </a:defRPr>
-            </a:lvl5pPr>
-            <a:lvl6pPr marL="2514600" indent="-228600" algn="l" defTabSz="457200" rtl="0" eaLnBrk="1" latinLnBrk="0" hangingPunct="1">
-              <a:spcBef>
-                <a:spcPct val="20000"/>
-              </a:spcBef>
-              <a:buFont typeface="Arial"/>
-              <a:buChar char="•"/>
-              <a:defRPr sz="2000" kern="1200">
-                <a:solidFill>
-                  <a:schemeClr val="tx1"/>
-                </a:solidFill>
-                <a:latin typeface="+mn-lt"/>
-                <a:ea typeface="+mn-ea"/>
-                <a:cs typeface="+mn-cs"/>
-              </a:defRPr>
-            </a:lvl6pPr>
-            <a:lvl7pPr marL="2971800" indent="-228600" algn="l" defTabSz="457200" rtl="0" eaLnBrk="1" latinLnBrk="0" hangingPunct="1">
-              <a:spcBef>
-                <a:spcPct val="20000"/>
-              </a:spcBef>
-              <a:buFont typeface="Arial"/>
-              <a:buChar char="•"/>
-              <a:defRPr sz="2000" kern="1200">
-                <a:solidFill>
-                  <a:schemeClr val="tx1"/>
-                </a:solidFill>
-                <a:latin typeface="+mn-lt"/>
-                <a:ea typeface="+mn-ea"/>
-                <a:cs typeface="+mn-cs"/>
-              </a:defRPr>
-            </a:lvl7pPr>
-            <a:lvl8pPr marL="3429000" indent="-228600" algn="l" defTabSz="457200" rtl="0" eaLnBrk="1" latinLnBrk="0" hangingPunct="1">
-              <a:spcBef>
-                <a:spcPct val="20000"/>
-              </a:spcBef>
-              <a:buFont typeface="Arial"/>
-              <a:buChar char="•"/>
-              <a:defRPr sz="2000" kern="1200">
-                <a:solidFill>
-                  <a:schemeClr val="tx1"/>
-                </a:solidFill>
-                <a:latin typeface="+mn-lt"/>
-                <a:ea typeface="+mn-ea"/>
-                <a:cs typeface="+mn-cs"/>
-              </a:defRPr>
-            </a:lvl8pPr>
-            <a:lvl9pPr marL="3886200" indent="-228600" algn="l" defTabSz="457200" rtl="0" eaLnBrk="1" latinLnBrk="0" hangingPunct="1">
-              <a:spcBef>
-                <a:spcPct val="20000"/>
-              </a:spcBef>
-              <a:buFont typeface="Arial"/>
-              <a:buChar char="•"/>
-              <a:defRPr sz="2000" kern="1200">
-                <a:solidFill>
-                  <a:schemeClr val="tx1"/>
-                </a:solidFill>
-                <a:latin typeface="+mn-lt"/>
-                <a:ea typeface="+mn-ea"/>
-                <a:cs typeface="+mn-cs"/>
-              </a:defRPr>
-            </a:lvl9pPr>
-          </a:lstStyle>
-          <a:p>
-            <a:pPr marL="54001" indent="0">
-              <a:buNone/>
-            </a:pPr>
-            <a:r>
-              <a:rPr lang="en-US" sz="1701" dirty="0"/>
-              <a:t>* Horribly misnamed!  This process clears nothing and truncates nothing.</a:t>
-            </a:r>
-          </a:p>
-          <a:p>
-            <a:pPr marL="54001" indent="0">
-              <a:buNone/>
-            </a:pPr>
-            <a:r>
-              <a:rPr lang="en-US" sz="1701" dirty="0"/>
-              <a:t>** More technically, when in “auto-truncate” mode.</a:t>
-            </a:r>
-          </a:p>
-          <a:p>
-            <a:pPr marL="54001" indent="0">
-              <a:buNone/>
-            </a:pPr>
-            <a:r>
-              <a:rPr lang="en-US" sz="1701" dirty="0"/>
-              <a:t>*** But this breaks the backup chain!</a:t>
+              <a:t>Log backups still include all changes</a:t>
+            </a:r>
+          </a:p>
+          <a:p>
+            <a:pPr marL="571500" indent="-571500">
+              <a:buFont typeface="Arial" panose="020B0604020202020204" pitchFamily="34" charset="0"/>
+              <a:buChar char="•"/>
+            </a:pPr>
+            <a:r>
+              <a:rPr lang="en-US" dirty="0"/>
+              <a:t>Point-in-time recovery not possible</a:t>
             </a:r>
           </a:p>
         </p:txBody>
@@ -8316,7 +8613,7 @@
     </p:spTree>
     <p:extLst>
       <p:ext uri="{BB962C8B-B14F-4D97-AF65-F5344CB8AC3E}">
-        <p14:creationId xmlns:p14="http://schemas.microsoft.com/office/powerpoint/2010/main" val="2569046170"/>
+        <p14:creationId xmlns:p14="http://schemas.microsoft.com/office/powerpoint/2010/main" val="3951071790"/>
       </p:ext>
     </p:extLst>
   </p:cSld>
@@ -8360,7 +8657,7 @@
           <a:p>
             <a:r>
               <a:rPr lang="en-US" dirty="0"/>
-              <a:t>Demos</a:t>
+              <a:t>Clearing* the Log (aka Truncating*)</a:t>
             </a:r>
           </a:p>
         </p:txBody>
@@ -8375,55 +8672,330 @@
             <p:ph idx="1"/>
           </p:nvPr>
         </p:nvSpPr>
-        <p:spPr/>
-        <p:txBody>
-          <a:bodyPr/>
-          <a:lstStyle/>
-          <a:p>
-            <a:r>
-              <a:rPr lang="en-US" dirty="0"/>
-              <a:t>Simple recovery</a:t>
-            </a:r>
-          </a:p>
-          <a:p>
-            <a:r>
-              <a:rPr lang="en-US" dirty="0"/>
-              <a:t>Full recovery</a:t>
-            </a:r>
-          </a:p>
-          <a:p>
-            <a:endParaRPr lang="en-US" dirty="0"/>
-          </a:p>
-        </p:txBody>
-      </p:sp>
-      <p:pic>
-        <p:nvPicPr>
-          <p:cNvPr id="4" name="Picture 3"/>
-          <p:cNvPicPr>
-            <a:picLocks noChangeAspect="1"/>
-          </p:cNvPicPr>
-          <p:nvPr/>
-        </p:nvPicPr>
-        <p:blipFill>
-          <a:blip r:embed="rId2"/>
-          <a:stretch>
-            <a:fillRect/>
-          </a:stretch>
-        </p:blipFill>
         <p:spPr>
           <a:xfrm>
-            <a:off x="2231692" y="1861695"/>
-            <a:ext cx="7198170" cy="3356311"/>
+            <a:off x="361038" y="1111463"/>
+            <a:ext cx="10800000" cy="4554399"/>
+          </a:xfrm>
+        </p:spPr>
+        <p:txBody>
+          <a:bodyPr>
+            <a:normAutofit fontScale="85000" lnSpcReduction="20000"/>
+          </a:bodyPr>
+          <a:lstStyle/>
+          <a:p>
+            <a:pPr marL="571500" indent="-571500">
+              <a:buFont typeface="Arial" panose="020B0604020202020204" pitchFamily="34" charset="0"/>
+              <a:buChar char="•"/>
+            </a:pPr>
+            <a:r>
+              <a:rPr lang="en-US" dirty="0"/>
+              <a:t>Marks unneeded portions of log as inactive</a:t>
+            </a:r>
+          </a:p>
+          <a:p>
+            <a:pPr marL="571500" indent="-571500">
+              <a:buFont typeface="Arial" panose="020B0604020202020204" pitchFamily="34" charset="0"/>
+              <a:buChar char="•"/>
+            </a:pPr>
+            <a:r>
+              <a:rPr lang="en-US" dirty="0"/>
+              <a:t>Triggers:</a:t>
+            </a:r>
+          </a:p>
+          <a:p>
+            <a:pPr marL="1033227" lvl="1" indent="-457200">
+              <a:buFont typeface="Arial" panose="020B0604020202020204" pitchFamily="34" charset="0"/>
+              <a:buChar char="•"/>
+            </a:pPr>
+            <a:r>
+              <a:rPr lang="en-US" dirty="0"/>
+              <a:t>Simple recovery**: Checkpoint</a:t>
+            </a:r>
+          </a:p>
+          <a:p>
+            <a:pPr marL="1033227" lvl="1" indent="-457200">
+              <a:buFont typeface="Arial" panose="020B0604020202020204" pitchFamily="34" charset="0"/>
+              <a:buChar char="•"/>
+            </a:pPr>
+            <a:r>
+              <a:rPr lang="en-US" dirty="0"/>
+              <a:t>Full/bulked-log: Log Backup</a:t>
+            </a:r>
+          </a:p>
+          <a:p>
+            <a:pPr marL="1033227" lvl="1" indent="-457200">
+              <a:buFont typeface="Arial" panose="020B0604020202020204" pitchFamily="34" charset="0"/>
+              <a:buChar char="•"/>
+            </a:pPr>
+            <a:r>
+              <a:rPr lang="en-US" dirty="0"/>
+              <a:t>Change from Full or Bulked Logged to Simple***</a:t>
+            </a:r>
+          </a:p>
+          <a:p>
+            <a:pPr marL="571500" indent="-571500">
+              <a:buFont typeface="Arial" panose="020B0604020202020204" pitchFamily="34" charset="0"/>
+              <a:buChar char="•"/>
+            </a:pPr>
+            <a:r>
+              <a:rPr lang="en-US" dirty="0"/>
+              <a:t>Why can’t the log clear?</a:t>
+            </a:r>
+          </a:p>
+          <a:p>
+            <a:pPr marL="1033227" lvl="1" indent="-457200">
+              <a:buFont typeface="Arial" panose="020B0604020202020204" pitchFamily="34" charset="0"/>
+              <a:buChar char="•"/>
+            </a:pPr>
+            <a:r>
+              <a:rPr lang="en-US" dirty="0"/>
+              <a:t>Pending log backup</a:t>
+            </a:r>
+          </a:p>
+          <a:p>
+            <a:pPr marL="1033227" lvl="1" indent="-457200">
+              <a:buFont typeface="Arial" panose="020B0604020202020204" pitchFamily="34" charset="0"/>
+              <a:buChar char="•"/>
+            </a:pPr>
+            <a:r>
+              <a:rPr lang="en-US" dirty="0"/>
+              <a:t>Active replication / CDC / AG / mirroring</a:t>
+            </a:r>
+          </a:p>
+          <a:p>
+            <a:pPr marL="1033227" lvl="1" indent="-457200">
+              <a:buFont typeface="Arial" panose="020B0604020202020204" pitchFamily="34" charset="0"/>
+              <a:buChar char="•"/>
+            </a:pPr>
+            <a:r>
+              <a:rPr lang="en-US" dirty="0"/>
+              <a:t>Long-running transaction</a:t>
+            </a:r>
+          </a:p>
+          <a:p>
+            <a:pPr marL="1033227" lvl="1" indent="-457200">
+              <a:buFont typeface="Arial" panose="020B0604020202020204" pitchFamily="34" charset="0"/>
+              <a:buChar char="•"/>
+            </a:pPr>
+            <a:r>
+              <a:rPr lang="en-US" dirty="0"/>
+              <a:t>See </a:t>
+            </a:r>
+            <a:r>
+              <a:rPr lang="en-US" sz="1890" b="1" dirty="0" err="1">
+                <a:latin typeface="Courier New" panose="02070309020205020404" pitchFamily="49" charset="0"/>
+                <a:cs typeface="Courier New" panose="02070309020205020404" pitchFamily="49" charset="0"/>
+              </a:rPr>
+              <a:t>sys.databases.log_reuse_wait_desc</a:t>
+            </a:r>
+            <a:endParaRPr lang="en-US" sz="1890" b="1" dirty="0">
+              <a:latin typeface="Courier New" panose="02070309020205020404" pitchFamily="49" charset="0"/>
+              <a:cs typeface="Courier New" panose="02070309020205020404" pitchFamily="49" charset="0"/>
+            </a:endParaRPr>
+          </a:p>
+          <a:p>
+            <a:pPr lvl="1"/>
+            <a:endParaRPr lang="en-US" dirty="0"/>
+          </a:p>
+        </p:txBody>
+      </p:sp>
+      <p:sp>
+        <p:nvSpPr>
+          <p:cNvPr id="4" name="Content Placeholder 2"/>
+          <p:cNvSpPr txBox="1">
+            <a:spLocks/>
+          </p:cNvSpPr>
+          <p:nvPr/>
+        </p:nvSpPr>
+        <p:spPr>
+          <a:xfrm>
+            <a:off x="6213431" y="5016381"/>
+            <a:ext cx="4500170" cy="1283793"/>
           </a:xfrm>
           <a:prstGeom prst="rect">
             <a:avLst/>
           </a:prstGeom>
+          <a:ln>
+            <a:solidFill>
+              <a:schemeClr val="accent1"/>
+            </a:solidFill>
+          </a:ln>
         </p:spPr>
-      </p:pic>
+        <p:txBody>
+          <a:bodyPr vert="horz" lIns="86402" tIns="43201" rIns="86402" bIns="43201" rtlCol="0">
+            <a:normAutofit fontScale="92500" lnSpcReduction="10000"/>
+          </a:bodyPr>
+          <a:lstStyle>
+            <a:lvl1pPr marL="342900" indent="-342900" algn="l" defTabSz="457200" rtl="0" eaLnBrk="1" latinLnBrk="0" hangingPunct="1">
+              <a:spcBef>
+                <a:spcPct val="20000"/>
+              </a:spcBef>
+              <a:buFont typeface="Wingdings" charset="2"/>
+              <a:buChar char="§"/>
+              <a:defRPr sz="3000" kern="1200">
+                <a:solidFill>
+                  <a:schemeClr val="tx2"/>
+                </a:solidFill>
+                <a:latin typeface="+mn-lt"/>
+                <a:ea typeface="+mn-ea"/>
+                <a:cs typeface="+mn-cs"/>
+              </a:defRPr>
+            </a:lvl1pPr>
+            <a:lvl2pPr marL="742950" indent="-285750" algn="l" defTabSz="457200" rtl="0" eaLnBrk="1" latinLnBrk="0" hangingPunct="1">
+              <a:spcBef>
+                <a:spcPct val="20000"/>
+              </a:spcBef>
+              <a:buFont typeface="Wingdings" charset="2"/>
+              <a:buChar char="§"/>
+              <a:defRPr sz="2600" kern="1200">
+                <a:solidFill>
+                  <a:srgbClr val="474947"/>
+                </a:solidFill>
+                <a:latin typeface="+mn-lt"/>
+                <a:ea typeface="+mn-ea"/>
+                <a:cs typeface="+mn-cs"/>
+              </a:defRPr>
+            </a:lvl2pPr>
+            <a:lvl3pPr marL="1143000" indent="-228600" algn="l" defTabSz="457200" rtl="0" eaLnBrk="1" latinLnBrk="0" hangingPunct="1">
+              <a:spcBef>
+                <a:spcPct val="20000"/>
+              </a:spcBef>
+              <a:buFont typeface="Wingdings" charset="2"/>
+              <a:buChar char="§"/>
+              <a:defRPr sz="2200" kern="1200">
+                <a:solidFill>
+                  <a:srgbClr val="474947"/>
+                </a:solidFill>
+                <a:latin typeface="+mn-lt"/>
+                <a:ea typeface="+mn-ea"/>
+                <a:cs typeface="+mn-cs"/>
+              </a:defRPr>
+            </a:lvl3pPr>
+            <a:lvl4pPr marL="1600200" indent="-228600" algn="l" defTabSz="457200" rtl="0" eaLnBrk="1" latinLnBrk="0" hangingPunct="1">
+              <a:spcBef>
+                <a:spcPct val="20000"/>
+              </a:spcBef>
+              <a:buFont typeface="Wingdings" charset="2"/>
+              <a:buChar char="§"/>
+              <a:defRPr sz="2000" kern="1200">
+                <a:solidFill>
+                  <a:srgbClr val="474947"/>
+                </a:solidFill>
+                <a:latin typeface="+mn-lt"/>
+                <a:ea typeface="+mn-ea"/>
+                <a:cs typeface="+mn-cs"/>
+              </a:defRPr>
+            </a:lvl4pPr>
+            <a:lvl5pPr marL="2057400" indent="-228600" algn="l" defTabSz="457200" rtl="0" eaLnBrk="1" latinLnBrk="0" hangingPunct="1">
+              <a:spcBef>
+                <a:spcPct val="20000"/>
+              </a:spcBef>
+              <a:buFont typeface="Wingdings" charset="2"/>
+              <a:buChar char="§"/>
+              <a:defRPr sz="1800" kern="1200">
+                <a:solidFill>
+                  <a:srgbClr val="474947"/>
+                </a:solidFill>
+                <a:latin typeface="+mn-lt"/>
+                <a:ea typeface="+mn-ea"/>
+                <a:cs typeface="+mn-cs"/>
+              </a:defRPr>
+            </a:lvl5pPr>
+            <a:lvl6pPr marL="2514600" indent="-228600" algn="l" defTabSz="457200" rtl="0" eaLnBrk="1" latinLnBrk="0" hangingPunct="1">
+              <a:spcBef>
+                <a:spcPct val="20000"/>
+              </a:spcBef>
+              <a:buFont typeface="Arial"/>
+              <a:buChar char="•"/>
+              <a:defRPr sz="2000" kern="1200">
+                <a:solidFill>
+                  <a:schemeClr val="tx1"/>
+                </a:solidFill>
+                <a:latin typeface="+mn-lt"/>
+                <a:ea typeface="+mn-ea"/>
+                <a:cs typeface="+mn-cs"/>
+              </a:defRPr>
+            </a:lvl6pPr>
+            <a:lvl7pPr marL="2971800" indent="-228600" algn="l" defTabSz="457200" rtl="0" eaLnBrk="1" latinLnBrk="0" hangingPunct="1">
+              <a:spcBef>
+                <a:spcPct val="20000"/>
+              </a:spcBef>
+              <a:buFont typeface="Arial"/>
+              <a:buChar char="•"/>
+              <a:defRPr sz="2000" kern="1200">
+                <a:solidFill>
+                  <a:schemeClr val="tx1"/>
+                </a:solidFill>
+                <a:latin typeface="+mn-lt"/>
+                <a:ea typeface="+mn-ea"/>
+                <a:cs typeface="+mn-cs"/>
+              </a:defRPr>
+            </a:lvl7pPr>
+            <a:lvl8pPr marL="3429000" indent="-228600" algn="l" defTabSz="457200" rtl="0" eaLnBrk="1" latinLnBrk="0" hangingPunct="1">
+              <a:spcBef>
+                <a:spcPct val="20000"/>
+              </a:spcBef>
+              <a:buFont typeface="Arial"/>
+              <a:buChar char="•"/>
+              <a:defRPr sz="2000" kern="1200">
+                <a:solidFill>
+                  <a:schemeClr val="tx1"/>
+                </a:solidFill>
+                <a:latin typeface="+mn-lt"/>
+                <a:ea typeface="+mn-ea"/>
+                <a:cs typeface="+mn-cs"/>
+              </a:defRPr>
+            </a:lvl8pPr>
+            <a:lvl9pPr marL="3886200" indent="-228600" algn="l" defTabSz="457200" rtl="0" eaLnBrk="1" latinLnBrk="0" hangingPunct="1">
+              <a:spcBef>
+                <a:spcPct val="20000"/>
+              </a:spcBef>
+              <a:buFont typeface="Arial"/>
+              <a:buChar char="•"/>
+              <a:defRPr sz="2000" kern="1200">
+                <a:solidFill>
+                  <a:schemeClr val="tx1"/>
+                </a:solidFill>
+                <a:latin typeface="+mn-lt"/>
+                <a:ea typeface="+mn-ea"/>
+                <a:cs typeface="+mn-cs"/>
+              </a:defRPr>
+            </a:lvl9pPr>
+          </a:lstStyle>
+          <a:p>
+            <a:pPr marL="54001" indent="0">
+              <a:buNone/>
+            </a:pPr>
+            <a:r>
+              <a:rPr lang="en-US" sz="1701" dirty="0"/>
+              <a:t>* Horribly misnamed!  This process clears nothing and truncates nothing.</a:t>
+            </a:r>
+          </a:p>
+          <a:p>
+            <a:pPr marL="54001" indent="0">
+              <a:buNone/>
+            </a:pPr>
+            <a:r>
+              <a:rPr lang="en-US" sz="1701" dirty="0"/>
+              <a:t>** More technically, when in “auto-truncate” mode.</a:t>
+            </a:r>
+          </a:p>
+          <a:p>
+            <a:pPr marL="54001" indent="0">
+              <a:buNone/>
+            </a:pPr>
+            <a:r>
+              <a:rPr lang="en-US" sz="1701" dirty="0"/>
+              <a:t>*** But this breaks the backup chain!</a:t>
+            </a:r>
+          </a:p>
+        </p:txBody>
+      </p:sp>
     </p:spTree>
     <p:extLst>
       <p:ext uri="{BB962C8B-B14F-4D97-AF65-F5344CB8AC3E}">
-        <p14:creationId xmlns:p14="http://schemas.microsoft.com/office/powerpoint/2010/main" val="163400615"/>
+        <p14:creationId xmlns:p14="http://schemas.microsoft.com/office/powerpoint/2010/main" val="2569046170"/>
       </p:ext>
     </p:extLst>
   </p:cSld>
@@ -8632,6 +9204,129 @@
       </p:grpSpPr>
       <p:sp>
         <p:nvSpPr>
+          <p:cNvPr id="2" name="Title 1">
+            <a:extLst>
+              <a:ext uri="{FF2B5EF4-FFF2-40B4-BE49-F238E27FC236}">
+                <a16:creationId xmlns:a16="http://schemas.microsoft.com/office/drawing/2014/main" id="{FEF5F440-7918-4A6B-9C7C-C25F5B4AB5DD}"/>
+              </a:ext>
+            </a:extLst>
+          </p:cNvPr>
+          <p:cNvSpPr>
+            <a:spLocks noGrp="1"/>
+          </p:cNvSpPr>
+          <p:nvPr>
+            <p:ph type="title"/>
+          </p:nvPr>
+        </p:nvSpPr>
+        <p:spPr/>
+        <p:txBody>
+          <a:bodyPr/>
+          <a:lstStyle/>
+          <a:p>
+            <a:r>
+              <a:rPr lang="en-US" dirty="0"/>
+              <a:t>Demo</a:t>
+            </a:r>
+          </a:p>
+        </p:txBody>
+      </p:sp>
+      <p:sp>
+        <p:nvSpPr>
+          <p:cNvPr id="3" name="Content Placeholder 2">
+            <a:extLst>
+              <a:ext uri="{FF2B5EF4-FFF2-40B4-BE49-F238E27FC236}">
+                <a16:creationId xmlns:a16="http://schemas.microsoft.com/office/drawing/2014/main" id="{9E20F2C1-4D76-4D3B-8502-4FA0575D48CD}"/>
+              </a:ext>
+            </a:extLst>
+          </p:cNvPr>
+          <p:cNvSpPr>
+            <a:spLocks noGrp="1"/>
+          </p:cNvSpPr>
+          <p:nvPr>
+            <p:ph idx="1"/>
+          </p:nvPr>
+        </p:nvSpPr>
+        <p:spPr>
+          <a:xfrm>
+            <a:off x="640106" y="1302682"/>
+            <a:ext cx="8123055" cy="4405846"/>
+          </a:xfrm>
+        </p:spPr>
+        <p:txBody>
+          <a:bodyPr>
+            <a:normAutofit/>
+          </a:bodyPr>
+          <a:lstStyle/>
+          <a:p>
+            <a:r>
+              <a:rPr lang="en-US" dirty="0"/>
+              <a:t>Simple recovery</a:t>
+            </a:r>
+          </a:p>
+          <a:p>
+            <a:r>
+              <a:rPr lang="en-US" dirty="0"/>
+              <a:t>Full recovery</a:t>
+            </a:r>
+          </a:p>
+        </p:txBody>
+      </p:sp>
+      <p:pic>
+        <p:nvPicPr>
+          <p:cNvPr id="5" name="Picture 4"/>
+          <p:cNvPicPr>
+            <a:picLocks noChangeAspect="1"/>
+          </p:cNvPicPr>
+          <p:nvPr/>
+        </p:nvPicPr>
+        <p:blipFill>
+          <a:blip r:embed="rId3"/>
+          <a:stretch>
+            <a:fillRect/>
+          </a:stretch>
+        </p:blipFill>
+        <p:spPr>
+          <a:xfrm>
+            <a:off x="493776" y="2011680"/>
+            <a:ext cx="8666495" cy="4032504"/>
+          </a:xfrm>
+          <a:prstGeom prst="rect">
+            <a:avLst/>
+          </a:prstGeom>
+        </p:spPr>
+      </p:pic>
+    </p:spTree>
+    <p:extLst>
+      <p:ext uri="{BB962C8B-B14F-4D97-AF65-F5344CB8AC3E}">
+        <p14:creationId xmlns:p14="http://schemas.microsoft.com/office/powerpoint/2010/main" val="1948617342"/>
+      </p:ext>
+    </p:extLst>
+  </p:cSld>
+  <p:clrMapOvr>
+    <a:masterClrMapping/>
+  </p:clrMapOvr>
+</p:sld>
+</file>
+
+<file path=ppt/slides/slide41.xml><?xml version="1.0" encoding="utf-8"?>
+<p:sld xmlns:a="http://schemas.openxmlformats.org/drawingml/2006/main" xmlns:r="http://schemas.openxmlformats.org/officeDocument/2006/relationships" xmlns:p="http://schemas.openxmlformats.org/presentationml/2006/main">
+  <p:cSld>
+    <p:spTree>
+      <p:nvGrpSpPr>
+        <p:cNvPr id="1" name=""/>
+        <p:cNvGrpSpPr/>
+        <p:nvPr/>
+      </p:nvGrpSpPr>
+      <p:grpSpPr>
+        <a:xfrm>
+          <a:off x="0" y="0"/>
+          <a:ext cx="0" cy="0"/>
+          <a:chOff x="0" y="0"/>
+          <a:chExt cx="0" cy="0"/>
+        </a:xfrm>
+      </p:grpSpPr>
+      <p:sp>
+        <p:nvSpPr>
           <p:cNvPr id="2" name="Title 1"/>
           <p:cNvSpPr>
             <a:spLocks noGrp="1"/>
@@ -8751,7 +9446,7 @@
 </p:sld>
 </file>
 
-<file path=ppt/slides/slide41.xml><?xml version="1.0" encoding="utf-8"?>
+<file path=ppt/slides/slide42.xml><?xml version="1.0" encoding="utf-8"?>
 <p:sld xmlns:a="http://schemas.openxmlformats.org/drawingml/2006/main" xmlns:r="http://schemas.openxmlformats.org/officeDocument/2006/relationships" xmlns:p="http://schemas.openxmlformats.org/presentationml/2006/main">
   <p:cSld>
     <p:spTree>
@@ -8880,7 +9575,7 @@
 </p:sld>
 </file>
 
-<file path=ppt/slides/slide42.xml><?xml version="1.0" encoding="utf-8"?>
+<file path=ppt/slides/slide43.xml><?xml version="1.0" encoding="utf-8"?>
 <p:sld xmlns:a="http://schemas.openxmlformats.org/drawingml/2006/main" xmlns:r="http://schemas.openxmlformats.org/officeDocument/2006/relationships" xmlns:p="http://schemas.openxmlformats.org/presentationml/2006/main">
   <p:cSld>
     <p:spTree>
@@ -8999,7 +9694,7 @@
 </p:sld>
 </file>
 
-<file path=ppt/slides/slide43.xml><?xml version="1.0" encoding="utf-8"?>
+<file path=ppt/slides/slide44.xml><?xml version="1.0" encoding="utf-8"?>
 <p:sld xmlns:a="http://schemas.openxmlformats.org/drawingml/2006/main" xmlns:r="http://schemas.openxmlformats.org/officeDocument/2006/relationships" xmlns:p="http://schemas.openxmlformats.org/presentationml/2006/main">
   <p:cSld>
     <p:spTree>
@@ -9118,7 +9813,7 @@
 </p:sld>
 </file>
 
-<file path=ppt/slides/slide44.xml><?xml version="1.0" encoding="utf-8"?>
+<file path=ppt/slides/slide45.xml><?xml version="1.0" encoding="utf-8"?>
 <p:sld xmlns:a="http://schemas.openxmlformats.org/drawingml/2006/main" xmlns:r="http://schemas.openxmlformats.org/officeDocument/2006/relationships" xmlns:p="http://schemas.openxmlformats.org/presentationml/2006/main">
   <p:cSld>
     <p:spTree>
@@ -9227,7 +9922,7 @@
 </p:sld>
 </file>
 
-<file path=ppt/slides/slide45.xml><?xml version="1.0" encoding="utf-8"?>
+<file path=ppt/slides/slide46.xml><?xml version="1.0" encoding="utf-8"?>
 <p:sld xmlns:a="http://schemas.openxmlformats.org/drawingml/2006/main" xmlns:r="http://schemas.openxmlformats.org/officeDocument/2006/relationships" xmlns:p="http://schemas.openxmlformats.org/presentationml/2006/main">
   <p:cSld>
     <p:spTree>
@@ -9336,119 +10031,6 @@
 </p:sld>
 </file>
 
-<file path=ppt/slides/slide46.xml><?xml version="1.0" encoding="utf-8"?>
-<p:sld xmlns:a="http://schemas.openxmlformats.org/drawingml/2006/main" xmlns:r="http://schemas.openxmlformats.org/officeDocument/2006/relationships" xmlns:p="http://schemas.openxmlformats.org/presentationml/2006/main">
-  <p:cSld>
-    <p:spTree>
-      <p:nvGrpSpPr>
-        <p:cNvPr id="1" name=""/>
-        <p:cNvGrpSpPr/>
-        <p:nvPr/>
-      </p:nvGrpSpPr>
-      <p:grpSpPr>
-        <a:xfrm>
-          <a:off x="0" y="0"/>
-          <a:ext cx="0" cy="0"/>
-          <a:chOff x="0" y="0"/>
-          <a:chExt cx="0" cy="0"/>
-        </a:xfrm>
-      </p:grpSpPr>
-      <p:sp>
-        <p:nvSpPr>
-          <p:cNvPr id="2" name="Title 1"/>
-          <p:cNvSpPr>
-            <a:spLocks noGrp="1"/>
-          </p:cNvSpPr>
-          <p:nvPr>
-            <p:ph type="title"/>
-          </p:nvPr>
-        </p:nvSpPr>
-        <p:spPr/>
-        <p:txBody>
-          <a:bodyPr/>
-          <a:lstStyle/>
-          <a:p>
-            <a:r>
-              <a:rPr lang="en-US" dirty="0"/>
-              <a:t>Rolling Back a Transaction</a:t>
-            </a:r>
-          </a:p>
-        </p:txBody>
-      </p:sp>
-      <p:sp>
-        <p:nvSpPr>
-          <p:cNvPr id="3" name="Content Placeholder 2"/>
-          <p:cNvSpPr>
-            <a:spLocks noGrp="1"/>
-          </p:cNvSpPr>
-          <p:nvPr>
-            <p:ph idx="1"/>
-          </p:nvPr>
-        </p:nvSpPr>
-        <p:spPr/>
-        <p:txBody>
-          <a:bodyPr/>
-          <a:lstStyle/>
-          <a:p>
-            <a:pPr marL="571500" indent="-571500">
-              <a:buFont typeface="Arial" panose="020B0604020202020204" pitchFamily="34" charset="0"/>
-              <a:buChar char="•"/>
-            </a:pPr>
-            <a:r>
-              <a:rPr lang="en-US" dirty="0"/>
-              <a:t>Key takeaways:</a:t>
-            </a:r>
-          </a:p>
-          <a:p>
-            <a:pPr marL="1033227" lvl="1" indent="-457200">
-              <a:buFont typeface="Arial" panose="020B0604020202020204" pitchFamily="34" charset="0"/>
-              <a:buChar char="•"/>
-            </a:pPr>
-            <a:r>
-              <a:rPr lang="en-US" dirty="0"/>
-              <a:t>Rollback operations generate log records</a:t>
-            </a:r>
-          </a:p>
-          <a:p>
-            <a:pPr marL="1033227" lvl="1" indent="-457200">
-              <a:buFont typeface="Arial" panose="020B0604020202020204" pitchFamily="34" charset="0"/>
-              <a:buChar char="•"/>
-            </a:pPr>
-            <a:r>
-              <a:rPr lang="en-US" dirty="0"/>
-              <a:t>As the initial operations are performed, SQL Server will “reserve” log space to ensure that a rollback is possible.</a:t>
-            </a:r>
-          </a:p>
-          <a:p>
-            <a:pPr marL="1609253" lvl="2" indent="-457200">
-              <a:buFont typeface="Arial" panose="020B0604020202020204" pitchFamily="34" charset="0"/>
-              <a:buChar char="•"/>
-            </a:pPr>
-            <a:r>
-              <a:rPr lang="en-US" dirty="0"/>
-              <a:t>Very large DML operations will reserve a lot of log space (and will prevent the log from clearing while in process).  Often better to split up into </a:t>
-            </a:r>
-            <a:r>
-              <a:rPr lang="en-US"/>
-              <a:t>smaller transactions.</a:t>
-            </a:r>
-            <a:endParaRPr lang="en-US" dirty="0"/>
-          </a:p>
-        </p:txBody>
-      </p:sp>
-    </p:spTree>
-    <p:extLst>
-      <p:ext uri="{BB962C8B-B14F-4D97-AF65-F5344CB8AC3E}">
-        <p14:creationId xmlns:p14="http://schemas.microsoft.com/office/powerpoint/2010/main" val="3473558338"/>
-      </p:ext>
-    </p:extLst>
-  </p:cSld>
-  <p:clrMapOvr>
-    <a:masterClrMapping/>
-  </p:clrMapOvr>
-</p:sld>
-</file>
-
 <file path=ppt/slides/slide47.xml><?xml version="1.0" encoding="utf-8"?>
 <p:sld xmlns:a="http://schemas.openxmlformats.org/drawingml/2006/main" xmlns:r="http://schemas.openxmlformats.org/officeDocument/2006/relationships" xmlns:p="http://schemas.openxmlformats.org/presentationml/2006/main">
   <p:cSld>
@@ -9483,7 +10065,7 @@
           <a:p>
             <a:r>
               <a:rPr lang="en-US" dirty="0"/>
-              <a:t>Demo</a:t>
+              <a:t>Rolling Back a Transaction</a:t>
             </a:r>
           </a:p>
         </p:txBody>
@@ -9503,41 +10085,56 @@
           <a:bodyPr/>
           <a:lstStyle/>
           <a:p>
-            <a:r>
-              <a:rPr lang="en-US" dirty="0"/>
-              <a:t>Rollback operations</a:t>
-            </a:r>
-          </a:p>
-        </p:txBody>
-      </p:sp>
-      <p:pic>
-        <p:nvPicPr>
-          <p:cNvPr id="4" name="Picture 3"/>
-          <p:cNvPicPr>
-            <a:picLocks noChangeAspect="1"/>
-          </p:cNvPicPr>
-          <p:nvPr/>
-        </p:nvPicPr>
-        <p:blipFill>
-          <a:blip r:embed="rId2"/>
-          <a:stretch>
-            <a:fillRect/>
-          </a:stretch>
-        </p:blipFill>
-        <p:spPr>
-          <a:xfrm>
-            <a:off x="2161159" y="1561932"/>
-            <a:ext cx="7198170" cy="3356311"/>
-          </a:xfrm>
-          <a:prstGeom prst="rect">
-            <a:avLst/>
-          </a:prstGeom>
-        </p:spPr>
-      </p:pic>
+            <a:pPr marL="571500" indent="-571500">
+              <a:buFont typeface="Arial" panose="020B0604020202020204" pitchFamily="34" charset="0"/>
+              <a:buChar char="•"/>
+            </a:pPr>
+            <a:r>
+              <a:rPr lang="en-US" dirty="0"/>
+              <a:t>Key takeaways:</a:t>
+            </a:r>
+          </a:p>
+          <a:p>
+            <a:pPr marL="1033227" lvl="1" indent="-457200">
+              <a:buFont typeface="Arial" panose="020B0604020202020204" pitchFamily="34" charset="0"/>
+              <a:buChar char="•"/>
+            </a:pPr>
+            <a:r>
+              <a:rPr lang="en-US" dirty="0"/>
+              <a:t>Rollback operations generate log records</a:t>
+            </a:r>
+          </a:p>
+          <a:p>
+            <a:pPr marL="1033227" lvl="1" indent="-457200">
+              <a:buFont typeface="Arial" panose="020B0604020202020204" pitchFamily="34" charset="0"/>
+              <a:buChar char="•"/>
+            </a:pPr>
+            <a:r>
+              <a:rPr lang="en-US" dirty="0"/>
+              <a:t>As the initial operations are performed, SQL Server will “reserve” log space to ensure that a rollback is possible.</a:t>
+            </a:r>
+          </a:p>
+          <a:p>
+            <a:pPr marL="1609253" lvl="2" indent="-457200">
+              <a:buFont typeface="Arial" panose="020B0604020202020204" pitchFamily="34" charset="0"/>
+              <a:buChar char="•"/>
+            </a:pPr>
+            <a:r>
+              <a:rPr lang="en-US" dirty="0"/>
+              <a:t>Very large DML operations will reserve a lot of log space (and will prevent the log from clearing while in process).  Often better to split up into </a:t>
+            </a:r>
+            <a:r>
+              <a:rPr lang="en-US"/>
+              <a:t>smaller transactions.</a:t>
+            </a:r>
+            <a:endParaRPr lang="en-US" dirty="0"/>
+          </a:p>
+        </p:txBody>
+      </p:sp>
     </p:spTree>
     <p:extLst>
       <p:ext uri="{BB962C8B-B14F-4D97-AF65-F5344CB8AC3E}">
-        <p14:creationId xmlns:p14="http://schemas.microsoft.com/office/powerpoint/2010/main" val="833895612"/>
+        <p14:creationId xmlns:p14="http://schemas.microsoft.com/office/powerpoint/2010/main" val="3473558338"/>
       </p:ext>
     </p:extLst>
   </p:cSld>
@@ -9548,6 +10145,123 @@
 </file>
 
 <file path=ppt/slides/slide48.xml><?xml version="1.0" encoding="utf-8"?>
+<p:sld xmlns:a="http://schemas.openxmlformats.org/drawingml/2006/main" xmlns:r="http://schemas.openxmlformats.org/officeDocument/2006/relationships" xmlns:p="http://schemas.openxmlformats.org/presentationml/2006/main">
+  <p:cSld>
+    <p:spTree>
+      <p:nvGrpSpPr>
+        <p:cNvPr id="1" name=""/>
+        <p:cNvGrpSpPr/>
+        <p:nvPr/>
+      </p:nvGrpSpPr>
+      <p:grpSpPr>
+        <a:xfrm>
+          <a:off x="0" y="0"/>
+          <a:ext cx="0" cy="0"/>
+          <a:chOff x="0" y="0"/>
+          <a:chExt cx="0" cy="0"/>
+        </a:xfrm>
+      </p:grpSpPr>
+      <p:sp>
+        <p:nvSpPr>
+          <p:cNvPr id="2" name="Title 1">
+            <a:extLst>
+              <a:ext uri="{FF2B5EF4-FFF2-40B4-BE49-F238E27FC236}">
+                <a16:creationId xmlns:a16="http://schemas.microsoft.com/office/drawing/2014/main" id="{FEF5F440-7918-4A6B-9C7C-C25F5B4AB5DD}"/>
+              </a:ext>
+            </a:extLst>
+          </p:cNvPr>
+          <p:cNvSpPr>
+            <a:spLocks noGrp="1"/>
+          </p:cNvSpPr>
+          <p:nvPr>
+            <p:ph type="title"/>
+          </p:nvPr>
+        </p:nvSpPr>
+        <p:spPr/>
+        <p:txBody>
+          <a:bodyPr/>
+          <a:lstStyle/>
+          <a:p>
+            <a:r>
+              <a:rPr lang="en-US" dirty="0"/>
+              <a:t>Demo</a:t>
+            </a:r>
+          </a:p>
+        </p:txBody>
+      </p:sp>
+      <p:sp>
+        <p:nvSpPr>
+          <p:cNvPr id="3" name="Content Placeholder 2">
+            <a:extLst>
+              <a:ext uri="{FF2B5EF4-FFF2-40B4-BE49-F238E27FC236}">
+                <a16:creationId xmlns:a16="http://schemas.microsoft.com/office/drawing/2014/main" id="{9E20F2C1-4D76-4D3B-8502-4FA0575D48CD}"/>
+              </a:ext>
+            </a:extLst>
+          </p:cNvPr>
+          <p:cNvSpPr>
+            <a:spLocks noGrp="1"/>
+          </p:cNvSpPr>
+          <p:nvPr>
+            <p:ph idx="1"/>
+          </p:nvPr>
+        </p:nvSpPr>
+        <p:spPr>
+          <a:xfrm>
+            <a:off x="640106" y="1302682"/>
+            <a:ext cx="8123055" cy="4405846"/>
+          </a:xfrm>
+        </p:spPr>
+        <p:txBody>
+          <a:bodyPr>
+            <a:normAutofit/>
+          </a:bodyPr>
+          <a:lstStyle/>
+          <a:p>
+            <a:r>
+              <a:rPr lang="en-US" dirty="0"/>
+              <a:t>Rollback operations</a:t>
+            </a:r>
+          </a:p>
+        </p:txBody>
+      </p:sp>
+      <p:pic>
+        <p:nvPicPr>
+          <p:cNvPr id="5" name="Picture 4"/>
+          <p:cNvPicPr>
+            <a:picLocks noChangeAspect="1"/>
+          </p:cNvPicPr>
+          <p:nvPr/>
+        </p:nvPicPr>
+        <p:blipFill>
+          <a:blip r:embed="rId3"/>
+          <a:stretch>
+            <a:fillRect/>
+          </a:stretch>
+        </p:blipFill>
+        <p:spPr>
+          <a:xfrm>
+            <a:off x="493776" y="2011680"/>
+            <a:ext cx="8666495" cy="4032504"/>
+          </a:xfrm>
+          <a:prstGeom prst="rect">
+            <a:avLst/>
+          </a:prstGeom>
+        </p:spPr>
+      </p:pic>
+    </p:spTree>
+    <p:extLst>
+      <p:ext uri="{BB962C8B-B14F-4D97-AF65-F5344CB8AC3E}">
+        <p14:creationId xmlns:p14="http://schemas.microsoft.com/office/powerpoint/2010/main" val="4264509665"/>
+      </p:ext>
+    </p:extLst>
+  </p:cSld>
+  <p:clrMapOvr>
+    <a:masterClrMapping/>
+  </p:clrMapOvr>
+</p:sld>
+</file>
+
+<file path=ppt/slides/slide49.xml><?xml version="1.0" encoding="utf-8"?>
 <p:sld xmlns:a="http://schemas.openxmlformats.org/drawingml/2006/main" xmlns:r="http://schemas.openxmlformats.org/officeDocument/2006/relationships" xmlns:p="http://schemas.openxmlformats.org/presentationml/2006/main">
   <p:cSld>
     <p:spTree>
@@ -10021,144 +10735,6 @@
 </p:sld>
 </file>
 
-<file path=ppt/slides/slide49.xml><?xml version="1.0" encoding="utf-8"?>
-<p:sld xmlns:a="http://schemas.openxmlformats.org/drawingml/2006/main" xmlns:r="http://schemas.openxmlformats.org/officeDocument/2006/relationships" xmlns:p="http://schemas.openxmlformats.org/presentationml/2006/main">
-  <p:cSld>
-    <p:spTree>
-      <p:nvGrpSpPr>
-        <p:cNvPr id="1" name=""/>
-        <p:cNvGrpSpPr/>
-        <p:nvPr/>
-      </p:nvGrpSpPr>
-      <p:grpSpPr>
-        <a:xfrm>
-          <a:off x="0" y="0"/>
-          <a:ext cx="0" cy="0"/>
-          <a:chOff x="0" y="0"/>
-          <a:chExt cx="0" cy="0"/>
-        </a:xfrm>
-      </p:grpSpPr>
-      <p:sp>
-        <p:nvSpPr>
-          <p:cNvPr id="2" name="Title 1"/>
-          <p:cNvSpPr>
-            <a:spLocks noGrp="1"/>
-          </p:cNvSpPr>
-          <p:nvPr>
-            <p:ph type="title"/>
-          </p:nvPr>
-        </p:nvSpPr>
-        <p:spPr/>
-        <p:txBody>
-          <a:bodyPr/>
-          <a:lstStyle/>
-          <a:p>
-            <a:r>
-              <a:rPr lang="en-US" dirty="0"/>
-              <a:t>VLF Trade-Offs</a:t>
-            </a:r>
-          </a:p>
-        </p:txBody>
-      </p:sp>
-      <p:sp>
-        <p:nvSpPr>
-          <p:cNvPr id="3" name="Content Placeholder 2"/>
-          <p:cNvSpPr>
-            <a:spLocks noGrp="1"/>
-          </p:cNvSpPr>
-          <p:nvPr>
-            <p:ph idx="1"/>
-          </p:nvPr>
-        </p:nvSpPr>
-        <p:spPr/>
-        <p:txBody>
-          <a:bodyPr>
-            <a:normAutofit/>
-          </a:bodyPr>
-          <a:lstStyle/>
-          <a:p>
-            <a:pPr marL="571500" indent="-571500">
-              <a:buFont typeface="Arial" panose="020B0604020202020204" pitchFamily="34" charset="0"/>
-              <a:buChar char="•"/>
-            </a:pPr>
-            <a:r>
-              <a:rPr lang="en-US" dirty="0"/>
-              <a:t>Too many VLFs create performance problems (“VLF Fragmentation”)</a:t>
-            </a:r>
-          </a:p>
-          <a:p>
-            <a:pPr marL="1033227" lvl="1" indent="-457200">
-              <a:buFont typeface="Arial" panose="020B0604020202020204" pitchFamily="34" charset="0"/>
-              <a:buChar char="•"/>
-            </a:pPr>
-            <a:r>
-              <a:rPr lang="en-US" dirty="0"/>
-              <a:t>Slows noticeably any time log is read</a:t>
-            </a:r>
-          </a:p>
-          <a:p>
-            <a:pPr marL="1494953" lvl="2" indent="-342900">
-              <a:buFont typeface="Arial" panose="020B0604020202020204" pitchFamily="34" charset="0"/>
-              <a:buChar char="•"/>
-            </a:pPr>
-            <a:r>
-              <a:rPr lang="en-US" dirty="0"/>
-              <a:t>Start-up time for database, log reader, backup &amp; restore, etc.</a:t>
-            </a:r>
-          </a:p>
-          <a:p>
-            <a:pPr marL="1033227" lvl="1" indent="-457200">
-              <a:buFont typeface="Arial" panose="020B0604020202020204" pitchFamily="34" charset="0"/>
-              <a:buChar char="•"/>
-            </a:pPr>
-            <a:r>
-              <a:rPr lang="en-US" dirty="0"/>
-              <a:t>But smaller VLFs are faster to allocate (zero-</a:t>
-            </a:r>
-            <a:r>
-              <a:rPr lang="en-US" dirty="0" err="1"/>
-              <a:t>init</a:t>
-            </a:r>
-            <a:r>
-              <a:rPr lang="en-US" dirty="0"/>
-              <a:t>)</a:t>
-            </a:r>
-          </a:p>
-          <a:p>
-            <a:pPr marL="571500" indent="-571500">
-              <a:buFont typeface="Arial" panose="020B0604020202020204" pitchFamily="34" charset="0"/>
-              <a:buChar char="•"/>
-            </a:pPr>
-            <a:r>
-              <a:rPr lang="en-US" dirty="0"/>
-              <a:t>Too few VLFs also create performance problems</a:t>
-            </a:r>
-          </a:p>
-          <a:p>
-            <a:pPr marL="1033227" lvl="1" indent="-457200">
-              <a:buFont typeface="Arial" panose="020B0604020202020204" pitchFamily="34" charset="0"/>
-              <a:buChar char="•"/>
-            </a:pPr>
-            <a:r>
-              <a:rPr lang="en-US" dirty="0"/>
-              <a:t>Clearing the log, especially when long-running transactions are happening</a:t>
-            </a:r>
-          </a:p>
-        </p:txBody>
-      </p:sp>
-    </p:spTree>
-    <p:extLst>
-      <p:ext uri="{BB962C8B-B14F-4D97-AF65-F5344CB8AC3E}">
-        <p14:creationId xmlns:p14="http://schemas.microsoft.com/office/powerpoint/2010/main" val="4210259203"/>
-      </p:ext>
-    </p:extLst>
-  </p:cSld>
-  <p:clrMapOvr>
-    <a:masterClrMapping/>
-  </p:clrMapOvr>
-</p:sld>
-</file>
-
 <file path=ppt/slides/slide5.xml><?xml version="1.0" encoding="utf-8"?>
 <p:sld xmlns:a="http://schemas.openxmlformats.org/drawingml/2006/main" xmlns:r="http://schemas.openxmlformats.org/officeDocument/2006/relationships" xmlns:p="http://schemas.openxmlformats.org/presentationml/2006/main">
   <p:cSld>
@@ -10337,7 +10913,7 @@
           <a:p>
             <a:r>
               <a:rPr lang="en-US" dirty="0"/>
-              <a:t>Pre-Allocating the Log</a:t>
+              <a:t>VLF Trade-Offs</a:t>
             </a:r>
           </a:p>
         </p:txBody>
@@ -10354,7 +10930,9 @@
         </p:nvSpPr>
         <p:spPr/>
         <p:txBody>
-          <a:bodyPr/>
+          <a:bodyPr>
+            <a:normAutofit/>
+          </a:bodyPr>
           <a:lstStyle/>
           <a:p>
             <a:pPr marL="571500" indent="-571500">
@@ -10363,7 +10941,7 @@
             </a:pPr>
             <a:r>
               <a:rPr lang="en-US" dirty="0"/>
-              <a:t>Why?</a:t>
+              <a:t>Too many VLFs create performance problems (“VLF Fragmentation”)</a:t>
             </a:r>
           </a:p>
           <a:p>
@@ -10373,7 +10951,17 @@
             </a:pPr>
             <a:r>
               <a:rPr lang="en-US" dirty="0"/>
-              <a:t>Eliminate VLF fragmentation</a:t>
+              <a:t>Slows noticeably any time log is read</a:t>
+            </a:r>
+          </a:p>
+          <a:p>
+            <a:pPr marL="1494953" lvl="2" indent="-342900">
+              <a:buFont typeface="Arial" panose="020B0604020202020204" pitchFamily="34" charset="0"/>
+              <a:buChar char="•"/>
+            </a:pPr>
+            <a:r>
+              <a:rPr lang="en-US" dirty="0"/>
+              <a:t>Start-up time for database, log reader, backup &amp; restore, etc.</a:t>
             </a:r>
           </a:p>
           <a:p>
@@ -10383,17 +10971,15 @@
             </a:pPr>
             <a:r>
               <a:rPr lang="en-US" dirty="0"/>
-              <a:t>Avoid log growth during user operations</a:t>
-            </a:r>
-          </a:p>
-          <a:p>
-            <a:pPr marL="1494953" lvl="2" indent="-342900">
-              <a:buFont typeface="Arial" panose="020B0604020202020204" pitchFamily="34" charset="0"/>
-              <a:buChar char="•"/>
-            </a:pPr>
-            <a:r>
-              <a:rPr lang="en-US" dirty="0"/>
-              <a:t>Can be time-consuming due to zero-initialization</a:t>
+              <a:t>But smaller VLFs are faster to allocate (zero-</a:t>
+            </a:r>
+            <a:r>
+              <a:rPr lang="en-US" dirty="0" err="1"/>
+              <a:t>init</a:t>
+            </a:r>
+            <a:r>
+              <a:rPr lang="en-US" dirty="0"/>
+              <a:t>)</a:t>
             </a:r>
           </a:p>
           <a:p>
@@ -10403,7 +10989,7 @@
             </a:pPr>
             <a:r>
               <a:rPr lang="en-US" dirty="0"/>
-              <a:t>However, plan for auto-growth</a:t>
+              <a:t>Too few VLFs also create performance problems</a:t>
             </a:r>
           </a:p>
           <a:p>
@@ -10413,17 +10999,7 @@
             </a:pPr>
             <a:r>
               <a:rPr lang="en-US" dirty="0"/>
-              <a:t>Set reasonable auto-growth parameters</a:t>
-            </a:r>
-          </a:p>
-          <a:p>
-            <a:pPr marL="1033227" lvl="1" indent="-457200">
-              <a:buFont typeface="Arial" panose="020B0604020202020204" pitchFamily="34" charset="0"/>
-              <a:buChar char="•"/>
-            </a:pPr>
-            <a:r>
-              <a:rPr lang="en-US" dirty="0"/>
-              <a:t>Fixed growth amount, not percentage</a:t>
+              <a:t>Clearing the log, especially when long-running transactions are happening</a:t>
             </a:r>
           </a:p>
         </p:txBody>
@@ -10431,7 +11007,7 @@
     </p:spTree>
     <p:extLst>
       <p:ext uri="{BB962C8B-B14F-4D97-AF65-F5344CB8AC3E}">
-        <p14:creationId xmlns:p14="http://schemas.microsoft.com/office/powerpoint/2010/main" val="1244144183"/>
+        <p14:creationId xmlns:p14="http://schemas.microsoft.com/office/powerpoint/2010/main" val="4210259203"/>
       </p:ext>
     </p:extLst>
   </p:cSld>
@@ -10475,7 +11051,7 @@
           <a:p>
             <a:r>
               <a:rPr lang="en-US" dirty="0"/>
-              <a:t>Demo</a:t>
+              <a:t>Pre-Allocating the Log</a:t>
             </a:r>
           </a:p>
         </p:txBody>
@@ -10495,41 +11071,81 @@
           <a:bodyPr/>
           <a:lstStyle/>
           <a:p>
-            <a:r>
-              <a:rPr lang="en-US" dirty="0"/>
-              <a:t>VLF Fragmentation</a:t>
-            </a:r>
-          </a:p>
-        </p:txBody>
-      </p:sp>
-      <p:pic>
-        <p:nvPicPr>
-          <p:cNvPr id="4" name="Picture 3"/>
-          <p:cNvPicPr>
-            <a:picLocks noChangeAspect="1"/>
-          </p:cNvPicPr>
-          <p:nvPr/>
-        </p:nvPicPr>
-        <p:blipFill>
-          <a:blip r:embed="rId2"/>
-          <a:stretch>
-            <a:fillRect/>
-          </a:stretch>
-        </p:blipFill>
-        <p:spPr>
-          <a:xfrm>
-            <a:off x="2161159" y="1561932"/>
-            <a:ext cx="7198170" cy="3356311"/>
-          </a:xfrm>
-          <a:prstGeom prst="rect">
-            <a:avLst/>
-          </a:prstGeom>
-        </p:spPr>
-      </p:pic>
+            <a:pPr marL="571500" indent="-571500">
+              <a:buFont typeface="Arial" panose="020B0604020202020204" pitchFamily="34" charset="0"/>
+              <a:buChar char="•"/>
+            </a:pPr>
+            <a:r>
+              <a:rPr lang="en-US" dirty="0"/>
+              <a:t>Why?</a:t>
+            </a:r>
+          </a:p>
+          <a:p>
+            <a:pPr marL="1033227" lvl="1" indent="-457200">
+              <a:buFont typeface="Arial" panose="020B0604020202020204" pitchFamily="34" charset="0"/>
+              <a:buChar char="•"/>
+            </a:pPr>
+            <a:r>
+              <a:rPr lang="en-US" dirty="0"/>
+              <a:t>Eliminate VLF fragmentation</a:t>
+            </a:r>
+          </a:p>
+          <a:p>
+            <a:pPr marL="1033227" lvl="1" indent="-457200">
+              <a:buFont typeface="Arial" panose="020B0604020202020204" pitchFamily="34" charset="0"/>
+              <a:buChar char="•"/>
+            </a:pPr>
+            <a:r>
+              <a:rPr lang="en-US" dirty="0"/>
+              <a:t>Avoid log growth during user operations</a:t>
+            </a:r>
+          </a:p>
+          <a:p>
+            <a:pPr marL="1494953" lvl="2" indent="-342900">
+              <a:buFont typeface="Arial" panose="020B0604020202020204" pitchFamily="34" charset="0"/>
+              <a:buChar char="•"/>
+            </a:pPr>
+            <a:r>
+              <a:rPr lang="en-US" dirty="0"/>
+              <a:t>Can be time-consuming due to zero-initialization</a:t>
+            </a:r>
+          </a:p>
+          <a:p>
+            <a:pPr marL="571500" indent="-571500">
+              <a:buFont typeface="Arial" panose="020B0604020202020204" pitchFamily="34" charset="0"/>
+              <a:buChar char="•"/>
+            </a:pPr>
+            <a:r>
+              <a:rPr lang="en-US" dirty="0"/>
+              <a:t>However, plan for auto-growth</a:t>
+            </a:r>
+          </a:p>
+          <a:p>
+            <a:pPr marL="1033227" lvl="1" indent="-457200">
+              <a:buFont typeface="Arial" panose="020B0604020202020204" pitchFamily="34" charset="0"/>
+              <a:buChar char="•"/>
+            </a:pPr>
+            <a:r>
+              <a:rPr lang="en-US" dirty="0"/>
+              <a:t>Set reasonable auto-growth parameters</a:t>
+            </a:r>
+          </a:p>
+          <a:p>
+            <a:pPr marL="1033227" lvl="1" indent="-457200">
+              <a:buFont typeface="Arial" panose="020B0604020202020204" pitchFamily="34" charset="0"/>
+              <a:buChar char="•"/>
+            </a:pPr>
+            <a:r>
+              <a:rPr lang="en-US" dirty="0"/>
+              <a:t>Fixed growth amount, not percentage</a:t>
+            </a:r>
+          </a:p>
+        </p:txBody>
+      </p:sp>
     </p:spTree>
     <p:extLst>
       <p:ext uri="{BB962C8B-B14F-4D97-AF65-F5344CB8AC3E}">
-        <p14:creationId xmlns:p14="http://schemas.microsoft.com/office/powerpoint/2010/main" val="1126903809"/>
+        <p14:creationId xmlns:p14="http://schemas.microsoft.com/office/powerpoint/2010/main" val="1244144183"/>
       </p:ext>
     </p:extLst>
   </p:cSld>
@@ -10558,7 +11174,13 @@
       </p:grpSpPr>
       <p:sp>
         <p:nvSpPr>
-          <p:cNvPr id="2" name="Title 1"/>
+          <p:cNvPr id="2" name="Title 1">
+            <a:extLst>
+              <a:ext uri="{FF2B5EF4-FFF2-40B4-BE49-F238E27FC236}">
+                <a16:creationId xmlns:a16="http://schemas.microsoft.com/office/drawing/2014/main" id="{FEF5F440-7918-4A6B-9C7C-C25F5B4AB5DD}"/>
+              </a:ext>
+            </a:extLst>
+          </p:cNvPr>
           <p:cNvSpPr>
             <a:spLocks noGrp="1"/>
           </p:cNvSpPr>
@@ -10573,14 +11195,20 @@
           <a:p>
             <a:r>
               <a:rPr lang="en-US" dirty="0"/>
-              <a:t>Controlling VLFs</a:t>
-            </a:r>
-          </a:p>
-        </p:txBody>
-      </p:sp>
-      <p:sp>
-        <p:nvSpPr>
-          <p:cNvPr id="3" name="Content Placeholder 2"/>
+              <a:t>Demo</a:t>
+            </a:r>
+          </a:p>
+        </p:txBody>
+      </p:sp>
+      <p:sp>
+        <p:nvSpPr>
+          <p:cNvPr id="3" name="Content Placeholder 2">
+            <a:extLst>
+              <a:ext uri="{FF2B5EF4-FFF2-40B4-BE49-F238E27FC236}">
+                <a16:creationId xmlns:a16="http://schemas.microsoft.com/office/drawing/2014/main" id="{9E20F2C1-4D76-4D3B-8502-4FA0575D48CD}"/>
+              </a:ext>
+            </a:extLst>
+          </p:cNvPr>
           <p:cNvSpPr>
             <a:spLocks noGrp="1"/>
           </p:cNvSpPr>
@@ -10588,62 +11216,53 @@
             <p:ph idx="1"/>
           </p:nvPr>
         </p:nvSpPr>
-        <p:spPr/>
-        <p:txBody>
-          <a:bodyPr/>
-          <a:lstStyle/>
-          <a:p>
-            <a:pPr marL="571500" indent="-571500">
-              <a:buFont typeface="Arial" panose="020B0604020202020204" pitchFamily="34" charset="0"/>
-              <a:buChar char="•"/>
-            </a:pPr>
-            <a:r>
-              <a:rPr lang="en-US" dirty="0"/>
-              <a:t>See the MS Tiger Team solution</a:t>
-            </a:r>
-          </a:p>
-          <a:p>
-            <a:pPr marL="1147527" lvl="1" indent="-571500">
-              <a:buFont typeface="Arial" panose="020B0604020202020204" pitchFamily="34" charset="0"/>
-              <a:buChar char="•"/>
-            </a:pPr>
-            <a:r>
-              <a:rPr lang="en-US" dirty="0"/>
-              <a:t>A bit of a hammer – it generates scripts for all databases on the instance</a:t>
-            </a:r>
-          </a:p>
-          <a:p>
-            <a:pPr marL="1147527" lvl="1" indent="-571500">
-              <a:buFont typeface="Arial" panose="020B0604020202020204" pitchFamily="34" charset="0"/>
-              <a:buChar char="•"/>
-            </a:pPr>
-            <a:r>
-              <a:rPr lang="en-US" dirty="0"/>
-              <a:t>Review the generated script before running it</a:t>
-            </a:r>
-          </a:p>
-          <a:p>
-            <a:pPr marL="1147527" lvl="1" indent="-571500">
-              <a:buFont typeface="Arial" panose="020B0604020202020204" pitchFamily="34" charset="0"/>
-              <a:buChar char="•"/>
-            </a:pPr>
-            <a:endParaRPr lang="en-US" dirty="0"/>
-          </a:p>
-          <a:p>
-            <a:r>
-              <a:rPr lang="en-US" sz="2400" dirty="0">
-                <a:hlinkClick r:id="rId2"/>
-              </a:rPr>
-              <a:t>https://github.com/Microsoft/tigertoolbox/tree/master/Fixing-VLFs</a:t>
-            </a:r>
-            <a:endParaRPr lang="en-US" sz="2400" dirty="0"/>
-          </a:p>
-        </p:txBody>
-      </p:sp>
+        <p:spPr>
+          <a:xfrm>
+            <a:off x="640106" y="1302682"/>
+            <a:ext cx="8123055" cy="4405846"/>
+          </a:xfrm>
+        </p:spPr>
+        <p:txBody>
+          <a:bodyPr>
+            <a:normAutofit/>
+          </a:bodyPr>
+          <a:lstStyle/>
+          <a:p>
+            <a:r>
+              <a:rPr lang="en-US" dirty="0"/>
+              <a:t>VLF fragmentation</a:t>
+            </a:r>
+          </a:p>
+        </p:txBody>
+      </p:sp>
+      <p:pic>
+        <p:nvPicPr>
+          <p:cNvPr id="5" name="Picture 4"/>
+          <p:cNvPicPr>
+            <a:picLocks noChangeAspect="1"/>
+          </p:cNvPicPr>
+          <p:nvPr/>
+        </p:nvPicPr>
+        <p:blipFill>
+          <a:blip r:embed="rId3"/>
+          <a:stretch>
+            <a:fillRect/>
+          </a:stretch>
+        </p:blipFill>
+        <p:spPr>
+          <a:xfrm>
+            <a:off x="493776" y="2011680"/>
+            <a:ext cx="8666495" cy="4032504"/>
+          </a:xfrm>
+          <a:prstGeom prst="rect">
+            <a:avLst/>
+          </a:prstGeom>
+        </p:spPr>
+      </p:pic>
     </p:spTree>
     <p:extLst>
       <p:ext uri="{BB962C8B-B14F-4D97-AF65-F5344CB8AC3E}">
-        <p14:creationId xmlns:p14="http://schemas.microsoft.com/office/powerpoint/2010/main" val="3027963439"/>
+        <p14:creationId xmlns:p14="http://schemas.microsoft.com/office/powerpoint/2010/main" val="122417637"/>
       </p:ext>
     </p:extLst>
   </p:cSld>
@@ -10687,7 +11306,7 @@
           <a:p>
             <a:r>
               <a:rPr lang="en-US" dirty="0"/>
-              <a:t>Log Monitoring</a:t>
+              <a:t>Controlling VLFs</a:t>
             </a:r>
           </a:p>
         </p:txBody>
@@ -10704,9 +11323,7 @@
         </p:nvSpPr>
         <p:spPr/>
         <p:txBody>
-          <a:bodyPr>
-            <a:normAutofit/>
-          </a:bodyPr>
+          <a:bodyPr/>
           <a:lstStyle/>
           <a:p>
             <a:pPr marL="571500" indent="-571500">
@@ -10714,184 +11331,52 @@
               <a:buChar char="•"/>
             </a:pPr>
             <a:r>
-              <a:rPr lang="en-US" sz="3200" dirty="0"/>
-              <a:t>Watch your VLF count</a:t>
-            </a:r>
-          </a:p>
-          <a:p>
-            <a:pPr marL="571500" indent="-571500">
-              <a:buFont typeface="Arial" panose="020B0604020202020204" pitchFamily="34" charset="0"/>
-              <a:buChar char="•"/>
-            </a:pPr>
-            <a:r>
-              <a:rPr lang="en-US" sz="3200" dirty="0"/>
-              <a:t>Monitor log size over time</a:t>
-            </a:r>
-          </a:p>
-          <a:p>
-            <a:pPr marL="571500" indent="-571500">
-              <a:buFont typeface="Arial" panose="020B0604020202020204" pitchFamily="34" charset="0"/>
-              <a:buChar char="•"/>
-            </a:pPr>
-            <a:r>
-              <a:rPr lang="en-US" sz="3200" dirty="0"/>
-              <a:t>Set SQL Alerts on:</a:t>
-            </a:r>
-          </a:p>
-          <a:p>
-            <a:pPr marL="1033227" lvl="1" indent="-457200">
-              <a:buFont typeface="Arial" panose="020B0604020202020204" pitchFamily="34" charset="0"/>
-              <a:buChar char="•"/>
-            </a:pPr>
-            <a:r>
-              <a:rPr lang="en-US" sz="2800" dirty="0"/>
-              <a:t>Severity 17 errors (will alert on log full)</a:t>
-            </a:r>
-          </a:p>
-          <a:p>
-            <a:pPr marL="1033227" lvl="1" indent="-457200">
-              <a:buFont typeface="Arial" panose="020B0604020202020204" pitchFamily="34" charset="0"/>
-              <a:buChar char="•"/>
-            </a:pPr>
-            <a:r>
-              <a:rPr lang="en-US" sz="2800" dirty="0"/>
-              <a:t>Error 5145</a:t>
-            </a:r>
-          </a:p>
-          <a:p>
-            <a:pPr lvl="2"/>
-            <a:r>
-              <a:rPr lang="en-US" sz="2000" b="1" dirty="0" err="1">
-                <a:solidFill>
-                  <a:srgbClr val="FF0000"/>
-                </a:solidFill>
-                <a:latin typeface="Courier New" panose="02070309020205020404" pitchFamily="49" charset="0"/>
-                <a:cs typeface="Courier New" panose="02070309020205020404" pitchFamily="49" charset="0"/>
+              <a:rPr lang="en-US" dirty="0"/>
+              <a:t>See the MS Tiger Team solution</a:t>
+            </a:r>
+          </a:p>
+          <a:p>
+            <a:pPr marL="1147527" lvl="1" indent="-571500">
+              <a:buFont typeface="Arial" panose="020B0604020202020204" pitchFamily="34" charset="0"/>
+              <a:buChar char="•"/>
+            </a:pPr>
+            <a:r>
+              <a:rPr lang="en-US" dirty="0"/>
+              <a:t>A bit of a hammer – it generates scripts for all databases on the instance</a:t>
+            </a:r>
+          </a:p>
+          <a:p>
+            <a:pPr marL="1147527" lvl="1" indent="-571500">
+              <a:buFont typeface="Arial" panose="020B0604020202020204" pitchFamily="34" charset="0"/>
+              <a:buChar char="•"/>
+            </a:pPr>
+            <a:r>
+              <a:rPr lang="en-US" dirty="0"/>
+              <a:t>Review the generated script before running it</a:t>
+            </a:r>
+          </a:p>
+          <a:p>
+            <a:pPr marL="1147527" lvl="1" indent="-571500">
+              <a:buFont typeface="Arial" panose="020B0604020202020204" pitchFamily="34" charset="0"/>
+              <a:buChar char="•"/>
+            </a:pPr>
+            <a:endParaRPr lang="en-US" dirty="0"/>
+          </a:p>
+          <a:p>
+            <a:r>
+              <a:rPr lang="en-US" sz="2400" dirty="0">
+                <a:hlinkClick r:id="rId2"/>
               </a:rPr>
-              <a:t>Autogrow</a:t>
-            </a:r>
-            <a:r>
-              <a:rPr lang="en-US" sz="2000" b="1" dirty="0">
-                <a:solidFill>
-                  <a:srgbClr val="FF0000"/>
-                </a:solidFill>
-                <a:latin typeface="Courier New" panose="02070309020205020404" pitchFamily="49" charset="0"/>
-                <a:cs typeface="Courier New" panose="02070309020205020404" pitchFamily="49" charset="0"/>
-              </a:rPr>
-              <a:t> of file '…' in database '…' was cancelled by user or timed out after xx milliseconds.</a:t>
-            </a:r>
-          </a:p>
-          <a:p>
-            <a:pPr marL="1033227" lvl="1" indent="-457200">
-              <a:buFont typeface="Arial" panose="020B0604020202020204" pitchFamily="34" charset="0"/>
-              <a:buChar char="•"/>
-            </a:pPr>
-            <a:r>
-              <a:rPr lang="en-US" sz="2800" dirty="0"/>
-              <a:t>Error 5144</a:t>
-            </a:r>
-          </a:p>
-          <a:p>
-            <a:pPr lvl="2"/>
-            <a:r>
-              <a:rPr lang="en-US" sz="2000" b="1" dirty="0" err="1">
-                <a:solidFill>
-                  <a:srgbClr val="FF0000"/>
-                </a:solidFill>
-                <a:latin typeface="Courier New" panose="02070309020205020404" pitchFamily="49" charset="0"/>
-                <a:cs typeface="Courier New" panose="02070309020205020404" pitchFamily="49" charset="0"/>
-              </a:rPr>
-              <a:t>Autogrow</a:t>
-            </a:r>
-            <a:r>
-              <a:rPr lang="en-US" sz="2000" b="1" dirty="0">
-                <a:solidFill>
-                  <a:srgbClr val="FF0000"/>
-                </a:solidFill>
-                <a:latin typeface="Courier New" panose="02070309020205020404" pitchFamily="49" charset="0"/>
-                <a:cs typeface="Courier New" panose="02070309020205020404" pitchFamily="49" charset="0"/>
-              </a:rPr>
-              <a:t> of file </a:t>
-            </a:r>
-            <a:r>
-              <a:rPr lang="en-US" sz="2000" dirty="0">
-                <a:solidFill>
-                  <a:srgbClr val="FF0000"/>
-                </a:solidFill>
-              </a:rPr>
-              <a:t>'</a:t>
-            </a:r>
-            <a:r>
-              <a:rPr lang="en-US" sz="2000" b="1" dirty="0">
-                <a:solidFill>
-                  <a:srgbClr val="FF0000"/>
-                </a:solidFill>
-                <a:latin typeface="Courier New" panose="02070309020205020404" pitchFamily="49" charset="0"/>
-                <a:cs typeface="Courier New" panose="02070309020205020404" pitchFamily="49" charset="0"/>
-              </a:rPr>
-              <a:t>…</a:t>
-            </a:r>
-            <a:r>
-              <a:rPr lang="en-US" sz="2000" dirty="0">
-                <a:solidFill>
-                  <a:srgbClr val="FF0000"/>
-                </a:solidFill>
-              </a:rPr>
-              <a:t>'</a:t>
-            </a:r>
-            <a:r>
-              <a:rPr lang="en-US" sz="2000" b="1" dirty="0">
-                <a:solidFill>
-                  <a:srgbClr val="FF0000"/>
-                </a:solidFill>
-                <a:latin typeface="Courier New" panose="02070309020205020404" pitchFamily="49" charset="0"/>
-                <a:cs typeface="Courier New" panose="02070309020205020404" pitchFamily="49" charset="0"/>
-              </a:rPr>
-              <a:t> in database </a:t>
-            </a:r>
-            <a:r>
-              <a:rPr lang="en-US" sz="2000" dirty="0">
-                <a:solidFill>
-                  <a:srgbClr val="FF0000"/>
-                </a:solidFill>
-              </a:rPr>
-              <a:t>'</a:t>
-            </a:r>
-            <a:r>
-              <a:rPr lang="en-US" sz="2000" b="1" dirty="0">
-                <a:solidFill>
-                  <a:srgbClr val="FF0000"/>
-                </a:solidFill>
-                <a:latin typeface="Courier New" panose="02070309020205020404" pitchFamily="49" charset="0"/>
-                <a:cs typeface="Courier New" panose="02070309020205020404" pitchFamily="49" charset="0"/>
-              </a:rPr>
-              <a:t>…</a:t>
-            </a:r>
-            <a:r>
-              <a:rPr lang="en-US" sz="2000" dirty="0">
-                <a:solidFill>
-                  <a:srgbClr val="FF0000"/>
-                </a:solidFill>
-              </a:rPr>
-              <a:t>'</a:t>
-            </a:r>
-            <a:r>
-              <a:rPr lang="en-US" sz="2000" b="1" dirty="0">
-                <a:solidFill>
-                  <a:srgbClr val="FF0000"/>
-                </a:solidFill>
-                <a:latin typeface="Courier New" panose="02070309020205020404" pitchFamily="49" charset="0"/>
-                <a:cs typeface="Courier New" panose="02070309020205020404" pitchFamily="49" charset="0"/>
-              </a:rPr>
-              <a:t> took xx milliseconds.</a:t>
-            </a:r>
+              <a:t>https://github.com/Microsoft/tigertoolbox/tree/master/Fixing-VLFs</a:t>
+            </a:r>
+            <a:endParaRPr lang="en-US" sz="2400" dirty="0"/>
           </a:p>
         </p:txBody>
       </p:sp>
     </p:spTree>
     <p:extLst>
       <p:ext uri="{BB962C8B-B14F-4D97-AF65-F5344CB8AC3E}">
-        <p14:creationId xmlns:p14="http://schemas.microsoft.com/office/powerpoint/2010/main" val="2965217731"/>
+        <p14:creationId xmlns:p14="http://schemas.microsoft.com/office/powerpoint/2010/main" val="3027963439"/>
       </p:ext>
     </p:extLst>
   </p:cSld>
@@ -10935,6 +11420,254 @@
           <a:p>
             <a:r>
               <a:rPr lang="en-US" dirty="0"/>
+              <a:t>Log Monitoring</a:t>
+            </a:r>
+          </a:p>
+        </p:txBody>
+      </p:sp>
+      <p:sp>
+        <p:nvSpPr>
+          <p:cNvPr id="3" name="Content Placeholder 2"/>
+          <p:cNvSpPr>
+            <a:spLocks noGrp="1"/>
+          </p:cNvSpPr>
+          <p:nvPr>
+            <p:ph idx="1"/>
+          </p:nvPr>
+        </p:nvSpPr>
+        <p:spPr/>
+        <p:txBody>
+          <a:bodyPr>
+            <a:normAutofit/>
+          </a:bodyPr>
+          <a:lstStyle/>
+          <a:p>
+            <a:pPr marL="571500" indent="-571500">
+              <a:buFont typeface="Arial" panose="020B0604020202020204" pitchFamily="34" charset="0"/>
+              <a:buChar char="•"/>
+            </a:pPr>
+            <a:r>
+              <a:rPr lang="en-US" sz="3200" dirty="0"/>
+              <a:t>Watch your VLF count</a:t>
+            </a:r>
+          </a:p>
+          <a:p>
+            <a:pPr marL="571500" indent="-571500">
+              <a:buFont typeface="Arial" panose="020B0604020202020204" pitchFamily="34" charset="0"/>
+              <a:buChar char="•"/>
+            </a:pPr>
+            <a:r>
+              <a:rPr lang="en-US" sz="3200" dirty="0"/>
+              <a:t>Monitor log size over time</a:t>
+            </a:r>
+          </a:p>
+          <a:p>
+            <a:pPr marL="571500" indent="-571500">
+              <a:buFont typeface="Arial" panose="020B0604020202020204" pitchFamily="34" charset="0"/>
+              <a:buChar char="•"/>
+            </a:pPr>
+            <a:r>
+              <a:rPr lang="en-US" sz="3200" dirty="0"/>
+              <a:t>Set SQL Alerts on:</a:t>
+            </a:r>
+          </a:p>
+          <a:p>
+            <a:pPr marL="1033227" lvl="1" indent="-457200">
+              <a:buFont typeface="Arial" panose="020B0604020202020204" pitchFamily="34" charset="0"/>
+              <a:buChar char="•"/>
+            </a:pPr>
+            <a:r>
+              <a:rPr lang="en-US" sz="2800" dirty="0"/>
+              <a:t>Severity 17 errors (will alert on log full)</a:t>
+            </a:r>
+          </a:p>
+          <a:p>
+            <a:pPr marL="1033227" lvl="1" indent="-457200">
+              <a:buFont typeface="Arial" panose="020B0604020202020204" pitchFamily="34" charset="0"/>
+              <a:buChar char="•"/>
+            </a:pPr>
+            <a:r>
+              <a:rPr lang="en-US" sz="2800" dirty="0"/>
+              <a:t>Error 5145</a:t>
+            </a:r>
+          </a:p>
+          <a:p>
+            <a:pPr lvl="2"/>
+            <a:r>
+              <a:rPr lang="en-US" sz="2000" b="1" dirty="0" err="1">
+                <a:solidFill>
+                  <a:srgbClr val="FF0000"/>
+                </a:solidFill>
+                <a:latin typeface="Courier New" panose="02070309020205020404" pitchFamily="49" charset="0"/>
+                <a:cs typeface="Courier New" panose="02070309020205020404" pitchFamily="49" charset="0"/>
+              </a:rPr>
+              <a:t>Autogrow</a:t>
+            </a:r>
+            <a:r>
+              <a:rPr lang="en-US" sz="2000" b="1" dirty="0">
+                <a:solidFill>
+                  <a:srgbClr val="FF0000"/>
+                </a:solidFill>
+                <a:latin typeface="Courier New" panose="02070309020205020404" pitchFamily="49" charset="0"/>
+                <a:cs typeface="Courier New" panose="02070309020205020404" pitchFamily="49" charset="0"/>
+              </a:rPr>
+              <a:t> of file '…' in database '…' was cancelled by user or timed out after xx milliseconds.</a:t>
+            </a:r>
+          </a:p>
+          <a:p>
+            <a:pPr marL="1033227" lvl="1" indent="-457200">
+              <a:buFont typeface="Arial" panose="020B0604020202020204" pitchFamily="34" charset="0"/>
+              <a:buChar char="•"/>
+            </a:pPr>
+            <a:r>
+              <a:rPr lang="en-US" sz="2800" dirty="0"/>
+              <a:t>Error 5144</a:t>
+            </a:r>
+          </a:p>
+          <a:p>
+            <a:pPr lvl="2"/>
+            <a:r>
+              <a:rPr lang="en-US" sz="2000" b="1" dirty="0" err="1">
+                <a:solidFill>
+                  <a:srgbClr val="FF0000"/>
+                </a:solidFill>
+                <a:latin typeface="Courier New" panose="02070309020205020404" pitchFamily="49" charset="0"/>
+                <a:cs typeface="Courier New" panose="02070309020205020404" pitchFamily="49" charset="0"/>
+              </a:rPr>
+              <a:t>Autogrow</a:t>
+            </a:r>
+            <a:r>
+              <a:rPr lang="en-US" sz="2000" b="1" dirty="0">
+                <a:solidFill>
+                  <a:srgbClr val="FF0000"/>
+                </a:solidFill>
+                <a:latin typeface="Courier New" panose="02070309020205020404" pitchFamily="49" charset="0"/>
+                <a:cs typeface="Courier New" panose="02070309020205020404" pitchFamily="49" charset="0"/>
+              </a:rPr>
+              <a:t> of file </a:t>
+            </a:r>
+            <a:r>
+              <a:rPr lang="en-US" sz="2000" dirty="0">
+                <a:solidFill>
+                  <a:srgbClr val="FF0000"/>
+                </a:solidFill>
+              </a:rPr>
+              <a:t>'</a:t>
+            </a:r>
+            <a:r>
+              <a:rPr lang="en-US" sz="2000" b="1" dirty="0">
+                <a:solidFill>
+                  <a:srgbClr val="FF0000"/>
+                </a:solidFill>
+                <a:latin typeface="Courier New" panose="02070309020205020404" pitchFamily="49" charset="0"/>
+                <a:cs typeface="Courier New" panose="02070309020205020404" pitchFamily="49" charset="0"/>
+              </a:rPr>
+              <a:t>…</a:t>
+            </a:r>
+            <a:r>
+              <a:rPr lang="en-US" sz="2000" dirty="0">
+                <a:solidFill>
+                  <a:srgbClr val="FF0000"/>
+                </a:solidFill>
+              </a:rPr>
+              <a:t>'</a:t>
+            </a:r>
+            <a:r>
+              <a:rPr lang="en-US" sz="2000" b="1" dirty="0">
+                <a:solidFill>
+                  <a:srgbClr val="FF0000"/>
+                </a:solidFill>
+                <a:latin typeface="Courier New" panose="02070309020205020404" pitchFamily="49" charset="0"/>
+                <a:cs typeface="Courier New" panose="02070309020205020404" pitchFamily="49" charset="0"/>
+              </a:rPr>
+              <a:t> in database </a:t>
+            </a:r>
+            <a:r>
+              <a:rPr lang="en-US" sz="2000" dirty="0">
+                <a:solidFill>
+                  <a:srgbClr val="FF0000"/>
+                </a:solidFill>
+              </a:rPr>
+              <a:t>'</a:t>
+            </a:r>
+            <a:r>
+              <a:rPr lang="en-US" sz="2000" b="1" dirty="0">
+                <a:solidFill>
+                  <a:srgbClr val="FF0000"/>
+                </a:solidFill>
+                <a:latin typeface="Courier New" panose="02070309020205020404" pitchFamily="49" charset="0"/>
+                <a:cs typeface="Courier New" panose="02070309020205020404" pitchFamily="49" charset="0"/>
+              </a:rPr>
+              <a:t>…</a:t>
+            </a:r>
+            <a:r>
+              <a:rPr lang="en-US" sz="2000" dirty="0">
+                <a:solidFill>
+                  <a:srgbClr val="FF0000"/>
+                </a:solidFill>
+              </a:rPr>
+              <a:t>'</a:t>
+            </a:r>
+            <a:r>
+              <a:rPr lang="en-US" sz="2000" b="1" dirty="0">
+                <a:solidFill>
+                  <a:srgbClr val="FF0000"/>
+                </a:solidFill>
+                <a:latin typeface="Courier New" panose="02070309020205020404" pitchFamily="49" charset="0"/>
+                <a:cs typeface="Courier New" panose="02070309020205020404" pitchFamily="49" charset="0"/>
+              </a:rPr>
+              <a:t> took xx milliseconds.</a:t>
+            </a:r>
+          </a:p>
+        </p:txBody>
+      </p:sp>
+    </p:spTree>
+    <p:extLst>
+      <p:ext uri="{BB962C8B-B14F-4D97-AF65-F5344CB8AC3E}">
+        <p14:creationId xmlns:p14="http://schemas.microsoft.com/office/powerpoint/2010/main" val="2965217731"/>
+      </p:ext>
+    </p:extLst>
+  </p:cSld>
+  <p:clrMapOvr>
+    <a:masterClrMapping/>
+  </p:clrMapOvr>
+</p:sld>
+</file>
+
+<file path=ppt/slides/slide55.xml><?xml version="1.0" encoding="utf-8"?>
+<p:sld xmlns:a="http://schemas.openxmlformats.org/drawingml/2006/main" xmlns:r="http://schemas.openxmlformats.org/officeDocument/2006/relationships" xmlns:p="http://schemas.openxmlformats.org/presentationml/2006/main">
+  <p:cSld>
+    <p:spTree>
+      <p:nvGrpSpPr>
+        <p:cNvPr id="1" name=""/>
+        <p:cNvGrpSpPr/>
+        <p:nvPr/>
+      </p:nvGrpSpPr>
+      <p:grpSpPr>
+        <a:xfrm>
+          <a:off x="0" y="0"/>
+          <a:ext cx="0" cy="0"/>
+          <a:chOff x="0" y="0"/>
+          <a:chExt cx="0" cy="0"/>
+        </a:xfrm>
+      </p:grpSpPr>
+      <p:sp>
+        <p:nvSpPr>
+          <p:cNvPr id="2" name="Title 1"/>
+          <p:cNvSpPr>
+            <a:spLocks noGrp="1"/>
+          </p:cNvSpPr>
+          <p:nvPr>
+            <p:ph type="title"/>
+          </p:nvPr>
+        </p:nvSpPr>
+        <p:spPr/>
+        <p:txBody>
+          <a:bodyPr/>
+          <a:lstStyle/>
+          <a:p>
+            <a:r>
+              <a:rPr lang="en-US" dirty="0"/>
               <a:t>Log Monitoring, continued</a:t>
             </a:r>
           </a:p>
@@ -11572,7 +12305,7 @@
             <a:fld id="{87FD5303-69AD-2E4D-B18B-E5EED0F0A60B}" type="slidenum">
               <a:rPr lang="en-US" smtClean="0"/>
               <a:pPr/>
-              <a:t>54</a:t>
+              <a:t>55</a:t>
             </a:fld>
             <a:r>
               <a:rPr lang="en-US"/>
@@ -11595,7 +12328,7 @@
 </p:sld>
 </file>
 
-<file path=ppt/slides/slide55.xml><?xml version="1.0" encoding="utf-8"?>
+<file path=ppt/slides/slide56.xml><?xml version="1.0" encoding="utf-8"?>
 <p:sld xmlns:a="http://schemas.openxmlformats.org/drawingml/2006/main" xmlns:r="http://schemas.openxmlformats.org/officeDocument/2006/relationships" xmlns:p="http://schemas.openxmlformats.org/presentationml/2006/main">
   <p:cSld>
     <p:spTree>

</xml_diff>